<commit_message>
Added a notice about the documentation to `PicoBlaze.html`
</commit_message>
<xml_diff>
--- a/seminar/PicoBlaze.pptx
+++ b/seminar/PicoBlaze.pptx
@@ -80,7 +80,7 @@
         <p:txBody>
           <a:bodyPr/>
           <a:p>
-            <a:fld id="{078F5F27-51BE-4217-9BF8-A8DF36FE0272}" type="slidenum">
+            <a:fld id="{1E5E9501-872A-4733-80F8-5A53773F400D}" type="slidenum">
               <a:t>&lt;#&gt;</a:t>
             </a:fld>
           </a:p>
@@ -289,7 +289,7 @@
         <p:txBody>
           <a:bodyPr/>
           <a:p>
-            <a:fld id="{FF0D6541-E998-4FAB-897B-82A037C6F9CD}" type="slidenum">
+            <a:fld id="{5583B43E-1716-49BA-A6B8-94F1FAD4DFBA}" type="slidenum">
               <a:t>&lt;#&gt;</a:t>
             </a:fld>
           </a:p>
@@ -584,7 +584,7 @@
         <p:txBody>
           <a:bodyPr/>
           <a:p>
-            <a:fld id="{7D2A59D1-D703-4E0A-BC37-7DE0888D5138}" type="slidenum">
+            <a:fld id="{4A348011-DD45-4822-9A00-3C693F0A7457}" type="slidenum">
               <a:t>&lt;#&gt;</a:t>
             </a:fld>
           </a:p>
@@ -965,7 +965,7 @@
         <p:txBody>
           <a:bodyPr/>
           <a:p>
-            <a:fld id="{B30BF2A5-A364-436D-86D3-D9C8DA05CDAF}" type="slidenum">
+            <a:fld id="{152CE1BD-95FE-4AF3-A44D-DFFFD6723C01}" type="slidenum">
               <a:t>&lt;#&gt;</a:t>
             </a:fld>
           </a:p>
@@ -1048,7 +1048,7 @@
         <p:txBody>
           <a:bodyPr/>
           <a:p>
-            <a:fld id="{B9EF8723-C270-4245-A369-D0BC51871F9D}" type="slidenum">
+            <a:fld id="{8BE61F50-122A-4263-B108-333D03A9B0DF}" type="slidenum">
               <a:t>&lt;#&gt;</a:t>
             </a:fld>
           </a:p>
@@ -1214,7 +1214,7 @@
         <p:txBody>
           <a:bodyPr/>
           <a:p>
-            <a:fld id="{4C434DA1-DFEA-4541-9573-D0B05BBEA1A4}" type="slidenum">
+            <a:fld id="{EF0E6DA0-5766-4800-9AF2-380C3662D8FF}" type="slidenum">
               <a:t>&lt;#&gt;</a:t>
             </a:fld>
           </a:p>
@@ -1380,7 +1380,7 @@
         <p:txBody>
           <a:bodyPr/>
           <a:p>
-            <a:fld id="{6CF91320-61C0-426F-AF4C-A3F693C325A7}" type="slidenum">
+            <a:fld id="{D56B4F07-BDB8-4229-8659-9788B6950844}" type="slidenum">
               <a:t>&lt;#&gt;</a:t>
             </a:fld>
           </a:p>
@@ -1589,7 +1589,7 @@
         <p:txBody>
           <a:bodyPr/>
           <a:p>
-            <a:fld id="{733F0825-1C1D-46A6-B8F3-4D25DA68D926}" type="slidenum">
+            <a:fld id="{13CFCADF-F1EB-464C-92C9-AF87F72672CA}" type="slidenum">
               <a:t>&lt;#&gt;</a:t>
             </a:fld>
           </a:p>
@@ -1712,7 +1712,7 @@
         <p:txBody>
           <a:bodyPr/>
           <a:p>
-            <a:fld id="{080EC3AF-D31F-4F1D-A182-96EA18E56B45}" type="slidenum">
+            <a:fld id="{05D34604-6E82-4551-8237-16D40AA053FD}" type="slidenum">
               <a:t>&lt;#&gt;</a:t>
             </a:fld>
           </a:p>
@@ -1836,7 +1836,7 @@
         <p:txBody>
           <a:bodyPr/>
           <a:p>
-            <a:fld id="{23F50E5C-5F7D-4E50-AE0C-CDDEF5D65CC0}" type="slidenum">
+            <a:fld id="{131D61BE-2B99-406E-AD5A-15BB69CE96E9}" type="slidenum">
               <a:t>&lt;#&gt;</a:t>
             </a:fld>
           </a:p>
@@ -2088,7 +2088,7 @@
         <p:txBody>
           <a:bodyPr/>
           <a:p>
-            <a:fld id="{DB972F80-2CE0-41FF-B38C-553DD257B664}" type="slidenum">
+            <a:fld id="{21370AB0-6206-4D28-88E0-C884B35C1D15}" type="slidenum">
               <a:t>&lt;#&gt;</a:t>
             </a:fld>
           </a:p>
@@ -2254,7 +2254,7 @@
         <p:txBody>
           <a:bodyPr/>
           <a:p>
-            <a:fld id="{0C3703F8-19F3-42B5-9EC5-400877A31B44}" type="slidenum">
+            <a:fld id="{F2862988-A7CD-4DD1-81DF-56FAD743D477}" type="slidenum">
               <a:t>&lt;#&gt;</a:t>
             </a:fld>
           </a:p>
@@ -2506,7 +2506,7 @@
         <p:txBody>
           <a:bodyPr/>
           <a:p>
-            <a:fld id="{755DA866-DB97-431C-942A-9436C9CAB0B3}" type="slidenum">
+            <a:fld id="{FFB2C724-3715-434B-A34C-725F533F62A4}" type="slidenum">
               <a:t>&lt;#&gt;</a:t>
             </a:fld>
           </a:p>
@@ -2758,7 +2758,7 @@
         <p:txBody>
           <a:bodyPr/>
           <a:p>
-            <a:fld id="{AAD119B8-6469-4120-9184-7E8E84F7587B}" type="slidenum">
+            <a:fld id="{B8D8E468-4C0E-4529-998F-6BF5642FDD07}" type="slidenum">
               <a:t>&lt;#&gt;</a:t>
             </a:fld>
           </a:p>
@@ -2967,7 +2967,7 @@
         <p:txBody>
           <a:bodyPr/>
           <a:p>
-            <a:fld id="{FE443B16-61FE-4A83-9BBC-38301E90CEE5}" type="slidenum">
+            <a:fld id="{9DD8B631-C845-414C-9460-5C46F133E205}" type="slidenum">
               <a:t>&lt;#&gt;</a:t>
             </a:fld>
           </a:p>
@@ -3262,7 +3262,7 @@
         <p:txBody>
           <a:bodyPr/>
           <a:p>
-            <a:fld id="{C802CC84-BEF4-4E08-8240-53520332F7A9}" type="slidenum">
+            <a:fld id="{1E70AAA9-F421-4B38-A0BE-73DD5D70A1C2}" type="slidenum">
               <a:t>&lt;#&gt;</a:t>
             </a:fld>
           </a:p>
@@ -3643,7 +3643,7 @@
         <p:txBody>
           <a:bodyPr/>
           <a:p>
-            <a:fld id="{54B6ED93-79C4-49EE-9CF4-0F2D92FB846F}" type="slidenum">
+            <a:fld id="{E3EA8D9E-00AC-4E9D-B056-38645727E7F3}" type="slidenum">
               <a:t>&lt;#&gt;</a:t>
             </a:fld>
           </a:p>
@@ -3809,7 +3809,7 @@
         <p:txBody>
           <a:bodyPr/>
           <a:p>
-            <a:fld id="{0EDDEBA8-143A-41E9-B95E-E9F3292FEB8E}" type="slidenum">
+            <a:fld id="{FFAB30AE-B56E-45EA-9B2E-CE41CAC0E53F}" type="slidenum">
               <a:t>&lt;#&gt;</a:t>
             </a:fld>
           </a:p>
@@ -4018,7 +4018,7 @@
         <p:txBody>
           <a:bodyPr/>
           <a:p>
-            <a:fld id="{02B02FA0-4428-43BD-A0CB-45D70725DA84}" type="slidenum">
+            <a:fld id="{C2454C8A-7275-4302-A876-832CBE85964B}" type="slidenum">
               <a:t>&lt;#&gt;</a:t>
             </a:fld>
           </a:p>
@@ -4141,7 +4141,7 @@
         <p:txBody>
           <a:bodyPr/>
           <a:p>
-            <a:fld id="{94FA585F-9B98-4909-A102-92F58EAB8926}" type="slidenum">
+            <a:fld id="{69DECF02-FB19-4D6A-89D5-FA6CE12BC211}" type="slidenum">
               <a:t>&lt;#&gt;</a:t>
             </a:fld>
           </a:p>
@@ -4265,7 +4265,7 @@
         <p:txBody>
           <a:bodyPr/>
           <a:p>
-            <a:fld id="{045EBA0F-300F-4521-A861-C8D7F8E34673}" type="slidenum">
+            <a:fld id="{2C8A872D-4E85-4911-AD3D-2DD250477858}" type="slidenum">
               <a:t>&lt;#&gt;</a:t>
             </a:fld>
           </a:p>
@@ -4517,7 +4517,7 @@
         <p:txBody>
           <a:bodyPr/>
           <a:p>
-            <a:fld id="{4B2B3CD4-D7FF-40B9-AD43-107041D327FA}" type="slidenum">
+            <a:fld id="{C298D1EA-75FD-48AA-AF54-B0CB406AC65D}" type="slidenum">
               <a:t>&lt;#&gt;</a:t>
             </a:fld>
           </a:p>
@@ -4769,7 +4769,7 @@
         <p:txBody>
           <a:bodyPr/>
           <a:p>
-            <a:fld id="{0074ECC7-12F0-4A06-BEE1-6D1315099D81}" type="slidenum">
+            <a:fld id="{FB55119E-CDBD-4C61-9F51-BA4066AE4BB2}" type="slidenum">
               <a:t>&lt;#&gt;</a:t>
             </a:fld>
           </a:p>
@@ -5021,7 +5021,7 @@
         <p:txBody>
           <a:bodyPr/>
           <a:p>
-            <a:fld id="{19538808-99CD-4D82-8265-423DD60C42C6}" type="slidenum">
+            <a:fld id="{6188E4D5-0584-44C7-A5D6-713A56BE29DD}" type="slidenum">
               <a:t>&lt;#&gt;</a:t>
             </a:fld>
           </a:p>
@@ -5560,7 +5560,7 @@
             <a:pPr indent="0" algn="r">
               <a:buNone/>
             </a:pPr>
-            <a:fld id="{BE81F173-71E0-41A4-A5DC-65193D05B75D}" type="slidenum">
+            <a:fld id="{DB71674B-5B4A-41EC-99F6-88FD27BFE513}" type="slidenum">
               <a:rPr b="0" lang="bs-BA" sz="1400" spc="-1" strike="noStrike">
                 <a:solidFill>
                   <a:srgbClr val="ffffff"/>
@@ -6159,7 +6159,7 @@
             <a:pPr indent="0" algn="r">
               <a:buNone/>
             </a:pPr>
-            <a:fld id="{5FBD8D88-2668-4A6F-AAF8-5862274488DC}" type="slidenum">
+            <a:fld id="{555CEAF4-5AAC-4D1F-8A89-D01FD003ABD7}" type="slidenum">
               <a:rPr b="0" lang="bs-BA" sz="1400" spc="-1" strike="noStrike">
                 <a:solidFill>
                   <a:srgbClr val="ffffff"/>
@@ -6557,7 +6557,7 @@
         <p:txBody>
           <a:bodyPr/>
           <a:p>
-            <a:fld id="{9A46AD10-226E-48E9-A6FC-BAFEB9B8EE38}" type="slidenum">
+            <a:fld id="{3A843427-B796-444F-BEFA-3793F82B604D}" type="slidenum">
               <a:t>10</a:t>
             </a:fld>
           </a:p>
@@ -6577,9 +6577,9 @@
         <p:txBody>
           <a:bodyPr/>
           <a:p>
-            <a:fld id="{45771175-AE7A-4113-9638-681425754980}" type="datetime1">
+            <a:fld id="{83757B33-742C-4FBB-A9D7-060CD015476D}" type="datetime1">
               <a:rPr lang="en-US"/>
-              <a:t>09/21/2023</a:t>
+              <a:t>10/06/2023</a:t>
             </a:fld>
           </a:p>
         </p:txBody>
@@ -6718,6 +6718,52 @@
               <a:latin typeface="Arial"/>
             </a:endParaRPr>
           </a:p>
+          <a:p>
+            <a:pPr marL="432000" indent="-324000">
+              <a:spcBef>
+                <a:spcPts val="1060"/>
+              </a:spcBef>
+              <a:buClr>
+                <a:srgbClr val="77caee"/>
+              </a:buClr>
+              <a:buSzPct val="45000"/>
+              <a:buFont typeface="Wingdings" charset="2"/>
+              <a:buChar char=""/>
+            </a:pPr>
+            <a:r>
+              <a:rPr b="0" lang="bs-BA" sz="2400" spc="-1" strike="noStrike">
+                <a:solidFill>
+                  <a:srgbClr val="009bdd"/>
+                </a:solidFill>
+                <a:latin typeface="Arial"/>
+              </a:rPr>
+              <a:t>Nedavno promijenjene zastavice i registri obojane su različitom bojom, da nam ne bi promakli. Za to se koristio </a:t>
+            </a:r>
+            <a:r>
+              <a:rPr b="0" i="1" lang="bs-BA" sz="2400" spc="-1" strike="noStrike">
+                <a:solidFill>
+                  <a:srgbClr val="009bdd"/>
+                </a:solidFill>
+                <a:latin typeface="Arial"/>
+              </a:rPr>
+              <a:t>DOM as a state</a:t>
+            </a:r>
+            <a:r>
+              <a:rPr b="0" lang="bs-BA" sz="2400" spc="-1" strike="noStrike">
+                <a:solidFill>
+                  <a:srgbClr val="009bdd"/>
+                </a:solidFill>
+                <a:latin typeface="Arial"/>
+              </a:rPr>
+              <a:t>, što možda i nije najbolje rješenje.</a:t>
+            </a:r>
+            <a:endParaRPr b="0" lang="bs-BA" sz="2400" spc="-1" strike="noStrike">
+              <a:solidFill>
+                <a:srgbClr val="009bdd"/>
+              </a:solidFill>
+              <a:latin typeface="Arial"/>
+            </a:endParaRPr>
+          </a:p>
         </p:txBody>
       </p:sp>
       <p:pic>
@@ -6757,7 +6803,7 @@
         <p:txBody>
           <a:bodyPr/>
           <a:p>
-            <a:fld id="{7EDDF574-4F66-4530-A4F3-7671AC86A3A1}" type="slidenum">
+            <a:fld id="{F89D8F1F-2DF4-45F7-935A-7FC84A2785CD}" type="slidenum">
               <a:t>11</a:t>
             </a:fld>
           </a:p>
@@ -6777,9 +6823,9 @@
         <p:txBody>
           <a:bodyPr/>
           <a:p>
-            <a:fld id="{848504E5-679C-4347-86A7-035D933F278D}" type="datetime1">
+            <a:fld id="{125D849A-5A6F-4CC2-89F3-61CB0FB4BB1E}" type="datetime1">
               <a:rPr lang="en-US"/>
-              <a:t>09/21/2023</a:t>
+              <a:t>10/06/2023</a:t>
             </a:fld>
           </a:p>
         </p:txBody>
@@ -7008,7 +7054,7 @@
         <p:txBody>
           <a:bodyPr/>
           <a:p>
-            <a:fld id="{82F4E571-FB14-4F70-A90C-3550DB8252D6}" type="slidenum">
+            <a:fld id="{B0445015-CBFD-4DE1-B5E2-F02C3337D630}" type="slidenum">
               <a:t>12</a:t>
             </a:fld>
           </a:p>
@@ -7028,9 +7074,9 @@
         <p:txBody>
           <a:bodyPr/>
           <a:p>
-            <a:fld id="{CBDB4D62-04BA-443F-88E8-94A1CE070C81}" type="datetime1">
+            <a:fld id="{D578CD90-F462-4EDB-B9E0-F906A92302EE}" type="datetime1">
               <a:rPr lang="en-US"/>
-              <a:t>09/21/2023</a:t>
+              <a:t>10/06/2023</a:t>
             </a:fld>
           </a:p>
         </p:txBody>
@@ -7225,7 +7271,7 @@
                 </a:solidFill>
                 <a:latin typeface="Arial"/>
               </a:rPr>
-              <a:t>Vjerujemo da je u modernim internetskim preglednicima (Firefox 69, Chrome 52...) to moguće riješiti CSS-om (naredba layout) i da će to i biti u nekoj budućoj verziji. Ali, for the time being, postoji checkbox kojim se program može donekle ubrzati. Uostalom, to rješenje sa checkboxom funkcionira i u Firefoxu 52.</a:t>
+              <a:t>Vjerujemo da je u modernim internetskim preglednicima (Firefox 69, Chrome 52...) to moguće riješiti CSS-om (naredba “contain: layout” i njoj srodne) i da će to i biti u nekoj budućoj verziji ovog simulatora. Ali, for the time being, postoji checkbox kojim se program može donekle ubrzati. Uostalom, to rješenje sa checkboxom funkcionira i u Firefoxu 52.</a:t>
             </a:r>
             <a:endParaRPr b="0" lang="bs-BA" sz="2200" spc="-1" strike="noStrike">
               <a:solidFill>
@@ -7250,7 +7296,7 @@
         <p:txBody>
           <a:bodyPr/>
           <a:p>
-            <a:fld id="{424C8C46-9228-489D-988B-F1CA9A183D14}" type="slidenum">
+            <a:fld id="{2A4D71E5-8930-4EB9-90B4-3520A081E4FF}" type="slidenum">
               <a:t>13</a:t>
             </a:fld>
           </a:p>
@@ -7270,9 +7316,9 @@
         <p:txBody>
           <a:bodyPr/>
           <a:p>
-            <a:fld id="{CD105215-A7F2-4E79-85A8-4D0695B6015F}" type="datetime1">
+            <a:fld id="{67844653-4EEC-43FC-BC6C-1FBB60EBA169}" type="datetime1">
               <a:rPr lang="en-US"/>
-              <a:t>09/21/2023</a:t>
+              <a:t>10/06/2023</a:t>
             </a:fld>
           </a:p>
         </p:txBody>
@@ -7478,7 +7524,7 @@
         <p:txBody>
           <a:bodyPr/>
           <a:p>
-            <a:fld id="{022D656A-A62D-4FD7-AFA0-48E4C1ACC606}" type="slidenum">
+            <a:fld id="{F45E2C13-3BE2-4F83-92BA-1F1D108E13B0}" type="slidenum">
               <a:t>14</a:t>
             </a:fld>
           </a:p>
@@ -7498,9 +7544,9 @@
         <p:txBody>
           <a:bodyPr/>
           <a:p>
-            <a:fld id="{DC203D3D-17EC-4EAC-864F-6ADA1BF4581D}" type="datetime1">
+            <a:fld id="{CC177D02-5C49-4B8B-AB63-D0E710B3A853}" type="datetime1">
               <a:rPr lang="en-US"/>
-              <a:t>09/21/2023</a:t>
+              <a:t>10/06/2023</a:t>
             </a:fld>
           </a:p>
         </p:txBody>
@@ -7658,7 +7704,7 @@
                 </a:solidFill>
                 <a:latin typeface="Arial"/>
               </a:rPr>
-              <a:t>Nedavno sam dobio kontributora s tog fakulteta koji se zove Agustin Izaguirre (agustiza). On je napravio nekoliko pull requestova na GitHubu, isprva sitni bug-fixi, a onda i dodavanje novih featuresa kao što su JEST testovi.</a:t>
+              <a:t>Nedavno sam dobio kontributora s tog fakulteta koji se zove Agustin Izaguirre (agustiza). On je napravio nekoliko pull requestova na GitHubu, isprva sitni bug-fixi (prvo da se naredba SRA ponaša ispravno kad je carry flag postavljen u jedinicu), a onda i dodavanje novih featuresa kao što su JEST testovi.</a:t>
             </a:r>
             <a:endParaRPr b="0" lang="bs-BA" sz="2400" spc="-1" strike="noStrike">
               <a:solidFill>
@@ -7683,7 +7729,7 @@
         <p:txBody>
           <a:bodyPr/>
           <a:p>
-            <a:fld id="{4C6E3BA5-652E-41EF-BC37-459292E74D5E}" type="slidenum">
+            <a:fld id="{3F0A4C1F-E619-46AC-BFF2-414D4F9BDB1D}" type="slidenum">
               <a:t>15</a:t>
             </a:fld>
           </a:p>
@@ -7703,9 +7749,9 @@
         <p:txBody>
           <a:bodyPr/>
           <a:p>
-            <a:fld id="{E91A41CB-CE00-4519-AE20-AE4D970600D9}" type="datetime1">
+            <a:fld id="{66D44FAA-681E-464E-8478-146AE1EF5D43}" type="datetime1">
               <a:rPr lang="en-US"/>
-              <a:t>09/21/2023</a:t>
+              <a:t>10/06/2023</a:t>
             </a:fld>
           </a:p>
         </p:txBody>
@@ -8056,7 +8102,7 @@
         <p:txBody>
           <a:bodyPr/>
           <a:p>
-            <a:fld id="{114379CE-5070-4086-BC7E-BB7F2CA7F317}" type="slidenum">
+            <a:fld id="{2176CF55-55B1-4690-A52D-DBE0B2DB466C}" type="slidenum">
               <a:t>16</a:t>
             </a:fld>
           </a:p>
@@ -8076,9 +8122,9 @@
         <p:txBody>
           <a:bodyPr/>
           <a:p>
-            <a:fld id="{EFB314FD-1507-4082-98E1-267BF3FACFAA}" type="datetime1">
+            <a:fld id="{61972692-8E30-4145-9628-394C4E986899}" type="datetime1">
               <a:rPr lang="en-US"/>
-              <a:t>09/21/2023</a:t>
+              <a:t>10/06/2023</a:t>
             </a:fld>
           </a:p>
         </p:txBody>
@@ -8180,7 +8226,7 @@
         <p:txBody>
           <a:bodyPr/>
           <a:p>
-            <a:fld id="{E165B22E-268C-41D5-A222-E0AB9B00909B}" type="slidenum">
+            <a:fld id="{39DB3E34-4FF5-461F-885F-A6A3E955F39F}" type="slidenum">
               <a:t>17</a:t>
             </a:fld>
           </a:p>
@@ -8200,9 +8246,9 @@
         <p:txBody>
           <a:bodyPr/>
           <a:p>
-            <a:fld id="{8B5A1D3D-6F0C-4BAA-85F8-974CCAE2E060}" type="datetime1">
+            <a:fld id="{DD1C2258-FDE7-4BB6-B9D2-FB898268F486}" type="datetime1">
               <a:rPr lang="en-US"/>
-              <a:t>09/21/2023</a:t>
+              <a:t>10/06/2023</a:t>
             </a:fld>
           </a:p>
         </p:txBody>
@@ -8525,7 +8571,7 @@
         <p:txBody>
           <a:bodyPr/>
           <a:p>
-            <a:fld id="{F3A39271-7B0A-4077-A5FC-62ED7C66E65B}" type="slidenum">
+            <a:fld id="{A93E9F43-6C74-454B-97D5-F88609B9B141}" type="slidenum">
               <a:t>2</a:t>
             </a:fld>
           </a:p>
@@ -8545,9 +8591,9 @@
         <p:txBody>
           <a:bodyPr/>
           <a:p>
-            <a:fld id="{97BC6A56-A128-42B6-88AC-A26587B3B14C}" type="datetime1">
+            <a:fld id="{F96ED6D6-380A-416E-9F86-A4FDB771EABD}" type="datetime1">
               <a:rPr lang="en-US"/>
-              <a:t>09/21/2023</a:t>
+              <a:t>10/06/2023</a:t>
             </a:fld>
           </a:p>
         </p:txBody>
@@ -8802,7 +8848,7 @@
         <p:txBody>
           <a:bodyPr/>
           <a:p>
-            <a:fld id="{28DA5911-C41D-482C-9BF0-E63A220B29F4}" type="slidenum">
+            <a:fld id="{3661534C-2B25-4788-967A-B13527B4DAA6}" type="slidenum">
               <a:t>3</a:t>
             </a:fld>
           </a:p>
@@ -8822,9 +8868,9 @@
         <p:txBody>
           <a:bodyPr/>
           <a:p>
-            <a:fld id="{E1AB4A70-9028-4468-9D37-9DBEFE15DC65}" type="datetime1">
+            <a:fld id="{DE51A927-14BC-4D7B-ACF5-7D9642187EBA}" type="datetime1">
               <a:rPr lang="en-US"/>
-              <a:t>09/21/2023</a:t>
+              <a:t>10/06/2023</a:t>
             </a:fld>
           </a:p>
         </p:txBody>
@@ -9053,7 +9099,7 @@
         <p:txBody>
           <a:bodyPr/>
           <a:p>
-            <a:fld id="{A11CDD3A-1D2E-4161-92D9-B5A1BCF3E508}" type="slidenum">
+            <a:fld id="{9D9A5460-AD25-4297-B71C-A123F857307C}" type="slidenum">
               <a:t>4</a:t>
             </a:fld>
           </a:p>
@@ -9073,9 +9119,9 @@
         <p:txBody>
           <a:bodyPr/>
           <a:p>
-            <a:fld id="{C0317E7B-C63C-413C-8EAF-67E0004D281D}" type="datetime1">
+            <a:fld id="{7E618E50-E1D4-4158-9381-E8FB575F1D44}" type="datetime1">
               <a:rPr lang="en-US"/>
-              <a:t>09/21/2023</a:t>
+              <a:t>10/06/2023</a:t>
             </a:fld>
           </a:p>
         </p:txBody>
@@ -9318,7 +9364,7 @@
         <p:txBody>
           <a:bodyPr/>
           <a:p>
-            <a:fld id="{282CE165-418C-44EA-BC8D-086CB642ADB0}" type="slidenum">
+            <a:fld id="{1F50C996-1042-4306-9A74-5DB9B942994D}" type="slidenum">
               <a:t>5</a:t>
             </a:fld>
           </a:p>
@@ -9338,9 +9384,9 @@
         <p:txBody>
           <a:bodyPr/>
           <a:p>
-            <a:fld id="{D1006242-9714-4EB5-A1C6-579C00BD4630}" type="datetime1">
+            <a:fld id="{96591726-34EF-4A31-8A65-E4326C73E742}" type="datetime1">
               <a:rPr lang="en-US"/>
-              <a:t>09/21/2023</a:t>
+              <a:t>10/06/2023</a:t>
             </a:fld>
           </a:p>
         </p:txBody>
@@ -9583,7 +9629,7 @@
         <p:txBody>
           <a:bodyPr/>
           <a:p>
-            <a:fld id="{F2E0A59D-19B8-4FCE-A192-964D246DB75B}" type="slidenum">
+            <a:fld id="{1DBBB064-8B23-4163-BECE-4D21125BC4EC}" type="slidenum">
               <a:t>6</a:t>
             </a:fld>
           </a:p>
@@ -9603,9 +9649,9 @@
         <p:txBody>
           <a:bodyPr/>
           <a:p>
-            <a:fld id="{9F64D0B9-CEE8-4F1E-8FBD-349792B83258}" type="datetime1">
+            <a:fld id="{9631FFD6-B0F2-4B52-89C4-0F9E14636568}" type="datetime1">
               <a:rPr lang="en-US"/>
-              <a:t>09/21/2023</a:t>
+              <a:t>10/06/2023</a:t>
             </a:fld>
           </a:p>
         </p:txBody>
@@ -9825,7 +9871,7 @@
         <p:txBody>
           <a:bodyPr/>
           <a:p>
-            <a:fld id="{1D638B86-1839-4393-9E86-8B341C326196}" type="slidenum">
+            <a:fld id="{32B47125-82F6-4B9E-AE85-A8D69D2613A1}" type="slidenum">
               <a:t>7</a:t>
             </a:fld>
           </a:p>
@@ -9845,9 +9891,9 @@
         <p:txBody>
           <a:bodyPr/>
           <a:p>
-            <a:fld id="{9FEC8AAA-9BC5-48D4-BCA5-D8C2FC414886}" type="datetime1">
+            <a:fld id="{27BD68BF-DCBA-4C65-9522-B00A03EBA72C}" type="datetime1">
               <a:rPr lang="en-US"/>
-              <a:t>09/21/2023</a:t>
+              <a:t>10/06/2023</a:t>
             </a:fld>
           </a:p>
         </p:txBody>
@@ -10025,7 +10071,7 @@
         <p:txBody>
           <a:bodyPr/>
           <a:p>
-            <a:fld id="{ADB88DCF-FB65-4216-B574-5046A5BC1C33}" type="slidenum">
+            <a:fld id="{FD70CBC8-50AA-4D42-ACD9-6C492DF3F927}" type="slidenum">
               <a:t>8</a:t>
             </a:fld>
           </a:p>
@@ -10045,9 +10091,9 @@
         <p:txBody>
           <a:bodyPr/>
           <a:p>
-            <a:fld id="{51738F78-07CA-41A4-891A-526FBCFAAFCF}" type="datetime1">
+            <a:fld id="{B038D146-684D-4C85-A0C1-799D45D15B5F}" type="datetime1">
               <a:rPr lang="en-US"/>
-              <a:t>09/21/2023</a:t>
+              <a:t>10/06/2023</a:t>
             </a:fld>
           </a:p>
         </p:txBody>
@@ -10295,7 +10341,7 @@
         <p:txBody>
           <a:bodyPr/>
           <a:p>
-            <a:fld id="{BD954B65-4E17-4AC4-8544-64880EA8EB58}" type="slidenum">
+            <a:fld id="{45EB7603-2B08-435F-85C0-1687040EC082}" type="slidenum">
               <a:t>9</a:t>
             </a:fld>
           </a:p>
@@ -10315,9 +10361,9 @@
         <p:txBody>
           <a:bodyPr/>
           <a:p>
-            <a:fld id="{BC212250-7697-497B-A9F1-E1A336B42A41}" type="datetime1">
+            <a:fld id="{E932EA6A-F5BA-4872-8816-664C963B83A0}" type="datetime1">
               <a:rPr lang="en-US"/>
-              <a:t>09/21/2023</a:t>
+              <a:t>10/06/2023</a:t>
             </a:fld>
           </a:p>
         </p:txBody>

</xml_diff>

<commit_message>
Warned about a few important bugs in the presentation
</commit_message>
<xml_diff>
--- a/seminar/PicoBlaze.pptx
+++ b/seminar/PicoBlaze.pptx
@@ -23,6 +23,8 @@
     <p:sldId id="270" r:id="rId18"/>
     <p:sldId id="271" r:id="rId19"/>
     <p:sldId id="272" r:id="rId20"/>
+    <p:sldId id="273" r:id="rId21"/>
+    <p:sldId id="274" r:id="rId22"/>
   </p:sldIdLst>
   <p:sldSz cx="10080625" cy="5670550"/>
   <p:notesSz cx="7559675" cy="10691813"/>
@@ -80,7 +82,7 @@
         <p:txBody>
           <a:bodyPr/>
           <a:p>
-            <a:fld id="{1E5E9501-872A-4733-80F8-5A53773F400D}" type="slidenum">
+            <a:fld id="{3A8E4DC7-F288-403B-A252-4A0EA8C6C8B3}" type="slidenum">
               <a:t>&lt;#&gt;</a:t>
             </a:fld>
           </a:p>
@@ -289,7 +291,7 @@
         <p:txBody>
           <a:bodyPr/>
           <a:p>
-            <a:fld id="{5583B43E-1716-49BA-A6B8-94F1FAD4DFBA}" type="slidenum">
+            <a:fld id="{DF942BE9-7826-466F-AA95-E013A641C7CA}" type="slidenum">
               <a:t>&lt;#&gt;</a:t>
             </a:fld>
           </a:p>
@@ -584,7 +586,7 @@
         <p:txBody>
           <a:bodyPr/>
           <a:p>
-            <a:fld id="{4A348011-DD45-4822-9A00-3C693F0A7457}" type="slidenum">
+            <a:fld id="{EFCEB3E9-8BFA-45DF-AD55-357C7C235379}" type="slidenum">
               <a:t>&lt;#&gt;</a:t>
             </a:fld>
           </a:p>
@@ -965,7 +967,7 @@
         <p:txBody>
           <a:bodyPr/>
           <a:p>
-            <a:fld id="{152CE1BD-95FE-4AF3-A44D-DFFFD6723C01}" type="slidenum">
+            <a:fld id="{27B258ED-7F3A-4E0C-BF44-316483A8AD67}" type="slidenum">
               <a:t>&lt;#&gt;</a:t>
             </a:fld>
           </a:p>
@@ -1048,7 +1050,7 @@
         <p:txBody>
           <a:bodyPr/>
           <a:p>
-            <a:fld id="{8BE61F50-122A-4263-B108-333D03A9B0DF}" type="slidenum">
+            <a:fld id="{A573DDE3-1025-46DB-ACF9-D48B00AB0B7A}" type="slidenum">
               <a:t>&lt;#&gt;</a:t>
             </a:fld>
           </a:p>
@@ -1214,7 +1216,7 @@
         <p:txBody>
           <a:bodyPr/>
           <a:p>
-            <a:fld id="{EF0E6DA0-5766-4800-9AF2-380C3662D8FF}" type="slidenum">
+            <a:fld id="{1F627CDB-C043-43D1-A337-CCA811D387F8}" type="slidenum">
               <a:t>&lt;#&gt;</a:t>
             </a:fld>
           </a:p>
@@ -1380,7 +1382,7 @@
         <p:txBody>
           <a:bodyPr/>
           <a:p>
-            <a:fld id="{D56B4F07-BDB8-4229-8659-9788B6950844}" type="slidenum">
+            <a:fld id="{FD00FF0E-CEA5-44B5-842E-10E580E76919}" type="slidenum">
               <a:t>&lt;#&gt;</a:t>
             </a:fld>
           </a:p>
@@ -1589,7 +1591,7 @@
         <p:txBody>
           <a:bodyPr/>
           <a:p>
-            <a:fld id="{13CFCADF-F1EB-464C-92C9-AF87F72672CA}" type="slidenum">
+            <a:fld id="{C04215C4-C25A-4643-AC71-269501F6E000}" type="slidenum">
               <a:t>&lt;#&gt;</a:t>
             </a:fld>
           </a:p>
@@ -1712,7 +1714,7 @@
         <p:txBody>
           <a:bodyPr/>
           <a:p>
-            <a:fld id="{05D34604-6E82-4551-8237-16D40AA053FD}" type="slidenum">
+            <a:fld id="{4BA4CD60-343F-433C-88F0-C0CAF03DD3A4}" type="slidenum">
               <a:t>&lt;#&gt;</a:t>
             </a:fld>
           </a:p>
@@ -1836,7 +1838,7 @@
         <p:txBody>
           <a:bodyPr/>
           <a:p>
-            <a:fld id="{131D61BE-2B99-406E-AD5A-15BB69CE96E9}" type="slidenum">
+            <a:fld id="{45B01691-E715-4BE4-A844-E6F7889A8952}" type="slidenum">
               <a:t>&lt;#&gt;</a:t>
             </a:fld>
           </a:p>
@@ -2088,7 +2090,7 @@
         <p:txBody>
           <a:bodyPr/>
           <a:p>
-            <a:fld id="{21370AB0-6206-4D28-88E0-C884B35C1D15}" type="slidenum">
+            <a:fld id="{1B2F3115-CDDA-455A-8965-CDB17C0C8E26}" type="slidenum">
               <a:t>&lt;#&gt;</a:t>
             </a:fld>
           </a:p>
@@ -2254,7 +2256,7 @@
         <p:txBody>
           <a:bodyPr/>
           <a:p>
-            <a:fld id="{F2862988-A7CD-4DD1-81DF-56FAD743D477}" type="slidenum">
+            <a:fld id="{F24EDC23-C51A-4803-BFAF-CE84C471DDA7}" type="slidenum">
               <a:t>&lt;#&gt;</a:t>
             </a:fld>
           </a:p>
@@ -2506,7 +2508,7 @@
         <p:txBody>
           <a:bodyPr/>
           <a:p>
-            <a:fld id="{FFB2C724-3715-434B-A34C-725F533F62A4}" type="slidenum">
+            <a:fld id="{1B8864CB-C398-4924-A370-A3B6CFD524F6}" type="slidenum">
               <a:t>&lt;#&gt;</a:t>
             </a:fld>
           </a:p>
@@ -2758,7 +2760,7 @@
         <p:txBody>
           <a:bodyPr/>
           <a:p>
-            <a:fld id="{B8D8E468-4C0E-4529-998F-6BF5642FDD07}" type="slidenum">
+            <a:fld id="{459AFF53-634E-483E-BB57-9CE488CC5F0E}" type="slidenum">
               <a:t>&lt;#&gt;</a:t>
             </a:fld>
           </a:p>
@@ -2967,7 +2969,7 @@
         <p:txBody>
           <a:bodyPr/>
           <a:p>
-            <a:fld id="{9DD8B631-C845-414C-9460-5C46F133E205}" type="slidenum">
+            <a:fld id="{8FB62973-1C89-4759-91E1-56690107851E}" type="slidenum">
               <a:t>&lt;#&gt;</a:t>
             </a:fld>
           </a:p>
@@ -3262,7 +3264,7 @@
         <p:txBody>
           <a:bodyPr/>
           <a:p>
-            <a:fld id="{1E70AAA9-F421-4B38-A0BE-73DD5D70A1C2}" type="slidenum">
+            <a:fld id="{B88D4057-60E6-4E58-BC75-6576BF23F7B8}" type="slidenum">
               <a:t>&lt;#&gt;</a:t>
             </a:fld>
           </a:p>
@@ -3643,7 +3645,7 @@
         <p:txBody>
           <a:bodyPr/>
           <a:p>
-            <a:fld id="{E3EA8D9E-00AC-4E9D-B056-38645727E7F3}" type="slidenum">
+            <a:fld id="{60F24AC1-723B-422F-8B62-DA20E91B0B5C}" type="slidenum">
               <a:t>&lt;#&gt;</a:t>
             </a:fld>
           </a:p>
@@ -3809,7 +3811,7 @@
         <p:txBody>
           <a:bodyPr/>
           <a:p>
-            <a:fld id="{FFAB30AE-B56E-45EA-9B2E-CE41CAC0E53F}" type="slidenum">
+            <a:fld id="{30B58278-82DB-439A-87D8-EE4724FC5495}" type="slidenum">
               <a:t>&lt;#&gt;</a:t>
             </a:fld>
           </a:p>
@@ -4018,7 +4020,7 @@
         <p:txBody>
           <a:bodyPr/>
           <a:p>
-            <a:fld id="{C2454C8A-7275-4302-A876-832CBE85964B}" type="slidenum">
+            <a:fld id="{82A5E2CA-5342-464E-87E5-BD9E3C0D7165}" type="slidenum">
               <a:t>&lt;#&gt;</a:t>
             </a:fld>
           </a:p>
@@ -4141,7 +4143,7 @@
         <p:txBody>
           <a:bodyPr/>
           <a:p>
-            <a:fld id="{69DECF02-FB19-4D6A-89D5-FA6CE12BC211}" type="slidenum">
+            <a:fld id="{C7117FD6-6C1F-4925-BB65-A42250FE21BC}" type="slidenum">
               <a:t>&lt;#&gt;</a:t>
             </a:fld>
           </a:p>
@@ -4265,7 +4267,7 @@
         <p:txBody>
           <a:bodyPr/>
           <a:p>
-            <a:fld id="{2C8A872D-4E85-4911-AD3D-2DD250477858}" type="slidenum">
+            <a:fld id="{E91470ED-21BD-49F8-982C-1E7A3E8EECC0}" type="slidenum">
               <a:t>&lt;#&gt;</a:t>
             </a:fld>
           </a:p>
@@ -4517,7 +4519,7 @@
         <p:txBody>
           <a:bodyPr/>
           <a:p>
-            <a:fld id="{C298D1EA-75FD-48AA-AF54-B0CB406AC65D}" type="slidenum">
+            <a:fld id="{B558BFBA-3EA3-4A20-A970-40368FA537CB}" type="slidenum">
               <a:t>&lt;#&gt;</a:t>
             </a:fld>
           </a:p>
@@ -4769,7 +4771,7 @@
         <p:txBody>
           <a:bodyPr/>
           <a:p>
-            <a:fld id="{FB55119E-CDBD-4C61-9F51-BA4066AE4BB2}" type="slidenum">
+            <a:fld id="{9C225260-1CCB-45BB-BA53-A064939A10C9}" type="slidenum">
               <a:t>&lt;#&gt;</a:t>
             </a:fld>
           </a:p>
@@ -5021,7 +5023,7 @@
         <p:txBody>
           <a:bodyPr/>
           <a:p>
-            <a:fld id="{6188E4D5-0584-44C7-A5D6-713A56BE29DD}" type="slidenum">
+            <a:fld id="{7C64EEF5-2611-4921-894F-C448EECC0234}" type="slidenum">
               <a:t>&lt;#&gt;</a:t>
             </a:fld>
           </a:p>
@@ -5560,7 +5562,7 @@
             <a:pPr indent="0" algn="r">
               <a:buNone/>
             </a:pPr>
-            <a:fld id="{DB71674B-5B4A-41EC-99F6-88FD27BFE513}" type="slidenum">
+            <a:fld id="{5919374E-48B2-4E0F-8867-9B455679B28F}" type="slidenum">
               <a:rPr b="0" lang="bs-BA" sz="1400" spc="-1" strike="noStrike">
                 <a:solidFill>
                   <a:srgbClr val="ffffff"/>
@@ -6159,7 +6161,7 @@
             <a:pPr indent="0" algn="r">
               <a:buNone/>
             </a:pPr>
-            <a:fld id="{555CEAF4-5AAC-4D1F-8A89-D01FD003ABD7}" type="slidenum">
+            <a:fld id="{A390C4F5-8351-4D36-A202-CD581ED1C56C}" type="slidenum">
               <a:rPr b="0" lang="bs-BA" sz="1400" spc="-1" strike="noStrike">
                 <a:solidFill>
                   <a:srgbClr val="ffffff"/>
@@ -6346,7 +6348,7 @@
       </p:grpSpPr>
       <p:sp>
         <p:nvSpPr>
-          <p:cNvPr id="116" name="PlaceHolder 1"/>
+          <p:cNvPr id="115" name="PlaceHolder 1"/>
           <p:cNvSpPr>
             <a:spLocks noGrp="1"/>
           </p:cNvSpPr>
@@ -6395,7 +6397,7 @@
       </p:sp>
       <p:sp>
         <p:nvSpPr>
-          <p:cNvPr id="117" name="PlaceHolder 2"/>
+          <p:cNvPr id="116" name="PlaceHolder 2"/>
           <p:cNvSpPr>
             <a:spLocks noGrp="1"/>
           </p:cNvSpPr>
@@ -6439,7 +6441,7 @@
                 </a:solidFill>
                 <a:latin typeface="Arial"/>
               </a:rPr>
-              <a:t>Kada program radi kako želimo u simulatoru, možemo ga isprobati na pravom PicoBlazeu tako da kliknemo na “Download Hexadecimal”.</a:t>
+              <a:t>Ako želimo, možemo dodati i breakpointse na koje će emulacija pauzirati.</a:t>
             </a:r>
             <a:endParaRPr b="0" lang="bs-BA" sz="2400" spc="-1" strike="noStrike">
               <a:solidFill>
@@ -6467,7 +6469,71 @@
                 </a:solidFill>
                 <a:latin typeface="Arial"/>
               </a:rPr>
-              <a:t>I Xilinxov asembler za PicoBlaze ispisuje heksadecimalne datoteke, tako da činjenica da ne ispisujemo binarne datoteke nije problem.</a:t>
+              <a:t>Tu sam mogućnost dodao na prijedlog profesora Tomislava Matića mlađeg.</a:t>
+            </a:r>
+            <a:endParaRPr b="0" lang="bs-BA" sz="2400" spc="-1" strike="noStrike">
+              <a:solidFill>
+                <a:srgbClr val="009bdd"/>
+              </a:solidFill>
+              <a:latin typeface="Arial"/>
+            </a:endParaRPr>
+          </a:p>
+          <a:p>
+            <a:pPr marL="432000" indent="-324000">
+              <a:spcBef>
+                <a:spcPts val="1060"/>
+              </a:spcBef>
+              <a:buClr>
+                <a:srgbClr val="77caee"/>
+              </a:buClr>
+              <a:buSzPct val="45000"/>
+              <a:buFont typeface="Wingdings" charset="2"/>
+              <a:buChar char=""/>
+            </a:pPr>
+            <a:r>
+              <a:rPr b="0" lang="bs-BA" sz="2400" spc="-1" strike="noStrike">
+                <a:solidFill>
+                  <a:srgbClr val="009bdd"/>
+                </a:solidFill>
+                <a:latin typeface="Arial"/>
+              </a:rPr>
+              <a:t>Postoje samo </a:t>
+            </a:r>
+            <a:r>
+              <a:rPr b="0" i="1" lang="bs-BA" sz="2400" spc="-1" strike="noStrike">
+                <a:solidFill>
+                  <a:srgbClr val="009bdd"/>
+                </a:solidFill>
+                <a:latin typeface="Arial"/>
+              </a:rPr>
+              <a:t>permanent</a:t>
+            </a:r>
+            <a:r>
+              <a:rPr b="0" lang="bs-BA" sz="2400" spc="-1" strike="noStrike">
+                <a:solidFill>
+                  <a:srgbClr val="009bdd"/>
+                </a:solidFill>
+                <a:latin typeface="Arial"/>
+              </a:rPr>
+              <a:t> breakpointsi, ne i </a:t>
+            </a:r>
+            <a:r>
+              <a:rPr b="0" i="1" lang="bs-BA" sz="2400" spc="-1" strike="noStrike">
+                <a:solidFill>
+                  <a:srgbClr val="009bdd"/>
+                </a:solidFill>
+                <a:latin typeface="Arial"/>
+              </a:rPr>
+              <a:t>temporary</a:t>
+            </a:r>
+            <a:r>
+              <a:rPr b="0" lang="bs-BA" sz="2400" spc="-1" strike="noStrike">
+                <a:solidFill>
+                  <a:srgbClr val="009bdd"/>
+                </a:solidFill>
+                <a:latin typeface="Arial"/>
+              </a:rPr>
+              <a:t>.</a:t>
             </a:r>
             <a:endParaRPr b="0" lang="bs-BA" sz="2400" spc="-1" strike="noStrike">
               <a:solidFill>
@@ -6480,7 +6546,7 @@
       </p:sp>
       <p:pic>
         <p:nvPicPr>
-          <p:cNvPr id="118" name="" descr=""/>
+          <p:cNvPr id="117" name="" descr=""/>
           <p:cNvPicPr/>
           <p:nvPr/>
         </p:nvPicPr>
@@ -6490,8 +6556,8 @@
         </p:blipFill>
         <p:spPr>
           <a:xfrm>
-            <a:off x="365760" y="937440"/>
-            <a:ext cx="4663440" cy="3863160"/>
+            <a:off x="228600" y="1013760"/>
+            <a:ext cx="4739400" cy="3786840"/>
           </a:xfrm>
           <a:prstGeom prst="rect">
             <a:avLst/>
@@ -6503,14 +6569,14 @@
       </p:pic>
       <p:sp>
         <p:nvSpPr>
-          <p:cNvPr id="119" name=""/>
+          <p:cNvPr id="118" name=""/>
           <p:cNvSpPr/>
           <p:nvPr/>
         </p:nvSpPr>
         <p:spPr>
           <a:xfrm>
-            <a:off x="1828800" y="914400"/>
-            <a:ext cx="1828800" cy="457200"/>
+            <a:off x="228600" y="4114800"/>
+            <a:ext cx="685800" cy="228600"/>
           </a:xfrm>
           <a:prstGeom prst="ellipse">
             <a:avLst/>
@@ -6557,7 +6623,7 @@
         <p:txBody>
           <a:bodyPr/>
           <a:p>
-            <a:fld id="{3A843427-B796-444F-BEFA-3793F82B604D}" type="slidenum">
+            <a:fld id="{2F8353DF-157C-4592-8C4B-3B84A6F8799C}" type="slidenum">
               <a:t>10</a:t>
             </a:fld>
           </a:p>
@@ -6577,7 +6643,7 @@
         <p:txBody>
           <a:bodyPr/>
           <a:p>
-            <a:fld id="{83757B33-742C-4FBB-A9D7-060CD015476D}" type="datetime1">
+            <a:fld id="{6931A2F3-B235-4A82-B9CA-385D1AD98871}" type="datetime1">
               <a:rPr lang="en-US"/>
               <a:t>10/06/2023</a:t>
             </a:fld>
@@ -6616,7 +6682,7 @@
       </p:grpSpPr>
       <p:sp>
         <p:nvSpPr>
-          <p:cNvPr id="120" name="PlaceHolder 1"/>
+          <p:cNvPr id="119" name="PlaceHolder 1"/>
           <p:cNvSpPr>
             <a:spLocks noGrp="1"/>
           </p:cNvSpPr>
@@ -6665,7 +6731,7 @@
       </p:sp>
       <p:sp>
         <p:nvSpPr>
-          <p:cNvPr id="121" name="PlaceHolder 2"/>
+          <p:cNvPr id="120" name="PlaceHolder 2"/>
           <p:cNvSpPr>
             <a:spLocks noGrp="1"/>
           </p:cNvSpPr>
@@ -6709,7 +6775,25 @@
                 </a:solidFill>
                 <a:latin typeface="Arial"/>
               </a:rPr>
-              <a:t>Kada dostignemo breakpoint, možemo pogledati trenutne registre, zastavice i memoriju u tablicama.</a:t>
+              <a:t>Kada program radi kako želimo u simulatoru, možemo ga isprobati na pravom PicoBlazeu tako da kliknemo na “</a:t>
+            </a:r>
+            <a:r>
+              <a:rPr b="0" i="1" lang="bs-BA" sz="2400" spc="-1" strike="noStrike">
+                <a:solidFill>
+                  <a:srgbClr val="009bdd"/>
+                </a:solidFill>
+                <a:latin typeface="Arial"/>
+              </a:rPr>
+              <a:t>Download Hexadecimal</a:t>
+            </a:r>
+            <a:r>
+              <a:rPr b="0" lang="bs-BA" sz="2400" spc="-1" strike="noStrike">
+                <a:solidFill>
+                  <a:srgbClr val="009bdd"/>
+                </a:solidFill>
+                <a:latin typeface="Arial"/>
+              </a:rPr>
+              <a:t>”.</a:t>
             </a:r>
             <a:endParaRPr b="0" lang="bs-BA" sz="2400" spc="-1" strike="noStrike">
               <a:solidFill>
@@ -6737,25 +6821,7 @@
                 </a:solidFill>
                 <a:latin typeface="Arial"/>
               </a:rPr>
-              <a:t>Nedavno promijenjene zastavice i registri obojane su različitom bojom, da nam ne bi promakli. Za to se koristio </a:t>
-            </a:r>
-            <a:r>
-              <a:rPr b="0" i="1" lang="bs-BA" sz="2400" spc="-1" strike="noStrike">
-                <a:solidFill>
-                  <a:srgbClr val="009bdd"/>
-                </a:solidFill>
-                <a:latin typeface="Arial"/>
-              </a:rPr>
-              <a:t>DOM as a state</a:t>
-            </a:r>
-            <a:r>
-              <a:rPr b="0" lang="bs-BA" sz="2400" spc="-1" strike="noStrike">
-                <a:solidFill>
-                  <a:srgbClr val="009bdd"/>
-                </a:solidFill>
-                <a:latin typeface="Arial"/>
-              </a:rPr>
-              <a:t>, što možda i nije najbolje rješenje.</a:t>
+              <a:t>I Xilinxov asembler za PicoBlaze ispisuje heksadecimalne datoteke, tako da činjenica da ne ispisujemo binarne datoteke nije problem.</a:t>
             </a:r>
             <a:endParaRPr b="0" lang="bs-BA" sz="2400" spc="-1" strike="noStrike">
               <a:solidFill>
@@ -6768,7 +6834,7 @@
       </p:sp>
       <p:pic>
         <p:nvPicPr>
-          <p:cNvPr id="122" name="" descr=""/>
+          <p:cNvPr id="121" name="" descr=""/>
           <p:cNvPicPr/>
           <p:nvPr/>
         </p:nvPicPr>
@@ -6778,8 +6844,8 @@
         </p:blipFill>
         <p:spPr>
           <a:xfrm>
-            <a:off x="343080" y="914400"/>
-            <a:ext cx="4686120" cy="3779280"/>
+            <a:off x="365760" y="937440"/>
+            <a:ext cx="4663440" cy="3863160"/>
           </a:xfrm>
           <a:prstGeom prst="rect">
             <a:avLst/>
@@ -6791,6 +6857,48 @@
       </p:pic>
       <p:sp>
         <p:nvSpPr>
+          <p:cNvPr id="122" name=""/>
+          <p:cNvSpPr/>
+          <p:nvPr/>
+        </p:nvSpPr>
+        <p:spPr>
+          <a:xfrm>
+            <a:off x="1828800" y="914400"/>
+            <a:ext cx="1828800" cy="457200"/>
+          </a:xfrm>
+          <a:prstGeom prst="ellipse">
+            <a:avLst/>
+          </a:prstGeom>
+          <a:noFill/>
+          <a:ln w="18000">
+            <a:solidFill>
+              <a:srgbClr val="009bdd"/>
+            </a:solidFill>
+            <a:round/>
+          </a:ln>
+        </p:spPr>
+        <p:style>
+          <a:lnRef idx="0"/>
+          <a:fillRef idx="0"/>
+          <a:effectRef idx="0"/>
+          <a:fontRef idx="minor"/>
+        </p:style>
+        <p:txBody>
+          <a:bodyPr wrap="none" lIns="90000" rIns="90000" tIns="45000" bIns="45000" anchor="ctr">
+            <a:noAutofit/>
+          </a:bodyPr>
+          <a:p>
+            <a:endParaRPr b="0" lang="bs-BA" sz="1800" spc="-1" strike="noStrike">
+              <a:solidFill>
+                <a:srgbClr val="000000"/>
+              </a:solidFill>
+              <a:latin typeface="Arial"/>
+            </a:endParaRPr>
+          </a:p>
+        </p:txBody>
+      </p:sp>
+      <p:sp>
+        <p:nvSpPr>
           <p:cNvPr id="4" name="PlaceHolder 3"/>
           <p:cNvSpPr>
             <a:spLocks noGrp="1"/>
@@ -6803,7 +6911,7 @@
         <p:txBody>
           <a:bodyPr/>
           <a:p>
-            <a:fld id="{F89D8F1F-2DF4-45F7-935A-7FC84A2785CD}" type="slidenum">
+            <a:fld id="{9DA0C846-EC7D-4902-A85A-440645A588BF}" type="slidenum">
               <a:t>11</a:t>
             </a:fld>
           </a:p>
@@ -6823,7 +6931,7 @@
         <p:txBody>
           <a:bodyPr/>
           <a:p>
-            <a:fld id="{125D849A-5A6F-4CC2-89F3-61CB0FB4BB1E}" type="datetime1">
+            <a:fld id="{7618BC9B-41E6-4894-9E1C-F7101ED7E258}" type="datetime1">
               <a:rPr lang="en-US"/>
               <a:t>10/06/2023</a:t>
             </a:fld>
@@ -6955,7 +7063,7 @@
                 </a:solidFill>
                 <a:latin typeface="Arial"/>
               </a:rPr>
-              <a:t>Da bismo komunicirali s programima kao što je “Decimal to Binary” (drugi primjer s lijeva), moramo uključiti UART terminal.</a:t>
+              <a:t>Kada dostignemo breakpoint, možemo pogledati trenutne registre, zastavice i memoriju u tablicama.</a:t>
             </a:r>
             <a:endParaRPr b="0" lang="bs-BA" sz="2400" spc="-1" strike="noStrike">
               <a:solidFill>
@@ -6983,7 +7091,25 @@
                 </a:solidFill>
                 <a:latin typeface="Arial"/>
               </a:rPr>
-              <a:t>Preporučljivo je pritom isključiti checkbox “Update registers and flags on every step”...</a:t>
+              <a:t>Nedavno promijenjene zastavice i registri obojane su različitom bojom, da nam ne bi promakli. Za to se koristio </a:t>
+            </a:r>
+            <a:r>
+              <a:rPr b="0" i="1" lang="bs-BA" sz="2400" spc="-1" strike="noStrike">
+                <a:solidFill>
+                  <a:srgbClr val="009bdd"/>
+                </a:solidFill>
+                <a:latin typeface="Arial"/>
+              </a:rPr>
+              <a:t>DOM as a state</a:t>
+            </a:r>
+            <a:r>
+              <a:rPr b="0" lang="bs-BA" sz="2400" spc="-1" strike="noStrike">
+                <a:solidFill>
+                  <a:srgbClr val="009bdd"/>
+                </a:solidFill>
+                <a:latin typeface="Arial"/>
+              </a:rPr>
+              <a:t>, što možda i nije najbolje rješenje.</a:t>
             </a:r>
             <a:endParaRPr b="0" lang="bs-BA" sz="2400" spc="-1" strike="noStrike">
               <a:solidFill>
@@ -7006,8 +7132,8 @@
         </p:blipFill>
         <p:spPr>
           <a:xfrm>
-            <a:off x="396360" y="914400"/>
-            <a:ext cx="3032640" cy="1833120"/>
+            <a:off x="343080" y="914400"/>
+            <a:ext cx="4686120" cy="3779280"/>
           </a:xfrm>
           <a:prstGeom prst="rect">
             <a:avLst/>
@@ -7017,29 +7143,6 @@
           </a:ln>
         </p:spPr>
       </p:pic>
-      <p:pic>
-        <p:nvPicPr>
-          <p:cNvPr id="126" name="" descr=""/>
-          <p:cNvPicPr/>
-          <p:nvPr/>
-        </p:nvPicPr>
-        <p:blipFill>
-          <a:blip r:embed="rId2"/>
-          <a:stretch/>
-        </p:blipFill>
-        <p:spPr>
-          <a:xfrm>
-            <a:off x="327960" y="3200400"/>
-            <a:ext cx="4701240" cy="837720"/>
-          </a:xfrm>
-          <a:prstGeom prst="rect">
-            <a:avLst/>
-          </a:prstGeom>
-          <a:ln w="18000">
-            <a:noFill/>
-          </a:ln>
-        </p:spPr>
-      </p:pic>
       <p:sp>
         <p:nvSpPr>
           <p:cNvPr id="4" name="PlaceHolder 3"/>
@@ -7054,7 +7157,7 @@
         <p:txBody>
           <a:bodyPr/>
           <a:p>
-            <a:fld id="{B0445015-CBFD-4DE1-B5E2-F02C3337D630}" type="slidenum">
+            <a:fld id="{F0478BC0-A990-4871-9F1F-BFAAA83C01B7}" type="slidenum">
               <a:t>12</a:t>
             </a:fld>
           </a:p>
@@ -7074,7 +7177,7 @@
         <p:txBody>
           <a:bodyPr/>
           <a:p>
-            <a:fld id="{D578CD90-F462-4EDB-B9E0-F906A92302EE}" type="datetime1">
+            <a:fld id="{66529A95-2656-4D40-BA2E-8FD676D944C6}" type="datetime1">
               <a:rPr lang="en-US"/>
               <a:t>10/06/2023</a:t>
             </a:fld>
@@ -7113,7 +7216,7 @@
       </p:grpSpPr>
       <p:sp>
         <p:nvSpPr>
-          <p:cNvPr id="127" name="PlaceHolder 1"/>
+          <p:cNvPr id="126" name="PlaceHolder 1"/>
           <p:cNvSpPr>
             <a:spLocks noGrp="1"/>
           </p:cNvSpPr>
@@ -7149,16 +7252,7 @@
                 </a:solidFill>
                 <a:latin typeface="Arial"/>
               </a:rPr>
-              <a:t>“</a:t>
-            </a:r>
-            <a:r>
-              <a:rPr b="0" lang="bs-BA" sz="3300" spc="-1" strike="noStrike">
-                <a:solidFill>
-                  <a:srgbClr val="ffffff"/>
-                </a:solidFill>
-                <a:latin typeface="Arial"/>
-              </a:rPr>
-              <a:t>Update registers and flags on every step”</a:t>
+              <a:t>Kako se koristi...</a:t>
             </a:r>
             <a:endParaRPr b="0" lang="bs-BA" sz="3300" spc="-1" strike="noStrike">
               <a:solidFill>
@@ -7171,7 +7265,7 @@
       </p:sp>
       <p:sp>
         <p:nvSpPr>
-          <p:cNvPr id="128" name="PlaceHolder 2"/>
+          <p:cNvPr id="127" name="PlaceHolder 2"/>
           <p:cNvSpPr>
             <a:spLocks noGrp="1"/>
           </p:cNvSpPr>
@@ -7181,8 +7275,8 @@
         </p:nvSpPr>
         <p:spPr>
           <a:xfrm>
-            <a:off x="360000" y="1080000"/>
-            <a:ext cx="9360000" cy="3600000"/>
+            <a:off x="5155920" y="1080000"/>
+            <a:ext cx="4567320" cy="3600000"/>
           </a:xfrm>
           <a:prstGeom prst="rect">
             <a:avLst/>
@@ -7209,15 +7303,15 @@
               <a:buChar char=""/>
             </a:pPr>
             <a:r>
-              <a:rPr b="0" lang="bs-BA" sz="2200" spc="-1" strike="noStrike">
+              <a:rPr b="0" lang="bs-BA" sz="2400" spc="-1" strike="noStrike">
                 <a:solidFill>
                   <a:srgbClr val="009bdd"/>
                 </a:solidFill>
                 <a:latin typeface="Arial"/>
               </a:rPr>
-              <a:t>Naime, moj program ima problem s layout trashingom: svaki put kad se upiše novi broj u tablicu s registrima (dakle, praktički svaka instrukcija), tablica se neprimjetno poveća ili smanji za nekoliko piksela... ali dovoljno da prisili browser da čitavu stranicu mora iznova renderirati.</a:t>
-            </a:r>
-            <a:endParaRPr b="0" lang="bs-BA" sz="2200" spc="-1" strike="noStrike">
+              <a:t>Da bismo komunicirali s programima kao što je “Decimal to Binary” (drugi primjer s lijeva), moramo uključiti UART terminal.</a:t>
+            </a:r>
+            <a:endParaRPr b="0" lang="bs-BA" sz="2400" spc="-1" strike="noStrike">
               <a:solidFill>
                 <a:srgbClr val="009bdd"/>
               </a:solidFill>
@@ -7237,51 +7331,87 @@
               <a:buChar char=""/>
             </a:pPr>
             <a:r>
-              <a:rPr b="0" lang="bs-BA" sz="2200" spc="-1" strike="noStrike">
+              <a:rPr b="0" lang="bs-BA" sz="2400" spc="-1" strike="noStrike">
                 <a:solidFill>
                   <a:srgbClr val="009bdd"/>
                 </a:solidFill>
                 <a:latin typeface="Arial"/>
               </a:rPr>
-              <a:t>Činjenica da sam koristio monospace font u tablici, izgleda, ne pomaže.</a:t>
-            </a:r>
-            <a:endParaRPr b="0" lang="bs-BA" sz="2200" spc="-1" strike="noStrike">
+              <a:t>Preporučljivo je pritom isključiti checkbox “</a:t>
+            </a:r>
+            <a:r>
+              <a:rPr b="0" i="1" lang="bs-BA" sz="2400" spc="-1" strike="noStrike">
+                <a:solidFill>
+                  <a:srgbClr val="009bdd"/>
+                </a:solidFill>
+                <a:latin typeface="Arial"/>
+              </a:rPr>
+              <a:t>Update registers and flags on every step</a:t>
+            </a:r>
+            <a:r>
+              <a:rPr b="0" lang="bs-BA" sz="2400" spc="-1" strike="noStrike">
+                <a:solidFill>
+                  <a:srgbClr val="009bdd"/>
+                </a:solidFill>
+                <a:latin typeface="Arial"/>
+              </a:rPr>
+              <a:t>”...</a:t>
+            </a:r>
+            <a:endParaRPr b="0" lang="bs-BA" sz="2400" spc="-1" strike="noStrike">
               <a:solidFill>
                 <a:srgbClr val="009bdd"/>
               </a:solidFill>
               <a:latin typeface="Arial"/>
             </a:endParaRPr>
           </a:p>
-          <a:p>
-            <a:pPr marL="432000" indent="-324000">
-              <a:spcBef>
-                <a:spcPts val="1060"/>
-              </a:spcBef>
-              <a:buClr>
-                <a:srgbClr val="77caee"/>
-              </a:buClr>
-              <a:buSzPct val="45000"/>
-              <a:buFont typeface="Wingdings" charset="2"/>
-              <a:buChar char=""/>
-            </a:pPr>
-            <a:r>
-              <a:rPr b="0" lang="bs-BA" sz="2200" spc="-1" strike="noStrike">
-                <a:solidFill>
-                  <a:srgbClr val="009bdd"/>
-                </a:solidFill>
-                <a:latin typeface="Arial"/>
-              </a:rPr>
-              <a:t>Vjerujemo da je u modernim internetskim preglednicima (Firefox 69, Chrome 52...) to moguće riješiti CSS-om (naredba “contain: layout” i njoj srodne) i da će to i biti u nekoj budućoj verziji ovog simulatora. Ali, for the time being, postoji checkbox kojim se program može donekle ubrzati. Uostalom, to rješenje sa checkboxom funkcionira i u Firefoxu 52.</a:t>
-            </a:r>
-            <a:endParaRPr b="0" lang="bs-BA" sz="2200" spc="-1" strike="noStrike">
-              <a:solidFill>
-                <a:srgbClr val="009bdd"/>
-              </a:solidFill>
-              <a:latin typeface="Arial"/>
-            </a:endParaRPr>
-          </a:p>
-        </p:txBody>
-      </p:sp>
+        </p:txBody>
+      </p:sp>
+      <p:pic>
+        <p:nvPicPr>
+          <p:cNvPr id="128" name="" descr=""/>
+          <p:cNvPicPr/>
+          <p:nvPr/>
+        </p:nvPicPr>
+        <p:blipFill>
+          <a:blip r:embed="rId1"/>
+          <a:stretch/>
+        </p:blipFill>
+        <p:spPr>
+          <a:xfrm>
+            <a:off x="396360" y="914400"/>
+            <a:ext cx="3032640" cy="1833120"/>
+          </a:xfrm>
+          <a:prstGeom prst="rect">
+            <a:avLst/>
+          </a:prstGeom>
+          <a:ln w="18000">
+            <a:noFill/>
+          </a:ln>
+        </p:spPr>
+      </p:pic>
+      <p:pic>
+        <p:nvPicPr>
+          <p:cNvPr id="129" name="" descr=""/>
+          <p:cNvPicPr/>
+          <p:nvPr/>
+        </p:nvPicPr>
+        <p:blipFill>
+          <a:blip r:embed="rId2"/>
+          <a:stretch/>
+        </p:blipFill>
+        <p:spPr>
+          <a:xfrm>
+            <a:off x="327960" y="3200400"/>
+            <a:ext cx="4701240" cy="837720"/>
+          </a:xfrm>
+          <a:prstGeom prst="rect">
+            <a:avLst/>
+          </a:prstGeom>
+          <a:ln w="18000">
+            <a:noFill/>
+          </a:ln>
+        </p:spPr>
+      </p:pic>
       <p:sp>
         <p:nvSpPr>
           <p:cNvPr id="4" name="PlaceHolder 3"/>
@@ -7296,7 +7426,7 @@
         <p:txBody>
           <a:bodyPr/>
           <a:p>
-            <a:fld id="{2A4D71E5-8930-4EB9-90B4-3520A081E4FF}" type="slidenum">
+            <a:fld id="{8876A1E8-76E4-4108-9533-5B78F2B5B978}" type="slidenum">
               <a:t>13</a:t>
             </a:fld>
           </a:p>
@@ -7316,7 +7446,7 @@
         <p:txBody>
           <a:bodyPr/>
           <a:p>
-            <a:fld id="{67844653-4EEC-43FC-BC6C-1FBB60EBA169}" type="datetime1">
+            <a:fld id="{FDF8C877-9EEE-4336-9CC7-0E64BD517FE9}" type="datetime1">
               <a:rPr lang="en-US"/>
               <a:t>10/06/2023</a:t>
             </a:fld>
@@ -7355,7 +7485,7 @@
       </p:grpSpPr>
       <p:sp>
         <p:nvSpPr>
-          <p:cNvPr id="129" name="PlaceHolder 1"/>
+          <p:cNvPr id="130" name="PlaceHolder 1"/>
           <p:cNvSpPr>
             <a:spLocks noGrp="1"/>
           </p:cNvSpPr>
@@ -7391,7 +7521,16 @@
                 </a:solidFill>
                 <a:latin typeface="Arial"/>
               </a:rPr>
-              <a:t>Kako se koristi...</a:t>
+              <a:t>“</a:t>
+            </a:r>
+            <a:r>
+              <a:rPr b="0" lang="bs-BA" sz="3300" spc="-1" strike="noStrike">
+                <a:solidFill>
+                  <a:srgbClr val="ffffff"/>
+                </a:solidFill>
+                <a:latin typeface="Arial"/>
+              </a:rPr>
+              <a:t>Update registers and flags on every step”</a:t>
             </a:r>
             <a:endParaRPr b="0" lang="bs-BA" sz="3300" spc="-1" strike="noStrike">
               <a:solidFill>
@@ -7404,7 +7543,7 @@
       </p:sp>
       <p:sp>
         <p:nvSpPr>
-          <p:cNvPr id="130" name="PlaceHolder 2"/>
+          <p:cNvPr id="131" name="PlaceHolder 2"/>
           <p:cNvSpPr>
             <a:spLocks noGrp="1"/>
           </p:cNvSpPr>
@@ -7414,8 +7553,8 @@
         </p:nvSpPr>
         <p:spPr>
           <a:xfrm>
-            <a:off x="5155920" y="1080000"/>
-            <a:ext cx="4567320" cy="3600000"/>
+            <a:off x="360000" y="1080000"/>
+            <a:ext cx="9360000" cy="3600000"/>
           </a:xfrm>
           <a:prstGeom prst="rect">
             <a:avLst/>
@@ -7442,15 +7581,15 @@
               <a:buChar char=""/>
             </a:pPr>
             <a:r>
-              <a:rPr b="0" lang="bs-BA" sz="2400" spc="-1" strike="noStrike">
+              <a:rPr b="0" lang="bs-BA" sz="2200" spc="-1" strike="noStrike">
                 <a:solidFill>
                   <a:srgbClr val="009bdd"/>
                 </a:solidFill>
                 <a:latin typeface="Arial"/>
               </a:rPr>
-              <a:t>Asembler podržava ono što se očekuje od današnjeg asemblera: aritmetičke izraze u konstantama, if-grananje, if-else grananje i while-petlje. Svaki asembler ujedno je i interpreter.</a:t>
-            </a:r>
-            <a:endParaRPr b="0" lang="bs-BA" sz="2400" spc="-1" strike="noStrike">
+              <a:t>Naime, moj program ima problem s layout trashingom: svaki put kad se upiše novi broj u tablicu s registrima (dakle, praktički svaka instrukcija), tablica se neprimjetno poveća ili smanji za nekoliko piksela... ali dovoljno da prisili browser da čitavu stranicu mora iznova renderirati.</a:t>
+            </a:r>
+            <a:endParaRPr b="0" lang="bs-BA" sz="2200" spc="-1" strike="noStrike">
               <a:solidFill>
                 <a:srgbClr val="009bdd"/>
               </a:solidFill>
@@ -7470,46 +7609,87 @@
               <a:buChar char=""/>
             </a:pPr>
             <a:r>
-              <a:rPr b="0" lang="bs-BA" sz="2400" spc="-1" strike="noStrike">
+              <a:rPr b="0" lang="bs-BA" sz="2200" spc="-1" strike="noStrike">
                 <a:solidFill>
                   <a:srgbClr val="009bdd"/>
                 </a:solidFill>
                 <a:latin typeface="Arial"/>
               </a:rPr>
-              <a:t>Primjer “Preprocessor Test” ispisuje Fibonaccijeve brojeve manje od 100 za vrijeme asembliranja.</a:t>
-            </a:r>
-            <a:endParaRPr b="0" lang="bs-BA" sz="2400" spc="-1" strike="noStrike">
+              <a:t>Činjenica da sam koristio monospace font u tablici, izgleda, ne pomaže.</a:t>
+            </a:r>
+            <a:endParaRPr b="0" lang="bs-BA" sz="2200" spc="-1" strike="noStrike">
               <a:solidFill>
                 <a:srgbClr val="009bdd"/>
               </a:solidFill>
               <a:latin typeface="Arial"/>
             </a:endParaRPr>
           </a:p>
-        </p:txBody>
-      </p:sp>
-      <p:pic>
-        <p:nvPicPr>
-          <p:cNvPr id="131" name="" descr=""/>
-          <p:cNvPicPr/>
-          <p:nvPr/>
-        </p:nvPicPr>
-        <p:blipFill>
-          <a:blip r:embed="rId1"/>
-          <a:stretch/>
-        </p:blipFill>
-        <p:spPr>
-          <a:xfrm>
-            <a:off x="228600" y="983160"/>
-            <a:ext cx="4671000" cy="3817440"/>
-          </a:xfrm>
-          <a:prstGeom prst="rect">
-            <a:avLst/>
-          </a:prstGeom>
-          <a:ln w="18000">
-            <a:noFill/>
-          </a:ln>
-        </p:spPr>
-      </p:pic>
+          <a:p>
+            <a:pPr marL="432000" indent="-324000">
+              <a:spcBef>
+                <a:spcPts val="1060"/>
+              </a:spcBef>
+              <a:buClr>
+                <a:srgbClr val="77caee"/>
+              </a:buClr>
+              <a:buSzPct val="45000"/>
+              <a:buFont typeface="Wingdings" charset="2"/>
+              <a:buChar char=""/>
+            </a:pPr>
+            <a:r>
+              <a:rPr b="0" lang="bs-BA" sz="2200" spc="-1" strike="noStrike">
+                <a:solidFill>
+                  <a:srgbClr val="009bdd"/>
+                </a:solidFill>
+                <a:latin typeface="Arial"/>
+              </a:rPr>
+              <a:t>Vjerujemo da je u modernim internetskim preglednicima (Firefox 69, Chrome 52...) to moguće riješiti CSS-om (naredba “</a:t>
+            </a:r>
+            <a:r>
+              <a:rPr b="0" i="1" lang="bs-BA" sz="2200" spc="-1" strike="noStrike">
+                <a:solidFill>
+                  <a:srgbClr val="009bdd"/>
+                </a:solidFill>
+                <a:latin typeface="Arial"/>
+              </a:rPr>
+              <a:t>contain: layout</a:t>
+            </a:r>
+            <a:r>
+              <a:rPr b="0" lang="bs-BA" sz="2200" spc="-1" strike="noStrike">
+                <a:solidFill>
+                  <a:srgbClr val="009bdd"/>
+                </a:solidFill>
+                <a:latin typeface="Arial"/>
+              </a:rPr>
+              <a:t>” i njoj srodne) i da će to i biti u nekoj budućoj verziji ovog simulatora. Ali, for the time being, postoji checkbox kojim se program može donekle ubrzati. Uostalom, to rješenje sa checkboxom funkcionira i u Firefoxu 52 (koji ne podržava “</a:t>
+            </a:r>
+            <a:r>
+              <a:rPr b="0" i="1" lang="bs-BA" sz="2200" spc="-1" strike="noStrike">
+                <a:solidFill>
+                  <a:srgbClr val="009bdd"/>
+                </a:solidFill>
+                <a:latin typeface="Arial"/>
+              </a:rPr>
+              <a:t>contain: layout</a:t>
+            </a:r>
+            <a:r>
+              <a:rPr b="0" lang="bs-BA" sz="2200" spc="-1" strike="noStrike">
+                <a:solidFill>
+                  <a:srgbClr val="009bdd"/>
+                </a:solidFill>
+                <a:latin typeface="Arial"/>
+              </a:rPr>
+              <a:t>” i njoj srodne naredbe).</a:t>
+            </a:r>
+            <a:endParaRPr b="0" lang="bs-BA" sz="2200" spc="-1" strike="noStrike">
+              <a:solidFill>
+                <a:srgbClr val="009bdd"/>
+              </a:solidFill>
+              <a:latin typeface="Arial"/>
+            </a:endParaRPr>
+          </a:p>
+        </p:txBody>
+      </p:sp>
       <p:sp>
         <p:nvSpPr>
           <p:cNvPr id="4" name="PlaceHolder 3"/>
@@ -7524,7 +7704,7 @@
         <p:txBody>
           <a:bodyPr/>
           <a:p>
-            <a:fld id="{F45E2C13-3BE2-4F83-92BA-1F1D108E13B0}" type="slidenum">
+            <a:fld id="{BB9BEF16-FADE-4303-B300-F67628CD1F72}" type="slidenum">
               <a:t>14</a:t>
             </a:fld>
           </a:p>
@@ -7544,7 +7724,7 @@
         <p:txBody>
           <a:bodyPr/>
           <a:p>
-            <a:fld id="{CC177D02-5C49-4B8B-AB63-D0E710B3A853}" type="datetime1">
+            <a:fld id="{408AB898-B84C-40BD-BF09-69ACBD7C0FC1}" type="datetime1">
               <a:rPr lang="en-US"/>
               <a:t>10/06/2023</a:t>
             </a:fld>
@@ -7619,7 +7799,7 @@
                 </a:solidFill>
                 <a:latin typeface="Arial"/>
               </a:rPr>
-              <a:t>Out in the wild...</a:t>
+              <a:t>Kako se koristi...</a:t>
             </a:r>
             <a:endParaRPr b="0" lang="bs-BA" sz="3300" spc="-1" strike="noStrike">
               <a:solidFill>
@@ -7642,8 +7822,8 @@
         </p:nvSpPr>
         <p:spPr>
           <a:xfrm>
-            <a:off x="360000" y="1080000"/>
-            <a:ext cx="9360000" cy="3600000"/>
+            <a:off x="5155920" y="1080000"/>
+            <a:ext cx="4567320" cy="3600000"/>
           </a:xfrm>
           <a:prstGeom prst="rect">
             <a:avLst/>
@@ -7676,7 +7856,7 @@
                 </a:solidFill>
                 <a:latin typeface="Arial"/>
               </a:rPr>
-              <a:t>Moj se program koristi na fakultetu u Argentini za uvod u ugrađene sustave.</a:t>
+              <a:t>Asembler podržava ono što se očekuje od današnjeg asemblera: aritmetičke izraze u konstantama, if-grananje, if-else grananje i while-petlje. Svaki asembler ujedno je i interpreter.</a:t>
             </a:r>
             <a:endParaRPr b="0" lang="bs-BA" sz="2400" spc="-1" strike="noStrike">
               <a:solidFill>
@@ -7704,7 +7884,7 @@
                 </a:solidFill>
                 <a:latin typeface="Arial"/>
               </a:rPr>
-              <a:t>Nedavno sam dobio kontributora s tog fakulteta koji se zove Agustin Izaguirre (agustiza). On je napravio nekoliko pull requestova na GitHubu, isprva sitni bug-fixi (prvo da se naredba SRA ponaša ispravno kad je carry flag postavljen u jedinicu), a onda i dodavanje novih featuresa kao što su JEST testovi.</a:t>
+              <a:t>Primjer “Preprocessor Test” ispisuje Fibonaccijeve brojeve manje od 100 za vrijeme asembliranja.</a:t>
             </a:r>
             <a:endParaRPr b="0" lang="bs-BA" sz="2400" spc="-1" strike="noStrike">
               <a:solidFill>
@@ -7715,6 +7895,29 @@
           </a:p>
         </p:txBody>
       </p:sp>
+      <p:pic>
+        <p:nvPicPr>
+          <p:cNvPr id="134" name="" descr=""/>
+          <p:cNvPicPr/>
+          <p:nvPr/>
+        </p:nvPicPr>
+        <p:blipFill>
+          <a:blip r:embed="rId1"/>
+          <a:stretch/>
+        </p:blipFill>
+        <p:spPr>
+          <a:xfrm>
+            <a:off x="228600" y="983160"/>
+            <a:ext cx="4671000" cy="3817440"/>
+          </a:xfrm>
+          <a:prstGeom prst="rect">
+            <a:avLst/>
+          </a:prstGeom>
+          <a:ln w="18000">
+            <a:noFill/>
+          </a:ln>
+        </p:spPr>
+      </p:pic>
       <p:sp>
         <p:nvSpPr>
           <p:cNvPr id="4" name="PlaceHolder 3"/>
@@ -7729,7 +7932,7 @@
         <p:txBody>
           <a:bodyPr/>
           <a:p>
-            <a:fld id="{3F0A4C1F-E619-46AC-BFF2-414D4F9BDB1D}" type="slidenum">
+            <a:fld id="{342F2680-A29D-420F-9507-FDB08F9DF60A}" type="slidenum">
               <a:t>15</a:t>
             </a:fld>
           </a:p>
@@ -7749,7 +7952,7 @@
         <p:txBody>
           <a:bodyPr/>
           <a:p>
-            <a:fld id="{66D44FAA-681E-464E-8478-146AE1EF5D43}" type="datetime1">
+            <a:fld id="{BADF0028-B775-41D4-8902-1E1F168CB5C7}" type="datetime1">
               <a:rPr lang="en-US"/>
               <a:t>10/06/2023</a:t>
             </a:fld>
@@ -7788,7 +7991,7 @@
       </p:grpSpPr>
       <p:sp>
         <p:nvSpPr>
-          <p:cNvPr id="134" name="PlaceHolder 1"/>
+          <p:cNvPr id="135" name="PlaceHolder 1"/>
           <p:cNvSpPr>
             <a:spLocks noGrp="1"/>
           </p:cNvSpPr>
@@ -7824,7 +8027,7 @@
                 </a:solidFill>
                 <a:latin typeface="Arial"/>
               </a:rPr>
-              <a:t>Kompatibilnost s browserima</a:t>
+              <a:t>Nedostatci predprocesora</a:t>
             </a:r>
             <a:endParaRPr b="0" lang="bs-BA" sz="3300" spc="-1" strike="noStrike">
               <a:solidFill>
@@ -7837,7 +8040,7 @@
       </p:sp>
       <p:sp>
         <p:nvSpPr>
-          <p:cNvPr id="135" name="PlaceHolder 2"/>
+          <p:cNvPr id="136" name="PlaceHolder 2"/>
           <p:cNvSpPr>
             <a:spLocks noGrp="1"/>
           </p:cNvSpPr>
@@ -7875,43 +8078,15 @@
               <a:buChar char=""/>
             </a:pPr>
             <a:r>
-              <a:rPr b="0" lang="bs-BA" sz="2000" spc="-1" strike="noStrike">
+              <a:rPr b="0" lang="bs-BA" sz="2400" spc="-1" strike="noStrike">
                 <a:solidFill>
                   <a:srgbClr val="009bdd"/>
                 </a:solidFill>
                 <a:latin typeface="Arial"/>
               </a:rPr>
-              <a:t>Ciljao sam na Firefox 52.9 ESR.</a:t>
-            </a:r>
-            <a:endParaRPr b="0" lang="bs-BA" sz="2000" spc="-1" strike="noStrike">
-              <a:solidFill>
-                <a:srgbClr val="009bdd"/>
-              </a:solidFill>
-              <a:latin typeface="Arial"/>
-            </a:endParaRPr>
-          </a:p>
-          <a:p>
-            <a:pPr lvl="1" marL="864000" indent="-324000">
-              <a:spcBef>
-                <a:spcPts val="850"/>
-              </a:spcBef>
-              <a:buClr>
-                <a:srgbClr val="77caee"/>
-              </a:buClr>
-              <a:buSzPct val="45000"/>
-              <a:buFont typeface="Wingdings" charset="2"/>
-              <a:buChar char=""/>
-            </a:pPr>
-            <a:r>
-              <a:rPr b="0" lang="bs-BA" sz="2000" spc="-1" strike="noStrike">
-                <a:solidFill>
-                  <a:srgbClr val="009bdd"/>
-                </a:solidFill>
-                <a:latin typeface="Arial"/>
-              </a:rPr>
-              <a:t>To je posljednja verzija Firefoxa koja se može vrtjeti na Windows XP-u i Windows Visti, te također verzija Firefoxa koja se dobije uz Solaris 11.4.</a:t>
-            </a:r>
-            <a:endParaRPr b="0" lang="bs-BA" sz="2000" spc="-1" strike="noStrike">
+              <a:t>Ne podržava makro-naredbe.</a:t>
+            </a:r>
+            <a:endParaRPr b="0" lang="bs-BA" sz="2400" spc="-1" strike="noStrike">
               <a:solidFill>
                 <a:srgbClr val="009bdd"/>
               </a:solidFill>
@@ -7931,43 +8106,33 @@
               <a:buChar char=""/>
             </a:pPr>
             <a:r>
-              <a:rPr b="0" lang="bs-BA" sz="2000" spc="-1" strike="noStrike">
+              <a:rPr b="0" lang="bs-BA" sz="2400" spc="-1" strike="noStrike">
                 <a:solidFill>
                   <a:srgbClr val="009bdd"/>
                 </a:solidFill>
                 <a:latin typeface="Arial"/>
               </a:rPr>
-              <a:t>Moderni Chrome</a:t>
-            </a:r>
-            <a:endParaRPr b="0" lang="bs-BA" sz="2000" spc="-1" strike="noStrike">
-              <a:solidFill>
-                <a:srgbClr val="009bdd"/>
-              </a:solidFill>
-              <a:latin typeface="Arial"/>
-            </a:endParaRPr>
-          </a:p>
-          <a:p>
-            <a:pPr lvl="1" marL="864000" indent="-324000">
-              <a:spcBef>
-                <a:spcPts val="850"/>
-              </a:spcBef>
-              <a:buClr>
-                <a:srgbClr val="77caee"/>
-              </a:buClr>
-              <a:buSzPct val="45000"/>
-              <a:buFont typeface="Wingdings" charset="2"/>
-              <a:buChar char=""/>
-            </a:pPr>
-            <a:r>
-              <a:rPr b="0" lang="bs-BA" sz="2000" spc="-1" strike="noStrike">
+              <a:t>Postoji neki neobičan bug u pretprocesoru da naredba “</a:t>
+            </a:r>
+            <a:r>
+              <a:rPr b="0" i="1" lang="bs-BA" sz="2400" spc="-1" strike="noStrike">
                 <a:solidFill>
                   <a:srgbClr val="009bdd"/>
                 </a:solidFill>
                 <a:latin typeface="Arial"/>
               </a:rPr>
-              <a:t>Za to da radi u Chromeu, morao sam izmijeniti CSS (jer tooltipsi na “Play/Pause”, “Fast Forward”, “Single Step” i “Stop” nisu bili radili).</a:t>
-            </a:r>
-            <a:endParaRPr b="0" lang="bs-BA" sz="2000" spc="-1" strike="noStrike">
+              <a:t>display a</a:t>
+            </a:r>
+            <a:r>
+              <a:rPr b="0" lang="bs-BA" sz="2400" spc="-1" strike="noStrike">
+                <a:solidFill>
+                  <a:srgbClr val="009bdd"/>
+                </a:solidFill>
+                <a:latin typeface="Arial"/>
+              </a:rPr>
+              <a:t>” ne radi kada je simulacija UART-a isključena.</a:t>
+            </a:r>
+            <a:endParaRPr b="0" lang="bs-BA" sz="2400" spc="-1" strike="noStrike">
               <a:solidFill>
                 <a:srgbClr val="009bdd"/>
               </a:solidFill>
@@ -7987,107 +8152,118 @@
               <a:buChar char=""/>
             </a:pPr>
             <a:r>
-              <a:rPr b="0" lang="bs-BA" sz="2000" spc="-1" strike="noStrike">
+              <a:rPr b="0" lang="bs-BA" sz="2400" spc="-1" strike="noStrike">
                 <a:solidFill>
                   <a:srgbClr val="009bdd"/>
                 </a:solidFill>
                 <a:latin typeface="Arial"/>
               </a:rPr>
-              <a:t>WebPositive (bliski srodnik Safariju)</a:t>
-            </a:r>
-            <a:endParaRPr b="0" lang="bs-BA" sz="2000" spc="-1" strike="noStrike">
+              <a:t>U </a:t>
+            </a:r>
+            <a:r>
+              <a:rPr b="0" i="1" lang="bs-BA" sz="2400" spc="-1" strike="noStrike">
+                <a:solidFill>
+                  <a:srgbClr val="009bdd"/>
+                </a:solidFill>
+                <a:latin typeface="Arial"/>
+              </a:rPr>
+              <a:t>if</a:t>
+            </a:r>
+            <a:r>
+              <a:rPr b="0" lang="bs-BA" sz="2400" spc="-1" strike="noStrike">
+                <a:solidFill>
+                  <a:srgbClr val="009bdd"/>
+                </a:solidFill>
+                <a:latin typeface="Arial"/>
+              </a:rPr>
+              <a:t>-grananjima, </a:t>
+            </a:r>
+            <a:r>
+              <a:rPr b="0" i="1" lang="bs-BA" sz="2400" spc="-1" strike="noStrike">
+                <a:solidFill>
+                  <a:srgbClr val="009bdd"/>
+                </a:solidFill>
+                <a:latin typeface="Arial"/>
+              </a:rPr>
+              <a:t>if-else</a:t>
+            </a:r>
+            <a:r>
+              <a:rPr b="0" lang="bs-BA" sz="2400" spc="-1" strike="noStrike">
+                <a:solidFill>
+                  <a:srgbClr val="009bdd"/>
+                </a:solidFill>
+                <a:latin typeface="Arial"/>
+              </a:rPr>
+              <a:t>-grananjima i </a:t>
+            </a:r>
+            <a:r>
+              <a:rPr b="0" i="1" lang="bs-BA" sz="2400" spc="-1" strike="noStrike">
+                <a:solidFill>
+                  <a:srgbClr val="009bdd"/>
+                </a:solidFill>
+                <a:latin typeface="Arial"/>
+              </a:rPr>
+              <a:t>while</a:t>
+            </a:r>
+            <a:r>
+              <a:rPr b="0" lang="bs-BA" sz="2400" spc="-1" strike="noStrike">
+                <a:solidFill>
+                  <a:srgbClr val="009bdd"/>
+                </a:solidFill>
+                <a:latin typeface="Arial"/>
+              </a:rPr>
+              <a:t>-petljama ne mogu se nalaziti mnemonike niti pretprocesorska naredba </a:t>
+            </a:r>
+            <a:r>
+              <a:rPr b="0" i="1" lang="bs-BA" sz="2400" spc="-1" strike="noStrike">
+                <a:solidFill>
+                  <a:srgbClr val="009bdd"/>
+                </a:solidFill>
+                <a:latin typeface="Arial"/>
+              </a:rPr>
+              <a:t>address</a:t>
+            </a:r>
+            <a:r>
+              <a:rPr b="0" lang="bs-BA" sz="2400" spc="-1" strike="noStrike">
+                <a:solidFill>
+                  <a:srgbClr val="009bdd"/>
+                </a:solidFill>
+                <a:latin typeface="Arial"/>
+              </a:rPr>
+              <a:t>. To je zato jer bi se, da se te stvari omoguće, znatno zakomplicirao pretprocesor i bilo bi lagano nenamjerno napraviti beskonačnu petlju za vrijeme pretprocesiranja:</a:t>
+            </a:r>
+            <a:endParaRPr b="0" lang="bs-BA" sz="2400" spc="-1" strike="noStrike">
               <a:solidFill>
                 <a:srgbClr val="009bdd"/>
               </a:solidFill>
               <a:latin typeface="Arial"/>
             </a:endParaRPr>
           </a:p>
-          <a:p>
-            <a:pPr lvl="1" marL="864000" indent="-324000">
-              <a:spcBef>
-                <a:spcPts val="850"/>
-              </a:spcBef>
-              <a:buClr>
-                <a:srgbClr val="77caee"/>
-              </a:buClr>
-              <a:buSzPct val="45000"/>
-              <a:buFont typeface="Wingdings" charset="2"/>
-              <a:buChar char=""/>
-            </a:pPr>
-            <a:r>
-              <a:rPr b="0" lang="bs-BA" sz="2000" spc="-1" strike="noStrike">
-                <a:solidFill>
-                  <a:srgbClr val="009bdd"/>
-                </a:solidFill>
-                <a:latin typeface="Arial"/>
-              </a:rPr>
-              <a:t>Za to da radi u WebPositiveu, morao sam izmijeniti i CSS i JavaScript.</a:t>
-            </a:r>
-            <a:endParaRPr b="0" lang="bs-BA" sz="2000" spc="-1" strike="noStrike">
-              <a:solidFill>
-                <a:srgbClr val="009bdd"/>
-              </a:solidFill>
-              <a:latin typeface="Arial"/>
-            </a:endParaRPr>
-          </a:p>
-          <a:p>
-            <a:pPr lvl="1" marL="864000" indent="-324000">
-              <a:spcBef>
-                <a:spcPts val="850"/>
-              </a:spcBef>
-              <a:buClr>
-                <a:srgbClr val="77caee"/>
-              </a:buClr>
-              <a:buSzPct val="45000"/>
-              <a:buFont typeface="Wingdings" charset="2"/>
-              <a:buChar char=""/>
-            </a:pPr>
-            <a:r>
-              <a:rPr b="0" lang="bs-BA" sz="2000" spc="-1" strike="noStrike">
-                <a:solidFill>
-                  <a:srgbClr val="009bdd"/>
-                </a:solidFill>
-                <a:latin typeface="Arial"/>
-              </a:rPr>
-              <a:t>Nisam uspio napraviti da “Download Hexadecimal” radi u WebPositiveu.</a:t>
-            </a:r>
-            <a:endParaRPr b="0" lang="bs-BA" sz="2000" spc="-1" strike="noStrike">
-              <a:solidFill>
-                <a:srgbClr val="009bdd"/>
-              </a:solidFill>
-              <a:latin typeface="Arial"/>
-            </a:endParaRPr>
-          </a:p>
-          <a:p>
-            <a:pPr marL="432000" indent="-324000">
-              <a:spcBef>
-                <a:spcPts val="1060"/>
-              </a:spcBef>
-              <a:buClr>
-                <a:srgbClr val="77caee"/>
-              </a:buClr>
-              <a:buSzPct val="45000"/>
-              <a:buFont typeface="Wingdings" charset="2"/>
-              <a:buChar char=""/>
-            </a:pPr>
-            <a:r>
-              <a:rPr b="0" lang="bs-BA" sz="2000" spc="-1" strike="noStrike">
-                <a:solidFill>
-                  <a:srgbClr val="009bdd"/>
-                </a:solidFill>
-                <a:latin typeface="Arial"/>
-              </a:rPr>
-              <a:t>Darko Nikolić tvrdi da je isprobao moj program na Macu u Safariju i u Operi i da funkcionira tamo.</a:t>
-            </a:r>
-            <a:endParaRPr b="0" lang="bs-BA" sz="2000" spc="-1" strike="noStrike">
-              <a:solidFill>
-                <a:srgbClr val="009bdd"/>
-              </a:solidFill>
-              <a:latin typeface="Arial"/>
-            </a:endParaRPr>
-          </a:p>
-        </p:txBody>
-      </p:sp>
+        </p:txBody>
+      </p:sp>
+      <p:pic>
+        <p:nvPicPr>
+          <p:cNvPr id="137" name="" descr=""/>
+          <p:cNvPicPr/>
+          <p:nvPr/>
+        </p:nvPicPr>
+        <p:blipFill>
+          <a:blip r:embed="rId1"/>
+          <a:stretch/>
+        </p:blipFill>
+        <p:spPr>
+          <a:xfrm>
+            <a:off x="685800" y="4100040"/>
+            <a:ext cx="2293200" cy="929160"/>
+          </a:xfrm>
+          <a:prstGeom prst="rect">
+            <a:avLst/>
+          </a:prstGeom>
+          <a:ln w="18000">
+            <a:noFill/>
+          </a:ln>
+        </p:spPr>
+      </p:pic>
       <p:sp>
         <p:nvSpPr>
           <p:cNvPr id="4" name="PlaceHolder 3"/>
@@ -8102,7 +8278,7 @@
         <p:txBody>
           <a:bodyPr/>
           <a:p>
-            <a:fld id="{2176CF55-55B1-4690-A52D-DBE0B2DB466C}" type="slidenum">
+            <a:fld id="{07B158F4-8403-4325-B022-4F1F392405FD}" type="slidenum">
               <a:t>16</a:t>
             </a:fld>
           </a:p>
@@ -8122,7 +8298,7 @@
         <p:txBody>
           <a:bodyPr/>
           <a:p>
-            <a:fld id="{61972692-8E30-4145-9628-394C4E986899}" type="datetime1">
+            <a:fld id="{7CB738CB-94E6-4358-9E38-1D1CB52CC7D7}" type="datetime1">
               <a:rPr lang="en-US"/>
               <a:t>10/06/2023</a:t>
             </a:fld>
@@ -8161,7 +8337,621 @@
       </p:grpSpPr>
       <p:sp>
         <p:nvSpPr>
-          <p:cNvPr id="136" name="PlaceHolder 1"/>
+          <p:cNvPr id="138" name="PlaceHolder 1"/>
+          <p:cNvSpPr>
+            <a:spLocks noGrp="1"/>
+          </p:cNvSpPr>
+          <p:nvPr>
+            <p:ph type="title"/>
+          </p:nvPr>
+        </p:nvSpPr>
+        <p:spPr>
+          <a:xfrm>
+            <a:off x="360000" y="180000"/>
+            <a:ext cx="9360000" cy="478080"/>
+          </a:xfrm>
+          <a:prstGeom prst="rect">
+            <a:avLst/>
+          </a:prstGeom>
+          <a:noFill/>
+          <a:ln w="0">
+            <a:noFill/>
+          </a:ln>
+        </p:spPr>
+        <p:txBody>
+          <a:bodyPr lIns="0" rIns="0" tIns="0" bIns="0" anchor="ctr">
+            <a:noAutofit/>
+          </a:bodyPr>
+          <a:p>
+            <a:pPr indent="0" algn="ctr">
+              <a:buNone/>
+            </a:pPr>
+            <a:r>
+              <a:rPr b="0" lang="bs-BA" sz="3300" spc="-1" strike="noStrike">
+                <a:solidFill>
+                  <a:srgbClr val="ffffff"/>
+                </a:solidFill>
+                <a:latin typeface="Arial"/>
+              </a:rPr>
+              <a:t>Out in the wild...</a:t>
+            </a:r>
+            <a:endParaRPr b="0" lang="bs-BA" sz="3300" spc="-1" strike="noStrike">
+              <a:solidFill>
+                <a:srgbClr val="ffffff"/>
+              </a:solidFill>
+              <a:latin typeface="Arial"/>
+            </a:endParaRPr>
+          </a:p>
+        </p:txBody>
+      </p:sp>
+      <p:sp>
+        <p:nvSpPr>
+          <p:cNvPr id="139" name="PlaceHolder 2"/>
+          <p:cNvSpPr>
+            <a:spLocks noGrp="1"/>
+          </p:cNvSpPr>
+          <p:nvPr>
+            <p:ph/>
+          </p:nvPr>
+        </p:nvSpPr>
+        <p:spPr>
+          <a:xfrm>
+            <a:off x="360000" y="1080000"/>
+            <a:ext cx="9360000" cy="3600000"/>
+          </a:xfrm>
+          <a:prstGeom prst="rect">
+            <a:avLst/>
+          </a:prstGeom>
+          <a:noFill/>
+          <a:ln w="0">
+            <a:noFill/>
+          </a:ln>
+        </p:spPr>
+        <p:txBody>
+          <a:bodyPr lIns="0" rIns="0" tIns="0" bIns="0" anchor="t">
+            <a:noAutofit/>
+          </a:bodyPr>
+          <a:p>
+            <a:pPr marL="432000" indent="-324000">
+              <a:spcBef>
+                <a:spcPts val="1060"/>
+              </a:spcBef>
+              <a:buClr>
+                <a:srgbClr val="77caee"/>
+              </a:buClr>
+              <a:buSzPct val="45000"/>
+              <a:buFont typeface="Wingdings" charset="2"/>
+              <a:buChar char=""/>
+            </a:pPr>
+            <a:r>
+              <a:rPr b="0" lang="bs-BA" sz="2400" spc="-1" strike="noStrike">
+                <a:solidFill>
+                  <a:srgbClr val="009bdd"/>
+                </a:solidFill>
+                <a:latin typeface="Arial"/>
+              </a:rPr>
+              <a:t>Moj se program koristi na fakultetu u Argentini za uvod u ugrađene sustave.</a:t>
+            </a:r>
+            <a:endParaRPr b="0" lang="bs-BA" sz="2400" spc="-1" strike="noStrike">
+              <a:solidFill>
+                <a:srgbClr val="009bdd"/>
+              </a:solidFill>
+              <a:latin typeface="Arial"/>
+            </a:endParaRPr>
+          </a:p>
+          <a:p>
+            <a:pPr marL="432000" indent="-324000">
+              <a:spcBef>
+                <a:spcPts val="1060"/>
+              </a:spcBef>
+              <a:buClr>
+                <a:srgbClr val="77caee"/>
+              </a:buClr>
+              <a:buSzPct val="45000"/>
+              <a:buFont typeface="Wingdings" charset="2"/>
+              <a:buChar char=""/>
+            </a:pPr>
+            <a:r>
+              <a:rPr b="0" lang="bs-BA" sz="2400" spc="-1" strike="noStrike">
+                <a:solidFill>
+                  <a:srgbClr val="009bdd"/>
+                </a:solidFill>
+                <a:latin typeface="Arial"/>
+              </a:rPr>
+              <a:t>Nedavno sam dobio kontributora s tog fakulteta koji se zove Agustin Izaguirre (</a:t>
+            </a:r>
+            <a:r>
+              <a:rPr b="0" i="1" lang="bs-BA" sz="2400" spc="-1" strike="noStrike">
+                <a:solidFill>
+                  <a:srgbClr val="009bdd"/>
+                </a:solidFill>
+                <a:latin typeface="Arial"/>
+              </a:rPr>
+              <a:t>agustiza</a:t>
+            </a:r>
+            <a:r>
+              <a:rPr b="0" lang="bs-BA" sz="2400" spc="-1" strike="noStrike">
+                <a:solidFill>
+                  <a:srgbClr val="009bdd"/>
+                </a:solidFill>
+                <a:latin typeface="Arial"/>
+              </a:rPr>
+              <a:t>). On je napravio nekoliko pull requestova na GitHubu, isprva sitni bug-fixi (prvo da se naredba SRA ponaša ispravno kad je </a:t>
+            </a:r>
+            <a:r>
+              <a:rPr b="0" i="1" lang="bs-BA" sz="2400" spc="-1" strike="noStrike">
+                <a:solidFill>
+                  <a:srgbClr val="009bdd"/>
+                </a:solidFill>
+                <a:latin typeface="Arial"/>
+              </a:rPr>
+              <a:t>carry flag</a:t>
+            </a:r>
+            <a:r>
+              <a:rPr b="0" lang="bs-BA" sz="2400" spc="-1" strike="noStrike">
+                <a:solidFill>
+                  <a:srgbClr val="009bdd"/>
+                </a:solidFill>
+                <a:latin typeface="Arial"/>
+              </a:rPr>
+              <a:t> postavljen u jedinicu), a onda i dodavanje novih featuresa kao što su JEST testovi.</a:t>
+            </a:r>
+            <a:endParaRPr b="0" lang="bs-BA" sz="2400" spc="-1" strike="noStrike">
+              <a:solidFill>
+                <a:srgbClr val="009bdd"/>
+              </a:solidFill>
+              <a:latin typeface="Arial"/>
+            </a:endParaRPr>
+          </a:p>
+        </p:txBody>
+      </p:sp>
+      <p:sp>
+        <p:nvSpPr>
+          <p:cNvPr id="4" name="PlaceHolder 3"/>
+          <p:cNvSpPr>
+            <a:spLocks noGrp="1"/>
+          </p:cNvSpPr>
+          <p:nvPr>
+            <p:ph type="sldNum" idx="6"/>
+          </p:nvPr>
+        </p:nvSpPr>
+        <p:spPr/>
+        <p:txBody>
+          <a:bodyPr/>
+          <a:p>
+            <a:fld id="{9211D8BD-B757-4E78-89B4-A4A12B334646}" type="slidenum">
+              <a:t>17</a:t>
+            </a:fld>
+          </a:p>
+        </p:txBody>
+      </p:sp>
+      <p:sp>
+        <p:nvSpPr>
+          <p:cNvPr id="5" name="PlaceHolder 4"/>
+          <p:cNvSpPr>
+            <a:spLocks noGrp="1"/>
+          </p:cNvSpPr>
+          <p:nvPr>
+            <p:ph type="dt" idx="4"/>
+          </p:nvPr>
+        </p:nvSpPr>
+        <p:spPr/>
+        <p:txBody>
+          <a:bodyPr/>
+          <a:p>
+            <a:fld id="{DDEE335B-406C-4162-8A3B-A605CEF940D9}" type="datetime1">
+              <a:rPr lang="en-US"/>
+              <a:t>10/06/2023</a:t>
+            </a:fld>
+          </a:p>
+        </p:txBody>
+      </p:sp>
+    </p:spTree>
+  </p:cSld>
+  <mc:AlternateContent>
+    <mc:Choice Requires="p14">
+      <p:transition spd="slow" p14:dur="2000"/>
+    </mc:Choice>
+    <mc:Fallback>
+      <p:transition spd="slow"/>
+    </mc:Fallback>
+  </mc:AlternateContent>
+</p:sld>
+</file>
+
+<file path=ppt/slides/slide18.xml><?xml version="1.0" encoding="utf-8"?>
+<p:sld xmlns:a="http://schemas.openxmlformats.org/drawingml/2006/main" xmlns:p="http://schemas.openxmlformats.org/presentationml/2006/main" xmlns:r="http://schemas.openxmlformats.org/officeDocument/2006/relationships" xmlns:p14="http://schemas.microsoft.com/office/powerpoint/2010/main" xmlns:p15="http://schemas.microsoft.com/office/powerpoint/2012/main" xmlns:mc="http://schemas.openxmlformats.org/markup-compatibility/2006">
+  <p:cSld>
+    <p:spTree>
+      <p:nvGrpSpPr>
+        <p:cNvPr id="1" name=""/>
+        <p:cNvGrpSpPr/>
+        <p:nvPr/>
+      </p:nvGrpSpPr>
+      <p:grpSpPr>
+        <a:xfrm>
+          <a:off x="0" y="0"/>
+          <a:ext cx="0" cy="0"/>
+          <a:chOff x="0" y="0"/>
+          <a:chExt cx="0" cy="0"/>
+        </a:xfrm>
+      </p:grpSpPr>
+      <p:sp>
+        <p:nvSpPr>
+          <p:cNvPr id="140" name="PlaceHolder 1"/>
+          <p:cNvSpPr>
+            <a:spLocks noGrp="1"/>
+          </p:cNvSpPr>
+          <p:nvPr>
+            <p:ph type="title"/>
+          </p:nvPr>
+        </p:nvSpPr>
+        <p:spPr>
+          <a:xfrm>
+            <a:off x="360000" y="180000"/>
+            <a:ext cx="9360000" cy="478080"/>
+          </a:xfrm>
+          <a:prstGeom prst="rect">
+            <a:avLst/>
+          </a:prstGeom>
+          <a:noFill/>
+          <a:ln w="0">
+            <a:noFill/>
+          </a:ln>
+        </p:spPr>
+        <p:txBody>
+          <a:bodyPr lIns="0" rIns="0" tIns="0" bIns="0" anchor="ctr">
+            <a:noAutofit/>
+          </a:bodyPr>
+          <a:p>
+            <a:pPr indent="0" algn="ctr">
+              <a:buNone/>
+            </a:pPr>
+            <a:r>
+              <a:rPr b="0" lang="bs-BA" sz="3300" spc="-1" strike="noStrike">
+                <a:solidFill>
+                  <a:srgbClr val="ffffff"/>
+                </a:solidFill>
+                <a:latin typeface="Arial"/>
+              </a:rPr>
+              <a:t>Kompatibilnost s browserima</a:t>
+            </a:r>
+            <a:endParaRPr b="0" lang="bs-BA" sz="3300" spc="-1" strike="noStrike">
+              <a:solidFill>
+                <a:srgbClr val="ffffff"/>
+              </a:solidFill>
+              <a:latin typeface="Arial"/>
+            </a:endParaRPr>
+          </a:p>
+        </p:txBody>
+      </p:sp>
+      <p:sp>
+        <p:nvSpPr>
+          <p:cNvPr id="141" name="PlaceHolder 2"/>
+          <p:cNvSpPr>
+            <a:spLocks noGrp="1"/>
+          </p:cNvSpPr>
+          <p:nvPr>
+            <p:ph/>
+          </p:nvPr>
+        </p:nvSpPr>
+        <p:spPr>
+          <a:xfrm>
+            <a:off x="360000" y="1080000"/>
+            <a:ext cx="9360000" cy="3600000"/>
+          </a:xfrm>
+          <a:prstGeom prst="rect">
+            <a:avLst/>
+          </a:prstGeom>
+          <a:noFill/>
+          <a:ln w="0">
+            <a:noFill/>
+          </a:ln>
+        </p:spPr>
+        <p:txBody>
+          <a:bodyPr lIns="0" rIns="0" tIns="0" bIns="0" anchor="t">
+            <a:noAutofit/>
+          </a:bodyPr>
+          <a:p>
+            <a:pPr marL="432000" indent="-324000">
+              <a:spcBef>
+                <a:spcPts val="1060"/>
+              </a:spcBef>
+              <a:buClr>
+                <a:srgbClr val="77caee"/>
+              </a:buClr>
+              <a:buSzPct val="45000"/>
+              <a:buFont typeface="Wingdings" charset="2"/>
+              <a:buChar char=""/>
+            </a:pPr>
+            <a:r>
+              <a:rPr b="0" lang="bs-BA" sz="2000" spc="-1" strike="noStrike">
+                <a:solidFill>
+                  <a:srgbClr val="009bdd"/>
+                </a:solidFill>
+                <a:latin typeface="Arial"/>
+              </a:rPr>
+              <a:t>Ciljao sam na Firefox 52.9 ESR.</a:t>
+            </a:r>
+            <a:endParaRPr b="0" lang="bs-BA" sz="2000" spc="-1" strike="noStrike">
+              <a:solidFill>
+                <a:srgbClr val="009bdd"/>
+              </a:solidFill>
+              <a:latin typeface="Arial"/>
+            </a:endParaRPr>
+          </a:p>
+          <a:p>
+            <a:pPr lvl="1" marL="864000" indent="-324000">
+              <a:spcBef>
+                <a:spcPts val="850"/>
+              </a:spcBef>
+              <a:buClr>
+                <a:srgbClr val="77caee"/>
+              </a:buClr>
+              <a:buSzPct val="45000"/>
+              <a:buFont typeface="Wingdings" charset="2"/>
+              <a:buChar char=""/>
+            </a:pPr>
+            <a:r>
+              <a:rPr b="0" lang="bs-BA" sz="2000" spc="-1" strike="noStrike">
+                <a:solidFill>
+                  <a:srgbClr val="009bdd"/>
+                </a:solidFill>
+                <a:latin typeface="Arial"/>
+              </a:rPr>
+              <a:t>To je posljednja verzija Firefoxa koja se može vrtjeti na Windows XP-u i Windows Visti, te također verzija Firefoxa koja se dobije uz Solaris 11.4.</a:t>
+            </a:r>
+            <a:endParaRPr b="0" lang="bs-BA" sz="2000" spc="-1" strike="noStrike">
+              <a:solidFill>
+                <a:srgbClr val="009bdd"/>
+              </a:solidFill>
+              <a:latin typeface="Arial"/>
+            </a:endParaRPr>
+          </a:p>
+          <a:p>
+            <a:pPr marL="432000" indent="-324000">
+              <a:spcBef>
+                <a:spcPts val="1060"/>
+              </a:spcBef>
+              <a:buClr>
+                <a:srgbClr val="77caee"/>
+              </a:buClr>
+              <a:buSzPct val="45000"/>
+              <a:buFont typeface="Wingdings" charset="2"/>
+              <a:buChar char=""/>
+            </a:pPr>
+            <a:r>
+              <a:rPr b="0" lang="bs-BA" sz="2000" spc="-1" strike="noStrike">
+                <a:solidFill>
+                  <a:srgbClr val="009bdd"/>
+                </a:solidFill>
+                <a:latin typeface="Arial"/>
+              </a:rPr>
+              <a:t>Moderni Chrome</a:t>
+            </a:r>
+            <a:endParaRPr b="0" lang="bs-BA" sz="2000" spc="-1" strike="noStrike">
+              <a:solidFill>
+                <a:srgbClr val="009bdd"/>
+              </a:solidFill>
+              <a:latin typeface="Arial"/>
+            </a:endParaRPr>
+          </a:p>
+          <a:p>
+            <a:pPr lvl="1" marL="864000" indent="-324000">
+              <a:spcBef>
+                <a:spcPts val="850"/>
+              </a:spcBef>
+              <a:buClr>
+                <a:srgbClr val="77caee"/>
+              </a:buClr>
+              <a:buSzPct val="45000"/>
+              <a:buFont typeface="Wingdings" charset="2"/>
+              <a:buChar char=""/>
+            </a:pPr>
+            <a:r>
+              <a:rPr b="0" lang="bs-BA" sz="2000" spc="-1" strike="noStrike">
+                <a:solidFill>
+                  <a:srgbClr val="009bdd"/>
+                </a:solidFill>
+                <a:latin typeface="Arial"/>
+              </a:rPr>
+              <a:t>Za to da radi u Chromeu, morao sam izmijeniti CSS (jer tooltipsi na “Play/Pause”, “Fast Forward”, “Single Step” i “Stop” nisu bili radili).</a:t>
+            </a:r>
+            <a:endParaRPr b="0" lang="bs-BA" sz="2000" spc="-1" strike="noStrike">
+              <a:solidFill>
+                <a:srgbClr val="009bdd"/>
+              </a:solidFill>
+              <a:latin typeface="Arial"/>
+            </a:endParaRPr>
+          </a:p>
+          <a:p>
+            <a:pPr marL="432000" indent="-324000">
+              <a:spcBef>
+                <a:spcPts val="1060"/>
+              </a:spcBef>
+              <a:buClr>
+                <a:srgbClr val="77caee"/>
+              </a:buClr>
+              <a:buSzPct val="45000"/>
+              <a:buFont typeface="Wingdings" charset="2"/>
+              <a:buChar char=""/>
+            </a:pPr>
+            <a:r>
+              <a:rPr b="0" lang="bs-BA" sz="2000" spc="-1" strike="noStrike">
+                <a:solidFill>
+                  <a:srgbClr val="009bdd"/>
+                </a:solidFill>
+                <a:latin typeface="Arial"/>
+              </a:rPr>
+              <a:t>WebPositive (bliski srodnik Safariju)</a:t>
+            </a:r>
+            <a:endParaRPr b="0" lang="bs-BA" sz="2000" spc="-1" strike="noStrike">
+              <a:solidFill>
+                <a:srgbClr val="009bdd"/>
+              </a:solidFill>
+              <a:latin typeface="Arial"/>
+            </a:endParaRPr>
+          </a:p>
+          <a:p>
+            <a:pPr lvl="1" marL="864000" indent="-324000">
+              <a:spcBef>
+                <a:spcPts val="850"/>
+              </a:spcBef>
+              <a:buClr>
+                <a:srgbClr val="77caee"/>
+              </a:buClr>
+              <a:buSzPct val="45000"/>
+              <a:buFont typeface="Wingdings" charset="2"/>
+              <a:buChar char=""/>
+            </a:pPr>
+            <a:r>
+              <a:rPr b="0" lang="bs-BA" sz="2000" spc="-1" strike="noStrike">
+                <a:solidFill>
+                  <a:srgbClr val="009bdd"/>
+                </a:solidFill>
+                <a:latin typeface="Arial"/>
+              </a:rPr>
+              <a:t>Za to da radi u WebPositiveu, morao sam izmijeniti i CSS i JavaScript.</a:t>
+            </a:r>
+            <a:endParaRPr b="0" lang="bs-BA" sz="2000" spc="-1" strike="noStrike">
+              <a:solidFill>
+                <a:srgbClr val="009bdd"/>
+              </a:solidFill>
+              <a:latin typeface="Arial"/>
+            </a:endParaRPr>
+          </a:p>
+          <a:p>
+            <a:pPr lvl="1" marL="864000" indent="-324000">
+              <a:spcBef>
+                <a:spcPts val="850"/>
+              </a:spcBef>
+              <a:buClr>
+                <a:srgbClr val="77caee"/>
+              </a:buClr>
+              <a:buSzPct val="45000"/>
+              <a:buFont typeface="Wingdings" charset="2"/>
+              <a:buChar char=""/>
+            </a:pPr>
+            <a:r>
+              <a:rPr b="0" lang="bs-BA" sz="2000" spc="-1" strike="noStrike">
+                <a:solidFill>
+                  <a:srgbClr val="009bdd"/>
+                </a:solidFill>
+                <a:latin typeface="Arial"/>
+              </a:rPr>
+              <a:t>Nisam uspio napraviti da “Download Hexadecimal” radi u WebPositiveu.</a:t>
+            </a:r>
+            <a:endParaRPr b="0" lang="bs-BA" sz="2000" spc="-1" strike="noStrike">
+              <a:solidFill>
+                <a:srgbClr val="009bdd"/>
+              </a:solidFill>
+              <a:latin typeface="Arial"/>
+            </a:endParaRPr>
+          </a:p>
+          <a:p>
+            <a:pPr marL="432000" indent="-324000">
+              <a:spcBef>
+                <a:spcPts val="1060"/>
+              </a:spcBef>
+              <a:buClr>
+                <a:srgbClr val="77caee"/>
+              </a:buClr>
+              <a:buSzPct val="45000"/>
+              <a:buFont typeface="Wingdings" charset="2"/>
+              <a:buChar char=""/>
+            </a:pPr>
+            <a:r>
+              <a:rPr b="0" lang="bs-BA" sz="2000" spc="-1" strike="noStrike">
+                <a:solidFill>
+                  <a:srgbClr val="009bdd"/>
+                </a:solidFill>
+                <a:latin typeface="Arial"/>
+              </a:rPr>
+              <a:t>Darko Nikolić tvrdi da je isprobao moj program na Macu u Safariju i u Operi i da funkcionira tamo.</a:t>
+            </a:r>
+            <a:endParaRPr b="0" lang="bs-BA" sz="2000" spc="-1" strike="noStrike">
+              <a:solidFill>
+                <a:srgbClr val="009bdd"/>
+              </a:solidFill>
+              <a:latin typeface="Arial"/>
+            </a:endParaRPr>
+          </a:p>
+        </p:txBody>
+      </p:sp>
+      <p:sp>
+        <p:nvSpPr>
+          <p:cNvPr id="4" name="PlaceHolder 3"/>
+          <p:cNvSpPr>
+            <a:spLocks noGrp="1"/>
+          </p:cNvSpPr>
+          <p:nvPr>
+            <p:ph type="sldNum" idx="6"/>
+          </p:nvPr>
+        </p:nvSpPr>
+        <p:spPr/>
+        <p:txBody>
+          <a:bodyPr/>
+          <a:p>
+            <a:fld id="{D6FDC79E-62A4-4C13-B8DA-072CE062A84C}" type="slidenum">
+              <a:t>18</a:t>
+            </a:fld>
+          </a:p>
+        </p:txBody>
+      </p:sp>
+      <p:sp>
+        <p:nvSpPr>
+          <p:cNvPr id="5" name="PlaceHolder 4"/>
+          <p:cNvSpPr>
+            <a:spLocks noGrp="1"/>
+          </p:cNvSpPr>
+          <p:nvPr>
+            <p:ph type="dt" idx="4"/>
+          </p:nvPr>
+        </p:nvSpPr>
+        <p:spPr/>
+        <p:txBody>
+          <a:bodyPr/>
+          <a:p>
+            <a:fld id="{8A5DC368-3DA7-4958-8F94-BEC4031781D0}" type="datetime1">
+              <a:rPr lang="en-US"/>
+              <a:t>10/06/2023</a:t>
+            </a:fld>
+          </a:p>
+        </p:txBody>
+      </p:sp>
+    </p:spTree>
+  </p:cSld>
+  <mc:AlternateContent>
+    <mc:Choice Requires="p14">
+      <p:transition spd="slow" p14:dur="2000"/>
+    </mc:Choice>
+    <mc:Fallback>
+      <p:transition spd="slow"/>
+    </mc:Fallback>
+  </mc:AlternateContent>
+</p:sld>
+</file>
+
+<file path=ppt/slides/slide19.xml><?xml version="1.0" encoding="utf-8"?>
+<p:sld xmlns:a="http://schemas.openxmlformats.org/drawingml/2006/main" xmlns:p="http://schemas.openxmlformats.org/presentationml/2006/main" xmlns:r="http://schemas.openxmlformats.org/officeDocument/2006/relationships" xmlns:p14="http://schemas.microsoft.com/office/powerpoint/2010/main" xmlns:p15="http://schemas.microsoft.com/office/powerpoint/2012/main" xmlns:mc="http://schemas.openxmlformats.org/markup-compatibility/2006">
+  <p:cSld>
+    <p:spTree>
+      <p:nvGrpSpPr>
+        <p:cNvPr id="1" name=""/>
+        <p:cNvGrpSpPr/>
+        <p:nvPr/>
+      </p:nvGrpSpPr>
+      <p:grpSpPr>
+        <a:xfrm>
+          <a:off x="0" y="0"/>
+          <a:ext cx="0" cy="0"/>
+          <a:chOff x="0" y="0"/>
+          <a:chExt cx="0" cy="0"/>
+        </a:xfrm>
+      </p:grpSpPr>
+      <p:sp>
+        <p:nvSpPr>
+          <p:cNvPr id="142" name="PlaceHolder 1"/>
           <p:cNvSpPr>
             <a:spLocks noGrp="1"/>
           </p:cNvSpPr>
@@ -8226,8 +9016,8 @@
         <p:txBody>
           <a:bodyPr/>
           <a:p>
-            <a:fld id="{39DB3E34-4FF5-461F-885F-A6A3E955F39F}" type="slidenum">
-              <a:t>17</a:t>
+            <a:fld id="{691291D8-A86D-40A2-871A-8062E5F2CC5B}" type="slidenum">
+              <a:t>19</a:t>
             </a:fld>
           </a:p>
         </p:txBody>
@@ -8246,7 +9036,7 @@
         <p:txBody>
           <a:bodyPr/>
           <a:p>
-            <a:fld id="{DD1C2258-FDE7-4BB6-B9D2-FB898268F486}" type="datetime1">
+            <a:fld id="{5232BD6C-96AA-46DC-8342-F02AF8A81671}" type="datetime1">
               <a:rPr lang="en-US"/>
               <a:t>10/06/2023</a:t>
             </a:fld>
@@ -8571,7 +9361,7 @@
         <p:txBody>
           <a:bodyPr/>
           <a:p>
-            <a:fld id="{A93E9F43-6C74-454B-97D5-F88609B9B141}" type="slidenum">
+            <a:fld id="{786E4D34-6FDE-4810-8044-7EC87AFB8FEF}" type="slidenum">
               <a:t>2</a:t>
             </a:fld>
           </a:p>
@@ -8591,7 +9381,7 @@
         <p:txBody>
           <a:bodyPr/>
           <a:p>
-            <a:fld id="{F96ED6D6-380A-416E-9F86-A4FDB771EABD}" type="datetime1">
+            <a:fld id="{E4FA418C-FDD2-4916-B5C7-7BD411854EF1}" type="datetime1">
               <a:rPr lang="en-US"/>
               <a:t>10/06/2023</a:t>
             </a:fld>
@@ -8848,7 +9638,7 @@
         <p:txBody>
           <a:bodyPr/>
           <a:p>
-            <a:fld id="{3661534C-2B25-4788-967A-B13527B4DAA6}" type="slidenum">
+            <a:fld id="{96433461-12D9-4667-90C3-DFAB52FCE8C2}" type="slidenum">
               <a:t>3</a:t>
             </a:fld>
           </a:p>
@@ -8868,7 +9658,7 @@
         <p:txBody>
           <a:bodyPr/>
           <a:p>
-            <a:fld id="{DE51A927-14BC-4D7B-ACF5-7D9642187EBA}" type="datetime1">
+            <a:fld id="{F882ABBF-6094-40C5-95E0-466CF922A3CF}" type="datetime1">
               <a:rPr lang="en-US"/>
               <a:t>10/06/2023</a:t>
             </a:fld>
@@ -9099,7 +9889,7 @@
         <p:txBody>
           <a:bodyPr/>
           <a:p>
-            <a:fld id="{9D9A5460-AD25-4297-B71C-A123F857307C}" type="slidenum">
+            <a:fld id="{3C389FEB-25AF-4603-BA3F-613791DE51E0}" type="slidenum">
               <a:t>4</a:t>
             </a:fld>
           </a:p>
@@ -9119,7 +9909,7 @@
         <p:txBody>
           <a:bodyPr/>
           <a:p>
-            <a:fld id="{7E618E50-E1D4-4158-9381-E8FB575F1D44}" type="datetime1">
+            <a:fld id="{6C766097-69F5-488A-98A1-2EE67DC30A2B}" type="datetime1">
               <a:rPr lang="en-US"/>
               <a:t>10/06/2023</a:t>
             </a:fld>
@@ -9364,7 +10154,7 @@
         <p:txBody>
           <a:bodyPr/>
           <a:p>
-            <a:fld id="{1F50C996-1042-4306-9A74-5DB9B942994D}" type="slidenum">
+            <a:fld id="{CBEBA096-AF3A-4307-A3C4-AF56751128BE}" type="slidenum">
               <a:t>5</a:t>
             </a:fld>
           </a:p>
@@ -9384,7 +10174,7 @@
         <p:txBody>
           <a:bodyPr/>
           <a:p>
-            <a:fld id="{96591726-34EF-4A31-8A65-E4326C73E742}" type="datetime1">
+            <a:fld id="{2B98097C-0E98-4755-AB78-A1B70A8428F8}" type="datetime1">
               <a:rPr lang="en-US"/>
               <a:t>10/06/2023</a:t>
             </a:fld>
@@ -9459,7 +10249,7 @@
                 </a:solidFill>
                 <a:latin typeface="Arial"/>
               </a:rPr>
-              <a:t>Kako se koristi...</a:t>
+              <a:t>Bugovi u syntax highlighteru</a:t>
             </a:r>
             <a:endParaRPr b="0" lang="bs-BA" sz="3300" spc="-1" strike="noStrike">
               <a:solidFill>
@@ -9482,8 +10272,8 @@
         </p:nvSpPr>
         <p:spPr>
           <a:xfrm>
-            <a:off x="5155920" y="1080000"/>
-            <a:ext cx="4567320" cy="3600000"/>
+            <a:off x="360000" y="1080000"/>
+            <a:ext cx="9360000" cy="3600000"/>
           </a:xfrm>
           <a:prstGeom prst="rect">
             <a:avLst/>
@@ -9516,9 +10306,173 @@
                 </a:solidFill>
                 <a:latin typeface="Arial"/>
               </a:rPr>
-              <a:t>Kada želimo da se kod asemblira, kliknemo na gumb “Assemble”.</a:t>
+              <a:t>Sintaksni bojač koda nije bez bugova:</a:t>
             </a:r>
             <a:endParaRPr b="0" lang="bs-BA" sz="2400" spc="-1" strike="noStrike">
+              <a:solidFill>
+                <a:srgbClr val="009bdd"/>
+              </a:solidFill>
+              <a:latin typeface="Arial"/>
+            </a:endParaRPr>
+          </a:p>
+          <a:p>
+            <a:pPr lvl="1" marL="864000" indent="-324000">
+              <a:spcBef>
+                <a:spcPts val="850"/>
+              </a:spcBef>
+              <a:buClr>
+                <a:srgbClr val="77caee"/>
+              </a:buClr>
+              <a:buSzPct val="45000"/>
+              <a:buFont typeface="Wingdings" charset="2"/>
+              <a:buChar char=""/>
+            </a:pPr>
+            <a:r>
+              <a:rPr b="0" lang="bs-BA" sz="2100" spc="-1" strike="noStrike">
+                <a:solidFill>
+                  <a:srgbClr val="009bdd"/>
+                </a:solidFill>
+                <a:latin typeface="Arial"/>
+              </a:rPr>
+              <a:t>Ne može highlightirati kodove koji sadrže znakove </a:t>
+            </a:r>
+            <a:r>
+              <a:rPr b="0" i="1" lang="bs-BA" sz="2100" spc="-1" strike="noStrike">
+                <a:solidFill>
+                  <a:srgbClr val="009bdd"/>
+                </a:solidFill>
+                <a:latin typeface="Arial"/>
+              </a:rPr>
+              <a:t>&amp;</a:t>
+            </a:r>
+            <a:r>
+              <a:rPr b="0" lang="bs-BA" sz="2100" spc="-1" strike="noStrike">
+                <a:solidFill>
+                  <a:srgbClr val="009bdd"/>
+                </a:solidFill>
+                <a:latin typeface="Arial"/>
+              </a:rPr>
+              <a:t>, </a:t>
+            </a:r>
+            <a:r>
+              <a:rPr b="0" i="1" lang="bs-BA" sz="2100" spc="-1" strike="noStrike">
+                <a:solidFill>
+                  <a:srgbClr val="009bdd"/>
+                </a:solidFill>
+                <a:latin typeface="Arial"/>
+              </a:rPr>
+              <a:t>&lt;</a:t>
+            </a:r>
+            <a:r>
+              <a:rPr b="0" lang="bs-BA" sz="2100" spc="-1" strike="noStrike">
+                <a:solidFill>
+                  <a:srgbClr val="009bdd"/>
+                </a:solidFill>
+                <a:latin typeface="Arial"/>
+              </a:rPr>
+              <a:t> i </a:t>
+            </a:r>
+            <a:r>
+              <a:rPr b="0" i="1" lang="bs-BA" sz="2100" spc="-1" strike="noStrike">
+                <a:solidFill>
+                  <a:srgbClr val="009bdd"/>
+                </a:solidFill>
+                <a:latin typeface="Arial"/>
+              </a:rPr>
+              <a:t>&gt;</a:t>
+            </a:r>
+            <a:r>
+              <a:rPr b="0" lang="bs-BA" sz="2100" spc="-1" strike="noStrike">
+                <a:solidFill>
+                  <a:srgbClr val="009bdd"/>
+                </a:solidFill>
+                <a:latin typeface="Arial"/>
+              </a:rPr>
+              <a:t>.</a:t>
+            </a:r>
+            <a:endParaRPr b="0" lang="bs-BA" sz="2100" spc="-1" strike="noStrike">
+              <a:solidFill>
+                <a:srgbClr val="009bdd"/>
+              </a:solidFill>
+              <a:latin typeface="Arial"/>
+            </a:endParaRPr>
+          </a:p>
+          <a:p>
+            <a:pPr lvl="1" marL="864000" indent="-324000">
+              <a:spcBef>
+                <a:spcPts val="850"/>
+              </a:spcBef>
+              <a:buClr>
+                <a:srgbClr val="77caee"/>
+              </a:buClr>
+              <a:buSzPct val="45000"/>
+              <a:buFont typeface="Wingdings" charset="2"/>
+              <a:buChar char=""/>
+            </a:pPr>
+            <a:r>
+              <a:rPr b="0" lang="bs-BA" sz="2100" spc="-1" strike="noStrike">
+                <a:solidFill>
+                  <a:srgbClr val="009bdd"/>
+                </a:solidFill>
+                <a:latin typeface="Arial"/>
+              </a:rPr>
+              <a:t>Netočno highlightira tokene </a:t>
+            </a:r>
+            <a:r>
+              <a:rPr b="0" i="1" lang="bs-BA" sz="2100" spc="-1" strike="noStrike">
+                <a:solidFill>
+                  <a:srgbClr val="009bdd"/>
+                </a:solidFill>
+                <a:latin typeface="Arial"/>
+              </a:rPr>
+              <a:t>a</a:t>
+            </a:r>
+            <a:r>
+              <a:rPr b="0" lang="bs-BA" sz="2100" spc="-1" strike="noStrike">
+                <a:solidFill>
+                  <a:srgbClr val="009bdd"/>
+                </a:solidFill>
+                <a:latin typeface="Arial"/>
+              </a:rPr>
+              <a:t>, </a:t>
+            </a:r>
+            <a:r>
+              <a:rPr b="0" i="1" lang="bs-BA" sz="2100" spc="-1" strike="noStrike">
+                <a:solidFill>
+                  <a:srgbClr val="009bdd"/>
+                </a:solidFill>
+                <a:latin typeface="Arial"/>
+              </a:rPr>
+              <a:t>b</a:t>
+            </a:r>
+            <a:r>
+              <a:rPr b="0" lang="bs-BA" sz="2100" spc="-1" strike="noStrike">
+                <a:solidFill>
+                  <a:srgbClr val="009bdd"/>
+                </a:solidFill>
+                <a:latin typeface="Arial"/>
+              </a:rPr>
+              <a:t> i </a:t>
+            </a:r>
+            <a:r>
+              <a:rPr b="0" i="1" lang="bs-BA" sz="2100" spc="-1" strike="noStrike">
+                <a:solidFill>
+                  <a:srgbClr val="009bdd"/>
+                </a:solidFill>
+                <a:latin typeface="Arial"/>
+              </a:rPr>
+              <a:t>c</a:t>
+            </a:r>
+            <a:r>
+              <a:rPr b="0" lang="bs-BA" sz="2100" spc="-1" strike="noStrike">
+                <a:solidFill>
+                  <a:srgbClr val="009bdd"/>
+                </a:solidFill>
+                <a:latin typeface="Arial"/>
+              </a:rPr>
+              <a:t> kad su heksadekadske konstante (uvijek ih highlightira kao da su flagovi).</a:t>
+            </a:r>
+            <a:endParaRPr b="0" lang="bs-BA" sz="2100" spc="-1" strike="noStrike">
               <a:solidFill>
                 <a:srgbClr val="009bdd"/>
               </a:solidFill>
@@ -9539,8 +10493,8 @@
         </p:blipFill>
         <p:spPr>
           <a:xfrm>
-            <a:off x="137160" y="1143000"/>
-            <a:ext cx="4892040" cy="380520"/>
+            <a:off x="1143000" y="2743200"/>
+            <a:ext cx="1737000" cy="723600"/>
           </a:xfrm>
           <a:prstGeom prst="rect">
             <a:avLst/>
@@ -9550,71 +10504,6 @@
           </a:ln>
         </p:spPr>
       </p:pic>
-      <p:pic>
-        <p:nvPicPr>
-          <p:cNvPr id="103" name="" descr=""/>
-          <p:cNvPicPr/>
-          <p:nvPr/>
-        </p:nvPicPr>
-        <p:blipFill>
-          <a:blip r:embed="rId2"/>
-          <a:stretch/>
-        </p:blipFill>
-        <p:spPr>
-          <a:xfrm>
-            <a:off x="685800" y="1600200"/>
-            <a:ext cx="3680280" cy="2976480"/>
-          </a:xfrm>
-          <a:prstGeom prst="rect">
-            <a:avLst/>
-          </a:prstGeom>
-          <a:ln w="18000">
-            <a:noFill/>
-          </a:ln>
-        </p:spPr>
-      </p:pic>
-      <p:sp>
-        <p:nvSpPr>
-          <p:cNvPr id="104" name=""/>
-          <p:cNvSpPr/>
-          <p:nvPr/>
-        </p:nvSpPr>
-        <p:spPr>
-          <a:xfrm>
-            <a:off x="4114800" y="914400"/>
-            <a:ext cx="914400" cy="914400"/>
-          </a:xfrm>
-          <a:prstGeom prst="ellipse">
-            <a:avLst/>
-          </a:prstGeom>
-          <a:noFill/>
-          <a:ln w="18000">
-            <a:solidFill>
-              <a:srgbClr val="009bdd"/>
-            </a:solidFill>
-            <a:round/>
-          </a:ln>
-        </p:spPr>
-        <p:style>
-          <a:lnRef idx="0"/>
-          <a:fillRef idx="0"/>
-          <a:effectRef idx="0"/>
-          <a:fontRef idx="minor"/>
-        </p:style>
-        <p:txBody>
-          <a:bodyPr wrap="none" lIns="90000" rIns="90000" tIns="45000" bIns="45000" anchor="ctr">
-            <a:noAutofit/>
-          </a:bodyPr>
-          <a:p>
-            <a:endParaRPr b="0" lang="bs-BA" sz="1800" spc="-1" strike="noStrike">
-              <a:solidFill>
-                <a:srgbClr val="000000"/>
-              </a:solidFill>
-              <a:latin typeface="Arial"/>
-            </a:endParaRPr>
-          </a:p>
-        </p:txBody>
-      </p:sp>
       <p:sp>
         <p:nvSpPr>
           <p:cNvPr id="4" name="PlaceHolder 3"/>
@@ -9629,7 +10518,7 @@
         <p:txBody>
           <a:bodyPr/>
           <a:p>
-            <a:fld id="{1DBBB064-8B23-4163-BECE-4D21125BC4EC}" type="slidenum">
+            <a:fld id="{BBDCE3F0-E881-4C70-8983-3D22BA19F4FD}" type="slidenum">
               <a:t>6</a:t>
             </a:fld>
           </a:p>
@@ -9649,7 +10538,7 @@
         <p:txBody>
           <a:bodyPr/>
           <a:p>
-            <a:fld id="{9631FFD6-B0F2-4B52-89C4-0F9E14636568}" type="datetime1">
+            <a:fld id="{2D33CF65-3FA2-4BAB-ADD1-7857B9B6F16C}" type="datetime1">
               <a:rPr lang="en-US"/>
               <a:t>10/06/2023</a:t>
             </a:fld>
@@ -9688,7 +10577,7 @@
       </p:grpSpPr>
       <p:sp>
         <p:nvSpPr>
-          <p:cNvPr id="105" name="PlaceHolder 1"/>
+          <p:cNvPr id="103" name="PlaceHolder 1"/>
           <p:cNvSpPr>
             <a:spLocks noGrp="1"/>
           </p:cNvSpPr>
@@ -9737,7 +10626,7 @@
       </p:sp>
       <p:sp>
         <p:nvSpPr>
-          <p:cNvPr id="106" name="PlaceHolder 2"/>
+          <p:cNvPr id="104" name="PlaceHolder 2"/>
           <p:cNvSpPr>
             <a:spLocks noGrp="1"/>
           </p:cNvSpPr>
@@ -9781,7 +10670,7 @@
                 </a:solidFill>
                 <a:latin typeface="Arial"/>
               </a:rPr>
-              <a:t>Onda, možemo, recimo, kliknuti na Fast Forward...</a:t>
+              <a:t>Kada želimo da se kod asemblira, kliknemo na gumb “Assemble”.</a:t>
             </a:r>
             <a:endParaRPr b="0" lang="bs-BA" sz="2400" spc="-1" strike="noStrike">
               <a:solidFill>
@@ -9794,7 +10683,7 @@
       </p:sp>
       <p:pic>
         <p:nvPicPr>
-          <p:cNvPr id="107" name="" descr=""/>
+          <p:cNvPr id="105" name="" descr=""/>
           <p:cNvPicPr/>
           <p:nvPr/>
         </p:nvPicPr>
@@ -9804,8 +10693,8 @@
         </p:blipFill>
         <p:spPr>
           <a:xfrm>
-            <a:off x="228600" y="1143000"/>
-            <a:ext cx="4625280" cy="2437920"/>
+            <a:off x="137160" y="1143000"/>
+            <a:ext cx="4892040" cy="380520"/>
           </a:xfrm>
           <a:prstGeom prst="rect">
             <a:avLst/>
@@ -9815,16 +10704,39 @@
           </a:ln>
         </p:spPr>
       </p:pic>
-      <p:sp>
-        <p:nvSpPr>
-          <p:cNvPr id="108" name=""/>
+      <p:pic>
+        <p:nvPicPr>
+          <p:cNvPr id="106" name="" descr=""/>
+          <p:cNvPicPr/>
+          <p:nvPr/>
+        </p:nvPicPr>
+        <p:blipFill>
+          <a:blip r:embed="rId2"/>
+          <a:stretch/>
+        </p:blipFill>
+        <p:spPr>
+          <a:xfrm>
+            <a:off x="685800" y="1600200"/>
+            <a:ext cx="3680280" cy="2976480"/>
+          </a:xfrm>
+          <a:prstGeom prst="rect">
+            <a:avLst/>
+          </a:prstGeom>
+          <a:ln w="18000">
+            <a:noFill/>
+          </a:ln>
+        </p:spPr>
+      </p:pic>
+      <p:sp>
+        <p:nvSpPr>
+          <p:cNvPr id="107" name=""/>
           <p:cNvSpPr/>
           <p:nvPr/>
         </p:nvSpPr>
         <p:spPr>
           <a:xfrm>
-            <a:off x="2057400" y="1143000"/>
-            <a:ext cx="457200" cy="457200"/>
+            <a:off x="4114800" y="914400"/>
+            <a:ext cx="914400" cy="914400"/>
           </a:xfrm>
           <a:prstGeom prst="ellipse">
             <a:avLst/>
@@ -9871,7 +10783,7 @@
         <p:txBody>
           <a:bodyPr/>
           <a:p>
-            <a:fld id="{32B47125-82F6-4B9E-AE85-A8D69D2613A1}" type="slidenum">
+            <a:fld id="{5282826D-E43D-4A5E-A9D8-B252DE19BD5A}" type="slidenum">
               <a:t>7</a:t>
             </a:fld>
           </a:p>
@@ -9891,7 +10803,7 @@
         <p:txBody>
           <a:bodyPr/>
           <a:p>
-            <a:fld id="{27BD68BF-DCBA-4C65-9522-B00A03EBA72C}" type="datetime1">
+            <a:fld id="{DB74380B-ED2D-4A21-AFA7-75D87C8A9A2B}" type="datetime1">
               <a:rPr lang="en-US"/>
               <a:t>10/06/2023</a:t>
             </a:fld>
@@ -9930,7 +10842,7 @@
       </p:grpSpPr>
       <p:sp>
         <p:nvSpPr>
-          <p:cNvPr id="109" name="PlaceHolder 1"/>
+          <p:cNvPr id="108" name="PlaceHolder 1"/>
           <p:cNvSpPr>
             <a:spLocks noGrp="1"/>
           </p:cNvSpPr>
@@ -9979,7 +10891,7 @@
       </p:sp>
       <p:sp>
         <p:nvSpPr>
-          <p:cNvPr id="110" name="PlaceHolder 2"/>
+          <p:cNvPr id="109" name="PlaceHolder 2"/>
           <p:cNvSpPr>
             <a:spLocks noGrp="1"/>
           </p:cNvSpPr>
@@ -10023,7 +10935,7 @@
                 </a:solidFill>
                 <a:latin typeface="Arial"/>
               </a:rPr>
-              <a:t>Da bismo komunicirali s programima kao što je “Binary to Decimal” (prvi primjer u flexboxu “Examples” s lijeva), možemo koristiti SVG-ove generirane u JavaScriptu, koji predstavljaju switcheve, LED-ice i sedam-segmentne pokaznike.</a:t>
+              <a:t>Onda, možemo, recimo, kliknuti na Fast Forward...</a:t>
             </a:r>
             <a:endParaRPr b="0" lang="bs-BA" sz="2400" spc="-1" strike="noStrike">
               <a:solidFill>
@@ -10036,7 +10948,7 @@
       </p:sp>
       <p:pic>
         <p:nvPicPr>
-          <p:cNvPr id="111" name="" descr=""/>
+          <p:cNvPr id="110" name="" descr=""/>
           <p:cNvPicPr/>
           <p:nvPr/>
         </p:nvPicPr>
@@ -10046,8 +10958,8 @@
         </p:blipFill>
         <p:spPr>
           <a:xfrm>
-            <a:off x="335520" y="1143000"/>
-            <a:ext cx="4693680" cy="1958040"/>
+            <a:off x="228600" y="1143000"/>
+            <a:ext cx="4625280" cy="2437920"/>
           </a:xfrm>
           <a:prstGeom prst="rect">
             <a:avLst/>
@@ -10059,6 +10971,48 @@
       </p:pic>
       <p:sp>
         <p:nvSpPr>
+          <p:cNvPr id="111" name=""/>
+          <p:cNvSpPr/>
+          <p:nvPr/>
+        </p:nvSpPr>
+        <p:spPr>
+          <a:xfrm>
+            <a:off x="2057400" y="1143000"/>
+            <a:ext cx="457200" cy="457200"/>
+          </a:xfrm>
+          <a:prstGeom prst="ellipse">
+            <a:avLst/>
+          </a:prstGeom>
+          <a:noFill/>
+          <a:ln w="18000">
+            <a:solidFill>
+              <a:srgbClr val="009bdd"/>
+            </a:solidFill>
+            <a:round/>
+          </a:ln>
+        </p:spPr>
+        <p:style>
+          <a:lnRef idx="0"/>
+          <a:fillRef idx="0"/>
+          <a:effectRef idx="0"/>
+          <a:fontRef idx="minor"/>
+        </p:style>
+        <p:txBody>
+          <a:bodyPr wrap="none" lIns="90000" rIns="90000" tIns="45000" bIns="45000" anchor="ctr">
+            <a:noAutofit/>
+          </a:bodyPr>
+          <a:p>
+            <a:endParaRPr b="0" lang="bs-BA" sz="1800" spc="-1" strike="noStrike">
+              <a:solidFill>
+                <a:srgbClr val="000000"/>
+              </a:solidFill>
+              <a:latin typeface="Arial"/>
+            </a:endParaRPr>
+          </a:p>
+        </p:txBody>
+      </p:sp>
+      <p:sp>
+        <p:nvSpPr>
           <p:cNvPr id="4" name="PlaceHolder 3"/>
           <p:cNvSpPr>
             <a:spLocks noGrp="1"/>
@@ -10071,7 +11025,7 @@
         <p:txBody>
           <a:bodyPr/>
           <a:p>
-            <a:fld id="{FD70CBC8-50AA-4D42-ACD9-6C492DF3F927}" type="slidenum">
+            <a:fld id="{9FD35C5E-3C3C-48E8-8459-0F1788DCC41C}" type="slidenum">
               <a:t>8</a:t>
             </a:fld>
           </a:p>
@@ -10091,7 +11045,7 @@
         <p:txBody>
           <a:bodyPr/>
           <a:p>
-            <a:fld id="{B038D146-684D-4C85-A0C1-799D45D15B5F}" type="datetime1">
+            <a:fld id="{8B9F0E16-CC59-4420-B224-CB649D523BA3}" type="datetime1">
               <a:rPr lang="en-US"/>
               <a:t>10/06/2023</a:t>
             </a:fld>
@@ -10223,35 +11177,7 @@
                 </a:solidFill>
                 <a:latin typeface="Arial"/>
               </a:rPr>
-              <a:t>Ako želimo, možemo dodati i breakpointse na koje će emulacija pauzirati.</a:t>
-            </a:r>
-            <a:endParaRPr b="0" lang="bs-BA" sz="2400" spc="-1" strike="noStrike">
-              <a:solidFill>
-                <a:srgbClr val="009bdd"/>
-              </a:solidFill>
-              <a:latin typeface="Arial"/>
-            </a:endParaRPr>
-          </a:p>
-          <a:p>
-            <a:pPr marL="432000" indent="-324000">
-              <a:spcBef>
-                <a:spcPts val="1060"/>
-              </a:spcBef>
-              <a:buClr>
-                <a:srgbClr val="77caee"/>
-              </a:buClr>
-              <a:buSzPct val="45000"/>
-              <a:buFont typeface="Wingdings" charset="2"/>
-              <a:buChar char=""/>
-            </a:pPr>
-            <a:r>
-              <a:rPr b="0" lang="bs-BA" sz="2400" spc="-1" strike="noStrike">
-                <a:solidFill>
-                  <a:srgbClr val="009bdd"/>
-                </a:solidFill>
-                <a:latin typeface="Arial"/>
-              </a:rPr>
-              <a:t>Tu sam mogućnost dodao na prijedlog profesora Tomislava Matića mlađeg.</a:t>
+              <a:t>Da bismo komunicirali s programima kao što je “Binary to Decimal” (prvi primjer u flexboxu “Examples” s lijeva), možemo koristiti SVG-ove generirane u JavaScriptu, koji predstavljaju switcheve, LED-ice i sedam-segmentne pokaznike.</a:t>
             </a:r>
             <a:endParaRPr b="0" lang="bs-BA" sz="2400" spc="-1" strike="noStrike">
               <a:solidFill>
@@ -10274,8 +11200,8 @@
         </p:blipFill>
         <p:spPr>
           <a:xfrm>
-            <a:off x="228600" y="1013760"/>
-            <a:ext cx="4739400" cy="3786840"/>
+            <a:off x="335520" y="1143000"/>
+            <a:ext cx="4693680" cy="1958040"/>
           </a:xfrm>
           <a:prstGeom prst="rect">
             <a:avLst/>
@@ -10287,48 +11213,6 @@
       </p:pic>
       <p:sp>
         <p:nvSpPr>
-          <p:cNvPr id="115" name=""/>
-          <p:cNvSpPr/>
-          <p:nvPr/>
-        </p:nvSpPr>
-        <p:spPr>
-          <a:xfrm>
-            <a:off x="228600" y="4114800"/>
-            <a:ext cx="685800" cy="228600"/>
-          </a:xfrm>
-          <a:prstGeom prst="ellipse">
-            <a:avLst/>
-          </a:prstGeom>
-          <a:noFill/>
-          <a:ln w="18000">
-            <a:solidFill>
-              <a:srgbClr val="009bdd"/>
-            </a:solidFill>
-            <a:round/>
-          </a:ln>
-        </p:spPr>
-        <p:style>
-          <a:lnRef idx="0"/>
-          <a:fillRef idx="0"/>
-          <a:effectRef idx="0"/>
-          <a:fontRef idx="minor"/>
-        </p:style>
-        <p:txBody>
-          <a:bodyPr wrap="none" lIns="90000" rIns="90000" tIns="45000" bIns="45000" anchor="ctr">
-            <a:noAutofit/>
-          </a:bodyPr>
-          <a:p>
-            <a:endParaRPr b="0" lang="bs-BA" sz="1800" spc="-1" strike="noStrike">
-              <a:solidFill>
-                <a:srgbClr val="000000"/>
-              </a:solidFill>
-              <a:latin typeface="Arial"/>
-            </a:endParaRPr>
-          </a:p>
-        </p:txBody>
-      </p:sp>
-      <p:sp>
-        <p:nvSpPr>
           <p:cNvPr id="4" name="PlaceHolder 3"/>
           <p:cNvSpPr>
             <a:spLocks noGrp="1"/>
@@ -10341,7 +11225,7 @@
         <p:txBody>
           <a:bodyPr/>
           <a:p>
-            <a:fld id="{45EB7603-2B08-435F-85C0-1687040EC082}" type="slidenum">
+            <a:fld id="{4FDF2F0E-CBAC-400A-B22A-C2BF810F8E45}" type="slidenum">
               <a:t>9</a:t>
             </a:fld>
           </a:p>
@@ -10361,7 +11245,7 @@
         <p:txBody>
           <a:bodyPr/>
           <a:p>
-            <a:fld id="{E932EA6A-F5BA-4872-8816-664C963B83A0}" type="datetime1">
+            <a:fld id="{6CE09DEB-750B-4FDD-A36F-96F41E397AD5}" type="datetime1">
               <a:rPr lang="en-US"/>
               <a:t>10/06/2023</a:t>
             </a:fld>

</xml_diff>

<commit_message>
Warned about a few more bugs in the presentation
</commit_message>
<xml_diff>
--- a/seminar/PicoBlaze.pptx
+++ b/seminar/PicoBlaze.pptx
@@ -25,6 +25,8 @@
     <p:sldId id="272" r:id="rId20"/>
     <p:sldId id="273" r:id="rId21"/>
     <p:sldId id="274" r:id="rId22"/>
+    <p:sldId id="275" r:id="rId23"/>
+    <p:sldId id="276" r:id="rId24"/>
   </p:sldIdLst>
   <p:sldSz cx="10080625" cy="5670550"/>
   <p:notesSz cx="7559675" cy="10691813"/>
@@ -82,7 +84,7 @@
         <p:txBody>
           <a:bodyPr/>
           <a:p>
-            <a:fld id="{3A8E4DC7-F288-403B-A252-4A0EA8C6C8B3}" type="slidenum">
+            <a:fld id="{B9DC3B0F-D73C-487A-9E75-700446DBF5C2}" type="slidenum">
               <a:t>&lt;#&gt;</a:t>
             </a:fld>
           </a:p>
@@ -291,7 +293,7 @@
         <p:txBody>
           <a:bodyPr/>
           <a:p>
-            <a:fld id="{DF942BE9-7826-466F-AA95-E013A641C7CA}" type="slidenum">
+            <a:fld id="{98BBF01B-C132-458D-BE69-317D283CC171}" type="slidenum">
               <a:t>&lt;#&gt;</a:t>
             </a:fld>
           </a:p>
@@ -586,7 +588,7 @@
         <p:txBody>
           <a:bodyPr/>
           <a:p>
-            <a:fld id="{EFCEB3E9-8BFA-45DF-AD55-357C7C235379}" type="slidenum">
+            <a:fld id="{D82E63F8-5AF0-4871-B2DA-F1CA56439458}" type="slidenum">
               <a:t>&lt;#&gt;</a:t>
             </a:fld>
           </a:p>
@@ -967,7 +969,7 @@
         <p:txBody>
           <a:bodyPr/>
           <a:p>
-            <a:fld id="{27B258ED-7F3A-4E0C-BF44-316483A8AD67}" type="slidenum">
+            <a:fld id="{4B462424-B9E4-4635-A57E-4A8395386AA4}" type="slidenum">
               <a:t>&lt;#&gt;</a:t>
             </a:fld>
           </a:p>
@@ -1050,7 +1052,7 @@
         <p:txBody>
           <a:bodyPr/>
           <a:p>
-            <a:fld id="{A573DDE3-1025-46DB-ACF9-D48B00AB0B7A}" type="slidenum">
+            <a:fld id="{C2CE9819-D819-4504-A21A-3F8BAD031B99}" type="slidenum">
               <a:t>&lt;#&gt;</a:t>
             </a:fld>
           </a:p>
@@ -1216,7 +1218,7 @@
         <p:txBody>
           <a:bodyPr/>
           <a:p>
-            <a:fld id="{1F627CDB-C043-43D1-A337-CCA811D387F8}" type="slidenum">
+            <a:fld id="{0B3F543A-CCB6-42C7-8C86-4F7AE2E92179}" type="slidenum">
               <a:t>&lt;#&gt;</a:t>
             </a:fld>
           </a:p>
@@ -1382,7 +1384,7 @@
         <p:txBody>
           <a:bodyPr/>
           <a:p>
-            <a:fld id="{FD00FF0E-CEA5-44B5-842E-10E580E76919}" type="slidenum">
+            <a:fld id="{313312DB-8205-49CD-A79F-6D17C37B6D6A}" type="slidenum">
               <a:t>&lt;#&gt;</a:t>
             </a:fld>
           </a:p>
@@ -1591,7 +1593,7 @@
         <p:txBody>
           <a:bodyPr/>
           <a:p>
-            <a:fld id="{C04215C4-C25A-4643-AC71-269501F6E000}" type="slidenum">
+            <a:fld id="{C4778844-5358-4AA4-89F3-464E3885C73A}" type="slidenum">
               <a:t>&lt;#&gt;</a:t>
             </a:fld>
           </a:p>
@@ -1714,7 +1716,7 @@
         <p:txBody>
           <a:bodyPr/>
           <a:p>
-            <a:fld id="{4BA4CD60-343F-433C-88F0-C0CAF03DD3A4}" type="slidenum">
+            <a:fld id="{CCC3F1BF-51CE-4AF1-860C-46C256D80FE0}" type="slidenum">
               <a:t>&lt;#&gt;</a:t>
             </a:fld>
           </a:p>
@@ -1838,7 +1840,7 @@
         <p:txBody>
           <a:bodyPr/>
           <a:p>
-            <a:fld id="{45B01691-E715-4BE4-A844-E6F7889A8952}" type="slidenum">
+            <a:fld id="{8B0B4496-22B4-450A-9FAE-1CBA76ADEAC7}" type="slidenum">
               <a:t>&lt;#&gt;</a:t>
             </a:fld>
           </a:p>
@@ -2090,7 +2092,7 @@
         <p:txBody>
           <a:bodyPr/>
           <a:p>
-            <a:fld id="{1B2F3115-CDDA-455A-8965-CDB17C0C8E26}" type="slidenum">
+            <a:fld id="{6805B874-E79F-4B4C-AFC3-66DB2115AEFE}" type="slidenum">
               <a:t>&lt;#&gt;</a:t>
             </a:fld>
           </a:p>
@@ -2256,7 +2258,7 @@
         <p:txBody>
           <a:bodyPr/>
           <a:p>
-            <a:fld id="{F24EDC23-C51A-4803-BFAF-CE84C471DDA7}" type="slidenum">
+            <a:fld id="{D0EC5574-7375-49C1-A915-16F01C10A3E8}" type="slidenum">
               <a:t>&lt;#&gt;</a:t>
             </a:fld>
           </a:p>
@@ -2508,7 +2510,7 @@
         <p:txBody>
           <a:bodyPr/>
           <a:p>
-            <a:fld id="{1B8864CB-C398-4924-A370-A3B6CFD524F6}" type="slidenum">
+            <a:fld id="{ABB8764D-228F-4EBE-A22E-1D799A9070A4}" type="slidenum">
               <a:t>&lt;#&gt;</a:t>
             </a:fld>
           </a:p>
@@ -2760,7 +2762,7 @@
         <p:txBody>
           <a:bodyPr/>
           <a:p>
-            <a:fld id="{459AFF53-634E-483E-BB57-9CE488CC5F0E}" type="slidenum">
+            <a:fld id="{D04E50B6-8916-4636-8389-DCF230C1017A}" type="slidenum">
               <a:t>&lt;#&gt;</a:t>
             </a:fld>
           </a:p>
@@ -2969,7 +2971,7 @@
         <p:txBody>
           <a:bodyPr/>
           <a:p>
-            <a:fld id="{8FB62973-1C89-4759-91E1-56690107851E}" type="slidenum">
+            <a:fld id="{E1B805FA-5F80-49D3-83B8-0B6631475584}" type="slidenum">
               <a:t>&lt;#&gt;</a:t>
             </a:fld>
           </a:p>
@@ -3264,7 +3266,7 @@
         <p:txBody>
           <a:bodyPr/>
           <a:p>
-            <a:fld id="{B88D4057-60E6-4E58-BC75-6576BF23F7B8}" type="slidenum">
+            <a:fld id="{71DEF1AF-DAFB-4598-BEE8-7D36F20CB182}" type="slidenum">
               <a:t>&lt;#&gt;</a:t>
             </a:fld>
           </a:p>
@@ -3645,7 +3647,7 @@
         <p:txBody>
           <a:bodyPr/>
           <a:p>
-            <a:fld id="{60F24AC1-723B-422F-8B62-DA20E91B0B5C}" type="slidenum">
+            <a:fld id="{4FFA2416-8394-4ADA-B66E-F6A79BF5A7AC}" type="slidenum">
               <a:t>&lt;#&gt;</a:t>
             </a:fld>
           </a:p>
@@ -3811,7 +3813,7 @@
         <p:txBody>
           <a:bodyPr/>
           <a:p>
-            <a:fld id="{30B58278-82DB-439A-87D8-EE4724FC5495}" type="slidenum">
+            <a:fld id="{44D7429B-E18D-480E-975D-9185572F6E8B}" type="slidenum">
               <a:t>&lt;#&gt;</a:t>
             </a:fld>
           </a:p>
@@ -4020,7 +4022,7 @@
         <p:txBody>
           <a:bodyPr/>
           <a:p>
-            <a:fld id="{82A5E2CA-5342-464E-87E5-BD9E3C0D7165}" type="slidenum">
+            <a:fld id="{98CBC4B9-4B68-40F9-998D-895EA680AF64}" type="slidenum">
               <a:t>&lt;#&gt;</a:t>
             </a:fld>
           </a:p>
@@ -4143,7 +4145,7 @@
         <p:txBody>
           <a:bodyPr/>
           <a:p>
-            <a:fld id="{C7117FD6-6C1F-4925-BB65-A42250FE21BC}" type="slidenum">
+            <a:fld id="{109FABF2-0585-4712-9F96-B00018A82699}" type="slidenum">
               <a:t>&lt;#&gt;</a:t>
             </a:fld>
           </a:p>
@@ -4267,7 +4269,7 @@
         <p:txBody>
           <a:bodyPr/>
           <a:p>
-            <a:fld id="{E91470ED-21BD-49F8-982C-1E7A3E8EECC0}" type="slidenum">
+            <a:fld id="{F2814642-84A9-427F-8F92-7248402EBB0A}" type="slidenum">
               <a:t>&lt;#&gt;</a:t>
             </a:fld>
           </a:p>
@@ -4519,7 +4521,7 @@
         <p:txBody>
           <a:bodyPr/>
           <a:p>
-            <a:fld id="{B558BFBA-3EA3-4A20-A970-40368FA537CB}" type="slidenum">
+            <a:fld id="{FBE30C94-233F-4DCB-8459-6B500893FCC8}" type="slidenum">
               <a:t>&lt;#&gt;</a:t>
             </a:fld>
           </a:p>
@@ -4771,7 +4773,7 @@
         <p:txBody>
           <a:bodyPr/>
           <a:p>
-            <a:fld id="{9C225260-1CCB-45BB-BA53-A064939A10C9}" type="slidenum">
+            <a:fld id="{E6442C73-7BD9-47E9-B850-F75F4B08803A}" type="slidenum">
               <a:t>&lt;#&gt;</a:t>
             </a:fld>
           </a:p>
@@ -5023,7 +5025,7 @@
         <p:txBody>
           <a:bodyPr/>
           <a:p>
-            <a:fld id="{7C64EEF5-2611-4921-894F-C448EECC0234}" type="slidenum">
+            <a:fld id="{3BC31858-0C02-4DF4-8C5C-6F3DA82044C1}" type="slidenum">
               <a:t>&lt;#&gt;</a:t>
             </a:fld>
           </a:p>
@@ -5562,7 +5564,7 @@
             <a:pPr indent="0" algn="r">
               <a:buNone/>
             </a:pPr>
-            <a:fld id="{5919374E-48B2-4E0F-8867-9B455679B28F}" type="slidenum">
+            <a:fld id="{6BBC24FC-1CC4-41F6-B73C-81A7FFD9700B}" type="slidenum">
               <a:rPr b="0" lang="bs-BA" sz="1400" spc="-1" strike="noStrike">
                 <a:solidFill>
                   <a:srgbClr val="ffffff"/>
@@ -6161,7 +6163,7 @@
             <a:pPr indent="0" algn="r">
               <a:buNone/>
             </a:pPr>
-            <a:fld id="{A390C4F5-8351-4D36-A202-CD581ED1C56C}" type="slidenum">
+            <a:fld id="{44D798EA-558E-4E47-9E6A-9A78891A67E2}" type="slidenum">
               <a:rPr b="0" lang="bs-BA" sz="1400" spc="-1" strike="noStrike">
                 <a:solidFill>
                   <a:srgbClr val="ffffff"/>
@@ -6623,7 +6625,7 @@
         <p:txBody>
           <a:bodyPr/>
           <a:p>
-            <a:fld id="{2F8353DF-157C-4592-8C4B-3B84A6F8799C}" type="slidenum">
+            <a:fld id="{C8897233-534E-47D9-BDEA-AD75C3FD0632}" type="slidenum">
               <a:t>10</a:t>
             </a:fld>
           </a:p>
@@ -6643,9 +6645,9 @@
         <p:txBody>
           <a:bodyPr/>
           <a:p>
-            <a:fld id="{6931A2F3-B235-4A82-B9CA-385D1AD98871}" type="datetime1">
+            <a:fld id="{B2E747F7-E400-403D-9338-56F519CF6B70}" type="datetime1">
               <a:rPr lang="en-US"/>
-              <a:t>10/06/2023</a:t>
+              <a:t>10/09/2023</a:t>
             </a:fld>
           </a:p>
         </p:txBody>
@@ -6911,7 +6913,7 @@
         <p:txBody>
           <a:bodyPr/>
           <a:p>
-            <a:fld id="{9DA0C846-EC7D-4902-A85A-440645A588BF}" type="slidenum">
+            <a:fld id="{DD6A0835-8C5B-444B-9C99-224F7E13CBE7}" type="slidenum">
               <a:t>11</a:t>
             </a:fld>
           </a:p>
@@ -6931,9 +6933,9 @@
         <p:txBody>
           <a:bodyPr/>
           <a:p>
-            <a:fld id="{7618BC9B-41E6-4894-9E1C-F7101ED7E258}" type="datetime1">
+            <a:fld id="{E66237CC-4129-4CCC-9F6E-7B355732C40C}" type="datetime1">
               <a:rPr lang="en-US"/>
-              <a:t>10/06/2023</a:t>
+              <a:t>10/09/2023</a:t>
             </a:fld>
           </a:p>
         </p:txBody>
@@ -7157,7 +7159,7 @@
         <p:txBody>
           <a:bodyPr/>
           <a:p>
-            <a:fld id="{F0478BC0-A990-4871-9F1F-BFAAA83C01B7}" type="slidenum">
+            <a:fld id="{E34EF763-4708-493C-9276-D58A79CCC4BF}" type="slidenum">
               <a:t>12</a:t>
             </a:fld>
           </a:p>
@@ -7177,9 +7179,9 @@
         <p:txBody>
           <a:bodyPr/>
           <a:p>
-            <a:fld id="{66529A95-2656-4D40-BA2E-8FD676D944C6}" type="datetime1">
+            <a:fld id="{E66F919B-3F3F-4021-8059-EFF18917CEC9}" type="datetime1">
               <a:rPr lang="en-US"/>
-              <a:t>10/06/2023</a:t>
+              <a:t>10/09/2023</a:t>
             </a:fld>
           </a:p>
         </p:txBody>
@@ -7426,7 +7428,7 @@
         <p:txBody>
           <a:bodyPr/>
           <a:p>
-            <a:fld id="{8876A1E8-76E4-4108-9533-5B78F2B5B978}" type="slidenum">
+            <a:fld id="{3DEF1FA2-01FE-4B43-8977-2ABED1DEFB72}" type="slidenum">
               <a:t>13</a:t>
             </a:fld>
           </a:p>
@@ -7446,9 +7448,9 @@
         <p:txBody>
           <a:bodyPr/>
           <a:p>
-            <a:fld id="{FDF8C877-9EEE-4336-9CC7-0E64BD517FE9}" type="datetime1">
+            <a:fld id="{014664CD-FD82-4CB8-A7FD-8F92441430EB}" type="datetime1">
               <a:rPr lang="en-US"/>
-              <a:t>10/06/2023</a:t>
+              <a:t>10/09/2023</a:t>
             </a:fld>
           </a:p>
         </p:txBody>
@@ -7704,7 +7706,7 @@
         <p:txBody>
           <a:bodyPr/>
           <a:p>
-            <a:fld id="{BB9BEF16-FADE-4303-B300-F67628CD1F72}" type="slidenum">
+            <a:fld id="{DCD41282-D125-4D96-817F-75E39CAA191A}" type="slidenum">
               <a:t>14</a:t>
             </a:fld>
           </a:p>
@@ -7724,9 +7726,9 @@
         <p:txBody>
           <a:bodyPr/>
           <a:p>
-            <a:fld id="{408AB898-B84C-40BD-BF09-69ACBD7C0FC1}" type="datetime1">
+            <a:fld id="{552DE3E2-9A6C-49D8-BB53-53C195C8D313}" type="datetime1">
               <a:rPr lang="en-US"/>
-              <a:t>10/06/2023</a:t>
+              <a:t>10/09/2023</a:t>
             </a:fld>
           </a:p>
         </p:txBody>
@@ -7799,7 +7801,7 @@
                 </a:solidFill>
                 <a:latin typeface="Arial"/>
               </a:rPr>
-              <a:t>Kako se koristi...</a:t>
+              <a:t>Je li simulacija UART-a realna?</a:t>
             </a:r>
             <a:endParaRPr b="0" lang="bs-BA" sz="3300" spc="-1" strike="noStrike">
               <a:solidFill>
@@ -7822,8 +7824,8 @@
         </p:nvSpPr>
         <p:spPr>
           <a:xfrm>
-            <a:off x="5155920" y="1080000"/>
-            <a:ext cx="4567320" cy="3600000"/>
+            <a:off x="360000" y="1080000"/>
+            <a:ext cx="9360000" cy="3600000"/>
           </a:xfrm>
           <a:prstGeom prst="rect">
             <a:avLst/>
@@ -7856,7 +7858,7 @@
                 </a:solidFill>
                 <a:latin typeface="Arial"/>
               </a:rPr>
-              <a:t>Asembler podržava ono što se očekuje od današnjeg asemblera: aritmetičke izraze u konstantama, if-grananje, if-else grananje i while-petlje. Svaki asembler ujedno je i interpreter.</a:t>
+              <a:t>Program “Decimal to Binary” nisam uspio pokrenuti na pravom PicoBlazeu, a nisam uspio ni dijagnosticirati problem. Tako da ga ne treba uzeti kao sigurno dobar primjer kako se na PicoBlazeu koristi UART.</a:t>
             </a:r>
             <a:endParaRPr b="0" lang="bs-BA" sz="2400" spc="-1" strike="noStrike">
               <a:solidFill>
@@ -7865,59 +7867,8 @@
               <a:latin typeface="Arial"/>
             </a:endParaRPr>
           </a:p>
-          <a:p>
-            <a:pPr marL="432000" indent="-324000">
-              <a:spcBef>
-                <a:spcPts val="1060"/>
-              </a:spcBef>
-              <a:buClr>
-                <a:srgbClr val="77caee"/>
-              </a:buClr>
-              <a:buSzPct val="45000"/>
-              <a:buFont typeface="Wingdings" charset="2"/>
-              <a:buChar char=""/>
-            </a:pPr>
-            <a:r>
-              <a:rPr b="0" lang="bs-BA" sz="2400" spc="-1" strike="noStrike">
-                <a:solidFill>
-                  <a:srgbClr val="009bdd"/>
-                </a:solidFill>
-                <a:latin typeface="Arial"/>
-              </a:rPr>
-              <a:t>Primjer “Preprocessor Test” ispisuje Fibonaccijeve brojeve manje od 100 za vrijeme asembliranja.</a:t>
-            </a:r>
-            <a:endParaRPr b="0" lang="bs-BA" sz="2400" spc="-1" strike="noStrike">
-              <a:solidFill>
-                <a:srgbClr val="009bdd"/>
-              </a:solidFill>
-              <a:latin typeface="Arial"/>
-            </a:endParaRPr>
-          </a:p>
-        </p:txBody>
-      </p:sp>
-      <p:pic>
-        <p:nvPicPr>
-          <p:cNvPr id="134" name="" descr=""/>
-          <p:cNvPicPr/>
-          <p:nvPr/>
-        </p:nvPicPr>
-        <p:blipFill>
-          <a:blip r:embed="rId1"/>
-          <a:stretch/>
-        </p:blipFill>
-        <p:spPr>
-          <a:xfrm>
-            <a:off x="228600" y="983160"/>
-            <a:ext cx="4671000" cy="3817440"/>
-          </a:xfrm>
-          <a:prstGeom prst="rect">
-            <a:avLst/>
-          </a:prstGeom>
-          <a:ln w="18000">
-            <a:noFill/>
-          </a:ln>
-        </p:spPr>
-      </p:pic>
+        </p:txBody>
+      </p:sp>
       <p:sp>
         <p:nvSpPr>
           <p:cNvPr id="4" name="PlaceHolder 3"/>
@@ -7932,7 +7883,7 @@
         <p:txBody>
           <a:bodyPr/>
           <a:p>
-            <a:fld id="{342F2680-A29D-420F-9507-FDB08F9DF60A}" type="slidenum">
+            <a:fld id="{90DC3E17-D9C7-43EB-B93B-9FF839B6313F}" type="slidenum">
               <a:t>15</a:t>
             </a:fld>
           </a:p>
@@ -7952,9 +7903,9 @@
         <p:txBody>
           <a:bodyPr/>
           <a:p>
-            <a:fld id="{BADF0028-B775-41D4-8902-1E1F168CB5C7}" type="datetime1">
+            <a:fld id="{25D9043E-D169-46FB-86FD-B12C64A3204E}" type="datetime1">
               <a:rPr lang="en-US"/>
-              <a:t>10/06/2023</a:t>
+              <a:t>10/09/2023</a:t>
             </a:fld>
           </a:p>
         </p:txBody>
@@ -7991,7 +7942,7 @@
       </p:grpSpPr>
       <p:sp>
         <p:nvSpPr>
-          <p:cNvPr id="135" name="PlaceHolder 1"/>
+          <p:cNvPr id="134" name="PlaceHolder 1"/>
           <p:cNvSpPr>
             <a:spLocks noGrp="1"/>
           </p:cNvSpPr>
@@ -8027,7 +7978,7 @@
                 </a:solidFill>
                 <a:latin typeface="Arial"/>
               </a:rPr>
-              <a:t>Nedostatci predprocesora</a:t>
+              <a:t>Kako se koristi...</a:t>
             </a:r>
             <a:endParaRPr b="0" lang="bs-BA" sz="3300" spc="-1" strike="noStrike">
               <a:solidFill>
@@ -8040,7 +7991,7 @@
       </p:sp>
       <p:sp>
         <p:nvSpPr>
-          <p:cNvPr id="136" name="PlaceHolder 2"/>
+          <p:cNvPr id="135" name="PlaceHolder 2"/>
           <p:cNvSpPr>
             <a:spLocks noGrp="1"/>
           </p:cNvSpPr>
@@ -8050,8 +8001,8 @@
         </p:nvSpPr>
         <p:spPr>
           <a:xfrm>
-            <a:off x="360000" y="1080000"/>
-            <a:ext cx="9360000" cy="3600000"/>
+            <a:off x="5155920" y="1080000"/>
+            <a:ext cx="4567320" cy="3600000"/>
           </a:xfrm>
           <a:prstGeom prst="rect">
             <a:avLst/>
@@ -8084,7 +8035,16 @@
                 </a:solidFill>
                 <a:latin typeface="Arial"/>
               </a:rPr>
-              <a:t>Ne podržava makro-naredbe.</a:t>
+              <a:t>Asembler podržava ono što se očekuje od današnjeg asemblera: aritmetičke izraze u konstantama, if-grananje, if-else grananje i while-petlje. </a:t>
+            </a:r>
+            <a:r>
+              <a:rPr b="0" i="1" lang="bs-BA" sz="2400" spc="-1" strike="noStrike">
+                <a:solidFill>
+                  <a:srgbClr val="009bdd"/>
+                </a:solidFill>
+                <a:latin typeface="Arial"/>
+              </a:rPr>
+              <a:t>Svaki asembler ujedno je i interpreter.</a:t>
             </a:r>
             <a:endParaRPr b="0" lang="bs-BA" sz="2400" spc="-1" strike="noStrike">
               <a:solidFill>
@@ -8112,125 +8072,7 @@
                 </a:solidFill>
                 <a:latin typeface="Arial"/>
               </a:rPr>
-              <a:t>Postoji neki neobičan bug u pretprocesoru da naredba “</a:t>
-            </a:r>
-            <a:r>
-              <a:rPr b="0" i="1" lang="bs-BA" sz="2400" spc="-1" strike="noStrike">
-                <a:solidFill>
-                  <a:srgbClr val="009bdd"/>
-                </a:solidFill>
-                <a:latin typeface="Arial"/>
-              </a:rPr>
-              <a:t>display a</a:t>
-            </a:r>
-            <a:r>
-              <a:rPr b="0" lang="bs-BA" sz="2400" spc="-1" strike="noStrike">
-                <a:solidFill>
-                  <a:srgbClr val="009bdd"/>
-                </a:solidFill>
-                <a:latin typeface="Arial"/>
-              </a:rPr>
-              <a:t>” ne radi kada je simulacija UART-a isključena.</a:t>
-            </a:r>
-            <a:endParaRPr b="0" lang="bs-BA" sz="2400" spc="-1" strike="noStrike">
-              <a:solidFill>
-                <a:srgbClr val="009bdd"/>
-              </a:solidFill>
-              <a:latin typeface="Arial"/>
-            </a:endParaRPr>
-          </a:p>
-          <a:p>
-            <a:pPr marL="432000" indent="-324000">
-              <a:spcBef>
-                <a:spcPts val="1060"/>
-              </a:spcBef>
-              <a:buClr>
-                <a:srgbClr val="77caee"/>
-              </a:buClr>
-              <a:buSzPct val="45000"/>
-              <a:buFont typeface="Wingdings" charset="2"/>
-              <a:buChar char=""/>
-            </a:pPr>
-            <a:r>
-              <a:rPr b="0" lang="bs-BA" sz="2400" spc="-1" strike="noStrike">
-                <a:solidFill>
-                  <a:srgbClr val="009bdd"/>
-                </a:solidFill>
-                <a:latin typeface="Arial"/>
-              </a:rPr>
-              <a:t>U </a:t>
-            </a:r>
-            <a:r>
-              <a:rPr b="0" i="1" lang="bs-BA" sz="2400" spc="-1" strike="noStrike">
-                <a:solidFill>
-                  <a:srgbClr val="009bdd"/>
-                </a:solidFill>
-                <a:latin typeface="Arial"/>
-              </a:rPr>
-              <a:t>if</a:t>
-            </a:r>
-            <a:r>
-              <a:rPr b="0" lang="bs-BA" sz="2400" spc="-1" strike="noStrike">
-                <a:solidFill>
-                  <a:srgbClr val="009bdd"/>
-                </a:solidFill>
-                <a:latin typeface="Arial"/>
-              </a:rPr>
-              <a:t>-grananjima, </a:t>
-            </a:r>
-            <a:r>
-              <a:rPr b="0" i="1" lang="bs-BA" sz="2400" spc="-1" strike="noStrike">
-                <a:solidFill>
-                  <a:srgbClr val="009bdd"/>
-                </a:solidFill>
-                <a:latin typeface="Arial"/>
-              </a:rPr>
-              <a:t>if-else</a:t>
-            </a:r>
-            <a:r>
-              <a:rPr b="0" lang="bs-BA" sz="2400" spc="-1" strike="noStrike">
-                <a:solidFill>
-                  <a:srgbClr val="009bdd"/>
-                </a:solidFill>
-                <a:latin typeface="Arial"/>
-              </a:rPr>
-              <a:t>-grananjima i </a:t>
-            </a:r>
-            <a:r>
-              <a:rPr b="0" i="1" lang="bs-BA" sz="2400" spc="-1" strike="noStrike">
-                <a:solidFill>
-                  <a:srgbClr val="009bdd"/>
-                </a:solidFill>
-                <a:latin typeface="Arial"/>
-              </a:rPr>
-              <a:t>while</a:t>
-            </a:r>
-            <a:r>
-              <a:rPr b="0" lang="bs-BA" sz="2400" spc="-1" strike="noStrike">
-                <a:solidFill>
-                  <a:srgbClr val="009bdd"/>
-                </a:solidFill>
-                <a:latin typeface="Arial"/>
-              </a:rPr>
-              <a:t>-petljama ne mogu se nalaziti mnemonike niti pretprocesorska naredba </a:t>
-            </a:r>
-            <a:r>
-              <a:rPr b="0" i="1" lang="bs-BA" sz="2400" spc="-1" strike="noStrike">
-                <a:solidFill>
-                  <a:srgbClr val="009bdd"/>
-                </a:solidFill>
-                <a:latin typeface="Arial"/>
-              </a:rPr>
-              <a:t>address</a:t>
-            </a:r>
-            <a:r>
-              <a:rPr b="0" lang="bs-BA" sz="2400" spc="-1" strike="noStrike">
-                <a:solidFill>
-                  <a:srgbClr val="009bdd"/>
-                </a:solidFill>
-                <a:latin typeface="Arial"/>
-              </a:rPr>
-              <a:t>. To je zato jer bi se, da se te stvari omoguće, znatno zakomplicirao pretprocesor i bilo bi lagano nenamjerno napraviti beskonačnu petlju za vrijeme pretprocesiranja:</a:t>
+              <a:t>Primjer “Preprocessor Test” ispisuje Fibonaccijeve brojeve manje od 100 za vrijeme asembliranja.</a:t>
             </a:r>
             <a:endParaRPr b="0" lang="bs-BA" sz="2400" spc="-1" strike="noStrike">
               <a:solidFill>
@@ -8243,7 +8085,7 @@
       </p:sp>
       <p:pic>
         <p:nvPicPr>
-          <p:cNvPr id="137" name="" descr=""/>
+          <p:cNvPr id="136" name="" descr=""/>
           <p:cNvPicPr/>
           <p:nvPr/>
         </p:nvPicPr>
@@ -8253,8 +8095,8 @@
         </p:blipFill>
         <p:spPr>
           <a:xfrm>
-            <a:off x="685800" y="4100040"/>
-            <a:ext cx="2293200" cy="929160"/>
+            <a:off x="228600" y="983160"/>
+            <a:ext cx="4671000" cy="3817440"/>
           </a:xfrm>
           <a:prstGeom prst="rect">
             <a:avLst/>
@@ -8278,7 +8120,7 @@
         <p:txBody>
           <a:bodyPr/>
           <a:p>
-            <a:fld id="{07B158F4-8403-4325-B022-4F1F392405FD}" type="slidenum">
+            <a:fld id="{E301701B-AFE5-4D28-9122-D9AF92563239}" type="slidenum">
               <a:t>16</a:t>
             </a:fld>
           </a:p>
@@ -8298,9 +8140,9 @@
         <p:txBody>
           <a:bodyPr/>
           <a:p>
-            <a:fld id="{7CB738CB-94E6-4358-9E38-1D1CB52CC7D7}" type="datetime1">
+            <a:fld id="{A438724E-CA97-4B12-B4F8-0379993029E8}" type="datetime1">
               <a:rPr lang="en-US"/>
-              <a:t>10/06/2023</a:t>
+              <a:t>10/09/2023</a:t>
             </a:fld>
           </a:p>
         </p:txBody>
@@ -8337,7 +8179,7 @@
       </p:grpSpPr>
       <p:sp>
         <p:nvSpPr>
-          <p:cNvPr id="138" name="PlaceHolder 1"/>
+          <p:cNvPr id="137" name="PlaceHolder 1"/>
           <p:cNvSpPr>
             <a:spLocks noGrp="1"/>
           </p:cNvSpPr>
@@ -8373,7 +8215,7 @@
                 </a:solidFill>
                 <a:latin typeface="Arial"/>
               </a:rPr>
-              <a:t>Out in the wild...</a:t>
+              <a:t>Nedostatci predprocesora</a:t>
             </a:r>
             <a:endParaRPr b="0" lang="bs-BA" sz="3300" spc="-1" strike="noStrike">
               <a:solidFill>
@@ -8386,7 +8228,7 @@
       </p:sp>
       <p:sp>
         <p:nvSpPr>
-          <p:cNvPr id="139" name="PlaceHolder 2"/>
+          <p:cNvPr id="138" name="PlaceHolder 2"/>
           <p:cNvSpPr>
             <a:spLocks noGrp="1"/>
           </p:cNvSpPr>
@@ -8430,7 +8272,7 @@
                 </a:solidFill>
                 <a:latin typeface="Arial"/>
               </a:rPr>
-              <a:t>Moj se program koristi na fakultetu u Argentini za uvod u ugrađene sustave.</a:t>
+              <a:t>Ne podržava makro-naredbe.</a:t>
             </a:r>
             <a:endParaRPr b="0" lang="bs-BA" sz="2400" spc="-1" strike="noStrike">
               <a:solidFill>
@@ -8458,7 +8300,7 @@
                 </a:solidFill>
                 <a:latin typeface="Arial"/>
               </a:rPr>
-              <a:t>Nedavno sam dobio kontributora s tog fakulteta koji se zove Agustin Izaguirre (</a:t>
+              <a:t>Postoji neki neobičan bug u pretprocesoru da naredba “</a:t>
             </a:r>
             <a:r>
               <a:rPr b="0" i="1" lang="bs-BA" sz="2400" spc="-1" strike="noStrike">
@@ -8467,7 +8309,7 @@
                 </a:solidFill>
                 <a:latin typeface="Arial"/>
               </a:rPr>
-              <a:t>agustiza</a:t>
+              <a:t>display a</a:t>
             </a:r>
             <a:r>
               <a:rPr b="0" lang="bs-BA" sz="2400" spc="-1" strike="noStrike">
@@ -8476,7 +8318,35 @@
                 </a:solidFill>
                 <a:latin typeface="Arial"/>
               </a:rPr>
-              <a:t>). On je napravio nekoliko pull requestova na GitHubu, isprva sitni bug-fixi (prvo da se naredba SRA ponaša ispravno kad je </a:t>
+              <a:t>”(novi red) ne radi kada je simulacija UART-a isključena.</a:t>
+            </a:r>
+            <a:endParaRPr b="0" lang="bs-BA" sz="2400" spc="-1" strike="noStrike">
+              <a:solidFill>
+                <a:srgbClr val="009bdd"/>
+              </a:solidFill>
+              <a:latin typeface="Arial"/>
+            </a:endParaRPr>
+          </a:p>
+          <a:p>
+            <a:pPr marL="432000" indent="-324000">
+              <a:spcBef>
+                <a:spcPts val="1060"/>
+              </a:spcBef>
+              <a:buClr>
+                <a:srgbClr val="77caee"/>
+              </a:buClr>
+              <a:buSzPct val="45000"/>
+              <a:buFont typeface="Wingdings" charset="2"/>
+              <a:buChar char=""/>
+            </a:pPr>
+            <a:r>
+              <a:rPr b="0" lang="bs-BA" sz="2400" spc="-1" strike="noStrike">
+                <a:solidFill>
+                  <a:srgbClr val="009bdd"/>
+                </a:solidFill>
+                <a:latin typeface="Arial"/>
+              </a:rPr>
+              <a:t>U </a:t>
             </a:r>
             <a:r>
               <a:rPr b="0" i="1" lang="bs-BA" sz="2400" spc="-1" strike="noStrike">
@@ -8485,7 +8355,7 @@
                 </a:solidFill>
                 <a:latin typeface="Arial"/>
               </a:rPr>
-              <a:t>carry flag</a:t>
+              <a:t>if</a:t>
             </a:r>
             <a:r>
               <a:rPr b="0" lang="bs-BA" sz="2400" spc="-1" strike="noStrike">
@@ -8494,7 +8364,61 @@
                 </a:solidFill>
                 <a:latin typeface="Arial"/>
               </a:rPr>
-              <a:t> postavljen u jedinicu), a onda i dodavanje novih featuresa kao što su JEST testovi.</a:t>
+              <a:t>-grananjima, </a:t>
+            </a:r>
+            <a:r>
+              <a:rPr b="0" i="1" lang="bs-BA" sz="2400" spc="-1" strike="noStrike">
+                <a:solidFill>
+                  <a:srgbClr val="009bdd"/>
+                </a:solidFill>
+                <a:latin typeface="Arial"/>
+              </a:rPr>
+              <a:t>if-else</a:t>
+            </a:r>
+            <a:r>
+              <a:rPr b="0" lang="bs-BA" sz="2400" spc="-1" strike="noStrike">
+                <a:solidFill>
+                  <a:srgbClr val="009bdd"/>
+                </a:solidFill>
+                <a:latin typeface="Arial"/>
+              </a:rPr>
+              <a:t>-grananjima i </a:t>
+            </a:r>
+            <a:r>
+              <a:rPr b="0" i="1" lang="bs-BA" sz="2400" spc="-1" strike="noStrike">
+                <a:solidFill>
+                  <a:srgbClr val="009bdd"/>
+                </a:solidFill>
+                <a:latin typeface="Arial"/>
+              </a:rPr>
+              <a:t>while</a:t>
+            </a:r>
+            <a:r>
+              <a:rPr b="0" lang="bs-BA" sz="2400" spc="-1" strike="noStrike">
+                <a:solidFill>
+                  <a:srgbClr val="009bdd"/>
+                </a:solidFill>
+                <a:latin typeface="Arial"/>
+              </a:rPr>
+              <a:t>-petljama ne mogu se nalaziti mnemonike niti pretprocesorska naredba </a:t>
+            </a:r>
+            <a:r>
+              <a:rPr b="0" i="1" lang="bs-BA" sz="2400" spc="-1" strike="noStrike">
+                <a:solidFill>
+                  <a:srgbClr val="009bdd"/>
+                </a:solidFill>
+                <a:latin typeface="Arial"/>
+              </a:rPr>
+              <a:t>address</a:t>
+            </a:r>
+            <a:r>
+              <a:rPr b="0" lang="bs-BA" sz="2400" spc="-1" strike="noStrike">
+                <a:solidFill>
+                  <a:srgbClr val="009bdd"/>
+                </a:solidFill>
+                <a:latin typeface="Arial"/>
+              </a:rPr>
+              <a:t>. To je zato jer bi se, da se te stvari omoguće, znatno zakomplicirao pretprocesor i bilo bi lagano nenamjerno napraviti beskonačnu petlju za vrijeme pretprocesiranja:</a:t>
             </a:r>
             <a:endParaRPr b="0" lang="bs-BA" sz="2400" spc="-1" strike="noStrike">
               <a:solidFill>
@@ -8505,6 +8429,29 @@
           </a:p>
         </p:txBody>
       </p:sp>
+      <p:pic>
+        <p:nvPicPr>
+          <p:cNvPr id="139" name="" descr=""/>
+          <p:cNvPicPr/>
+          <p:nvPr/>
+        </p:nvPicPr>
+        <p:blipFill>
+          <a:blip r:embed="rId1"/>
+          <a:stretch/>
+        </p:blipFill>
+        <p:spPr>
+          <a:xfrm>
+            <a:off x="685800" y="4100040"/>
+            <a:ext cx="2293200" cy="929160"/>
+          </a:xfrm>
+          <a:prstGeom prst="rect">
+            <a:avLst/>
+          </a:prstGeom>
+          <a:ln w="18000">
+            <a:noFill/>
+          </a:ln>
+        </p:spPr>
+      </p:pic>
       <p:sp>
         <p:nvSpPr>
           <p:cNvPr id="4" name="PlaceHolder 3"/>
@@ -8519,7 +8466,7 @@
         <p:txBody>
           <a:bodyPr/>
           <a:p>
-            <a:fld id="{9211D8BD-B757-4E78-89B4-A4A12B334646}" type="slidenum">
+            <a:fld id="{4A3378C0-40A8-4AA7-B6D8-ED6881B38B9C}" type="slidenum">
               <a:t>17</a:t>
             </a:fld>
           </a:p>
@@ -8539,9 +8486,9 @@
         <p:txBody>
           <a:bodyPr/>
           <a:p>
-            <a:fld id="{DDEE335B-406C-4162-8A3B-A605CEF940D9}" type="datetime1">
+            <a:fld id="{2E98CCD6-7AEE-4373-8434-C328E9C8A503}" type="datetime1">
               <a:rPr lang="en-US"/>
-              <a:t>10/06/2023</a:t>
+              <a:t>10/09/2023</a:t>
             </a:fld>
           </a:p>
         </p:txBody>
@@ -8614,7 +8561,7 @@
                 </a:solidFill>
                 <a:latin typeface="Arial"/>
               </a:rPr>
-              <a:t>Kompatibilnost s browserima</a:t>
+              <a:t>Nedostatci simulatora</a:t>
             </a:r>
             <a:endParaRPr b="0" lang="bs-BA" sz="3300" spc="-1" strike="noStrike">
               <a:solidFill>
@@ -8665,219 +8612,64 @@
               <a:buChar char=""/>
             </a:pPr>
             <a:r>
-              <a:rPr b="0" lang="bs-BA" sz="2000" spc="-1" strike="noStrike">
+              <a:rPr b="0" lang="bs-BA" sz="2400" spc="-1" strike="noStrike">
                 <a:solidFill>
                   <a:srgbClr val="009bdd"/>
                 </a:solidFill>
                 <a:latin typeface="Arial"/>
               </a:rPr>
-              <a:t>Ciljao sam na Firefox 52.9 ESR.</a:t>
-            </a:r>
-            <a:endParaRPr b="0" lang="bs-BA" sz="2000" spc="-1" strike="noStrike">
+              <a:t>Ne znam kako se zastavice na pravom PicoBlazeu ponašaju kad se promijeni regbanka. U svoj simulator PicoBlazea uprogramirao sam da svaka regbanka ima zasebne zastavice carry i zero (kao na Z80), ali moguće je da to nije tako. To bi se trebalo moći provjeriti pomoću programa “</a:t>
+            </a:r>
+            <a:r>
+              <a:rPr b="0" i="1" lang="bs-BA" sz="2400" spc="-1" strike="noStrike">
+                <a:solidFill>
+                  <a:srgbClr val="009bdd"/>
+                </a:solidFill>
+                <a:latin typeface="Arial"/>
+              </a:rPr>
+              <a:t>Regbanks-Flags Test</a:t>
+            </a:r>
+            <a:r>
+              <a:rPr b="0" lang="bs-BA" sz="2400" spc="-1" strike="noStrike">
+                <a:solidFill>
+                  <a:srgbClr val="009bdd"/>
+                </a:solidFill>
+                <a:latin typeface="Arial"/>
+              </a:rPr>
+              <a:t>”.</a:t>
+            </a:r>
+            <a:endParaRPr b="0" lang="bs-BA" sz="2400" spc="-1" strike="noStrike">
               <a:solidFill>
                 <a:srgbClr val="009bdd"/>
               </a:solidFill>
               <a:latin typeface="Arial"/>
             </a:endParaRPr>
           </a:p>
-          <a:p>
-            <a:pPr lvl="1" marL="864000" indent="-324000">
-              <a:spcBef>
-                <a:spcPts val="850"/>
-              </a:spcBef>
-              <a:buClr>
-                <a:srgbClr val="77caee"/>
-              </a:buClr>
-              <a:buSzPct val="45000"/>
-              <a:buFont typeface="Wingdings" charset="2"/>
-              <a:buChar char=""/>
-            </a:pPr>
-            <a:r>
-              <a:rPr b="0" lang="bs-BA" sz="2000" spc="-1" strike="noStrike">
-                <a:solidFill>
-                  <a:srgbClr val="009bdd"/>
-                </a:solidFill>
-                <a:latin typeface="Arial"/>
-              </a:rPr>
-              <a:t>To je posljednja verzija Firefoxa koja se može vrtjeti na Windows XP-u i Windows Visti, te također verzija Firefoxa koja se dobije uz Solaris 11.4.</a:t>
-            </a:r>
-            <a:endParaRPr b="0" lang="bs-BA" sz="2000" spc="-1" strike="noStrike">
-              <a:solidFill>
-                <a:srgbClr val="009bdd"/>
-              </a:solidFill>
-              <a:latin typeface="Arial"/>
-            </a:endParaRPr>
-          </a:p>
-          <a:p>
-            <a:pPr marL="432000" indent="-324000">
-              <a:spcBef>
-                <a:spcPts val="1060"/>
-              </a:spcBef>
-              <a:buClr>
-                <a:srgbClr val="77caee"/>
-              </a:buClr>
-              <a:buSzPct val="45000"/>
-              <a:buFont typeface="Wingdings" charset="2"/>
-              <a:buChar char=""/>
-            </a:pPr>
-            <a:r>
-              <a:rPr b="0" lang="bs-BA" sz="2000" spc="-1" strike="noStrike">
-                <a:solidFill>
-                  <a:srgbClr val="009bdd"/>
-                </a:solidFill>
-                <a:latin typeface="Arial"/>
-              </a:rPr>
-              <a:t>Moderni Chrome</a:t>
-            </a:r>
-            <a:endParaRPr b="0" lang="bs-BA" sz="2000" spc="-1" strike="noStrike">
-              <a:solidFill>
-                <a:srgbClr val="009bdd"/>
-              </a:solidFill>
-              <a:latin typeface="Arial"/>
-            </a:endParaRPr>
-          </a:p>
-          <a:p>
-            <a:pPr lvl="1" marL="864000" indent="-324000">
-              <a:spcBef>
-                <a:spcPts val="850"/>
-              </a:spcBef>
-              <a:buClr>
-                <a:srgbClr val="77caee"/>
-              </a:buClr>
-              <a:buSzPct val="45000"/>
-              <a:buFont typeface="Wingdings" charset="2"/>
-              <a:buChar char=""/>
-            </a:pPr>
-            <a:r>
-              <a:rPr b="0" lang="bs-BA" sz="2000" spc="-1" strike="noStrike">
-                <a:solidFill>
-                  <a:srgbClr val="009bdd"/>
-                </a:solidFill>
-                <a:latin typeface="Arial"/>
-              </a:rPr>
-              <a:t>Za to da radi u Chromeu, morao sam izmijeniti CSS (jer tooltipsi na “Play/Pause”, “Fast Forward”, “Single Step” i “Stop” nisu bili radili).</a:t>
-            </a:r>
-            <a:endParaRPr b="0" lang="bs-BA" sz="2000" spc="-1" strike="noStrike">
-              <a:solidFill>
-                <a:srgbClr val="009bdd"/>
-              </a:solidFill>
-              <a:latin typeface="Arial"/>
-            </a:endParaRPr>
-          </a:p>
-          <a:p>
-            <a:pPr marL="432000" indent="-324000">
-              <a:spcBef>
-                <a:spcPts val="1060"/>
-              </a:spcBef>
-              <a:buClr>
-                <a:srgbClr val="77caee"/>
-              </a:buClr>
-              <a:buSzPct val="45000"/>
-              <a:buFont typeface="Wingdings" charset="2"/>
-              <a:buChar char=""/>
-            </a:pPr>
-            <a:r>
-              <a:rPr b="0" lang="bs-BA" sz="2000" spc="-1" strike="noStrike">
-                <a:solidFill>
-                  <a:srgbClr val="009bdd"/>
-                </a:solidFill>
-                <a:latin typeface="Arial"/>
-              </a:rPr>
-              <a:t>WebPositive (bliski srodnik Safariju)</a:t>
-            </a:r>
-            <a:endParaRPr b="0" lang="bs-BA" sz="2000" spc="-1" strike="noStrike">
-              <a:solidFill>
-                <a:srgbClr val="009bdd"/>
-              </a:solidFill>
-              <a:latin typeface="Arial"/>
-            </a:endParaRPr>
-          </a:p>
-          <a:p>
-            <a:pPr lvl="1" marL="864000" indent="-324000">
-              <a:spcBef>
-                <a:spcPts val="850"/>
-              </a:spcBef>
-              <a:buClr>
-                <a:srgbClr val="77caee"/>
-              </a:buClr>
-              <a:buSzPct val="45000"/>
-              <a:buFont typeface="Wingdings" charset="2"/>
-              <a:buChar char=""/>
-            </a:pPr>
-            <a:r>
-              <a:rPr b="0" lang="bs-BA" sz="2000" spc="-1" strike="noStrike">
-                <a:solidFill>
-                  <a:srgbClr val="009bdd"/>
-                </a:solidFill>
-                <a:latin typeface="Arial"/>
-              </a:rPr>
-              <a:t>Za to da radi u WebPositiveu, morao sam izmijeniti i CSS i JavaScript.</a:t>
-            </a:r>
-            <a:endParaRPr b="0" lang="bs-BA" sz="2000" spc="-1" strike="noStrike">
-              <a:solidFill>
-                <a:srgbClr val="009bdd"/>
-              </a:solidFill>
-              <a:latin typeface="Arial"/>
-            </a:endParaRPr>
-          </a:p>
-          <a:p>
-            <a:pPr lvl="1" marL="864000" indent="-324000">
-              <a:spcBef>
-                <a:spcPts val="850"/>
-              </a:spcBef>
-              <a:buClr>
-                <a:srgbClr val="77caee"/>
-              </a:buClr>
-              <a:buSzPct val="45000"/>
-              <a:buFont typeface="Wingdings" charset="2"/>
-              <a:buChar char=""/>
-            </a:pPr>
-            <a:r>
-              <a:rPr b="0" lang="bs-BA" sz="2000" spc="-1" strike="noStrike">
-                <a:solidFill>
-                  <a:srgbClr val="009bdd"/>
-                </a:solidFill>
-                <a:latin typeface="Arial"/>
-              </a:rPr>
-              <a:t>Nisam uspio napraviti da “Download Hexadecimal” radi u WebPositiveu.</a:t>
-            </a:r>
-            <a:endParaRPr b="0" lang="bs-BA" sz="2000" spc="-1" strike="noStrike">
-              <a:solidFill>
-                <a:srgbClr val="009bdd"/>
-              </a:solidFill>
-              <a:latin typeface="Arial"/>
-            </a:endParaRPr>
-          </a:p>
-          <a:p>
-            <a:pPr marL="432000" indent="-324000">
-              <a:spcBef>
-                <a:spcPts val="1060"/>
-              </a:spcBef>
-              <a:buClr>
-                <a:srgbClr val="77caee"/>
-              </a:buClr>
-              <a:buSzPct val="45000"/>
-              <a:buFont typeface="Wingdings" charset="2"/>
-              <a:buChar char=""/>
-            </a:pPr>
-            <a:r>
-              <a:rPr b="0" lang="bs-BA" sz="2000" spc="-1" strike="noStrike">
-                <a:solidFill>
-                  <a:srgbClr val="009bdd"/>
-                </a:solidFill>
-                <a:latin typeface="Arial"/>
-              </a:rPr>
-              <a:t>Darko Nikolić tvrdi da je isprobao moj program na Macu u Safariju i u Operi i da funkcionira tamo.</a:t>
-            </a:r>
-            <a:endParaRPr b="0" lang="bs-BA" sz="2000" spc="-1" strike="noStrike">
-              <a:solidFill>
-                <a:srgbClr val="009bdd"/>
-              </a:solidFill>
-              <a:latin typeface="Arial"/>
-            </a:endParaRPr>
-          </a:p>
-        </p:txBody>
-      </p:sp>
+        </p:txBody>
+      </p:sp>
+      <p:pic>
+        <p:nvPicPr>
+          <p:cNvPr id="142" name="" descr=""/>
+          <p:cNvPicPr/>
+          <p:nvPr/>
+        </p:nvPicPr>
+        <p:blipFill>
+          <a:blip r:embed="rId1"/>
+          <a:stretch/>
+        </p:blipFill>
+        <p:spPr>
+          <a:xfrm>
+            <a:off x="709200" y="2971800"/>
+            <a:ext cx="1576800" cy="1371240"/>
+          </a:xfrm>
+          <a:prstGeom prst="rect">
+            <a:avLst/>
+          </a:prstGeom>
+          <a:ln w="18000">
+            <a:noFill/>
+          </a:ln>
+        </p:spPr>
+      </p:pic>
       <p:sp>
         <p:nvSpPr>
           <p:cNvPr id="4" name="PlaceHolder 3"/>
@@ -8892,7 +8684,7 @@
         <p:txBody>
           <a:bodyPr/>
           <a:p>
-            <a:fld id="{D6FDC79E-62A4-4C13-B8DA-072CE062A84C}" type="slidenum">
+            <a:fld id="{193A1D01-3842-4215-AA5D-EF4900BE3D85}" type="slidenum">
               <a:t>18</a:t>
             </a:fld>
           </a:p>
@@ -8912,9 +8704,9 @@
         <p:txBody>
           <a:bodyPr/>
           <a:p>
-            <a:fld id="{8A5DC368-3DA7-4958-8F94-BEC4031781D0}" type="datetime1">
+            <a:fld id="{D5916E2D-CC1F-491F-A859-07B85BFD03DF}" type="datetime1">
               <a:rPr lang="en-US"/>
-              <a:t>10/06/2023</a:t>
+              <a:t>10/09/2023</a:t>
             </a:fld>
           </a:p>
         </p:txBody>
@@ -8951,18 +8743,18 @@
       </p:grpSpPr>
       <p:sp>
         <p:nvSpPr>
-          <p:cNvPr id="142" name="PlaceHolder 1"/>
-          <p:cNvSpPr>
-            <a:spLocks noGrp="1"/>
-          </p:cNvSpPr>
-          <p:nvPr>
-            <p:ph type="subTitle"/>
+          <p:cNvPr id="143" name="PlaceHolder 1"/>
+          <p:cNvSpPr>
+            <a:spLocks noGrp="1"/>
+          </p:cNvSpPr>
+          <p:nvPr>
+            <p:ph type="title"/>
           </p:nvPr>
         </p:nvSpPr>
         <p:spPr>
           <a:xfrm>
             <a:off x="360000" y="180000"/>
-            <a:ext cx="9360000" cy="2217240"/>
+            <a:ext cx="9360000" cy="478080"/>
           </a:xfrm>
           <a:prstGeom prst="rect">
             <a:avLst/>
@@ -8977,34 +8769,151 @@
             <a:noAutofit/>
           </a:bodyPr>
           <a:p>
-            <a:pPr algn="ctr"/>
-            <a:r>
-              <a:rPr b="0" lang="bs-BA" sz="3200" spc="-1" strike="noStrike">
-                <a:solidFill>
-                  <a:srgbClr val="000000"/>
-                </a:solidFill>
-                <a:highlight>
+            <a:pPr indent="0" algn="ctr">
+              <a:buNone/>
+            </a:pPr>
+            <a:r>
+              <a:rPr b="0" lang="bs-BA" sz="3300" spc="-1" strike="noStrike">
+                <a:solidFill>
                   <a:srgbClr val="ffffff"/>
-                </a:highlight>
-                <a:latin typeface="Arial"/>
-              </a:rPr>
-              <a:t>Hvala na pozornosti!</a:t>
-            </a:r>
-            <a:endParaRPr b="0" lang="bs-BA" sz="3200" spc="-1" strike="noStrike">
-              <a:solidFill>
-                <a:srgbClr val="000000"/>
-              </a:solidFill>
-              <a:highlight>
+                </a:solidFill>
+                <a:latin typeface="Arial"/>
+              </a:rPr>
+              <a:t>Out in the wild...</a:t>
+            </a:r>
+            <a:endParaRPr b="0" lang="bs-BA" sz="3300" spc="-1" strike="noStrike">
+              <a:solidFill>
                 <a:srgbClr val="ffffff"/>
-              </a:highlight>
-              <a:latin typeface="Arial"/>
-            </a:endParaRPr>
-          </a:p>
-        </p:txBody>
-      </p:sp>
-      <p:sp>
-        <p:nvSpPr>
-          <p:cNvPr id="3" name="PlaceHolder 2"/>
+              </a:solidFill>
+              <a:latin typeface="Arial"/>
+            </a:endParaRPr>
+          </a:p>
+        </p:txBody>
+      </p:sp>
+      <p:sp>
+        <p:nvSpPr>
+          <p:cNvPr id="144" name="PlaceHolder 2"/>
+          <p:cNvSpPr>
+            <a:spLocks noGrp="1"/>
+          </p:cNvSpPr>
+          <p:nvPr>
+            <p:ph/>
+          </p:nvPr>
+        </p:nvSpPr>
+        <p:spPr>
+          <a:xfrm>
+            <a:off x="360000" y="1080000"/>
+            <a:ext cx="9360000" cy="3600000"/>
+          </a:xfrm>
+          <a:prstGeom prst="rect">
+            <a:avLst/>
+          </a:prstGeom>
+          <a:noFill/>
+          <a:ln w="0">
+            <a:noFill/>
+          </a:ln>
+        </p:spPr>
+        <p:txBody>
+          <a:bodyPr lIns="0" rIns="0" tIns="0" bIns="0" anchor="t">
+            <a:noAutofit/>
+          </a:bodyPr>
+          <a:p>
+            <a:pPr marL="432000" indent="-324000">
+              <a:spcBef>
+                <a:spcPts val="1060"/>
+              </a:spcBef>
+              <a:buClr>
+                <a:srgbClr val="77caee"/>
+              </a:buClr>
+              <a:buSzPct val="45000"/>
+              <a:buFont typeface="Wingdings" charset="2"/>
+              <a:buChar char=""/>
+            </a:pPr>
+            <a:r>
+              <a:rPr b="0" lang="bs-BA" sz="2400" spc="-1" strike="noStrike">
+                <a:solidFill>
+                  <a:srgbClr val="009bdd"/>
+                </a:solidFill>
+                <a:latin typeface="Arial"/>
+              </a:rPr>
+              <a:t>Moj se program koristi na fakultetu u Argentini za uvod u ugrađene sustave.</a:t>
+            </a:r>
+            <a:endParaRPr b="0" lang="bs-BA" sz="2400" spc="-1" strike="noStrike">
+              <a:solidFill>
+                <a:srgbClr val="009bdd"/>
+              </a:solidFill>
+              <a:latin typeface="Arial"/>
+            </a:endParaRPr>
+          </a:p>
+          <a:p>
+            <a:pPr marL="432000" indent="-324000">
+              <a:spcBef>
+                <a:spcPts val="1060"/>
+              </a:spcBef>
+              <a:buClr>
+                <a:srgbClr val="77caee"/>
+              </a:buClr>
+              <a:buSzPct val="45000"/>
+              <a:buFont typeface="Wingdings" charset="2"/>
+              <a:buChar char=""/>
+            </a:pPr>
+            <a:r>
+              <a:rPr b="0" lang="bs-BA" sz="2400" spc="-1" strike="noStrike">
+                <a:solidFill>
+                  <a:srgbClr val="009bdd"/>
+                </a:solidFill>
+                <a:latin typeface="Arial"/>
+              </a:rPr>
+              <a:t>Nedavno sam dobio kontributora s tog fakulteta koji se zove Agustin Izaguirre (</a:t>
+            </a:r>
+            <a:r>
+              <a:rPr b="0" i="1" lang="bs-BA" sz="2400" spc="-1" strike="noStrike">
+                <a:solidFill>
+                  <a:srgbClr val="009bdd"/>
+                </a:solidFill>
+                <a:latin typeface="Arial"/>
+              </a:rPr>
+              <a:t>agustiza</a:t>
+            </a:r>
+            <a:r>
+              <a:rPr b="0" lang="bs-BA" sz="2400" spc="-1" strike="noStrike">
+                <a:solidFill>
+                  <a:srgbClr val="009bdd"/>
+                </a:solidFill>
+                <a:latin typeface="Arial"/>
+              </a:rPr>
+              <a:t>). On je napravio nekoliko pull requestova na GitHubu, isprva sitni bug-fixi (prvo da se naredba SRA ponaša ispravno kad je </a:t>
+            </a:r>
+            <a:r>
+              <a:rPr b="0" i="1" lang="bs-BA" sz="2400" spc="-1" strike="noStrike">
+                <a:solidFill>
+                  <a:srgbClr val="009bdd"/>
+                </a:solidFill>
+                <a:latin typeface="Arial"/>
+              </a:rPr>
+              <a:t>carry flag</a:t>
+            </a:r>
+            <a:r>
+              <a:rPr b="0" lang="bs-BA" sz="2400" spc="-1" strike="noStrike">
+                <a:solidFill>
+                  <a:srgbClr val="009bdd"/>
+                </a:solidFill>
+                <a:latin typeface="Arial"/>
+              </a:rPr>
+              <a:t> postavljen u jedinicu), a onda i dodavanje novih featuresa kao što su JEST testovi.</a:t>
+            </a:r>
+            <a:endParaRPr b="0" lang="bs-BA" sz="2400" spc="-1" strike="noStrike">
+              <a:solidFill>
+                <a:srgbClr val="009bdd"/>
+              </a:solidFill>
+              <a:latin typeface="Arial"/>
+            </a:endParaRPr>
+          </a:p>
+        </p:txBody>
+      </p:sp>
+      <p:sp>
+        <p:nvSpPr>
+          <p:cNvPr id="4" name="PlaceHolder 3"/>
           <p:cNvSpPr>
             <a:spLocks noGrp="1"/>
           </p:cNvSpPr>
@@ -9016,7 +8925,7 @@
         <p:txBody>
           <a:bodyPr/>
           <a:p>
-            <a:fld id="{691291D8-A86D-40A2-871A-8062E5F2CC5B}" type="slidenum">
+            <a:fld id="{8F2ED7E0-91B1-449B-86B9-ADE3C428BFFA}" type="slidenum">
               <a:t>19</a:t>
             </a:fld>
           </a:p>
@@ -9024,7 +8933,7 @@
       </p:sp>
       <p:sp>
         <p:nvSpPr>
-          <p:cNvPr id="4" name="PlaceHolder 3"/>
+          <p:cNvPr id="5" name="PlaceHolder 4"/>
           <p:cNvSpPr>
             <a:spLocks noGrp="1"/>
           </p:cNvSpPr>
@@ -9036,9 +8945,9 @@
         <p:txBody>
           <a:bodyPr/>
           <a:p>
-            <a:fld id="{5232BD6C-96AA-46DC-8342-F02AF8A81671}" type="datetime1">
+            <a:fld id="{2D996B94-E5D2-463D-9622-E1C672A6221F}" type="datetime1">
               <a:rPr lang="en-US"/>
-              <a:t>10/06/2023</a:t>
+              <a:t>10/09/2023</a:t>
             </a:fld>
           </a:p>
         </p:txBody>
@@ -9330,7 +9239,7 @@
               <a:buChar char=""/>
             </a:pPr>
             <a:r>
-              <a:rPr b="0" lang="bs-BA" sz="1600" spc="-1" strike="noStrike">
+              <a:rPr b="1" lang="bs-BA" sz="1600" spc="-1" strike="noStrike">
                 <a:solidFill>
                   <a:srgbClr val="009bdd"/>
                 </a:solidFill>
@@ -9361,7 +9270,7 @@
         <p:txBody>
           <a:bodyPr/>
           <a:p>
-            <a:fld id="{786E4D34-6FDE-4810-8044-7EC87AFB8FEF}" type="slidenum">
+            <a:fld id="{C56F939A-75FE-4CE8-BA9A-05AE201BB100}" type="slidenum">
               <a:t>2</a:t>
             </a:fld>
           </a:p>
@@ -9381,9 +9290,506 @@
         <p:txBody>
           <a:bodyPr/>
           <a:p>
-            <a:fld id="{E4FA418C-FDD2-4916-B5C7-7BD411854EF1}" type="datetime1">
+            <a:fld id="{09926378-C672-43EC-B5BA-CA73E5331CAE}" type="datetime1">
               <a:rPr lang="en-US"/>
-              <a:t>10/06/2023</a:t>
+              <a:t>10/09/2023</a:t>
+            </a:fld>
+          </a:p>
+        </p:txBody>
+      </p:sp>
+    </p:spTree>
+  </p:cSld>
+  <mc:AlternateContent>
+    <mc:Choice Requires="p14">
+      <p:transition spd="slow" p14:dur="2000"/>
+    </mc:Choice>
+    <mc:Fallback>
+      <p:transition spd="slow"/>
+    </mc:Fallback>
+  </mc:AlternateContent>
+</p:sld>
+</file>
+
+<file path=ppt/slides/slide20.xml><?xml version="1.0" encoding="utf-8"?>
+<p:sld xmlns:a="http://schemas.openxmlformats.org/drawingml/2006/main" xmlns:p="http://schemas.openxmlformats.org/presentationml/2006/main" xmlns:r="http://schemas.openxmlformats.org/officeDocument/2006/relationships" xmlns:p14="http://schemas.microsoft.com/office/powerpoint/2010/main" xmlns:p15="http://schemas.microsoft.com/office/powerpoint/2012/main" xmlns:mc="http://schemas.openxmlformats.org/markup-compatibility/2006">
+  <p:cSld>
+    <p:spTree>
+      <p:nvGrpSpPr>
+        <p:cNvPr id="1" name=""/>
+        <p:cNvGrpSpPr/>
+        <p:nvPr/>
+      </p:nvGrpSpPr>
+      <p:grpSpPr>
+        <a:xfrm>
+          <a:off x="0" y="0"/>
+          <a:ext cx="0" cy="0"/>
+          <a:chOff x="0" y="0"/>
+          <a:chExt cx="0" cy="0"/>
+        </a:xfrm>
+      </p:grpSpPr>
+      <p:sp>
+        <p:nvSpPr>
+          <p:cNvPr id="145" name="PlaceHolder 1"/>
+          <p:cNvSpPr>
+            <a:spLocks noGrp="1"/>
+          </p:cNvSpPr>
+          <p:nvPr>
+            <p:ph type="title"/>
+          </p:nvPr>
+        </p:nvSpPr>
+        <p:spPr>
+          <a:xfrm>
+            <a:off x="360000" y="180000"/>
+            <a:ext cx="9360000" cy="478080"/>
+          </a:xfrm>
+          <a:prstGeom prst="rect">
+            <a:avLst/>
+          </a:prstGeom>
+          <a:noFill/>
+          <a:ln w="0">
+            <a:noFill/>
+          </a:ln>
+        </p:spPr>
+        <p:txBody>
+          <a:bodyPr lIns="0" rIns="0" tIns="0" bIns="0" anchor="ctr">
+            <a:noAutofit/>
+          </a:bodyPr>
+          <a:p>
+            <a:pPr indent="0" algn="ctr">
+              <a:buNone/>
+            </a:pPr>
+            <a:r>
+              <a:rPr b="0" lang="bs-BA" sz="3300" spc="-1" strike="noStrike">
+                <a:solidFill>
+                  <a:srgbClr val="ffffff"/>
+                </a:solidFill>
+                <a:latin typeface="Arial"/>
+              </a:rPr>
+              <a:t>Kompatibilnost s browserima</a:t>
+            </a:r>
+            <a:endParaRPr b="0" lang="bs-BA" sz="3300" spc="-1" strike="noStrike">
+              <a:solidFill>
+                <a:srgbClr val="ffffff"/>
+              </a:solidFill>
+              <a:latin typeface="Arial"/>
+            </a:endParaRPr>
+          </a:p>
+        </p:txBody>
+      </p:sp>
+      <p:sp>
+        <p:nvSpPr>
+          <p:cNvPr id="146" name="PlaceHolder 2"/>
+          <p:cNvSpPr>
+            <a:spLocks noGrp="1"/>
+          </p:cNvSpPr>
+          <p:nvPr>
+            <p:ph/>
+          </p:nvPr>
+        </p:nvSpPr>
+        <p:spPr>
+          <a:xfrm>
+            <a:off x="360000" y="1080000"/>
+            <a:ext cx="9360000" cy="3600000"/>
+          </a:xfrm>
+          <a:prstGeom prst="rect">
+            <a:avLst/>
+          </a:prstGeom>
+          <a:noFill/>
+          <a:ln w="0">
+            <a:noFill/>
+          </a:ln>
+        </p:spPr>
+        <p:txBody>
+          <a:bodyPr lIns="0" rIns="0" tIns="0" bIns="0" anchor="t">
+            <a:noAutofit/>
+          </a:bodyPr>
+          <a:p>
+            <a:pPr marL="432000" indent="-324000">
+              <a:spcBef>
+                <a:spcPts val="1060"/>
+              </a:spcBef>
+              <a:buClr>
+                <a:srgbClr val="77caee"/>
+              </a:buClr>
+              <a:buSzPct val="45000"/>
+              <a:buFont typeface="Wingdings" charset="2"/>
+              <a:buChar char=""/>
+            </a:pPr>
+            <a:r>
+              <a:rPr b="0" lang="bs-BA" sz="2000" spc="-1" strike="noStrike">
+                <a:solidFill>
+                  <a:srgbClr val="009bdd"/>
+                </a:solidFill>
+                <a:latin typeface="Arial"/>
+              </a:rPr>
+              <a:t>Ciljao sam na Firefox 52.9 ESR.</a:t>
+            </a:r>
+            <a:endParaRPr b="0" lang="bs-BA" sz="2000" spc="-1" strike="noStrike">
+              <a:solidFill>
+                <a:srgbClr val="009bdd"/>
+              </a:solidFill>
+              <a:latin typeface="Arial"/>
+            </a:endParaRPr>
+          </a:p>
+          <a:p>
+            <a:pPr lvl="1" marL="864000" indent="-324000">
+              <a:spcBef>
+                <a:spcPts val="850"/>
+              </a:spcBef>
+              <a:buClr>
+                <a:srgbClr val="77caee"/>
+              </a:buClr>
+              <a:buSzPct val="45000"/>
+              <a:buFont typeface="Wingdings" charset="2"/>
+              <a:buChar char=""/>
+            </a:pPr>
+            <a:r>
+              <a:rPr b="0" lang="bs-BA" sz="2000" spc="-1" strike="noStrike">
+                <a:solidFill>
+                  <a:srgbClr val="009bdd"/>
+                </a:solidFill>
+                <a:latin typeface="Arial"/>
+              </a:rPr>
+              <a:t>To je posljednja verzija Firefoxa koja se može vrtjeti na Windows XP-u i Windows Visti, te također verzija Firefoxa koja se dobije uz Solaris 11.4.</a:t>
+            </a:r>
+            <a:endParaRPr b="0" lang="bs-BA" sz="2000" spc="-1" strike="noStrike">
+              <a:solidFill>
+                <a:srgbClr val="009bdd"/>
+              </a:solidFill>
+              <a:latin typeface="Arial"/>
+            </a:endParaRPr>
+          </a:p>
+          <a:p>
+            <a:pPr marL="432000" indent="-324000">
+              <a:spcBef>
+                <a:spcPts val="1060"/>
+              </a:spcBef>
+              <a:buClr>
+                <a:srgbClr val="77caee"/>
+              </a:buClr>
+              <a:buSzPct val="45000"/>
+              <a:buFont typeface="Wingdings" charset="2"/>
+              <a:buChar char=""/>
+            </a:pPr>
+            <a:r>
+              <a:rPr b="0" lang="bs-BA" sz="2000" spc="-1" strike="noStrike">
+                <a:solidFill>
+                  <a:srgbClr val="009bdd"/>
+                </a:solidFill>
+                <a:latin typeface="Arial"/>
+              </a:rPr>
+              <a:t>Moderni Chrome</a:t>
+            </a:r>
+            <a:endParaRPr b="0" lang="bs-BA" sz="2000" spc="-1" strike="noStrike">
+              <a:solidFill>
+                <a:srgbClr val="009bdd"/>
+              </a:solidFill>
+              <a:latin typeface="Arial"/>
+            </a:endParaRPr>
+          </a:p>
+          <a:p>
+            <a:pPr lvl="1" marL="864000" indent="-324000">
+              <a:spcBef>
+                <a:spcPts val="850"/>
+              </a:spcBef>
+              <a:buClr>
+                <a:srgbClr val="77caee"/>
+              </a:buClr>
+              <a:buSzPct val="45000"/>
+              <a:buFont typeface="Wingdings" charset="2"/>
+              <a:buChar char=""/>
+            </a:pPr>
+            <a:r>
+              <a:rPr b="0" lang="bs-BA" sz="2000" spc="-1" strike="noStrike">
+                <a:solidFill>
+                  <a:srgbClr val="009bdd"/>
+                </a:solidFill>
+                <a:latin typeface="Arial"/>
+              </a:rPr>
+              <a:t>Za to da radi u Chromeu, morao sam izmijeniti CSS (jer tooltipsi na “Play/Pause”, “Fast Forward”, “Single Step” i “Stop” nisu bili radili).</a:t>
+            </a:r>
+            <a:endParaRPr b="0" lang="bs-BA" sz="2000" spc="-1" strike="noStrike">
+              <a:solidFill>
+                <a:srgbClr val="009bdd"/>
+              </a:solidFill>
+              <a:latin typeface="Arial"/>
+            </a:endParaRPr>
+          </a:p>
+          <a:p>
+            <a:pPr marL="432000" indent="-324000">
+              <a:spcBef>
+                <a:spcPts val="1060"/>
+              </a:spcBef>
+              <a:buClr>
+                <a:srgbClr val="77caee"/>
+              </a:buClr>
+              <a:buSzPct val="45000"/>
+              <a:buFont typeface="Wingdings" charset="2"/>
+              <a:buChar char=""/>
+            </a:pPr>
+            <a:r>
+              <a:rPr b="0" lang="bs-BA" sz="2000" spc="-1" strike="noStrike">
+                <a:solidFill>
+                  <a:srgbClr val="009bdd"/>
+                </a:solidFill>
+                <a:latin typeface="Arial"/>
+              </a:rPr>
+              <a:t>WebPositive (bliski srodnik Safariju)</a:t>
+            </a:r>
+            <a:endParaRPr b="0" lang="bs-BA" sz="2000" spc="-1" strike="noStrike">
+              <a:solidFill>
+                <a:srgbClr val="009bdd"/>
+              </a:solidFill>
+              <a:latin typeface="Arial"/>
+            </a:endParaRPr>
+          </a:p>
+          <a:p>
+            <a:pPr lvl="1" marL="864000" indent="-324000">
+              <a:spcBef>
+                <a:spcPts val="850"/>
+              </a:spcBef>
+              <a:buClr>
+                <a:srgbClr val="77caee"/>
+              </a:buClr>
+              <a:buSzPct val="45000"/>
+              <a:buFont typeface="Wingdings" charset="2"/>
+              <a:buChar char=""/>
+            </a:pPr>
+            <a:r>
+              <a:rPr b="0" lang="bs-BA" sz="2000" spc="-1" strike="noStrike">
+                <a:solidFill>
+                  <a:srgbClr val="009bdd"/>
+                </a:solidFill>
+                <a:latin typeface="Arial"/>
+              </a:rPr>
+              <a:t>Za to da radi u WebPositiveu, morao sam izmijeniti i CSS i JavaScript.</a:t>
+            </a:r>
+            <a:endParaRPr b="0" lang="bs-BA" sz="2000" spc="-1" strike="noStrike">
+              <a:solidFill>
+                <a:srgbClr val="009bdd"/>
+              </a:solidFill>
+              <a:latin typeface="Arial"/>
+            </a:endParaRPr>
+          </a:p>
+          <a:p>
+            <a:pPr lvl="1" marL="864000" indent="-324000">
+              <a:spcBef>
+                <a:spcPts val="850"/>
+              </a:spcBef>
+              <a:buClr>
+                <a:srgbClr val="77caee"/>
+              </a:buClr>
+              <a:buSzPct val="45000"/>
+              <a:buFont typeface="Wingdings" charset="2"/>
+              <a:buChar char=""/>
+            </a:pPr>
+            <a:r>
+              <a:rPr b="0" lang="bs-BA" sz="2000" spc="-1" strike="noStrike">
+                <a:solidFill>
+                  <a:srgbClr val="009bdd"/>
+                </a:solidFill>
+                <a:latin typeface="Arial"/>
+              </a:rPr>
+              <a:t>Nisam uspio napraviti da “Download Hexadecimal” radi u WebPositiveu.</a:t>
+            </a:r>
+            <a:endParaRPr b="0" lang="bs-BA" sz="2000" spc="-1" strike="noStrike">
+              <a:solidFill>
+                <a:srgbClr val="009bdd"/>
+              </a:solidFill>
+              <a:latin typeface="Arial"/>
+            </a:endParaRPr>
+          </a:p>
+          <a:p>
+            <a:pPr marL="432000" indent="-324000">
+              <a:spcBef>
+                <a:spcPts val="1060"/>
+              </a:spcBef>
+              <a:buClr>
+                <a:srgbClr val="77caee"/>
+              </a:buClr>
+              <a:buSzPct val="45000"/>
+              <a:buFont typeface="Wingdings" charset="2"/>
+              <a:buChar char=""/>
+            </a:pPr>
+            <a:r>
+              <a:rPr b="0" lang="bs-BA" sz="2000" spc="-1" strike="noStrike">
+                <a:solidFill>
+                  <a:srgbClr val="009bdd"/>
+                </a:solidFill>
+                <a:latin typeface="Arial"/>
+              </a:rPr>
+              <a:t>Darko Nikolić tvrdi da je isprobao moj program na Macu u Safariju i u Operi i da funkcionira tamo.</a:t>
+            </a:r>
+            <a:endParaRPr b="0" lang="bs-BA" sz="2000" spc="-1" strike="noStrike">
+              <a:solidFill>
+                <a:srgbClr val="009bdd"/>
+              </a:solidFill>
+              <a:latin typeface="Arial"/>
+            </a:endParaRPr>
+          </a:p>
+        </p:txBody>
+      </p:sp>
+      <p:sp>
+        <p:nvSpPr>
+          <p:cNvPr id="4" name="PlaceHolder 3"/>
+          <p:cNvSpPr>
+            <a:spLocks noGrp="1"/>
+          </p:cNvSpPr>
+          <p:nvPr>
+            <p:ph type="sldNum" idx="6"/>
+          </p:nvPr>
+        </p:nvSpPr>
+        <p:spPr/>
+        <p:txBody>
+          <a:bodyPr/>
+          <a:p>
+            <a:fld id="{8F0D95C8-94FB-4C72-B7F3-822129F3C69A}" type="slidenum">
+              <a:t>20</a:t>
+            </a:fld>
+          </a:p>
+        </p:txBody>
+      </p:sp>
+      <p:sp>
+        <p:nvSpPr>
+          <p:cNvPr id="5" name="PlaceHolder 4"/>
+          <p:cNvSpPr>
+            <a:spLocks noGrp="1"/>
+          </p:cNvSpPr>
+          <p:nvPr>
+            <p:ph type="dt" idx="4"/>
+          </p:nvPr>
+        </p:nvSpPr>
+        <p:spPr/>
+        <p:txBody>
+          <a:bodyPr/>
+          <a:p>
+            <a:fld id="{B69CCE23-232D-41BA-9036-3119AEA62702}" type="datetime1">
+              <a:rPr lang="en-US"/>
+              <a:t>10/09/2023</a:t>
+            </a:fld>
+          </a:p>
+        </p:txBody>
+      </p:sp>
+    </p:spTree>
+  </p:cSld>
+  <mc:AlternateContent>
+    <mc:Choice Requires="p14">
+      <p:transition spd="slow" p14:dur="2000"/>
+    </mc:Choice>
+    <mc:Fallback>
+      <p:transition spd="slow"/>
+    </mc:Fallback>
+  </mc:AlternateContent>
+</p:sld>
+</file>
+
+<file path=ppt/slides/slide21.xml><?xml version="1.0" encoding="utf-8"?>
+<p:sld xmlns:a="http://schemas.openxmlformats.org/drawingml/2006/main" xmlns:p="http://schemas.openxmlformats.org/presentationml/2006/main" xmlns:r="http://schemas.openxmlformats.org/officeDocument/2006/relationships" xmlns:p14="http://schemas.microsoft.com/office/powerpoint/2010/main" xmlns:p15="http://schemas.microsoft.com/office/powerpoint/2012/main" xmlns:mc="http://schemas.openxmlformats.org/markup-compatibility/2006">
+  <p:cSld>
+    <p:spTree>
+      <p:nvGrpSpPr>
+        <p:cNvPr id="1" name=""/>
+        <p:cNvGrpSpPr/>
+        <p:nvPr/>
+      </p:nvGrpSpPr>
+      <p:grpSpPr>
+        <a:xfrm>
+          <a:off x="0" y="0"/>
+          <a:ext cx="0" cy="0"/>
+          <a:chOff x="0" y="0"/>
+          <a:chExt cx="0" cy="0"/>
+        </a:xfrm>
+      </p:grpSpPr>
+      <p:sp>
+        <p:nvSpPr>
+          <p:cNvPr id="147" name="PlaceHolder 1"/>
+          <p:cNvSpPr>
+            <a:spLocks noGrp="1"/>
+          </p:cNvSpPr>
+          <p:nvPr>
+            <p:ph type="subTitle"/>
+          </p:nvPr>
+        </p:nvSpPr>
+        <p:spPr>
+          <a:xfrm>
+            <a:off x="360000" y="180000"/>
+            <a:ext cx="9360000" cy="2217240"/>
+          </a:xfrm>
+          <a:prstGeom prst="rect">
+            <a:avLst/>
+          </a:prstGeom>
+          <a:noFill/>
+          <a:ln w="0">
+            <a:noFill/>
+          </a:ln>
+        </p:spPr>
+        <p:txBody>
+          <a:bodyPr lIns="0" rIns="0" tIns="0" bIns="0" anchor="ctr">
+            <a:noAutofit/>
+          </a:bodyPr>
+          <a:p>
+            <a:pPr algn="ctr"/>
+            <a:r>
+              <a:rPr b="0" lang="bs-BA" sz="3200" spc="-1" strike="noStrike">
+                <a:solidFill>
+                  <a:srgbClr val="000000"/>
+                </a:solidFill>
+                <a:highlight>
+                  <a:srgbClr val="ffffff"/>
+                </a:highlight>
+                <a:latin typeface="Arial"/>
+              </a:rPr>
+              <a:t>Hvala na pozornosti!</a:t>
+            </a:r>
+            <a:endParaRPr b="0" lang="bs-BA" sz="3200" spc="-1" strike="noStrike">
+              <a:solidFill>
+                <a:srgbClr val="000000"/>
+              </a:solidFill>
+              <a:highlight>
+                <a:srgbClr val="ffffff"/>
+              </a:highlight>
+              <a:latin typeface="Arial"/>
+            </a:endParaRPr>
+          </a:p>
+        </p:txBody>
+      </p:sp>
+      <p:sp>
+        <p:nvSpPr>
+          <p:cNvPr id="3" name="PlaceHolder 2"/>
+          <p:cNvSpPr>
+            <a:spLocks noGrp="1"/>
+          </p:cNvSpPr>
+          <p:nvPr>
+            <p:ph type="sldNum" idx="6"/>
+          </p:nvPr>
+        </p:nvSpPr>
+        <p:spPr/>
+        <p:txBody>
+          <a:bodyPr/>
+          <a:p>
+            <a:fld id="{D6461293-442F-43EC-B9C9-B9CB79DD5646}" type="slidenum">
+              <a:t>21</a:t>
+            </a:fld>
+          </a:p>
+        </p:txBody>
+      </p:sp>
+      <p:sp>
+        <p:nvSpPr>
+          <p:cNvPr id="4" name="PlaceHolder 3"/>
+          <p:cNvSpPr>
+            <a:spLocks noGrp="1"/>
+          </p:cNvSpPr>
+          <p:nvPr>
+            <p:ph type="dt" idx="4"/>
+          </p:nvPr>
+        </p:nvSpPr>
+        <p:spPr/>
+        <p:txBody>
+          <a:bodyPr/>
+          <a:p>
+            <a:fld id="{D4343255-193D-46E2-9F6D-9B30B8A9ED49}" type="datetime1">
+              <a:rPr lang="en-US"/>
+              <a:t>10/09/2023</a:t>
             </a:fld>
           </a:p>
         </p:txBody>
@@ -9638,7 +10044,7 @@
         <p:txBody>
           <a:bodyPr/>
           <a:p>
-            <a:fld id="{96433461-12D9-4667-90C3-DFAB52FCE8C2}" type="slidenum">
+            <a:fld id="{0D45D030-2F0B-4CB6-B57E-10B7EFA1B92E}" type="slidenum">
               <a:t>3</a:t>
             </a:fld>
           </a:p>
@@ -9658,9 +10064,9 @@
         <p:txBody>
           <a:bodyPr/>
           <a:p>
-            <a:fld id="{F882ABBF-6094-40C5-95E0-466CF922A3CF}" type="datetime1">
+            <a:fld id="{2513C771-73A6-44A9-A0DF-B11D51427072}" type="datetime1">
               <a:rPr lang="en-US"/>
-              <a:t>10/06/2023</a:t>
+              <a:t>10/09/2023</a:t>
             </a:fld>
           </a:p>
         </p:txBody>
@@ -9889,7 +10295,7 @@
         <p:txBody>
           <a:bodyPr/>
           <a:p>
-            <a:fld id="{3C389FEB-25AF-4603-BA3F-613791DE51E0}" type="slidenum">
+            <a:fld id="{A31695E4-1F78-45DF-9B7C-A69602B80CE6}" type="slidenum">
               <a:t>4</a:t>
             </a:fld>
           </a:p>
@@ -9909,9 +10315,9 @@
         <p:txBody>
           <a:bodyPr/>
           <a:p>
-            <a:fld id="{6C766097-69F5-488A-98A1-2EE67DC30A2B}" type="datetime1">
+            <a:fld id="{49AC8D3D-D5B3-4EAE-BEB9-6A1D21548142}" type="datetime1">
               <a:rPr lang="en-US"/>
-              <a:t>10/06/2023</a:t>
+              <a:t>10/09/2023</a:t>
             </a:fld>
           </a:p>
         </p:txBody>
@@ -10154,7 +10560,7 @@
         <p:txBody>
           <a:bodyPr/>
           <a:p>
-            <a:fld id="{CBEBA096-AF3A-4307-A3C4-AF56751128BE}" type="slidenum">
+            <a:fld id="{C0D30B57-9B54-4166-ADC5-BC65300F1C63}" type="slidenum">
               <a:t>5</a:t>
             </a:fld>
           </a:p>
@@ -10174,9 +10580,9 @@
         <p:txBody>
           <a:bodyPr/>
           <a:p>
-            <a:fld id="{2B98097C-0E98-4755-AB78-A1B70A8428F8}" type="datetime1">
+            <a:fld id="{590F801B-B1F4-408F-846F-5926355A35EC}" type="datetime1">
               <a:rPr lang="en-US"/>
-              <a:t>10/06/2023</a:t>
+              <a:t>10/09/2023</a:t>
             </a:fld>
           </a:p>
         </p:txBody>
@@ -10518,7 +10924,7 @@
         <p:txBody>
           <a:bodyPr/>
           <a:p>
-            <a:fld id="{BBDCE3F0-E881-4C70-8983-3D22BA19F4FD}" type="slidenum">
+            <a:fld id="{9BBC3D06-0BD8-4D07-9506-B523D126A44C}" type="slidenum">
               <a:t>6</a:t>
             </a:fld>
           </a:p>
@@ -10538,9 +10944,9 @@
         <p:txBody>
           <a:bodyPr/>
           <a:p>
-            <a:fld id="{2D33CF65-3FA2-4BAB-ADD1-7857B9B6F16C}" type="datetime1">
+            <a:fld id="{091DE798-B8DB-448D-B82B-0BDE93AB75CA}" type="datetime1">
               <a:rPr lang="en-US"/>
-              <a:t>10/06/2023</a:t>
+              <a:t>10/09/2023</a:t>
             </a:fld>
           </a:p>
         </p:txBody>
@@ -10783,7 +11189,7 @@
         <p:txBody>
           <a:bodyPr/>
           <a:p>
-            <a:fld id="{5282826D-E43D-4A5E-A9D8-B252DE19BD5A}" type="slidenum">
+            <a:fld id="{BB011921-C636-4C7B-9D31-705E51146268}" type="slidenum">
               <a:t>7</a:t>
             </a:fld>
           </a:p>
@@ -10803,9 +11209,9 @@
         <p:txBody>
           <a:bodyPr/>
           <a:p>
-            <a:fld id="{DB74380B-ED2D-4A21-AFA7-75D87C8A9A2B}" type="datetime1">
+            <a:fld id="{CBE0962B-4B2E-43B4-BF8D-FD3EA871337D}" type="datetime1">
               <a:rPr lang="en-US"/>
-              <a:t>10/06/2023</a:t>
+              <a:t>10/09/2023</a:t>
             </a:fld>
           </a:p>
         </p:txBody>
@@ -11025,7 +11431,7 @@
         <p:txBody>
           <a:bodyPr/>
           <a:p>
-            <a:fld id="{9FD35C5E-3C3C-48E8-8459-0F1788DCC41C}" type="slidenum">
+            <a:fld id="{DB81F284-4CEA-4067-8B37-51CA5612A1DF}" type="slidenum">
               <a:t>8</a:t>
             </a:fld>
           </a:p>
@@ -11045,9 +11451,9 @@
         <p:txBody>
           <a:bodyPr/>
           <a:p>
-            <a:fld id="{8B9F0E16-CC59-4420-B224-CB649D523BA3}" type="datetime1">
+            <a:fld id="{BC65E804-8467-40D3-9EDD-E5A297B1A0F9}" type="datetime1">
               <a:rPr lang="en-US"/>
-              <a:t>10/06/2023</a:t>
+              <a:t>10/09/2023</a:t>
             </a:fld>
           </a:p>
         </p:txBody>
@@ -11225,7 +11631,7 @@
         <p:txBody>
           <a:bodyPr/>
           <a:p>
-            <a:fld id="{4FDF2F0E-CBAC-400A-B22A-C2BF810F8E45}" type="slidenum">
+            <a:fld id="{54DBB792-43A5-4BCB-844C-49FE0A2B7E59}" type="slidenum">
               <a:t>9</a:t>
             </a:fld>
           </a:p>
@@ -11245,9 +11651,9 @@
         <p:txBody>
           <a:bodyPr/>
           <a:p>
-            <a:fld id="{6CE09DEB-750B-4FDD-A36F-96F41E397AD5}" type="datetime1">
+            <a:fld id="{A4317B92-3F4C-4D34-BF9D-3D8013CBD566}" type="datetime1">
               <a:rPr lang="en-US"/>
-              <a:t>10/06/2023</a:t>
+              <a:t>10/09/2023</a:t>
             </a:fld>
           </a:p>
         </p:txBody>

</xml_diff>

<commit_message>
Noted in the presentation that `v3.1.4` automatically disables debug
</commit_message>
<xml_diff>
--- a/seminar/PicoBlaze.pptx
+++ b/seminar/PicoBlaze.pptx
@@ -84,7 +84,7 @@
         <p:txBody>
           <a:bodyPr/>
           <a:p>
-            <a:fld id="{B9DC3B0F-D73C-487A-9E75-700446DBF5C2}" type="slidenum">
+            <a:fld id="{34ED42B4-8ABA-4B36-9E4E-3B6512159B20}" type="slidenum">
               <a:t>&lt;#&gt;</a:t>
             </a:fld>
           </a:p>
@@ -293,7 +293,7 @@
         <p:txBody>
           <a:bodyPr/>
           <a:p>
-            <a:fld id="{98BBF01B-C132-458D-BE69-317D283CC171}" type="slidenum">
+            <a:fld id="{692D707F-5D36-49E5-B88D-C8FA891F6171}" type="slidenum">
               <a:t>&lt;#&gt;</a:t>
             </a:fld>
           </a:p>
@@ -588,7 +588,7 @@
         <p:txBody>
           <a:bodyPr/>
           <a:p>
-            <a:fld id="{D82E63F8-5AF0-4871-B2DA-F1CA56439458}" type="slidenum">
+            <a:fld id="{2F9DE568-B076-4F19-AE46-0D9487FD2CB4}" type="slidenum">
               <a:t>&lt;#&gt;</a:t>
             </a:fld>
           </a:p>
@@ -969,7 +969,7 @@
         <p:txBody>
           <a:bodyPr/>
           <a:p>
-            <a:fld id="{4B462424-B9E4-4635-A57E-4A8395386AA4}" type="slidenum">
+            <a:fld id="{82BDA7E0-F916-416F-9605-1573E0E351C8}" type="slidenum">
               <a:t>&lt;#&gt;</a:t>
             </a:fld>
           </a:p>
@@ -1052,7 +1052,7 @@
         <p:txBody>
           <a:bodyPr/>
           <a:p>
-            <a:fld id="{C2CE9819-D819-4504-A21A-3F8BAD031B99}" type="slidenum">
+            <a:fld id="{1DCE9CF3-3D70-47FA-8D4E-E51DDAADD762}" type="slidenum">
               <a:t>&lt;#&gt;</a:t>
             </a:fld>
           </a:p>
@@ -1218,7 +1218,7 @@
         <p:txBody>
           <a:bodyPr/>
           <a:p>
-            <a:fld id="{0B3F543A-CCB6-42C7-8C86-4F7AE2E92179}" type="slidenum">
+            <a:fld id="{DC1F1A13-A731-45FB-963D-D028EB80F8FD}" type="slidenum">
               <a:t>&lt;#&gt;</a:t>
             </a:fld>
           </a:p>
@@ -1384,7 +1384,7 @@
         <p:txBody>
           <a:bodyPr/>
           <a:p>
-            <a:fld id="{313312DB-8205-49CD-A79F-6D17C37B6D6A}" type="slidenum">
+            <a:fld id="{0E00C809-7819-4F04-9891-7C29D96D2E05}" type="slidenum">
               <a:t>&lt;#&gt;</a:t>
             </a:fld>
           </a:p>
@@ -1593,7 +1593,7 @@
         <p:txBody>
           <a:bodyPr/>
           <a:p>
-            <a:fld id="{C4778844-5358-4AA4-89F3-464E3885C73A}" type="slidenum">
+            <a:fld id="{2B398DD0-38A8-4F74-AC94-DF06464BBDC3}" type="slidenum">
               <a:t>&lt;#&gt;</a:t>
             </a:fld>
           </a:p>
@@ -1716,7 +1716,7 @@
         <p:txBody>
           <a:bodyPr/>
           <a:p>
-            <a:fld id="{CCC3F1BF-51CE-4AF1-860C-46C256D80FE0}" type="slidenum">
+            <a:fld id="{56F27452-12D3-4933-A348-BE3260DDF87D}" type="slidenum">
               <a:t>&lt;#&gt;</a:t>
             </a:fld>
           </a:p>
@@ -1840,7 +1840,7 @@
         <p:txBody>
           <a:bodyPr/>
           <a:p>
-            <a:fld id="{8B0B4496-22B4-450A-9FAE-1CBA76ADEAC7}" type="slidenum">
+            <a:fld id="{8CEB29D2-0D64-4094-8290-04C68A50EA5B}" type="slidenum">
               <a:t>&lt;#&gt;</a:t>
             </a:fld>
           </a:p>
@@ -2092,7 +2092,7 @@
         <p:txBody>
           <a:bodyPr/>
           <a:p>
-            <a:fld id="{6805B874-E79F-4B4C-AFC3-66DB2115AEFE}" type="slidenum">
+            <a:fld id="{9E6466EC-5379-4FA2-BF45-1886F5CF38A8}" type="slidenum">
               <a:t>&lt;#&gt;</a:t>
             </a:fld>
           </a:p>
@@ -2258,7 +2258,7 @@
         <p:txBody>
           <a:bodyPr/>
           <a:p>
-            <a:fld id="{D0EC5574-7375-49C1-A915-16F01C10A3E8}" type="slidenum">
+            <a:fld id="{1119D9B4-608D-418B-A53E-F95C1B0F3772}" type="slidenum">
               <a:t>&lt;#&gt;</a:t>
             </a:fld>
           </a:p>
@@ -2510,7 +2510,7 @@
         <p:txBody>
           <a:bodyPr/>
           <a:p>
-            <a:fld id="{ABB8764D-228F-4EBE-A22E-1D799A9070A4}" type="slidenum">
+            <a:fld id="{CAC78B37-9ACD-4752-A7A8-210326B4D46C}" type="slidenum">
               <a:t>&lt;#&gt;</a:t>
             </a:fld>
           </a:p>
@@ -2762,7 +2762,7 @@
         <p:txBody>
           <a:bodyPr/>
           <a:p>
-            <a:fld id="{D04E50B6-8916-4636-8389-DCF230C1017A}" type="slidenum">
+            <a:fld id="{01D0C090-A3D4-4341-A8D4-2207DDC98040}" type="slidenum">
               <a:t>&lt;#&gt;</a:t>
             </a:fld>
           </a:p>
@@ -2971,7 +2971,7 @@
         <p:txBody>
           <a:bodyPr/>
           <a:p>
-            <a:fld id="{E1B805FA-5F80-49D3-83B8-0B6631475584}" type="slidenum">
+            <a:fld id="{78D51719-3DE0-4C05-A33C-BBB1437F9424}" type="slidenum">
               <a:t>&lt;#&gt;</a:t>
             </a:fld>
           </a:p>
@@ -3266,7 +3266,7 @@
         <p:txBody>
           <a:bodyPr/>
           <a:p>
-            <a:fld id="{71DEF1AF-DAFB-4598-BEE8-7D36F20CB182}" type="slidenum">
+            <a:fld id="{9EE2C065-1D9D-4A36-8AA6-DCDCAAF7A193}" type="slidenum">
               <a:t>&lt;#&gt;</a:t>
             </a:fld>
           </a:p>
@@ -3647,7 +3647,7 @@
         <p:txBody>
           <a:bodyPr/>
           <a:p>
-            <a:fld id="{4FFA2416-8394-4ADA-B66E-F6A79BF5A7AC}" type="slidenum">
+            <a:fld id="{88AE8BAB-BAE1-44AE-99B2-C2B213818AF1}" type="slidenum">
               <a:t>&lt;#&gt;</a:t>
             </a:fld>
           </a:p>
@@ -3813,7 +3813,7 @@
         <p:txBody>
           <a:bodyPr/>
           <a:p>
-            <a:fld id="{44D7429B-E18D-480E-975D-9185572F6E8B}" type="slidenum">
+            <a:fld id="{2DDE2D41-371F-4DF6-84FD-E13423592E31}" type="slidenum">
               <a:t>&lt;#&gt;</a:t>
             </a:fld>
           </a:p>
@@ -4022,7 +4022,7 @@
         <p:txBody>
           <a:bodyPr/>
           <a:p>
-            <a:fld id="{98CBC4B9-4B68-40F9-998D-895EA680AF64}" type="slidenum">
+            <a:fld id="{6D59861B-185C-4DF6-BC91-81B3500528C8}" type="slidenum">
               <a:t>&lt;#&gt;</a:t>
             </a:fld>
           </a:p>
@@ -4145,7 +4145,7 @@
         <p:txBody>
           <a:bodyPr/>
           <a:p>
-            <a:fld id="{109FABF2-0585-4712-9F96-B00018A82699}" type="slidenum">
+            <a:fld id="{A882E379-7CF4-4B2C-9F54-A001DA7D9580}" type="slidenum">
               <a:t>&lt;#&gt;</a:t>
             </a:fld>
           </a:p>
@@ -4269,7 +4269,7 @@
         <p:txBody>
           <a:bodyPr/>
           <a:p>
-            <a:fld id="{F2814642-84A9-427F-8F92-7248402EBB0A}" type="slidenum">
+            <a:fld id="{8469E09C-E7EE-42B9-BE9B-CCA3F0ED7C3E}" type="slidenum">
               <a:t>&lt;#&gt;</a:t>
             </a:fld>
           </a:p>
@@ -4521,7 +4521,7 @@
         <p:txBody>
           <a:bodyPr/>
           <a:p>
-            <a:fld id="{FBE30C94-233F-4DCB-8459-6B500893FCC8}" type="slidenum">
+            <a:fld id="{2360E738-3873-4EB0-B8C1-753B199700DD}" type="slidenum">
               <a:t>&lt;#&gt;</a:t>
             </a:fld>
           </a:p>
@@ -4773,7 +4773,7 @@
         <p:txBody>
           <a:bodyPr/>
           <a:p>
-            <a:fld id="{E6442C73-7BD9-47E9-B850-F75F4B08803A}" type="slidenum">
+            <a:fld id="{DEBD8448-DC56-40AF-9CD3-D065E8F3089C}" type="slidenum">
               <a:t>&lt;#&gt;</a:t>
             </a:fld>
           </a:p>
@@ -5025,7 +5025,7 @@
         <p:txBody>
           <a:bodyPr/>
           <a:p>
-            <a:fld id="{3BC31858-0C02-4DF4-8C5C-6F3DA82044C1}" type="slidenum">
+            <a:fld id="{A44AE9D4-0CB2-4B36-97FA-834B58795B0B}" type="slidenum">
               <a:t>&lt;#&gt;</a:t>
             </a:fld>
           </a:p>
@@ -5564,7 +5564,7 @@
             <a:pPr indent="0" algn="r">
               <a:buNone/>
             </a:pPr>
-            <a:fld id="{6BBC24FC-1CC4-41F6-B73C-81A7FFD9700B}" type="slidenum">
+            <a:fld id="{4E5AA434-2343-4C1E-953A-4E14E2CCC92A}" type="slidenum">
               <a:rPr b="0" lang="bs-BA" sz="1400" spc="-1" strike="noStrike">
                 <a:solidFill>
                   <a:srgbClr val="ffffff"/>
@@ -6163,7 +6163,7 @@
             <a:pPr indent="0" algn="r">
               <a:buNone/>
             </a:pPr>
-            <a:fld id="{44D798EA-558E-4E47-9E6A-9A78891A67E2}" type="slidenum">
+            <a:fld id="{C59B3C63-9038-4092-A35B-0511D6152B0E}" type="slidenum">
               <a:rPr b="0" lang="bs-BA" sz="1400" spc="-1" strike="noStrike">
                 <a:solidFill>
                   <a:srgbClr val="ffffff"/>
@@ -6625,7 +6625,7 @@
         <p:txBody>
           <a:bodyPr/>
           <a:p>
-            <a:fld id="{C8897233-534E-47D9-BDEA-AD75C3FD0632}" type="slidenum">
+            <a:fld id="{801AE847-E188-408B-9FF7-70B16C5583A7}" type="slidenum">
               <a:t>10</a:t>
             </a:fld>
           </a:p>
@@ -6645,9 +6645,9 @@
         <p:txBody>
           <a:bodyPr/>
           <a:p>
-            <a:fld id="{B2E747F7-E400-403D-9338-56F519CF6B70}" type="datetime1">
+            <a:fld id="{F57A026D-7B7D-406E-B90C-A645A8713FB3}" type="datetime1">
               <a:rPr lang="en-US"/>
-              <a:t>10/09/2023</a:t>
+              <a:t>11/10/2023</a:t>
             </a:fld>
           </a:p>
         </p:txBody>
@@ -6913,7 +6913,7 @@
         <p:txBody>
           <a:bodyPr/>
           <a:p>
-            <a:fld id="{DD6A0835-8C5B-444B-9C99-224F7E13CBE7}" type="slidenum">
+            <a:fld id="{5081B196-4411-48B3-B7BD-C6E7ABC99D23}" type="slidenum">
               <a:t>11</a:t>
             </a:fld>
           </a:p>
@@ -6933,9 +6933,9 @@
         <p:txBody>
           <a:bodyPr/>
           <a:p>
-            <a:fld id="{E66237CC-4129-4CCC-9F6E-7B355732C40C}" type="datetime1">
+            <a:fld id="{8484473E-F260-444E-B820-71EDACE77D82}" type="datetime1">
               <a:rPr lang="en-US"/>
-              <a:t>10/09/2023</a:t>
+              <a:t>11/10/2023</a:t>
             </a:fld>
           </a:p>
         </p:txBody>
@@ -7159,7 +7159,7 @@
         <p:txBody>
           <a:bodyPr/>
           <a:p>
-            <a:fld id="{E34EF763-4708-493C-9276-D58A79CCC4BF}" type="slidenum">
+            <a:fld id="{4D4B96E1-A463-4206-806A-6526E73CE85D}" type="slidenum">
               <a:t>12</a:t>
             </a:fld>
           </a:p>
@@ -7179,9 +7179,9 @@
         <p:txBody>
           <a:bodyPr/>
           <a:p>
-            <a:fld id="{E66F919B-3F3F-4021-8059-EFF18917CEC9}" type="datetime1">
+            <a:fld id="{4226ECBA-D890-41DB-B19A-D2DC689ABF78}" type="datetime1">
               <a:rPr lang="en-US"/>
-              <a:t>10/09/2023</a:t>
+              <a:t>11/10/2023</a:t>
             </a:fld>
           </a:p>
         </p:txBody>
@@ -7357,7 +7357,25 @@
                 </a:solidFill>
                 <a:latin typeface="Arial"/>
               </a:rPr>
-              <a:t>”...</a:t>
+              <a:t>”. Verzija </a:t>
+            </a:r>
+            <a:r>
+              <a:rPr b="0" i="1" lang="bs-BA" sz="2400" spc="-1" strike="noStrike">
+                <a:solidFill>
+                  <a:srgbClr val="009bdd"/>
+                </a:solidFill>
+                <a:latin typeface="Arial"/>
+              </a:rPr>
+              <a:t>v3.1.4</a:t>
+            </a:r>
+            <a:r>
+              <a:rPr b="0" lang="bs-BA" sz="2400" spc="-1" strike="noStrike">
+                <a:solidFill>
+                  <a:srgbClr val="009bdd"/>
+                </a:solidFill>
+                <a:latin typeface="Arial"/>
+              </a:rPr>
+              <a:t> i novije to rade automatski.</a:t>
             </a:r>
             <a:endParaRPr b="0" lang="bs-BA" sz="2400" spc="-1" strike="noStrike">
               <a:solidFill>
@@ -7428,7 +7446,7 @@
         <p:txBody>
           <a:bodyPr/>
           <a:p>
-            <a:fld id="{3DEF1FA2-01FE-4B43-8977-2ABED1DEFB72}" type="slidenum">
+            <a:fld id="{7C1E8E25-D559-475E-AF28-97E215BA5E8A}" type="slidenum">
               <a:t>13</a:t>
             </a:fld>
           </a:p>
@@ -7448,9 +7466,9 @@
         <p:txBody>
           <a:bodyPr/>
           <a:p>
-            <a:fld id="{014664CD-FD82-4CB8-A7FD-8F92441430EB}" type="datetime1">
+            <a:fld id="{48D6A115-A570-4B90-9213-EE633725A9A1}" type="datetime1">
               <a:rPr lang="en-US"/>
-              <a:t>10/09/2023</a:t>
+              <a:t>11/10/2023</a:t>
             </a:fld>
           </a:p>
         </p:txBody>
@@ -7706,7 +7724,7 @@
         <p:txBody>
           <a:bodyPr/>
           <a:p>
-            <a:fld id="{DCD41282-D125-4D96-817F-75E39CAA191A}" type="slidenum">
+            <a:fld id="{E88AAA47-F12D-4B69-9BCF-8BACF55287FA}" type="slidenum">
               <a:t>14</a:t>
             </a:fld>
           </a:p>
@@ -7726,9 +7744,9 @@
         <p:txBody>
           <a:bodyPr/>
           <a:p>
-            <a:fld id="{552DE3E2-9A6C-49D8-BB53-53C195C8D313}" type="datetime1">
+            <a:fld id="{41E1A780-AF57-439D-A0AD-E9454166E022}" type="datetime1">
               <a:rPr lang="en-US"/>
-              <a:t>10/09/2023</a:t>
+              <a:t>11/10/2023</a:t>
             </a:fld>
           </a:p>
         </p:txBody>
@@ -7883,7 +7901,7 @@
         <p:txBody>
           <a:bodyPr/>
           <a:p>
-            <a:fld id="{90DC3E17-D9C7-43EB-B93B-9FF839B6313F}" type="slidenum">
+            <a:fld id="{165D9790-DE18-464D-9BB8-3A7BB6DEFB46}" type="slidenum">
               <a:t>15</a:t>
             </a:fld>
           </a:p>
@@ -7903,9 +7921,9 @@
         <p:txBody>
           <a:bodyPr/>
           <a:p>
-            <a:fld id="{25D9043E-D169-46FB-86FD-B12C64A3204E}" type="datetime1">
+            <a:fld id="{FC168AF1-0AAA-459E-980F-B7DF7E6EA460}" type="datetime1">
               <a:rPr lang="en-US"/>
-              <a:t>10/09/2023</a:t>
+              <a:t>11/10/2023</a:t>
             </a:fld>
           </a:p>
         </p:txBody>
@@ -8120,7 +8138,7 @@
         <p:txBody>
           <a:bodyPr/>
           <a:p>
-            <a:fld id="{E301701B-AFE5-4D28-9122-D9AF92563239}" type="slidenum">
+            <a:fld id="{C39C1ED4-6D85-4F1A-82A7-E1567D4758BD}" type="slidenum">
               <a:t>16</a:t>
             </a:fld>
           </a:p>
@@ -8140,9 +8158,9 @@
         <p:txBody>
           <a:bodyPr/>
           <a:p>
-            <a:fld id="{A438724E-CA97-4B12-B4F8-0379993029E8}" type="datetime1">
+            <a:fld id="{CF966580-F476-44EC-B252-EBDE08D98B9F}" type="datetime1">
               <a:rPr lang="en-US"/>
-              <a:t>10/09/2023</a:t>
+              <a:t>11/10/2023</a:t>
             </a:fld>
           </a:p>
         </p:txBody>
@@ -8466,7 +8484,7 @@
         <p:txBody>
           <a:bodyPr/>
           <a:p>
-            <a:fld id="{4A3378C0-40A8-4AA7-B6D8-ED6881B38B9C}" type="slidenum">
+            <a:fld id="{DD491884-D7CA-43B4-BF7F-79F48BBAA809}" type="slidenum">
               <a:t>17</a:t>
             </a:fld>
           </a:p>
@@ -8486,9 +8504,9 @@
         <p:txBody>
           <a:bodyPr/>
           <a:p>
-            <a:fld id="{2E98CCD6-7AEE-4373-8434-C328E9C8A503}" type="datetime1">
+            <a:fld id="{936572CE-45EA-4782-864E-1A5AD254D7A9}" type="datetime1">
               <a:rPr lang="en-US"/>
-              <a:t>10/09/2023</a:t>
+              <a:t>11/10/2023</a:t>
             </a:fld>
           </a:p>
         </p:txBody>
@@ -8684,7 +8702,7 @@
         <p:txBody>
           <a:bodyPr/>
           <a:p>
-            <a:fld id="{193A1D01-3842-4215-AA5D-EF4900BE3D85}" type="slidenum">
+            <a:fld id="{6AF63EF5-5F3A-4530-BE32-3F300003F185}" type="slidenum">
               <a:t>18</a:t>
             </a:fld>
           </a:p>
@@ -8704,9 +8722,9 @@
         <p:txBody>
           <a:bodyPr/>
           <a:p>
-            <a:fld id="{D5916E2D-CC1F-491F-A859-07B85BFD03DF}" type="datetime1">
+            <a:fld id="{E1BC65D7-36E6-4416-B379-E0B477DCE42E}" type="datetime1">
               <a:rPr lang="en-US"/>
-              <a:t>10/09/2023</a:t>
+              <a:t>11/10/2023</a:t>
             </a:fld>
           </a:p>
         </p:txBody>
@@ -8925,7 +8943,7 @@
         <p:txBody>
           <a:bodyPr/>
           <a:p>
-            <a:fld id="{8F2ED7E0-91B1-449B-86B9-ADE3C428BFFA}" type="slidenum">
+            <a:fld id="{6595D191-C899-4918-BA7F-75AE41718B13}" type="slidenum">
               <a:t>19</a:t>
             </a:fld>
           </a:p>
@@ -8945,9 +8963,9 @@
         <p:txBody>
           <a:bodyPr/>
           <a:p>
-            <a:fld id="{2D996B94-E5D2-463D-9622-E1C672A6221F}" type="datetime1">
+            <a:fld id="{5BD6B26E-C3EA-408B-9380-FAE223EE376E}" type="datetime1">
               <a:rPr lang="en-US"/>
-              <a:t>10/09/2023</a:t>
+              <a:t>11/10/2023</a:t>
             </a:fld>
           </a:p>
         </p:txBody>
@@ -9270,7 +9288,7 @@
         <p:txBody>
           <a:bodyPr/>
           <a:p>
-            <a:fld id="{C56F939A-75FE-4CE8-BA9A-05AE201BB100}" type="slidenum">
+            <a:fld id="{15DDE629-D9FB-4510-9032-FAAAAB7B73AD}" type="slidenum">
               <a:t>2</a:t>
             </a:fld>
           </a:p>
@@ -9290,9 +9308,9 @@
         <p:txBody>
           <a:bodyPr/>
           <a:p>
-            <a:fld id="{09926378-C672-43EC-B5BA-CA73E5331CAE}" type="datetime1">
+            <a:fld id="{30BD9E28-78BF-4684-915F-172C0FD19789}" type="datetime1">
               <a:rPr lang="en-US"/>
-              <a:t>10/09/2023</a:t>
+              <a:t>11/10/2023</a:t>
             </a:fld>
           </a:p>
         </p:txBody>
@@ -9643,7 +9661,7 @@
         <p:txBody>
           <a:bodyPr/>
           <a:p>
-            <a:fld id="{8F0D95C8-94FB-4C72-B7F3-822129F3C69A}" type="slidenum">
+            <a:fld id="{9E2268D7-15B5-4D79-BCB6-88246D546E3C}" type="slidenum">
               <a:t>20</a:t>
             </a:fld>
           </a:p>
@@ -9663,9 +9681,9 @@
         <p:txBody>
           <a:bodyPr/>
           <a:p>
-            <a:fld id="{B69CCE23-232D-41BA-9036-3119AEA62702}" type="datetime1">
+            <a:fld id="{A08BE60D-993E-43B7-8BD9-33594220B495}" type="datetime1">
               <a:rPr lang="en-US"/>
-              <a:t>10/09/2023</a:t>
+              <a:t>11/10/2023</a:t>
             </a:fld>
           </a:p>
         </p:txBody>
@@ -9767,7 +9785,7 @@
         <p:txBody>
           <a:bodyPr/>
           <a:p>
-            <a:fld id="{D6461293-442F-43EC-B9C9-B9CB79DD5646}" type="slidenum">
+            <a:fld id="{CF8B3E1F-F606-4905-82B8-513E1D32781D}" type="slidenum">
               <a:t>21</a:t>
             </a:fld>
           </a:p>
@@ -9787,9 +9805,9 @@
         <p:txBody>
           <a:bodyPr/>
           <a:p>
-            <a:fld id="{D4343255-193D-46E2-9F6D-9B30B8A9ED49}" type="datetime1">
+            <a:fld id="{B4D48BA4-B681-4530-B020-FA74B9B8F22F}" type="datetime1">
               <a:rPr lang="en-US"/>
-              <a:t>10/09/2023</a:t>
+              <a:t>11/10/2023</a:t>
             </a:fld>
           </a:p>
         </p:txBody>
@@ -10044,7 +10062,7 @@
         <p:txBody>
           <a:bodyPr/>
           <a:p>
-            <a:fld id="{0D45D030-2F0B-4CB6-B57E-10B7EFA1B92E}" type="slidenum">
+            <a:fld id="{3E57C99D-1C4A-405E-84A5-0B956D430311}" type="slidenum">
               <a:t>3</a:t>
             </a:fld>
           </a:p>
@@ -10064,9 +10082,9 @@
         <p:txBody>
           <a:bodyPr/>
           <a:p>
-            <a:fld id="{2513C771-73A6-44A9-A0DF-B11D51427072}" type="datetime1">
+            <a:fld id="{E7A8895A-1011-4F0F-B3FB-067C806CCC8F}" type="datetime1">
               <a:rPr lang="en-US"/>
-              <a:t>10/09/2023</a:t>
+              <a:t>11/10/2023</a:t>
             </a:fld>
           </a:p>
         </p:txBody>
@@ -10295,7 +10313,7 @@
         <p:txBody>
           <a:bodyPr/>
           <a:p>
-            <a:fld id="{A31695E4-1F78-45DF-9B7C-A69602B80CE6}" type="slidenum">
+            <a:fld id="{7394722F-B19F-4511-B69E-73E611A47E37}" type="slidenum">
               <a:t>4</a:t>
             </a:fld>
           </a:p>
@@ -10315,9 +10333,9 @@
         <p:txBody>
           <a:bodyPr/>
           <a:p>
-            <a:fld id="{49AC8D3D-D5B3-4EAE-BEB9-6A1D21548142}" type="datetime1">
+            <a:fld id="{5EFB6241-790A-43CD-8DB9-506B11588301}" type="datetime1">
               <a:rPr lang="en-US"/>
-              <a:t>10/09/2023</a:t>
+              <a:t>11/10/2023</a:t>
             </a:fld>
           </a:p>
         </p:txBody>
@@ -10560,7 +10578,7 @@
         <p:txBody>
           <a:bodyPr/>
           <a:p>
-            <a:fld id="{C0D30B57-9B54-4166-ADC5-BC65300F1C63}" type="slidenum">
+            <a:fld id="{87B99C2B-C93F-4DF8-8A56-AAEAC786D569}" type="slidenum">
               <a:t>5</a:t>
             </a:fld>
           </a:p>
@@ -10580,9 +10598,9 @@
         <p:txBody>
           <a:bodyPr/>
           <a:p>
-            <a:fld id="{590F801B-B1F4-408F-846F-5926355A35EC}" type="datetime1">
+            <a:fld id="{7897745E-CB33-4664-AC70-E9752C168F26}" type="datetime1">
               <a:rPr lang="en-US"/>
-              <a:t>10/09/2023</a:t>
+              <a:t>11/10/2023</a:t>
             </a:fld>
           </a:p>
         </p:txBody>
@@ -10924,7 +10942,7 @@
         <p:txBody>
           <a:bodyPr/>
           <a:p>
-            <a:fld id="{9BBC3D06-0BD8-4D07-9506-B523D126A44C}" type="slidenum">
+            <a:fld id="{AAB24DEA-C84A-476E-9A14-F1685B8F7655}" type="slidenum">
               <a:t>6</a:t>
             </a:fld>
           </a:p>
@@ -10944,9 +10962,9 @@
         <p:txBody>
           <a:bodyPr/>
           <a:p>
-            <a:fld id="{091DE798-B8DB-448D-B82B-0BDE93AB75CA}" type="datetime1">
+            <a:fld id="{DF50DA62-E6BB-4A2E-B3FF-08BCEE8285D6}" type="datetime1">
               <a:rPr lang="en-US"/>
-              <a:t>10/09/2023</a:t>
+              <a:t>11/10/2023</a:t>
             </a:fld>
           </a:p>
         </p:txBody>
@@ -11189,7 +11207,7 @@
         <p:txBody>
           <a:bodyPr/>
           <a:p>
-            <a:fld id="{BB011921-C636-4C7B-9D31-705E51146268}" type="slidenum">
+            <a:fld id="{E17B5E4C-7D44-4ACE-9E36-C02B998177D3}" type="slidenum">
               <a:t>7</a:t>
             </a:fld>
           </a:p>
@@ -11209,9 +11227,9 @@
         <p:txBody>
           <a:bodyPr/>
           <a:p>
-            <a:fld id="{CBE0962B-4B2E-43B4-BF8D-FD3EA871337D}" type="datetime1">
+            <a:fld id="{BBB17544-D49B-41F8-8CFB-EFC49F9E5B58}" type="datetime1">
               <a:rPr lang="en-US"/>
-              <a:t>10/09/2023</a:t>
+              <a:t>11/10/2023</a:t>
             </a:fld>
           </a:p>
         </p:txBody>
@@ -11431,7 +11449,7 @@
         <p:txBody>
           <a:bodyPr/>
           <a:p>
-            <a:fld id="{DB81F284-4CEA-4067-8B37-51CA5612A1DF}" type="slidenum">
+            <a:fld id="{DA4E1CCB-9056-4D82-BCE5-E5A7F82D65E5}" type="slidenum">
               <a:t>8</a:t>
             </a:fld>
           </a:p>
@@ -11451,9 +11469,9 @@
         <p:txBody>
           <a:bodyPr/>
           <a:p>
-            <a:fld id="{BC65E804-8467-40D3-9EDD-E5A297B1A0F9}" type="datetime1">
+            <a:fld id="{33A54E3B-5F05-4FE6-B1C1-625834336BF5}" type="datetime1">
               <a:rPr lang="en-US"/>
-              <a:t>10/09/2023</a:t>
+              <a:t>11/10/2023</a:t>
             </a:fld>
           </a:p>
         </p:txBody>
@@ -11631,7 +11649,7 @@
         <p:txBody>
           <a:bodyPr/>
           <a:p>
-            <a:fld id="{54DBB792-43A5-4BCB-844C-49FE0A2B7E59}" type="slidenum">
+            <a:fld id="{EA49D6B9-B07D-44AB-B9B7-7779A3EB57D3}" type="slidenum">
               <a:t>9</a:t>
             </a:fld>
           </a:p>
@@ -11651,9 +11669,9 @@
         <p:txBody>
           <a:bodyPr/>
           <a:p>
-            <a:fld id="{A4317B92-3F4C-4D34-BF9D-3D8013CBD566}" type="datetime1">
+            <a:fld id="{5821AD39-5A8D-4DDE-BE23-D8EB449E8C69}" type="datetime1">
               <a:rPr lang="en-US"/>
-              <a:t>10/09/2023</a:t>
+              <a:t>11/10/2023</a:t>
             </a:fld>
           </a:p>
         </p:txBody>

</xml_diff>

<commit_message>
Mentioned the back-end in the presentation
</commit_message>
<xml_diff>
--- a/seminar/PicoBlaze.pptx
+++ b/seminar/PicoBlaze.pptx
@@ -27,6 +27,7 @@
     <p:sldId id="274" r:id="rId22"/>
     <p:sldId id="275" r:id="rId23"/>
     <p:sldId id="276" r:id="rId24"/>
+    <p:sldId id="277" r:id="rId25"/>
   </p:sldIdLst>
   <p:sldSz cx="10080625" cy="5670550"/>
   <p:notesSz cx="7559675" cy="10691813"/>
@@ -84,7 +85,7 @@
         <p:txBody>
           <a:bodyPr/>
           <a:p>
-            <a:fld id="{AE803EFA-CF76-4E23-87E2-D1E3DB91A0D2}" type="slidenum">
+            <a:fld id="{32CF32AF-60C3-4B37-8259-7B5A3C02603A}" type="slidenum">
               <a:t>&lt;#&gt;</a:t>
             </a:fld>
           </a:p>
@@ -167,7 +168,7 @@
         <p:txBody>
           <a:bodyPr/>
           <a:p>
-            <a:fld id="{0CF91054-485B-4B71-8888-2C7772C6ADFD}" type="slidenum">
+            <a:fld id="{54EC2A8F-A2BB-43D5-8C73-C7B1D91F9B29}" type="slidenum">
               <a:t>&lt;#&gt;</a:t>
             </a:fld>
           </a:p>
@@ -1084,7 +1085,7 @@
             <a:pPr indent="0" algn="r">
               <a:buNone/>
             </a:pPr>
-            <a:fld id="{01A98895-7EF3-4E3C-B769-0288EB5F4690}" type="slidenum">
+            <a:fld id="{96B31DF4-C0F5-4974-82F2-202B90263F24}" type="slidenum">
               <a:rPr b="0" lang="bs-BA" sz="1400" spc="-1" strike="noStrike">
                 <a:solidFill>
                   <a:srgbClr val="ffffff"/>
@@ -2428,7 +2429,7 @@
             <a:pPr indent="0" algn="r">
               <a:buNone/>
             </a:pPr>
-            <a:fld id="{FBB92720-D73E-49D6-8317-E135E013436D}" type="slidenum">
+            <a:fld id="{2E382A96-F48D-4C06-A9D5-65BAB590C67D}" type="slidenum">
               <a:rPr b="0" lang="bs-BA" sz="1400" spc="-1" strike="noStrike">
                 <a:solidFill>
                   <a:srgbClr val="ffffff"/>
@@ -2879,7 +2880,7 @@
         <p:txBody>
           <a:bodyPr/>
           <a:p>
-            <a:fld id="{467D0022-C61E-4C66-A160-594721A8B2AA}" type="slidenum">
+            <a:fld id="{132664B0-0497-42F0-BE4B-36495B2C9117}" type="slidenum">
               <a:t>10</a:t>
             </a:fld>
           </a:p>
@@ -2899,9 +2900,9 @@
         <p:txBody>
           <a:bodyPr/>
           <a:p>
-            <a:fld id="{63D71003-8DEF-4F10-B350-BF4AC892A89A}" type="datetime1">
+            <a:fld id="{1AA1C342-1838-43CA-865C-23FD4FC48E39}" type="datetime1">
               <a:rPr lang="en-US"/>
-              <a:t>04/07/2024</a:t>
+              <a:t>04/09/2024</a:t>
             </a:fld>
           </a:p>
         </p:txBody>
@@ -3167,7 +3168,7 @@
         <p:txBody>
           <a:bodyPr/>
           <a:p>
-            <a:fld id="{3A30A584-873C-4337-82D8-A9B470524AF7}" type="slidenum">
+            <a:fld id="{93A99683-0199-46A1-8C60-DAAE91BC89BF}" type="slidenum">
               <a:t>11</a:t>
             </a:fld>
           </a:p>
@@ -3187,9 +3188,9 @@
         <p:txBody>
           <a:bodyPr/>
           <a:p>
-            <a:fld id="{D527FDC6-53B8-43DE-97B1-1B874FE224CE}" type="datetime1">
+            <a:fld id="{59699284-1051-458F-A7EF-7B4F808DA4A0}" type="datetime1">
               <a:rPr lang="en-US"/>
-              <a:t>04/07/2024</a:t>
+              <a:t>04/09/2024</a:t>
             </a:fld>
           </a:p>
         </p:txBody>
@@ -3413,7 +3414,7 @@
         <p:txBody>
           <a:bodyPr/>
           <a:p>
-            <a:fld id="{CCC20927-7C91-4F49-B39E-2646DF1DE957}" type="slidenum">
+            <a:fld id="{5E2B5913-D496-44D1-A55E-26D29A3ABDB4}" type="slidenum">
               <a:t>12</a:t>
             </a:fld>
           </a:p>
@@ -3433,9 +3434,9 @@
         <p:txBody>
           <a:bodyPr/>
           <a:p>
-            <a:fld id="{6F0411A0-0612-4A5F-AAAD-A5C3E488B54E}" type="datetime1">
+            <a:fld id="{829BE6BD-2566-4345-9FBE-1E3718AC3EF5}" type="datetime1">
               <a:rPr lang="en-US"/>
-              <a:t>04/07/2024</a:t>
+              <a:t>04/09/2024</a:t>
             </a:fld>
           </a:p>
         </p:txBody>
@@ -3700,7 +3701,7 @@
         <p:txBody>
           <a:bodyPr/>
           <a:p>
-            <a:fld id="{D872609D-1F3D-4944-BDE1-97EBD362026E}" type="slidenum">
+            <a:fld id="{0C315EA2-DD62-4A44-8BA2-522598DD099D}" type="slidenum">
               <a:t>13</a:t>
             </a:fld>
           </a:p>
@@ -3720,9 +3721,9 @@
         <p:txBody>
           <a:bodyPr/>
           <a:p>
-            <a:fld id="{42474DAE-0D82-427A-A3EE-02F6F27E42EA}" type="datetime1">
+            <a:fld id="{61610095-3250-4EAD-B809-9C66E25F41CE}" type="datetime1">
               <a:rPr lang="en-US"/>
-              <a:t>04/07/2024</a:t>
+              <a:t>04/09/2024</a:t>
             </a:fld>
           </a:p>
         </p:txBody>
@@ -3978,7 +3979,7 @@
         <p:txBody>
           <a:bodyPr/>
           <a:p>
-            <a:fld id="{16DFDD3F-F2EF-4F56-877F-0C7DC6089B77}" type="slidenum">
+            <a:fld id="{BDAA6840-3320-46DE-9FD4-427F117BBB07}" type="slidenum">
               <a:t>14</a:t>
             </a:fld>
           </a:p>
@@ -3998,9 +3999,9 @@
         <p:txBody>
           <a:bodyPr/>
           <a:p>
-            <a:fld id="{9ACEAECE-AE68-4EF5-A718-142425AC1FDD}" type="datetime1">
+            <a:fld id="{68E53807-1EC2-44FB-8D2B-500AB10E15B3}" type="datetime1">
               <a:rPr lang="en-US"/>
-              <a:t>04/07/2024</a:t>
+              <a:t>04/09/2024</a:t>
             </a:fld>
           </a:p>
         </p:txBody>
@@ -4155,7 +4156,7 @@
         <p:txBody>
           <a:bodyPr/>
           <a:p>
-            <a:fld id="{C4169FAC-3C45-4C4D-A6DD-0445BC55F019}" type="slidenum">
+            <a:fld id="{83F574B3-38DA-4CF7-80B3-C87D0F187963}" type="slidenum">
               <a:t>15</a:t>
             </a:fld>
           </a:p>
@@ -4175,9 +4176,9 @@
         <p:txBody>
           <a:bodyPr/>
           <a:p>
-            <a:fld id="{88692DF7-9A2E-4CCF-85F2-5E10C394C140}" type="datetime1">
+            <a:fld id="{829896C0-9ACA-4A72-B293-EF3B860C7A66}" type="datetime1">
               <a:rPr lang="en-US"/>
-              <a:t>04/07/2024</a:t>
+              <a:t>04/09/2024</a:t>
             </a:fld>
           </a:p>
         </p:txBody>
@@ -4392,7 +4393,7 @@
         <p:txBody>
           <a:bodyPr/>
           <a:p>
-            <a:fld id="{E13E38C5-FBE3-4FBB-A52F-C52FFB2D1F4B}" type="slidenum">
+            <a:fld id="{B3FD8414-1F9D-4490-BA26-EF3802DB7417}" type="slidenum">
               <a:t>16</a:t>
             </a:fld>
           </a:p>
@@ -4412,9 +4413,9 @@
         <p:txBody>
           <a:bodyPr/>
           <a:p>
-            <a:fld id="{EE13CA9C-1286-401C-98FE-018A58F947AD}" type="datetime1">
+            <a:fld id="{1C93A688-500D-44A2-9F65-8CBADD23B5C3}" type="datetime1">
               <a:rPr lang="en-US"/>
-              <a:t>04/07/2024</a:t>
+              <a:t>04/09/2024</a:t>
             </a:fld>
           </a:p>
         </p:txBody>
@@ -4738,7 +4739,7 @@
         <p:txBody>
           <a:bodyPr/>
           <a:p>
-            <a:fld id="{3D5A5A32-E780-4B0D-A850-ECD079416B5E}" type="slidenum">
+            <a:fld id="{ED1E8FE7-C595-4036-94EF-2426AE0FF3FF}" type="slidenum">
               <a:t>17</a:t>
             </a:fld>
           </a:p>
@@ -4758,9 +4759,9 @@
         <p:txBody>
           <a:bodyPr/>
           <a:p>
-            <a:fld id="{080A50B5-F88B-448D-9DD6-9E575E36D1D4}" type="datetime1">
+            <a:fld id="{C1E49FDE-2CE9-43D9-BA56-114D94416F63}" type="datetime1">
               <a:rPr lang="en-US"/>
-              <a:t>04/07/2024</a:t>
+              <a:t>04/09/2024</a:t>
             </a:fld>
           </a:p>
         </p:txBody>
@@ -4956,7 +4957,7 @@
         <p:txBody>
           <a:bodyPr/>
           <a:p>
-            <a:fld id="{566F9CBB-5405-4AB9-ABFD-E76E4EB089ED}" type="slidenum">
+            <a:fld id="{189EF0C4-0969-4D7A-9157-4122F742D03F}" type="slidenum">
               <a:t>18</a:t>
             </a:fld>
           </a:p>
@@ -4976,9 +4977,9 @@
         <p:txBody>
           <a:bodyPr/>
           <a:p>
-            <a:fld id="{86D9CFCA-3092-4246-A356-4762C4F0476E}" type="datetime1">
+            <a:fld id="{CF20E8BF-CC02-42C5-9002-A439B060A5DA}" type="datetime1">
               <a:rPr lang="en-US"/>
-              <a:t>04/07/2024</a:t>
+              <a:t>04/09/2024</a:t>
             </a:fld>
           </a:p>
         </p:txBody>
@@ -5197,7 +5198,7 @@
         <p:txBody>
           <a:bodyPr/>
           <a:p>
-            <a:fld id="{5E93BEC0-1464-43A0-AFDD-678BA04B7283}" type="slidenum">
+            <a:fld id="{73D74879-5899-4318-B494-B9C5A902AD6E}" type="slidenum">
               <a:t>19</a:t>
             </a:fld>
           </a:p>
@@ -5217,9 +5218,9 @@
         <p:txBody>
           <a:bodyPr/>
           <a:p>
-            <a:fld id="{D220F691-5091-47E9-9B7B-B889A1690E10}" type="datetime1">
+            <a:fld id="{D5DB4529-9105-45DB-BC90-8F17F2686B33}" type="datetime1">
               <a:rPr lang="en-US"/>
-              <a:t>04/07/2024</a:t>
+              <a:t>04/09/2024</a:t>
             </a:fld>
           </a:p>
         </p:txBody>
@@ -5542,7 +5543,7 @@
         <p:txBody>
           <a:bodyPr/>
           <a:p>
-            <a:fld id="{E7D15F11-60F2-4523-B45B-3F8050C78035}" type="slidenum">
+            <a:fld id="{DCD1BCB4-5862-4868-92A3-6DBDED965440}" type="slidenum">
               <a:t>2</a:t>
             </a:fld>
           </a:p>
@@ -5562,9 +5563,9 @@
         <p:txBody>
           <a:bodyPr/>
           <a:p>
-            <a:fld id="{D15A6173-306D-4820-9824-7E453A65BCFF}" type="datetime1">
+            <a:fld id="{39BA5523-5392-44A4-A57C-D4021B298422}" type="datetime1">
               <a:rPr lang="en-US"/>
-              <a:t>04/07/2024</a:t>
+              <a:t>04/09/2024</a:t>
             </a:fld>
           </a:p>
         </p:txBody>
@@ -5989,7 +5990,7 @@
         <p:txBody>
           <a:bodyPr/>
           <a:p>
-            <a:fld id="{96144C27-9A33-4438-AA86-7EF4B53B708B}" type="slidenum">
+            <a:fld id="{572C6FE0-3C68-4C2D-8696-318114F22B9B}" type="slidenum">
               <a:t>20</a:t>
             </a:fld>
           </a:p>
@@ -6009,9 +6010,9 @@
         <p:txBody>
           <a:bodyPr/>
           <a:p>
-            <a:fld id="{B3F432AC-2C78-4636-87D2-8F9CD8B40AFC}" type="datetime1">
+            <a:fld id="{24F8DC3F-EF4F-4466-91CF-2FE4E5170D5F}" type="datetime1">
               <a:rPr lang="en-US"/>
-              <a:t>04/07/2024</a:t>
+              <a:t>04/09/2024</a:t>
             </a:fld>
           </a:p>
         </p:txBody>
@@ -6053,6 +6054,201 @@
             <a:spLocks noGrp="1"/>
           </p:cNvSpPr>
           <p:nvPr>
+            <p:ph type="title"/>
+          </p:nvPr>
+        </p:nvSpPr>
+        <p:spPr>
+          <a:xfrm>
+            <a:off x="360000" y="180000"/>
+            <a:ext cx="9360000" cy="478080"/>
+          </a:xfrm>
+          <a:prstGeom prst="rect">
+            <a:avLst/>
+          </a:prstGeom>
+          <a:noFill/>
+          <a:ln w="0">
+            <a:noFill/>
+          </a:ln>
+        </p:spPr>
+        <p:txBody>
+          <a:bodyPr lIns="0" rIns="0" tIns="0" bIns="0" anchor="ctr">
+            <a:noAutofit/>
+          </a:bodyPr>
+          <a:p>
+            <a:pPr indent="0" algn="ctr">
+              <a:buNone/>
+            </a:pPr>
+            <a:r>
+              <a:rPr b="0" lang="bs-BA" sz="3300" spc="-1" strike="noStrike">
+                <a:solidFill>
+                  <a:srgbClr val="ffffff"/>
+                </a:solidFill>
+                <a:latin typeface="Arial"/>
+              </a:rPr>
+              <a:t>Back-end</a:t>
+            </a:r>
+            <a:endParaRPr b="0" lang="bs-BA" sz="3300" spc="-1" strike="noStrike">
+              <a:solidFill>
+                <a:srgbClr val="ffffff"/>
+              </a:solidFill>
+              <a:latin typeface="Arial"/>
+            </a:endParaRPr>
+          </a:p>
+        </p:txBody>
+      </p:sp>
+      <p:sp>
+        <p:nvSpPr>
+          <p:cNvPr id="76" name="PlaceHolder 2"/>
+          <p:cNvSpPr>
+            <a:spLocks noGrp="1"/>
+          </p:cNvSpPr>
+          <p:nvPr>
+            <p:ph/>
+          </p:nvPr>
+        </p:nvSpPr>
+        <p:spPr>
+          <a:xfrm>
+            <a:off x="360000" y="1080000"/>
+            <a:ext cx="9360000" cy="3600000"/>
+          </a:xfrm>
+          <a:prstGeom prst="rect">
+            <a:avLst/>
+          </a:prstGeom>
+          <a:noFill/>
+          <a:ln w="0">
+            <a:noFill/>
+          </a:ln>
+        </p:spPr>
+        <p:txBody>
+          <a:bodyPr lIns="0" rIns="0" tIns="0" bIns="0" anchor="t">
+            <a:noAutofit/>
+          </a:bodyPr>
+          <a:p>
+            <a:pPr marL="432000" indent="-324000">
+              <a:spcBef>
+                <a:spcPts val="1060"/>
+              </a:spcBef>
+              <a:buClr>
+                <a:srgbClr val="77caee"/>
+              </a:buClr>
+              <a:buSzPct val="45000"/>
+              <a:buFont typeface="Wingdings" charset="2"/>
+              <a:buChar char=""/>
+            </a:pPr>
+            <a:r>
+              <a:rPr b="0" lang="bs-BA" sz="2400" spc="-1" strike="noStrike">
+                <a:solidFill>
+                  <a:srgbClr val="009bdd"/>
+                </a:solidFill>
+                <a:latin typeface="Arial"/>
+              </a:rPr>
+              <a:t>Abidin Durdu (</a:t>
+            </a:r>
+            <a:r>
+              <a:rPr b="0" i="1" lang="bs-BA" sz="2400" spc="-1" strike="noStrike">
+                <a:solidFill>
+                  <a:srgbClr val="009bdd"/>
+                </a:solidFill>
+                <a:latin typeface="Arial"/>
+              </a:rPr>
+              <a:t>betelgeuse-7</a:t>
+            </a:r>
+            <a:r>
+              <a:rPr b="0" lang="bs-BA" sz="2400" spc="-1" strike="noStrike">
+                <a:solidFill>
+                  <a:srgbClr val="009bdd"/>
+                </a:solidFill>
+                <a:latin typeface="Arial"/>
+              </a:rPr>
+              <a:t>) napravio je back-end u PHP-u, koji omogućuje korisnicima da dijele asemblerske programe. Taj back-end koristi MySQL bazu podataka. Vrti se na SourceForge serverima.</a:t>
+            </a:r>
+            <a:endParaRPr b="0" lang="bs-BA" sz="2400" spc="-1" strike="noStrike">
+              <a:solidFill>
+                <a:srgbClr val="009bdd"/>
+              </a:solidFill>
+              <a:latin typeface="Arial"/>
+            </a:endParaRPr>
+          </a:p>
+        </p:txBody>
+      </p:sp>
+      <p:sp>
+        <p:nvSpPr>
+          <p:cNvPr id="4" name="PlaceHolder 3"/>
+          <p:cNvSpPr>
+            <a:spLocks noGrp="1"/>
+          </p:cNvSpPr>
+          <p:nvPr>
+            <p:ph type="sldNum" idx="6"/>
+          </p:nvPr>
+        </p:nvSpPr>
+        <p:spPr/>
+        <p:txBody>
+          <a:bodyPr/>
+          <a:p>
+            <a:fld id="{B469B4E2-34D6-4729-B4C5-05A24F8F1D1C}" type="slidenum">
+              <a:t>21</a:t>
+            </a:fld>
+          </a:p>
+        </p:txBody>
+      </p:sp>
+      <p:sp>
+        <p:nvSpPr>
+          <p:cNvPr id="5" name="PlaceHolder 4"/>
+          <p:cNvSpPr>
+            <a:spLocks noGrp="1"/>
+          </p:cNvSpPr>
+          <p:nvPr>
+            <p:ph type="dt" idx="4"/>
+          </p:nvPr>
+        </p:nvSpPr>
+        <p:spPr/>
+        <p:txBody>
+          <a:bodyPr/>
+          <a:p>
+            <a:fld id="{3C1D9046-7A48-42DF-84CF-EE54BC37D098}" type="datetime1">
+              <a:rPr lang="en-US"/>
+              <a:t>04/09/2024</a:t>
+            </a:fld>
+          </a:p>
+        </p:txBody>
+      </p:sp>
+    </p:spTree>
+  </p:cSld>
+  <mc:AlternateContent>
+    <mc:Choice Requires="p14">
+      <p:transition spd="slow" p14:dur="2000"/>
+    </mc:Choice>
+    <mc:Fallback>
+      <p:transition spd="slow"/>
+    </mc:Fallback>
+  </mc:AlternateContent>
+</p:sld>
+</file>
+
+<file path=ppt/slides/slide22.xml><?xml version="1.0" encoding="utf-8"?>
+<p:sld xmlns:a="http://schemas.openxmlformats.org/drawingml/2006/main" xmlns:p="http://schemas.openxmlformats.org/presentationml/2006/main" xmlns:r="http://schemas.openxmlformats.org/officeDocument/2006/relationships" xmlns:p14="http://schemas.microsoft.com/office/powerpoint/2010/main" xmlns:p15="http://schemas.microsoft.com/office/powerpoint/2012/main" xmlns:mc="http://schemas.openxmlformats.org/markup-compatibility/2006">
+  <p:cSld>
+    <p:spTree>
+      <p:nvGrpSpPr>
+        <p:cNvPr id="1" name=""/>
+        <p:cNvGrpSpPr/>
+        <p:nvPr/>
+      </p:nvGrpSpPr>
+      <p:grpSpPr>
+        <a:xfrm>
+          <a:off x="0" y="0"/>
+          <a:ext cx="0" cy="0"/>
+          <a:chOff x="0" y="0"/>
+          <a:chExt cx="0" cy="0"/>
+        </a:xfrm>
+      </p:grpSpPr>
+      <p:sp>
+        <p:nvSpPr>
+          <p:cNvPr id="77" name="PlaceHolder 1"/>
+          <p:cNvSpPr>
+            <a:spLocks noGrp="1"/>
+          </p:cNvSpPr>
+          <p:nvPr>
             <p:ph type="subTitle"/>
           </p:nvPr>
         </p:nvSpPr>
@@ -6113,8 +6309,8 @@
         <p:txBody>
           <a:bodyPr/>
           <a:p>
-            <a:fld id="{9F617803-4E8B-4A06-8593-0E11895A55DF}" type="slidenum">
-              <a:t>21</a:t>
+            <a:fld id="{07CC83E5-2D7C-4196-9F4D-8079A396F805}" type="slidenum">
+              <a:t>22</a:t>
             </a:fld>
           </a:p>
         </p:txBody>
@@ -6133,9 +6329,9 @@
         <p:txBody>
           <a:bodyPr/>
           <a:p>
-            <a:fld id="{45C8E16D-0420-4E51-9A95-1E19A42A7BF2}" type="datetime1">
+            <a:fld id="{9954E01E-4557-4ABB-8295-1DE512BC1966}" type="datetime1">
               <a:rPr lang="en-US"/>
-              <a:t>04/07/2024</a:t>
+              <a:t>04/09/2024</a:t>
             </a:fld>
           </a:p>
         </p:txBody>
@@ -6275,7 +6471,7 @@
                 </a:solidFill>
                 <a:latin typeface="Arial"/>
               </a:rPr>
-              <a:t> (stabilna verzija)</a:t>
+              <a:t> (samo front-end, uključujući i asembler pisan u JavaScriptu)</a:t>
             </a:r>
             <a:endParaRPr b="0" lang="bs-BA" sz="2400" spc="-1" strike="noStrike">
               <a:solidFill>
@@ -6313,7 +6509,7 @@
                 </a:solidFill>
                 <a:latin typeface="Arial"/>
               </a:rPr>
-              <a:t> (stabilna verzija)</a:t>
+              <a:t> (i front-end i back-end)</a:t>
             </a:r>
             <a:endParaRPr b="0" lang="bs-BA" sz="2400" spc="-1" strike="noStrike">
               <a:solidFill>
@@ -6365,7 +6561,26 @@
                 </a:solidFill>
                 <a:latin typeface="Arial"/>
               </a:rPr>
-              <a:t> (nestabilna verzija)</a:t>
+              <a:t> (fork koji održava Agust</a:t>
+            </a:r>
+            <a:r>
+              <a:rPr b="0" lang="bs-BA" sz="2400" spc="-1" strike="noStrike">
+                <a:solidFill>
+                  <a:srgbClr val="009bdd"/>
+                </a:solidFill>
+                <a:latin typeface="Arial"/>
+                <a:ea typeface="Arial"/>
+              </a:rPr>
+              <a:t>í</a:t>
+            </a:r>
+            <a:r>
+              <a:rPr b="0" lang="bs-BA" sz="2400" spc="-1" strike="noStrike">
+                <a:solidFill>
+                  <a:srgbClr val="009bdd"/>
+                </a:solidFill>
+                <a:latin typeface="Arial"/>
+              </a:rPr>
+              <a:t>n Izaguirre)</a:t>
             </a:r>
             <a:endParaRPr b="0" lang="bs-BA" sz="2400" spc="-1" strike="noStrike">
               <a:solidFill>
@@ -6390,7 +6605,7 @@
         <p:txBody>
           <a:bodyPr/>
           <a:p>
-            <a:fld id="{2A67BCA3-3F2C-4B26-BF9B-662462687237}" type="slidenum">
+            <a:fld id="{5D9D82AF-9B37-4DEC-BE70-E994F85C55E3}" type="slidenum">
               <a:t>3</a:t>
             </a:fld>
           </a:p>
@@ -6410,9 +6625,9 @@
         <p:txBody>
           <a:bodyPr/>
           <a:p>
-            <a:fld id="{14701CEF-A1CD-41DE-A564-AF5D12120589}" type="datetime1">
+            <a:fld id="{10FF08B9-D982-4858-B03C-1D8BB77FBCA0}" type="datetime1">
               <a:rPr lang="en-US"/>
-              <a:t>04/07/2024</a:t>
+              <a:t>04/09/2024</a:t>
             </a:fld>
           </a:p>
         </p:txBody>
@@ -6641,7 +6856,7 @@
         <p:txBody>
           <a:bodyPr/>
           <a:p>
-            <a:fld id="{04D84D6F-9EFA-4B64-AADF-5189BA008E69}" type="slidenum">
+            <a:fld id="{649478B2-AC7B-44D1-A692-4828DE3976B9}" type="slidenum">
               <a:t>4</a:t>
             </a:fld>
           </a:p>
@@ -6661,9 +6876,9 @@
         <p:txBody>
           <a:bodyPr/>
           <a:p>
-            <a:fld id="{D373787E-7FDA-4E93-80C7-774D9D36807C}" type="datetime1">
+            <a:fld id="{E08CE1AE-0CC1-4B7E-8D2E-C3BD17EC13A0}" type="datetime1">
               <a:rPr lang="en-US"/>
-              <a:t>04/07/2024</a:t>
+              <a:t>04/09/2024</a:t>
             </a:fld>
           </a:p>
         </p:txBody>
@@ -6906,7 +7121,7 @@
         <p:txBody>
           <a:bodyPr/>
           <a:p>
-            <a:fld id="{803D1FA8-950C-4F52-B323-B8078D992EDC}" type="slidenum">
+            <a:fld id="{DD5D8EA7-504C-4F31-8394-DD40C18EBB57}" type="slidenum">
               <a:t>5</a:t>
             </a:fld>
           </a:p>
@@ -6926,9 +7141,9 @@
         <p:txBody>
           <a:bodyPr/>
           <a:p>
-            <a:fld id="{D4F81A06-B82A-4BE3-88DA-467FE0BD823D}" type="datetime1">
+            <a:fld id="{5BACA872-E585-4E77-BA9D-FE70C4555015}" type="datetime1">
               <a:rPr lang="en-US"/>
-              <a:t>04/07/2024</a:t>
+              <a:t>04/09/2024</a:t>
             </a:fld>
           </a:p>
         </p:txBody>
@@ -7270,7 +7485,7 @@
         <p:txBody>
           <a:bodyPr/>
           <a:p>
-            <a:fld id="{FDF77FA9-4F6F-4B93-8356-5F749C9093E7}" type="slidenum">
+            <a:fld id="{354D9EF3-2C08-4DFA-9727-AE2D5FA549E8}" type="slidenum">
               <a:t>6</a:t>
             </a:fld>
           </a:p>
@@ -7290,9 +7505,9 @@
         <p:txBody>
           <a:bodyPr/>
           <a:p>
-            <a:fld id="{4BF5EBBD-B64B-4D05-8448-91BC66B14DB6}" type="datetime1">
+            <a:fld id="{30E611F8-CE85-4041-AA5F-2E1D4A6A3B57}" type="datetime1">
               <a:rPr lang="en-US"/>
-              <a:t>04/07/2024</a:t>
+              <a:t>04/09/2024</a:t>
             </a:fld>
           </a:p>
         </p:txBody>
@@ -7535,7 +7750,7 @@
         <p:txBody>
           <a:bodyPr/>
           <a:p>
-            <a:fld id="{A17D68E8-8B3A-4EC5-97D9-41A199ABB003}" type="slidenum">
+            <a:fld id="{586732A3-322A-45E3-A5B6-E4E490D70D4A}" type="slidenum">
               <a:t>7</a:t>
             </a:fld>
           </a:p>
@@ -7555,9 +7770,9 @@
         <p:txBody>
           <a:bodyPr/>
           <a:p>
-            <a:fld id="{F97FA369-86C0-4A59-B91A-5E17781ECBA2}" type="datetime1">
+            <a:fld id="{60B37384-8E76-4C21-B79E-E67AA3023856}" type="datetime1">
               <a:rPr lang="en-US"/>
-              <a:t>04/07/2024</a:t>
+              <a:t>04/09/2024</a:t>
             </a:fld>
           </a:p>
         </p:txBody>
@@ -7777,7 +7992,7 @@
         <p:txBody>
           <a:bodyPr/>
           <a:p>
-            <a:fld id="{9AEEFDE1-742B-4980-925A-491577325C77}" type="slidenum">
+            <a:fld id="{D6316FA7-9D66-46FB-9B16-D7CBD66A96D0}" type="slidenum">
               <a:t>8</a:t>
             </a:fld>
           </a:p>
@@ -7797,9 +8012,9 @@
         <p:txBody>
           <a:bodyPr/>
           <a:p>
-            <a:fld id="{7DF06910-BFBF-41A9-BD2A-AD4314465362}" type="datetime1">
+            <a:fld id="{86CF8389-BF5B-4FEA-B200-081F87B15CAB}" type="datetime1">
               <a:rPr lang="en-US"/>
-              <a:t>04/07/2024</a:t>
+              <a:t>04/09/2024</a:t>
             </a:fld>
           </a:p>
         </p:txBody>
@@ -7977,7 +8192,7 @@
         <p:txBody>
           <a:bodyPr/>
           <a:p>
-            <a:fld id="{33C90417-16D0-4A1A-92D8-33A2AAED759C}" type="slidenum">
+            <a:fld id="{EB6C4B75-3C9B-4446-AA70-92EC5996B733}" type="slidenum">
               <a:t>9</a:t>
             </a:fld>
           </a:p>
@@ -7997,9 +8212,9 @@
         <p:txBody>
           <a:bodyPr/>
           <a:p>
-            <a:fld id="{97EF31C4-EFC7-4E31-8F31-E6F2A1817570}" type="datetime1">
+            <a:fld id="{C29AD29C-C5F0-485D-ACA9-5A5A50C8A3D1}" type="datetime1">
               <a:rPr lang="en-US"/>
-              <a:t>04/07/2024</a:t>
+              <a:t>04/09/2024</a:t>
             </a:fld>
           </a:p>
         </p:txBody>

</xml_diff>

<commit_message>
Explained how the parser works (different from most assemblers)
</commit_message>
<xml_diff>
--- a/seminar/PicoBlaze.pptx
+++ b/seminar/PicoBlaze.pptx
@@ -28,6 +28,7 @@
     <p:sldId id="275" r:id="rId23"/>
     <p:sldId id="276" r:id="rId24"/>
     <p:sldId id="277" r:id="rId25"/>
+    <p:sldId id="278" r:id="rId26"/>
   </p:sldIdLst>
   <p:sldSz cx="10080625" cy="5670550"/>
   <p:notesSz cx="7559675" cy="10691813"/>
@@ -85,7 +86,7 @@
         <p:txBody>
           <a:bodyPr/>
           <a:p>
-            <a:fld id="{32CF32AF-60C3-4B37-8259-7B5A3C02603A}" type="slidenum">
+            <a:fld id="{D736E83D-0767-4FBE-BA84-9C2E24AA4E87}" type="slidenum">
               <a:t>&lt;#&gt;</a:t>
             </a:fld>
           </a:p>
@@ -118,6 +119,633 @@
 </file>
 
 <file path=ppt/slideLayouts/slideLayout2.xml><?xml version="1.0" encoding="utf-8"?>
+<p:sldLayout xmlns:a="http://schemas.openxmlformats.org/drawingml/2006/main" xmlns:p="http://schemas.openxmlformats.org/presentationml/2006/main" xmlns:r="http://schemas.openxmlformats.org/officeDocument/2006/relationships" xmlns:p14="http://schemas.microsoft.com/office/powerpoint/2010/main" xmlns:p15="http://schemas.microsoft.com/office/powerpoint/2012/main" xmlns:mc="http://schemas.openxmlformats.org/markup-compatibility/2006" type="tx" preserve="1">
+  <p:cSld name="Blue_Curve1">
+    <p:spTree>
+      <p:nvGrpSpPr>
+        <p:cNvPr id="1" name=""/>
+        <p:cNvGrpSpPr/>
+        <p:nvPr/>
+      </p:nvGrpSpPr>
+      <p:grpSpPr>
+        <a:xfrm>
+          <a:off x="0" y="0"/>
+          <a:ext cx="0" cy="0"/>
+          <a:chOff x="0" y="0"/>
+          <a:chExt cx="0" cy="0"/>
+        </a:xfrm>
+      </p:grpSpPr>
+      <p:sp>
+        <p:nvSpPr>
+          <p:cNvPr id="13" name="PlaceHolder 1"/>
+          <p:cNvSpPr>
+            <a:spLocks noGrp="1"/>
+          </p:cNvSpPr>
+          <p:nvPr>
+            <p:ph type="title"/>
+          </p:nvPr>
+        </p:nvSpPr>
+        <p:spPr>
+          <a:xfrm>
+            <a:off x="360000" y="180000"/>
+            <a:ext cx="9360000" cy="478080"/>
+          </a:xfrm>
+          <a:prstGeom prst="rect">
+            <a:avLst/>
+          </a:prstGeom>
+          <a:noFill/>
+          <a:ln w="0">
+            <a:noFill/>
+          </a:ln>
+        </p:spPr>
+        <p:txBody>
+          <a:bodyPr lIns="0" rIns="0" tIns="0" bIns="0" anchor="ctr">
+            <a:noAutofit/>
+          </a:bodyPr>
+          <a:p>
+            <a:pPr indent="0" algn="ctr">
+              <a:buNone/>
+            </a:pPr>
+            <a:endParaRPr b="0" lang="bs-BA" sz="3300" spc="-1" strike="noStrike">
+              <a:solidFill>
+                <a:srgbClr val="ffffff"/>
+              </a:solidFill>
+              <a:latin typeface="Arial"/>
+            </a:endParaRPr>
+          </a:p>
+        </p:txBody>
+      </p:sp>
+      <p:sp>
+        <p:nvSpPr>
+          <p:cNvPr id="14" name="PlaceHolder 2"/>
+          <p:cNvSpPr>
+            <a:spLocks noGrp="1"/>
+          </p:cNvSpPr>
+          <p:nvPr>
+            <p:ph/>
+          </p:nvPr>
+        </p:nvSpPr>
+        <p:spPr>
+          <a:xfrm>
+            <a:off x="360000" y="1080000"/>
+            <a:ext cx="9360000" cy="3600000"/>
+          </a:xfrm>
+          <a:prstGeom prst="rect">
+            <a:avLst/>
+          </a:prstGeom>
+          <a:noFill/>
+          <a:ln w="0">
+            <a:noFill/>
+          </a:ln>
+        </p:spPr>
+        <p:txBody>
+          <a:bodyPr lIns="0" rIns="0" tIns="0" bIns="0" anchor="t">
+            <a:noAutofit/>
+          </a:bodyPr>
+          <a:p>
+            <a:pPr indent="0">
+              <a:spcBef>
+                <a:spcPts val="1060"/>
+              </a:spcBef>
+              <a:buNone/>
+            </a:pPr>
+            <a:endParaRPr b="0" lang="bs-BA" sz="2400" spc="-1" strike="noStrike">
+              <a:solidFill>
+                <a:srgbClr val="009bdd"/>
+              </a:solidFill>
+              <a:latin typeface="Arial"/>
+            </a:endParaRPr>
+          </a:p>
+        </p:txBody>
+      </p:sp>
+      <p:sp>
+        <p:nvSpPr>
+          <p:cNvPr id="4" name="PlaceHolder 3"/>
+          <p:cNvSpPr>
+            <a:spLocks noGrp="1"/>
+          </p:cNvSpPr>
+          <p:nvPr>
+            <p:ph type="ftr" idx="5"/>
+          </p:nvPr>
+        </p:nvSpPr>
+        <p:spPr/>
+        <p:txBody>
+          <a:bodyPr/>
+          <a:p>
+            <a:r>
+              <a:t>Footer</a:t>
+            </a:r>
+          </a:p>
+        </p:txBody>
+      </p:sp>
+      <p:sp>
+        <p:nvSpPr>
+          <p:cNvPr id="5" name="PlaceHolder 4"/>
+          <p:cNvSpPr>
+            <a:spLocks noGrp="1"/>
+          </p:cNvSpPr>
+          <p:nvPr>
+            <p:ph type="sldNum" idx="6"/>
+          </p:nvPr>
+        </p:nvSpPr>
+        <p:spPr/>
+        <p:txBody>
+          <a:bodyPr/>
+          <a:p>
+            <a:fld id="{529AB49E-DADC-432C-AC48-C40956916D52}" type="slidenum">
+              <a:t>&lt;#&gt;</a:t>
+            </a:fld>
+          </a:p>
+        </p:txBody>
+      </p:sp>
+      <p:sp>
+        <p:nvSpPr>
+          <p:cNvPr id="6" name="PlaceHolder 5"/>
+          <p:cNvSpPr>
+            <a:spLocks noGrp="1"/>
+          </p:cNvSpPr>
+          <p:nvPr>
+            <p:ph type="dt" idx="4"/>
+          </p:nvPr>
+        </p:nvSpPr>
+        <p:spPr/>
+        <p:txBody>
+          <a:bodyPr/>
+          <a:p>
+            <a:r>
+              <a:rPr lang="en-US"/>
+              <a:t/>
+            </a:r>
+          </a:p>
+        </p:txBody>
+      </p:sp>
+    </p:spTree>
+  </p:cSld>
+</p:sldLayout>
+</file>
+
+<file path=ppt/slideLayouts/slideLayout3.xml><?xml version="1.0" encoding="utf-8"?>
+<p:sldLayout xmlns:a="http://schemas.openxmlformats.org/drawingml/2006/main" xmlns:p="http://schemas.openxmlformats.org/presentationml/2006/main" xmlns:r="http://schemas.openxmlformats.org/officeDocument/2006/relationships" xmlns:p14="http://schemas.microsoft.com/office/powerpoint/2010/main" xmlns:p15="http://schemas.microsoft.com/office/powerpoint/2012/main" xmlns:mc="http://schemas.openxmlformats.org/markup-compatibility/2006" type="twoObjAndTx" preserve="1">
+  <p:cSld name="Blue_Curve1">
+    <p:spTree>
+      <p:nvGrpSpPr>
+        <p:cNvPr id="1" name=""/>
+        <p:cNvGrpSpPr/>
+        <p:nvPr/>
+      </p:nvGrpSpPr>
+      <p:grpSpPr>
+        <a:xfrm>
+          <a:off x="0" y="0"/>
+          <a:ext cx="0" cy="0"/>
+          <a:chOff x="0" y="0"/>
+          <a:chExt cx="0" cy="0"/>
+        </a:xfrm>
+      </p:grpSpPr>
+      <p:sp>
+        <p:nvSpPr>
+          <p:cNvPr id="15" name="PlaceHolder 1"/>
+          <p:cNvSpPr>
+            <a:spLocks noGrp="1"/>
+          </p:cNvSpPr>
+          <p:nvPr>
+            <p:ph type="title"/>
+          </p:nvPr>
+        </p:nvSpPr>
+        <p:spPr>
+          <a:xfrm>
+            <a:off x="360000" y="180000"/>
+            <a:ext cx="9360000" cy="478080"/>
+          </a:xfrm>
+          <a:prstGeom prst="rect">
+            <a:avLst/>
+          </a:prstGeom>
+          <a:noFill/>
+          <a:ln w="0">
+            <a:noFill/>
+          </a:ln>
+        </p:spPr>
+        <p:txBody>
+          <a:bodyPr lIns="0" rIns="0" tIns="0" bIns="0" anchor="ctr">
+            <a:noAutofit/>
+          </a:bodyPr>
+          <a:p>
+            <a:pPr indent="0" algn="ctr">
+              <a:buNone/>
+            </a:pPr>
+            <a:endParaRPr b="0" lang="bs-BA" sz="3300" spc="-1" strike="noStrike">
+              <a:solidFill>
+                <a:srgbClr val="ffffff"/>
+              </a:solidFill>
+              <a:latin typeface="Arial"/>
+            </a:endParaRPr>
+          </a:p>
+        </p:txBody>
+      </p:sp>
+      <p:sp>
+        <p:nvSpPr>
+          <p:cNvPr id="16" name="PlaceHolder 2"/>
+          <p:cNvSpPr>
+            <a:spLocks noGrp="1"/>
+          </p:cNvSpPr>
+          <p:nvPr>
+            <p:ph/>
+          </p:nvPr>
+        </p:nvSpPr>
+        <p:spPr>
+          <a:xfrm>
+            <a:off x="360000" y="1080000"/>
+            <a:ext cx="4567320" cy="1716840"/>
+          </a:xfrm>
+          <a:prstGeom prst="rect">
+            <a:avLst/>
+          </a:prstGeom>
+          <a:noFill/>
+          <a:ln w="0">
+            <a:noFill/>
+          </a:ln>
+        </p:spPr>
+        <p:txBody>
+          <a:bodyPr lIns="0" rIns="0" tIns="0" bIns="0" anchor="t">
+            <a:noAutofit/>
+          </a:bodyPr>
+          <a:p>
+            <a:pPr indent="0">
+              <a:spcBef>
+                <a:spcPts val="1060"/>
+              </a:spcBef>
+              <a:buNone/>
+            </a:pPr>
+            <a:endParaRPr b="0" lang="bs-BA" sz="2400" spc="-1" strike="noStrike">
+              <a:solidFill>
+                <a:srgbClr val="009bdd"/>
+              </a:solidFill>
+              <a:latin typeface="Arial"/>
+            </a:endParaRPr>
+          </a:p>
+        </p:txBody>
+      </p:sp>
+      <p:sp>
+        <p:nvSpPr>
+          <p:cNvPr id="17" name="PlaceHolder 3"/>
+          <p:cNvSpPr>
+            <a:spLocks noGrp="1"/>
+          </p:cNvSpPr>
+          <p:nvPr>
+            <p:ph/>
+          </p:nvPr>
+        </p:nvSpPr>
+        <p:spPr>
+          <a:xfrm>
+            <a:off x="5155920" y="1080000"/>
+            <a:ext cx="4567320" cy="3600000"/>
+          </a:xfrm>
+          <a:prstGeom prst="rect">
+            <a:avLst/>
+          </a:prstGeom>
+          <a:noFill/>
+          <a:ln w="0">
+            <a:noFill/>
+          </a:ln>
+        </p:spPr>
+        <p:txBody>
+          <a:bodyPr lIns="0" rIns="0" tIns="0" bIns="0" anchor="t">
+            <a:noAutofit/>
+          </a:bodyPr>
+          <a:p>
+            <a:pPr indent="0">
+              <a:spcBef>
+                <a:spcPts val="1060"/>
+              </a:spcBef>
+              <a:buNone/>
+            </a:pPr>
+            <a:endParaRPr b="0" lang="bs-BA" sz="2400" spc="-1" strike="noStrike">
+              <a:solidFill>
+                <a:srgbClr val="009bdd"/>
+              </a:solidFill>
+              <a:latin typeface="Arial"/>
+            </a:endParaRPr>
+          </a:p>
+        </p:txBody>
+      </p:sp>
+      <p:sp>
+        <p:nvSpPr>
+          <p:cNvPr id="18" name="PlaceHolder 4"/>
+          <p:cNvSpPr>
+            <a:spLocks noGrp="1"/>
+          </p:cNvSpPr>
+          <p:nvPr>
+            <p:ph/>
+          </p:nvPr>
+        </p:nvSpPr>
+        <p:spPr>
+          <a:xfrm>
+            <a:off x="360000" y="2960280"/>
+            <a:ext cx="4567320" cy="1716840"/>
+          </a:xfrm>
+          <a:prstGeom prst="rect">
+            <a:avLst/>
+          </a:prstGeom>
+          <a:noFill/>
+          <a:ln w="0">
+            <a:noFill/>
+          </a:ln>
+        </p:spPr>
+        <p:txBody>
+          <a:bodyPr lIns="0" rIns="0" tIns="0" bIns="0" anchor="t">
+            <a:noAutofit/>
+          </a:bodyPr>
+          <a:p>
+            <a:pPr indent="0">
+              <a:spcBef>
+                <a:spcPts val="1060"/>
+              </a:spcBef>
+              <a:buNone/>
+            </a:pPr>
+            <a:endParaRPr b="0" lang="bs-BA" sz="2400" spc="-1" strike="noStrike">
+              <a:solidFill>
+                <a:srgbClr val="009bdd"/>
+              </a:solidFill>
+              <a:latin typeface="Arial"/>
+            </a:endParaRPr>
+          </a:p>
+        </p:txBody>
+      </p:sp>
+      <p:sp>
+        <p:nvSpPr>
+          <p:cNvPr id="6" name="PlaceHolder 5"/>
+          <p:cNvSpPr>
+            <a:spLocks noGrp="1"/>
+          </p:cNvSpPr>
+          <p:nvPr>
+            <p:ph type="ftr" idx="5"/>
+          </p:nvPr>
+        </p:nvSpPr>
+        <p:spPr/>
+        <p:txBody>
+          <a:bodyPr/>
+          <a:p>
+            <a:r>
+              <a:t>Footer</a:t>
+            </a:r>
+          </a:p>
+        </p:txBody>
+      </p:sp>
+      <p:sp>
+        <p:nvSpPr>
+          <p:cNvPr id="7" name="PlaceHolder 6"/>
+          <p:cNvSpPr>
+            <a:spLocks noGrp="1"/>
+          </p:cNvSpPr>
+          <p:nvPr>
+            <p:ph type="sldNum" idx="6"/>
+          </p:nvPr>
+        </p:nvSpPr>
+        <p:spPr/>
+        <p:txBody>
+          <a:bodyPr/>
+          <a:p>
+            <a:fld id="{480CA4B2-8A92-4AAD-8431-9496BA70631C}" type="slidenum">
+              <a:t>&lt;#&gt;</a:t>
+            </a:fld>
+          </a:p>
+        </p:txBody>
+      </p:sp>
+      <p:sp>
+        <p:nvSpPr>
+          <p:cNvPr id="8" name="PlaceHolder 7"/>
+          <p:cNvSpPr>
+            <a:spLocks noGrp="1"/>
+          </p:cNvSpPr>
+          <p:nvPr>
+            <p:ph type="dt" idx="4"/>
+          </p:nvPr>
+        </p:nvSpPr>
+        <p:spPr/>
+        <p:txBody>
+          <a:bodyPr/>
+          <a:p>
+            <a:r>
+              <a:rPr lang="en-US"/>
+              <a:t/>
+            </a:r>
+          </a:p>
+        </p:txBody>
+      </p:sp>
+    </p:spTree>
+  </p:cSld>
+</p:sldLayout>
+</file>
+
+<file path=ppt/slideLayouts/slideLayout4.xml><?xml version="1.0" encoding="utf-8"?>
+<p:sldLayout xmlns:a="http://schemas.openxmlformats.org/drawingml/2006/main" xmlns:p="http://schemas.openxmlformats.org/presentationml/2006/main" xmlns:r="http://schemas.openxmlformats.org/officeDocument/2006/relationships" xmlns:p14="http://schemas.microsoft.com/office/powerpoint/2010/main" xmlns:p15="http://schemas.microsoft.com/office/powerpoint/2012/main" xmlns:mc="http://schemas.openxmlformats.org/markup-compatibility/2006" type="twoObj" preserve="1">
+  <p:cSld name="Blue_Curve1">
+    <p:spTree>
+      <p:nvGrpSpPr>
+        <p:cNvPr id="1" name=""/>
+        <p:cNvGrpSpPr/>
+        <p:nvPr/>
+      </p:nvGrpSpPr>
+      <p:grpSpPr>
+        <a:xfrm>
+          <a:off x="0" y="0"/>
+          <a:ext cx="0" cy="0"/>
+          <a:chOff x="0" y="0"/>
+          <a:chExt cx="0" cy="0"/>
+        </a:xfrm>
+      </p:grpSpPr>
+      <p:sp>
+        <p:nvSpPr>
+          <p:cNvPr id="19" name="PlaceHolder 1"/>
+          <p:cNvSpPr>
+            <a:spLocks noGrp="1"/>
+          </p:cNvSpPr>
+          <p:nvPr>
+            <p:ph type="title"/>
+          </p:nvPr>
+        </p:nvSpPr>
+        <p:spPr>
+          <a:xfrm>
+            <a:off x="360000" y="180000"/>
+            <a:ext cx="9360000" cy="478080"/>
+          </a:xfrm>
+          <a:prstGeom prst="rect">
+            <a:avLst/>
+          </a:prstGeom>
+          <a:noFill/>
+          <a:ln w="0">
+            <a:noFill/>
+          </a:ln>
+        </p:spPr>
+        <p:txBody>
+          <a:bodyPr lIns="0" rIns="0" tIns="0" bIns="0" anchor="ctr">
+            <a:noAutofit/>
+          </a:bodyPr>
+          <a:p>
+            <a:pPr indent="0" algn="ctr">
+              <a:buNone/>
+            </a:pPr>
+            <a:endParaRPr b="0" lang="bs-BA" sz="3300" spc="-1" strike="noStrike">
+              <a:solidFill>
+                <a:srgbClr val="ffffff"/>
+              </a:solidFill>
+              <a:latin typeface="Arial"/>
+            </a:endParaRPr>
+          </a:p>
+        </p:txBody>
+      </p:sp>
+      <p:sp>
+        <p:nvSpPr>
+          <p:cNvPr id="20" name="PlaceHolder 2"/>
+          <p:cNvSpPr>
+            <a:spLocks noGrp="1"/>
+          </p:cNvSpPr>
+          <p:nvPr>
+            <p:ph/>
+          </p:nvPr>
+        </p:nvSpPr>
+        <p:spPr>
+          <a:xfrm>
+            <a:off x="360000" y="1080000"/>
+            <a:ext cx="4567320" cy="3600000"/>
+          </a:xfrm>
+          <a:prstGeom prst="rect">
+            <a:avLst/>
+          </a:prstGeom>
+          <a:noFill/>
+          <a:ln w="0">
+            <a:noFill/>
+          </a:ln>
+        </p:spPr>
+        <p:txBody>
+          <a:bodyPr lIns="0" rIns="0" tIns="0" bIns="0" anchor="t">
+            <a:noAutofit/>
+          </a:bodyPr>
+          <a:p>
+            <a:pPr indent="0">
+              <a:spcBef>
+                <a:spcPts val="1060"/>
+              </a:spcBef>
+              <a:buNone/>
+            </a:pPr>
+            <a:endParaRPr b="0" lang="bs-BA" sz="2400" spc="-1" strike="noStrike">
+              <a:solidFill>
+                <a:srgbClr val="009bdd"/>
+              </a:solidFill>
+              <a:latin typeface="Arial"/>
+            </a:endParaRPr>
+          </a:p>
+        </p:txBody>
+      </p:sp>
+      <p:sp>
+        <p:nvSpPr>
+          <p:cNvPr id="21" name="PlaceHolder 3"/>
+          <p:cNvSpPr>
+            <a:spLocks noGrp="1"/>
+          </p:cNvSpPr>
+          <p:nvPr>
+            <p:ph/>
+          </p:nvPr>
+        </p:nvSpPr>
+        <p:spPr>
+          <a:xfrm>
+            <a:off x="5155920" y="1080000"/>
+            <a:ext cx="4567320" cy="3600000"/>
+          </a:xfrm>
+          <a:prstGeom prst="rect">
+            <a:avLst/>
+          </a:prstGeom>
+          <a:noFill/>
+          <a:ln w="0">
+            <a:noFill/>
+          </a:ln>
+        </p:spPr>
+        <p:txBody>
+          <a:bodyPr lIns="0" rIns="0" tIns="0" bIns="0" anchor="t">
+            <a:noAutofit/>
+          </a:bodyPr>
+          <a:p>
+            <a:pPr indent="0">
+              <a:spcBef>
+                <a:spcPts val="1060"/>
+              </a:spcBef>
+              <a:buNone/>
+            </a:pPr>
+            <a:endParaRPr b="0" lang="bs-BA" sz="2400" spc="-1" strike="noStrike">
+              <a:solidFill>
+                <a:srgbClr val="009bdd"/>
+              </a:solidFill>
+              <a:latin typeface="Arial"/>
+            </a:endParaRPr>
+          </a:p>
+        </p:txBody>
+      </p:sp>
+      <p:sp>
+        <p:nvSpPr>
+          <p:cNvPr id="5" name="PlaceHolder 4"/>
+          <p:cNvSpPr>
+            <a:spLocks noGrp="1"/>
+          </p:cNvSpPr>
+          <p:nvPr>
+            <p:ph type="ftr" idx="5"/>
+          </p:nvPr>
+        </p:nvSpPr>
+        <p:spPr/>
+        <p:txBody>
+          <a:bodyPr/>
+          <a:p>
+            <a:r>
+              <a:t>Footer</a:t>
+            </a:r>
+          </a:p>
+        </p:txBody>
+      </p:sp>
+      <p:sp>
+        <p:nvSpPr>
+          <p:cNvPr id="6" name="PlaceHolder 5"/>
+          <p:cNvSpPr>
+            <a:spLocks noGrp="1"/>
+          </p:cNvSpPr>
+          <p:nvPr>
+            <p:ph type="sldNum" idx="6"/>
+          </p:nvPr>
+        </p:nvSpPr>
+        <p:spPr/>
+        <p:txBody>
+          <a:bodyPr/>
+          <a:p>
+            <a:fld id="{FC25D157-22E3-4101-BB1E-4252C6B2B7E8}" type="slidenum">
+              <a:t>&lt;#&gt;</a:t>
+            </a:fld>
+          </a:p>
+        </p:txBody>
+      </p:sp>
+      <p:sp>
+        <p:nvSpPr>
+          <p:cNvPr id="7" name="PlaceHolder 6"/>
+          <p:cNvSpPr>
+            <a:spLocks noGrp="1"/>
+          </p:cNvSpPr>
+          <p:nvPr>
+            <p:ph type="dt" idx="4"/>
+          </p:nvPr>
+        </p:nvSpPr>
+        <p:spPr/>
+        <p:txBody>
+          <a:bodyPr/>
+          <a:p>
+            <a:r>
+              <a:rPr lang="en-US"/>
+              <a:t/>
+            </a:r>
+          </a:p>
+        </p:txBody>
+      </p:sp>
+    </p:spTree>
+  </p:cSld>
+</p:sldLayout>
+</file>
+
+<file path=ppt/slideLayouts/slideLayout5.xml><?xml version="1.0" encoding="utf-8"?>
 <p:sldLayout xmlns:a="http://schemas.openxmlformats.org/drawingml/2006/main" xmlns:p="http://schemas.openxmlformats.org/presentationml/2006/main" xmlns:r="http://schemas.openxmlformats.org/officeDocument/2006/relationships" xmlns:p14="http://schemas.microsoft.com/office/powerpoint/2010/main" xmlns:p15="http://schemas.microsoft.com/office/powerpoint/2012/main" xmlns:mc="http://schemas.openxmlformats.org/markup-compatibility/2006" type="mediaAndTx" preserve="1">
   <p:cSld name="Blue_Curve1">
     <p:spTree>
@@ -168,7 +796,7 @@
         <p:txBody>
           <a:bodyPr/>
           <a:p>
-            <a:fld id="{54EC2A8F-A2BB-43D5-8C73-C7B1D91F9B29}" type="slidenum">
+            <a:fld id="{C7BFF568-F220-405F-A5CF-73342D7A723C}" type="slidenum">
               <a:t>&lt;#&gt;</a:t>
             </a:fld>
           </a:p>
@@ -1085,7 +1713,7 @@
             <a:pPr indent="0" algn="r">
               <a:buNone/>
             </a:pPr>
-            <a:fld id="{96B31DF4-C0F5-4974-82F2-202B90263F24}" type="slidenum">
+            <a:fld id="{F5130021-48F9-4D3D-8D1C-5721C98EBCEA}" type="slidenum">
               <a:rPr b="0" lang="bs-BA" sz="1400" spc="-1" strike="noStrike">
                 <a:solidFill>
                   <a:srgbClr val="ffffff"/>
@@ -2429,7 +3057,7 @@
             <a:pPr indent="0" algn="r">
               <a:buNone/>
             </a:pPr>
-            <a:fld id="{2E382A96-F48D-4C06-A9D5-65BAB590C67D}" type="slidenum">
+            <a:fld id="{5606E619-7E63-42EC-A6F3-EC1CB16E936B}" type="slidenum">
               <a:rPr b="0" lang="bs-BA" sz="1400" spc="-1" strike="noStrike">
                 <a:solidFill>
                   <a:srgbClr val="ffffff"/>
@@ -2452,6 +3080,9 @@
   <p:clrMap bg1="lt1" bg2="lt2" tx1="dk1" tx2="dk2" accent1="accent1" accent2="accent2" accent3="accent3" accent4="accent4" accent5="accent5" accent6="accent6" hlink="hlink" folHlink="folHlink"/>
   <p:sldLayoutIdLst>
     <p:sldLayoutId id="2147483651" r:id="rId2"/>
+    <p:sldLayoutId id="2147483652" r:id="rId3"/>
+    <p:sldLayoutId id="2147483653" r:id="rId4"/>
+    <p:sldLayoutId id="2147483654" r:id="rId5"/>
   </p:sldLayoutIdLst>
 </p:sldMaster>
 </file>
@@ -2475,7 +3106,7 @@
       </p:grpSpPr>
       <p:sp>
         <p:nvSpPr>
-          <p:cNvPr id="13" name="PlaceHolder 1"/>
+          <p:cNvPr id="22" name="PlaceHolder 1"/>
           <p:cNvSpPr>
             <a:spLocks noGrp="1"/>
           </p:cNvSpPr>
@@ -2552,7 +3183,7 @@
       </p:sp>
       <p:pic>
         <p:nvPicPr>
-          <p:cNvPr id="14" name="" descr=""/>
+          <p:cNvPr id="23" name="" descr=""/>
           <p:cNvPicPr/>
           <p:nvPr/>
         </p:nvPicPr>
@@ -2605,7 +3236,7 @@
       </p:grpSpPr>
       <p:sp>
         <p:nvSpPr>
-          <p:cNvPr id="43" name="PlaceHolder 1"/>
+          <p:cNvPr id="52" name="PlaceHolder 1"/>
           <p:cNvSpPr>
             <a:spLocks noGrp="1"/>
           </p:cNvSpPr>
@@ -2654,7 +3285,7 @@
       </p:sp>
       <p:sp>
         <p:nvSpPr>
-          <p:cNvPr id="44" name="PlaceHolder 2"/>
+          <p:cNvPr id="53" name="PlaceHolder 2"/>
           <p:cNvSpPr>
             <a:spLocks noGrp="1"/>
           </p:cNvSpPr>
@@ -2803,7 +3434,7 @@
       </p:sp>
       <p:pic>
         <p:nvPicPr>
-          <p:cNvPr id="45" name="" descr=""/>
+          <p:cNvPr id="54" name="" descr=""/>
           <p:cNvPicPr/>
           <p:nvPr/>
         </p:nvPicPr>
@@ -2826,7 +3457,7 @@
       </p:pic>
       <p:sp>
         <p:nvSpPr>
-          <p:cNvPr id="46" name=""/>
+          <p:cNvPr id="55" name=""/>
           <p:cNvSpPr/>
           <p:nvPr/>
         </p:nvSpPr>
@@ -2880,7 +3511,7 @@
         <p:txBody>
           <a:bodyPr/>
           <a:p>
-            <a:fld id="{132664B0-0497-42F0-BE4B-36495B2C9117}" type="slidenum">
+            <a:fld id="{BE01EDD7-F03D-46E8-A929-E02F58DAE629}" type="slidenum">
               <a:t>10</a:t>
             </a:fld>
           </a:p>
@@ -2900,9 +3531,9 @@
         <p:txBody>
           <a:bodyPr/>
           <a:p>
-            <a:fld id="{1AA1C342-1838-43CA-865C-23FD4FC48E39}" type="datetime1">
+            <a:fld id="{82412E8D-D253-4C84-B510-EE66C393D88C}" type="datetime1">
               <a:rPr lang="en-US"/>
-              <a:t>04/09/2024</a:t>
+              <a:t>04/20/2024</a:t>
             </a:fld>
           </a:p>
         </p:txBody>
@@ -2939,7 +3570,7 @@
       </p:grpSpPr>
       <p:sp>
         <p:nvSpPr>
-          <p:cNvPr id="47" name="PlaceHolder 1"/>
+          <p:cNvPr id="56" name="PlaceHolder 1"/>
           <p:cNvSpPr>
             <a:spLocks noGrp="1"/>
           </p:cNvSpPr>
@@ -2988,7 +3619,7 @@
       </p:sp>
       <p:sp>
         <p:nvSpPr>
-          <p:cNvPr id="48" name="PlaceHolder 2"/>
+          <p:cNvPr id="57" name="PlaceHolder 2"/>
           <p:cNvSpPr>
             <a:spLocks noGrp="1"/>
           </p:cNvSpPr>
@@ -3091,7 +3722,7 @@
       </p:sp>
       <p:pic>
         <p:nvPicPr>
-          <p:cNvPr id="49" name="" descr=""/>
+          <p:cNvPr id="58" name="" descr=""/>
           <p:cNvPicPr/>
           <p:nvPr/>
         </p:nvPicPr>
@@ -3114,7 +3745,7 @@
       </p:pic>
       <p:sp>
         <p:nvSpPr>
-          <p:cNvPr id="50" name=""/>
+          <p:cNvPr id="59" name=""/>
           <p:cNvSpPr/>
           <p:nvPr/>
         </p:nvSpPr>
@@ -3168,7 +3799,7 @@
         <p:txBody>
           <a:bodyPr/>
           <a:p>
-            <a:fld id="{93A99683-0199-46A1-8C60-DAAE91BC89BF}" type="slidenum">
+            <a:fld id="{F9933DC8-76FD-4209-8651-0926A2C282F9}" type="slidenum">
               <a:t>11</a:t>
             </a:fld>
           </a:p>
@@ -3188,9 +3819,9 @@
         <p:txBody>
           <a:bodyPr/>
           <a:p>
-            <a:fld id="{59699284-1051-458F-A7EF-7B4F808DA4A0}" type="datetime1">
+            <a:fld id="{62C0999A-0D61-48E1-A8F4-ED3D2CE82B30}" type="datetime1">
               <a:rPr lang="en-US"/>
-              <a:t>04/09/2024</a:t>
+              <a:t>04/20/2024</a:t>
             </a:fld>
           </a:p>
         </p:txBody>
@@ -3227,7 +3858,7 @@
       </p:grpSpPr>
       <p:sp>
         <p:nvSpPr>
-          <p:cNvPr id="51" name="PlaceHolder 1"/>
+          <p:cNvPr id="60" name="PlaceHolder 1"/>
           <p:cNvSpPr>
             <a:spLocks noGrp="1"/>
           </p:cNvSpPr>
@@ -3276,7 +3907,7 @@
       </p:sp>
       <p:sp>
         <p:nvSpPr>
-          <p:cNvPr id="52" name="PlaceHolder 2"/>
+          <p:cNvPr id="61" name="PlaceHolder 2"/>
           <p:cNvSpPr>
             <a:spLocks noGrp="1"/>
           </p:cNvSpPr>
@@ -3379,7 +4010,7 @@
       </p:sp>
       <p:pic>
         <p:nvPicPr>
-          <p:cNvPr id="53" name="" descr=""/>
+          <p:cNvPr id="62" name="" descr=""/>
           <p:cNvPicPr/>
           <p:nvPr/>
         </p:nvPicPr>
@@ -3414,7 +4045,7 @@
         <p:txBody>
           <a:bodyPr/>
           <a:p>
-            <a:fld id="{5E2B5913-D496-44D1-A55E-26D29A3ABDB4}" type="slidenum">
+            <a:fld id="{84FA8841-0023-47C3-AF8F-EC103843ED8F}" type="slidenum">
               <a:t>12</a:t>
             </a:fld>
           </a:p>
@@ -3434,9 +4065,9 @@
         <p:txBody>
           <a:bodyPr/>
           <a:p>
-            <a:fld id="{829BE6BD-2566-4345-9FBE-1E3718AC3EF5}" type="datetime1">
+            <a:fld id="{39F2E99D-1574-4F3F-B6B0-52541AAA1319}" type="datetime1">
               <a:rPr lang="en-US"/>
-              <a:t>04/09/2024</a:t>
+              <a:t>04/20/2024</a:t>
             </a:fld>
           </a:p>
         </p:txBody>
@@ -3473,7 +4104,7 @@
       </p:grpSpPr>
       <p:sp>
         <p:nvSpPr>
-          <p:cNvPr id="54" name="PlaceHolder 1"/>
+          <p:cNvPr id="63" name="PlaceHolder 1"/>
           <p:cNvSpPr>
             <a:spLocks noGrp="1"/>
           </p:cNvSpPr>
@@ -3522,7 +4153,7 @@
       </p:sp>
       <p:sp>
         <p:nvSpPr>
-          <p:cNvPr id="55" name="PlaceHolder 2"/>
+          <p:cNvPr id="64" name="PlaceHolder 2"/>
           <p:cNvSpPr>
             <a:spLocks noGrp="1"/>
           </p:cNvSpPr>
@@ -3643,7 +4274,7 @@
       </p:sp>
       <p:pic>
         <p:nvPicPr>
-          <p:cNvPr id="56" name="" descr=""/>
+          <p:cNvPr id="65" name="" descr=""/>
           <p:cNvPicPr/>
           <p:nvPr/>
         </p:nvPicPr>
@@ -3666,7 +4297,7 @@
       </p:pic>
       <p:pic>
         <p:nvPicPr>
-          <p:cNvPr id="57" name="" descr=""/>
+          <p:cNvPr id="66" name="" descr=""/>
           <p:cNvPicPr/>
           <p:nvPr/>
         </p:nvPicPr>
@@ -3701,7 +4332,7 @@
         <p:txBody>
           <a:bodyPr/>
           <a:p>
-            <a:fld id="{0C315EA2-DD62-4A44-8BA2-522598DD099D}" type="slidenum">
+            <a:fld id="{87FEBCAE-19DC-401C-A9AA-315D82E50061}" type="slidenum">
               <a:t>13</a:t>
             </a:fld>
           </a:p>
@@ -3721,9 +4352,9 @@
         <p:txBody>
           <a:bodyPr/>
           <a:p>
-            <a:fld id="{61610095-3250-4EAD-B809-9C66E25F41CE}" type="datetime1">
+            <a:fld id="{D30F25AC-9C61-41BC-9A70-021530A7C583}" type="datetime1">
               <a:rPr lang="en-US"/>
-              <a:t>04/09/2024</a:t>
+              <a:t>04/20/2024</a:t>
             </a:fld>
           </a:p>
         </p:txBody>
@@ -3760,7 +4391,7 @@
       </p:grpSpPr>
       <p:sp>
         <p:nvSpPr>
-          <p:cNvPr id="58" name="PlaceHolder 1"/>
+          <p:cNvPr id="67" name="PlaceHolder 1"/>
           <p:cNvSpPr>
             <a:spLocks noGrp="1"/>
           </p:cNvSpPr>
@@ -3818,7 +4449,7 @@
       </p:sp>
       <p:sp>
         <p:nvSpPr>
-          <p:cNvPr id="59" name="PlaceHolder 2"/>
+          <p:cNvPr id="68" name="PlaceHolder 2"/>
           <p:cNvSpPr>
             <a:spLocks noGrp="1"/>
           </p:cNvSpPr>
@@ -3979,7 +4610,7 @@
         <p:txBody>
           <a:bodyPr/>
           <a:p>
-            <a:fld id="{BDAA6840-3320-46DE-9FD4-427F117BBB07}" type="slidenum">
+            <a:fld id="{6091F3C2-BB18-4D38-9BD6-2411D7A32B82}" type="slidenum">
               <a:t>14</a:t>
             </a:fld>
           </a:p>
@@ -3999,9 +4630,9 @@
         <p:txBody>
           <a:bodyPr/>
           <a:p>
-            <a:fld id="{68E53807-1EC2-44FB-8D2B-500AB10E15B3}" type="datetime1">
+            <a:fld id="{C61909AF-C750-460F-B678-94521F7671E8}" type="datetime1">
               <a:rPr lang="en-US"/>
-              <a:t>04/09/2024</a:t>
+              <a:t>04/20/2024</a:t>
             </a:fld>
           </a:p>
         </p:txBody>
@@ -4038,7 +4669,7 @@
       </p:grpSpPr>
       <p:sp>
         <p:nvSpPr>
-          <p:cNvPr id="60" name="PlaceHolder 1"/>
+          <p:cNvPr id="69" name="PlaceHolder 1"/>
           <p:cNvSpPr>
             <a:spLocks noGrp="1"/>
           </p:cNvSpPr>
@@ -4087,7 +4718,7 @@
       </p:sp>
       <p:sp>
         <p:nvSpPr>
-          <p:cNvPr id="61" name="PlaceHolder 2"/>
+          <p:cNvPr id="70" name="PlaceHolder 2"/>
           <p:cNvSpPr>
             <a:spLocks noGrp="1"/>
           </p:cNvSpPr>
@@ -4156,7 +4787,7 @@
         <p:txBody>
           <a:bodyPr/>
           <a:p>
-            <a:fld id="{83F574B3-38DA-4CF7-80B3-C87D0F187963}" type="slidenum">
+            <a:fld id="{C0A67F7A-3FD3-43B0-AE6D-1E7EE2C8D9BC}" type="slidenum">
               <a:t>15</a:t>
             </a:fld>
           </a:p>
@@ -4176,9 +4807,9 @@
         <p:txBody>
           <a:bodyPr/>
           <a:p>
-            <a:fld id="{829896C0-9ACA-4A72-B293-EF3B860C7A66}" type="datetime1">
+            <a:fld id="{8722E913-C697-4546-AB0C-D71E0681E565}" type="datetime1">
               <a:rPr lang="en-US"/>
-              <a:t>04/09/2024</a:t>
+              <a:t>04/20/2024</a:t>
             </a:fld>
           </a:p>
         </p:txBody>
@@ -4215,7 +4846,7 @@
       </p:grpSpPr>
       <p:sp>
         <p:nvSpPr>
-          <p:cNvPr id="62" name="PlaceHolder 1"/>
+          <p:cNvPr id="71" name="PlaceHolder 1"/>
           <p:cNvSpPr>
             <a:spLocks noGrp="1"/>
           </p:cNvSpPr>
@@ -4264,7 +4895,7 @@
       </p:sp>
       <p:sp>
         <p:nvSpPr>
-          <p:cNvPr id="63" name="PlaceHolder 2"/>
+          <p:cNvPr id="72" name="PlaceHolder 2"/>
           <p:cNvSpPr>
             <a:spLocks noGrp="1"/>
           </p:cNvSpPr>
@@ -4358,7 +4989,7 @@
       </p:sp>
       <p:pic>
         <p:nvPicPr>
-          <p:cNvPr id="64" name="" descr=""/>
+          <p:cNvPr id="73" name="" descr=""/>
           <p:cNvPicPr/>
           <p:nvPr/>
         </p:nvPicPr>
@@ -4393,7 +5024,7 @@
         <p:txBody>
           <a:bodyPr/>
           <a:p>
-            <a:fld id="{B3FD8414-1F9D-4490-BA26-EF3802DB7417}" type="slidenum">
+            <a:fld id="{5249EFBC-2605-45EE-A338-E8763EC4B823}" type="slidenum">
               <a:t>16</a:t>
             </a:fld>
           </a:p>
@@ -4413,9 +5044,9 @@
         <p:txBody>
           <a:bodyPr/>
           <a:p>
-            <a:fld id="{1C93A688-500D-44A2-9F65-8CBADD23B5C3}" type="datetime1">
+            <a:fld id="{6E238B97-2E14-4DCF-89BF-364EAF487DB8}" type="datetime1">
               <a:rPr lang="en-US"/>
-              <a:t>04/09/2024</a:t>
+              <a:t>04/20/2024</a:t>
             </a:fld>
           </a:p>
         </p:txBody>
@@ -4452,7 +5083,7 @@
       </p:grpSpPr>
       <p:sp>
         <p:nvSpPr>
-          <p:cNvPr id="65" name="PlaceHolder 1"/>
+          <p:cNvPr id="74" name="PlaceHolder 1"/>
           <p:cNvSpPr>
             <a:spLocks noGrp="1"/>
           </p:cNvSpPr>
@@ -4501,7 +5132,7 @@
       </p:sp>
       <p:sp>
         <p:nvSpPr>
-          <p:cNvPr id="66" name="PlaceHolder 2"/>
+          <p:cNvPr id="75" name="PlaceHolder 2"/>
           <p:cNvSpPr>
             <a:spLocks noGrp="1"/>
           </p:cNvSpPr>
@@ -4704,7 +5335,7 @@
       </p:sp>
       <p:pic>
         <p:nvPicPr>
-          <p:cNvPr id="67" name="" descr=""/>
+          <p:cNvPr id="76" name="" descr=""/>
           <p:cNvPicPr/>
           <p:nvPr/>
         </p:nvPicPr>
@@ -4739,7 +5370,7 @@
         <p:txBody>
           <a:bodyPr/>
           <a:p>
-            <a:fld id="{ED1E8FE7-C595-4036-94EF-2426AE0FF3FF}" type="slidenum">
+            <a:fld id="{651197B8-3D08-4F33-83CD-50C2E87820EA}" type="slidenum">
               <a:t>17</a:t>
             </a:fld>
           </a:p>
@@ -4759,9 +5390,9 @@
         <p:txBody>
           <a:bodyPr/>
           <a:p>
-            <a:fld id="{C1E49FDE-2CE9-43D9-BA56-114D94416F63}" type="datetime1">
+            <a:fld id="{5E39A430-50F2-4010-AFC3-FBB06A0FBC76}" type="datetime1">
               <a:rPr lang="en-US"/>
-              <a:t>04/09/2024</a:t>
+              <a:t>04/20/2024</a:t>
             </a:fld>
           </a:p>
         </p:txBody>
@@ -4798,7 +5429,7 @@
       </p:grpSpPr>
       <p:sp>
         <p:nvSpPr>
-          <p:cNvPr id="68" name="PlaceHolder 1"/>
+          <p:cNvPr id="77" name="PlaceHolder 1"/>
           <p:cNvSpPr>
             <a:spLocks noGrp="1"/>
           </p:cNvSpPr>
@@ -4847,7 +5478,7 @@
       </p:sp>
       <p:sp>
         <p:nvSpPr>
-          <p:cNvPr id="69" name="PlaceHolder 2"/>
+          <p:cNvPr id="78" name="PlaceHolder 2"/>
           <p:cNvSpPr>
             <a:spLocks noGrp="1"/>
           </p:cNvSpPr>
@@ -4922,7 +5553,7 @@
       </p:sp>
       <p:pic>
         <p:nvPicPr>
-          <p:cNvPr id="70" name="" descr=""/>
+          <p:cNvPr id="79" name="" descr=""/>
           <p:cNvPicPr/>
           <p:nvPr/>
         </p:nvPicPr>
@@ -4957,7 +5588,7 @@
         <p:txBody>
           <a:bodyPr/>
           <a:p>
-            <a:fld id="{189EF0C4-0969-4D7A-9157-4122F742D03F}" type="slidenum">
+            <a:fld id="{92E6DB94-A467-40E0-84D7-FBB574B65671}" type="slidenum">
               <a:t>18</a:t>
             </a:fld>
           </a:p>
@@ -4977,9 +5608,9 @@
         <p:txBody>
           <a:bodyPr/>
           <a:p>
-            <a:fld id="{CF20E8BF-CC02-42C5-9002-A439B060A5DA}" type="datetime1">
+            <a:fld id="{7E489A9C-AC33-43D6-944A-C1121CA06E89}" type="datetime1">
               <a:rPr lang="en-US"/>
-              <a:t>04/09/2024</a:t>
+              <a:t>04/20/2024</a:t>
             </a:fld>
           </a:p>
         </p:txBody>
@@ -5016,7 +5647,7 @@
       </p:grpSpPr>
       <p:sp>
         <p:nvSpPr>
-          <p:cNvPr id="71" name="PlaceHolder 1"/>
+          <p:cNvPr id="80" name="PlaceHolder 1"/>
           <p:cNvSpPr>
             <a:spLocks noGrp="1"/>
           </p:cNvSpPr>
@@ -5065,7 +5696,7 @@
       </p:sp>
       <p:sp>
         <p:nvSpPr>
-          <p:cNvPr id="72" name="PlaceHolder 2"/>
+          <p:cNvPr id="81" name="PlaceHolder 2"/>
           <p:cNvSpPr>
             <a:spLocks noGrp="1"/>
           </p:cNvSpPr>
@@ -5198,7 +5829,7 @@
         <p:txBody>
           <a:bodyPr/>
           <a:p>
-            <a:fld id="{73D74879-5899-4318-B494-B9C5A902AD6E}" type="slidenum">
+            <a:fld id="{D63EC9A3-6AB8-4B4F-8A8B-4BEDD0F0EFCC}" type="slidenum">
               <a:t>19</a:t>
             </a:fld>
           </a:p>
@@ -5218,9 +5849,9 @@
         <p:txBody>
           <a:bodyPr/>
           <a:p>
-            <a:fld id="{D5DB4529-9105-45DB-BC90-8F17F2686B33}" type="datetime1">
+            <a:fld id="{2A6436C6-1D1F-4E66-A560-8E5E6C187796}" type="datetime1">
               <a:rPr lang="en-US"/>
-              <a:t>04/09/2024</a:t>
+              <a:t>04/20/2024</a:t>
             </a:fld>
           </a:p>
         </p:txBody>
@@ -5257,7 +5888,7 @@
       </p:grpSpPr>
       <p:sp>
         <p:nvSpPr>
-          <p:cNvPr id="15" name="PlaceHolder 1"/>
+          <p:cNvPr id="24" name="PlaceHolder 1"/>
           <p:cNvSpPr>
             <a:spLocks noGrp="1"/>
           </p:cNvSpPr>
@@ -5306,7 +5937,7 @@
       </p:sp>
       <p:sp>
         <p:nvSpPr>
-          <p:cNvPr id="16" name="PlaceHolder 2"/>
+          <p:cNvPr id="25" name="PlaceHolder 2"/>
           <p:cNvSpPr>
             <a:spLocks noGrp="1"/>
           </p:cNvSpPr>
@@ -5543,7 +6174,7 @@
         <p:txBody>
           <a:bodyPr/>
           <a:p>
-            <a:fld id="{DCD1BCB4-5862-4868-92A3-6DBDED965440}" type="slidenum">
+            <a:fld id="{902A64F2-DD24-4463-AB7B-57E22586281A}" type="slidenum">
               <a:t>2</a:t>
             </a:fld>
           </a:p>
@@ -5563,9 +6194,9 @@
         <p:txBody>
           <a:bodyPr/>
           <a:p>
-            <a:fld id="{39BA5523-5392-44A4-A57C-D4021B298422}" type="datetime1">
+            <a:fld id="{270572DB-79C5-42B6-802B-C699ED22C9E8}" type="datetime1">
               <a:rPr lang="en-US"/>
-              <a:t>04/09/2024</a:t>
+              <a:t>04/20/2024</a:t>
             </a:fld>
           </a:p>
         </p:txBody>
@@ -5602,7 +6233,7 @@
       </p:grpSpPr>
       <p:sp>
         <p:nvSpPr>
-          <p:cNvPr id="73" name="PlaceHolder 1"/>
+          <p:cNvPr id="82" name="PlaceHolder 1"/>
           <p:cNvSpPr>
             <a:spLocks noGrp="1"/>
           </p:cNvSpPr>
@@ -5651,7 +6282,7 @@
       </p:sp>
       <p:sp>
         <p:nvSpPr>
-          <p:cNvPr id="74" name="PlaceHolder 2"/>
+          <p:cNvPr id="83" name="PlaceHolder 2"/>
           <p:cNvSpPr>
             <a:spLocks noGrp="1"/>
           </p:cNvSpPr>
@@ -5990,7 +6621,7 @@
         <p:txBody>
           <a:bodyPr/>
           <a:p>
-            <a:fld id="{572C6FE0-3C68-4C2D-8696-318114F22B9B}" type="slidenum">
+            <a:fld id="{B1084EDA-A509-409C-9B60-AF95546E690A}" type="slidenum">
               <a:t>20</a:t>
             </a:fld>
           </a:p>
@@ -6010,9 +6641,9 @@
         <p:txBody>
           <a:bodyPr/>
           <a:p>
-            <a:fld id="{24F8DC3F-EF4F-4466-91CF-2FE4E5170D5F}" type="datetime1">
+            <a:fld id="{CFCEDB99-E097-4D91-B6CC-436BBF65512A}" type="datetime1">
               <a:rPr lang="en-US"/>
-              <a:t>04/09/2024</a:t>
+              <a:t>04/20/2024</a:t>
             </a:fld>
           </a:p>
         </p:txBody>
@@ -6049,7 +6680,7 @@
       </p:grpSpPr>
       <p:sp>
         <p:nvSpPr>
-          <p:cNvPr id="75" name="PlaceHolder 1"/>
+          <p:cNvPr id="84" name="PlaceHolder 1"/>
           <p:cNvSpPr>
             <a:spLocks noGrp="1"/>
           </p:cNvSpPr>
@@ -6098,7 +6729,7 @@
       </p:sp>
       <p:sp>
         <p:nvSpPr>
-          <p:cNvPr id="76" name="PlaceHolder 2"/>
+          <p:cNvPr id="85" name="PlaceHolder 2"/>
           <p:cNvSpPr>
             <a:spLocks noGrp="1"/>
           </p:cNvSpPr>
@@ -6185,7 +6816,7 @@
         <p:txBody>
           <a:bodyPr/>
           <a:p>
-            <a:fld id="{B469B4E2-34D6-4729-B4C5-05A24F8F1D1C}" type="slidenum">
+            <a:fld id="{3309ED5E-76C9-47F4-8D9D-9F0C0BF3EE9D}" type="slidenum">
               <a:t>21</a:t>
             </a:fld>
           </a:p>
@@ -6205,9 +6836,9 @@
         <p:txBody>
           <a:bodyPr/>
           <a:p>
-            <a:fld id="{3C1D9046-7A48-42DF-84CF-EE54BC37D098}" type="datetime1">
+            <a:fld id="{4D0D6461-8DC7-4485-B5CE-8BB0015660B6}" type="datetime1">
               <a:rPr lang="en-US"/>
-              <a:t>04/09/2024</a:t>
+              <a:t>04/20/2024</a:t>
             </a:fld>
           </a:p>
         </p:txBody>
@@ -6244,7 +6875,240 @@
       </p:grpSpPr>
       <p:sp>
         <p:nvSpPr>
-          <p:cNvPr id="77" name="PlaceHolder 1"/>
+          <p:cNvPr id="86" name="PlaceHolder 1"/>
+          <p:cNvSpPr>
+            <a:spLocks noGrp="1"/>
+          </p:cNvSpPr>
+          <p:nvPr>
+            <p:ph type="title"/>
+          </p:nvPr>
+        </p:nvSpPr>
+        <p:spPr>
+          <a:xfrm>
+            <a:off x="360000" y="180000"/>
+            <a:ext cx="9360000" cy="478080"/>
+          </a:xfrm>
+          <a:prstGeom prst="rect">
+            <a:avLst/>
+          </a:prstGeom>
+          <a:noFill/>
+          <a:ln w="0">
+            <a:noFill/>
+          </a:ln>
+        </p:spPr>
+        <p:txBody>
+          <a:bodyPr lIns="0" rIns="0" tIns="0" bIns="0" anchor="ctr">
+            <a:noAutofit/>
+          </a:bodyPr>
+          <a:p>
+            <a:pPr indent="0" algn="ctr">
+              <a:buNone/>
+            </a:pPr>
+            <a:r>
+              <a:rPr b="0" lang="bs-BA" sz="3300" spc="-1" strike="noStrike">
+                <a:solidFill>
+                  <a:srgbClr val="ffffff"/>
+                </a:solidFill>
+                <a:latin typeface="Arial"/>
+              </a:rPr>
+              <a:t>Bilješke o arhitekturi</a:t>
+            </a:r>
+            <a:endParaRPr b="0" lang="bs-BA" sz="3300" spc="-1" strike="noStrike">
+              <a:solidFill>
+                <a:srgbClr val="ffffff"/>
+              </a:solidFill>
+              <a:latin typeface="Arial"/>
+            </a:endParaRPr>
+          </a:p>
+        </p:txBody>
+      </p:sp>
+      <p:sp>
+        <p:nvSpPr>
+          <p:cNvPr id="87" name="PlaceHolder 2"/>
+          <p:cNvSpPr>
+            <a:spLocks noGrp="1"/>
+          </p:cNvSpPr>
+          <p:nvPr>
+            <p:ph/>
+          </p:nvPr>
+        </p:nvSpPr>
+        <p:spPr>
+          <a:xfrm>
+            <a:off x="360000" y="1080000"/>
+            <a:ext cx="9360000" cy="3600000"/>
+          </a:xfrm>
+          <a:prstGeom prst="rect">
+            <a:avLst/>
+          </a:prstGeom>
+          <a:noFill/>
+          <a:ln w="0">
+            <a:noFill/>
+          </a:ln>
+        </p:spPr>
+        <p:txBody>
+          <a:bodyPr lIns="0" rIns="0" tIns="0" bIns="0" anchor="t">
+            <a:noAutofit/>
+          </a:bodyPr>
+          <a:p>
+            <a:pPr marL="432000" indent="-324000">
+              <a:spcBef>
+                <a:spcPts val="1060"/>
+              </a:spcBef>
+              <a:buClr>
+                <a:srgbClr val="77caee"/>
+              </a:buClr>
+              <a:buSzPct val="45000"/>
+              <a:buFont typeface="Wingdings" charset="2"/>
+              <a:buChar char=""/>
+            </a:pPr>
+            <a:r>
+              <a:rPr b="0" lang="bs-BA" sz="2400" spc="-1" strike="noStrike">
+                <a:solidFill>
+                  <a:srgbClr val="009bdd"/>
+                </a:solidFill>
+                <a:latin typeface="Arial"/>
+              </a:rPr>
+              <a:t>Parseri većine asemblera pretvaraju tokenizirani asemblerski kod u dvodimenzionalno polje (tablicu) malih stabala (gdje su samo aritmetički izrazi stabla, a ostalo su pojedinačni čvorovi).</a:t>
+            </a:r>
+            <a:endParaRPr b="0" lang="bs-BA" sz="2400" spc="-1" strike="noStrike">
+              <a:solidFill>
+                <a:srgbClr val="009bdd"/>
+              </a:solidFill>
+              <a:latin typeface="Arial"/>
+            </a:endParaRPr>
+          </a:p>
+          <a:p>
+            <a:pPr marL="432000" indent="-324000">
+              <a:spcBef>
+                <a:spcPts val="1060"/>
+              </a:spcBef>
+              <a:buClr>
+                <a:srgbClr val="77caee"/>
+              </a:buClr>
+              <a:buSzPct val="45000"/>
+              <a:buFont typeface="Wingdings" charset="2"/>
+              <a:buChar char=""/>
+            </a:pPr>
+            <a:r>
+              <a:rPr b="0" lang="bs-BA" sz="2400" spc="-1" strike="noStrike">
+                <a:solidFill>
+                  <a:srgbClr val="009bdd"/>
+                </a:solidFill>
+                <a:latin typeface="Arial"/>
+              </a:rPr>
+              <a:t>Parser u ovom asembleru za PicoBlaze pretvara tokenizirani asemblerski kod u jedno veliko stablo. Korijen tog stabla je čvor s tekstom “assembly”, a čvorovi dubine 1 su mnemonike, pretprocesorske naredbe i labeli.</a:t>
+            </a:r>
+            <a:endParaRPr b="0" lang="bs-BA" sz="2400" spc="-1" strike="noStrike">
+              <a:solidFill>
+                <a:srgbClr val="009bdd"/>
+              </a:solidFill>
+              <a:latin typeface="Arial"/>
+            </a:endParaRPr>
+          </a:p>
+          <a:p>
+            <a:pPr marL="432000" indent="-324000">
+              <a:spcBef>
+                <a:spcPts val="1060"/>
+              </a:spcBef>
+              <a:buClr>
+                <a:srgbClr val="77caee"/>
+              </a:buClr>
+              <a:buSzPct val="45000"/>
+              <a:buFont typeface="Wingdings" charset="2"/>
+              <a:buChar char=""/>
+            </a:pPr>
+            <a:r>
+              <a:rPr b="0" lang="bs-BA" sz="2400" spc="-1" strike="noStrike">
+                <a:solidFill>
+                  <a:srgbClr val="009bdd"/>
+                </a:solidFill>
+                <a:latin typeface="Arial"/>
+              </a:rPr>
+              <a:t>Operandi mnemonika i pretprocesorskih naredbi njihova su djeca.</a:t>
+            </a:r>
+            <a:endParaRPr b="0" lang="bs-BA" sz="2400" spc="-1" strike="noStrike">
+              <a:solidFill>
+                <a:srgbClr val="009bdd"/>
+              </a:solidFill>
+              <a:latin typeface="Arial"/>
+            </a:endParaRPr>
+          </a:p>
+        </p:txBody>
+      </p:sp>
+      <p:sp>
+        <p:nvSpPr>
+          <p:cNvPr id="4" name="PlaceHolder 3"/>
+          <p:cNvSpPr>
+            <a:spLocks noGrp="1"/>
+          </p:cNvSpPr>
+          <p:nvPr>
+            <p:ph type="sldNum" idx="6"/>
+          </p:nvPr>
+        </p:nvSpPr>
+        <p:spPr/>
+        <p:txBody>
+          <a:bodyPr/>
+          <a:p>
+            <a:fld id="{D39B6481-0834-41B9-AC6A-524DDA0780F4}" type="slidenum">
+              <a:t>22</a:t>
+            </a:fld>
+          </a:p>
+        </p:txBody>
+      </p:sp>
+      <p:sp>
+        <p:nvSpPr>
+          <p:cNvPr id="5" name="PlaceHolder 4"/>
+          <p:cNvSpPr>
+            <a:spLocks noGrp="1"/>
+          </p:cNvSpPr>
+          <p:nvPr>
+            <p:ph type="dt" idx="4"/>
+          </p:nvPr>
+        </p:nvSpPr>
+        <p:spPr/>
+        <p:txBody>
+          <a:bodyPr/>
+          <a:p>
+            <a:fld id="{8A7C5D05-4FC6-4EB8-80AB-D517A6C1DD43}" type="datetime1">
+              <a:rPr lang="en-US"/>
+              <a:t>04/20/2024</a:t>
+            </a:fld>
+          </a:p>
+        </p:txBody>
+      </p:sp>
+    </p:spTree>
+  </p:cSld>
+  <mc:AlternateContent>
+    <mc:Choice Requires="p14">
+      <p:transition spd="slow" p14:dur="2000"/>
+    </mc:Choice>
+    <mc:Fallback>
+      <p:transition spd="slow"/>
+    </mc:Fallback>
+  </mc:AlternateContent>
+</p:sld>
+</file>
+
+<file path=ppt/slides/slide23.xml><?xml version="1.0" encoding="utf-8"?>
+<p:sld xmlns:a="http://schemas.openxmlformats.org/drawingml/2006/main" xmlns:p="http://schemas.openxmlformats.org/presentationml/2006/main" xmlns:r="http://schemas.openxmlformats.org/officeDocument/2006/relationships" xmlns:p14="http://schemas.microsoft.com/office/powerpoint/2010/main" xmlns:p15="http://schemas.microsoft.com/office/powerpoint/2012/main" xmlns:mc="http://schemas.openxmlformats.org/markup-compatibility/2006">
+  <p:cSld>
+    <p:spTree>
+      <p:nvGrpSpPr>
+        <p:cNvPr id="1" name=""/>
+        <p:cNvGrpSpPr/>
+        <p:nvPr/>
+      </p:nvGrpSpPr>
+      <p:grpSpPr>
+        <a:xfrm>
+          <a:off x="0" y="0"/>
+          <a:ext cx="0" cy="0"/>
+          <a:chOff x="0" y="0"/>
+          <a:chExt cx="0" cy="0"/>
+        </a:xfrm>
+      </p:grpSpPr>
+      <p:sp>
+        <p:nvSpPr>
+          <p:cNvPr id="88" name="PlaceHolder 1"/>
           <p:cNvSpPr>
             <a:spLocks noGrp="1"/>
           </p:cNvSpPr>
@@ -6309,8 +7173,8 @@
         <p:txBody>
           <a:bodyPr/>
           <a:p>
-            <a:fld id="{07CC83E5-2D7C-4196-9F4D-8079A396F805}" type="slidenum">
-              <a:t>22</a:t>
+            <a:fld id="{FEF86604-3D30-4DF1-8996-C71B2DD6B520}" type="slidenum">
+              <a:t>23</a:t>
             </a:fld>
           </a:p>
         </p:txBody>
@@ -6329,9 +7193,9 @@
         <p:txBody>
           <a:bodyPr/>
           <a:p>
-            <a:fld id="{9954E01E-4557-4ABB-8295-1DE512BC1966}" type="datetime1">
+            <a:fld id="{141100E6-3E38-47DD-94FD-E25E32E0AF22}" type="datetime1">
               <a:rPr lang="en-US"/>
-              <a:t>04/09/2024</a:t>
+              <a:t>04/20/2024</a:t>
             </a:fld>
           </a:p>
         </p:txBody>
@@ -6368,7 +7232,7 @@
       </p:grpSpPr>
       <p:sp>
         <p:nvSpPr>
-          <p:cNvPr id="17" name="PlaceHolder 1"/>
+          <p:cNvPr id="26" name="PlaceHolder 1"/>
           <p:cNvSpPr>
             <a:spLocks noGrp="1"/>
           </p:cNvSpPr>
@@ -6417,7 +7281,7 @@
       </p:sp>
       <p:sp>
         <p:nvSpPr>
-          <p:cNvPr id="18" name="PlaceHolder 2"/>
+          <p:cNvPr id="27" name="PlaceHolder 2"/>
           <p:cNvSpPr>
             <a:spLocks noGrp="1"/>
           </p:cNvSpPr>
@@ -6605,7 +7469,7 @@
         <p:txBody>
           <a:bodyPr/>
           <a:p>
-            <a:fld id="{5D9D82AF-9B37-4DEC-BE70-E994F85C55E3}" type="slidenum">
+            <a:fld id="{0998026A-4EE2-418E-81BA-060098B29CCC}" type="slidenum">
               <a:t>3</a:t>
             </a:fld>
           </a:p>
@@ -6625,9 +7489,9 @@
         <p:txBody>
           <a:bodyPr/>
           <a:p>
-            <a:fld id="{10FF08B9-D982-4858-B03C-1D8BB77FBCA0}" type="datetime1">
+            <a:fld id="{90E8E252-D0AD-4B60-8E79-BA7C0D4B78CF}" type="datetime1">
               <a:rPr lang="en-US"/>
-              <a:t>04/09/2024</a:t>
+              <a:t>04/20/2024</a:t>
             </a:fld>
           </a:p>
         </p:txBody>
@@ -6664,7 +7528,7 @@
       </p:grpSpPr>
       <p:sp>
         <p:nvSpPr>
-          <p:cNvPr id="19" name="PlaceHolder 1"/>
+          <p:cNvPr id="28" name="PlaceHolder 1"/>
           <p:cNvSpPr>
             <a:spLocks noGrp="1"/>
           </p:cNvSpPr>
@@ -6713,7 +7577,7 @@
       </p:sp>
       <p:sp>
         <p:nvSpPr>
-          <p:cNvPr id="20" name="PlaceHolder 2"/>
+          <p:cNvPr id="29" name="PlaceHolder 2"/>
           <p:cNvSpPr>
             <a:spLocks noGrp="1"/>
           </p:cNvSpPr>
@@ -6798,7 +7662,7 @@
       </p:sp>
       <p:pic>
         <p:nvPicPr>
-          <p:cNvPr id="21" name="" descr=""/>
+          <p:cNvPr id="30" name="" descr=""/>
           <p:cNvPicPr/>
           <p:nvPr/>
         </p:nvPicPr>
@@ -6821,7 +7685,7 @@
       </p:pic>
       <p:pic>
         <p:nvPicPr>
-          <p:cNvPr id="22" name="" descr=""/>
+          <p:cNvPr id="31" name="" descr=""/>
           <p:cNvPicPr/>
           <p:nvPr/>
         </p:nvPicPr>
@@ -6856,7 +7720,7 @@
         <p:txBody>
           <a:bodyPr/>
           <a:p>
-            <a:fld id="{649478B2-AC7B-44D1-A692-4828DE3976B9}" type="slidenum">
+            <a:fld id="{961D462E-9C6F-4A88-8E8F-6173A974FB8E}" type="slidenum">
               <a:t>4</a:t>
             </a:fld>
           </a:p>
@@ -6876,9 +7740,9 @@
         <p:txBody>
           <a:bodyPr/>
           <a:p>
-            <a:fld id="{E08CE1AE-0CC1-4B7E-8D2E-C3BD17EC13A0}" type="datetime1">
+            <a:fld id="{FB7F735E-F9C0-4913-89D5-DD2E8516C86D}" type="datetime1">
               <a:rPr lang="en-US"/>
-              <a:t>04/09/2024</a:t>
+              <a:t>04/20/2024</a:t>
             </a:fld>
           </a:p>
         </p:txBody>
@@ -6915,7 +7779,7 @@
       </p:grpSpPr>
       <p:sp>
         <p:nvSpPr>
-          <p:cNvPr id="23" name="PlaceHolder 1"/>
+          <p:cNvPr id="32" name="PlaceHolder 1"/>
           <p:cNvSpPr>
             <a:spLocks noGrp="1"/>
           </p:cNvSpPr>
@@ -6964,7 +7828,7 @@
       </p:sp>
       <p:sp>
         <p:nvSpPr>
-          <p:cNvPr id="24" name="PlaceHolder 2"/>
+          <p:cNvPr id="33" name="PlaceHolder 2"/>
           <p:cNvSpPr>
             <a:spLocks noGrp="1"/>
           </p:cNvSpPr>
@@ -7021,7 +7885,7 @@
       </p:sp>
       <p:pic>
         <p:nvPicPr>
-          <p:cNvPr id="25" name="" descr=""/>
+          <p:cNvPr id="34" name="" descr=""/>
           <p:cNvPicPr/>
           <p:nvPr/>
         </p:nvPicPr>
@@ -7044,7 +7908,7 @@
       </p:pic>
       <p:pic>
         <p:nvPicPr>
-          <p:cNvPr id="26" name="" descr=""/>
+          <p:cNvPr id="35" name="" descr=""/>
           <p:cNvPicPr/>
           <p:nvPr/>
         </p:nvPicPr>
@@ -7067,7 +7931,7 @@
       </p:pic>
       <p:sp>
         <p:nvSpPr>
-          <p:cNvPr id="27" name=""/>
+          <p:cNvPr id="36" name=""/>
           <p:cNvSpPr/>
           <p:nvPr/>
         </p:nvSpPr>
@@ -7121,7 +7985,7 @@
         <p:txBody>
           <a:bodyPr/>
           <a:p>
-            <a:fld id="{DD5D8EA7-504C-4F31-8394-DD40C18EBB57}" type="slidenum">
+            <a:fld id="{5874043C-134C-44DF-8401-1E4432DBEA6C}" type="slidenum">
               <a:t>5</a:t>
             </a:fld>
           </a:p>
@@ -7141,9 +8005,9 @@
         <p:txBody>
           <a:bodyPr/>
           <a:p>
-            <a:fld id="{5BACA872-E585-4E77-BA9D-FE70C4555015}" type="datetime1">
+            <a:fld id="{9DACF11A-7D90-4BD1-B60C-D6B90C2FBA4E}" type="datetime1">
               <a:rPr lang="en-US"/>
-              <a:t>04/09/2024</a:t>
+              <a:t>04/20/2024</a:t>
             </a:fld>
           </a:p>
         </p:txBody>
@@ -7180,7 +8044,7 @@
       </p:grpSpPr>
       <p:sp>
         <p:nvSpPr>
-          <p:cNvPr id="28" name="PlaceHolder 1"/>
+          <p:cNvPr id="37" name="PlaceHolder 1"/>
           <p:cNvSpPr>
             <a:spLocks noGrp="1"/>
           </p:cNvSpPr>
@@ -7229,7 +8093,7 @@
       </p:sp>
       <p:sp>
         <p:nvSpPr>
-          <p:cNvPr id="29" name="PlaceHolder 2"/>
+          <p:cNvPr id="38" name="PlaceHolder 2"/>
           <p:cNvSpPr>
             <a:spLocks noGrp="1"/>
           </p:cNvSpPr>
@@ -7450,7 +8314,7 @@
       </p:sp>
       <p:pic>
         <p:nvPicPr>
-          <p:cNvPr id="30" name="" descr=""/>
+          <p:cNvPr id="39" name="" descr=""/>
           <p:cNvPicPr/>
           <p:nvPr/>
         </p:nvPicPr>
@@ -7485,7 +8349,7 @@
         <p:txBody>
           <a:bodyPr/>
           <a:p>
-            <a:fld id="{354D9EF3-2C08-4DFA-9727-AE2D5FA549E8}" type="slidenum">
+            <a:fld id="{A8033B29-F74C-4307-B627-EFB55FCDAAC6}" type="slidenum">
               <a:t>6</a:t>
             </a:fld>
           </a:p>
@@ -7505,9 +8369,9 @@
         <p:txBody>
           <a:bodyPr/>
           <a:p>
-            <a:fld id="{30E611F8-CE85-4041-AA5F-2E1D4A6A3B57}" type="datetime1">
+            <a:fld id="{82BE1EEA-9951-4188-B1C1-93DBE842F1C7}" type="datetime1">
               <a:rPr lang="en-US"/>
-              <a:t>04/09/2024</a:t>
+              <a:t>04/20/2024</a:t>
             </a:fld>
           </a:p>
         </p:txBody>
@@ -7544,7 +8408,7 @@
       </p:grpSpPr>
       <p:sp>
         <p:nvSpPr>
-          <p:cNvPr id="31" name="PlaceHolder 1"/>
+          <p:cNvPr id="40" name="PlaceHolder 1"/>
           <p:cNvSpPr>
             <a:spLocks noGrp="1"/>
           </p:cNvSpPr>
@@ -7593,7 +8457,7 @@
       </p:sp>
       <p:sp>
         <p:nvSpPr>
-          <p:cNvPr id="32" name="PlaceHolder 2"/>
+          <p:cNvPr id="41" name="PlaceHolder 2"/>
           <p:cNvSpPr>
             <a:spLocks noGrp="1"/>
           </p:cNvSpPr>
@@ -7650,7 +8514,7 @@
       </p:sp>
       <p:pic>
         <p:nvPicPr>
-          <p:cNvPr id="33" name="" descr=""/>
+          <p:cNvPr id="42" name="" descr=""/>
           <p:cNvPicPr/>
           <p:nvPr/>
         </p:nvPicPr>
@@ -7673,7 +8537,7 @@
       </p:pic>
       <p:pic>
         <p:nvPicPr>
-          <p:cNvPr id="34" name="" descr=""/>
+          <p:cNvPr id="43" name="" descr=""/>
           <p:cNvPicPr/>
           <p:nvPr/>
         </p:nvPicPr>
@@ -7696,7 +8560,7 @@
       </p:pic>
       <p:sp>
         <p:nvSpPr>
-          <p:cNvPr id="35" name=""/>
+          <p:cNvPr id="44" name=""/>
           <p:cNvSpPr/>
           <p:nvPr/>
         </p:nvSpPr>
@@ -7750,7 +8614,7 @@
         <p:txBody>
           <a:bodyPr/>
           <a:p>
-            <a:fld id="{586732A3-322A-45E3-A5B6-E4E490D70D4A}" type="slidenum">
+            <a:fld id="{89E81FB2-F993-4787-8D72-BA5ADDA6BD0C}" type="slidenum">
               <a:t>7</a:t>
             </a:fld>
           </a:p>
@@ -7770,9 +8634,9 @@
         <p:txBody>
           <a:bodyPr/>
           <a:p>
-            <a:fld id="{60B37384-8E76-4C21-B79E-E67AA3023856}" type="datetime1">
+            <a:fld id="{1F4DDEBF-A84F-4088-A684-D5795EC0690A}" type="datetime1">
               <a:rPr lang="en-US"/>
-              <a:t>04/09/2024</a:t>
+              <a:t>04/20/2024</a:t>
             </a:fld>
           </a:p>
         </p:txBody>
@@ -7809,7 +8673,7 @@
       </p:grpSpPr>
       <p:sp>
         <p:nvSpPr>
-          <p:cNvPr id="36" name="PlaceHolder 1"/>
+          <p:cNvPr id="45" name="PlaceHolder 1"/>
           <p:cNvSpPr>
             <a:spLocks noGrp="1"/>
           </p:cNvSpPr>
@@ -7858,7 +8722,7 @@
       </p:sp>
       <p:sp>
         <p:nvSpPr>
-          <p:cNvPr id="37" name="PlaceHolder 2"/>
+          <p:cNvPr id="46" name="PlaceHolder 2"/>
           <p:cNvSpPr>
             <a:spLocks noGrp="1"/>
           </p:cNvSpPr>
@@ -7915,7 +8779,7 @@
       </p:sp>
       <p:pic>
         <p:nvPicPr>
-          <p:cNvPr id="38" name="" descr=""/>
+          <p:cNvPr id="47" name="" descr=""/>
           <p:cNvPicPr/>
           <p:nvPr/>
         </p:nvPicPr>
@@ -7938,7 +8802,7 @@
       </p:pic>
       <p:sp>
         <p:nvSpPr>
-          <p:cNvPr id="39" name=""/>
+          <p:cNvPr id="48" name=""/>
           <p:cNvSpPr/>
           <p:nvPr/>
         </p:nvSpPr>
@@ -7992,7 +8856,7 @@
         <p:txBody>
           <a:bodyPr/>
           <a:p>
-            <a:fld id="{D6316FA7-9D66-46FB-9B16-D7CBD66A96D0}" type="slidenum">
+            <a:fld id="{4A19BCD0-160A-481E-8760-9B7571D4E1CA}" type="slidenum">
               <a:t>8</a:t>
             </a:fld>
           </a:p>
@@ -8012,9 +8876,9 @@
         <p:txBody>
           <a:bodyPr/>
           <a:p>
-            <a:fld id="{86CF8389-BF5B-4FEA-B200-081F87B15CAB}" type="datetime1">
+            <a:fld id="{851E93A1-4C14-4481-81F8-C3B7A06B4DB3}" type="datetime1">
               <a:rPr lang="en-US"/>
-              <a:t>04/09/2024</a:t>
+              <a:t>04/20/2024</a:t>
             </a:fld>
           </a:p>
         </p:txBody>
@@ -8051,7 +8915,7 @@
       </p:grpSpPr>
       <p:sp>
         <p:nvSpPr>
-          <p:cNvPr id="40" name="PlaceHolder 1"/>
+          <p:cNvPr id="49" name="PlaceHolder 1"/>
           <p:cNvSpPr>
             <a:spLocks noGrp="1"/>
           </p:cNvSpPr>
@@ -8100,7 +8964,7 @@
       </p:sp>
       <p:sp>
         <p:nvSpPr>
-          <p:cNvPr id="41" name="PlaceHolder 2"/>
+          <p:cNvPr id="50" name="PlaceHolder 2"/>
           <p:cNvSpPr>
             <a:spLocks noGrp="1"/>
           </p:cNvSpPr>
@@ -8157,7 +9021,7 @@
       </p:sp>
       <p:pic>
         <p:nvPicPr>
-          <p:cNvPr id="42" name="" descr=""/>
+          <p:cNvPr id="51" name="" descr=""/>
           <p:cNvPicPr/>
           <p:nvPr/>
         </p:nvPicPr>
@@ -8192,7 +9056,7 @@
         <p:txBody>
           <a:bodyPr/>
           <a:p>
-            <a:fld id="{EB6C4B75-3C9B-4446-AA70-92EC5996B733}" type="slidenum">
+            <a:fld id="{7DC884F1-EDB7-48D1-94DE-70F2AD3C7C0F}" type="slidenum">
               <a:t>9</a:t>
             </a:fld>
           </a:p>
@@ -8212,9 +9076,9 @@
         <p:txBody>
           <a:bodyPr/>
           <a:p>
-            <a:fld id="{C29AD29C-C5F0-485D-ACA9-5A5A50C8A3D1}" type="datetime1">
+            <a:fld id="{51EE53EE-92BE-4614-8FA0-062D91877264}" type="datetime1">
               <a:rPr lang="en-US"/>
-              <a:t>04/09/2024</a:t>
+              <a:t>04/20/2024</a:t>
             </a:fld>
           </a:p>
         </p:txBody>

</xml_diff>

<commit_message>
Added the image of the dialog box to the presentation
</commit_message>
<xml_diff>
--- a/seminar/PicoBlaze.pptx
+++ b/seminar/PicoBlaze.pptx
@@ -86,7 +86,7 @@
         <p:txBody>
           <a:bodyPr/>
           <a:p>
-            <a:fld id="{D736E83D-0767-4FBE-BA84-9C2E24AA4E87}" type="slidenum">
+            <a:fld id="{D8E7B68A-096A-4F7E-A081-4ED105FF7FBA}" type="slidenum">
               <a:t>&lt;#&gt;</a:t>
             </a:fld>
           </a:p>
@@ -252,7 +252,7 @@
         <p:txBody>
           <a:bodyPr/>
           <a:p>
-            <a:fld id="{529AB49E-DADC-432C-AC48-C40956916D52}" type="slidenum">
+            <a:fld id="{7647052F-246A-4775-A30A-31DB58E48859}" type="slidenum">
               <a:t>&lt;#&gt;</a:t>
             </a:fld>
           </a:p>
@@ -504,7 +504,7 @@
         <p:txBody>
           <a:bodyPr/>
           <a:p>
-            <a:fld id="{480CA4B2-8A92-4AAD-8431-9496BA70631C}" type="slidenum">
+            <a:fld id="{3E7E22CA-31FB-4028-A5B6-3D6B7B30E6AB}" type="slidenum">
               <a:t>&lt;#&gt;</a:t>
             </a:fld>
           </a:p>
@@ -713,7 +713,7 @@
         <p:txBody>
           <a:bodyPr/>
           <a:p>
-            <a:fld id="{FC25D157-22E3-4101-BB1E-4252C6B2B7E8}" type="slidenum">
+            <a:fld id="{508DE0F9-3286-46DD-BBAB-96FBE71C7724}" type="slidenum">
               <a:t>&lt;#&gt;</a:t>
             </a:fld>
           </a:p>
@@ -796,7 +796,7 @@
         <p:txBody>
           <a:bodyPr/>
           <a:p>
-            <a:fld id="{C7BFF568-F220-405F-A5CF-73342D7A723C}" type="slidenum">
+            <a:fld id="{D2DC9720-8339-4B79-AD46-6227A1346406}" type="slidenum">
               <a:t>&lt;#&gt;</a:t>
             </a:fld>
           </a:p>
@@ -1270,7 +1270,7 @@
           <a:p>
             <a:endParaRPr b="0" lang="bs-BA" sz="1800" spc="-1" strike="noStrike">
               <a:solidFill>
-                <a:srgbClr val="000000"/>
+                <a:srgbClr val="ffffff"/>
               </a:solidFill>
               <a:latin typeface="Arial"/>
             </a:endParaRPr>
@@ -1713,7 +1713,7 @@
             <a:pPr indent="0" algn="r">
               <a:buNone/>
             </a:pPr>
-            <a:fld id="{F5130021-48F9-4D3D-8D1C-5721C98EBCEA}" type="slidenum">
+            <a:fld id="{5A3E673C-D041-47E1-9F04-7946576D90D8}" type="slidenum">
               <a:rPr b="0" lang="bs-BA" sz="1400" spc="-1" strike="noStrike">
                 <a:solidFill>
                   <a:srgbClr val="ffffff"/>
@@ -2182,7 +2182,7 @@
           <a:p>
             <a:endParaRPr b="0" lang="bs-BA" sz="1800" spc="-1" strike="noStrike">
               <a:solidFill>
-                <a:srgbClr val="000000"/>
+                <a:srgbClr val="ffffff"/>
               </a:solidFill>
               <a:latin typeface="Arial"/>
             </a:endParaRPr>
@@ -2614,7 +2614,7 @@
           <a:p>
             <a:endParaRPr b="0" lang="bs-BA" sz="1800" spc="-1" strike="noStrike">
               <a:solidFill>
-                <a:srgbClr val="000000"/>
+                <a:srgbClr val="ffffff"/>
               </a:solidFill>
               <a:latin typeface="Arial"/>
             </a:endParaRPr>
@@ -3057,7 +3057,7 @@
             <a:pPr indent="0" algn="r">
               <a:buNone/>
             </a:pPr>
-            <a:fld id="{5606E619-7E63-42EC-A6F3-EC1CB16E936B}" type="slidenum">
+            <a:fld id="{F54B0527-366D-4746-9102-2AC1586F0EC5}" type="slidenum">
               <a:rPr b="0" lang="bs-BA" sz="1400" spc="-1" strike="noStrike">
                 <a:solidFill>
                   <a:srgbClr val="ffffff"/>
@@ -3511,7 +3511,7 @@
         <p:txBody>
           <a:bodyPr/>
           <a:p>
-            <a:fld id="{BE01EDD7-F03D-46E8-A929-E02F58DAE629}" type="slidenum">
+            <a:fld id="{CA4FDE59-6A68-4E2F-BADC-88BE7BC05B10}" type="slidenum">
               <a:t>10</a:t>
             </a:fld>
           </a:p>
@@ -3531,9 +3531,9 @@
         <p:txBody>
           <a:bodyPr/>
           <a:p>
-            <a:fld id="{82412E8D-D253-4C84-B510-EE66C393D88C}" type="datetime1">
+            <a:fld id="{06181982-E0A6-4AFE-B24E-59ED927FF514}" type="datetime1">
               <a:rPr lang="en-US"/>
-              <a:t>04/20/2024</a:t>
+              <a:t>07/04/2024</a:t>
             </a:fld>
           </a:p>
         </p:txBody>
@@ -3799,7 +3799,7 @@
         <p:txBody>
           <a:bodyPr/>
           <a:p>
-            <a:fld id="{F9933DC8-76FD-4209-8651-0926A2C282F9}" type="slidenum">
+            <a:fld id="{E415E07F-6235-45C8-B213-B2923095E07B}" type="slidenum">
               <a:t>11</a:t>
             </a:fld>
           </a:p>
@@ -3819,9 +3819,9 @@
         <p:txBody>
           <a:bodyPr/>
           <a:p>
-            <a:fld id="{62C0999A-0D61-48E1-A8F4-ED3D2CE82B30}" type="datetime1">
+            <a:fld id="{4D25F48B-5A0D-42BD-8650-5B00BB5D6915}" type="datetime1">
               <a:rPr lang="en-US"/>
-              <a:t>04/20/2024</a:t>
+              <a:t>07/04/2024</a:t>
             </a:fld>
           </a:p>
         </p:txBody>
@@ -4045,7 +4045,7 @@
         <p:txBody>
           <a:bodyPr/>
           <a:p>
-            <a:fld id="{84FA8841-0023-47C3-AF8F-EC103843ED8F}" type="slidenum">
+            <a:fld id="{D9D03605-39E3-4958-898F-7221FE5EEE46}" type="slidenum">
               <a:t>12</a:t>
             </a:fld>
           </a:p>
@@ -4065,9 +4065,9 @@
         <p:txBody>
           <a:bodyPr/>
           <a:p>
-            <a:fld id="{39F2E99D-1574-4F3F-B6B0-52541AAA1319}" type="datetime1">
+            <a:fld id="{5EA2CC75-3AE3-4E26-A91E-B66C8DDF8B2F}" type="datetime1">
               <a:rPr lang="en-US"/>
-              <a:t>04/20/2024</a:t>
+              <a:t>07/04/2024</a:t>
             </a:fld>
           </a:p>
         </p:txBody>
@@ -4332,7 +4332,7 @@
         <p:txBody>
           <a:bodyPr/>
           <a:p>
-            <a:fld id="{87FEBCAE-19DC-401C-A9AA-315D82E50061}" type="slidenum">
+            <a:fld id="{96949188-8ECB-4224-84B1-873D00F7B9FE}" type="slidenum">
               <a:t>13</a:t>
             </a:fld>
           </a:p>
@@ -4352,9 +4352,9 @@
         <p:txBody>
           <a:bodyPr/>
           <a:p>
-            <a:fld id="{D30F25AC-9C61-41BC-9A70-021530A7C583}" type="datetime1">
+            <a:fld id="{16D6CEAB-D2BD-417D-BAF9-03567CA6E3AC}" type="datetime1">
               <a:rPr lang="en-US"/>
-              <a:t>04/20/2024</a:t>
+              <a:t>07/04/2024</a:t>
             </a:fld>
           </a:p>
         </p:txBody>
@@ -4610,7 +4610,7 @@
         <p:txBody>
           <a:bodyPr/>
           <a:p>
-            <a:fld id="{6091F3C2-BB18-4D38-9BD6-2411D7A32B82}" type="slidenum">
+            <a:fld id="{2FA425DB-DC13-4D64-829D-8B25ADA7BA78}" type="slidenum">
               <a:t>14</a:t>
             </a:fld>
           </a:p>
@@ -4630,9 +4630,9 @@
         <p:txBody>
           <a:bodyPr/>
           <a:p>
-            <a:fld id="{C61909AF-C750-460F-B678-94521F7671E8}" type="datetime1">
+            <a:fld id="{F2156D74-C157-4604-B00D-8DADDE2024FA}" type="datetime1">
               <a:rPr lang="en-US"/>
-              <a:t>04/20/2024</a:t>
+              <a:t>07/04/2024</a:t>
             </a:fld>
           </a:p>
         </p:txBody>
@@ -4787,7 +4787,7 @@
         <p:txBody>
           <a:bodyPr/>
           <a:p>
-            <a:fld id="{C0A67F7A-3FD3-43B0-AE6D-1E7EE2C8D9BC}" type="slidenum">
+            <a:fld id="{606F0592-7E9D-42CD-B43B-F1A4DB9B9D23}" type="slidenum">
               <a:t>15</a:t>
             </a:fld>
           </a:p>
@@ -4807,9 +4807,9 @@
         <p:txBody>
           <a:bodyPr/>
           <a:p>
-            <a:fld id="{8722E913-C697-4546-AB0C-D71E0681E565}" type="datetime1">
+            <a:fld id="{474556C1-ED0B-4C5A-B19B-265E96EA1F67}" type="datetime1">
               <a:rPr lang="en-US"/>
-              <a:t>04/20/2024</a:t>
+              <a:t>07/04/2024</a:t>
             </a:fld>
           </a:p>
         </p:txBody>
@@ -5024,7 +5024,7 @@
         <p:txBody>
           <a:bodyPr/>
           <a:p>
-            <a:fld id="{5249EFBC-2605-45EE-A338-E8763EC4B823}" type="slidenum">
+            <a:fld id="{0E60642E-E790-470B-80F0-3CEDF396520B}" type="slidenum">
               <a:t>16</a:t>
             </a:fld>
           </a:p>
@@ -5044,9 +5044,9 @@
         <p:txBody>
           <a:bodyPr/>
           <a:p>
-            <a:fld id="{6E238B97-2E14-4DCF-89BF-364EAF487DB8}" type="datetime1">
+            <a:fld id="{E47FA5E5-E46B-4636-800E-E0D22EA3030A}" type="datetime1">
               <a:rPr lang="en-US"/>
-              <a:t>04/20/2024</a:t>
+              <a:t>07/04/2024</a:t>
             </a:fld>
           </a:p>
         </p:txBody>
@@ -5370,7 +5370,7 @@
         <p:txBody>
           <a:bodyPr/>
           <a:p>
-            <a:fld id="{651197B8-3D08-4F33-83CD-50C2E87820EA}" type="slidenum">
+            <a:fld id="{C40ACCD2-6608-4274-A566-BF31EE844A27}" type="slidenum">
               <a:t>17</a:t>
             </a:fld>
           </a:p>
@@ -5390,9 +5390,9 @@
         <p:txBody>
           <a:bodyPr/>
           <a:p>
-            <a:fld id="{5E39A430-50F2-4010-AFC3-FBB06A0FBC76}" type="datetime1">
+            <a:fld id="{3332D819-8576-41CF-A86B-C81B779CCF1C}" type="datetime1">
               <a:rPr lang="en-US"/>
-              <a:t>04/20/2024</a:t>
+              <a:t>07/04/2024</a:t>
             </a:fld>
           </a:p>
         </p:txBody>
@@ -5588,7 +5588,7 @@
         <p:txBody>
           <a:bodyPr/>
           <a:p>
-            <a:fld id="{92E6DB94-A467-40E0-84D7-FBB574B65671}" type="slidenum">
+            <a:fld id="{C349B515-9B79-43A5-9B8F-D4EE1ED38044}" type="slidenum">
               <a:t>18</a:t>
             </a:fld>
           </a:p>
@@ -5608,9 +5608,9 @@
         <p:txBody>
           <a:bodyPr/>
           <a:p>
-            <a:fld id="{7E489A9C-AC33-43D6-944A-C1121CA06E89}" type="datetime1">
+            <a:fld id="{DDE314C6-0C8C-4D12-97BB-E28A1E4829F4}" type="datetime1">
               <a:rPr lang="en-US"/>
-              <a:t>04/20/2024</a:t>
+              <a:t>07/04/2024</a:t>
             </a:fld>
           </a:p>
         </p:txBody>
@@ -5734,7 +5734,7 @@
               <a:buChar char=""/>
             </a:pPr>
             <a:r>
-              <a:rPr b="0" lang="bs-BA" sz="2400" spc="-1" strike="noStrike">
+              <a:rPr b="0" lang="bs-BA" sz="2200" spc="-1" strike="noStrike">
                 <a:solidFill>
                   <a:srgbClr val="009bdd"/>
                 </a:solidFill>
@@ -5742,7 +5742,7 @@
               </a:rPr>
               <a:t>Moj se program koristi na fakultetu u Argentini za uvod u ugrađene sustave.</a:t>
             </a:r>
-            <a:endParaRPr b="0" lang="bs-BA" sz="2400" spc="-1" strike="noStrike">
+            <a:endParaRPr b="0" lang="bs-BA" sz="2200" spc="-1" strike="noStrike">
               <a:solidFill>
                 <a:srgbClr val="009bdd"/>
               </a:solidFill>
@@ -5762,7 +5762,7 @@
               <a:buChar char=""/>
             </a:pPr>
             <a:r>
-              <a:rPr b="0" lang="bs-BA" sz="2400" spc="-1" strike="noStrike">
+              <a:rPr b="0" lang="bs-BA" sz="2200" spc="-1" strike="noStrike">
                 <a:solidFill>
                   <a:srgbClr val="009bdd"/>
                 </a:solidFill>
@@ -5771,7 +5771,7 @@
               <a:t>Nedavno sam dobio kontributora s tog fakulteta koji se zove Agustin Izaguirre (</a:t>
             </a:r>
             <a:r>
-              <a:rPr b="0" i="1" lang="bs-BA" sz="2400" spc="-1" strike="noStrike">
+              <a:rPr b="0" i="1" lang="bs-BA" sz="2200" spc="-1" strike="noStrike">
                 <a:solidFill>
                   <a:srgbClr val="009bdd"/>
                 </a:solidFill>
@@ -5780,7 +5780,7 @@
               <a:t>agustiza</a:t>
             </a:r>
             <a:r>
-              <a:rPr b="0" lang="bs-BA" sz="2400" spc="-1" strike="noStrike">
+              <a:rPr b="0" lang="bs-BA" sz="2200" spc="-1" strike="noStrike">
                 <a:solidFill>
                   <a:srgbClr val="009bdd"/>
                 </a:solidFill>
@@ -5789,7 +5789,7 @@
               <a:t>). On je napravio nekoliko pull requestova na GitHubu, isprva sitni bug-fixi (prvo da se naredba SRA ponaša ispravno kad je </a:t>
             </a:r>
             <a:r>
-              <a:rPr b="0" i="1" lang="bs-BA" sz="2400" spc="-1" strike="noStrike">
+              <a:rPr b="0" i="1" lang="bs-BA" sz="2200" spc="-1" strike="noStrike">
                 <a:solidFill>
                   <a:srgbClr val="009bdd"/>
                 </a:solidFill>
@@ -5798,7 +5798,7 @@
               <a:t>carry flag</a:t>
             </a:r>
             <a:r>
-              <a:rPr b="0" lang="bs-BA" sz="2400" spc="-1" strike="noStrike">
+              <a:rPr b="0" lang="bs-BA" sz="2200" spc="-1" strike="noStrike">
                 <a:solidFill>
                   <a:srgbClr val="009bdd"/>
                 </a:solidFill>
@@ -5806,13 +5806,59 @@
               </a:rPr>
               <a:t> postavljen u jedinicu), a onda i dodavanje novih featuresa kao što su JEST testovi.</a:t>
             </a:r>
-            <a:endParaRPr b="0" lang="bs-BA" sz="2400" spc="-1" strike="noStrike">
+            <a:endParaRPr b="0" lang="bs-BA" sz="2200" spc="-1" strike="noStrike">
               <a:solidFill>
                 <a:srgbClr val="009bdd"/>
               </a:solidFill>
               <a:latin typeface="Arial"/>
             </a:endParaRPr>
           </a:p>
+          <a:p>
+            <a:pPr marL="432000" indent="-324000">
+              <a:spcBef>
+                <a:spcPts val="1060"/>
+              </a:spcBef>
+              <a:buClr>
+                <a:srgbClr val="77caee"/>
+              </a:buClr>
+              <a:buSzPct val="45000"/>
+              <a:buFont typeface="Wingdings" charset="2"/>
+              <a:buChar char=""/>
+            </a:pPr>
+            <a:r>
+              <a:rPr b="0" lang="bs-BA" sz="2200" spc="-1" strike="noStrike">
+                <a:solidFill>
+                  <a:srgbClr val="009bdd"/>
+                </a:solidFill>
+                <a:latin typeface="Arial"/>
+              </a:rPr>
+              <a:t>JEST testira tokenizer, parser, asembler, jezgru simulatora i evaluator aritmetičkih izraza. Međutim, </a:t>
+            </a:r>
+            <a:r>
+              <a:rPr b="0" i="1" lang="bs-BA" sz="2200" spc="-1" strike="noStrike">
+                <a:solidFill>
+                  <a:srgbClr val="009bdd"/>
+                </a:solidFill>
+                <a:latin typeface="Arial"/>
+              </a:rPr>
+              <a:t>test coverage</a:t>
+            </a:r>
+            <a:r>
+              <a:rPr b="0" lang="bs-BA" sz="2200" spc="-1" strike="noStrike">
+                <a:solidFill>
+                  <a:srgbClr val="009bdd"/>
+                </a:solidFill>
+                <a:latin typeface="Arial"/>
+              </a:rPr>
+              <a:t> je još uvijek nizak i contributori se još uvijek moraju oslanjati na ručno testiranje.</a:t>
+            </a:r>
+            <a:endParaRPr b="0" lang="bs-BA" sz="2200" spc="-1" strike="noStrike">
+              <a:solidFill>
+                <a:srgbClr val="009bdd"/>
+              </a:solidFill>
+              <a:latin typeface="Arial"/>
+            </a:endParaRPr>
+          </a:p>
         </p:txBody>
       </p:sp>
       <p:sp>
@@ -5829,7 +5875,7 @@
         <p:txBody>
           <a:bodyPr/>
           <a:p>
-            <a:fld id="{D63EC9A3-6AB8-4B4F-8A8B-4BEDD0F0EFCC}" type="slidenum">
+            <a:fld id="{DDA30351-D2AA-48F7-8D45-4F42E1784ABE}" type="slidenum">
               <a:t>19</a:t>
             </a:fld>
           </a:p>
@@ -5849,9 +5895,9 @@
         <p:txBody>
           <a:bodyPr/>
           <a:p>
-            <a:fld id="{2A6436C6-1D1F-4E66-A560-8E5E6C187796}" type="datetime1">
+            <a:fld id="{04E2A30E-D1D2-43B6-B555-30A0A5E11A04}" type="datetime1">
               <a:rPr lang="en-US"/>
-              <a:t>04/20/2024</a:t>
+              <a:t>07/04/2024</a:t>
             </a:fld>
           </a:p>
         </p:txBody>
@@ -6174,7 +6220,7 @@
         <p:txBody>
           <a:bodyPr/>
           <a:p>
-            <a:fld id="{902A64F2-DD24-4463-AB7B-57E22586281A}" type="slidenum">
+            <a:fld id="{3B042324-1A19-4921-B067-D093850E2825}" type="slidenum">
               <a:t>2</a:t>
             </a:fld>
           </a:p>
@@ -6194,9 +6240,9 @@
         <p:txBody>
           <a:bodyPr/>
           <a:p>
-            <a:fld id="{270572DB-79C5-42B6-802B-C699ED22C9E8}" type="datetime1">
+            <a:fld id="{1E15C37E-5ECC-4E54-B86F-DA4B7F319E17}" type="datetime1">
               <a:rPr lang="en-US"/>
-              <a:t>04/20/2024</a:t>
+              <a:t>07/04/2024</a:t>
             </a:fld>
           </a:p>
         </p:txBody>
@@ -6621,7 +6667,7 @@
         <p:txBody>
           <a:bodyPr/>
           <a:p>
-            <a:fld id="{B1084EDA-A509-409C-9B60-AF95546E690A}" type="slidenum">
+            <a:fld id="{D44D6507-48DC-4882-A909-36827D309341}" type="slidenum">
               <a:t>20</a:t>
             </a:fld>
           </a:p>
@@ -6641,9 +6687,9 @@
         <p:txBody>
           <a:bodyPr/>
           <a:p>
-            <a:fld id="{CFCEDB99-E097-4D91-B6CC-436BBF65512A}" type="datetime1">
+            <a:fld id="{C13E3C19-6AA2-41EA-A3A7-78439F4458B1}" type="datetime1">
               <a:rPr lang="en-US"/>
-              <a:t>04/20/2024</a:t>
+              <a:t>07/04/2024</a:t>
             </a:fld>
           </a:p>
         </p:txBody>
@@ -6802,6 +6848,94 @@
           </a:p>
         </p:txBody>
       </p:sp>
+      <p:pic>
+        <p:nvPicPr>
+          <p:cNvPr id="86" name="" descr=""/>
+          <p:cNvPicPr/>
+          <p:nvPr/>
+        </p:nvPicPr>
+        <p:blipFill>
+          <a:blip r:embed="rId1"/>
+          <a:stretch/>
+        </p:blipFill>
+        <p:spPr>
+          <a:xfrm>
+            <a:off x="2507040" y="2289960"/>
+            <a:ext cx="5090040" cy="1104480"/>
+          </a:xfrm>
+          <a:prstGeom prst="rect">
+            <a:avLst/>
+          </a:prstGeom>
+          <a:ln w="18000">
+            <a:noFill/>
+          </a:ln>
+        </p:spPr>
+      </p:pic>
+      <p:sp>
+        <p:nvSpPr>
+          <p:cNvPr id="87" name=""/>
+          <p:cNvSpPr/>
+          <p:nvPr/>
+        </p:nvSpPr>
+        <p:spPr>
+          <a:xfrm>
+            <a:off x="4898160" y="2468880"/>
+            <a:ext cx="359640" cy="359640"/>
+          </a:xfrm>
+          <a:prstGeom prst="ellipse">
+            <a:avLst/>
+          </a:prstGeom>
+          <a:noFill/>
+          <a:ln w="18000">
+            <a:solidFill>
+              <a:srgbClr val="009bdd"/>
+            </a:solidFill>
+            <a:round/>
+          </a:ln>
+        </p:spPr>
+        <p:style>
+          <a:lnRef idx="0"/>
+          <a:fillRef idx="0"/>
+          <a:effectRef idx="0"/>
+          <a:fontRef idx="minor"/>
+        </p:style>
+        <p:txBody>
+          <a:bodyPr wrap="none" lIns="90000" rIns="90000" tIns="45000" bIns="45000" anchor="ctr">
+            <a:noAutofit/>
+          </a:bodyPr>
+          <a:p>
+            <a:endParaRPr b="0" lang="bs-BA" sz="1800" spc="-1" strike="noStrike">
+              <a:solidFill>
+                <a:srgbClr val="000000"/>
+              </a:solidFill>
+              <a:latin typeface="Arial"/>
+            </a:endParaRPr>
+          </a:p>
+        </p:txBody>
+      </p:sp>
+      <p:pic>
+        <p:nvPicPr>
+          <p:cNvPr id="88" name="" descr=""/>
+          <p:cNvPicPr/>
+          <p:nvPr/>
+        </p:nvPicPr>
+        <p:blipFill>
+          <a:blip r:embed="rId2"/>
+          <a:stretch/>
+        </p:blipFill>
+        <p:spPr>
+          <a:xfrm>
+            <a:off x="1356120" y="3527640"/>
+            <a:ext cx="7330680" cy="1371240"/>
+          </a:xfrm>
+          <a:prstGeom prst="rect">
+            <a:avLst/>
+          </a:prstGeom>
+          <a:ln w="18000">
+            <a:noFill/>
+          </a:ln>
+        </p:spPr>
+      </p:pic>
       <p:sp>
         <p:nvSpPr>
           <p:cNvPr id="4" name="PlaceHolder 3"/>
@@ -6816,7 +6950,7 @@
         <p:txBody>
           <a:bodyPr/>
           <a:p>
-            <a:fld id="{3309ED5E-76C9-47F4-8D9D-9F0C0BF3EE9D}" type="slidenum">
+            <a:fld id="{B39BD62F-8D8C-427B-839F-6553DBDF4D25}" type="slidenum">
               <a:t>21</a:t>
             </a:fld>
           </a:p>
@@ -6836,9 +6970,9 @@
         <p:txBody>
           <a:bodyPr/>
           <a:p>
-            <a:fld id="{4D0D6461-8DC7-4485-B5CE-8BB0015660B6}" type="datetime1">
+            <a:fld id="{653CA531-CFF3-47F7-9215-FEAA2246F785}" type="datetime1">
               <a:rPr lang="en-US"/>
-              <a:t>04/20/2024</a:t>
+              <a:t>07/04/2024</a:t>
             </a:fld>
           </a:p>
         </p:txBody>
@@ -6875,7 +7009,7 @@
       </p:grpSpPr>
       <p:sp>
         <p:nvSpPr>
-          <p:cNvPr id="86" name="PlaceHolder 1"/>
+          <p:cNvPr id="89" name="PlaceHolder 1"/>
           <p:cNvSpPr>
             <a:spLocks noGrp="1"/>
           </p:cNvSpPr>
@@ -6924,7 +7058,7 @@
       </p:sp>
       <p:sp>
         <p:nvSpPr>
-          <p:cNvPr id="87" name="PlaceHolder 2"/>
+          <p:cNvPr id="90" name="PlaceHolder 2"/>
           <p:cNvSpPr>
             <a:spLocks noGrp="1"/>
           </p:cNvSpPr>
@@ -7049,7 +7183,7 @@
         <p:txBody>
           <a:bodyPr/>
           <a:p>
-            <a:fld id="{D39B6481-0834-41B9-AC6A-524DDA0780F4}" type="slidenum">
+            <a:fld id="{4F7526D2-8C25-4F10-8414-741A815E63A7}" type="slidenum">
               <a:t>22</a:t>
             </a:fld>
           </a:p>
@@ -7069,9 +7203,9 @@
         <p:txBody>
           <a:bodyPr/>
           <a:p>
-            <a:fld id="{8A7C5D05-4FC6-4EB8-80AB-D517A6C1DD43}" type="datetime1">
+            <a:fld id="{1ADB6AD5-B2F2-4FD5-97A1-C08F9162C341}" type="datetime1">
               <a:rPr lang="en-US"/>
-              <a:t>04/20/2024</a:t>
+              <a:t>07/04/2024</a:t>
             </a:fld>
           </a:p>
         </p:txBody>
@@ -7108,7 +7242,7 @@
       </p:grpSpPr>
       <p:sp>
         <p:nvSpPr>
-          <p:cNvPr id="88" name="PlaceHolder 1"/>
+          <p:cNvPr id="91" name="PlaceHolder 1"/>
           <p:cNvSpPr>
             <a:spLocks noGrp="1"/>
           </p:cNvSpPr>
@@ -7173,7 +7307,7 @@
         <p:txBody>
           <a:bodyPr/>
           <a:p>
-            <a:fld id="{FEF86604-3D30-4DF1-8996-C71B2DD6B520}" type="slidenum">
+            <a:fld id="{70B607D7-D646-4163-AC0F-8FB649722167}" type="slidenum">
               <a:t>23</a:t>
             </a:fld>
           </a:p>
@@ -7193,9 +7327,9 @@
         <p:txBody>
           <a:bodyPr/>
           <a:p>
-            <a:fld id="{141100E6-3E38-47DD-94FD-E25E32E0AF22}" type="datetime1">
+            <a:fld id="{121A339D-9D9D-4FC1-83CF-9C2269F5EEC9}" type="datetime1">
               <a:rPr lang="en-US"/>
-              <a:t>04/20/2024</a:t>
+              <a:t>07/04/2024</a:t>
             </a:fld>
           </a:p>
         </p:txBody>
@@ -7469,7 +7603,7 @@
         <p:txBody>
           <a:bodyPr/>
           <a:p>
-            <a:fld id="{0998026A-4EE2-418E-81BA-060098B29CCC}" type="slidenum">
+            <a:fld id="{C3394828-1795-4B38-AA73-DE060920E6F4}" type="slidenum">
               <a:t>3</a:t>
             </a:fld>
           </a:p>
@@ -7489,9 +7623,9 @@
         <p:txBody>
           <a:bodyPr/>
           <a:p>
-            <a:fld id="{90E8E252-D0AD-4B60-8E79-BA7C0D4B78CF}" type="datetime1">
+            <a:fld id="{0789566B-792C-44E7-B961-367BE04FC8F4}" type="datetime1">
               <a:rPr lang="en-US"/>
-              <a:t>04/20/2024</a:t>
+              <a:t>07/04/2024</a:t>
             </a:fld>
           </a:p>
         </p:txBody>
@@ -7720,7 +7854,7 @@
         <p:txBody>
           <a:bodyPr/>
           <a:p>
-            <a:fld id="{961D462E-9C6F-4A88-8E8F-6173A974FB8E}" type="slidenum">
+            <a:fld id="{A1E1295A-AE82-4EEA-8C6B-119C2248254A}" type="slidenum">
               <a:t>4</a:t>
             </a:fld>
           </a:p>
@@ -7740,9 +7874,9 @@
         <p:txBody>
           <a:bodyPr/>
           <a:p>
-            <a:fld id="{FB7F735E-F9C0-4913-89D5-DD2E8516C86D}" type="datetime1">
+            <a:fld id="{9228B88F-4412-4FE3-AC5E-14CECF03A7B6}" type="datetime1">
               <a:rPr lang="en-US"/>
-              <a:t>04/20/2024</a:t>
+              <a:t>07/04/2024</a:t>
             </a:fld>
           </a:p>
         </p:txBody>
@@ -7985,7 +8119,7 @@
         <p:txBody>
           <a:bodyPr/>
           <a:p>
-            <a:fld id="{5874043C-134C-44DF-8401-1E4432DBEA6C}" type="slidenum">
+            <a:fld id="{F711FC34-C1B4-411A-AAAC-927135ACB39A}" type="slidenum">
               <a:t>5</a:t>
             </a:fld>
           </a:p>
@@ -8005,9 +8139,9 @@
         <p:txBody>
           <a:bodyPr/>
           <a:p>
-            <a:fld id="{9DACF11A-7D90-4BD1-B60C-D6B90C2FBA4E}" type="datetime1">
+            <a:fld id="{BABE7AE1-7BDD-4F3E-9319-F19094A27FCC}" type="datetime1">
               <a:rPr lang="en-US"/>
-              <a:t>04/20/2024</a:t>
+              <a:t>07/04/2024</a:t>
             </a:fld>
           </a:p>
         </p:txBody>
@@ -8349,7 +8483,7 @@
         <p:txBody>
           <a:bodyPr/>
           <a:p>
-            <a:fld id="{A8033B29-F74C-4307-B627-EFB55FCDAAC6}" type="slidenum">
+            <a:fld id="{27038507-1CF4-460D-A797-7730464777BF}" type="slidenum">
               <a:t>6</a:t>
             </a:fld>
           </a:p>
@@ -8369,9 +8503,9 @@
         <p:txBody>
           <a:bodyPr/>
           <a:p>
-            <a:fld id="{82BE1EEA-9951-4188-B1C1-93DBE842F1C7}" type="datetime1">
+            <a:fld id="{3E32CB50-C98D-4FBA-B102-EEA7C1FD5A72}" type="datetime1">
               <a:rPr lang="en-US"/>
-              <a:t>04/20/2024</a:t>
+              <a:t>07/04/2024</a:t>
             </a:fld>
           </a:p>
         </p:txBody>
@@ -8501,7 +8635,25 @@
                 </a:solidFill>
                 <a:latin typeface="Arial"/>
               </a:rPr>
-              <a:t>Kada želimo da se kod asemblira, kliknemo na gumb “Assemble”.</a:t>
+              <a:t>Kada želimo da se kod asemblira, kliknemo na gumb “Assemble”. Ako to ne napravimo, a nastavimo dalje, simulirat ćemo PicoBlaze koji stalno vrti “</a:t>
+            </a:r>
+            <a:r>
+              <a:rPr b="0" lang="bs-BA" sz="2400" spc="-1" strike="noStrike">
+                <a:solidFill>
+                  <a:srgbClr val="009bdd"/>
+                </a:solidFill>
+                <a:latin typeface="Courier New"/>
+              </a:rPr>
+              <a:t>load s0, s0</a:t>
+            </a:r>
+            <a:r>
+              <a:rPr b="0" lang="bs-BA" sz="2400" spc="-1" strike="noStrike">
+                <a:solidFill>
+                  <a:srgbClr val="009bdd"/>
+                </a:solidFill>
+                <a:latin typeface="Arial"/>
+              </a:rPr>
+              <a:t>” (heksadekadski 00000).</a:t>
             </a:r>
             <a:endParaRPr b="0" lang="bs-BA" sz="2400" spc="-1" strike="noStrike">
               <a:solidFill>
@@ -8614,7 +8766,7 @@
         <p:txBody>
           <a:bodyPr/>
           <a:p>
-            <a:fld id="{89E81FB2-F993-4787-8D72-BA5ADDA6BD0C}" type="slidenum">
+            <a:fld id="{8284B993-A827-46E1-8356-20457B8D1EF7}" type="slidenum">
               <a:t>7</a:t>
             </a:fld>
           </a:p>
@@ -8634,9 +8786,9 @@
         <p:txBody>
           <a:bodyPr/>
           <a:p>
-            <a:fld id="{1F4DDEBF-A84F-4088-A684-D5795EC0690A}" type="datetime1">
+            <a:fld id="{C5436E52-98CE-4F0A-8C47-5B9E50812F8E}" type="datetime1">
               <a:rPr lang="en-US"/>
-              <a:t>04/20/2024</a:t>
+              <a:t>07/04/2024</a:t>
             </a:fld>
           </a:p>
         </p:txBody>
@@ -8856,7 +9008,7 @@
         <p:txBody>
           <a:bodyPr/>
           <a:p>
-            <a:fld id="{4A19BCD0-160A-481E-8760-9B7571D4E1CA}" type="slidenum">
+            <a:fld id="{ECB9D41D-A02A-405F-8401-0C7081C5EE66}" type="slidenum">
               <a:t>8</a:t>
             </a:fld>
           </a:p>
@@ -8876,9 +9028,9 @@
         <p:txBody>
           <a:bodyPr/>
           <a:p>
-            <a:fld id="{851E93A1-4C14-4481-81F8-C3B7A06B4DB3}" type="datetime1">
+            <a:fld id="{DE80A58A-88D2-407A-8C07-09F8D650EFF5}" type="datetime1">
               <a:rPr lang="en-US"/>
-              <a:t>04/20/2024</a:t>
+              <a:t>07/04/2024</a:t>
             </a:fld>
           </a:p>
         </p:txBody>
@@ -9056,7 +9208,7 @@
         <p:txBody>
           <a:bodyPr/>
           <a:p>
-            <a:fld id="{7DC884F1-EDB7-48D1-94DE-70F2AD3C7C0F}" type="slidenum">
+            <a:fld id="{80EBE1F5-3052-42EF-A18F-924BCF480B4B}" type="slidenum">
               <a:t>9</a:t>
             </a:fld>
           </a:p>
@@ -9076,9 +9228,9 @@
         <p:txBody>
           <a:bodyPr/>
           <a:p>
-            <a:fld id="{51EE53EE-92BE-4614-8FA0-062D91877264}" type="datetime1">
+            <a:fld id="{E6EE4A48-A926-4D6F-931C-0451AEEF4500}" type="datetime1">
               <a:rPr lang="en-US"/>
-              <a:t>04/20/2024</a:t>
+              <a:t>07/04/2024</a:t>
             </a:fld>
           </a:p>
         </p:txBody>

</xml_diff>

<commit_message>
Explained what's new in versions v4.4.0 and v4.4.1
</commit_message>
<xml_diff>
--- a/seminar/PicoBlaze.pptx
+++ b/seminar/PicoBlaze.pptx
@@ -86,7 +86,7 @@
         <p:txBody>
           <a:bodyPr/>
           <a:p>
-            <a:fld id="{D8E7B68A-096A-4F7E-A081-4ED105FF7FBA}" type="slidenum">
+            <a:fld id="{A3F32615-CB97-46D7-A1B1-2079F41FC055}" type="slidenum">
               <a:t>&lt;#&gt;</a:t>
             </a:fld>
           </a:p>
@@ -252,7 +252,7 @@
         <p:txBody>
           <a:bodyPr/>
           <a:p>
-            <a:fld id="{7647052F-246A-4775-A30A-31DB58E48859}" type="slidenum">
+            <a:fld id="{38353740-D8A8-4D80-B915-2172E6BFD39A}" type="slidenum">
               <a:t>&lt;#&gt;</a:t>
             </a:fld>
           </a:p>
@@ -504,7 +504,7 @@
         <p:txBody>
           <a:bodyPr/>
           <a:p>
-            <a:fld id="{3E7E22CA-31FB-4028-A5B6-3D6B7B30E6AB}" type="slidenum">
+            <a:fld id="{89F53B68-3E31-4355-B223-0C3F3CDA4066}" type="slidenum">
               <a:t>&lt;#&gt;</a:t>
             </a:fld>
           </a:p>
@@ -713,7 +713,7 @@
         <p:txBody>
           <a:bodyPr/>
           <a:p>
-            <a:fld id="{508DE0F9-3286-46DD-BBAB-96FBE71C7724}" type="slidenum">
+            <a:fld id="{0939F144-A12A-4EE4-B299-7236BF662BC2}" type="slidenum">
               <a:t>&lt;#&gt;</a:t>
             </a:fld>
           </a:p>
@@ -796,7 +796,7 @@
         <p:txBody>
           <a:bodyPr/>
           <a:p>
-            <a:fld id="{D2DC9720-8339-4B79-AD46-6227A1346406}" type="slidenum">
+            <a:fld id="{E2C2431D-A0A5-4ED1-8D9C-E5BC87395783}" type="slidenum">
               <a:t>&lt;#&gt;</a:t>
             </a:fld>
           </a:p>
@@ -1713,7 +1713,7 @@
             <a:pPr indent="0" algn="r">
               <a:buNone/>
             </a:pPr>
-            <a:fld id="{5A3E673C-D041-47E1-9F04-7946576D90D8}" type="slidenum">
+            <a:fld id="{47DC2EE2-67AA-408B-8C93-F4A483B82D60}" type="slidenum">
               <a:rPr b="0" lang="bs-BA" sz="1400" spc="-1" strike="noStrike">
                 <a:solidFill>
                   <a:srgbClr val="ffffff"/>
@@ -3057,7 +3057,7 @@
             <a:pPr indent="0" algn="r">
               <a:buNone/>
             </a:pPr>
-            <a:fld id="{F54B0527-366D-4746-9102-2AC1586F0EC5}" type="slidenum">
+            <a:fld id="{243F7FD9-3D85-4796-9909-0800641FD4F4}" type="slidenum">
               <a:rPr b="0" lang="bs-BA" sz="1400" spc="-1" strike="noStrike">
                 <a:solidFill>
                   <a:srgbClr val="ffffff"/>
@@ -3511,7 +3511,7 @@
         <p:txBody>
           <a:bodyPr/>
           <a:p>
-            <a:fld id="{CA4FDE59-6A68-4E2F-BADC-88BE7BC05B10}" type="slidenum">
+            <a:fld id="{EE43B80B-0DE2-4145-9A19-7CB8287C4286}" type="slidenum">
               <a:t>10</a:t>
             </a:fld>
           </a:p>
@@ -3531,9 +3531,9 @@
         <p:txBody>
           <a:bodyPr/>
           <a:p>
-            <a:fld id="{06181982-E0A6-4AFE-B24E-59ED927FF514}" type="datetime1">
+            <a:fld id="{B73858E3-58C5-4CC5-93F9-91C10CED7932}" type="datetime1">
               <a:rPr lang="en-US"/>
-              <a:t>07/04/2024</a:t>
+              <a:t>09/08/2024</a:t>
             </a:fld>
           </a:p>
         </p:txBody>
@@ -3799,7 +3799,7 @@
         <p:txBody>
           <a:bodyPr/>
           <a:p>
-            <a:fld id="{E415E07F-6235-45C8-B213-B2923095E07B}" type="slidenum">
+            <a:fld id="{FA134AE3-CCEE-4D92-90F2-92643739C85B}" type="slidenum">
               <a:t>11</a:t>
             </a:fld>
           </a:p>
@@ -3819,9 +3819,9 @@
         <p:txBody>
           <a:bodyPr/>
           <a:p>
-            <a:fld id="{4D25F48B-5A0D-42BD-8650-5B00BB5D6915}" type="datetime1">
+            <a:fld id="{1CA68BC0-6729-44FE-BDF5-D63BE9B7611B}" type="datetime1">
               <a:rPr lang="en-US"/>
-              <a:t>07/04/2024</a:t>
+              <a:t>09/08/2024</a:t>
             </a:fld>
           </a:p>
         </p:txBody>
@@ -4045,7 +4045,7 @@
         <p:txBody>
           <a:bodyPr/>
           <a:p>
-            <a:fld id="{D9D03605-39E3-4958-898F-7221FE5EEE46}" type="slidenum">
+            <a:fld id="{649DA565-900B-4F3C-8DDD-943F5E828BF9}" type="slidenum">
               <a:t>12</a:t>
             </a:fld>
           </a:p>
@@ -4065,9 +4065,9 @@
         <p:txBody>
           <a:bodyPr/>
           <a:p>
-            <a:fld id="{5EA2CC75-3AE3-4E26-A91E-B66C8DDF8B2F}" type="datetime1">
+            <a:fld id="{C8E77E25-2858-4709-8E5E-7350BC0270EA}" type="datetime1">
               <a:rPr lang="en-US"/>
-              <a:t>07/04/2024</a:t>
+              <a:t>09/08/2024</a:t>
             </a:fld>
           </a:p>
         </p:txBody>
@@ -4332,7 +4332,7 @@
         <p:txBody>
           <a:bodyPr/>
           <a:p>
-            <a:fld id="{96949188-8ECB-4224-84B1-873D00F7B9FE}" type="slidenum">
+            <a:fld id="{F9376B17-1C30-4485-A077-AB2C21CF553C}" type="slidenum">
               <a:t>13</a:t>
             </a:fld>
           </a:p>
@@ -4352,9 +4352,9 @@
         <p:txBody>
           <a:bodyPr/>
           <a:p>
-            <a:fld id="{16D6CEAB-D2BD-417D-BAF9-03567CA6E3AC}" type="datetime1">
+            <a:fld id="{46B97DD5-C73A-4297-8967-DB6C5F6021F0}" type="datetime1">
               <a:rPr lang="en-US"/>
-              <a:t>07/04/2024</a:t>
+              <a:t>09/08/2024</a:t>
             </a:fld>
           </a:p>
         </p:txBody>
@@ -4610,7 +4610,7 @@
         <p:txBody>
           <a:bodyPr/>
           <a:p>
-            <a:fld id="{2FA425DB-DC13-4D64-829D-8B25ADA7BA78}" type="slidenum">
+            <a:fld id="{9639907F-A58F-4A43-9E1D-A9B89D8065A9}" type="slidenum">
               <a:t>14</a:t>
             </a:fld>
           </a:p>
@@ -4630,9 +4630,9 @@
         <p:txBody>
           <a:bodyPr/>
           <a:p>
-            <a:fld id="{F2156D74-C157-4604-B00D-8DADDE2024FA}" type="datetime1">
+            <a:fld id="{1B2636A1-D512-4BD8-9CEA-85131A4DE8FC}" type="datetime1">
               <a:rPr lang="en-US"/>
-              <a:t>07/04/2024</a:t>
+              <a:t>09/08/2024</a:t>
             </a:fld>
           </a:p>
         </p:txBody>
@@ -4787,7 +4787,7 @@
         <p:txBody>
           <a:bodyPr/>
           <a:p>
-            <a:fld id="{606F0592-7E9D-42CD-B43B-F1A4DB9B9D23}" type="slidenum">
+            <a:fld id="{B68BD1AD-F700-423E-B30E-F71EBDDFD698}" type="slidenum">
               <a:t>15</a:t>
             </a:fld>
           </a:p>
@@ -4807,9 +4807,9 @@
         <p:txBody>
           <a:bodyPr/>
           <a:p>
-            <a:fld id="{474556C1-ED0B-4C5A-B19B-265E96EA1F67}" type="datetime1">
+            <a:fld id="{A213BE18-DA5E-4936-A863-D19E14E2B75E}" type="datetime1">
               <a:rPr lang="en-US"/>
-              <a:t>07/04/2024</a:t>
+              <a:t>09/08/2024</a:t>
             </a:fld>
           </a:p>
         </p:txBody>
@@ -5024,7 +5024,7 @@
         <p:txBody>
           <a:bodyPr/>
           <a:p>
-            <a:fld id="{0E60642E-E790-470B-80F0-3CEDF396520B}" type="slidenum">
+            <a:fld id="{44CA1D7E-E970-49F7-9E5A-8F13141C3FEC}" type="slidenum">
               <a:t>16</a:t>
             </a:fld>
           </a:p>
@@ -5044,9 +5044,9 @@
         <p:txBody>
           <a:bodyPr/>
           <a:p>
-            <a:fld id="{E47FA5E5-E46B-4636-800E-E0D22EA3030A}" type="datetime1">
+            <a:fld id="{14F60D6E-C941-40BE-A2F4-F7D349E1DD7A}" type="datetime1">
               <a:rPr lang="en-US"/>
-              <a:t>07/04/2024</a:t>
+              <a:t>09/08/2024</a:t>
             </a:fld>
           </a:p>
         </p:txBody>
@@ -5370,7 +5370,7 @@
         <p:txBody>
           <a:bodyPr/>
           <a:p>
-            <a:fld id="{C40ACCD2-6608-4274-A566-BF31EE844A27}" type="slidenum">
+            <a:fld id="{BDC3A0CB-EDC4-4F1E-B1F9-3384B8FF70C4}" type="slidenum">
               <a:t>17</a:t>
             </a:fld>
           </a:p>
@@ -5390,9 +5390,9 @@
         <p:txBody>
           <a:bodyPr/>
           <a:p>
-            <a:fld id="{3332D819-8576-41CF-A86B-C81B779CCF1C}" type="datetime1">
+            <a:fld id="{D1E39FD2-0929-4B8B-ABFD-7FBF470250D0}" type="datetime1">
               <a:rPr lang="en-US"/>
-              <a:t>07/04/2024</a:t>
+              <a:t>09/08/2024</a:t>
             </a:fld>
           </a:p>
         </p:txBody>
@@ -5588,7 +5588,7 @@
         <p:txBody>
           <a:bodyPr/>
           <a:p>
-            <a:fld id="{C349B515-9B79-43A5-9B8F-D4EE1ED38044}" type="slidenum">
+            <a:fld id="{B80C169C-29A9-4D65-B4B0-BD0599ACEE76}" type="slidenum">
               <a:t>18</a:t>
             </a:fld>
           </a:p>
@@ -5608,9 +5608,9 @@
         <p:txBody>
           <a:bodyPr/>
           <a:p>
-            <a:fld id="{DDE314C6-0C8C-4D12-97BB-E28A1E4829F4}" type="datetime1">
+            <a:fld id="{AFEA9986-43B0-4C22-A113-33565F7FABA8}" type="datetime1">
               <a:rPr lang="en-US"/>
-              <a:t>07/04/2024</a:t>
+              <a:t>09/08/2024</a:t>
             </a:fld>
           </a:p>
         </p:txBody>
@@ -5875,7 +5875,7 @@
         <p:txBody>
           <a:bodyPr/>
           <a:p>
-            <a:fld id="{DDA30351-D2AA-48F7-8D45-4F42E1784ABE}" type="slidenum">
+            <a:fld id="{A48F4597-1AA9-47B6-90EB-11E72C058227}" type="slidenum">
               <a:t>19</a:t>
             </a:fld>
           </a:p>
@@ -5895,9 +5895,9 @@
         <p:txBody>
           <a:bodyPr/>
           <a:p>
-            <a:fld id="{04E2A30E-D1D2-43B6-B555-30A0A5E11A04}" type="datetime1">
+            <a:fld id="{8135A717-0D25-4FFF-B491-EC5E10B01D54}" type="datetime1">
               <a:rPr lang="en-US"/>
-              <a:t>07/04/2024</a:t>
+              <a:t>09/08/2024</a:t>
             </a:fld>
           </a:p>
         </p:txBody>
@@ -6220,7 +6220,7 @@
         <p:txBody>
           <a:bodyPr/>
           <a:p>
-            <a:fld id="{3B042324-1A19-4921-B067-D093850E2825}" type="slidenum">
+            <a:fld id="{EDFB0802-5259-44E7-A65D-F36640430D8D}" type="slidenum">
               <a:t>2</a:t>
             </a:fld>
           </a:p>
@@ -6240,9 +6240,9 @@
         <p:txBody>
           <a:bodyPr/>
           <a:p>
-            <a:fld id="{1E15C37E-5ECC-4E54-B86F-DA4B7F319E17}" type="datetime1">
+            <a:fld id="{6DE92A0D-16D2-4D6E-9CDA-2727A70FF11A}" type="datetime1">
               <a:rPr lang="en-US"/>
-              <a:t>07/04/2024</a:t>
+              <a:t>09/08/2024</a:t>
             </a:fld>
           </a:p>
         </p:txBody>
@@ -6667,7 +6667,7 @@
         <p:txBody>
           <a:bodyPr/>
           <a:p>
-            <a:fld id="{D44D6507-48DC-4882-A909-36827D309341}" type="slidenum">
+            <a:fld id="{C0552D02-7EEE-415D-8AC0-D35A6C16DEA8}" type="slidenum">
               <a:t>20</a:t>
             </a:fld>
           </a:p>
@@ -6687,9 +6687,9 @@
         <p:txBody>
           <a:bodyPr/>
           <a:p>
-            <a:fld id="{C13E3C19-6AA2-41EA-A3A7-78439F4458B1}" type="datetime1">
+            <a:fld id="{9C2CF006-C061-4870-803B-1462ED1ACB00}" type="datetime1">
               <a:rPr lang="en-US"/>
-              <a:t>07/04/2024</a:t>
+              <a:t>09/08/2024</a:t>
             </a:fld>
           </a:p>
         </p:txBody>
@@ -6950,7 +6950,7 @@
         <p:txBody>
           <a:bodyPr/>
           <a:p>
-            <a:fld id="{B39BD62F-8D8C-427B-839F-6553DBDF4D25}" type="slidenum">
+            <a:fld id="{59FD2E6B-D2B1-44DE-B305-5E98D8F24E1E}" type="slidenum">
               <a:t>21</a:t>
             </a:fld>
           </a:p>
@@ -6970,9 +6970,9 @@
         <p:txBody>
           <a:bodyPr/>
           <a:p>
-            <a:fld id="{653CA531-CFF3-47F7-9215-FEAA2246F785}" type="datetime1">
+            <a:fld id="{B39D97EC-F10C-4771-A0B1-98F1259EBC4A}" type="datetime1">
               <a:rPr lang="en-US"/>
-              <a:t>07/04/2024</a:t>
+              <a:t>09/08/2024</a:t>
             </a:fld>
           </a:p>
         </p:txBody>
@@ -7183,7 +7183,7 @@
         <p:txBody>
           <a:bodyPr/>
           <a:p>
-            <a:fld id="{4F7526D2-8C25-4F10-8414-741A815E63A7}" type="slidenum">
+            <a:fld id="{434EE30F-87E5-4D7A-AEE6-1AA8783534CB}" type="slidenum">
               <a:t>22</a:t>
             </a:fld>
           </a:p>
@@ -7203,9 +7203,9 @@
         <p:txBody>
           <a:bodyPr/>
           <a:p>
-            <a:fld id="{1ADB6AD5-B2F2-4FD5-97A1-C08F9162C341}" type="datetime1">
+            <a:fld id="{7F8D665F-E33A-4B6F-BF45-CB174ED7AACE}" type="datetime1">
               <a:rPr lang="en-US"/>
-              <a:t>07/04/2024</a:t>
+              <a:t>09/08/2024</a:t>
             </a:fld>
           </a:p>
         </p:txBody>
@@ -7307,7 +7307,7 @@
         <p:txBody>
           <a:bodyPr/>
           <a:p>
-            <a:fld id="{70B607D7-D646-4163-AC0F-8FB649722167}" type="slidenum">
+            <a:fld id="{4D0F63DB-31B4-4975-937D-C79F382592B7}" type="slidenum">
               <a:t>23</a:t>
             </a:fld>
           </a:p>
@@ -7327,9 +7327,9 @@
         <p:txBody>
           <a:bodyPr/>
           <a:p>
-            <a:fld id="{121A339D-9D9D-4FC1-83CF-9C2269F5EEC9}" type="datetime1">
+            <a:fld id="{71CDD637-9C03-42F8-9A6F-1DD950A1FC7C}" type="datetime1">
               <a:rPr lang="en-US"/>
-              <a:t>07/04/2024</a:t>
+              <a:t>09/08/2024</a:t>
             </a:fld>
           </a:p>
         </p:txBody>
@@ -7603,7 +7603,7 @@
         <p:txBody>
           <a:bodyPr/>
           <a:p>
-            <a:fld id="{C3394828-1795-4B38-AA73-DE060920E6F4}" type="slidenum">
+            <a:fld id="{552E14B4-5061-4DCD-8673-565D8A1C1695}" type="slidenum">
               <a:t>3</a:t>
             </a:fld>
           </a:p>
@@ -7623,9 +7623,9 @@
         <p:txBody>
           <a:bodyPr/>
           <a:p>
-            <a:fld id="{0789566B-792C-44E7-B961-367BE04FC8F4}" type="datetime1">
+            <a:fld id="{4D8BFA0A-DC43-458F-A0EF-17D0CF15DEA4}" type="datetime1">
               <a:rPr lang="en-US"/>
-              <a:t>07/04/2024</a:t>
+              <a:t>09/08/2024</a:t>
             </a:fld>
           </a:p>
         </p:txBody>
@@ -7854,7 +7854,7 @@
         <p:txBody>
           <a:bodyPr/>
           <a:p>
-            <a:fld id="{A1E1295A-AE82-4EEA-8C6B-119C2248254A}" type="slidenum">
+            <a:fld id="{D5D9B14B-4530-4953-B1D3-B0865EAE197C}" type="slidenum">
               <a:t>4</a:t>
             </a:fld>
           </a:p>
@@ -7874,9 +7874,9 @@
         <p:txBody>
           <a:bodyPr/>
           <a:p>
-            <a:fld id="{9228B88F-4412-4FE3-AC5E-14CECF03A7B6}" type="datetime1">
+            <a:fld id="{C040156E-48CD-49D8-8DD9-51B8B49ADC60}" type="datetime1">
               <a:rPr lang="en-US"/>
-              <a:t>07/04/2024</a:t>
+              <a:t>09/08/2024</a:t>
             </a:fld>
           </a:p>
         </p:txBody>
@@ -8119,7 +8119,7 @@
         <p:txBody>
           <a:bodyPr/>
           <a:p>
-            <a:fld id="{F711FC34-C1B4-411A-AAAC-927135ACB39A}" type="slidenum">
+            <a:fld id="{2C5AAED9-FDBA-4F14-99D5-C55F275EB3AA}" type="slidenum">
               <a:t>5</a:t>
             </a:fld>
           </a:p>
@@ -8139,9 +8139,9 @@
         <p:txBody>
           <a:bodyPr/>
           <a:p>
-            <a:fld id="{BABE7AE1-7BDD-4F3E-9319-F19094A27FCC}" type="datetime1">
+            <a:fld id="{91955CF2-BB66-49AC-9810-3E9EFDF0BA07}" type="datetime1">
               <a:rPr lang="en-US"/>
-              <a:t>07/04/2024</a:t>
+              <a:t>09/08/2024</a:t>
             </a:fld>
           </a:p>
         </p:txBody>
@@ -8483,7 +8483,7 @@
         <p:txBody>
           <a:bodyPr/>
           <a:p>
-            <a:fld id="{27038507-1CF4-460D-A797-7730464777BF}" type="slidenum">
+            <a:fld id="{5D5568E4-CB6D-4D37-8DBA-1DCB511DD50E}" type="slidenum">
               <a:t>6</a:t>
             </a:fld>
           </a:p>
@@ -8503,9 +8503,9 @@
         <p:txBody>
           <a:bodyPr/>
           <a:p>
-            <a:fld id="{3E32CB50-C98D-4FBA-B102-EEA7C1FD5A72}" type="datetime1">
+            <a:fld id="{2E18801D-04DD-4198-810E-5006F4B8B67C}" type="datetime1">
               <a:rPr lang="en-US"/>
-              <a:t>07/04/2024</a:t>
+              <a:t>09/08/2024</a:t>
             </a:fld>
           </a:p>
         </p:txBody>
@@ -8629,7 +8629,7 @@
               <a:buChar char=""/>
             </a:pPr>
             <a:r>
-              <a:rPr b="0" lang="bs-BA" sz="2400" spc="-1" strike="noStrike">
+              <a:rPr b="0" lang="bs-BA" sz="1600" spc="-1" strike="noStrike">
                 <a:solidFill>
                   <a:srgbClr val="009bdd"/>
                 </a:solidFill>
@@ -8638,7 +8638,7 @@
               <a:t>Kada želimo da se kod asemblira, kliknemo na gumb “Assemble”. Ako to ne napravimo, a nastavimo dalje, simulirat ćemo PicoBlaze koji stalno vrti “</a:t>
             </a:r>
             <a:r>
-              <a:rPr b="0" lang="bs-BA" sz="2400" spc="-1" strike="noStrike">
+              <a:rPr b="0" lang="bs-BA" sz="1600" spc="-1" strike="noStrike">
                 <a:solidFill>
                   <a:srgbClr val="009bdd"/>
                 </a:solidFill>
@@ -8647,7 +8647,7 @@
               <a:t>load s0, s0</a:t>
             </a:r>
             <a:r>
-              <a:rPr b="0" lang="bs-BA" sz="2400" spc="-1" strike="noStrike">
+              <a:rPr b="0" lang="bs-BA" sz="1600" spc="-1" strike="noStrike">
                 <a:solidFill>
                   <a:srgbClr val="009bdd"/>
                 </a:solidFill>
@@ -8655,7 +8655,53 @@
               </a:rPr>
               <a:t>” (heksadekadski 00000).</a:t>
             </a:r>
-            <a:endParaRPr b="0" lang="bs-BA" sz="2400" spc="-1" strike="noStrike">
+            <a:endParaRPr b="0" lang="bs-BA" sz="1600" spc="-1" strike="noStrike">
+              <a:solidFill>
+                <a:srgbClr val="009bdd"/>
+              </a:solidFill>
+              <a:latin typeface="Arial"/>
+            </a:endParaRPr>
+          </a:p>
+          <a:p>
+            <a:pPr marL="432000" indent="-324000">
+              <a:spcBef>
+                <a:spcPts val="1060"/>
+              </a:spcBef>
+              <a:buClr>
+                <a:srgbClr val="77caee"/>
+              </a:buClr>
+              <a:buSzPct val="45000"/>
+              <a:buFont typeface="Wingdings" charset="2"/>
+              <a:buChar char=""/>
+            </a:pPr>
+            <a:r>
+              <a:rPr b="0" lang="bs-BA" sz="1600" spc="-1" strike="noStrike">
+                <a:solidFill>
+                  <a:srgbClr val="009bdd"/>
+                </a:solidFill>
+                <a:latin typeface="Arial"/>
+              </a:rPr>
+              <a:t>Verzija v4.4.0 upozorava nas </a:t>
+            </a:r>
+            <a:r>
+              <a:rPr b="0" i="1" lang="bs-BA" sz="1600" spc="-1" strike="noStrike">
+                <a:solidFill>
+                  <a:srgbClr val="009bdd"/>
+                </a:solidFill>
+                <a:latin typeface="Arial"/>
+              </a:rPr>
+              <a:t>confirm</a:t>
+            </a:r>
+            <a:r>
+              <a:rPr b="0" lang="bs-BA" sz="1600" spc="-1" strike="noStrike">
+                <a:solidFill>
+                  <a:srgbClr val="009bdd"/>
+                </a:solidFill>
+                <a:latin typeface="Arial"/>
+              </a:rPr>
+              <a:t>om ako zaboravimo pritisnuti Assemble prije “Play” ili “Fast Forward”, a verzija v4.4.1 upozorava nas također i ako pokušamo pokrenuti emulaciju iako je asemblerski kod promijenjen od zadnjeg uspješnog asembliranja (da ne bismo nehotice pokrenuli staru verziju našeg programa umjesto nove).</a:t>
+            </a:r>
+            <a:endParaRPr b="0" lang="bs-BA" sz="1600" spc="-1" strike="noStrike">
               <a:solidFill>
                 <a:srgbClr val="009bdd"/>
               </a:solidFill>
@@ -8766,7 +8812,7 @@
         <p:txBody>
           <a:bodyPr/>
           <a:p>
-            <a:fld id="{8284B993-A827-46E1-8356-20457B8D1EF7}" type="slidenum">
+            <a:fld id="{633A1341-021C-40B0-B1AC-F23DC9F1D264}" type="slidenum">
               <a:t>7</a:t>
             </a:fld>
           </a:p>
@@ -8786,9 +8832,9 @@
         <p:txBody>
           <a:bodyPr/>
           <a:p>
-            <a:fld id="{C5436E52-98CE-4F0A-8C47-5B9E50812F8E}" type="datetime1">
+            <a:fld id="{40323CB9-9212-4FED-91D2-D7C2583B8B3C}" type="datetime1">
               <a:rPr lang="en-US"/>
-              <a:t>07/04/2024</a:t>
+              <a:t>09/08/2024</a:t>
             </a:fld>
           </a:p>
         </p:txBody>
@@ -9008,7 +9054,7 @@
         <p:txBody>
           <a:bodyPr/>
           <a:p>
-            <a:fld id="{ECB9D41D-A02A-405F-8401-0C7081C5EE66}" type="slidenum">
+            <a:fld id="{F9BA86F2-2DD7-4C51-9328-DDD08D3E7B95}" type="slidenum">
               <a:t>8</a:t>
             </a:fld>
           </a:p>
@@ -9028,9 +9074,9 @@
         <p:txBody>
           <a:bodyPr/>
           <a:p>
-            <a:fld id="{DE80A58A-88D2-407A-8C07-09F8D650EFF5}" type="datetime1">
+            <a:fld id="{8D9CAB2D-631D-4F41-8CAE-091835F6EC6B}" type="datetime1">
               <a:rPr lang="en-US"/>
-              <a:t>07/04/2024</a:t>
+              <a:t>09/08/2024</a:t>
             </a:fld>
           </a:p>
         </p:txBody>
@@ -9208,7 +9254,7 @@
         <p:txBody>
           <a:bodyPr/>
           <a:p>
-            <a:fld id="{80EBE1F5-3052-42EF-A18F-924BCF480B4B}" type="slidenum">
+            <a:fld id="{DA78C32A-1088-42CA-ABB4-74FBF74837C2}" type="slidenum">
               <a:t>9</a:t>
             </a:fld>
           </a:p>
@@ -9228,9 +9274,9 @@
         <p:txBody>
           <a:bodyPr/>
           <a:p>
-            <a:fld id="{E6EE4A48-A926-4D6F-931C-0451AEEF4500}" type="datetime1">
+            <a:fld id="{2C7FB7EF-94A8-4A05-9996-A562C77F550E}" type="datetime1">
               <a:rPr lang="en-US"/>
-              <a:t>07/04/2024</a:t>
+              <a:t>09/08/2024</a:t>
             </a:fld>
           </a:p>
         </p:txBody>

</xml_diff>

<commit_message>
Documented what's new in v5.0.0
</commit_message>
<xml_diff>
--- a/seminar/PicoBlaze.pptx
+++ b/seminar/PicoBlaze.pptx
@@ -29,6 +29,7 @@
     <p:sldId id="276" r:id="rId24"/>
     <p:sldId id="277" r:id="rId25"/>
     <p:sldId id="278" r:id="rId26"/>
+    <p:sldId id="279" r:id="rId27"/>
   </p:sldIdLst>
   <p:sldSz cx="10080625" cy="5670550"/>
   <p:notesSz cx="7559675" cy="10691813"/>
@@ -86,7 +87,7 @@
         <p:txBody>
           <a:bodyPr/>
           <a:p>
-            <a:fld id="{A3F32615-CB97-46D7-A1B1-2079F41FC055}" type="slidenum">
+            <a:fld id="{FACF7DA2-E687-488C-B481-5EF12C4628A7}" type="slidenum">
               <a:t>&lt;#&gt;</a:t>
             </a:fld>
           </a:p>
@@ -166,10 +167,11 @@
             <a:pPr indent="0" algn="ctr">
               <a:buNone/>
             </a:pPr>
-            <a:endParaRPr b="0" lang="bs-BA" sz="3300" spc="-1" strike="noStrike">
+            <a:endParaRPr b="0" lang="bs-BA" sz="3300" strike="noStrike" u="none">
               <a:solidFill>
                 <a:srgbClr val="ffffff"/>
               </a:solidFill>
+              <a:uFillTx/>
               <a:latin typeface="Arial"/>
             </a:endParaRPr>
           </a:p>
@@ -209,10 +211,11 @@
               </a:spcBef>
               <a:buNone/>
             </a:pPr>
-            <a:endParaRPr b="0" lang="bs-BA" sz="2400" spc="-1" strike="noStrike">
+            <a:endParaRPr b="0" lang="bs-BA" sz="2400" strike="noStrike" u="none">
               <a:solidFill>
                 <a:srgbClr val="009bdd"/>
               </a:solidFill>
+              <a:uFillTx/>
               <a:latin typeface="Arial"/>
             </a:endParaRPr>
           </a:p>
@@ -252,7 +255,7 @@
         <p:txBody>
           <a:bodyPr/>
           <a:p>
-            <a:fld id="{38353740-D8A8-4D80-B915-2172E6BFD39A}" type="slidenum">
+            <a:fld id="{A957D9BF-6E1D-454D-A0E8-99AF20F8F881}" type="slidenum">
               <a:t>&lt;#&gt;</a:t>
             </a:fld>
           </a:p>
@@ -332,10 +335,11 @@
             <a:pPr indent="0" algn="ctr">
               <a:buNone/>
             </a:pPr>
-            <a:endParaRPr b="0" lang="bs-BA" sz="3300" spc="-1" strike="noStrike">
+            <a:endParaRPr b="0" lang="bs-BA" sz="3300" strike="noStrike" u="none">
               <a:solidFill>
                 <a:srgbClr val="ffffff"/>
               </a:solidFill>
+              <a:uFillTx/>
               <a:latin typeface="Arial"/>
             </a:endParaRPr>
           </a:p>
@@ -375,10 +379,11 @@
               </a:spcBef>
               <a:buNone/>
             </a:pPr>
-            <a:endParaRPr b="0" lang="bs-BA" sz="2400" spc="-1" strike="noStrike">
+            <a:endParaRPr b="0" lang="bs-BA" sz="2400" strike="noStrike" u="none">
               <a:solidFill>
                 <a:srgbClr val="009bdd"/>
               </a:solidFill>
+              <a:uFillTx/>
               <a:latin typeface="Arial"/>
             </a:endParaRPr>
           </a:p>
@@ -418,10 +423,11 @@
               </a:spcBef>
               <a:buNone/>
             </a:pPr>
-            <a:endParaRPr b="0" lang="bs-BA" sz="2400" spc="-1" strike="noStrike">
+            <a:endParaRPr b="0" lang="bs-BA" sz="2400" strike="noStrike" u="none">
               <a:solidFill>
                 <a:srgbClr val="009bdd"/>
               </a:solidFill>
+              <a:uFillTx/>
               <a:latin typeface="Arial"/>
             </a:endParaRPr>
           </a:p>
@@ -461,10 +467,11 @@
               </a:spcBef>
               <a:buNone/>
             </a:pPr>
-            <a:endParaRPr b="0" lang="bs-BA" sz="2400" spc="-1" strike="noStrike">
+            <a:endParaRPr b="0" lang="bs-BA" sz="2400" strike="noStrike" u="none">
               <a:solidFill>
                 <a:srgbClr val="009bdd"/>
               </a:solidFill>
+              <a:uFillTx/>
               <a:latin typeface="Arial"/>
             </a:endParaRPr>
           </a:p>
@@ -504,7 +511,7 @@
         <p:txBody>
           <a:bodyPr/>
           <a:p>
-            <a:fld id="{89F53B68-3E31-4355-B223-0C3F3CDA4066}" type="slidenum">
+            <a:fld id="{7DB61E3F-964A-43C2-B8DE-3E9A2BF6EDC2}" type="slidenum">
               <a:t>&lt;#&gt;</a:t>
             </a:fld>
           </a:p>
@@ -584,10 +591,11 @@
             <a:pPr indent="0" algn="ctr">
               <a:buNone/>
             </a:pPr>
-            <a:endParaRPr b="0" lang="bs-BA" sz="3300" spc="-1" strike="noStrike">
+            <a:endParaRPr b="0" lang="bs-BA" sz="3300" strike="noStrike" u="none">
               <a:solidFill>
                 <a:srgbClr val="ffffff"/>
               </a:solidFill>
+              <a:uFillTx/>
               <a:latin typeface="Arial"/>
             </a:endParaRPr>
           </a:p>
@@ -627,10 +635,11 @@
               </a:spcBef>
               <a:buNone/>
             </a:pPr>
-            <a:endParaRPr b="0" lang="bs-BA" sz="2400" spc="-1" strike="noStrike">
+            <a:endParaRPr b="0" lang="bs-BA" sz="2400" strike="noStrike" u="none">
               <a:solidFill>
                 <a:srgbClr val="009bdd"/>
               </a:solidFill>
+              <a:uFillTx/>
               <a:latin typeface="Arial"/>
             </a:endParaRPr>
           </a:p>
@@ -670,10 +679,11 @@
               </a:spcBef>
               <a:buNone/>
             </a:pPr>
-            <a:endParaRPr b="0" lang="bs-BA" sz="2400" spc="-1" strike="noStrike">
+            <a:endParaRPr b="0" lang="bs-BA" sz="2400" strike="noStrike" u="none">
               <a:solidFill>
                 <a:srgbClr val="009bdd"/>
               </a:solidFill>
+              <a:uFillTx/>
               <a:latin typeface="Arial"/>
             </a:endParaRPr>
           </a:p>
@@ -713,7 +723,7 @@
         <p:txBody>
           <a:bodyPr/>
           <a:p>
-            <a:fld id="{0939F144-A12A-4EE4-B299-7236BF662BC2}" type="slidenum">
+            <a:fld id="{D6B95EC9-57D3-438D-97F5-39AF457950F1}" type="slidenum">
               <a:t>&lt;#&gt;</a:t>
             </a:fld>
           </a:p>
@@ -796,7 +806,7 @@
         <p:txBody>
           <a:bodyPr/>
           <a:p>
-            <a:fld id="{E2C2431D-A0A5-4ED1-8D9C-E5BC87395783}" type="slidenum">
+            <a:fld id="{0CDB3F67-14B1-4AD5-94C2-59DDE008F335}" type="slidenum">
               <a:t>&lt;#&gt;</a:t>
             </a:fld>
           </a:p>
@@ -1268,10 +1278,11 @@
             <a:noAutofit/>
           </a:bodyPr>
           <a:p>
-            <a:endParaRPr b="0" lang="bs-BA" sz="1800" spc="-1" strike="noStrike">
+            <a:endParaRPr b="0" lang="bs-BA" sz="1800" strike="noStrike" u="none">
               <a:solidFill>
                 <a:srgbClr val="ffffff"/>
               </a:solidFill>
+              <a:uFillTx/>
               <a:latin typeface="Arial"/>
             </a:endParaRPr>
           </a:p>
@@ -1309,18 +1320,20 @@
               <a:buNone/>
             </a:pPr>
             <a:r>
-              <a:rPr b="0" lang="bs-BA" sz="3300" spc="-1" strike="noStrike">
+              <a:rPr b="0" lang="bs-BA" sz="3300" strike="noStrike" u="none">
                 <a:solidFill>
                   <a:srgbClr val="dd4100"/>
                 </a:solidFill>
+                <a:uFillTx/>
                 <a:latin typeface="Arial"/>
               </a:rPr>
               <a:t>Click to edit the title text format</a:t>
             </a:r>
-            <a:endParaRPr b="0" lang="bs-BA" sz="3300" spc="-1" strike="noStrike">
+            <a:endParaRPr b="0" lang="bs-BA" sz="3300" strike="noStrike" u="none">
               <a:solidFill>
                 <a:srgbClr val="dd4100"/>
               </a:solidFill>
+              <a:uFillTx/>
               <a:latin typeface="Arial"/>
             </a:endParaRPr>
           </a:p>
@@ -1351,7 +1364,7 @@
         </p:spPr>
         <p:txBody>
           <a:bodyPr lIns="0" rIns="0" tIns="0" bIns="0" anchor="t">
-            <a:normAutofit fontScale="76219"/>
+            <a:normAutofit fontScale="92500" lnSpcReduction="19999"/>
           </a:bodyPr>
           <a:p>
             <a:pPr marL="432000" indent="-324000">
@@ -1366,18 +1379,20 @@
               <a:buChar char=""/>
             </a:pPr>
             <a:r>
-              <a:rPr b="0" lang="bs-BA" sz="2400" spc="-1" strike="noStrike">
-                <a:solidFill>
-                  <a:srgbClr val="009bdd"/>
-                </a:solidFill>
+              <a:rPr b="0" lang="bs-BA" sz="2400" strike="noStrike" u="none">
+                <a:solidFill>
+                  <a:srgbClr val="009bdd"/>
+                </a:solidFill>
+                <a:uFillTx/>
                 <a:latin typeface="Arial"/>
               </a:rPr>
               <a:t>Click to edit the outline text format</a:t>
             </a:r>
-            <a:endParaRPr b="0" lang="bs-BA" sz="2400" spc="-1" strike="noStrike">
+            <a:endParaRPr b="0" lang="bs-BA" sz="2400" strike="noStrike" u="none">
               <a:solidFill>
                 <a:srgbClr val="009bdd"/>
               </a:solidFill>
+              <a:uFillTx/>
               <a:latin typeface="Arial"/>
             </a:endParaRPr>
           </a:p>
@@ -1394,18 +1409,20 @@
               <a:buChar char=""/>
             </a:pPr>
             <a:r>
-              <a:rPr b="0" lang="bs-BA" sz="2100" spc="-1" strike="noStrike">
-                <a:solidFill>
-                  <a:srgbClr val="009bdd"/>
-                </a:solidFill>
+              <a:rPr b="0" lang="bs-BA" sz="2100" strike="noStrike" u="none">
+                <a:solidFill>
+                  <a:srgbClr val="009bdd"/>
+                </a:solidFill>
+                <a:uFillTx/>
                 <a:latin typeface="Arial"/>
               </a:rPr>
               <a:t>Second Outline Level</a:t>
             </a:r>
-            <a:endParaRPr b="0" lang="bs-BA" sz="2100" spc="-1" strike="noStrike">
+            <a:endParaRPr b="0" lang="bs-BA" sz="2100" strike="noStrike" u="none">
               <a:solidFill>
                 <a:srgbClr val="009bdd"/>
               </a:solidFill>
+              <a:uFillTx/>
               <a:latin typeface="Arial"/>
             </a:endParaRPr>
           </a:p>
@@ -1422,18 +1439,20 @@
               <a:buChar char=""/>
             </a:pPr>
             <a:r>
-              <a:rPr b="0" lang="bs-BA" sz="1800" spc="-1" strike="noStrike">
-                <a:solidFill>
-                  <a:srgbClr val="009bdd"/>
-                </a:solidFill>
+              <a:rPr b="0" lang="bs-BA" sz="1800" strike="noStrike" u="none">
+                <a:solidFill>
+                  <a:srgbClr val="009bdd"/>
+                </a:solidFill>
+                <a:uFillTx/>
                 <a:latin typeface="Arial"/>
               </a:rPr>
               <a:t>Third Outline Level</a:t>
             </a:r>
-            <a:endParaRPr b="0" lang="bs-BA" sz="1800" spc="-1" strike="noStrike">
+            <a:endParaRPr b="0" lang="bs-BA" sz="1800" strike="noStrike" u="none">
               <a:solidFill>
                 <a:srgbClr val="009bdd"/>
               </a:solidFill>
+              <a:uFillTx/>
               <a:latin typeface="Arial"/>
             </a:endParaRPr>
           </a:p>
@@ -1450,18 +1469,20 @@
               <a:buChar char=""/>
             </a:pPr>
             <a:r>
-              <a:rPr b="0" lang="bs-BA" sz="1500" spc="-1" strike="noStrike">
-                <a:solidFill>
-                  <a:srgbClr val="009bdd"/>
-                </a:solidFill>
+              <a:rPr b="0" lang="bs-BA" sz="1500" strike="noStrike" u="none">
+                <a:solidFill>
+                  <a:srgbClr val="009bdd"/>
+                </a:solidFill>
+                <a:uFillTx/>
                 <a:latin typeface="Arial"/>
               </a:rPr>
               <a:t>Fourth Outline Level</a:t>
             </a:r>
-            <a:endParaRPr b="0" lang="bs-BA" sz="1500" spc="-1" strike="noStrike">
+            <a:endParaRPr b="0" lang="bs-BA" sz="1500" strike="noStrike" u="none">
               <a:solidFill>
                 <a:srgbClr val="009bdd"/>
               </a:solidFill>
+              <a:uFillTx/>
               <a:latin typeface="Arial"/>
             </a:endParaRPr>
           </a:p>
@@ -1478,18 +1499,20 @@
               <a:buChar char=""/>
             </a:pPr>
             <a:r>
-              <a:rPr b="0" lang="bs-BA" sz="1500" spc="-1" strike="noStrike">
-                <a:solidFill>
-                  <a:srgbClr val="009bdd"/>
-                </a:solidFill>
+              <a:rPr b="0" lang="bs-BA" sz="1500" strike="noStrike" u="none">
+                <a:solidFill>
+                  <a:srgbClr val="009bdd"/>
+                </a:solidFill>
+                <a:uFillTx/>
                 <a:latin typeface="Arial"/>
               </a:rPr>
               <a:t>Fifth Outline Level</a:t>
             </a:r>
-            <a:endParaRPr b="0" lang="bs-BA" sz="1500" spc="-1" strike="noStrike">
+            <a:endParaRPr b="0" lang="bs-BA" sz="1500" strike="noStrike" u="none">
               <a:solidFill>
                 <a:srgbClr val="009bdd"/>
               </a:solidFill>
+              <a:uFillTx/>
               <a:latin typeface="Arial"/>
             </a:endParaRPr>
           </a:p>
@@ -1506,18 +1529,20 @@
               <a:buChar char=""/>
             </a:pPr>
             <a:r>
-              <a:rPr b="0" lang="bs-BA" sz="1500" spc="-1" strike="noStrike">
-                <a:solidFill>
-                  <a:srgbClr val="009bdd"/>
-                </a:solidFill>
+              <a:rPr b="0" lang="bs-BA" sz="1500" strike="noStrike" u="none">
+                <a:solidFill>
+                  <a:srgbClr val="009bdd"/>
+                </a:solidFill>
+                <a:uFillTx/>
                 <a:latin typeface="Arial"/>
               </a:rPr>
               <a:t>Sixth Outline Level</a:t>
             </a:r>
-            <a:endParaRPr b="0" lang="bs-BA" sz="1500" spc="-1" strike="noStrike">
+            <a:endParaRPr b="0" lang="bs-BA" sz="1500" strike="noStrike" u="none">
               <a:solidFill>
                 <a:srgbClr val="009bdd"/>
               </a:solidFill>
+              <a:uFillTx/>
               <a:latin typeface="Arial"/>
             </a:endParaRPr>
           </a:p>
@@ -1534,18 +1559,20 @@
               <a:buChar char=""/>
             </a:pPr>
             <a:r>
-              <a:rPr b="0" lang="bs-BA" sz="1500" spc="-1" strike="noStrike">
-                <a:solidFill>
-                  <a:srgbClr val="009bdd"/>
-                </a:solidFill>
+              <a:rPr b="0" lang="bs-BA" sz="1500" strike="noStrike" u="none">
+                <a:solidFill>
+                  <a:srgbClr val="009bdd"/>
+                </a:solidFill>
+                <a:uFillTx/>
                 <a:latin typeface="Arial"/>
               </a:rPr>
               <a:t>Seventh Outline Level</a:t>
             </a:r>
-            <a:endParaRPr b="0" lang="bs-BA" sz="1500" spc="-1" strike="noStrike">
+            <a:endParaRPr b="0" lang="bs-BA" sz="1500" strike="noStrike" u="none">
               <a:solidFill>
                 <a:srgbClr val="009bdd"/>
               </a:solidFill>
+              <a:uFillTx/>
               <a:latin typeface="Arial"/>
             </a:endParaRPr>
           </a:p>
@@ -1581,10 +1608,11 @@
           <a:lstStyle>
             <a:lvl1pPr indent="0">
               <a:buNone/>
-              <a:defRPr b="0" lang="bs-BA" sz="1400" spc="-1" strike="noStrike">
+              <a:defRPr b="0" lang="bs-BA" sz="1400" strike="noStrike" u="none">
                 <a:solidFill>
                   <a:srgbClr val="ffffff"/>
                 </a:solidFill>
+                <a:uFillTx/>
                 <a:latin typeface="Arial"/>
               </a:defRPr>
             </a:lvl1pPr>
@@ -1594,18 +1622,20 @@
               <a:buNone/>
             </a:pPr>
             <a:r>
-              <a:rPr b="0" lang="bs-BA" sz="1400" spc="-1" strike="noStrike">
+              <a:rPr b="0" lang="bs-BA" sz="1400" strike="noStrike" u="none">
                 <a:solidFill>
                   <a:srgbClr val="ffffff"/>
                 </a:solidFill>
+                <a:uFillTx/>
                 <a:latin typeface="Arial"/>
               </a:rPr>
               <a:t>&lt;date/time&gt;</a:t>
             </a:r>
-            <a:endParaRPr b="0" lang="bs-BA" sz="1400" spc="-1" strike="noStrike">
+            <a:endParaRPr b="0" lang="bs-BA" sz="1400" strike="noStrike" u="none">
               <a:solidFill>
                 <a:srgbClr val="ffffff"/>
               </a:solidFill>
+              <a:uFillTx/>
               <a:latin typeface="Arial"/>
             </a:endParaRPr>
           </a:p>
@@ -1641,10 +1671,11 @@
           <a:lstStyle>
             <a:lvl1pPr indent="0" algn="ctr">
               <a:buNone/>
-              <a:defRPr b="0" lang="bs-BA" sz="1400" spc="-1" strike="noStrike">
+              <a:defRPr b="0" lang="bs-BA" sz="1400" strike="noStrike" u="none">
                 <a:solidFill>
                   <a:srgbClr val="ffffff"/>
                 </a:solidFill>
+                <a:uFillTx/>
                 <a:latin typeface="Arial"/>
               </a:defRPr>
             </a:lvl1pPr>
@@ -1654,18 +1685,20 @@
               <a:buNone/>
             </a:pPr>
             <a:r>
-              <a:rPr b="0" lang="bs-BA" sz="1400" spc="-1" strike="noStrike">
+              <a:rPr b="0" lang="bs-BA" sz="1400" strike="noStrike" u="none">
                 <a:solidFill>
                   <a:srgbClr val="ffffff"/>
                 </a:solidFill>
+                <a:uFillTx/>
                 <a:latin typeface="Arial"/>
               </a:rPr>
               <a:t>&lt;footer&gt;</a:t>
             </a:r>
-            <a:endParaRPr b="0" lang="bs-BA" sz="1400" spc="-1" strike="noStrike">
+            <a:endParaRPr b="0" lang="bs-BA" sz="1400" strike="noStrike" u="none">
               <a:solidFill>
                 <a:srgbClr val="ffffff"/>
               </a:solidFill>
+              <a:uFillTx/>
               <a:latin typeface="Arial"/>
             </a:endParaRPr>
           </a:p>
@@ -1701,10 +1734,11 @@
           <a:lstStyle>
             <a:lvl1pPr indent="0" algn="r">
               <a:buNone/>
-              <a:defRPr b="0" lang="bs-BA" sz="1400" spc="-1" strike="noStrike">
+              <a:defRPr b="0" lang="bs-BA" sz="1400" strike="noStrike" u="none">
                 <a:solidFill>
                   <a:srgbClr val="ffffff"/>
                 </a:solidFill>
+                <a:uFillTx/>
                 <a:latin typeface="Arial"/>
               </a:defRPr>
             </a:lvl1pPr>
@@ -1713,19 +1747,21 @@
             <a:pPr indent="0" algn="r">
               <a:buNone/>
             </a:pPr>
-            <a:fld id="{47DC2EE2-67AA-408B-8C93-F4A483B82D60}" type="slidenum">
-              <a:rPr b="0" lang="bs-BA" sz="1400" spc="-1" strike="noStrike">
+            <a:fld id="{DFE1B4A2-05DC-4984-B3AB-C00D919E34A4}" type="slidenum">
+              <a:rPr b="0" lang="bs-BA" sz="1400" strike="noStrike" u="none">
                 <a:solidFill>
                   <a:srgbClr val="ffffff"/>
                 </a:solidFill>
+                <a:uFillTx/>
                 <a:latin typeface="Arial"/>
               </a:rPr>
               <a:t>&lt;number&gt;</a:t>
             </a:fld>
-            <a:endParaRPr b="0" lang="bs-BA" sz="1400" spc="-1" strike="noStrike">
+            <a:endParaRPr b="0" lang="bs-BA" sz="1400" strike="noStrike" u="none">
               <a:solidFill>
                 <a:srgbClr val="ffffff"/>
               </a:solidFill>
+              <a:uFillTx/>
               <a:latin typeface="Arial"/>
             </a:endParaRPr>
           </a:p>
@@ -1733,7 +1769,7 @@
       </p:sp>
     </p:spTree>
   </p:cSld>
-  <p:clrMap bg1="lt1" bg2="lt2" tx1="dk1" tx2="dk2" accent1="accent1" accent2="accent2" accent3="accent3" accent4="accent4" accent5="accent5" accent6="accent6" hlink="hlink" folHlink="folHlink"/>
+  <p:clrMap bg1="lt1" tx1="dk1" bg2="lt2" tx2="dk2" accent1="accent1" accent2="accent2" accent3="accent3" accent4="accent4" accent5="accent5" accent6="accent6" hlink="hlink" folHlink="folHlink"/>
   <p:sldLayoutIdLst>
     <p:sldLayoutId id="2147483649" r:id="rId2"/>
   </p:sldLayoutIdLst>
@@ -2180,10 +2216,11 @@
             <a:noAutofit/>
           </a:bodyPr>
           <a:p>
-            <a:endParaRPr b="0" lang="bs-BA" sz="1800" spc="-1" strike="noStrike">
+            <a:endParaRPr b="0" lang="bs-BA" sz="1800" strike="noStrike" u="none">
               <a:solidFill>
                 <a:srgbClr val="ffffff"/>
               </a:solidFill>
+              <a:uFillTx/>
               <a:latin typeface="Arial"/>
             </a:endParaRPr>
           </a:p>
@@ -2612,10 +2649,11 @@
             <a:noAutofit/>
           </a:bodyPr>
           <a:p>
-            <a:endParaRPr b="0" lang="bs-BA" sz="1800" spc="-1" strike="noStrike">
+            <a:endParaRPr b="0" lang="bs-BA" sz="1800" strike="noStrike" u="none">
               <a:solidFill>
                 <a:srgbClr val="ffffff"/>
               </a:solidFill>
+              <a:uFillTx/>
               <a:latin typeface="Arial"/>
             </a:endParaRPr>
           </a:p>
@@ -2653,18 +2691,20 @@
               <a:buNone/>
             </a:pPr>
             <a:r>
-              <a:rPr b="0" lang="bs-BA" sz="3300" spc="-1" strike="noStrike">
+              <a:rPr b="0" lang="bs-BA" sz="3300" strike="noStrike" u="none">
                 <a:solidFill>
                   <a:srgbClr val="ffffff"/>
                 </a:solidFill>
+                <a:uFillTx/>
                 <a:latin typeface="Arial"/>
               </a:rPr>
               <a:t>Click to edit the title text format</a:t>
             </a:r>
-            <a:endParaRPr b="0" lang="bs-BA" sz="3300" spc="-1" strike="noStrike">
+            <a:endParaRPr b="0" lang="bs-BA" sz="3300" strike="noStrike" u="none">
               <a:solidFill>
                 <a:srgbClr val="ffffff"/>
               </a:solidFill>
+              <a:uFillTx/>
               <a:latin typeface="Arial"/>
             </a:endParaRPr>
           </a:p>
@@ -2710,18 +2750,20 @@
               <a:buChar char=""/>
             </a:pPr>
             <a:r>
-              <a:rPr b="0" lang="bs-BA" sz="2400" spc="-1" strike="noStrike">
-                <a:solidFill>
-                  <a:srgbClr val="009bdd"/>
-                </a:solidFill>
+              <a:rPr b="0" lang="bs-BA" sz="2400" strike="noStrike" u="none">
+                <a:solidFill>
+                  <a:srgbClr val="009bdd"/>
+                </a:solidFill>
+                <a:uFillTx/>
                 <a:latin typeface="Arial"/>
               </a:rPr>
               <a:t>Click to edit the outline text format</a:t>
             </a:r>
-            <a:endParaRPr b="0" lang="bs-BA" sz="2400" spc="-1" strike="noStrike">
+            <a:endParaRPr b="0" lang="bs-BA" sz="2400" strike="noStrike" u="none">
               <a:solidFill>
                 <a:srgbClr val="009bdd"/>
               </a:solidFill>
+              <a:uFillTx/>
               <a:latin typeface="Arial"/>
             </a:endParaRPr>
           </a:p>
@@ -2738,18 +2780,20 @@
               <a:buChar char=""/>
             </a:pPr>
             <a:r>
-              <a:rPr b="0" lang="bs-BA" sz="2100" spc="-1" strike="noStrike">
-                <a:solidFill>
-                  <a:srgbClr val="009bdd"/>
-                </a:solidFill>
+              <a:rPr b="0" lang="bs-BA" sz="2100" strike="noStrike" u="none">
+                <a:solidFill>
+                  <a:srgbClr val="009bdd"/>
+                </a:solidFill>
+                <a:uFillTx/>
                 <a:latin typeface="Arial"/>
               </a:rPr>
               <a:t>Second Outline Level</a:t>
             </a:r>
-            <a:endParaRPr b="0" lang="bs-BA" sz="2100" spc="-1" strike="noStrike">
+            <a:endParaRPr b="0" lang="bs-BA" sz="2100" strike="noStrike" u="none">
               <a:solidFill>
                 <a:srgbClr val="009bdd"/>
               </a:solidFill>
+              <a:uFillTx/>
               <a:latin typeface="Arial"/>
             </a:endParaRPr>
           </a:p>
@@ -2766,18 +2810,20 @@
               <a:buChar char=""/>
             </a:pPr>
             <a:r>
-              <a:rPr b="0" lang="bs-BA" sz="1800" spc="-1" strike="noStrike">
-                <a:solidFill>
-                  <a:srgbClr val="009bdd"/>
-                </a:solidFill>
+              <a:rPr b="0" lang="bs-BA" sz="1800" strike="noStrike" u="none">
+                <a:solidFill>
+                  <a:srgbClr val="009bdd"/>
+                </a:solidFill>
+                <a:uFillTx/>
                 <a:latin typeface="Arial"/>
               </a:rPr>
               <a:t>Third Outline Level</a:t>
             </a:r>
-            <a:endParaRPr b="0" lang="bs-BA" sz="1800" spc="-1" strike="noStrike">
+            <a:endParaRPr b="0" lang="bs-BA" sz="1800" strike="noStrike" u="none">
               <a:solidFill>
                 <a:srgbClr val="009bdd"/>
               </a:solidFill>
+              <a:uFillTx/>
               <a:latin typeface="Arial"/>
             </a:endParaRPr>
           </a:p>
@@ -2794,18 +2840,20 @@
               <a:buChar char=""/>
             </a:pPr>
             <a:r>
-              <a:rPr b="0" lang="bs-BA" sz="1500" spc="-1" strike="noStrike">
-                <a:solidFill>
-                  <a:srgbClr val="009bdd"/>
-                </a:solidFill>
+              <a:rPr b="0" lang="bs-BA" sz="1500" strike="noStrike" u="none">
+                <a:solidFill>
+                  <a:srgbClr val="009bdd"/>
+                </a:solidFill>
+                <a:uFillTx/>
                 <a:latin typeface="Arial"/>
               </a:rPr>
               <a:t>Fourth Outline Level</a:t>
             </a:r>
-            <a:endParaRPr b="0" lang="bs-BA" sz="1500" spc="-1" strike="noStrike">
+            <a:endParaRPr b="0" lang="bs-BA" sz="1500" strike="noStrike" u="none">
               <a:solidFill>
                 <a:srgbClr val="009bdd"/>
               </a:solidFill>
+              <a:uFillTx/>
               <a:latin typeface="Arial"/>
             </a:endParaRPr>
           </a:p>
@@ -2822,18 +2870,20 @@
               <a:buChar char=""/>
             </a:pPr>
             <a:r>
-              <a:rPr b="0" lang="bs-BA" sz="1500" spc="-1" strike="noStrike">
-                <a:solidFill>
-                  <a:srgbClr val="009bdd"/>
-                </a:solidFill>
+              <a:rPr b="0" lang="bs-BA" sz="1500" strike="noStrike" u="none">
+                <a:solidFill>
+                  <a:srgbClr val="009bdd"/>
+                </a:solidFill>
+                <a:uFillTx/>
                 <a:latin typeface="Arial"/>
               </a:rPr>
               <a:t>Fifth Outline Level</a:t>
             </a:r>
-            <a:endParaRPr b="0" lang="bs-BA" sz="1500" spc="-1" strike="noStrike">
+            <a:endParaRPr b="0" lang="bs-BA" sz="1500" strike="noStrike" u="none">
               <a:solidFill>
                 <a:srgbClr val="009bdd"/>
               </a:solidFill>
+              <a:uFillTx/>
               <a:latin typeface="Arial"/>
             </a:endParaRPr>
           </a:p>
@@ -2850,18 +2900,20 @@
               <a:buChar char=""/>
             </a:pPr>
             <a:r>
-              <a:rPr b="0" lang="bs-BA" sz="1500" spc="-1" strike="noStrike">
-                <a:solidFill>
-                  <a:srgbClr val="009bdd"/>
-                </a:solidFill>
+              <a:rPr b="0" lang="bs-BA" sz="1500" strike="noStrike" u="none">
+                <a:solidFill>
+                  <a:srgbClr val="009bdd"/>
+                </a:solidFill>
+                <a:uFillTx/>
                 <a:latin typeface="Arial"/>
               </a:rPr>
               <a:t>Sixth Outline Level</a:t>
             </a:r>
-            <a:endParaRPr b="0" lang="bs-BA" sz="1500" spc="-1" strike="noStrike">
+            <a:endParaRPr b="0" lang="bs-BA" sz="1500" strike="noStrike" u="none">
               <a:solidFill>
                 <a:srgbClr val="009bdd"/>
               </a:solidFill>
+              <a:uFillTx/>
               <a:latin typeface="Arial"/>
             </a:endParaRPr>
           </a:p>
@@ -2878,18 +2930,20 @@
               <a:buChar char=""/>
             </a:pPr>
             <a:r>
-              <a:rPr b="0" lang="bs-BA" sz="1500" spc="-1" strike="noStrike">
-                <a:solidFill>
-                  <a:srgbClr val="009bdd"/>
-                </a:solidFill>
+              <a:rPr b="0" lang="bs-BA" sz="1500" strike="noStrike" u="none">
+                <a:solidFill>
+                  <a:srgbClr val="009bdd"/>
+                </a:solidFill>
+                <a:uFillTx/>
                 <a:latin typeface="Arial"/>
               </a:rPr>
               <a:t>Seventh Outline Level</a:t>
             </a:r>
-            <a:endParaRPr b="0" lang="bs-BA" sz="1500" spc="-1" strike="noStrike">
+            <a:endParaRPr b="0" lang="bs-BA" sz="1500" strike="noStrike" u="none">
               <a:solidFill>
                 <a:srgbClr val="009bdd"/>
               </a:solidFill>
+              <a:uFillTx/>
               <a:latin typeface="Arial"/>
             </a:endParaRPr>
           </a:p>
@@ -2925,10 +2979,11 @@
           <a:lstStyle>
             <a:lvl1pPr indent="0">
               <a:buNone/>
-              <a:defRPr b="0" lang="bs-BA" sz="1400" spc="-1" strike="noStrike">
+              <a:defRPr b="0" lang="bs-BA" sz="1400" strike="noStrike" u="none">
                 <a:solidFill>
                   <a:srgbClr val="ffffff"/>
                 </a:solidFill>
+                <a:uFillTx/>
                 <a:latin typeface="Arial"/>
               </a:defRPr>
             </a:lvl1pPr>
@@ -2938,18 +2993,20 @@
               <a:buNone/>
             </a:pPr>
             <a:r>
-              <a:rPr b="0" lang="bs-BA" sz="1400" spc="-1" strike="noStrike">
+              <a:rPr b="0" lang="bs-BA" sz="1400" strike="noStrike" u="none">
                 <a:solidFill>
                   <a:srgbClr val="ffffff"/>
                 </a:solidFill>
+                <a:uFillTx/>
                 <a:latin typeface="Arial"/>
               </a:rPr>
               <a:t>&lt;date/time&gt;</a:t>
             </a:r>
-            <a:endParaRPr b="0" lang="bs-BA" sz="1400" spc="-1" strike="noStrike">
+            <a:endParaRPr b="0" lang="bs-BA" sz="1400" strike="noStrike" u="none">
               <a:solidFill>
                 <a:srgbClr val="ffffff"/>
               </a:solidFill>
+              <a:uFillTx/>
               <a:latin typeface="Arial"/>
             </a:endParaRPr>
           </a:p>
@@ -2985,10 +3042,11 @@
           <a:lstStyle>
             <a:lvl1pPr indent="0" algn="ctr">
               <a:buNone/>
-              <a:defRPr b="0" lang="bs-BA" sz="1400" spc="-1" strike="noStrike">
+              <a:defRPr b="0" lang="bs-BA" sz="1400" strike="noStrike" u="none">
                 <a:solidFill>
                   <a:srgbClr val="ffffff"/>
                 </a:solidFill>
+                <a:uFillTx/>
                 <a:latin typeface="Arial"/>
               </a:defRPr>
             </a:lvl1pPr>
@@ -2998,18 +3056,20 @@
               <a:buNone/>
             </a:pPr>
             <a:r>
-              <a:rPr b="0" lang="bs-BA" sz="1400" spc="-1" strike="noStrike">
+              <a:rPr b="0" lang="bs-BA" sz="1400" strike="noStrike" u="none">
                 <a:solidFill>
                   <a:srgbClr val="ffffff"/>
                 </a:solidFill>
+                <a:uFillTx/>
                 <a:latin typeface="Arial"/>
               </a:rPr>
               <a:t>&lt;footer&gt;</a:t>
             </a:r>
-            <a:endParaRPr b="0" lang="bs-BA" sz="1400" spc="-1" strike="noStrike">
+            <a:endParaRPr b="0" lang="bs-BA" sz="1400" strike="noStrike" u="none">
               <a:solidFill>
                 <a:srgbClr val="ffffff"/>
               </a:solidFill>
+              <a:uFillTx/>
               <a:latin typeface="Arial"/>
             </a:endParaRPr>
           </a:p>
@@ -3045,10 +3105,11 @@
           <a:lstStyle>
             <a:lvl1pPr indent="0" algn="r">
               <a:buNone/>
-              <a:defRPr b="0" lang="bs-BA" sz="1400" spc="-1" strike="noStrike">
+              <a:defRPr b="0" lang="bs-BA" sz="1400" strike="noStrike" u="none">
                 <a:solidFill>
                   <a:srgbClr val="ffffff"/>
                 </a:solidFill>
+                <a:uFillTx/>
                 <a:latin typeface="Arial"/>
               </a:defRPr>
             </a:lvl1pPr>
@@ -3057,19 +3118,21 @@
             <a:pPr indent="0" algn="r">
               <a:buNone/>
             </a:pPr>
-            <a:fld id="{243F7FD9-3D85-4796-9909-0800641FD4F4}" type="slidenum">
-              <a:rPr b="0" lang="bs-BA" sz="1400" spc="-1" strike="noStrike">
+            <a:fld id="{F3BC5E99-283D-4763-A853-A8D77FC60B57}" type="slidenum">
+              <a:rPr b="0" lang="bs-BA" sz="1400" strike="noStrike" u="none">
                 <a:solidFill>
                   <a:srgbClr val="ffffff"/>
                 </a:solidFill>
+                <a:uFillTx/>
                 <a:latin typeface="Arial"/>
               </a:rPr>
               <a:t>&lt;number&gt;</a:t>
             </a:fld>
-            <a:endParaRPr b="0" lang="bs-BA" sz="1400" spc="-1" strike="noStrike">
+            <a:endParaRPr b="0" lang="bs-BA" sz="1400" strike="noStrike" u="none">
               <a:solidFill>
                 <a:srgbClr val="ffffff"/>
               </a:solidFill>
+              <a:uFillTx/>
               <a:latin typeface="Arial"/>
             </a:endParaRPr>
           </a:p>
@@ -3077,7 +3140,7 @@
       </p:sp>
     </p:spTree>
   </p:cSld>
-  <p:clrMap bg1="lt1" bg2="lt2" tx1="dk1" tx2="dk2" accent1="accent1" accent2="accent2" accent3="accent3" accent4="accent4" accent5="accent5" accent6="accent6" hlink="hlink" folHlink="folHlink"/>
+  <p:clrMap bg1="lt1" tx1="dk1" bg2="lt2" tx2="dk2" accent1="accent1" accent2="accent2" accent3="accent3" accent4="accent4" accent5="accent5" accent6="accent6" hlink="hlink" folHlink="folHlink"/>
   <p:sldLayoutIdLst>
     <p:sldLayoutId id="2147483651" r:id="rId2"/>
     <p:sldLayoutId id="2147483652" r:id="rId3"/>
@@ -3134,48 +3197,52 @@
           <a:p>
             <a:pPr algn="ctr"/>
             <a:r>
-              <a:rPr b="0" lang="bs-BA" sz="3200" spc="-1" strike="noStrike">
+              <a:rPr b="0" lang="bs-BA" sz="3200" strike="noStrike" u="none">
                 <a:solidFill>
                   <a:srgbClr val="000000"/>
                 </a:solidFill>
                 <a:highlight>
                   <a:srgbClr val="ffffff"/>
                 </a:highlight>
+                <a:uFillTx/>
                 <a:latin typeface="Arial"/>
               </a:rPr>
               <a:t>Simulator PicoBlaze računala u programskom jeziku JavaScript</a:t>
             </a:r>
-            <a:endParaRPr b="0" lang="bs-BA" sz="3200" spc="-1" strike="noStrike">
+            <a:endParaRPr b="0" lang="bs-BA" sz="3200" strike="noStrike" u="none">
               <a:solidFill>
                 <a:srgbClr val="000000"/>
               </a:solidFill>
               <a:highlight>
                 <a:srgbClr val="ffffff"/>
               </a:highlight>
+              <a:uFillTx/>
               <a:latin typeface="Arial"/>
             </a:endParaRPr>
           </a:p>
           <a:p>
             <a:pPr algn="ctr"/>
             <a:r>
-              <a:rPr b="0" lang="bs-BA" sz="3200" spc="-1" strike="noStrike">
+              <a:rPr b="0" lang="bs-BA" sz="3200" strike="noStrike" u="none">
                 <a:solidFill>
                   <a:srgbClr val="000000"/>
                 </a:solidFill>
                 <a:highlight>
                   <a:srgbClr val="ffffff"/>
                 </a:highlight>
+                <a:uFillTx/>
                 <a:latin typeface="Arial"/>
               </a:rPr>
               <a:t>Autor: Teo Samaržija</a:t>
             </a:r>
-            <a:endParaRPr b="0" lang="bs-BA" sz="3200" spc="-1" strike="noStrike">
+            <a:endParaRPr b="0" lang="bs-BA" sz="3200" strike="noStrike" u="none">
               <a:solidFill>
                 <a:srgbClr val="000000"/>
               </a:solidFill>
               <a:highlight>
                 <a:srgbClr val="ffffff"/>
               </a:highlight>
+              <a:uFillTx/>
               <a:latin typeface="Arial"/>
             </a:endParaRPr>
           </a:p>
@@ -3199,6 +3266,7 @@
           <a:prstGeom prst="rect">
             <a:avLst/>
           </a:prstGeom>
+          <a:noFill/>
           <a:ln w="18000">
             <a:noFill/>
           </a:ln>
@@ -3266,18 +3334,20 @@
               <a:buNone/>
             </a:pPr>
             <a:r>
-              <a:rPr b="0" lang="bs-BA" sz="3300" spc="-1" strike="noStrike">
+              <a:rPr b="0" lang="bs-BA" sz="3300" strike="noStrike" u="none">
                 <a:solidFill>
                   <a:srgbClr val="ffffff"/>
                 </a:solidFill>
+                <a:uFillTx/>
                 <a:latin typeface="Arial"/>
               </a:rPr>
               <a:t>Kako se koristi...</a:t>
             </a:r>
-            <a:endParaRPr b="0" lang="bs-BA" sz="3300" spc="-1" strike="noStrike">
+            <a:endParaRPr b="0" lang="bs-BA" sz="3300" strike="noStrike" u="none">
               <a:solidFill>
                 <a:srgbClr val="ffffff"/>
               </a:solidFill>
+              <a:uFillTx/>
               <a:latin typeface="Arial"/>
             </a:endParaRPr>
           </a:p>
@@ -3323,18 +3393,20 @@
               <a:buChar char=""/>
             </a:pPr>
             <a:r>
-              <a:rPr b="0" lang="bs-BA" sz="2400" spc="-1" strike="noStrike">
-                <a:solidFill>
-                  <a:srgbClr val="009bdd"/>
-                </a:solidFill>
+              <a:rPr b="0" lang="bs-BA" sz="2400" strike="noStrike" u="none">
+                <a:solidFill>
+                  <a:srgbClr val="009bdd"/>
+                </a:solidFill>
+                <a:uFillTx/>
                 <a:latin typeface="Arial"/>
               </a:rPr>
               <a:t>Ako želimo, možemo dodati i breakpointse na koje će emulacija pauzirati.</a:t>
             </a:r>
-            <a:endParaRPr b="0" lang="bs-BA" sz="2400" spc="-1" strike="noStrike">
+            <a:endParaRPr b="0" lang="bs-BA" sz="2400" strike="noStrike" u="none">
               <a:solidFill>
                 <a:srgbClr val="009bdd"/>
               </a:solidFill>
+              <a:uFillTx/>
               <a:latin typeface="Arial"/>
             </a:endParaRPr>
           </a:p>
@@ -3351,18 +3423,20 @@
               <a:buChar char=""/>
             </a:pPr>
             <a:r>
-              <a:rPr b="0" lang="bs-BA" sz="2400" spc="-1" strike="noStrike">
-                <a:solidFill>
-                  <a:srgbClr val="009bdd"/>
-                </a:solidFill>
+              <a:rPr b="0" lang="bs-BA" sz="2400" strike="noStrike" u="none">
+                <a:solidFill>
+                  <a:srgbClr val="009bdd"/>
+                </a:solidFill>
+                <a:uFillTx/>
                 <a:latin typeface="Arial"/>
               </a:rPr>
               <a:t>Tu sam mogućnost dodao na prijedlog profesora Tomislava Matića mlađeg.</a:t>
             </a:r>
-            <a:endParaRPr b="0" lang="bs-BA" sz="2400" spc="-1" strike="noStrike">
+            <a:endParaRPr b="0" lang="bs-BA" sz="2400" strike="noStrike" u="none">
               <a:solidFill>
                 <a:srgbClr val="009bdd"/>
               </a:solidFill>
+              <a:uFillTx/>
               <a:latin typeface="Arial"/>
             </a:endParaRPr>
           </a:p>
@@ -3379,54 +3453,60 @@
               <a:buChar char=""/>
             </a:pPr>
             <a:r>
-              <a:rPr b="0" lang="bs-BA" sz="2400" spc="-1" strike="noStrike">
-                <a:solidFill>
-                  <a:srgbClr val="009bdd"/>
-                </a:solidFill>
+              <a:rPr b="0" lang="bs-BA" sz="2400" strike="noStrike" u="none">
+                <a:solidFill>
+                  <a:srgbClr val="009bdd"/>
+                </a:solidFill>
+                <a:uFillTx/>
                 <a:latin typeface="Arial"/>
               </a:rPr>
               <a:t>Postoje samo </a:t>
             </a:r>
             <a:r>
-              <a:rPr b="0" i="1" lang="bs-BA" sz="2400" spc="-1" strike="noStrike">
-                <a:solidFill>
-                  <a:srgbClr val="009bdd"/>
-                </a:solidFill>
+              <a:rPr b="0" i="1" lang="bs-BA" sz="2400" strike="noStrike" u="none">
+                <a:solidFill>
+                  <a:srgbClr val="009bdd"/>
+                </a:solidFill>
+                <a:uFillTx/>
                 <a:latin typeface="Arial"/>
               </a:rPr>
               <a:t>permanent</a:t>
             </a:r>
             <a:r>
-              <a:rPr b="0" lang="bs-BA" sz="2400" spc="-1" strike="noStrike">
-                <a:solidFill>
-                  <a:srgbClr val="009bdd"/>
-                </a:solidFill>
+              <a:rPr b="0" lang="bs-BA" sz="2400" strike="noStrike" u="none">
+                <a:solidFill>
+                  <a:srgbClr val="009bdd"/>
+                </a:solidFill>
+                <a:uFillTx/>
                 <a:latin typeface="Arial"/>
               </a:rPr>
               <a:t> breakpointsi, ne i </a:t>
             </a:r>
             <a:r>
-              <a:rPr b="0" i="1" lang="bs-BA" sz="2400" spc="-1" strike="noStrike">
-                <a:solidFill>
-                  <a:srgbClr val="009bdd"/>
-                </a:solidFill>
+              <a:rPr b="0" i="1" lang="bs-BA" sz="2400" strike="noStrike" u="none">
+                <a:solidFill>
+                  <a:srgbClr val="009bdd"/>
+                </a:solidFill>
+                <a:uFillTx/>
                 <a:latin typeface="Arial"/>
               </a:rPr>
               <a:t>temporary</a:t>
             </a:r>
             <a:r>
-              <a:rPr b="0" lang="bs-BA" sz="2400" spc="-1" strike="noStrike">
-                <a:solidFill>
-                  <a:srgbClr val="009bdd"/>
-                </a:solidFill>
+              <a:rPr b="0" lang="bs-BA" sz="2400" strike="noStrike" u="none">
+                <a:solidFill>
+                  <a:srgbClr val="009bdd"/>
+                </a:solidFill>
+                <a:uFillTx/>
                 <a:latin typeface="Arial"/>
               </a:rPr>
               <a:t>.</a:t>
             </a:r>
-            <a:endParaRPr b="0" lang="bs-BA" sz="2400" spc="-1" strike="noStrike">
+            <a:endParaRPr b="0" lang="bs-BA" sz="2400" strike="noStrike" u="none">
               <a:solidFill>
                 <a:srgbClr val="009bdd"/>
               </a:solidFill>
+              <a:uFillTx/>
               <a:latin typeface="Arial"/>
             </a:endParaRPr>
           </a:p>
@@ -3450,6 +3530,7 @@
           <a:prstGeom prst="rect">
             <a:avLst/>
           </a:prstGeom>
+          <a:noFill/>
           <a:ln w="18000">
             <a:noFill/>
           </a:ln>
@@ -3488,10 +3569,11 @@
             <a:noAutofit/>
           </a:bodyPr>
           <a:p>
-            <a:endParaRPr b="0" lang="bs-BA" sz="1800" spc="-1" strike="noStrike">
+            <a:endParaRPr b="0" lang="bs-BA" sz="1800" strike="noStrike" u="none">
               <a:solidFill>
                 <a:srgbClr val="000000"/>
               </a:solidFill>
+              <a:uFillTx/>
               <a:latin typeface="Arial"/>
             </a:endParaRPr>
           </a:p>
@@ -3511,7 +3593,7 @@
         <p:txBody>
           <a:bodyPr/>
           <a:p>
-            <a:fld id="{EE43B80B-0DE2-4145-9A19-7CB8287C4286}" type="slidenum">
+            <a:fld id="{23CD2F68-ECAE-4A7A-B140-98B29671E223}" type="slidenum">
               <a:t>10</a:t>
             </a:fld>
           </a:p>
@@ -3531,9 +3613,9 @@
         <p:txBody>
           <a:bodyPr/>
           <a:p>
-            <a:fld id="{B73858E3-58C5-4CC5-93F9-91C10CED7932}" type="datetime1">
+            <a:fld id="{AB231485-B51B-489D-95EF-3EC6889322BE}" type="datetime1">
               <a:rPr lang="en-US"/>
-              <a:t>09/08/2024</a:t>
+              <a:t>02/03/2025</a:t>
             </a:fld>
           </a:p>
         </p:txBody>
@@ -3600,18 +3682,20 @@
               <a:buNone/>
             </a:pPr>
             <a:r>
-              <a:rPr b="0" lang="bs-BA" sz="3300" spc="-1" strike="noStrike">
+              <a:rPr b="0" lang="bs-BA" sz="3300" strike="noStrike" u="none">
                 <a:solidFill>
                   <a:srgbClr val="ffffff"/>
                 </a:solidFill>
+                <a:uFillTx/>
                 <a:latin typeface="Arial"/>
               </a:rPr>
               <a:t>Kako se koristi...</a:t>
             </a:r>
-            <a:endParaRPr b="0" lang="bs-BA" sz="3300" spc="-1" strike="noStrike">
+            <a:endParaRPr b="0" lang="bs-BA" sz="3300" strike="noStrike" u="none">
               <a:solidFill>
                 <a:srgbClr val="ffffff"/>
               </a:solidFill>
+              <a:uFillTx/>
               <a:latin typeface="Arial"/>
             </a:endParaRPr>
           </a:p>
@@ -3657,36 +3741,40 @@
               <a:buChar char=""/>
             </a:pPr>
             <a:r>
-              <a:rPr b="0" lang="bs-BA" sz="2400" spc="-1" strike="noStrike">
-                <a:solidFill>
-                  <a:srgbClr val="009bdd"/>
-                </a:solidFill>
+              <a:rPr b="0" lang="bs-BA" sz="2400" strike="noStrike" u="none">
+                <a:solidFill>
+                  <a:srgbClr val="009bdd"/>
+                </a:solidFill>
+                <a:uFillTx/>
                 <a:latin typeface="Arial"/>
               </a:rPr>
               <a:t>Kada program radi kako želimo u simulatoru, možemo ga isprobati na pravom PicoBlazeu tako da kliknemo na “</a:t>
             </a:r>
             <a:r>
-              <a:rPr b="0" i="1" lang="bs-BA" sz="2400" spc="-1" strike="noStrike">
-                <a:solidFill>
-                  <a:srgbClr val="009bdd"/>
-                </a:solidFill>
+              <a:rPr b="0" i="1" lang="bs-BA" sz="2400" strike="noStrike" u="none">
+                <a:solidFill>
+                  <a:srgbClr val="009bdd"/>
+                </a:solidFill>
+                <a:uFillTx/>
                 <a:latin typeface="Arial"/>
               </a:rPr>
               <a:t>Download Hexadecimal</a:t>
             </a:r>
             <a:r>
-              <a:rPr b="0" lang="bs-BA" sz="2400" spc="-1" strike="noStrike">
-                <a:solidFill>
-                  <a:srgbClr val="009bdd"/>
-                </a:solidFill>
+              <a:rPr b="0" lang="bs-BA" sz="2400" strike="noStrike" u="none">
+                <a:solidFill>
+                  <a:srgbClr val="009bdd"/>
+                </a:solidFill>
+                <a:uFillTx/>
                 <a:latin typeface="Arial"/>
               </a:rPr>
               <a:t>”.</a:t>
             </a:r>
-            <a:endParaRPr b="0" lang="bs-BA" sz="2400" spc="-1" strike="noStrike">
+            <a:endParaRPr b="0" lang="bs-BA" sz="2400" strike="noStrike" u="none">
               <a:solidFill>
                 <a:srgbClr val="009bdd"/>
               </a:solidFill>
+              <a:uFillTx/>
               <a:latin typeface="Arial"/>
             </a:endParaRPr>
           </a:p>
@@ -3703,18 +3791,20 @@
               <a:buChar char=""/>
             </a:pPr>
             <a:r>
-              <a:rPr b="0" lang="bs-BA" sz="2400" spc="-1" strike="noStrike">
-                <a:solidFill>
-                  <a:srgbClr val="009bdd"/>
-                </a:solidFill>
+              <a:rPr b="0" lang="bs-BA" sz="2400" strike="noStrike" u="none">
+                <a:solidFill>
+                  <a:srgbClr val="009bdd"/>
+                </a:solidFill>
+                <a:uFillTx/>
                 <a:latin typeface="Arial"/>
               </a:rPr>
               <a:t>I Xilinxov asembler za PicoBlaze ispisuje heksadecimalne datoteke, tako da činjenica da ne ispisujemo binarne datoteke nije problem.</a:t>
             </a:r>
-            <a:endParaRPr b="0" lang="bs-BA" sz="2400" spc="-1" strike="noStrike">
+            <a:endParaRPr b="0" lang="bs-BA" sz="2400" strike="noStrike" u="none">
               <a:solidFill>
                 <a:srgbClr val="009bdd"/>
               </a:solidFill>
+              <a:uFillTx/>
               <a:latin typeface="Arial"/>
             </a:endParaRPr>
           </a:p>
@@ -3738,6 +3828,7 @@
           <a:prstGeom prst="rect">
             <a:avLst/>
           </a:prstGeom>
+          <a:noFill/>
           <a:ln w="18000">
             <a:noFill/>
           </a:ln>
@@ -3776,10 +3867,11 @@
             <a:noAutofit/>
           </a:bodyPr>
           <a:p>
-            <a:endParaRPr b="0" lang="bs-BA" sz="1800" spc="-1" strike="noStrike">
+            <a:endParaRPr b="0" lang="bs-BA" sz="1800" strike="noStrike" u="none">
               <a:solidFill>
                 <a:srgbClr val="000000"/>
               </a:solidFill>
+              <a:uFillTx/>
               <a:latin typeface="Arial"/>
             </a:endParaRPr>
           </a:p>
@@ -3799,7 +3891,7 @@
         <p:txBody>
           <a:bodyPr/>
           <a:p>
-            <a:fld id="{FA134AE3-CCEE-4D92-90F2-92643739C85B}" type="slidenum">
+            <a:fld id="{5E28ED94-12DD-426A-958B-ABED5A3DDA3E}" type="slidenum">
               <a:t>11</a:t>
             </a:fld>
           </a:p>
@@ -3819,9 +3911,9 @@
         <p:txBody>
           <a:bodyPr/>
           <a:p>
-            <a:fld id="{1CA68BC0-6729-44FE-BDF5-D63BE9B7611B}" type="datetime1">
+            <a:fld id="{9CB5DA02-7C7B-4006-ACF5-BA75C888D96B}" type="datetime1">
               <a:rPr lang="en-US"/>
-              <a:t>09/08/2024</a:t>
+              <a:t>02/03/2025</a:t>
             </a:fld>
           </a:p>
         </p:txBody>
@@ -3888,18 +3980,20 @@
               <a:buNone/>
             </a:pPr>
             <a:r>
-              <a:rPr b="0" lang="bs-BA" sz="3300" spc="-1" strike="noStrike">
+              <a:rPr b="0" lang="bs-BA" sz="3300" strike="noStrike" u="none">
                 <a:solidFill>
                   <a:srgbClr val="ffffff"/>
                 </a:solidFill>
+                <a:uFillTx/>
                 <a:latin typeface="Arial"/>
               </a:rPr>
               <a:t>Kako se koristi...</a:t>
             </a:r>
-            <a:endParaRPr b="0" lang="bs-BA" sz="3300" spc="-1" strike="noStrike">
+            <a:endParaRPr b="0" lang="bs-BA" sz="3300" strike="noStrike" u="none">
               <a:solidFill>
                 <a:srgbClr val="ffffff"/>
               </a:solidFill>
+              <a:uFillTx/>
               <a:latin typeface="Arial"/>
             </a:endParaRPr>
           </a:p>
@@ -3945,18 +4039,20 @@
               <a:buChar char=""/>
             </a:pPr>
             <a:r>
-              <a:rPr b="0" lang="bs-BA" sz="2400" spc="-1" strike="noStrike">
-                <a:solidFill>
-                  <a:srgbClr val="009bdd"/>
-                </a:solidFill>
+              <a:rPr b="0" lang="bs-BA" sz="2400" strike="noStrike" u="none">
+                <a:solidFill>
+                  <a:srgbClr val="009bdd"/>
+                </a:solidFill>
+                <a:uFillTx/>
                 <a:latin typeface="Arial"/>
               </a:rPr>
               <a:t>Kada dostignemo breakpoint, možemo pogledati trenutne registre, zastavice i memoriju u tablicama.</a:t>
             </a:r>
-            <a:endParaRPr b="0" lang="bs-BA" sz="2400" spc="-1" strike="noStrike">
+            <a:endParaRPr b="0" lang="bs-BA" sz="2400" strike="noStrike" u="none">
               <a:solidFill>
                 <a:srgbClr val="009bdd"/>
               </a:solidFill>
+              <a:uFillTx/>
               <a:latin typeface="Arial"/>
             </a:endParaRPr>
           </a:p>
@@ -3973,36 +4069,40 @@
               <a:buChar char=""/>
             </a:pPr>
             <a:r>
-              <a:rPr b="0" lang="bs-BA" sz="2400" spc="-1" strike="noStrike">
-                <a:solidFill>
-                  <a:srgbClr val="009bdd"/>
-                </a:solidFill>
+              <a:rPr b="0" lang="bs-BA" sz="2400" strike="noStrike" u="none">
+                <a:solidFill>
+                  <a:srgbClr val="009bdd"/>
+                </a:solidFill>
+                <a:uFillTx/>
                 <a:latin typeface="Arial"/>
               </a:rPr>
               <a:t>Nedavno promijenjene zastavice i registri obojane su različitom bojom, da nam ne bi promakli. Za to se koristio </a:t>
             </a:r>
             <a:r>
-              <a:rPr b="0" i="1" lang="bs-BA" sz="2400" spc="-1" strike="noStrike">
-                <a:solidFill>
-                  <a:srgbClr val="009bdd"/>
-                </a:solidFill>
+              <a:rPr b="0" i="1" lang="bs-BA" sz="2400" strike="noStrike" u="none">
+                <a:solidFill>
+                  <a:srgbClr val="009bdd"/>
+                </a:solidFill>
+                <a:uFillTx/>
                 <a:latin typeface="Arial"/>
               </a:rPr>
               <a:t>DOM as a state</a:t>
             </a:r>
             <a:r>
-              <a:rPr b="0" lang="bs-BA" sz="2400" spc="-1" strike="noStrike">
-                <a:solidFill>
-                  <a:srgbClr val="009bdd"/>
-                </a:solidFill>
+              <a:rPr b="0" lang="bs-BA" sz="2400" strike="noStrike" u="none">
+                <a:solidFill>
+                  <a:srgbClr val="009bdd"/>
+                </a:solidFill>
+                <a:uFillTx/>
                 <a:latin typeface="Arial"/>
               </a:rPr>
               <a:t>, što možda i nije najbolje rješenje.</a:t>
             </a:r>
-            <a:endParaRPr b="0" lang="bs-BA" sz="2400" spc="-1" strike="noStrike">
+            <a:endParaRPr b="0" lang="bs-BA" sz="2400" strike="noStrike" u="none">
               <a:solidFill>
                 <a:srgbClr val="009bdd"/>
               </a:solidFill>
+              <a:uFillTx/>
               <a:latin typeface="Arial"/>
             </a:endParaRPr>
           </a:p>
@@ -4026,6 +4126,7 @@
           <a:prstGeom prst="rect">
             <a:avLst/>
           </a:prstGeom>
+          <a:noFill/>
           <a:ln w="18000">
             <a:noFill/>
           </a:ln>
@@ -4045,7 +4146,7 @@
         <p:txBody>
           <a:bodyPr/>
           <a:p>
-            <a:fld id="{649DA565-900B-4F3C-8DDD-943F5E828BF9}" type="slidenum">
+            <a:fld id="{3E126B65-DF5D-43E3-BA98-D80DD27348EE}" type="slidenum">
               <a:t>12</a:t>
             </a:fld>
           </a:p>
@@ -4065,9 +4166,9 @@
         <p:txBody>
           <a:bodyPr/>
           <a:p>
-            <a:fld id="{C8E77E25-2858-4709-8E5E-7350BC0270EA}" type="datetime1">
+            <a:fld id="{3E44CF42-13F2-4DA2-B98A-E5B81672166C}" type="datetime1">
               <a:rPr lang="en-US"/>
-              <a:t>09/08/2024</a:t>
+              <a:t>02/03/2025</a:t>
             </a:fld>
           </a:p>
         </p:txBody>
@@ -4134,18 +4235,20 @@
               <a:buNone/>
             </a:pPr>
             <a:r>
-              <a:rPr b="0" lang="bs-BA" sz="3300" spc="-1" strike="noStrike">
+              <a:rPr b="0" lang="bs-BA" sz="3300" strike="noStrike" u="none">
                 <a:solidFill>
                   <a:srgbClr val="ffffff"/>
                 </a:solidFill>
+                <a:uFillTx/>
                 <a:latin typeface="Arial"/>
               </a:rPr>
               <a:t>Kako se koristi...</a:t>
             </a:r>
-            <a:endParaRPr b="0" lang="bs-BA" sz="3300" spc="-1" strike="noStrike">
+            <a:endParaRPr b="0" lang="bs-BA" sz="3300" strike="noStrike" u="none">
               <a:solidFill>
                 <a:srgbClr val="ffffff"/>
               </a:solidFill>
+              <a:uFillTx/>
               <a:latin typeface="Arial"/>
             </a:endParaRPr>
           </a:p>
@@ -4191,18 +4294,20 @@
               <a:buChar char=""/>
             </a:pPr>
             <a:r>
-              <a:rPr b="0" lang="bs-BA" sz="2400" spc="-1" strike="noStrike">
-                <a:solidFill>
-                  <a:srgbClr val="009bdd"/>
-                </a:solidFill>
+              <a:rPr b="0" lang="bs-BA" sz="2400" strike="noStrike" u="none">
+                <a:solidFill>
+                  <a:srgbClr val="009bdd"/>
+                </a:solidFill>
+                <a:uFillTx/>
                 <a:latin typeface="Arial"/>
               </a:rPr>
               <a:t>Da bismo komunicirali s programima kao što je “Decimal to Binary” (drugi primjer s lijeva), moramo uključiti UART terminal.</a:t>
             </a:r>
-            <a:endParaRPr b="0" lang="bs-BA" sz="2400" spc="-1" strike="noStrike">
+            <a:endParaRPr b="0" lang="bs-BA" sz="2400" strike="noStrike" u="none">
               <a:solidFill>
                 <a:srgbClr val="009bdd"/>
               </a:solidFill>
+              <a:uFillTx/>
               <a:latin typeface="Arial"/>
             </a:endParaRPr>
           </a:p>
@@ -4219,54 +4324,60 @@
               <a:buChar char=""/>
             </a:pPr>
             <a:r>
-              <a:rPr b="0" lang="bs-BA" sz="2400" spc="-1" strike="noStrike">
-                <a:solidFill>
-                  <a:srgbClr val="009bdd"/>
-                </a:solidFill>
+              <a:rPr b="0" lang="bs-BA" sz="2400" strike="noStrike" u="none">
+                <a:solidFill>
+                  <a:srgbClr val="009bdd"/>
+                </a:solidFill>
+                <a:uFillTx/>
                 <a:latin typeface="Arial"/>
               </a:rPr>
               <a:t>Preporučljivo je pritom isključiti checkbox “</a:t>
             </a:r>
             <a:r>
-              <a:rPr b="0" i="1" lang="bs-BA" sz="2400" spc="-1" strike="noStrike">
-                <a:solidFill>
-                  <a:srgbClr val="009bdd"/>
-                </a:solidFill>
+              <a:rPr b="0" i="1" lang="bs-BA" sz="2400" strike="noStrike" u="none">
+                <a:solidFill>
+                  <a:srgbClr val="009bdd"/>
+                </a:solidFill>
+                <a:uFillTx/>
                 <a:latin typeface="Arial"/>
               </a:rPr>
               <a:t>Update registers and flags on every step</a:t>
             </a:r>
             <a:r>
-              <a:rPr b="0" lang="bs-BA" sz="2400" spc="-1" strike="noStrike">
-                <a:solidFill>
-                  <a:srgbClr val="009bdd"/>
-                </a:solidFill>
+              <a:rPr b="0" lang="bs-BA" sz="2400" strike="noStrike" u="none">
+                <a:solidFill>
+                  <a:srgbClr val="009bdd"/>
+                </a:solidFill>
+                <a:uFillTx/>
                 <a:latin typeface="Arial"/>
               </a:rPr>
               <a:t>”. Verzija </a:t>
             </a:r>
             <a:r>
-              <a:rPr b="0" i="1" lang="bs-BA" sz="2400" spc="-1" strike="noStrike">
-                <a:solidFill>
-                  <a:srgbClr val="009bdd"/>
-                </a:solidFill>
+              <a:rPr b="0" i="1" lang="bs-BA" sz="2400" strike="noStrike" u="none">
+                <a:solidFill>
+                  <a:srgbClr val="009bdd"/>
+                </a:solidFill>
+                <a:uFillTx/>
                 <a:latin typeface="Arial"/>
               </a:rPr>
               <a:t>v3.1.4</a:t>
             </a:r>
             <a:r>
-              <a:rPr b="0" lang="bs-BA" sz="2400" spc="-1" strike="noStrike">
-                <a:solidFill>
-                  <a:srgbClr val="009bdd"/>
-                </a:solidFill>
+              <a:rPr b="0" lang="bs-BA" sz="2400" strike="noStrike" u="none">
+                <a:solidFill>
+                  <a:srgbClr val="009bdd"/>
+                </a:solidFill>
+                <a:uFillTx/>
                 <a:latin typeface="Arial"/>
               </a:rPr>
               <a:t> i novije to rade automatski.</a:t>
             </a:r>
-            <a:endParaRPr b="0" lang="bs-BA" sz="2400" spc="-1" strike="noStrike">
+            <a:endParaRPr b="0" lang="bs-BA" sz="2400" strike="noStrike" u="none">
               <a:solidFill>
                 <a:srgbClr val="009bdd"/>
               </a:solidFill>
+              <a:uFillTx/>
               <a:latin typeface="Arial"/>
             </a:endParaRPr>
           </a:p>
@@ -4290,6 +4401,7 @@
           <a:prstGeom prst="rect">
             <a:avLst/>
           </a:prstGeom>
+          <a:noFill/>
           <a:ln w="18000">
             <a:noFill/>
           </a:ln>
@@ -4313,6 +4425,7 @@
           <a:prstGeom prst="rect">
             <a:avLst/>
           </a:prstGeom>
+          <a:noFill/>
           <a:ln w="18000">
             <a:noFill/>
           </a:ln>
@@ -4332,7 +4445,7 @@
         <p:txBody>
           <a:bodyPr/>
           <a:p>
-            <a:fld id="{F9376B17-1C30-4485-A077-AB2C21CF553C}" type="slidenum">
+            <a:fld id="{1541A6E9-0053-4B21-864B-3ED6A947409F}" type="slidenum">
               <a:t>13</a:t>
             </a:fld>
           </a:p>
@@ -4352,9 +4465,9 @@
         <p:txBody>
           <a:bodyPr/>
           <a:p>
-            <a:fld id="{46B97DD5-C73A-4297-8967-DB6C5F6021F0}" type="datetime1">
+            <a:fld id="{FE137C82-7185-4680-B20C-810AFC735959}" type="datetime1">
               <a:rPr lang="en-US"/>
-              <a:t>09/08/2024</a:t>
+              <a:t>02/03/2025</a:t>
             </a:fld>
           </a:p>
         </p:txBody>
@@ -4421,27 +4534,30 @@
               <a:buNone/>
             </a:pPr>
             <a:r>
-              <a:rPr b="0" lang="bs-BA" sz="3300" spc="-1" strike="noStrike">
+              <a:rPr b="0" lang="bs-BA" sz="3300" strike="noStrike" u="none">
                 <a:solidFill>
                   <a:srgbClr val="ffffff"/>
                 </a:solidFill>
+                <a:uFillTx/>
                 <a:latin typeface="Arial"/>
               </a:rPr>
               <a:t>“</a:t>
             </a:r>
             <a:r>
-              <a:rPr b="0" lang="bs-BA" sz="3300" spc="-1" strike="noStrike">
+              <a:rPr b="0" lang="bs-BA" sz="3300" strike="noStrike" u="none">
                 <a:solidFill>
                   <a:srgbClr val="ffffff"/>
                 </a:solidFill>
+                <a:uFillTx/>
                 <a:latin typeface="Arial"/>
               </a:rPr>
               <a:t>Update registers and flags on every step”</a:t>
             </a:r>
-            <a:endParaRPr b="0" lang="bs-BA" sz="3300" spc="-1" strike="noStrike">
+            <a:endParaRPr b="0" lang="bs-BA" sz="3300" strike="noStrike" u="none">
               <a:solidFill>
                 <a:srgbClr val="ffffff"/>
               </a:solidFill>
+              <a:uFillTx/>
               <a:latin typeface="Arial"/>
             </a:endParaRPr>
           </a:p>
@@ -4487,18 +4603,20 @@
               <a:buChar char=""/>
             </a:pPr>
             <a:r>
-              <a:rPr b="0" lang="bs-BA" sz="2200" spc="-1" strike="noStrike">
-                <a:solidFill>
-                  <a:srgbClr val="009bdd"/>
-                </a:solidFill>
+              <a:rPr b="0" lang="bs-BA" sz="2200" strike="noStrike" u="none">
+                <a:solidFill>
+                  <a:srgbClr val="009bdd"/>
+                </a:solidFill>
+                <a:uFillTx/>
                 <a:latin typeface="Arial"/>
               </a:rPr>
               <a:t>Naime, moj program ima problem s layout trashingom: svaki put kad se upiše novi broj u tablicu s registrima (dakle, praktički svaka instrukcija), tablica se neprimjetno poveća ili smanji za nekoliko piksela... ali dovoljno da prisili browser da čitavu stranicu mora iznova renderirati.</a:t>
             </a:r>
-            <a:endParaRPr b="0" lang="bs-BA" sz="2200" spc="-1" strike="noStrike">
+            <a:endParaRPr b="0" lang="bs-BA" sz="2200" strike="noStrike" u="none">
               <a:solidFill>
                 <a:srgbClr val="009bdd"/>
               </a:solidFill>
+              <a:uFillTx/>
               <a:latin typeface="Arial"/>
             </a:endParaRPr>
           </a:p>
@@ -4515,18 +4633,20 @@
               <a:buChar char=""/>
             </a:pPr>
             <a:r>
-              <a:rPr b="0" lang="bs-BA" sz="2200" spc="-1" strike="noStrike">
-                <a:solidFill>
-                  <a:srgbClr val="009bdd"/>
-                </a:solidFill>
+              <a:rPr b="0" lang="bs-BA" sz="2200" strike="noStrike" u="none">
+                <a:solidFill>
+                  <a:srgbClr val="009bdd"/>
+                </a:solidFill>
+                <a:uFillTx/>
                 <a:latin typeface="Arial"/>
               </a:rPr>
               <a:t>Činjenica da sam koristio monospace font u tablici, izgleda, ne pomaže.</a:t>
             </a:r>
-            <a:endParaRPr b="0" lang="bs-BA" sz="2200" spc="-1" strike="noStrike">
+            <a:endParaRPr b="0" lang="bs-BA" sz="2200" strike="noStrike" u="none">
               <a:solidFill>
                 <a:srgbClr val="009bdd"/>
               </a:solidFill>
+              <a:uFillTx/>
               <a:latin typeface="Arial"/>
             </a:endParaRPr>
           </a:p>
@@ -4543,54 +4663,60 @@
               <a:buChar char=""/>
             </a:pPr>
             <a:r>
-              <a:rPr b="0" lang="bs-BA" sz="2200" spc="-1" strike="noStrike">
-                <a:solidFill>
-                  <a:srgbClr val="009bdd"/>
-                </a:solidFill>
+              <a:rPr b="0" lang="bs-BA" sz="2200" strike="noStrike" u="none">
+                <a:solidFill>
+                  <a:srgbClr val="009bdd"/>
+                </a:solidFill>
+                <a:uFillTx/>
                 <a:latin typeface="Arial"/>
               </a:rPr>
               <a:t>Vjerujemo da je u modernim internetskim preglednicima (Firefox 69, Chrome 52...) to moguće riješiti CSS-om (naredba “</a:t>
             </a:r>
             <a:r>
-              <a:rPr b="0" i="1" lang="bs-BA" sz="2200" spc="-1" strike="noStrike">
-                <a:solidFill>
-                  <a:srgbClr val="009bdd"/>
-                </a:solidFill>
+              <a:rPr b="0" i="1" lang="bs-BA" sz="2200" strike="noStrike" u="none">
+                <a:solidFill>
+                  <a:srgbClr val="009bdd"/>
+                </a:solidFill>
+                <a:uFillTx/>
                 <a:latin typeface="Arial"/>
               </a:rPr>
               <a:t>contain: layout</a:t>
             </a:r>
             <a:r>
-              <a:rPr b="0" lang="bs-BA" sz="2200" spc="-1" strike="noStrike">
-                <a:solidFill>
-                  <a:srgbClr val="009bdd"/>
-                </a:solidFill>
+              <a:rPr b="0" lang="bs-BA" sz="2200" strike="noStrike" u="none">
+                <a:solidFill>
+                  <a:srgbClr val="009bdd"/>
+                </a:solidFill>
+                <a:uFillTx/>
                 <a:latin typeface="Arial"/>
               </a:rPr>
               <a:t>” i njoj srodne) i da će to i biti u nekoj budućoj verziji ovog simulatora. Ali, for the time being, postoji checkbox kojim se program može donekle ubrzati. Uostalom, to rješenje sa checkboxom funkcionira i u Firefoxu 52 (koji ne podržava “</a:t>
             </a:r>
             <a:r>
-              <a:rPr b="0" i="1" lang="bs-BA" sz="2200" spc="-1" strike="noStrike">
-                <a:solidFill>
-                  <a:srgbClr val="009bdd"/>
-                </a:solidFill>
+              <a:rPr b="0" i="1" lang="bs-BA" sz="2200" strike="noStrike" u="none">
+                <a:solidFill>
+                  <a:srgbClr val="009bdd"/>
+                </a:solidFill>
+                <a:uFillTx/>
                 <a:latin typeface="Arial"/>
               </a:rPr>
               <a:t>contain: layout</a:t>
             </a:r>
             <a:r>
-              <a:rPr b="0" lang="bs-BA" sz="2200" spc="-1" strike="noStrike">
-                <a:solidFill>
-                  <a:srgbClr val="009bdd"/>
-                </a:solidFill>
+              <a:rPr b="0" lang="bs-BA" sz="2200" strike="noStrike" u="none">
+                <a:solidFill>
+                  <a:srgbClr val="009bdd"/>
+                </a:solidFill>
+                <a:uFillTx/>
                 <a:latin typeface="Arial"/>
               </a:rPr>
               <a:t>” i njoj srodne naredbe).</a:t>
             </a:r>
-            <a:endParaRPr b="0" lang="bs-BA" sz="2200" spc="-1" strike="noStrike">
+            <a:endParaRPr b="0" lang="bs-BA" sz="2200" strike="noStrike" u="none">
               <a:solidFill>
                 <a:srgbClr val="009bdd"/>
               </a:solidFill>
+              <a:uFillTx/>
               <a:latin typeface="Arial"/>
             </a:endParaRPr>
           </a:p>
@@ -4610,7 +4736,7 @@
         <p:txBody>
           <a:bodyPr/>
           <a:p>
-            <a:fld id="{9639907F-A58F-4A43-9E1D-A9B89D8065A9}" type="slidenum">
+            <a:fld id="{E9FB5B95-0C66-4D3E-BD3E-B72CB220241D}" type="slidenum">
               <a:t>14</a:t>
             </a:fld>
           </a:p>
@@ -4630,9 +4756,9 @@
         <p:txBody>
           <a:bodyPr/>
           <a:p>
-            <a:fld id="{1B2636A1-D512-4BD8-9CEA-85131A4DE8FC}" type="datetime1">
+            <a:fld id="{3DE0D771-0D88-459D-98FD-DB6AF37C7C49}" type="datetime1">
               <a:rPr lang="en-US"/>
-              <a:t>09/08/2024</a:t>
+              <a:t>02/03/2025</a:t>
             </a:fld>
           </a:p>
         </p:txBody>
@@ -4699,18 +4825,20 @@
               <a:buNone/>
             </a:pPr>
             <a:r>
-              <a:rPr b="0" lang="bs-BA" sz="3300" spc="-1" strike="noStrike">
+              <a:rPr b="0" lang="bs-BA" sz="3300" strike="noStrike" u="none">
                 <a:solidFill>
                   <a:srgbClr val="ffffff"/>
                 </a:solidFill>
+                <a:uFillTx/>
                 <a:latin typeface="Arial"/>
               </a:rPr>
               <a:t>Je li simulacija UART-a realna?</a:t>
             </a:r>
-            <a:endParaRPr b="0" lang="bs-BA" sz="3300" spc="-1" strike="noStrike">
+            <a:endParaRPr b="0" lang="bs-BA" sz="3300" strike="noStrike" u="none">
               <a:solidFill>
                 <a:srgbClr val="ffffff"/>
               </a:solidFill>
+              <a:uFillTx/>
               <a:latin typeface="Arial"/>
             </a:endParaRPr>
           </a:p>
@@ -4756,18 +4884,20 @@
               <a:buChar char=""/>
             </a:pPr>
             <a:r>
-              <a:rPr b="0" lang="bs-BA" sz="2400" spc="-1" strike="noStrike">
-                <a:solidFill>
-                  <a:srgbClr val="009bdd"/>
-                </a:solidFill>
+              <a:rPr b="0" lang="bs-BA" sz="2400" strike="noStrike" u="none">
+                <a:solidFill>
+                  <a:srgbClr val="009bdd"/>
+                </a:solidFill>
+                <a:uFillTx/>
                 <a:latin typeface="Arial"/>
               </a:rPr>
               <a:t>Program “Decimal to Binary” nisam uspio pokrenuti na pravom PicoBlazeu, a nisam uspio ni dijagnosticirati problem. Tako da ga ne treba uzeti kao sigurno dobar primjer kako se na PicoBlazeu koristi UART.</a:t>
             </a:r>
-            <a:endParaRPr b="0" lang="bs-BA" sz="2400" spc="-1" strike="noStrike">
+            <a:endParaRPr b="0" lang="bs-BA" sz="2400" strike="noStrike" u="none">
               <a:solidFill>
                 <a:srgbClr val="009bdd"/>
               </a:solidFill>
+              <a:uFillTx/>
               <a:latin typeface="Arial"/>
             </a:endParaRPr>
           </a:p>
@@ -4787,7 +4917,7 @@
         <p:txBody>
           <a:bodyPr/>
           <a:p>
-            <a:fld id="{B68BD1AD-F700-423E-B30E-F71EBDDFD698}" type="slidenum">
+            <a:fld id="{E217E40C-070B-48EE-B540-88CBC74A345E}" type="slidenum">
               <a:t>15</a:t>
             </a:fld>
           </a:p>
@@ -4807,9 +4937,9 @@
         <p:txBody>
           <a:bodyPr/>
           <a:p>
-            <a:fld id="{A213BE18-DA5E-4936-A863-D19E14E2B75E}" type="datetime1">
+            <a:fld id="{BC2E4A57-10A1-44EC-9CC3-1B7B27DE3527}" type="datetime1">
               <a:rPr lang="en-US"/>
-              <a:t>09/08/2024</a:t>
+              <a:t>02/03/2025</a:t>
             </a:fld>
           </a:p>
         </p:txBody>
@@ -4876,18 +5006,20 @@
               <a:buNone/>
             </a:pPr>
             <a:r>
-              <a:rPr b="0" lang="bs-BA" sz="3300" spc="-1" strike="noStrike">
+              <a:rPr b="0" lang="bs-BA" sz="3300" strike="noStrike" u="none">
                 <a:solidFill>
                   <a:srgbClr val="ffffff"/>
                 </a:solidFill>
+                <a:uFillTx/>
                 <a:latin typeface="Arial"/>
               </a:rPr>
               <a:t>Kako se koristi...</a:t>
             </a:r>
-            <a:endParaRPr b="0" lang="bs-BA" sz="3300" spc="-1" strike="noStrike">
+            <a:endParaRPr b="0" lang="bs-BA" sz="3300" strike="noStrike" u="none">
               <a:solidFill>
                 <a:srgbClr val="ffffff"/>
               </a:solidFill>
+              <a:uFillTx/>
               <a:latin typeface="Arial"/>
             </a:endParaRPr>
           </a:p>
@@ -4933,27 +5065,30 @@
               <a:buChar char=""/>
             </a:pPr>
             <a:r>
-              <a:rPr b="0" lang="bs-BA" sz="2400" spc="-1" strike="noStrike">
-                <a:solidFill>
-                  <a:srgbClr val="009bdd"/>
-                </a:solidFill>
+              <a:rPr b="0" lang="bs-BA" sz="2400" strike="noStrike" u="none">
+                <a:solidFill>
+                  <a:srgbClr val="009bdd"/>
+                </a:solidFill>
+                <a:uFillTx/>
                 <a:latin typeface="Arial"/>
               </a:rPr>
               <a:t>Asembler podržava ono što se očekuje od današnjeg asemblera: aritmetičke izraze u konstantama, if-grananje, if-else grananje i while-petlje. </a:t>
             </a:r>
             <a:r>
-              <a:rPr b="0" i="1" lang="bs-BA" sz="2400" spc="-1" strike="noStrike">
-                <a:solidFill>
-                  <a:srgbClr val="009bdd"/>
-                </a:solidFill>
+              <a:rPr b="0" i="1" lang="bs-BA" sz="2400" strike="noStrike" u="none">
+                <a:solidFill>
+                  <a:srgbClr val="009bdd"/>
+                </a:solidFill>
+                <a:uFillTx/>
                 <a:latin typeface="Arial"/>
               </a:rPr>
               <a:t>Svaki asembler ujedno je i interpreter.</a:t>
             </a:r>
-            <a:endParaRPr b="0" lang="bs-BA" sz="2400" spc="-1" strike="noStrike">
+            <a:endParaRPr b="0" lang="bs-BA" sz="2400" strike="noStrike" u="none">
               <a:solidFill>
                 <a:srgbClr val="009bdd"/>
               </a:solidFill>
+              <a:uFillTx/>
               <a:latin typeface="Arial"/>
             </a:endParaRPr>
           </a:p>
@@ -4970,18 +5105,20 @@
               <a:buChar char=""/>
             </a:pPr>
             <a:r>
-              <a:rPr b="0" lang="bs-BA" sz="2400" spc="-1" strike="noStrike">
-                <a:solidFill>
-                  <a:srgbClr val="009bdd"/>
-                </a:solidFill>
+              <a:rPr b="0" lang="bs-BA" sz="2400" strike="noStrike" u="none">
+                <a:solidFill>
+                  <a:srgbClr val="009bdd"/>
+                </a:solidFill>
+                <a:uFillTx/>
                 <a:latin typeface="Arial"/>
               </a:rPr>
               <a:t>Primjer “Preprocessor Test” ispisuje Fibonaccijeve brojeve manje od 100 za vrijeme asembliranja.</a:t>
             </a:r>
-            <a:endParaRPr b="0" lang="bs-BA" sz="2400" spc="-1" strike="noStrike">
+            <a:endParaRPr b="0" lang="bs-BA" sz="2400" strike="noStrike" u="none">
               <a:solidFill>
                 <a:srgbClr val="009bdd"/>
               </a:solidFill>
+              <a:uFillTx/>
               <a:latin typeface="Arial"/>
             </a:endParaRPr>
           </a:p>
@@ -5005,6 +5142,7 @@
           <a:prstGeom prst="rect">
             <a:avLst/>
           </a:prstGeom>
+          <a:noFill/>
           <a:ln w="18000">
             <a:noFill/>
           </a:ln>
@@ -5024,7 +5162,7 @@
         <p:txBody>
           <a:bodyPr/>
           <a:p>
-            <a:fld id="{44CA1D7E-E970-49F7-9E5A-8F13141C3FEC}" type="slidenum">
+            <a:fld id="{947D0D34-B17F-4A71-9548-6F208F4DCD7A}" type="slidenum">
               <a:t>16</a:t>
             </a:fld>
           </a:p>
@@ -5044,9 +5182,9 @@
         <p:txBody>
           <a:bodyPr/>
           <a:p>
-            <a:fld id="{14F60D6E-C941-40BE-A2F4-F7D349E1DD7A}" type="datetime1">
+            <a:fld id="{2BD13DF3-DC39-4447-8372-0E09598BCE22}" type="datetime1">
               <a:rPr lang="en-US"/>
-              <a:t>09/08/2024</a:t>
+              <a:t>02/03/2025</a:t>
             </a:fld>
           </a:p>
         </p:txBody>
@@ -5113,18 +5251,20 @@
               <a:buNone/>
             </a:pPr>
             <a:r>
-              <a:rPr b="0" lang="bs-BA" sz="3300" spc="-1" strike="noStrike">
+              <a:rPr b="0" lang="bs-BA" sz="3300" strike="noStrike" u="none">
                 <a:solidFill>
                   <a:srgbClr val="ffffff"/>
                 </a:solidFill>
+                <a:uFillTx/>
                 <a:latin typeface="Arial"/>
               </a:rPr>
               <a:t>Nedostatci predprocesora</a:t>
             </a:r>
-            <a:endParaRPr b="0" lang="bs-BA" sz="3300" spc="-1" strike="noStrike">
+            <a:endParaRPr b="0" lang="bs-BA" sz="3300" strike="noStrike" u="none">
               <a:solidFill>
                 <a:srgbClr val="ffffff"/>
               </a:solidFill>
+              <a:uFillTx/>
               <a:latin typeface="Arial"/>
             </a:endParaRPr>
           </a:p>
@@ -5170,18 +5310,20 @@
               <a:buChar char=""/>
             </a:pPr>
             <a:r>
-              <a:rPr b="0" lang="bs-BA" sz="2400" spc="-1" strike="noStrike">
-                <a:solidFill>
-                  <a:srgbClr val="009bdd"/>
-                </a:solidFill>
+              <a:rPr b="0" lang="bs-BA" sz="2400" strike="noStrike" u="none">
+                <a:solidFill>
+                  <a:srgbClr val="009bdd"/>
+                </a:solidFill>
+                <a:uFillTx/>
                 <a:latin typeface="Arial"/>
               </a:rPr>
               <a:t>Ne podržava makro-naredbe.</a:t>
             </a:r>
-            <a:endParaRPr b="0" lang="bs-BA" sz="2400" spc="-1" strike="noStrike">
+            <a:endParaRPr b="0" lang="bs-BA" sz="2400" strike="noStrike" u="none">
               <a:solidFill>
                 <a:srgbClr val="009bdd"/>
               </a:solidFill>
+              <a:uFillTx/>
               <a:latin typeface="Arial"/>
             </a:endParaRPr>
           </a:p>
@@ -5198,36 +5340,40 @@
               <a:buChar char=""/>
             </a:pPr>
             <a:r>
-              <a:rPr b="0" lang="bs-BA" sz="2400" spc="-1" strike="noStrike">
-                <a:solidFill>
-                  <a:srgbClr val="009bdd"/>
-                </a:solidFill>
+              <a:rPr b="0" lang="bs-BA" sz="2400" strike="noStrike" u="none">
+                <a:solidFill>
+                  <a:srgbClr val="009bdd"/>
+                </a:solidFill>
+                <a:uFillTx/>
                 <a:latin typeface="Arial"/>
               </a:rPr>
               <a:t>Postoji neki neobičan bug u pretprocesoru da naredba “</a:t>
             </a:r>
             <a:r>
-              <a:rPr b="0" i="1" lang="bs-BA" sz="2400" spc="-1" strike="noStrike">
-                <a:solidFill>
-                  <a:srgbClr val="009bdd"/>
-                </a:solidFill>
+              <a:rPr b="0" i="1" lang="bs-BA" sz="2400" strike="noStrike" u="none">
+                <a:solidFill>
+                  <a:srgbClr val="009bdd"/>
+                </a:solidFill>
+                <a:uFillTx/>
                 <a:latin typeface="Arial"/>
               </a:rPr>
               <a:t>display a</a:t>
             </a:r>
             <a:r>
-              <a:rPr b="0" lang="bs-BA" sz="2400" spc="-1" strike="noStrike">
-                <a:solidFill>
-                  <a:srgbClr val="009bdd"/>
-                </a:solidFill>
+              <a:rPr b="0" lang="bs-BA" sz="2400" strike="noStrike" u="none">
+                <a:solidFill>
+                  <a:srgbClr val="009bdd"/>
+                </a:solidFill>
+                <a:uFillTx/>
                 <a:latin typeface="Arial"/>
               </a:rPr>
               <a:t>”(novi red) ne radi kada je simulacija UART-a isključena.</a:t>
             </a:r>
-            <a:endParaRPr b="0" lang="bs-BA" sz="2400" spc="-1" strike="noStrike">
+            <a:endParaRPr b="0" lang="bs-BA" sz="2400" strike="noStrike" u="none">
               <a:solidFill>
                 <a:srgbClr val="009bdd"/>
               </a:solidFill>
+              <a:uFillTx/>
               <a:latin typeface="Arial"/>
             </a:endParaRPr>
           </a:p>
@@ -5244,90 +5390,100 @@
               <a:buChar char=""/>
             </a:pPr>
             <a:r>
-              <a:rPr b="0" lang="bs-BA" sz="2400" spc="-1" strike="noStrike">
-                <a:solidFill>
-                  <a:srgbClr val="009bdd"/>
-                </a:solidFill>
+              <a:rPr b="0" lang="bs-BA" sz="2400" strike="noStrike" u="none">
+                <a:solidFill>
+                  <a:srgbClr val="009bdd"/>
+                </a:solidFill>
+                <a:uFillTx/>
                 <a:latin typeface="Arial"/>
               </a:rPr>
               <a:t>U </a:t>
             </a:r>
             <a:r>
-              <a:rPr b="0" i="1" lang="bs-BA" sz="2400" spc="-1" strike="noStrike">
-                <a:solidFill>
-                  <a:srgbClr val="009bdd"/>
-                </a:solidFill>
+              <a:rPr b="0" i="1" lang="bs-BA" sz="2400" strike="noStrike" u="none">
+                <a:solidFill>
+                  <a:srgbClr val="009bdd"/>
+                </a:solidFill>
+                <a:uFillTx/>
                 <a:latin typeface="Arial"/>
               </a:rPr>
               <a:t>if</a:t>
             </a:r>
             <a:r>
-              <a:rPr b="0" lang="bs-BA" sz="2400" spc="-1" strike="noStrike">
-                <a:solidFill>
-                  <a:srgbClr val="009bdd"/>
-                </a:solidFill>
+              <a:rPr b="0" lang="bs-BA" sz="2400" strike="noStrike" u="none">
+                <a:solidFill>
+                  <a:srgbClr val="009bdd"/>
+                </a:solidFill>
+                <a:uFillTx/>
                 <a:latin typeface="Arial"/>
               </a:rPr>
               <a:t>-grananjima, </a:t>
             </a:r>
             <a:r>
-              <a:rPr b="0" i="1" lang="bs-BA" sz="2400" spc="-1" strike="noStrike">
-                <a:solidFill>
-                  <a:srgbClr val="009bdd"/>
-                </a:solidFill>
+              <a:rPr b="0" i="1" lang="bs-BA" sz="2400" strike="noStrike" u="none">
+                <a:solidFill>
+                  <a:srgbClr val="009bdd"/>
+                </a:solidFill>
+                <a:uFillTx/>
                 <a:latin typeface="Arial"/>
               </a:rPr>
               <a:t>if-else</a:t>
             </a:r>
             <a:r>
-              <a:rPr b="0" lang="bs-BA" sz="2400" spc="-1" strike="noStrike">
-                <a:solidFill>
-                  <a:srgbClr val="009bdd"/>
-                </a:solidFill>
+              <a:rPr b="0" lang="bs-BA" sz="2400" strike="noStrike" u="none">
+                <a:solidFill>
+                  <a:srgbClr val="009bdd"/>
+                </a:solidFill>
+                <a:uFillTx/>
                 <a:latin typeface="Arial"/>
               </a:rPr>
               <a:t>-grananjima i </a:t>
             </a:r>
             <a:r>
-              <a:rPr b="0" i="1" lang="bs-BA" sz="2400" spc="-1" strike="noStrike">
-                <a:solidFill>
-                  <a:srgbClr val="009bdd"/>
-                </a:solidFill>
+              <a:rPr b="0" i="1" lang="bs-BA" sz="2400" strike="noStrike" u="none">
+                <a:solidFill>
+                  <a:srgbClr val="009bdd"/>
+                </a:solidFill>
+                <a:uFillTx/>
                 <a:latin typeface="Arial"/>
               </a:rPr>
               <a:t>while</a:t>
             </a:r>
             <a:r>
-              <a:rPr b="0" lang="bs-BA" sz="2400" spc="-1" strike="noStrike">
-                <a:solidFill>
-                  <a:srgbClr val="009bdd"/>
-                </a:solidFill>
+              <a:rPr b="0" lang="bs-BA" sz="2400" strike="noStrike" u="none">
+                <a:solidFill>
+                  <a:srgbClr val="009bdd"/>
+                </a:solidFill>
+                <a:uFillTx/>
                 <a:latin typeface="Arial"/>
               </a:rPr>
               <a:t>-petljama ne mogu se nalaziti mnemonike niti pretprocesorska naredba </a:t>
             </a:r>
             <a:r>
-              <a:rPr b="0" i="1" lang="bs-BA" sz="2400" spc="-1" strike="noStrike">
-                <a:solidFill>
-                  <a:srgbClr val="009bdd"/>
-                </a:solidFill>
+              <a:rPr b="0" i="1" lang="bs-BA" sz="2400" strike="noStrike" u="none">
+                <a:solidFill>
+                  <a:srgbClr val="009bdd"/>
+                </a:solidFill>
+                <a:uFillTx/>
                 <a:latin typeface="Arial"/>
               </a:rPr>
               <a:t>address</a:t>
             </a:r>
             <a:r>
-              <a:rPr b="0" lang="bs-BA" sz="2400" spc="-1" strike="noStrike">
-                <a:solidFill>
-                  <a:srgbClr val="009bdd"/>
-                </a:solidFill>
+              <a:rPr b="0" lang="bs-BA" sz="2400" strike="noStrike" u="none">
+                <a:solidFill>
+                  <a:srgbClr val="009bdd"/>
+                </a:solidFill>
+                <a:uFillTx/>
                 <a:latin typeface="Arial"/>
               </a:rPr>
               <a:t>. To je zato jer bi se, da se te stvari omoguće, znatno zakomplicirao pretprocesor i bilo bi lagano nenamjerno napraviti beskonačnu petlju za vrijeme pretprocesiranja:</a:t>
             </a:r>
-            <a:endParaRPr b="0" lang="bs-BA" sz="2400" spc="-1" strike="noStrike">
+            <a:endParaRPr b="0" lang="bs-BA" sz="2400" strike="noStrike" u="none">
               <a:solidFill>
                 <a:srgbClr val="009bdd"/>
               </a:solidFill>
+              <a:uFillTx/>
               <a:latin typeface="Arial"/>
             </a:endParaRPr>
           </a:p>
@@ -5351,6 +5507,7 @@
           <a:prstGeom prst="rect">
             <a:avLst/>
           </a:prstGeom>
+          <a:noFill/>
           <a:ln w="18000">
             <a:noFill/>
           </a:ln>
@@ -5370,7 +5527,7 @@
         <p:txBody>
           <a:bodyPr/>
           <a:p>
-            <a:fld id="{BDC3A0CB-EDC4-4F1E-B1F9-3384B8FF70C4}" type="slidenum">
+            <a:fld id="{5F771274-82E1-4626-80A7-1E7C77FC0358}" type="slidenum">
               <a:t>17</a:t>
             </a:fld>
           </a:p>
@@ -5390,9 +5547,9 @@
         <p:txBody>
           <a:bodyPr/>
           <a:p>
-            <a:fld id="{D1E39FD2-0929-4B8B-ABFD-7FBF470250D0}" type="datetime1">
+            <a:fld id="{98943E85-3019-4AFC-879F-1696DFED90B4}" type="datetime1">
               <a:rPr lang="en-US"/>
-              <a:t>09/08/2024</a:t>
+              <a:t>02/03/2025</a:t>
             </a:fld>
           </a:p>
         </p:txBody>
@@ -5459,18 +5616,20 @@
               <a:buNone/>
             </a:pPr>
             <a:r>
-              <a:rPr b="0" lang="bs-BA" sz="3300" spc="-1" strike="noStrike">
+              <a:rPr b="0" lang="bs-BA" sz="3300" strike="noStrike" u="none">
                 <a:solidFill>
                   <a:srgbClr val="ffffff"/>
                 </a:solidFill>
+                <a:uFillTx/>
                 <a:latin typeface="Arial"/>
               </a:rPr>
               <a:t>Nedostatci simulatora</a:t>
             </a:r>
-            <a:endParaRPr b="0" lang="bs-BA" sz="3300" spc="-1" strike="noStrike">
+            <a:endParaRPr b="0" lang="bs-BA" sz="3300" strike="noStrike" u="none">
               <a:solidFill>
                 <a:srgbClr val="ffffff"/>
               </a:solidFill>
+              <a:uFillTx/>
               <a:latin typeface="Arial"/>
             </a:endParaRPr>
           </a:p>
@@ -5516,36 +5675,40 @@
               <a:buChar char=""/>
             </a:pPr>
             <a:r>
-              <a:rPr b="0" lang="bs-BA" sz="2400" spc="-1" strike="noStrike">
-                <a:solidFill>
-                  <a:srgbClr val="009bdd"/>
-                </a:solidFill>
+              <a:rPr b="0" lang="bs-BA" sz="2400" strike="noStrike" u="none">
+                <a:solidFill>
+                  <a:srgbClr val="009bdd"/>
+                </a:solidFill>
+                <a:uFillTx/>
                 <a:latin typeface="Arial"/>
               </a:rPr>
               <a:t>Ne znam kako se zastavice na pravom PicoBlazeu ponašaju kad se promijeni regbanka. U svoj simulator PicoBlazea uprogramirao sam da svaka regbanka ima zasebne zastavice carry i zero (kao na Z80), ali moguće je da to nije tako. To bi se trebalo moći provjeriti pomoću programa “</a:t>
             </a:r>
             <a:r>
-              <a:rPr b="0" i="1" lang="bs-BA" sz="2400" spc="-1" strike="noStrike">
-                <a:solidFill>
-                  <a:srgbClr val="009bdd"/>
-                </a:solidFill>
+              <a:rPr b="0" i="1" lang="bs-BA" sz="2400" strike="noStrike" u="none">
+                <a:solidFill>
+                  <a:srgbClr val="009bdd"/>
+                </a:solidFill>
+                <a:uFillTx/>
                 <a:latin typeface="Arial"/>
               </a:rPr>
               <a:t>Regbanks-Flags Test</a:t>
             </a:r>
             <a:r>
-              <a:rPr b="0" lang="bs-BA" sz="2400" spc="-1" strike="noStrike">
-                <a:solidFill>
-                  <a:srgbClr val="009bdd"/>
-                </a:solidFill>
+              <a:rPr b="0" lang="bs-BA" sz="2400" strike="noStrike" u="none">
+                <a:solidFill>
+                  <a:srgbClr val="009bdd"/>
+                </a:solidFill>
+                <a:uFillTx/>
                 <a:latin typeface="Arial"/>
               </a:rPr>
               <a:t>”.</a:t>
             </a:r>
-            <a:endParaRPr b="0" lang="bs-BA" sz="2400" spc="-1" strike="noStrike">
+            <a:endParaRPr b="0" lang="bs-BA" sz="2400" strike="noStrike" u="none">
               <a:solidFill>
                 <a:srgbClr val="009bdd"/>
               </a:solidFill>
+              <a:uFillTx/>
               <a:latin typeface="Arial"/>
             </a:endParaRPr>
           </a:p>
@@ -5569,6 +5732,7 @@
           <a:prstGeom prst="rect">
             <a:avLst/>
           </a:prstGeom>
+          <a:noFill/>
           <a:ln w="18000">
             <a:noFill/>
           </a:ln>
@@ -5588,7 +5752,7 @@
         <p:txBody>
           <a:bodyPr/>
           <a:p>
-            <a:fld id="{B80C169C-29A9-4D65-B4B0-BD0599ACEE76}" type="slidenum">
+            <a:fld id="{9C71CB6B-23DD-4199-9220-37CE19E428E6}" type="slidenum">
               <a:t>18</a:t>
             </a:fld>
           </a:p>
@@ -5608,9 +5772,9 @@
         <p:txBody>
           <a:bodyPr/>
           <a:p>
-            <a:fld id="{AFEA9986-43B0-4C22-A113-33565F7FABA8}" type="datetime1">
+            <a:fld id="{43827BC8-38E2-41CB-A3C6-1B7A354621E6}" type="datetime1">
               <a:rPr lang="en-US"/>
-              <a:t>09/08/2024</a:t>
+              <a:t>02/03/2025</a:t>
             </a:fld>
           </a:p>
         </p:txBody>
@@ -5677,18 +5841,20 @@
               <a:buNone/>
             </a:pPr>
             <a:r>
-              <a:rPr b="0" lang="bs-BA" sz="3300" spc="-1" strike="noStrike">
+              <a:rPr b="0" lang="bs-BA" sz="3300" strike="noStrike" u="none">
                 <a:solidFill>
                   <a:srgbClr val="ffffff"/>
                 </a:solidFill>
+                <a:uFillTx/>
                 <a:latin typeface="Arial"/>
               </a:rPr>
               <a:t>Out in the wild...</a:t>
             </a:r>
-            <a:endParaRPr b="0" lang="bs-BA" sz="3300" spc="-1" strike="noStrike">
+            <a:endParaRPr b="0" lang="bs-BA" sz="3300" strike="noStrike" u="none">
               <a:solidFill>
                 <a:srgbClr val="ffffff"/>
               </a:solidFill>
+              <a:uFillTx/>
               <a:latin typeface="Arial"/>
             </a:endParaRPr>
           </a:p>
@@ -5734,18 +5900,20 @@
               <a:buChar char=""/>
             </a:pPr>
             <a:r>
-              <a:rPr b="0" lang="bs-BA" sz="2200" spc="-1" strike="noStrike">
-                <a:solidFill>
-                  <a:srgbClr val="009bdd"/>
-                </a:solidFill>
+              <a:rPr b="0" lang="bs-BA" sz="2200" strike="noStrike" u="none">
+                <a:solidFill>
+                  <a:srgbClr val="009bdd"/>
+                </a:solidFill>
+                <a:uFillTx/>
                 <a:latin typeface="Arial"/>
               </a:rPr>
               <a:t>Moj se program koristi na fakultetu u Argentini za uvod u ugrađene sustave.</a:t>
             </a:r>
-            <a:endParaRPr b="0" lang="bs-BA" sz="2200" spc="-1" strike="noStrike">
+            <a:endParaRPr b="0" lang="bs-BA" sz="2200" strike="noStrike" u="none">
               <a:solidFill>
                 <a:srgbClr val="009bdd"/>
               </a:solidFill>
+              <a:uFillTx/>
               <a:latin typeface="Arial"/>
             </a:endParaRPr>
           </a:p>
@@ -5762,54 +5930,60 @@
               <a:buChar char=""/>
             </a:pPr>
             <a:r>
-              <a:rPr b="0" lang="bs-BA" sz="2200" spc="-1" strike="noStrike">
-                <a:solidFill>
-                  <a:srgbClr val="009bdd"/>
-                </a:solidFill>
+              <a:rPr b="0" lang="bs-BA" sz="2200" strike="noStrike" u="none">
+                <a:solidFill>
+                  <a:srgbClr val="009bdd"/>
+                </a:solidFill>
+                <a:uFillTx/>
                 <a:latin typeface="Arial"/>
               </a:rPr>
               <a:t>Nedavno sam dobio kontributora s tog fakulteta koji se zove Agustin Izaguirre (</a:t>
             </a:r>
             <a:r>
-              <a:rPr b="0" i="1" lang="bs-BA" sz="2200" spc="-1" strike="noStrike">
-                <a:solidFill>
-                  <a:srgbClr val="009bdd"/>
-                </a:solidFill>
+              <a:rPr b="0" i="1" lang="bs-BA" sz="2200" strike="noStrike" u="none">
+                <a:solidFill>
+                  <a:srgbClr val="009bdd"/>
+                </a:solidFill>
+                <a:uFillTx/>
                 <a:latin typeface="Arial"/>
               </a:rPr>
               <a:t>agustiza</a:t>
             </a:r>
             <a:r>
-              <a:rPr b="0" lang="bs-BA" sz="2200" spc="-1" strike="noStrike">
-                <a:solidFill>
-                  <a:srgbClr val="009bdd"/>
-                </a:solidFill>
+              <a:rPr b="0" lang="bs-BA" sz="2200" strike="noStrike" u="none">
+                <a:solidFill>
+                  <a:srgbClr val="009bdd"/>
+                </a:solidFill>
+                <a:uFillTx/>
                 <a:latin typeface="Arial"/>
               </a:rPr>
               <a:t>). On je napravio nekoliko pull requestova na GitHubu, isprva sitni bug-fixi (prvo da se naredba SRA ponaša ispravno kad je </a:t>
             </a:r>
             <a:r>
-              <a:rPr b="0" i="1" lang="bs-BA" sz="2200" spc="-1" strike="noStrike">
-                <a:solidFill>
-                  <a:srgbClr val="009bdd"/>
-                </a:solidFill>
+              <a:rPr b="0" i="1" lang="bs-BA" sz="2200" strike="noStrike" u="none">
+                <a:solidFill>
+                  <a:srgbClr val="009bdd"/>
+                </a:solidFill>
+                <a:uFillTx/>
                 <a:latin typeface="Arial"/>
               </a:rPr>
               <a:t>carry flag</a:t>
             </a:r>
             <a:r>
-              <a:rPr b="0" lang="bs-BA" sz="2200" spc="-1" strike="noStrike">
-                <a:solidFill>
-                  <a:srgbClr val="009bdd"/>
-                </a:solidFill>
+              <a:rPr b="0" lang="bs-BA" sz="2200" strike="noStrike" u="none">
+                <a:solidFill>
+                  <a:srgbClr val="009bdd"/>
+                </a:solidFill>
+                <a:uFillTx/>
                 <a:latin typeface="Arial"/>
               </a:rPr>
               <a:t> postavljen u jedinicu), a onda i dodavanje novih featuresa kao što su JEST testovi.</a:t>
             </a:r>
-            <a:endParaRPr b="0" lang="bs-BA" sz="2200" spc="-1" strike="noStrike">
+            <a:endParaRPr b="0" lang="bs-BA" sz="2200" strike="noStrike" u="none">
               <a:solidFill>
                 <a:srgbClr val="009bdd"/>
               </a:solidFill>
+              <a:uFillTx/>
               <a:latin typeface="Arial"/>
             </a:endParaRPr>
           </a:p>
@@ -5826,36 +6000,40 @@
               <a:buChar char=""/>
             </a:pPr>
             <a:r>
-              <a:rPr b="0" lang="bs-BA" sz="2200" spc="-1" strike="noStrike">
-                <a:solidFill>
-                  <a:srgbClr val="009bdd"/>
-                </a:solidFill>
+              <a:rPr b="0" lang="bs-BA" sz="2200" strike="noStrike" u="none">
+                <a:solidFill>
+                  <a:srgbClr val="009bdd"/>
+                </a:solidFill>
+                <a:uFillTx/>
                 <a:latin typeface="Arial"/>
               </a:rPr>
               <a:t>JEST testira tokenizer, parser, asembler, jezgru simulatora i evaluator aritmetičkih izraza. Međutim, </a:t>
             </a:r>
             <a:r>
-              <a:rPr b="0" i="1" lang="bs-BA" sz="2200" spc="-1" strike="noStrike">
-                <a:solidFill>
-                  <a:srgbClr val="009bdd"/>
-                </a:solidFill>
+              <a:rPr b="0" i="1" lang="bs-BA" sz="2200" strike="noStrike" u="none">
+                <a:solidFill>
+                  <a:srgbClr val="009bdd"/>
+                </a:solidFill>
+                <a:uFillTx/>
                 <a:latin typeface="Arial"/>
               </a:rPr>
               <a:t>test coverage</a:t>
             </a:r>
             <a:r>
-              <a:rPr b="0" lang="bs-BA" sz="2200" spc="-1" strike="noStrike">
-                <a:solidFill>
-                  <a:srgbClr val="009bdd"/>
-                </a:solidFill>
+              <a:rPr b="0" lang="bs-BA" sz="2200" strike="noStrike" u="none">
+                <a:solidFill>
+                  <a:srgbClr val="009bdd"/>
+                </a:solidFill>
+                <a:uFillTx/>
                 <a:latin typeface="Arial"/>
               </a:rPr>
               <a:t> je još uvijek nizak i contributori se još uvijek moraju oslanjati na ručno testiranje.</a:t>
             </a:r>
-            <a:endParaRPr b="0" lang="bs-BA" sz="2200" spc="-1" strike="noStrike">
+            <a:endParaRPr b="0" lang="bs-BA" sz="2200" strike="noStrike" u="none">
               <a:solidFill>
                 <a:srgbClr val="009bdd"/>
               </a:solidFill>
+              <a:uFillTx/>
               <a:latin typeface="Arial"/>
             </a:endParaRPr>
           </a:p>
@@ -5875,7 +6053,7 @@
         <p:txBody>
           <a:bodyPr/>
           <a:p>
-            <a:fld id="{A48F4597-1AA9-47B6-90EB-11E72C058227}" type="slidenum">
+            <a:fld id="{6D567A27-31E9-4FBB-BFEF-BC67D6AD28A0}" type="slidenum">
               <a:t>19</a:t>
             </a:fld>
           </a:p>
@@ -5895,9 +6073,9 @@
         <p:txBody>
           <a:bodyPr/>
           <a:p>
-            <a:fld id="{8135A717-0D25-4FFF-B491-EC5E10B01D54}" type="datetime1">
+            <a:fld id="{5DE3AE10-9A76-411C-BAD5-360DF781DDDD}" type="datetime1">
               <a:rPr lang="en-US"/>
-              <a:t>09/08/2024</a:t>
+              <a:t>02/03/2025</a:t>
             </a:fld>
           </a:p>
         </p:txBody>
@@ -5964,18 +6142,20 @@
               <a:buNone/>
             </a:pPr>
             <a:r>
-              <a:rPr b="0" lang="bs-BA" sz="3300" spc="-1" strike="noStrike">
+              <a:rPr b="0" lang="bs-BA" sz="3300" strike="noStrike" u="none">
                 <a:solidFill>
                   <a:srgbClr val="ffffff"/>
                 </a:solidFill>
+                <a:uFillTx/>
                 <a:latin typeface="Arial"/>
               </a:rPr>
               <a:t>Pozadina</a:t>
             </a:r>
-            <a:endParaRPr b="0" lang="bs-BA" sz="3300" spc="-1" strike="noStrike">
+            <a:endParaRPr b="0" lang="bs-BA" sz="3300" strike="noStrike" u="none">
               <a:solidFill>
                 <a:srgbClr val="ffffff"/>
               </a:solidFill>
+              <a:uFillTx/>
               <a:latin typeface="Arial"/>
             </a:endParaRPr>
           </a:p>
@@ -6021,18 +6201,20 @@
               <a:buChar char=""/>
             </a:pPr>
             <a:r>
-              <a:rPr b="0" lang="bs-BA" sz="1600" spc="-1" strike="noStrike">
-                <a:solidFill>
-                  <a:srgbClr val="009bdd"/>
-                </a:solidFill>
+              <a:rPr b="0" lang="bs-BA" sz="1600" strike="noStrike" u="none">
+                <a:solidFill>
+                  <a:srgbClr val="009bdd"/>
+                </a:solidFill>
+                <a:uFillTx/>
                 <a:latin typeface="Arial"/>
               </a:rPr>
               <a:t>Još u osnovnoj školi kupio sam si Kip Irvineinu knjigu “Assembly language for x86 processors” i pročitao sam je.</a:t>
             </a:r>
-            <a:endParaRPr b="0" lang="bs-BA" sz="1600" spc="-1" strike="noStrike">
+            <a:endParaRPr b="0" lang="bs-BA" sz="1600" strike="noStrike" u="none">
               <a:solidFill>
                 <a:srgbClr val="009bdd"/>
               </a:solidFill>
+              <a:uFillTx/>
               <a:latin typeface="Arial"/>
             </a:endParaRPr>
           </a:p>
@@ -6049,18 +6231,20 @@
               <a:buChar char=""/>
             </a:pPr>
             <a:r>
-              <a:rPr b="0" lang="bs-BA" sz="1600" spc="-1" strike="noStrike">
-                <a:solidFill>
-                  <a:srgbClr val="009bdd"/>
-                </a:solidFill>
+              <a:rPr b="0" lang="bs-BA" sz="1600" strike="noStrike" u="none">
+                <a:solidFill>
+                  <a:srgbClr val="009bdd"/>
+                </a:solidFill>
+                <a:uFillTx/>
                 <a:latin typeface="Arial"/>
               </a:rPr>
               <a:t>Tako da sam se na predavanju iz asemblerskog jezika kod profesora Ivana Aleksija mogao “praviti važan”.</a:t>
             </a:r>
-            <a:endParaRPr b="0" lang="bs-BA" sz="1600" spc="-1" strike="noStrike">
+            <a:endParaRPr b="0" lang="bs-BA" sz="1600" strike="noStrike" u="none">
               <a:solidFill>
                 <a:srgbClr val="009bdd"/>
               </a:solidFill>
+              <a:uFillTx/>
               <a:latin typeface="Arial"/>
             </a:endParaRPr>
           </a:p>
@@ -6077,18 +6261,20 @@
               <a:buChar char=""/>
             </a:pPr>
             <a:r>
-              <a:rPr b="0" lang="bs-BA" sz="1600" spc="-1" strike="noStrike">
-                <a:solidFill>
-                  <a:srgbClr val="009bdd"/>
-                </a:solidFill>
+              <a:rPr b="0" lang="bs-BA" sz="1600" strike="noStrike" u="none">
+                <a:solidFill>
+                  <a:srgbClr val="009bdd"/>
+                </a:solidFill>
+                <a:uFillTx/>
                 <a:latin typeface="Arial"/>
               </a:rPr>
               <a:t>Profesor Ivan Aleksi pozvao me je na kavu nakon predavanja.</a:t>
             </a:r>
-            <a:endParaRPr b="0" lang="bs-BA" sz="1600" spc="-1" strike="noStrike">
+            <a:endParaRPr b="0" lang="bs-BA" sz="1600" strike="noStrike" u="none">
               <a:solidFill>
                 <a:srgbClr val="009bdd"/>
               </a:solidFill>
+              <a:uFillTx/>
               <a:latin typeface="Arial"/>
             </a:endParaRPr>
           </a:p>
@@ -6105,18 +6291,20 @@
               <a:buChar char=""/>
             </a:pPr>
             <a:r>
-              <a:rPr b="0" lang="bs-BA" sz="1600" spc="-1" strike="noStrike">
-                <a:solidFill>
-                  <a:srgbClr val="009bdd"/>
-                </a:solidFill>
+              <a:rPr b="0" lang="bs-BA" sz="1600" strike="noStrike" u="none">
+                <a:solidFill>
+                  <a:srgbClr val="009bdd"/>
+                </a:solidFill>
+                <a:uFillTx/>
                 <a:latin typeface="Arial"/>
               </a:rPr>
               <a:t>Rekao sam mu da imam web-stranicu i da znam relativno dobro JavaScript.</a:t>
             </a:r>
-            <a:endParaRPr b="0" lang="bs-BA" sz="1600" spc="-1" strike="noStrike">
+            <a:endParaRPr b="0" lang="bs-BA" sz="1600" strike="noStrike" u="none">
               <a:solidFill>
                 <a:srgbClr val="009bdd"/>
               </a:solidFill>
+              <a:uFillTx/>
               <a:latin typeface="Arial"/>
             </a:endParaRPr>
           </a:p>
@@ -6133,18 +6321,20 @@
               <a:buChar char=""/>
             </a:pPr>
             <a:r>
-              <a:rPr b="0" lang="bs-BA" sz="1600" spc="-1" strike="noStrike">
-                <a:solidFill>
-                  <a:srgbClr val="009bdd"/>
-                </a:solidFill>
+              <a:rPr b="0" lang="bs-BA" sz="1600" strike="noStrike" u="none">
+                <a:solidFill>
+                  <a:srgbClr val="009bdd"/>
+                </a:solidFill>
+                <a:uFillTx/>
                 <a:latin typeface="Arial"/>
               </a:rPr>
               <a:t>Pa mi je profesor Ivan Aleksi predložio da napravim asembler i emulator za PicoBlaze koji se može vrtjeti u internetskom pregledniku.</a:t>
             </a:r>
-            <a:endParaRPr b="0" lang="bs-BA" sz="1600" spc="-1" strike="noStrike">
+            <a:endParaRPr b="0" lang="bs-BA" sz="1600" strike="noStrike" u="none">
               <a:solidFill>
                 <a:srgbClr val="009bdd"/>
               </a:solidFill>
+              <a:uFillTx/>
               <a:latin typeface="Arial"/>
             </a:endParaRPr>
           </a:p>
@@ -6161,18 +6351,20 @@
               <a:buChar char=""/>
             </a:pPr>
             <a:r>
-              <a:rPr b="0" lang="bs-BA" sz="1600" spc="-1" strike="noStrike">
-                <a:solidFill>
-                  <a:srgbClr val="009bdd"/>
-                </a:solidFill>
+              <a:rPr b="0" lang="bs-BA" sz="1600" strike="noStrike" u="none">
+                <a:solidFill>
+                  <a:srgbClr val="009bdd"/>
+                </a:solidFill>
+                <a:uFillTx/>
                 <a:latin typeface="Arial"/>
               </a:rPr>
               <a:t>PicoBlaze je malo računalo koje proizvodi tvrtka Xilinx, i on se koristi na laboratorijskim i auditornim vježbama iz Arhitekture računala kao primjer jednostavnog računala.</a:t>
             </a:r>
-            <a:endParaRPr b="0" lang="bs-BA" sz="1600" spc="-1" strike="noStrike">
+            <a:endParaRPr b="0" lang="bs-BA" sz="1600" strike="noStrike" u="none">
               <a:solidFill>
                 <a:srgbClr val="009bdd"/>
               </a:solidFill>
+              <a:uFillTx/>
               <a:latin typeface="Arial"/>
             </a:endParaRPr>
           </a:p>
@@ -6189,18 +6381,20 @@
               <a:buChar char=""/>
             </a:pPr>
             <a:r>
-              <a:rPr b="1" lang="bs-BA" sz="1600" spc="-1" strike="noStrike">
-                <a:solidFill>
-                  <a:srgbClr val="009bdd"/>
-                </a:solidFill>
+              <a:rPr b="1" lang="bs-BA" sz="1600" strike="noStrike" u="none">
+                <a:solidFill>
+                  <a:srgbClr val="009bdd"/>
+                </a:solidFill>
+                <a:uFillTx/>
                 <a:latin typeface="Arial"/>
               </a:rPr>
               <a:t>Profesor Ivan Aleksi se je bojao da, ukoliko se zbog pandemije ukinu fizičke laboratorijske vježbe, studenti će naletjeti na probleme pokušavajući koristiti postojeće asemblere i emulatore za PicoBlaze na svojim računalima. Po mom mišljenju, taj strah bio je realan.</a:t>
             </a:r>
-            <a:endParaRPr b="0" lang="bs-BA" sz="1600" spc="-1" strike="noStrike">
+            <a:endParaRPr b="0" lang="bs-BA" sz="1600" strike="noStrike" u="none">
               <a:solidFill>
                 <a:srgbClr val="009bdd"/>
               </a:solidFill>
+              <a:uFillTx/>
               <a:latin typeface="Arial"/>
             </a:endParaRPr>
           </a:p>
@@ -6220,7 +6414,7 @@
         <p:txBody>
           <a:bodyPr/>
           <a:p>
-            <a:fld id="{EDFB0802-5259-44E7-A65D-F36640430D8D}" type="slidenum">
+            <a:fld id="{A3E9FF14-F9E1-4A79-9AB3-0B2A88C5E1A6}" type="slidenum">
               <a:t>2</a:t>
             </a:fld>
           </a:p>
@@ -6240,9 +6434,9 @@
         <p:txBody>
           <a:bodyPr/>
           <a:p>
-            <a:fld id="{6DE92A0D-16D2-4D6E-9CDA-2727A70FF11A}" type="datetime1">
+            <a:fld id="{6EE73141-4281-476F-B29E-93F35FB1BE6D}" type="datetime1">
               <a:rPr lang="en-US"/>
-              <a:t>09/08/2024</a:t>
+              <a:t>02/03/2025</a:t>
             </a:fld>
           </a:p>
         </p:txBody>
@@ -6309,18 +6503,20 @@
               <a:buNone/>
             </a:pPr>
             <a:r>
-              <a:rPr b="0" lang="bs-BA" sz="3300" spc="-1" strike="noStrike">
+              <a:rPr b="0" lang="bs-BA" sz="3300" strike="noStrike" u="none">
                 <a:solidFill>
                   <a:srgbClr val="ffffff"/>
                 </a:solidFill>
+                <a:uFillTx/>
                 <a:latin typeface="Arial"/>
               </a:rPr>
               <a:t>Kompatibilnost s browserima</a:t>
             </a:r>
-            <a:endParaRPr b="0" lang="bs-BA" sz="3300" spc="-1" strike="noStrike">
+            <a:endParaRPr b="0" lang="bs-BA" sz="3300" strike="noStrike" u="none">
               <a:solidFill>
                 <a:srgbClr val="ffffff"/>
               </a:solidFill>
+              <a:uFillTx/>
               <a:latin typeface="Arial"/>
             </a:endParaRPr>
           </a:p>
@@ -6366,18 +6562,20 @@
               <a:buChar char=""/>
             </a:pPr>
             <a:r>
-              <a:rPr b="0" lang="bs-BA" sz="1200" spc="-1" strike="noStrike">
-                <a:solidFill>
-                  <a:srgbClr val="009bdd"/>
-                </a:solidFill>
+              <a:rPr b="0" lang="bs-BA" sz="1200" strike="noStrike" u="none">
+                <a:solidFill>
+                  <a:srgbClr val="009bdd"/>
+                </a:solidFill>
+                <a:uFillTx/>
                 <a:latin typeface="Arial"/>
               </a:rPr>
               <a:t>Ciljao sam na Firefox 52.9 ESR.</a:t>
             </a:r>
-            <a:endParaRPr b="0" lang="bs-BA" sz="1200" spc="-1" strike="noStrike">
+            <a:endParaRPr b="0" lang="bs-BA" sz="1200" strike="noStrike" u="none">
               <a:solidFill>
                 <a:srgbClr val="009bdd"/>
               </a:solidFill>
+              <a:uFillTx/>
               <a:latin typeface="Arial"/>
             </a:endParaRPr>
           </a:p>
@@ -6394,18 +6592,20 @@
               <a:buChar char=""/>
             </a:pPr>
             <a:r>
-              <a:rPr b="0" lang="bs-BA" sz="1200" spc="-1" strike="noStrike">
-                <a:solidFill>
-                  <a:srgbClr val="009bdd"/>
-                </a:solidFill>
+              <a:rPr b="0" lang="bs-BA" sz="1200" strike="noStrike" u="none">
+                <a:solidFill>
+                  <a:srgbClr val="009bdd"/>
+                </a:solidFill>
+                <a:uFillTx/>
                 <a:latin typeface="Arial"/>
               </a:rPr>
               <a:t>To je posljednja verzija Firefoxa koja se može vrtjeti na Windows XP-u i Windows Visti, te također verzija Firefoxa koja se dobije uz Solaris 11.4.</a:t>
             </a:r>
-            <a:endParaRPr b="0" lang="bs-BA" sz="1200" spc="-1" strike="noStrike">
+            <a:endParaRPr b="0" lang="bs-BA" sz="1200" strike="noStrike" u="none">
               <a:solidFill>
                 <a:srgbClr val="009bdd"/>
               </a:solidFill>
+              <a:uFillTx/>
               <a:latin typeface="Arial"/>
             </a:endParaRPr>
           </a:p>
@@ -6422,18 +6622,20 @@
               <a:buChar char=""/>
             </a:pPr>
             <a:r>
-              <a:rPr b="0" lang="bs-BA" sz="1200" spc="-1" strike="noStrike">
-                <a:solidFill>
-                  <a:srgbClr val="009bdd"/>
-                </a:solidFill>
+              <a:rPr b="0" lang="bs-BA" sz="1200" strike="noStrike" u="none">
+                <a:solidFill>
+                  <a:srgbClr val="009bdd"/>
+                </a:solidFill>
+                <a:uFillTx/>
                 <a:latin typeface="Arial"/>
               </a:rPr>
               <a:t>Međutim, u Firefoxu 52.9 ESR pokrenutom na Windows XP (ali ne i ako se pokrene na Solarisu ili Windows 11), kao i u Epiphanyju na FreeBSD-u, linije koda i kod nisu alignirani (što onemogućava da se koriste breakpointsi).</a:t>
             </a:r>
-            <a:endParaRPr b="0" lang="bs-BA" sz="1200" spc="-1" strike="noStrike">
+            <a:endParaRPr b="0" lang="bs-BA" sz="1200" strike="noStrike" u="none">
               <a:solidFill>
                 <a:srgbClr val="009bdd"/>
               </a:solidFill>
+              <a:uFillTx/>
               <a:latin typeface="Arial"/>
             </a:endParaRPr>
           </a:p>
@@ -6450,18 +6652,20 @@
               <a:buChar char=""/>
             </a:pPr>
             <a:r>
-              <a:rPr b="0" lang="bs-BA" sz="1200" spc="-1" strike="noStrike">
-                <a:solidFill>
-                  <a:srgbClr val="009bdd"/>
-                </a:solidFill>
+              <a:rPr b="0" lang="bs-BA" sz="1200" strike="noStrike" u="none">
+                <a:solidFill>
+                  <a:srgbClr val="009bdd"/>
+                </a:solidFill>
+                <a:uFillTx/>
                 <a:latin typeface="Arial"/>
               </a:rPr>
               <a:t>Iz nekog meni nedokučivog razloga, JavaScript se vrti približno dvostruko brže u Firefoxu 52 nego u Firefoxu 120.</a:t>
             </a:r>
-            <a:endParaRPr b="0" lang="bs-BA" sz="1200" spc="-1" strike="noStrike">
+            <a:endParaRPr b="0" lang="bs-BA" sz="1200" strike="noStrike" u="none">
               <a:solidFill>
                 <a:srgbClr val="009bdd"/>
               </a:solidFill>
+              <a:uFillTx/>
               <a:latin typeface="Arial"/>
             </a:endParaRPr>
           </a:p>
@@ -6478,18 +6682,20 @@
               <a:buChar char=""/>
             </a:pPr>
             <a:r>
-              <a:rPr b="0" lang="bs-BA" sz="1200" spc="-1" strike="noStrike">
-                <a:solidFill>
-                  <a:srgbClr val="009bdd"/>
-                </a:solidFill>
+              <a:rPr b="0" lang="bs-BA" sz="1200" strike="noStrike" u="none">
+                <a:solidFill>
+                  <a:srgbClr val="009bdd"/>
+                </a:solidFill>
+                <a:uFillTx/>
                 <a:latin typeface="Arial"/>
               </a:rPr>
               <a:t>Moderni Chrome</a:t>
             </a:r>
-            <a:endParaRPr b="0" lang="bs-BA" sz="1200" spc="-1" strike="noStrike">
+            <a:endParaRPr b="0" lang="bs-BA" sz="1200" strike="noStrike" u="none">
               <a:solidFill>
                 <a:srgbClr val="009bdd"/>
               </a:solidFill>
+              <a:uFillTx/>
               <a:latin typeface="Arial"/>
             </a:endParaRPr>
           </a:p>
@@ -6506,18 +6712,20 @@
               <a:buChar char=""/>
             </a:pPr>
             <a:r>
-              <a:rPr b="0" lang="bs-BA" sz="1200" spc="-1" strike="noStrike">
-                <a:solidFill>
-                  <a:srgbClr val="009bdd"/>
-                </a:solidFill>
+              <a:rPr b="0" lang="bs-BA" sz="1200" strike="noStrike" u="none">
+                <a:solidFill>
+                  <a:srgbClr val="009bdd"/>
+                </a:solidFill>
+                <a:uFillTx/>
                 <a:latin typeface="Arial"/>
               </a:rPr>
               <a:t>Za to da radi u Chromeu, morao sam izmijeniti CSS (jer tooltipsi na “Play/Pause”, “Fast Forward”, “Single Step” i “Stop” nisu bili radili).</a:t>
             </a:r>
-            <a:endParaRPr b="0" lang="bs-BA" sz="1200" spc="-1" strike="noStrike">
+            <a:endParaRPr b="0" lang="bs-BA" sz="1200" strike="noStrike" u="none">
               <a:solidFill>
                 <a:srgbClr val="009bdd"/>
               </a:solidFill>
+              <a:uFillTx/>
               <a:latin typeface="Arial"/>
             </a:endParaRPr>
           </a:p>
@@ -6534,18 +6742,20 @@
               <a:buChar char=""/>
             </a:pPr>
             <a:r>
-              <a:rPr b="0" lang="bs-BA" sz="1200" spc="-1" strike="noStrike">
-                <a:solidFill>
-                  <a:srgbClr val="009bdd"/>
-                </a:solidFill>
+              <a:rPr b="0" lang="bs-BA" sz="1200" strike="noStrike" u="none">
+                <a:solidFill>
+                  <a:srgbClr val="009bdd"/>
+                </a:solidFill>
+                <a:uFillTx/>
                 <a:latin typeface="Arial"/>
               </a:rPr>
               <a:t>WebPositive (bliski srodnik Safariju)</a:t>
             </a:r>
-            <a:endParaRPr b="0" lang="bs-BA" sz="1200" spc="-1" strike="noStrike">
+            <a:endParaRPr b="0" lang="bs-BA" sz="1200" strike="noStrike" u="none">
               <a:solidFill>
                 <a:srgbClr val="009bdd"/>
               </a:solidFill>
+              <a:uFillTx/>
               <a:latin typeface="Arial"/>
             </a:endParaRPr>
           </a:p>
@@ -6562,18 +6772,20 @@
               <a:buChar char=""/>
             </a:pPr>
             <a:r>
-              <a:rPr b="0" lang="bs-BA" sz="1200" spc="-1" strike="noStrike">
-                <a:solidFill>
-                  <a:srgbClr val="009bdd"/>
-                </a:solidFill>
+              <a:rPr b="0" lang="bs-BA" sz="1200" strike="noStrike" u="none">
+                <a:solidFill>
+                  <a:srgbClr val="009bdd"/>
+                </a:solidFill>
+                <a:uFillTx/>
                 <a:latin typeface="Arial"/>
               </a:rPr>
               <a:t>Za to da radi u WebPositiveu, morao sam izmijeniti i CSS i JavaScript.</a:t>
             </a:r>
-            <a:endParaRPr b="0" lang="bs-BA" sz="1200" spc="-1" strike="noStrike">
+            <a:endParaRPr b="0" lang="bs-BA" sz="1200" strike="noStrike" u="none">
               <a:solidFill>
                 <a:srgbClr val="009bdd"/>
               </a:solidFill>
+              <a:uFillTx/>
               <a:latin typeface="Arial"/>
             </a:endParaRPr>
           </a:p>
@@ -6590,18 +6802,20 @@
               <a:buChar char=""/>
             </a:pPr>
             <a:r>
-              <a:rPr b="0" lang="bs-BA" sz="1200" spc="-1" strike="noStrike">
-                <a:solidFill>
-                  <a:srgbClr val="009bdd"/>
-                </a:solidFill>
+              <a:rPr b="0" lang="bs-BA" sz="1200" strike="noStrike" u="none">
+                <a:solidFill>
+                  <a:srgbClr val="009bdd"/>
+                </a:solidFill>
+                <a:uFillTx/>
                 <a:latin typeface="Arial"/>
               </a:rPr>
               <a:t>Nisam uspio napraviti da “Download Hexadecimal” radi u WebPositiveu.</a:t>
             </a:r>
-            <a:endParaRPr b="0" lang="bs-BA" sz="1200" spc="-1" strike="noStrike">
+            <a:endParaRPr b="0" lang="bs-BA" sz="1200" strike="noStrike" u="none">
               <a:solidFill>
                 <a:srgbClr val="009bdd"/>
               </a:solidFill>
+              <a:uFillTx/>
               <a:latin typeface="Arial"/>
             </a:endParaRPr>
           </a:p>
@@ -6618,36 +6832,40 @@
               <a:buChar char=""/>
             </a:pPr>
             <a:r>
-              <a:rPr b="0" lang="bs-BA" sz="1200" spc="-1" strike="noStrike">
-                <a:solidFill>
-                  <a:srgbClr val="009bdd"/>
-                </a:solidFill>
+              <a:rPr b="0" lang="bs-BA" sz="1200" strike="noStrike" u="none">
+                <a:solidFill>
+                  <a:srgbClr val="009bdd"/>
+                </a:solidFill>
+                <a:uFillTx/>
                 <a:latin typeface="Arial"/>
               </a:rPr>
               <a:t>Darko Nikolić tvrdi da je isprobao moj program na Macu u Safariju i u Operi i da funkcionira tamo. Discordaš </a:t>
             </a:r>
             <a:r>
-              <a:rPr b="0" i="1" lang="bs-BA" sz="1200" spc="-1" strike="noStrike">
-                <a:solidFill>
-                  <a:srgbClr val="009bdd"/>
-                </a:solidFill>
+              <a:rPr b="0" i="1" lang="bs-BA" sz="1200" strike="noStrike" u="none">
+                <a:solidFill>
+                  <a:srgbClr val="009bdd"/>
+                </a:solidFill>
+                <a:uFillTx/>
                 <a:latin typeface="Arial"/>
               </a:rPr>
               <a:t>emm312</a:t>
             </a:r>
             <a:r>
-              <a:rPr b="0" lang="bs-BA" sz="1200" spc="-1" strike="noStrike">
-                <a:solidFill>
-                  <a:srgbClr val="009bdd"/>
-                </a:solidFill>
+              <a:rPr b="0" lang="bs-BA" sz="1200" strike="noStrike" u="none">
+                <a:solidFill>
+                  <a:srgbClr val="009bdd"/>
+                </a:solidFill>
+                <a:uFillTx/>
                 <a:latin typeface="Arial"/>
               </a:rPr>
               <a:t> isto tvrdi da ga je isprobao u Safariju i da funkcionira tamo.</a:t>
             </a:r>
-            <a:endParaRPr b="0" lang="bs-BA" sz="1200" spc="-1" strike="noStrike">
+            <a:endParaRPr b="0" lang="bs-BA" sz="1200" strike="noStrike" u="none">
               <a:solidFill>
                 <a:srgbClr val="009bdd"/>
               </a:solidFill>
+              <a:uFillTx/>
               <a:latin typeface="Arial"/>
             </a:endParaRPr>
           </a:p>
@@ -6667,7 +6885,7 @@
         <p:txBody>
           <a:bodyPr/>
           <a:p>
-            <a:fld id="{C0552D02-7EEE-415D-8AC0-D35A6C16DEA8}" type="slidenum">
+            <a:fld id="{8C996EE5-336A-4E0D-A279-8B485CDED5CD}" type="slidenum">
               <a:t>20</a:t>
             </a:fld>
           </a:p>
@@ -6687,9 +6905,9 @@
         <p:txBody>
           <a:bodyPr/>
           <a:p>
-            <a:fld id="{9C2CF006-C061-4870-803B-1462ED1ACB00}" type="datetime1">
+            <a:fld id="{FD36834F-157F-4816-8B82-5E1C6968888F}" type="datetime1">
               <a:rPr lang="en-US"/>
-              <a:t>09/08/2024</a:t>
+              <a:t>02/03/2025</a:t>
             </a:fld>
           </a:p>
         </p:txBody>
@@ -6756,18 +6974,20 @@
               <a:buNone/>
             </a:pPr>
             <a:r>
-              <a:rPr b="0" lang="bs-BA" sz="3300" spc="-1" strike="noStrike">
+              <a:rPr b="0" lang="bs-BA" sz="3300" strike="noStrike" u="none">
                 <a:solidFill>
                   <a:srgbClr val="ffffff"/>
                 </a:solidFill>
+                <a:uFillTx/>
                 <a:latin typeface="Arial"/>
               </a:rPr>
               <a:t>Back-end</a:t>
             </a:r>
-            <a:endParaRPr b="0" lang="bs-BA" sz="3300" spc="-1" strike="noStrike">
+            <a:endParaRPr b="0" lang="bs-BA" sz="3300" strike="noStrike" u="none">
               <a:solidFill>
                 <a:srgbClr val="ffffff"/>
               </a:solidFill>
+              <a:uFillTx/>
               <a:latin typeface="Arial"/>
             </a:endParaRPr>
           </a:p>
@@ -6813,36 +7033,40 @@
               <a:buChar char=""/>
             </a:pPr>
             <a:r>
-              <a:rPr b="0" lang="bs-BA" sz="2400" spc="-1" strike="noStrike">
-                <a:solidFill>
-                  <a:srgbClr val="009bdd"/>
-                </a:solidFill>
+              <a:rPr b="0" lang="bs-BA" sz="2400" strike="noStrike" u="none">
+                <a:solidFill>
+                  <a:srgbClr val="009bdd"/>
+                </a:solidFill>
+                <a:uFillTx/>
                 <a:latin typeface="Arial"/>
               </a:rPr>
               <a:t>Abidin Durdu (</a:t>
             </a:r>
             <a:r>
-              <a:rPr b="0" i="1" lang="bs-BA" sz="2400" spc="-1" strike="noStrike">
-                <a:solidFill>
-                  <a:srgbClr val="009bdd"/>
-                </a:solidFill>
+              <a:rPr b="0" i="1" lang="bs-BA" sz="2400" strike="noStrike" u="none">
+                <a:solidFill>
+                  <a:srgbClr val="009bdd"/>
+                </a:solidFill>
+                <a:uFillTx/>
                 <a:latin typeface="Arial"/>
               </a:rPr>
               <a:t>betelgeuse-7</a:t>
             </a:r>
             <a:r>
-              <a:rPr b="0" lang="bs-BA" sz="2400" spc="-1" strike="noStrike">
-                <a:solidFill>
-                  <a:srgbClr val="009bdd"/>
-                </a:solidFill>
+              <a:rPr b="0" lang="bs-BA" sz="2400" strike="noStrike" u="none">
+                <a:solidFill>
+                  <a:srgbClr val="009bdd"/>
+                </a:solidFill>
+                <a:uFillTx/>
                 <a:latin typeface="Arial"/>
               </a:rPr>
               <a:t>) napravio je back-end u PHP-u, koji omogućuje korisnicima da dijele asemblerske programe. Taj back-end koristi MySQL bazu podataka. Vrti se na SourceForge serverima.</a:t>
             </a:r>
-            <a:endParaRPr b="0" lang="bs-BA" sz="2400" spc="-1" strike="noStrike">
+            <a:endParaRPr b="0" lang="bs-BA" sz="2400" strike="noStrike" u="none">
               <a:solidFill>
                 <a:srgbClr val="009bdd"/>
               </a:solidFill>
+              <a:uFillTx/>
               <a:latin typeface="Arial"/>
             </a:endParaRPr>
           </a:p>
@@ -6866,6 +7090,7 @@
           <a:prstGeom prst="rect">
             <a:avLst/>
           </a:prstGeom>
+          <a:noFill/>
           <a:ln w="18000">
             <a:noFill/>
           </a:ln>
@@ -6904,10 +7129,11 @@
             <a:noAutofit/>
           </a:bodyPr>
           <a:p>
-            <a:endParaRPr b="0" lang="bs-BA" sz="1800" spc="-1" strike="noStrike">
+            <a:endParaRPr b="0" lang="bs-BA" sz="1800" strike="noStrike" u="none">
               <a:solidFill>
                 <a:srgbClr val="000000"/>
               </a:solidFill>
+              <a:uFillTx/>
               <a:latin typeface="Arial"/>
             </a:endParaRPr>
           </a:p>
@@ -6931,6 +7157,7 @@
           <a:prstGeom prst="rect">
             <a:avLst/>
           </a:prstGeom>
+          <a:noFill/>
           <a:ln w="18000">
             <a:noFill/>
           </a:ln>
@@ -6950,7 +7177,7 @@
         <p:txBody>
           <a:bodyPr/>
           <a:p>
-            <a:fld id="{59FD2E6B-D2B1-44DE-B305-5E98D8F24E1E}" type="slidenum">
+            <a:fld id="{9A3BAF68-FE5F-4395-9A2D-B02C369BA2D5}" type="slidenum">
               <a:t>21</a:t>
             </a:fld>
           </a:p>
@@ -6970,9 +7197,9 @@
         <p:txBody>
           <a:bodyPr/>
           <a:p>
-            <a:fld id="{B39D97EC-F10C-4771-A0B1-98F1259EBC4A}" type="datetime1">
+            <a:fld id="{CE0A7B93-3987-49F2-9E05-8A827093C470}" type="datetime1">
               <a:rPr lang="en-US"/>
-              <a:t>09/08/2024</a:t>
+              <a:t>02/03/2025</a:t>
             </a:fld>
           </a:p>
         </p:txBody>
@@ -7039,18 +7266,20 @@
               <a:buNone/>
             </a:pPr>
             <a:r>
-              <a:rPr b="0" lang="bs-BA" sz="3300" spc="-1" strike="noStrike">
+              <a:rPr b="0" lang="bs-BA" sz="3300" strike="noStrike" u="none">
                 <a:solidFill>
                   <a:srgbClr val="ffffff"/>
                 </a:solidFill>
-                <a:latin typeface="Arial"/>
-              </a:rPr>
-              <a:t>Bilješke o arhitekturi</a:t>
-            </a:r>
-            <a:endParaRPr b="0" lang="bs-BA" sz="3300" spc="-1" strike="noStrike">
+                <a:uFillTx/>
+                <a:latin typeface="Arial"/>
+              </a:rPr>
+              <a:t>Bilješke o sintaksi</a:t>
+            </a:r>
+            <a:endParaRPr b="0" lang="bs-BA" sz="3300" strike="noStrike" u="none">
               <a:solidFill>
                 <a:srgbClr val="ffffff"/>
               </a:solidFill>
+              <a:uFillTx/>
               <a:latin typeface="Arial"/>
             </a:endParaRPr>
           </a:p>
@@ -7096,18 +7325,20 @@
               <a:buChar char=""/>
             </a:pPr>
             <a:r>
-              <a:rPr b="0" lang="bs-BA" sz="2400" spc="-1" strike="noStrike">
-                <a:solidFill>
-                  <a:srgbClr val="009bdd"/>
-                </a:solidFill>
-                <a:latin typeface="Arial"/>
-              </a:rPr>
-              <a:t>Parseri većine asemblera pretvaraju tokenizirani asemblerski kod u dvodimenzionalno polje (tablicu) malih stabala (gdje su samo aritmetički izrazi stabla, a ostalo su pojedinačni čvorovi).</a:t>
-            </a:r>
-            <a:endParaRPr b="0" lang="bs-BA" sz="2400" spc="-1" strike="noStrike">
+              <a:rPr b="0" lang="bs-BA" sz="2100" strike="noStrike" u="none">
+                <a:solidFill>
+                  <a:srgbClr val="009bdd"/>
+                </a:solidFill>
+                <a:uFillTx/>
+                <a:latin typeface="Arial"/>
+              </a:rPr>
+              <a:t>Moj asembler za PicoBlaze cilja na punu kompatibilnost sa Xilinxovim službenim asemblerom za PicoBlaze. To, na žalost, znači da se numerički literali bez eksplicitno određene brojevne baze interpretiraju kao heksadekadski.</a:t>
+            </a:r>
+            <a:endParaRPr b="0" lang="bs-BA" sz="2100" strike="noStrike" u="none">
               <a:solidFill>
                 <a:srgbClr val="009bdd"/>
               </a:solidFill>
+              <a:uFillTx/>
               <a:latin typeface="Arial"/>
             </a:endParaRPr>
           </a:p>
@@ -7124,18 +7355,60 @@
               <a:buChar char=""/>
             </a:pPr>
             <a:r>
-              <a:rPr b="0" lang="bs-BA" sz="2400" spc="-1" strike="noStrike">
-                <a:solidFill>
-                  <a:srgbClr val="009bdd"/>
-                </a:solidFill>
-                <a:latin typeface="Arial"/>
-              </a:rPr>
-              <a:t>Parser u ovom asembleru za PicoBlaze pretvara tokenizirani asemblerski kod u jedno veliko stablo. Korijen tog stabla je čvor s tekstom “assembly”, a čvorovi dubine 1 su mnemonike, pretprocesorske naredbe i labeli.</a:t>
-            </a:r>
-            <a:endParaRPr b="0" lang="bs-BA" sz="2400" spc="-1" strike="noStrike">
+              <a:rPr b="0" lang="bs-BA" sz="2100" strike="noStrike" u="none">
+                <a:solidFill>
+                  <a:srgbClr val="009bdd"/>
+                </a:solidFill>
+                <a:uFillTx/>
+                <a:latin typeface="Arial"/>
+              </a:rPr>
+              <a:t>Od verzije v5.0.0 to se ponašanje može promijeniti: pretprocesor i asembler će sve brojevne literale bez specificirane baze nakon direktive </a:t>
+            </a:r>
+            <a:r>
+              <a:rPr b="0" lang="bs-BA" sz="2100" strike="noStrike" u="none">
+                <a:solidFill>
+                  <a:srgbClr val="009bdd"/>
+                </a:solidFill>
+                <a:uFillTx/>
+                <a:latin typeface="Courier New"/>
+              </a:rPr>
+              <a:t>base_decimal</a:t>
+            </a:r>
+            <a:r>
+              <a:rPr b="0" lang="bs-BA" sz="2100" strike="noStrike" u="none">
+                <a:solidFill>
+                  <a:srgbClr val="009bdd"/>
+                </a:solidFill>
+                <a:uFillTx/>
+                <a:latin typeface="Arial"/>
+              </a:rPr>
+              <a:t> interpretirati kao dekadske (kao u gotovo svim programskim jezicima), a nakon </a:t>
+            </a:r>
+            <a:r>
+              <a:rPr b="0" lang="bs-BA" sz="2100" strike="noStrike" u="none">
+                <a:solidFill>
+                  <a:srgbClr val="009bdd"/>
+                </a:solidFill>
+                <a:uFillTx/>
+                <a:latin typeface="Courier New"/>
+              </a:rPr>
+              <a:t>base_hexadecimal</a:t>
+            </a:r>
+            <a:r>
+              <a:rPr b="0" lang="bs-BA" sz="2100" strike="noStrike" u="none">
+                <a:solidFill>
+                  <a:srgbClr val="009bdd"/>
+                </a:solidFill>
+                <a:uFillTx/>
+                <a:latin typeface="Arial"/>
+              </a:rPr>
+              <a:t> kao heksadekadske.</a:t>
+            </a:r>
+            <a:endParaRPr b="0" lang="bs-BA" sz="2100" strike="noStrike" u="none">
               <a:solidFill>
                 <a:srgbClr val="009bdd"/>
               </a:solidFill>
+              <a:uFillTx/>
               <a:latin typeface="Arial"/>
             </a:endParaRPr>
           </a:p>
@@ -7152,18 +7425,20 @@
               <a:buChar char=""/>
             </a:pPr>
             <a:r>
-              <a:rPr b="0" lang="bs-BA" sz="2400" spc="-1" strike="noStrike">
-                <a:solidFill>
-                  <a:srgbClr val="009bdd"/>
-                </a:solidFill>
-                <a:latin typeface="Arial"/>
-              </a:rPr>
-              <a:t>Operandi mnemonika i pretprocesorskih naredbi njihova su djeca.</a:t>
-            </a:r>
-            <a:endParaRPr b="0" lang="bs-BA" sz="2400" spc="-1" strike="noStrike">
+              <a:rPr b="0" lang="bs-BA" sz="2100" strike="noStrike" u="none">
+                <a:solidFill>
+                  <a:srgbClr val="009bdd"/>
+                </a:solidFill>
+                <a:uFillTx/>
+                <a:latin typeface="Arial"/>
+              </a:rPr>
+              <a:t>Zbog načina na koji je asembler napravljen, ako se te naredbe stave u if-grananje ili while-petlju, može se dogoditi da pretprocesor interpretira konstante kao dekadske, a asembler kao heksadekadske. Nema očitog rješenja za taj problem.</a:t>
+            </a:r>
+            <a:endParaRPr b="0" lang="bs-BA" sz="2100" strike="noStrike" u="none">
               <a:solidFill>
                 <a:srgbClr val="009bdd"/>
               </a:solidFill>
+              <a:uFillTx/>
               <a:latin typeface="Arial"/>
             </a:endParaRPr>
           </a:p>
@@ -7183,7 +7458,7 @@
         <p:txBody>
           <a:bodyPr/>
           <a:p>
-            <a:fld id="{434EE30F-87E5-4D7A-AEE6-1AA8783534CB}" type="slidenum">
+            <a:fld id="{87DDDA86-190D-4317-A216-0D0EAFDC705F}" type="slidenum">
               <a:t>22</a:t>
             </a:fld>
           </a:p>
@@ -7203,9 +7478,9 @@
         <p:txBody>
           <a:bodyPr/>
           <a:p>
-            <a:fld id="{7F8D665F-E33A-4B6F-BF45-CB174ED7AACE}" type="datetime1">
+            <a:fld id="{D34F0777-4682-414F-A73A-A2D8D1338DE7}" type="datetime1">
               <a:rPr lang="en-US"/>
-              <a:t>09/08/2024</a:t>
+              <a:t>02/03/2025</a:t>
             </a:fld>
           </a:p>
         </p:txBody>
@@ -7247,6 +7522,247 @@
             <a:spLocks noGrp="1"/>
           </p:cNvSpPr>
           <p:nvPr>
+            <p:ph type="title"/>
+          </p:nvPr>
+        </p:nvSpPr>
+        <p:spPr>
+          <a:xfrm>
+            <a:off x="360000" y="180000"/>
+            <a:ext cx="9360000" cy="478080"/>
+          </a:xfrm>
+          <a:prstGeom prst="rect">
+            <a:avLst/>
+          </a:prstGeom>
+          <a:noFill/>
+          <a:ln w="0">
+            <a:noFill/>
+          </a:ln>
+        </p:spPr>
+        <p:txBody>
+          <a:bodyPr lIns="0" rIns="0" tIns="0" bIns="0" anchor="ctr">
+            <a:noAutofit/>
+          </a:bodyPr>
+          <a:p>
+            <a:pPr indent="0" algn="ctr">
+              <a:buNone/>
+            </a:pPr>
+            <a:r>
+              <a:rPr b="0" lang="bs-BA" sz="3300" strike="noStrike" u="none">
+                <a:solidFill>
+                  <a:srgbClr val="ffffff"/>
+                </a:solidFill>
+                <a:uFillTx/>
+                <a:latin typeface="Arial"/>
+              </a:rPr>
+              <a:t>Bilješke o arhitekturi</a:t>
+            </a:r>
+            <a:endParaRPr b="0" lang="bs-BA" sz="3300" strike="noStrike" u="none">
+              <a:solidFill>
+                <a:srgbClr val="ffffff"/>
+              </a:solidFill>
+              <a:uFillTx/>
+              <a:latin typeface="Arial"/>
+            </a:endParaRPr>
+          </a:p>
+        </p:txBody>
+      </p:sp>
+      <p:sp>
+        <p:nvSpPr>
+          <p:cNvPr id="92" name="PlaceHolder 2"/>
+          <p:cNvSpPr>
+            <a:spLocks noGrp="1"/>
+          </p:cNvSpPr>
+          <p:nvPr>
+            <p:ph/>
+          </p:nvPr>
+        </p:nvSpPr>
+        <p:spPr>
+          <a:xfrm>
+            <a:off x="360000" y="1080000"/>
+            <a:ext cx="9360000" cy="3600000"/>
+          </a:xfrm>
+          <a:prstGeom prst="rect">
+            <a:avLst/>
+          </a:prstGeom>
+          <a:noFill/>
+          <a:ln w="0">
+            <a:noFill/>
+          </a:ln>
+        </p:spPr>
+        <p:txBody>
+          <a:bodyPr lIns="0" rIns="0" tIns="0" bIns="0" anchor="t">
+            <a:noAutofit/>
+          </a:bodyPr>
+          <a:p>
+            <a:pPr marL="432000" indent="-324000">
+              <a:spcBef>
+                <a:spcPts val="1060"/>
+              </a:spcBef>
+              <a:buClr>
+                <a:srgbClr val="77caee"/>
+              </a:buClr>
+              <a:buSzPct val="45000"/>
+              <a:buFont typeface="Wingdings" charset="2"/>
+              <a:buChar char=""/>
+            </a:pPr>
+            <a:r>
+              <a:rPr b="0" lang="bs-BA" sz="2400" strike="noStrike" u="none">
+                <a:solidFill>
+                  <a:srgbClr val="009bdd"/>
+                </a:solidFill>
+                <a:uFillTx/>
+                <a:latin typeface="Arial"/>
+              </a:rPr>
+              <a:t>Parseri većine asemblera pretvaraju tokenizirani asemblerski kod u dvodimenzionalno polje (tablicu) malih stabala (gdje su samo aritmetički izrazi stabla, a ostalo su pojedinačni čvorovi).</a:t>
+            </a:r>
+            <a:endParaRPr b="0" lang="bs-BA" sz="2400" strike="noStrike" u="none">
+              <a:solidFill>
+                <a:srgbClr val="009bdd"/>
+              </a:solidFill>
+              <a:uFillTx/>
+              <a:latin typeface="Arial"/>
+            </a:endParaRPr>
+          </a:p>
+          <a:p>
+            <a:pPr marL="432000" indent="-324000">
+              <a:spcBef>
+                <a:spcPts val="1060"/>
+              </a:spcBef>
+              <a:buClr>
+                <a:srgbClr val="77caee"/>
+              </a:buClr>
+              <a:buSzPct val="45000"/>
+              <a:buFont typeface="Wingdings" charset="2"/>
+              <a:buChar char=""/>
+            </a:pPr>
+            <a:r>
+              <a:rPr b="0" lang="bs-BA" sz="2400" strike="noStrike" u="none">
+                <a:solidFill>
+                  <a:srgbClr val="009bdd"/>
+                </a:solidFill>
+                <a:uFillTx/>
+                <a:latin typeface="Arial"/>
+              </a:rPr>
+              <a:t>Parser u ovom asembleru za PicoBlaze pretvara tokenizirani asemblerski kod u jedno veliko stablo. Korijen tog stabla je čvor s tekstom “assembly”, a čvorovi dubine 1 su mnemonike, pretprocesorske naredbe i labeli.</a:t>
+            </a:r>
+            <a:endParaRPr b="0" lang="bs-BA" sz="2400" strike="noStrike" u="none">
+              <a:solidFill>
+                <a:srgbClr val="009bdd"/>
+              </a:solidFill>
+              <a:uFillTx/>
+              <a:latin typeface="Arial"/>
+            </a:endParaRPr>
+          </a:p>
+          <a:p>
+            <a:pPr marL="432000" indent="-324000">
+              <a:spcBef>
+                <a:spcPts val="1060"/>
+              </a:spcBef>
+              <a:buClr>
+                <a:srgbClr val="77caee"/>
+              </a:buClr>
+              <a:buSzPct val="45000"/>
+              <a:buFont typeface="Wingdings" charset="2"/>
+              <a:buChar char=""/>
+            </a:pPr>
+            <a:r>
+              <a:rPr b="0" lang="bs-BA" sz="2400" strike="noStrike" u="none">
+                <a:solidFill>
+                  <a:srgbClr val="009bdd"/>
+                </a:solidFill>
+                <a:uFillTx/>
+                <a:latin typeface="Arial"/>
+              </a:rPr>
+              <a:t>Operandi mnemonika i pretprocesorskih naredbi njihova su djeca.</a:t>
+            </a:r>
+            <a:endParaRPr b="0" lang="bs-BA" sz="2400" strike="noStrike" u="none">
+              <a:solidFill>
+                <a:srgbClr val="009bdd"/>
+              </a:solidFill>
+              <a:uFillTx/>
+              <a:latin typeface="Arial"/>
+            </a:endParaRPr>
+          </a:p>
+        </p:txBody>
+      </p:sp>
+      <p:sp>
+        <p:nvSpPr>
+          <p:cNvPr id="4" name="PlaceHolder 3"/>
+          <p:cNvSpPr>
+            <a:spLocks noGrp="1"/>
+          </p:cNvSpPr>
+          <p:nvPr>
+            <p:ph type="sldNum" idx="6"/>
+          </p:nvPr>
+        </p:nvSpPr>
+        <p:spPr/>
+        <p:txBody>
+          <a:bodyPr/>
+          <a:p>
+            <a:fld id="{2645769B-8019-4765-B7C0-9BF0AB044883}" type="slidenum">
+              <a:t>23</a:t>
+            </a:fld>
+          </a:p>
+        </p:txBody>
+      </p:sp>
+      <p:sp>
+        <p:nvSpPr>
+          <p:cNvPr id="5" name="PlaceHolder 4"/>
+          <p:cNvSpPr>
+            <a:spLocks noGrp="1"/>
+          </p:cNvSpPr>
+          <p:nvPr>
+            <p:ph type="dt" idx="4"/>
+          </p:nvPr>
+        </p:nvSpPr>
+        <p:spPr/>
+        <p:txBody>
+          <a:bodyPr/>
+          <a:p>
+            <a:fld id="{071FA692-BA1E-4327-A4FF-B0E5A2BA2917}" type="datetime1">
+              <a:rPr lang="en-US"/>
+              <a:t>02/03/2025</a:t>
+            </a:fld>
+          </a:p>
+        </p:txBody>
+      </p:sp>
+    </p:spTree>
+  </p:cSld>
+  <mc:AlternateContent>
+    <mc:Choice Requires="p14">
+      <p:transition spd="slow" p14:dur="2000"/>
+    </mc:Choice>
+    <mc:Fallback>
+      <p:transition spd="slow"/>
+    </mc:Fallback>
+  </mc:AlternateContent>
+</p:sld>
+</file>
+
+<file path=ppt/slides/slide24.xml><?xml version="1.0" encoding="utf-8"?>
+<p:sld xmlns:a="http://schemas.openxmlformats.org/drawingml/2006/main" xmlns:p="http://schemas.openxmlformats.org/presentationml/2006/main" xmlns:r="http://schemas.openxmlformats.org/officeDocument/2006/relationships" xmlns:p14="http://schemas.microsoft.com/office/powerpoint/2010/main" xmlns:p15="http://schemas.microsoft.com/office/powerpoint/2012/main" xmlns:mc="http://schemas.openxmlformats.org/markup-compatibility/2006">
+  <p:cSld>
+    <p:spTree>
+      <p:nvGrpSpPr>
+        <p:cNvPr id="1" name=""/>
+        <p:cNvGrpSpPr/>
+        <p:nvPr/>
+      </p:nvGrpSpPr>
+      <p:grpSpPr>
+        <a:xfrm>
+          <a:off x="0" y="0"/>
+          <a:ext cx="0" cy="0"/>
+          <a:chOff x="0" y="0"/>
+          <a:chExt cx="0" cy="0"/>
+        </a:xfrm>
+      </p:grpSpPr>
+      <p:sp>
+        <p:nvSpPr>
+          <p:cNvPr id="93" name="PlaceHolder 1"/>
+          <p:cNvSpPr>
+            <a:spLocks noGrp="1"/>
+          </p:cNvSpPr>
+          <p:nvPr>
             <p:ph type="subTitle"/>
           </p:nvPr>
         </p:nvSpPr>
@@ -7270,24 +7786,26 @@
           <a:p>
             <a:pPr algn="ctr"/>
             <a:r>
-              <a:rPr b="0" lang="bs-BA" sz="3200" spc="-1" strike="noStrike">
+              <a:rPr b="0" lang="bs-BA" sz="3200" strike="noStrike" u="none">
                 <a:solidFill>
                   <a:srgbClr val="000000"/>
                 </a:solidFill>
                 <a:highlight>
                   <a:srgbClr val="ffffff"/>
                 </a:highlight>
+                <a:uFillTx/>
                 <a:latin typeface="Arial"/>
               </a:rPr>
               <a:t>Hvala na pozornosti!</a:t>
             </a:r>
-            <a:endParaRPr b="0" lang="bs-BA" sz="3200" spc="-1" strike="noStrike">
+            <a:endParaRPr b="0" lang="bs-BA" sz="3200" strike="noStrike" u="none">
               <a:solidFill>
                 <a:srgbClr val="000000"/>
               </a:solidFill>
               <a:highlight>
                 <a:srgbClr val="ffffff"/>
               </a:highlight>
+              <a:uFillTx/>
               <a:latin typeface="Arial"/>
             </a:endParaRPr>
           </a:p>
@@ -7307,8 +7825,8 @@
         <p:txBody>
           <a:bodyPr/>
           <a:p>
-            <a:fld id="{4D0F63DB-31B4-4975-937D-C79F382592B7}" type="slidenum">
-              <a:t>23</a:t>
+            <a:fld id="{9E40ED77-D375-4756-9320-1D4BE4726ECC}" type="slidenum">
+              <a:t>24</a:t>
             </a:fld>
           </a:p>
         </p:txBody>
@@ -7327,9 +7845,9 @@
         <p:txBody>
           <a:bodyPr/>
           <a:p>
-            <a:fld id="{71CDD637-9C03-42F8-9A6F-1DD950A1FC7C}" type="datetime1">
+            <a:fld id="{495147A3-AA9C-40D2-A751-93F3DF123BB7}" type="datetime1">
               <a:rPr lang="en-US"/>
-              <a:t>09/08/2024</a:t>
+              <a:t>02/03/2025</a:t>
             </a:fld>
           </a:p>
         </p:txBody>
@@ -7396,18 +7914,20 @@
               <a:buNone/>
             </a:pPr>
             <a:r>
-              <a:rPr b="0" lang="bs-BA" sz="3300" spc="-1" strike="noStrike">
+              <a:rPr b="0" lang="bs-BA" sz="3300" strike="noStrike" u="none">
                 <a:solidFill>
                   <a:srgbClr val="ffffff"/>
                 </a:solidFill>
+                <a:uFillTx/>
                 <a:latin typeface="Arial"/>
               </a:rPr>
               <a:t>Kako do njega...</a:t>
             </a:r>
-            <a:endParaRPr b="0" lang="bs-BA" sz="3300" spc="-1" strike="noStrike">
+            <a:endParaRPr b="0" lang="bs-BA" sz="3300" strike="noStrike" u="none">
               <a:solidFill>
                 <a:srgbClr val="ffffff"/>
               </a:solidFill>
+              <a:uFillTx/>
               <a:latin typeface="Arial"/>
             </a:endParaRPr>
           </a:p>
@@ -7453,28 +7973,31 @@
               <a:buChar char=""/>
             </a:pPr>
             <a:r>
-              <a:rPr b="0" lang="bs-BA" sz="2400" spc="-1" strike="noStrike">
-                <a:solidFill>
-                  <a:srgbClr val="009bdd"/>
-                </a:solidFill>
+              <a:rPr b="0" lang="bs-BA" sz="2400" strike="noStrike" u="none">
+                <a:solidFill>
+                  <a:srgbClr val="009bdd"/>
+                </a:solidFill>
+                <a:uFillTx/>
                 <a:latin typeface="Arial"/>
                 <a:hlinkClick r:id="rId1"/>
               </a:rPr>
               <a:t>https://flatassembler.github.io/PicoBlaze/PicoBlaze.html</a:t>
             </a:r>
             <a:r>
-              <a:rPr b="0" lang="bs-BA" sz="2400" spc="-1" strike="noStrike">
-                <a:solidFill>
-                  <a:srgbClr val="009bdd"/>
-                </a:solidFill>
+              <a:rPr b="0" lang="bs-BA" sz="2400" strike="noStrike" u="none">
+                <a:solidFill>
+                  <a:srgbClr val="009bdd"/>
+                </a:solidFill>
+                <a:uFillTx/>
                 <a:latin typeface="Arial"/>
               </a:rPr>
               <a:t> (samo front-end, uključujući i asembler pisan u JavaScriptu)</a:t>
             </a:r>
-            <a:endParaRPr b="0" lang="bs-BA" sz="2400" spc="-1" strike="noStrike">
+            <a:endParaRPr b="0" lang="bs-BA" sz="2400" strike="noStrike" u="none">
               <a:solidFill>
                 <a:srgbClr val="009bdd"/>
               </a:solidFill>
+              <a:uFillTx/>
               <a:latin typeface="Arial"/>
             </a:endParaRPr>
           </a:p>
@@ -7491,28 +8014,31 @@
               <a:buChar char=""/>
             </a:pPr>
             <a:r>
-              <a:rPr b="0" lang="bs-BA" sz="2400" spc="-1" strike="noStrike">
-                <a:solidFill>
-                  <a:srgbClr val="009bdd"/>
-                </a:solidFill>
+              <a:rPr b="0" lang="bs-BA" sz="2400" strike="noStrike" u="none">
+                <a:solidFill>
+                  <a:srgbClr val="009bdd"/>
+                </a:solidFill>
+                <a:uFillTx/>
                 <a:latin typeface="Arial"/>
                 <a:hlinkClick r:id="rId2"/>
               </a:rPr>
               <a:t>https://picoblaze-simulator.sourceforge.io/</a:t>
             </a:r>
             <a:r>
-              <a:rPr b="0" lang="bs-BA" sz="2400" spc="-1" strike="noStrike">
-                <a:solidFill>
-                  <a:srgbClr val="009bdd"/>
-                </a:solidFill>
+              <a:rPr b="0" lang="bs-BA" sz="2400" strike="noStrike" u="none">
+                <a:solidFill>
+                  <a:srgbClr val="009bdd"/>
+                </a:solidFill>
+                <a:uFillTx/>
                 <a:latin typeface="Arial"/>
               </a:rPr>
               <a:t> (i front-end i back-end)</a:t>
             </a:r>
-            <a:endParaRPr b="0" lang="bs-BA" sz="2400" spc="-1" strike="noStrike">
+            <a:endParaRPr b="0" lang="bs-BA" sz="2400" strike="noStrike" u="none">
               <a:solidFill>
                 <a:srgbClr val="009bdd"/>
               </a:solidFill>
+              <a:uFillTx/>
               <a:latin typeface="Arial"/>
             </a:endParaRPr>
           </a:p>
@@ -7523,10 +8049,11 @@
               </a:spcBef>
               <a:buNone/>
             </a:pPr>
-            <a:endParaRPr b="0" lang="bs-BA" sz="2400" spc="-1" strike="noStrike">
+            <a:endParaRPr b="0" lang="bs-BA" sz="2400" strike="noStrike" u="none">
               <a:solidFill>
                 <a:srgbClr val="009bdd"/>
               </a:solidFill>
+              <a:uFillTx/>
               <a:latin typeface="Arial"/>
             </a:endParaRPr>
           </a:p>
@@ -7543,47 +8070,52 @@
               <a:buChar char=""/>
             </a:pPr>
             <a:r>
-              <a:rPr b="0" lang="bs-BA" sz="2100" spc="-1" strike="noStrike">
-                <a:solidFill>
-                  <a:srgbClr val="009bdd"/>
-                </a:solidFill>
+              <a:rPr b="0" lang="bs-BA" sz="2100" strike="noStrike" u="none">
+                <a:solidFill>
+                  <a:srgbClr val="009bdd"/>
+                </a:solidFill>
+                <a:uFillTx/>
                 <a:latin typeface="Arial"/>
                 <a:hlinkClick r:id="rId3"/>
               </a:rPr>
               <a:t>https://agustiza.github.io/PicoBlaze_Simulator_in_JS/PicoBlaze.html</a:t>
             </a:r>
             <a:r>
-              <a:rPr b="0" lang="bs-BA" sz="2400" spc="-1" strike="noStrike">
-                <a:solidFill>
-                  <a:srgbClr val="009bdd"/>
-                </a:solidFill>
+              <a:rPr b="0" lang="bs-BA" sz="2400" strike="noStrike" u="none">
+                <a:solidFill>
+                  <a:srgbClr val="009bdd"/>
+                </a:solidFill>
+                <a:uFillTx/>
                 <a:latin typeface="Arial"/>
               </a:rPr>
               <a:t> (fork koji održava Agust</a:t>
             </a:r>
             <a:r>
-              <a:rPr b="0" lang="bs-BA" sz="2400" spc="-1" strike="noStrike">
-                <a:solidFill>
-                  <a:srgbClr val="009bdd"/>
-                </a:solidFill>
+              <a:rPr b="0" lang="bs-BA" sz="2400" strike="noStrike" u="none">
+                <a:solidFill>
+                  <a:srgbClr val="009bdd"/>
+                </a:solidFill>
+                <a:uFillTx/>
                 <a:latin typeface="Arial"/>
                 <a:ea typeface="Arial"/>
               </a:rPr>
               <a:t>í</a:t>
             </a:r>
             <a:r>
-              <a:rPr b="0" lang="bs-BA" sz="2400" spc="-1" strike="noStrike">
-                <a:solidFill>
-                  <a:srgbClr val="009bdd"/>
-                </a:solidFill>
+              <a:rPr b="0" lang="bs-BA" sz="2400" strike="noStrike" u="none">
+                <a:solidFill>
+                  <a:srgbClr val="009bdd"/>
+                </a:solidFill>
+                <a:uFillTx/>
                 <a:latin typeface="Arial"/>
               </a:rPr>
               <a:t>n Izaguirre)</a:t>
             </a:r>
-            <a:endParaRPr b="0" lang="bs-BA" sz="2400" spc="-1" strike="noStrike">
+            <a:endParaRPr b="0" lang="bs-BA" sz="2400" strike="noStrike" u="none">
               <a:solidFill>
                 <a:srgbClr val="009bdd"/>
               </a:solidFill>
+              <a:uFillTx/>
               <a:latin typeface="Arial"/>
             </a:endParaRPr>
           </a:p>
@@ -7603,7 +8135,7 @@
         <p:txBody>
           <a:bodyPr/>
           <a:p>
-            <a:fld id="{552E14B4-5061-4DCD-8673-565D8A1C1695}" type="slidenum">
+            <a:fld id="{23845AB8-CC94-4285-A061-ED2D71B8A7BF}" type="slidenum">
               <a:t>3</a:t>
             </a:fld>
           </a:p>
@@ -7623,9 +8155,9 @@
         <p:txBody>
           <a:bodyPr/>
           <a:p>
-            <a:fld id="{4D8BFA0A-DC43-458F-A0EF-17D0CF15DEA4}" type="datetime1">
+            <a:fld id="{C7C88219-7CB4-4047-837C-4D46B1487898}" type="datetime1">
               <a:rPr lang="en-US"/>
-              <a:t>09/08/2024</a:t>
+              <a:t>02/03/2025</a:t>
             </a:fld>
           </a:p>
         </p:txBody>
@@ -7692,18 +8224,20 @@
               <a:buNone/>
             </a:pPr>
             <a:r>
-              <a:rPr b="0" lang="bs-BA" sz="3300" spc="-1" strike="noStrike">
+              <a:rPr b="0" lang="bs-BA" sz="3300" strike="noStrike" u="none">
                 <a:solidFill>
                   <a:srgbClr val="ffffff"/>
                 </a:solidFill>
+                <a:uFillTx/>
                 <a:latin typeface="Arial"/>
               </a:rPr>
               <a:t>Kako se koristi...</a:t>
             </a:r>
-            <a:endParaRPr b="0" lang="bs-BA" sz="3300" spc="-1" strike="noStrike">
+            <a:endParaRPr b="0" lang="bs-BA" sz="3300" strike="noStrike" u="none">
               <a:solidFill>
                 <a:srgbClr val="ffffff"/>
               </a:solidFill>
+              <a:uFillTx/>
               <a:latin typeface="Arial"/>
             </a:endParaRPr>
           </a:p>
@@ -7749,18 +8283,20 @@
               <a:buChar char=""/>
             </a:pPr>
             <a:r>
-              <a:rPr b="0" lang="bs-BA" sz="2400" spc="-1" strike="noStrike">
-                <a:solidFill>
-                  <a:srgbClr val="009bdd"/>
-                </a:solidFill>
+              <a:rPr b="0" lang="bs-BA" sz="2400" strike="noStrike" u="none">
+                <a:solidFill>
+                  <a:srgbClr val="009bdd"/>
+                </a:solidFill>
+                <a:uFillTx/>
                 <a:latin typeface="Arial"/>
               </a:rPr>
               <a:t>Ukucamo (ili pasteamo) asemblerski kod...</a:t>
             </a:r>
-            <a:endParaRPr b="0" lang="bs-BA" sz="2400" spc="-1" strike="noStrike">
+            <a:endParaRPr b="0" lang="bs-BA" sz="2400" strike="noStrike" u="none">
               <a:solidFill>
                 <a:srgbClr val="009bdd"/>
               </a:solidFill>
+              <a:uFillTx/>
               <a:latin typeface="Arial"/>
             </a:endParaRPr>
           </a:p>
@@ -7777,18 +8313,20 @@
               <a:buChar char=""/>
             </a:pPr>
             <a:r>
-              <a:rPr b="0" lang="bs-BA" sz="2400" spc="-1" strike="noStrike">
-                <a:solidFill>
-                  <a:srgbClr val="009bdd"/>
-                </a:solidFill>
+              <a:rPr b="0" lang="bs-BA" sz="2400" strike="noStrike" u="none">
+                <a:solidFill>
+                  <a:srgbClr val="009bdd"/>
+                </a:solidFill>
+                <a:uFillTx/>
                 <a:latin typeface="Arial"/>
               </a:rPr>
               <a:t>...ili odaberemo neki od osam primjera iz flexboxa “Examples”.</a:t>
             </a:r>
-            <a:endParaRPr b="0" lang="bs-BA" sz="2400" spc="-1" strike="noStrike">
+            <a:endParaRPr b="0" lang="bs-BA" sz="2400" strike="noStrike" u="none">
               <a:solidFill>
                 <a:srgbClr val="009bdd"/>
               </a:solidFill>
+              <a:uFillTx/>
               <a:latin typeface="Arial"/>
             </a:endParaRPr>
           </a:p>
@@ -7812,6 +8350,7 @@
           <a:prstGeom prst="rect">
             <a:avLst/>
           </a:prstGeom>
+          <a:noFill/>
           <a:ln w="18000">
             <a:noFill/>
           </a:ln>
@@ -7835,6 +8374,7 @@
           <a:prstGeom prst="rect">
             <a:avLst/>
           </a:prstGeom>
+          <a:noFill/>
           <a:ln w="18000">
             <a:noFill/>
           </a:ln>
@@ -7854,7 +8394,7 @@
         <p:txBody>
           <a:bodyPr/>
           <a:p>
-            <a:fld id="{D5D9B14B-4530-4953-B1D3-B0865EAE197C}" type="slidenum">
+            <a:fld id="{8ECC1A15-7F79-4760-9556-837896C2593F}" type="slidenum">
               <a:t>4</a:t>
             </a:fld>
           </a:p>
@@ -7874,9 +8414,9 @@
         <p:txBody>
           <a:bodyPr/>
           <a:p>
-            <a:fld id="{C040156E-48CD-49D8-8DD9-51B8B49ADC60}" type="datetime1">
+            <a:fld id="{521FADE0-8483-4426-913B-F87F742B358D}" type="datetime1">
               <a:rPr lang="en-US"/>
-              <a:t>09/08/2024</a:t>
+              <a:t>02/03/2025</a:t>
             </a:fld>
           </a:p>
         </p:txBody>
@@ -7943,18 +8483,20 @@
               <a:buNone/>
             </a:pPr>
             <a:r>
-              <a:rPr b="0" lang="bs-BA" sz="3300" spc="-1" strike="noStrike">
+              <a:rPr b="0" lang="bs-BA" sz="3300" strike="noStrike" u="none">
                 <a:solidFill>
                   <a:srgbClr val="ffffff"/>
                 </a:solidFill>
+                <a:uFillTx/>
                 <a:latin typeface="Arial"/>
               </a:rPr>
               <a:t>Kako se koristi...</a:t>
             </a:r>
-            <a:endParaRPr b="0" lang="bs-BA" sz="3300" spc="-1" strike="noStrike">
+            <a:endParaRPr b="0" lang="bs-BA" sz="3300" strike="noStrike" u="none">
               <a:solidFill>
                 <a:srgbClr val="ffffff"/>
               </a:solidFill>
+              <a:uFillTx/>
               <a:latin typeface="Arial"/>
             </a:endParaRPr>
           </a:p>
@@ -8000,18 +8542,20 @@
               <a:buChar char=""/>
             </a:pPr>
             <a:r>
-              <a:rPr b="0" lang="bs-BA" sz="2400" spc="-1" strike="noStrike">
-                <a:solidFill>
-                  <a:srgbClr val="009bdd"/>
-                </a:solidFill>
+              <a:rPr b="0" lang="bs-BA" sz="2400" strike="noStrike" u="none">
+                <a:solidFill>
+                  <a:srgbClr val="009bdd"/>
+                </a:solidFill>
+                <a:uFillTx/>
                 <a:latin typeface="Arial"/>
               </a:rPr>
               <a:t>Ako želimo da nam se kod sintaksno oboji, kliknemo na gumb “Highlight Assembly”. To je daleko lakše isprogramirati u JavaScriptu nego da se kod automatski boja kako ga tipkamo.</a:t>
             </a:r>
-            <a:endParaRPr b="0" lang="bs-BA" sz="2400" spc="-1" strike="noStrike">
+            <a:endParaRPr b="0" lang="bs-BA" sz="2400" strike="noStrike" u="none">
               <a:solidFill>
                 <a:srgbClr val="009bdd"/>
               </a:solidFill>
+              <a:uFillTx/>
               <a:latin typeface="Arial"/>
             </a:endParaRPr>
           </a:p>
@@ -8035,6 +8579,7 @@
           <a:prstGeom prst="rect">
             <a:avLst/>
           </a:prstGeom>
+          <a:noFill/>
           <a:ln w="18000">
             <a:noFill/>
           </a:ln>
@@ -8058,6 +8603,7 @@
           <a:prstGeom prst="rect">
             <a:avLst/>
           </a:prstGeom>
+          <a:noFill/>
           <a:ln w="18000">
             <a:noFill/>
           </a:ln>
@@ -8096,10 +8642,11 @@
             <a:noAutofit/>
           </a:bodyPr>
           <a:p>
-            <a:endParaRPr b="0" lang="bs-BA" sz="1800" spc="-1" strike="noStrike">
+            <a:endParaRPr b="0" lang="bs-BA" sz="1800" strike="noStrike" u="none">
               <a:solidFill>
                 <a:srgbClr val="000000"/>
               </a:solidFill>
+              <a:uFillTx/>
               <a:latin typeface="Arial"/>
             </a:endParaRPr>
           </a:p>
@@ -8119,7 +8666,7 @@
         <p:txBody>
           <a:bodyPr/>
           <a:p>
-            <a:fld id="{2C5AAED9-FDBA-4F14-99D5-C55F275EB3AA}" type="slidenum">
+            <a:fld id="{195E7831-C41C-4CE7-BE54-1A99CD12D3FB}" type="slidenum">
               <a:t>5</a:t>
             </a:fld>
           </a:p>
@@ -8139,9 +8686,9 @@
         <p:txBody>
           <a:bodyPr/>
           <a:p>
-            <a:fld id="{91955CF2-BB66-49AC-9810-3E9EFDF0BA07}" type="datetime1">
+            <a:fld id="{51F38EEC-57A1-4DA5-A9C4-83E6713727EC}" type="datetime1">
               <a:rPr lang="en-US"/>
-              <a:t>09/08/2024</a:t>
+              <a:t>02/03/2025</a:t>
             </a:fld>
           </a:p>
         </p:txBody>
@@ -8208,18 +8755,20 @@
               <a:buNone/>
             </a:pPr>
             <a:r>
-              <a:rPr b="0" lang="bs-BA" sz="3300" spc="-1" strike="noStrike">
+              <a:rPr b="0" lang="bs-BA" sz="3300" strike="noStrike" u="none">
                 <a:solidFill>
                   <a:srgbClr val="ffffff"/>
                 </a:solidFill>
+                <a:uFillTx/>
                 <a:latin typeface="Arial"/>
               </a:rPr>
               <a:t>Bugovi u syntax highlighteru</a:t>
             </a:r>
-            <a:endParaRPr b="0" lang="bs-BA" sz="3300" spc="-1" strike="noStrike">
+            <a:endParaRPr b="0" lang="bs-BA" sz="3300" strike="noStrike" u="none">
               <a:solidFill>
                 <a:srgbClr val="ffffff"/>
               </a:solidFill>
+              <a:uFillTx/>
               <a:latin typeface="Arial"/>
             </a:endParaRPr>
           </a:p>
@@ -8265,18 +8814,20 @@
               <a:buChar char=""/>
             </a:pPr>
             <a:r>
-              <a:rPr b="0" lang="bs-BA" sz="2400" spc="-1" strike="noStrike">
-                <a:solidFill>
-                  <a:srgbClr val="009bdd"/>
-                </a:solidFill>
+              <a:rPr b="0" lang="bs-BA" sz="2400" strike="noStrike" u="none">
+                <a:solidFill>
+                  <a:srgbClr val="009bdd"/>
+                </a:solidFill>
+                <a:uFillTx/>
                 <a:latin typeface="Arial"/>
               </a:rPr>
               <a:t>Sintaksni bojač koda nije bez bugova:</a:t>
             </a:r>
-            <a:endParaRPr b="0" lang="bs-BA" sz="2400" spc="-1" strike="noStrike">
+            <a:endParaRPr b="0" lang="bs-BA" sz="2400" strike="noStrike" u="none">
               <a:solidFill>
                 <a:srgbClr val="009bdd"/>
               </a:solidFill>
+              <a:uFillTx/>
               <a:latin typeface="Arial"/>
             </a:endParaRPr>
           </a:p>
@@ -8293,72 +8844,80 @@
               <a:buChar char=""/>
             </a:pPr>
             <a:r>
-              <a:rPr b="0" lang="bs-BA" sz="2100" spc="-1" strike="noStrike">
-                <a:solidFill>
-                  <a:srgbClr val="009bdd"/>
-                </a:solidFill>
+              <a:rPr b="0" lang="bs-BA" sz="2100" strike="noStrike" u="none">
+                <a:solidFill>
+                  <a:srgbClr val="009bdd"/>
+                </a:solidFill>
+                <a:uFillTx/>
                 <a:latin typeface="Arial"/>
               </a:rPr>
               <a:t>Ne može highlightirati kodove koji sadrže znakove </a:t>
             </a:r>
             <a:r>
-              <a:rPr b="0" i="1" lang="bs-BA" sz="2100" spc="-1" strike="noStrike">
-                <a:solidFill>
-                  <a:srgbClr val="009bdd"/>
-                </a:solidFill>
+              <a:rPr b="0" i="1" lang="bs-BA" sz="2100" strike="noStrike" u="none">
+                <a:solidFill>
+                  <a:srgbClr val="009bdd"/>
+                </a:solidFill>
+                <a:uFillTx/>
                 <a:latin typeface="Arial"/>
               </a:rPr>
               <a:t>&amp;</a:t>
             </a:r>
             <a:r>
-              <a:rPr b="0" lang="bs-BA" sz="2100" spc="-1" strike="noStrike">
-                <a:solidFill>
-                  <a:srgbClr val="009bdd"/>
-                </a:solidFill>
+              <a:rPr b="0" lang="bs-BA" sz="2100" strike="noStrike" u="none">
+                <a:solidFill>
+                  <a:srgbClr val="009bdd"/>
+                </a:solidFill>
+                <a:uFillTx/>
                 <a:latin typeface="Arial"/>
               </a:rPr>
               <a:t>, </a:t>
             </a:r>
             <a:r>
-              <a:rPr b="0" i="1" lang="bs-BA" sz="2100" spc="-1" strike="noStrike">
-                <a:solidFill>
-                  <a:srgbClr val="009bdd"/>
-                </a:solidFill>
+              <a:rPr b="0" i="1" lang="bs-BA" sz="2100" strike="noStrike" u="none">
+                <a:solidFill>
+                  <a:srgbClr val="009bdd"/>
+                </a:solidFill>
+                <a:uFillTx/>
                 <a:latin typeface="Arial"/>
               </a:rPr>
               <a:t>&lt;</a:t>
             </a:r>
             <a:r>
-              <a:rPr b="0" lang="bs-BA" sz="2100" spc="-1" strike="noStrike">
-                <a:solidFill>
-                  <a:srgbClr val="009bdd"/>
-                </a:solidFill>
+              <a:rPr b="0" lang="bs-BA" sz="2100" strike="noStrike" u="none">
+                <a:solidFill>
+                  <a:srgbClr val="009bdd"/>
+                </a:solidFill>
+                <a:uFillTx/>
                 <a:latin typeface="Arial"/>
               </a:rPr>
               <a:t> i </a:t>
             </a:r>
             <a:r>
-              <a:rPr b="0" i="1" lang="bs-BA" sz="2100" spc="-1" strike="noStrike">
-                <a:solidFill>
-                  <a:srgbClr val="009bdd"/>
-                </a:solidFill>
+              <a:rPr b="0" i="1" lang="bs-BA" sz="2100" strike="noStrike" u="none">
+                <a:solidFill>
+                  <a:srgbClr val="009bdd"/>
+                </a:solidFill>
+                <a:uFillTx/>
                 <a:latin typeface="Arial"/>
               </a:rPr>
               <a:t>&gt;</a:t>
             </a:r>
             <a:r>
-              <a:rPr b="0" lang="bs-BA" sz="2100" spc="-1" strike="noStrike">
-                <a:solidFill>
-                  <a:srgbClr val="009bdd"/>
-                </a:solidFill>
+              <a:rPr b="0" lang="bs-BA" sz="2100" strike="noStrike" u="none">
+                <a:solidFill>
+                  <a:srgbClr val="009bdd"/>
+                </a:solidFill>
+                <a:uFillTx/>
                 <a:latin typeface="Arial"/>
               </a:rPr>
               <a:t>.</a:t>
             </a:r>
-            <a:endParaRPr b="0" lang="bs-BA" sz="2100" spc="-1" strike="noStrike">
+            <a:endParaRPr b="0" lang="bs-BA" sz="2100" strike="noStrike" u="none">
               <a:solidFill>
                 <a:srgbClr val="009bdd"/>
               </a:solidFill>
+              <a:uFillTx/>
               <a:latin typeface="Arial"/>
             </a:endParaRPr>
           </a:p>
@@ -8375,72 +8934,80 @@
               <a:buChar char=""/>
             </a:pPr>
             <a:r>
-              <a:rPr b="0" lang="bs-BA" sz="2100" spc="-1" strike="noStrike">
-                <a:solidFill>
-                  <a:srgbClr val="009bdd"/>
-                </a:solidFill>
+              <a:rPr b="0" lang="bs-BA" sz="2100" strike="noStrike" u="none">
+                <a:solidFill>
+                  <a:srgbClr val="009bdd"/>
+                </a:solidFill>
+                <a:uFillTx/>
                 <a:latin typeface="Arial"/>
               </a:rPr>
               <a:t>Netočno highlightira tokene </a:t>
             </a:r>
             <a:r>
-              <a:rPr b="0" i="1" lang="bs-BA" sz="2100" spc="-1" strike="noStrike">
-                <a:solidFill>
-                  <a:srgbClr val="009bdd"/>
-                </a:solidFill>
+              <a:rPr b="0" i="1" lang="bs-BA" sz="2100" strike="noStrike" u="none">
+                <a:solidFill>
+                  <a:srgbClr val="009bdd"/>
+                </a:solidFill>
+                <a:uFillTx/>
                 <a:latin typeface="Arial"/>
               </a:rPr>
               <a:t>a</a:t>
             </a:r>
             <a:r>
-              <a:rPr b="0" lang="bs-BA" sz="2100" spc="-1" strike="noStrike">
-                <a:solidFill>
-                  <a:srgbClr val="009bdd"/>
-                </a:solidFill>
+              <a:rPr b="0" lang="bs-BA" sz="2100" strike="noStrike" u="none">
+                <a:solidFill>
+                  <a:srgbClr val="009bdd"/>
+                </a:solidFill>
+                <a:uFillTx/>
                 <a:latin typeface="Arial"/>
               </a:rPr>
               <a:t>, </a:t>
             </a:r>
             <a:r>
-              <a:rPr b="0" i="1" lang="bs-BA" sz="2100" spc="-1" strike="noStrike">
-                <a:solidFill>
-                  <a:srgbClr val="009bdd"/>
-                </a:solidFill>
+              <a:rPr b="0" i="1" lang="bs-BA" sz="2100" strike="noStrike" u="none">
+                <a:solidFill>
+                  <a:srgbClr val="009bdd"/>
+                </a:solidFill>
+                <a:uFillTx/>
                 <a:latin typeface="Arial"/>
               </a:rPr>
               <a:t>b</a:t>
             </a:r>
             <a:r>
-              <a:rPr b="0" lang="bs-BA" sz="2100" spc="-1" strike="noStrike">
-                <a:solidFill>
-                  <a:srgbClr val="009bdd"/>
-                </a:solidFill>
+              <a:rPr b="0" lang="bs-BA" sz="2100" strike="noStrike" u="none">
+                <a:solidFill>
+                  <a:srgbClr val="009bdd"/>
+                </a:solidFill>
+                <a:uFillTx/>
                 <a:latin typeface="Arial"/>
               </a:rPr>
               <a:t> i </a:t>
             </a:r>
             <a:r>
-              <a:rPr b="0" i="1" lang="bs-BA" sz="2100" spc="-1" strike="noStrike">
-                <a:solidFill>
-                  <a:srgbClr val="009bdd"/>
-                </a:solidFill>
+              <a:rPr b="0" i="1" lang="bs-BA" sz="2100" strike="noStrike" u="none">
+                <a:solidFill>
+                  <a:srgbClr val="009bdd"/>
+                </a:solidFill>
+                <a:uFillTx/>
                 <a:latin typeface="Arial"/>
               </a:rPr>
               <a:t>c</a:t>
             </a:r>
             <a:r>
-              <a:rPr b="0" lang="bs-BA" sz="2100" spc="-1" strike="noStrike">
-                <a:solidFill>
-                  <a:srgbClr val="009bdd"/>
-                </a:solidFill>
+              <a:rPr b="0" lang="bs-BA" sz="2100" strike="noStrike" u="none">
+                <a:solidFill>
+                  <a:srgbClr val="009bdd"/>
+                </a:solidFill>
+                <a:uFillTx/>
                 <a:latin typeface="Arial"/>
               </a:rPr>
               <a:t> kad su heksadekadske konstante (uvijek ih highlightira kao da su flagovi).</a:t>
             </a:r>
-            <a:endParaRPr b="0" lang="bs-BA" sz="2100" spc="-1" strike="noStrike">
+            <a:endParaRPr b="0" lang="bs-BA" sz="2100" strike="noStrike" u="none">
               <a:solidFill>
                 <a:srgbClr val="009bdd"/>
               </a:solidFill>
+              <a:uFillTx/>
               <a:latin typeface="Arial"/>
             </a:endParaRPr>
           </a:p>
@@ -8464,6 +9031,7 @@
           <a:prstGeom prst="rect">
             <a:avLst/>
           </a:prstGeom>
+          <a:noFill/>
           <a:ln w="18000">
             <a:noFill/>
           </a:ln>
@@ -8483,7 +9051,7 @@
         <p:txBody>
           <a:bodyPr/>
           <a:p>
-            <a:fld id="{5D5568E4-CB6D-4D37-8DBA-1DCB511DD50E}" type="slidenum">
+            <a:fld id="{48AA621D-0616-423D-9AB6-DF42B42932FA}" type="slidenum">
               <a:t>6</a:t>
             </a:fld>
           </a:p>
@@ -8503,9 +9071,9 @@
         <p:txBody>
           <a:bodyPr/>
           <a:p>
-            <a:fld id="{2E18801D-04DD-4198-810E-5006F4B8B67C}" type="datetime1">
+            <a:fld id="{8721E604-9907-412F-A144-93DCD491D1CD}" type="datetime1">
               <a:rPr lang="en-US"/>
-              <a:t>09/08/2024</a:t>
+              <a:t>02/03/2025</a:t>
             </a:fld>
           </a:p>
         </p:txBody>
@@ -8572,18 +9140,20 @@
               <a:buNone/>
             </a:pPr>
             <a:r>
-              <a:rPr b="0" lang="bs-BA" sz="3300" spc="-1" strike="noStrike">
+              <a:rPr b="0" lang="bs-BA" sz="3300" strike="noStrike" u="none">
                 <a:solidFill>
                   <a:srgbClr val="ffffff"/>
                 </a:solidFill>
+                <a:uFillTx/>
                 <a:latin typeface="Arial"/>
               </a:rPr>
               <a:t>Kako se koristi...</a:t>
             </a:r>
-            <a:endParaRPr b="0" lang="bs-BA" sz="3300" spc="-1" strike="noStrike">
+            <a:endParaRPr b="0" lang="bs-BA" sz="3300" strike="noStrike" u="none">
               <a:solidFill>
                 <a:srgbClr val="ffffff"/>
               </a:solidFill>
+              <a:uFillTx/>
               <a:latin typeface="Arial"/>
             </a:endParaRPr>
           </a:p>
@@ -8629,36 +9199,40 @@
               <a:buChar char=""/>
             </a:pPr>
             <a:r>
-              <a:rPr b="0" lang="bs-BA" sz="1600" spc="-1" strike="noStrike">
-                <a:solidFill>
-                  <a:srgbClr val="009bdd"/>
-                </a:solidFill>
+              <a:rPr b="0" lang="bs-BA" sz="1600" strike="noStrike" u="none">
+                <a:solidFill>
+                  <a:srgbClr val="009bdd"/>
+                </a:solidFill>
+                <a:uFillTx/>
                 <a:latin typeface="Arial"/>
               </a:rPr>
               <a:t>Kada želimo da se kod asemblira, kliknemo na gumb “Assemble”. Ako to ne napravimo, a nastavimo dalje, simulirat ćemo PicoBlaze koji stalno vrti “</a:t>
             </a:r>
             <a:r>
-              <a:rPr b="0" lang="bs-BA" sz="1600" spc="-1" strike="noStrike">
-                <a:solidFill>
-                  <a:srgbClr val="009bdd"/>
-                </a:solidFill>
+              <a:rPr b="0" lang="bs-BA" sz="1600" strike="noStrike" u="none">
+                <a:solidFill>
+                  <a:srgbClr val="009bdd"/>
+                </a:solidFill>
+                <a:uFillTx/>
                 <a:latin typeface="Courier New"/>
               </a:rPr>
               <a:t>load s0, s0</a:t>
             </a:r>
             <a:r>
-              <a:rPr b="0" lang="bs-BA" sz="1600" spc="-1" strike="noStrike">
-                <a:solidFill>
-                  <a:srgbClr val="009bdd"/>
-                </a:solidFill>
+              <a:rPr b="0" lang="bs-BA" sz="1600" strike="noStrike" u="none">
+                <a:solidFill>
+                  <a:srgbClr val="009bdd"/>
+                </a:solidFill>
+                <a:uFillTx/>
                 <a:latin typeface="Arial"/>
               </a:rPr>
               <a:t>” (heksadekadski 00000).</a:t>
             </a:r>
-            <a:endParaRPr b="0" lang="bs-BA" sz="1600" spc="-1" strike="noStrike">
+            <a:endParaRPr b="0" lang="bs-BA" sz="1600" strike="noStrike" u="none">
               <a:solidFill>
                 <a:srgbClr val="009bdd"/>
               </a:solidFill>
+              <a:uFillTx/>
               <a:latin typeface="Arial"/>
             </a:endParaRPr>
           </a:p>
@@ -8675,36 +9249,40 @@
               <a:buChar char=""/>
             </a:pPr>
             <a:r>
-              <a:rPr b="0" lang="bs-BA" sz="1600" spc="-1" strike="noStrike">
-                <a:solidFill>
-                  <a:srgbClr val="009bdd"/>
-                </a:solidFill>
+              <a:rPr b="0" lang="bs-BA" sz="1600" strike="noStrike" u="none">
+                <a:solidFill>
+                  <a:srgbClr val="009bdd"/>
+                </a:solidFill>
+                <a:uFillTx/>
                 <a:latin typeface="Arial"/>
               </a:rPr>
               <a:t>Verzija v4.4.0 upozorava nas </a:t>
             </a:r>
             <a:r>
-              <a:rPr b="0" i="1" lang="bs-BA" sz="1600" spc="-1" strike="noStrike">
-                <a:solidFill>
-                  <a:srgbClr val="009bdd"/>
-                </a:solidFill>
+              <a:rPr b="0" i="1" lang="bs-BA" sz="1600" strike="noStrike" u="none">
+                <a:solidFill>
+                  <a:srgbClr val="009bdd"/>
+                </a:solidFill>
+                <a:uFillTx/>
                 <a:latin typeface="Arial"/>
               </a:rPr>
               <a:t>confirm</a:t>
             </a:r>
             <a:r>
-              <a:rPr b="0" lang="bs-BA" sz="1600" spc="-1" strike="noStrike">
-                <a:solidFill>
-                  <a:srgbClr val="009bdd"/>
-                </a:solidFill>
+              <a:rPr b="0" lang="bs-BA" sz="1600" strike="noStrike" u="none">
+                <a:solidFill>
+                  <a:srgbClr val="009bdd"/>
+                </a:solidFill>
+                <a:uFillTx/>
                 <a:latin typeface="Arial"/>
               </a:rPr>
               <a:t>om ako zaboravimo pritisnuti Assemble prije “Play” ili “Fast Forward”, a verzija v4.4.1 upozorava nas također i ako pokušamo pokrenuti emulaciju iako je asemblerski kod promijenjen od zadnjeg uspješnog asembliranja (da ne bismo nehotice pokrenuli staru verziju našeg programa umjesto nove).</a:t>
             </a:r>
-            <a:endParaRPr b="0" lang="bs-BA" sz="1600" spc="-1" strike="noStrike">
+            <a:endParaRPr b="0" lang="bs-BA" sz="1600" strike="noStrike" u="none">
               <a:solidFill>
                 <a:srgbClr val="009bdd"/>
               </a:solidFill>
+              <a:uFillTx/>
               <a:latin typeface="Arial"/>
             </a:endParaRPr>
           </a:p>
@@ -8728,6 +9306,7 @@
           <a:prstGeom prst="rect">
             <a:avLst/>
           </a:prstGeom>
+          <a:noFill/>
           <a:ln w="18000">
             <a:noFill/>
           </a:ln>
@@ -8751,6 +9330,7 @@
           <a:prstGeom prst="rect">
             <a:avLst/>
           </a:prstGeom>
+          <a:noFill/>
           <a:ln w="18000">
             <a:noFill/>
           </a:ln>
@@ -8789,10 +9369,11 @@
             <a:noAutofit/>
           </a:bodyPr>
           <a:p>
-            <a:endParaRPr b="0" lang="bs-BA" sz="1800" spc="-1" strike="noStrike">
+            <a:endParaRPr b="0" lang="bs-BA" sz="1800" strike="noStrike" u="none">
               <a:solidFill>
                 <a:srgbClr val="000000"/>
               </a:solidFill>
+              <a:uFillTx/>
               <a:latin typeface="Arial"/>
             </a:endParaRPr>
           </a:p>
@@ -8812,7 +9393,7 @@
         <p:txBody>
           <a:bodyPr/>
           <a:p>
-            <a:fld id="{633A1341-021C-40B0-B1AC-F23DC9F1D264}" type="slidenum">
+            <a:fld id="{5C3F2109-CF38-4F4F-A235-463AD75F711A}" type="slidenum">
               <a:t>7</a:t>
             </a:fld>
           </a:p>
@@ -8832,9 +9413,9 @@
         <p:txBody>
           <a:bodyPr/>
           <a:p>
-            <a:fld id="{40323CB9-9212-4FED-91D2-D7C2583B8B3C}" type="datetime1">
+            <a:fld id="{98308094-2115-42A3-930E-055EFFE59E23}" type="datetime1">
               <a:rPr lang="en-US"/>
-              <a:t>09/08/2024</a:t>
+              <a:t>02/03/2025</a:t>
             </a:fld>
           </a:p>
         </p:txBody>
@@ -8901,18 +9482,20 @@
               <a:buNone/>
             </a:pPr>
             <a:r>
-              <a:rPr b="0" lang="bs-BA" sz="3300" spc="-1" strike="noStrike">
+              <a:rPr b="0" lang="bs-BA" sz="3300" strike="noStrike" u="none">
                 <a:solidFill>
                   <a:srgbClr val="ffffff"/>
                 </a:solidFill>
+                <a:uFillTx/>
                 <a:latin typeface="Arial"/>
               </a:rPr>
               <a:t>Kako se koristi...</a:t>
             </a:r>
-            <a:endParaRPr b="0" lang="bs-BA" sz="3300" spc="-1" strike="noStrike">
+            <a:endParaRPr b="0" lang="bs-BA" sz="3300" strike="noStrike" u="none">
               <a:solidFill>
                 <a:srgbClr val="ffffff"/>
               </a:solidFill>
+              <a:uFillTx/>
               <a:latin typeface="Arial"/>
             </a:endParaRPr>
           </a:p>
@@ -8958,18 +9541,20 @@
               <a:buChar char=""/>
             </a:pPr>
             <a:r>
-              <a:rPr b="0" lang="bs-BA" sz="2400" spc="-1" strike="noStrike">
-                <a:solidFill>
-                  <a:srgbClr val="009bdd"/>
-                </a:solidFill>
+              <a:rPr b="0" lang="bs-BA" sz="2400" strike="noStrike" u="none">
+                <a:solidFill>
+                  <a:srgbClr val="009bdd"/>
+                </a:solidFill>
+                <a:uFillTx/>
                 <a:latin typeface="Arial"/>
               </a:rPr>
               <a:t>Onda, možemo, recimo, kliknuti na Fast Forward...</a:t>
             </a:r>
-            <a:endParaRPr b="0" lang="bs-BA" sz="2400" spc="-1" strike="noStrike">
+            <a:endParaRPr b="0" lang="bs-BA" sz="2400" strike="noStrike" u="none">
               <a:solidFill>
                 <a:srgbClr val="009bdd"/>
               </a:solidFill>
+              <a:uFillTx/>
               <a:latin typeface="Arial"/>
             </a:endParaRPr>
           </a:p>
@@ -8993,6 +9578,7 @@
           <a:prstGeom prst="rect">
             <a:avLst/>
           </a:prstGeom>
+          <a:noFill/>
           <a:ln w="18000">
             <a:noFill/>
           </a:ln>
@@ -9031,10 +9617,11 @@
             <a:noAutofit/>
           </a:bodyPr>
           <a:p>
-            <a:endParaRPr b="0" lang="bs-BA" sz="1800" spc="-1" strike="noStrike">
+            <a:endParaRPr b="0" lang="bs-BA" sz="1800" strike="noStrike" u="none">
               <a:solidFill>
                 <a:srgbClr val="000000"/>
               </a:solidFill>
+              <a:uFillTx/>
               <a:latin typeface="Arial"/>
             </a:endParaRPr>
           </a:p>
@@ -9054,7 +9641,7 @@
         <p:txBody>
           <a:bodyPr/>
           <a:p>
-            <a:fld id="{F9BA86F2-2DD7-4C51-9328-DDD08D3E7B95}" type="slidenum">
+            <a:fld id="{CD9C0887-1E92-40C5-A8BA-9BE35B639534}" type="slidenum">
               <a:t>8</a:t>
             </a:fld>
           </a:p>
@@ -9074,9 +9661,9 @@
         <p:txBody>
           <a:bodyPr/>
           <a:p>
-            <a:fld id="{8D9CAB2D-631D-4F41-8CAE-091835F6EC6B}" type="datetime1">
+            <a:fld id="{28A888AA-6DAC-4E00-BD25-504D0AB85361}" type="datetime1">
               <a:rPr lang="en-US"/>
-              <a:t>09/08/2024</a:t>
+              <a:t>02/03/2025</a:t>
             </a:fld>
           </a:p>
         </p:txBody>
@@ -9143,18 +9730,20 @@
               <a:buNone/>
             </a:pPr>
             <a:r>
-              <a:rPr b="0" lang="bs-BA" sz="3300" spc="-1" strike="noStrike">
+              <a:rPr b="0" lang="bs-BA" sz="3300" strike="noStrike" u="none">
                 <a:solidFill>
                   <a:srgbClr val="ffffff"/>
                 </a:solidFill>
+                <a:uFillTx/>
                 <a:latin typeface="Arial"/>
               </a:rPr>
               <a:t>Kako se koristi...</a:t>
             </a:r>
-            <a:endParaRPr b="0" lang="bs-BA" sz="3300" spc="-1" strike="noStrike">
+            <a:endParaRPr b="0" lang="bs-BA" sz="3300" strike="noStrike" u="none">
               <a:solidFill>
                 <a:srgbClr val="ffffff"/>
               </a:solidFill>
+              <a:uFillTx/>
               <a:latin typeface="Arial"/>
             </a:endParaRPr>
           </a:p>
@@ -9200,18 +9789,20 @@
               <a:buChar char=""/>
             </a:pPr>
             <a:r>
-              <a:rPr b="0" lang="bs-BA" sz="2400" spc="-1" strike="noStrike">
-                <a:solidFill>
-                  <a:srgbClr val="009bdd"/>
-                </a:solidFill>
+              <a:rPr b="0" lang="bs-BA" sz="2400" strike="noStrike" u="none">
+                <a:solidFill>
+                  <a:srgbClr val="009bdd"/>
+                </a:solidFill>
+                <a:uFillTx/>
                 <a:latin typeface="Arial"/>
               </a:rPr>
               <a:t>Da bismo komunicirali s programima kao što je “Binary to Decimal” (prvi primjer u flexboxu “Examples” s lijeva), možemo koristiti SVG-ove generirane u JavaScriptu, koji predstavljaju switcheve, LED-ice i sedam-segmentne pokaznike.</a:t>
             </a:r>
-            <a:endParaRPr b="0" lang="bs-BA" sz="2400" spc="-1" strike="noStrike">
+            <a:endParaRPr b="0" lang="bs-BA" sz="2400" strike="noStrike" u="none">
               <a:solidFill>
                 <a:srgbClr val="009bdd"/>
               </a:solidFill>
+              <a:uFillTx/>
               <a:latin typeface="Arial"/>
             </a:endParaRPr>
           </a:p>
@@ -9235,6 +9826,7 @@
           <a:prstGeom prst="rect">
             <a:avLst/>
           </a:prstGeom>
+          <a:noFill/>
           <a:ln w="18000">
             <a:noFill/>
           </a:ln>
@@ -9254,7 +9846,7 @@
         <p:txBody>
           <a:bodyPr/>
           <a:p>
-            <a:fld id="{DA78C32A-1088-42CA-ABB4-74FBF74837C2}" type="slidenum">
+            <a:fld id="{EB8DB819-C2C4-4C5D-B963-FAC2FAF68D22}" type="slidenum">
               <a:t>9</a:t>
             </a:fld>
           </a:p>
@@ -9274,9 +9866,9 @@
         <p:txBody>
           <a:bodyPr/>
           <a:p>
-            <a:fld id="{2C7FB7EF-94A8-4A05-9996-A562C77F550E}" type="datetime1">
+            <a:fld id="{D3DB9F64-17B0-4ED4-BEBC-CE3745DA4961}" type="datetime1">
               <a:rPr lang="en-US"/>
-              <a:t>09/08/2024</a:t>
+              <a:t>02/03/2025</a:t>
             </a:fld>
           </a:p>
         </p:txBody>

</xml_diff>

<commit_message>
Noted in the documentation that Abidin Durdu is now called @abdrd
</commit_message>
<xml_diff>
--- a/seminar/PicoBlaze.pptx
+++ b/seminar/PicoBlaze.pptx
@@ -87,7 +87,7 @@
         <p:txBody>
           <a:bodyPr/>
           <a:p>
-            <a:fld id="{FACF7DA2-E687-488C-B481-5EF12C4628A7}" type="slidenum">
+            <a:fld id="{24B737DB-E3A2-498A-940D-8B4D69D92BCD}" type="slidenum">
               <a:t>&lt;#&gt;</a:t>
             </a:fld>
           </a:p>
@@ -255,7 +255,7 @@
         <p:txBody>
           <a:bodyPr/>
           <a:p>
-            <a:fld id="{A957D9BF-6E1D-454D-A0E8-99AF20F8F881}" type="slidenum">
+            <a:fld id="{96D05474-8EC6-47A9-ADF4-4F329C73786F}" type="slidenum">
               <a:t>&lt;#&gt;</a:t>
             </a:fld>
           </a:p>
@@ -511,7 +511,7 @@
         <p:txBody>
           <a:bodyPr/>
           <a:p>
-            <a:fld id="{7DB61E3F-964A-43C2-B8DE-3E9A2BF6EDC2}" type="slidenum">
+            <a:fld id="{DE3836D1-ED86-46AA-905B-C9B26493E8B1}" type="slidenum">
               <a:t>&lt;#&gt;</a:t>
             </a:fld>
           </a:p>
@@ -723,7 +723,7 @@
         <p:txBody>
           <a:bodyPr/>
           <a:p>
-            <a:fld id="{D6B95EC9-57D3-438D-97F5-39AF457950F1}" type="slidenum">
+            <a:fld id="{B96474AC-5CBA-4794-ABC0-A04B4706C039}" type="slidenum">
               <a:t>&lt;#&gt;</a:t>
             </a:fld>
           </a:p>
@@ -806,7 +806,7 @@
         <p:txBody>
           <a:bodyPr/>
           <a:p>
-            <a:fld id="{0CDB3F67-14B1-4AD5-94C2-59DDE008F335}" type="slidenum">
+            <a:fld id="{A0226CEA-FFD2-4CDD-A071-C675884F5786}" type="slidenum">
               <a:t>&lt;#&gt;</a:t>
             </a:fld>
           </a:p>
@@ -1747,7 +1747,7 @@
             <a:pPr indent="0" algn="r">
               <a:buNone/>
             </a:pPr>
-            <a:fld id="{DFE1B4A2-05DC-4984-B3AB-C00D919E34A4}" type="slidenum">
+            <a:fld id="{D30B06F5-4442-419A-94C3-4ECEE35DD540}" type="slidenum">
               <a:rPr b="0" lang="bs-BA" sz="1400" strike="noStrike" u="none">
                 <a:solidFill>
                   <a:srgbClr val="ffffff"/>
@@ -3118,7 +3118,7 @@
             <a:pPr indent="0" algn="r">
               <a:buNone/>
             </a:pPr>
-            <a:fld id="{F3BC5E99-283D-4763-A853-A8D77FC60B57}" type="slidenum">
+            <a:fld id="{0559069D-7FC7-41C5-933A-43FF798E7B0F}" type="slidenum">
               <a:rPr b="0" lang="bs-BA" sz="1400" strike="noStrike" u="none">
                 <a:solidFill>
                   <a:srgbClr val="ffffff"/>
@@ -3593,7 +3593,7 @@
         <p:txBody>
           <a:bodyPr/>
           <a:p>
-            <a:fld id="{23CD2F68-ECAE-4A7A-B140-98B29671E223}" type="slidenum">
+            <a:fld id="{45A384A6-7842-4A4D-A37A-92FCDA311C23}" type="slidenum">
               <a:t>10</a:t>
             </a:fld>
           </a:p>
@@ -3613,9 +3613,9 @@
         <p:txBody>
           <a:bodyPr/>
           <a:p>
-            <a:fld id="{AB231485-B51B-489D-95EF-3EC6889322BE}" type="datetime1">
+            <a:fld id="{26362C41-6D8C-4555-A56D-8C8F4328B7EA}" type="datetime1">
               <a:rPr lang="en-US"/>
-              <a:t>02/03/2025</a:t>
+              <a:t>03/24/2025</a:t>
             </a:fld>
           </a:p>
         </p:txBody>
@@ -3891,7 +3891,7 @@
         <p:txBody>
           <a:bodyPr/>
           <a:p>
-            <a:fld id="{5E28ED94-12DD-426A-958B-ABED5A3DDA3E}" type="slidenum">
+            <a:fld id="{0E237F78-9A0C-4B9A-9E7F-066A8E710644}" type="slidenum">
               <a:t>11</a:t>
             </a:fld>
           </a:p>
@@ -3911,9 +3911,9 @@
         <p:txBody>
           <a:bodyPr/>
           <a:p>
-            <a:fld id="{9CB5DA02-7C7B-4006-ACF5-BA75C888D96B}" type="datetime1">
+            <a:fld id="{FE537DF6-E9A8-4248-B610-49CA9216A886}" type="datetime1">
               <a:rPr lang="en-US"/>
-              <a:t>02/03/2025</a:t>
+              <a:t>03/24/2025</a:t>
             </a:fld>
           </a:p>
         </p:txBody>
@@ -4146,7 +4146,7 @@
         <p:txBody>
           <a:bodyPr/>
           <a:p>
-            <a:fld id="{3E126B65-DF5D-43E3-BA98-D80DD27348EE}" type="slidenum">
+            <a:fld id="{8E93F65E-88B0-43CA-98AC-826E4DAE3778}" type="slidenum">
               <a:t>12</a:t>
             </a:fld>
           </a:p>
@@ -4166,9 +4166,9 @@
         <p:txBody>
           <a:bodyPr/>
           <a:p>
-            <a:fld id="{3E44CF42-13F2-4DA2-B98A-E5B81672166C}" type="datetime1">
+            <a:fld id="{30478C61-F9BB-4ADE-8D23-24BD2992BFCE}" type="datetime1">
               <a:rPr lang="en-US"/>
-              <a:t>02/03/2025</a:t>
+              <a:t>03/24/2025</a:t>
             </a:fld>
           </a:p>
         </p:txBody>
@@ -4445,7 +4445,7 @@
         <p:txBody>
           <a:bodyPr/>
           <a:p>
-            <a:fld id="{1541A6E9-0053-4B21-864B-3ED6A947409F}" type="slidenum">
+            <a:fld id="{ED104D79-4220-49C5-834B-E6E69CB25DE8}" type="slidenum">
               <a:t>13</a:t>
             </a:fld>
           </a:p>
@@ -4465,9 +4465,9 @@
         <p:txBody>
           <a:bodyPr/>
           <a:p>
-            <a:fld id="{FE137C82-7185-4680-B20C-810AFC735959}" type="datetime1">
+            <a:fld id="{FF55313C-39AB-496A-8C57-7AC043FD9DF5}" type="datetime1">
               <a:rPr lang="en-US"/>
-              <a:t>02/03/2025</a:t>
+              <a:t>03/24/2025</a:t>
             </a:fld>
           </a:p>
         </p:txBody>
@@ -4736,7 +4736,7 @@
         <p:txBody>
           <a:bodyPr/>
           <a:p>
-            <a:fld id="{E9FB5B95-0C66-4D3E-BD3E-B72CB220241D}" type="slidenum">
+            <a:fld id="{B69DA9DE-DFCD-469E-AB50-B29CBE6C47DD}" type="slidenum">
               <a:t>14</a:t>
             </a:fld>
           </a:p>
@@ -4756,9 +4756,9 @@
         <p:txBody>
           <a:bodyPr/>
           <a:p>
-            <a:fld id="{3DE0D771-0D88-459D-98FD-DB6AF37C7C49}" type="datetime1">
+            <a:fld id="{5DD55106-47DA-4F1D-B7F2-462C3367B7CB}" type="datetime1">
               <a:rPr lang="en-US"/>
-              <a:t>02/03/2025</a:t>
+              <a:t>03/24/2025</a:t>
             </a:fld>
           </a:p>
         </p:txBody>
@@ -4917,7 +4917,7 @@
         <p:txBody>
           <a:bodyPr/>
           <a:p>
-            <a:fld id="{E217E40C-070B-48EE-B540-88CBC74A345E}" type="slidenum">
+            <a:fld id="{5EB9A239-B242-4C27-9310-AD239A8570DE}" type="slidenum">
               <a:t>15</a:t>
             </a:fld>
           </a:p>
@@ -4937,9 +4937,9 @@
         <p:txBody>
           <a:bodyPr/>
           <a:p>
-            <a:fld id="{BC2E4A57-10A1-44EC-9CC3-1B7B27DE3527}" type="datetime1">
+            <a:fld id="{F6D3B875-DB34-495B-BB66-EF3902CE0D40}" type="datetime1">
               <a:rPr lang="en-US"/>
-              <a:t>02/03/2025</a:t>
+              <a:t>03/24/2025</a:t>
             </a:fld>
           </a:p>
         </p:txBody>
@@ -5162,7 +5162,7 @@
         <p:txBody>
           <a:bodyPr/>
           <a:p>
-            <a:fld id="{947D0D34-B17F-4A71-9548-6F208F4DCD7A}" type="slidenum">
+            <a:fld id="{172B0059-090D-4311-93BE-67DAC4E6C5A2}" type="slidenum">
               <a:t>16</a:t>
             </a:fld>
           </a:p>
@@ -5182,9 +5182,9 @@
         <p:txBody>
           <a:bodyPr/>
           <a:p>
-            <a:fld id="{2BD13DF3-DC39-4447-8372-0E09598BCE22}" type="datetime1">
+            <a:fld id="{1822ECF2-37E9-4127-90AD-85BFD22DADD9}" type="datetime1">
               <a:rPr lang="en-US"/>
-              <a:t>02/03/2025</a:t>
+              <a:t>03/24/2025</a:t>
             </a:fld>
           </a:p>
         </p:txBody>
@@ -5527,7 +5527,7 @@
         <p:txBody>
           <a:bodyPr/>
           <a:p>
-            <a:fld id="{5F771274-82E1-4626-80A7-1E7C77FC0358}" type="slidenum">
+            <a:fld id="{E52B7852-0970-4BF6-9590-694972713DB3}" type="slidenum">
               <a:t>17</a:t>
             </a:fld>
           </a:p>
@@ -5547,9 +5547,9 @@
         <p:txBody>
           <a:bodyPr/>
           <a:p>
-            <a:fld id="{98943E85-3019-4AFC-879F-1696DFED90B4}" type="datetime1">
+            <a:fld id="{6D0DAD7E-2B94-43B2-91D8-9E0E4BC03475}" type="datetime1">
               <a:rPr lang="en-US"/>
-              <a:t>02/03/2025</a:t>
+              <a:t>03/24/2025</a:t>
             </a:fld>
           </a:p>
         </p:txBody>
@@ -5752,7 +5752,7 @@
         <p:txBody>
           <a:bodyPr/>
           <a:p>
-            <a:fld id="{9C71CB6B-23DD-4199-9220-37CE19E428E6}" type="slidenum">
+            <a:fld id="{AE00E52E-E1AE-443D-85D3-409C3DB2DDEA}" type="slidenum">
               <a:t>18</a:t>
             </a:fld>
           </a:p>
@@ -5772,9 +5772,9 @@
         <p:txBody>
           <a:bodyPr/>
           <a:p>
-            <a:fld id="{43827BC8-38E2-41CB-A3C6-1B7A354621E6}" type="datetime1">
+            <a:fld id="{7999964E-4A5E-4C52-B694-CDCEA03FB2DF}" type="datetime1">
               <a:rPr lang="en-US"/>
-              <a:t>02/03/2025</a:t>
+              <a:t>03/24/2025</a:t>
             </a:fld>
           </a:p>
         </p:txBody>
@@ -6053,7 +6053,7 @@
         <p:txBody>
           <a:bodyPr/>
           <a:p>
-            <a:fld id="{6D567A27-31E9-4FBB-BFEF-BC67D6AD28A0}" type="slidenum">
+            <a:fld id="{14B6EDB3-09C0-4802-A14B-76D4E2B48C58}" type="slidenum">
               <a:t>19</a:t>
             </a:fld>
           </a:p>
@@ -6073,9 +6073,9 @@
         <p:txBody>
           <a:bodyPr/>
           <a:p>
-            <a:fld id="{5DE3AE10-9A76-411C-BAD5-360DF781DDDD}" type="datetime1">
+            <a:fld id="{86266B98-42AA-4FA5-A46C-2C1B3F6EB64B}" type="datetime1">
               <a:rPr lang="en-US"/>
-              <a:t>02/03/2025</a:t>
+              <a:t>03/24/2025</a:t>
             </a:fld>
           </a:p>
         </p:txBody>
@@ -6414,7 +6414,7 @@
         <p:txBody>
           <a:bodyPr/>
           <a:p>
-            <a:fld id="{A3E9FF14-F9E1-4A79-9AB3-0B2A88C5E1A6}" type="slidenum">
+            <a:fld id="{ED5C072C-E8AE-4968-9275-8420BF0D7769}" type="slidenum">
               <a:t>2</a:t>
             </a:fld>
           </a:p>
@@ -6434,9 +6434,9 @@
         <p:txBody>
           <a:bodyPr/>
           <a:p>
-            <a:fld id="{6EE73141-4281-476F-B29E-93F35FB1BE6D}" type="datetime1">
+            <a:fld id="{BB6C78E3-C385-49B6-8D87-9D36EFFD6391}" type="datetime1">
               <a:rPr lang="en-US"/>
-              <a:t>02/03/2025</a:t>
+              <a:t>03/24/2025</a:t>
             </a:fld>
           </a:p>
         </p:txBody>
@@ -6885,7 +6885,7 @@
         <p:txBody>
           <a:bodyPr/>
           <a:p>
-            <a:fld id="{8C996EE5-336A-4E0D-A279-8B485CDED5CD}" type="slidenum">
+            <a:fld id="{951F935A-A42F-47A5-80C1-BAEBFC2B84D2}" type="slidenum">
               <a:t>20</a:t>
             </a:fld>
           </a:p>
@@ -6905,9 +6905,9 @@
         <p:txBody>
           <a:bodyPr/>
           <a:p>
-            <a:fld id="{FD36834F-157F-4816-8B82-5E1C6968888F}" type="datetime1">
+            <a:fld id="{25F1005B-A24A-4187-BB5F-DE75C30A3728}" type="datetime1">
               <a:rPr lang="en-US"/>
-              <a:t>02/03/2025</a:t>
+              <a:t>03/24/2025</a:t>
             </a:fld>
           </a:p>
         </p:txBody>
@@ -7033,17 +7033,17 @@
               <a:buChar char=""/>
             </a:pPr>
             <a:r>
-              <a:rPr b="0" lang="bs-BA" sz="2400" strike="noStrike" u="none">
-                <a:solidFill>
-                  <a:srgbClr val="009bdd"/>
-                </a:solidFill>
-                <a:uFillTx/>
-                <a:latin typeface="Arial"/>
-              </a:rPr>
-              <a:t>Abidin Durdu (</a:t>
-            </a:r>
-            <a:r>
-              <a:rPr b="0" i="1" lang="bs-BA" sz="2400" strike="noStrike" u="none">
+              <a:rPr b="0" lang="bs-BA" sz="2100" strike="noStrike" u="none">
+                <a:solidFill>
+                  <a:srgbClr val="009bdd"/>
+                </a:solidFill>
+                <a:uFillTx/>
+                <a:latin typeface="Arial"/>
+              </a:rPr>
+              <a:t>Abidin Durdu (tada zvan </a:t>
+            </a:r>
+            <a:r>
+              <a:rPr b="0" i="1" lang="bs-BA" sz="2100" strike="noStrike" u="none">
                 <a:solidFill>
                   <a:srgbClr val="009bdd"/>
                 </a:solidFill>
@@ -7053,7 +7053,27 @@
               <a:t>betelgeuse-7</a:t>
             </a:r>
             <a:r>
-              <a:rPr b="0" lang="bs-BA" sz="2400" strike="noStrike" u="none">
+              <a:rPr b="0" lang="bs-BA" sz="2100" strike="noStrike" u="none">
+                <a:solidFill>
+                  <a:srgbClr val="009bdd"/>
+                </a:solidFill>
+                <a:uFillTx/>
+                <a:latin typeface="Arial"/>
+              </a:rPr>
+              <a:t>, a sada zvan </a:t>
+            </a:r>
+            <a:r>
+              <a:rPr b="0" i="1" lang="bs-BA" sz="2100" strike="noStrike" u="none">
+                <a:solidFill>
+                  <a:srgbClr val="009bdd"/>
+                </a:solidFill>
+                <a:uFillTx/>
+                <a:latin typeface="Arial"/>
+              </a:rPr>
+              <a:t>abdrd</a:t>
+            </a:r>
+            <a:r>
+              <a:rPr b="0" lang="bs-BA" sz="2100" strike="noStrike" u="none">
                 <a:solidFill>
                   <a:srgbClr val="009bdd"/>
                 </a:solidFill>
@@ -7062,7 +7082,7 @@
               </a:rPr>
               <a:t>) napravio je back-end u PHP-u, koji omogućuje korisnicima da dijele asemblerske programe. Taj back-end koristi MySQL bazu podataka. Vrti se na SourceForge serverima.</a:t>
             </a:r>
-            <a:endParaRPr b="0" lang="bs-BA" sz="2400" strike="noStrike" u="none">
+            <a:endParaRPr b="0" lang="bs-BA" sz="2100" strike="noStrike" u="none">
               <a:solidFill>
                 <a:srgbClr val="009bdd"/>
               </a:solidFill>
@@ -7177,7 +7197,7 @@
         <p:txBody>
           <a:bodyPr/>
           <a:p>
-            <a:fld id="{9A3BAF68-FE5F-4395-9A2D-B02C369BA2D5}" type="slidenum">
+            <a:fld id="{96716B77-A0D7-4103-9752-95158D5A125A}" type="slidenum">
               <a:t>21</a:t>
             </a:fld>
           </a:p>
@@ -7197,9 +7217,9 @@
         <p:txBody>
           <a:bodyPr/>
           <a:p>
-            <a:fld id="{CE0A7B93-3987-49F2-9E05-8A827093C470}" type="datetime1">
+            <a:fld id="{926E158C-63E3-49B2-A6E9-61869991577C}" type="datetime1">
               <a:rPr lang="en-US"/>
-              <a:t>02/03/2025</a:t>
+              <a:t>03/24/2025</a:t>
             </a:fld>
           </a:p>
         </p:txBody>
@@ -7458,7 +7478,7 @@
         <p:txBody>
           <a:bodyPr/>
           <a:p>
-            <a:fld id="{87DDDA86-190D-4317-A216-0D0EAFDC705F}" type="slidenum">
+            <a:fld id="{3AB5DF38-718B-41F9-8D37-CDE3F9F2408D}" type="slidenum">
               <a:t>22</a:t>
             </a:fld>
           </a:p>
@@ -7478,9 +7498,9 @@
         <p:txBody>
           <a:bodyPr/>
           <a:p>
-            <a:fld id="{D34F0777-4682-414F-A73A-A2D8D1338DE7}" type="datetime1">
+            <a:fld id="{2F416E57-0BDD-4DB7-A250-9D69825A4BCF}" type="datetime1">
               <a:rPr lang="en-US"/>
-              <a:t>02/03/2025</a:t>
+              <a:t>03/24/2025</a:t>
             </a:fld>
           </a:p>
         </p:txBody>
@@ -7699,7 +7719,7 @@
         <p:txBody>
           <a:bodyPr/>
           <a:p>
-            <a:fld id="{2645769B-8019-4765-B7C0-9BF0AB044883}" type="slidenum">
+            <a:fld id="{078F0073-59E5-47C2-BEAE-5D31C3846254}" type="slidenum">
               <a:t>23</a:t>
             </a:fld>
           </a:p>
@@ -7719,9 +7739,9 @@
         <p:txBody>
           <a:bodyPr/>
           <a:p>
-            <a:fld id="{071FA692-BA1E-4327-A4FF-B0E5A2BA2917}" type="datetime1">
+            <a:fld id="{A816CBD3-45FA-4056-A5B4-216E214DD2FC}" type="datetime1">
               <a:rPr lang="en-US"/>
-              <a:t>02/03/2025</a:t>
+              <a:t>03/24/2025</a:t>
             </a:fld>
           </a:p>
         </p:txBody>
@@ -7825,7 +7845,7 @@
         <p:txBody>
           <a:bodyPr/>
           <a:p>
-            <a:fld id="{9E40ED77-D375-4756-9320-1D4BE4726ECC}" type="slidenum">
+            <a:fld id="{39DC9BF3-9971-44D9-A3F8-7758A50777C4}" type="slidenum">
               <a:t>24</a:t>
             </a:fld>
           </a:p>
@@ -7845,9 +7865,9 @@
         <p:txBody>
           <a:bodyPr/>
           <a:p>
-            <a:fld id="{495147A3-AA9C-40D2-A751-93F3DF123BB7}" type="datetime1">
+            <a:fld id="{AD1E0D7C-D88E-4331-A1FE-A0D27FAC61A0}" type="datetime1">
               <a:rPr lang="en-US"/>
-              <a:t>02/03/2025</a:t>
+              <a:t>03/24/2025</a:t>
             </a:fld>
           </a:p>
         </p:txBody>
@@ -8135,7 +8155,7 @@
         <p:txBody>
           <a:bodyPr/>
           <a:p>
-            <a:fld id="{23845AB8-CC94-4285-A061-ED2D71B8A7BF}" type="slidenum">
+            <a:fld id="{99987232-C852-4A6E-9F31-864BA716A96F}" type="slidenum">
               <a:t>3</a:t>
             </a:fld>
           </a:p>
@@ -8155,9 +8175,9 @@
         <p:txBody>
           <a:bodyPr/>
           <a:p>
-            <a:fld id="{C7C88219-7CB4-4047-837C-4D46B1487898}" type="datetime1">
+            <a:fld id="{9ECEA5B8-C93E-4E7E-9C0D-EBECAECDE199}" type="datetime1">
               <a:rPr lang="en-US"/>
-              <a:t>02/03/2025</a:t>
+              <a:t>03/24/2025</a:t>
             </a:fld>
           </a:p>
         </p:txBody>
@@ -8320,7 +8340,7 @@
                 <a:uFillTx/>
                 <a:latin typeface="Arial"/>
               </a:rPr>
-              <a:t>...ili odaberemo neki od osam primjera iz flexboxa “Examples”.</a:t>
+              <a:t>...ili odaberemo neki od devet primjera iz flexboxa “Examples”.</a:t>
             </a:r>
             <a:endParaRPr b="0" lang="bs-BA" sz="2400" strike="noStrike" u="none">
               <a:solidFill>
@@ -8394,7 +8414,7 @@
         <p:txBody>
           <a:bodyPr/>
           <a:p>
-            <a:fld id="{8ECC1A15-7F79-4760-9556-837896C2593F}" type="slidenum">
+            <a:fld id="{2FCBF701-5F39-4AE7-B5D9-BE27F21F2B00}" type="slidenum">
               <a:t>4</a:t>
             </a:fld>
           </a:p>
@@ -8414,9 +8434,9 @@
         <p:txBody>
           <a:bodyPr/>
           <a:p>
-            <a:fld id="{521FADE0-8483-4426-913B-F87F742B358D}" type="datetime1">
+            <a:fld id="{52E51FC4-A861-4BC0-BEFC-D216D4A51CB4}" type="datetime1">
               <a:rPr lang="en-US"/>
-              <a:t>02/03/2025</a:t>
+              <a:t>03/24/2025</a:t>
             </a:fld>
           </a:p>
         </p:txBody>
@@ -8666,7 +8686,7 @@
         <p:txBody>
           <a:bodyPr/>
           <a:p>
-            <a:fld id="{195E7831-C41C-4CE7-BE54-1A99CD12D3FB}" type="slidenum">
+            <a:fld id="{FADF69B6-FB84-4802-9BDD-BF72E7D39ED6}" type="slidenum">
               <a:t>5</a:t>
             </a:fld>
           </a:p>
@@ -8686,9 +8706,9 @@
         <p:txBody>
           <a:bodyPr/>
           <a:p>
-            <a:fld id="{51F38EEC-57A1-4DA5-A9C4-83E6713727EC}" type="datetime1">
+            <a:fld id="{B428C188-AAD1-4605-8C89-E46EABB6AA5B}" type="datetime1">
               <a:rPr lang="en-US"/>
-              <a:t>02/03/2025</a:t>
+              <a:t>03/24/2025</a:t>
             </a:fld>
           </a:p>
         </p:txBody>
@@ -9051,7 +9071,7 @@
         <p:txBody>
           <a:bodyPr/>
           <a:p>
-            <a:fld id="{48AA621D-0616-423D-9AB6-DF42B42932FA}" type="slidenum">
+            <a:fld id="{337EBF35-EBC3-44A9-88D1-BA3B173C1AB6}" type="slidenum">
               <a:t>6</a:t>
             </a:fld>
           </a:p>
@@ -9071,9 +9091,9 @@
         <p:txBody>
           <a:bodyPr/>
           <a:p>
-            <a:fld id="{8721E604-9907-412F-A144-93DCD491D1CD}" type="datetime1">
+            <a:fld id="{D0201804-1928-474F-89C9-8B7AC662AB7D}" type="datetime1">
               <a:rPr lang="en-US"/>
-              <a:t>02/03/2025</a:t>
+              <a:t>03/24/2025</a:t>
             </a:fld>
           </a:p>
         </p:txBody>
@@ -9393,7 +9413,7 @@
         <p:txBody>
           <a:bodyPr/>
           <a:p>
-            <a:fld id="{5C3F2109-CF38-4F4F-A235-463AD75F711A}" type="slidenum">
+            <a:fld id="{30225AE0-7C2B-4E4E-8396-B87951CD0EAA}" type="slidenum">
               <a:t>7</a:t>
             </a:fld>
           </a:p>
@@ -9413,9 +9433,9 @@
         <p:txBody>
           <a:bodyPr/>
           <a:p>
-            <a:fld id="{98308094-2115-42A3-930E-055EFFE59E23}" type="datetime1">
+            <a:fld id="{9B60300B-D4AD-4EB6-AD01-FEAE06569F07}" type="datetime1">
               <a:rPr lang="en-US"/>
-              <a:t>02/03/2025</a:t>
+              <a:t>03/24/2025</a:t>
             </a:fld>
           </a:p>
         </p:txBody>
@@ -9641,7 +9661,7 @@
         <p:txBody>
           <a:bodyPr/>
           <a:p>
-            <a:fld id="{CD9C0887-1E92-40C5-A8BA-9BE35B639534}" type="slidenum">
+            <a:fld id="{A8FFBAF8-AC3D-4B1E-9907-AE188D813B0F}" type="slidenum">
               <a:t>8</a:t>
             </a:fld>
           </a:p>
@@ -9661,9 +9681,9 @@
         <p:txBody>
           <a:bodyPr/>
           <a:p>
-            <a:fld id="{28A888AA-6DAC-4E00-BD25-504D0AB85361}" type="datetime1">
+            <a:fld id="{74AF3A89-D28C-4339-8799-64380733A280}" type="datetime1">
               <a:rPr lang="en-US"/>
-              <a:t>02/03/2025</a:t>
+              <a:t>03/24/2025</a:t>
             </a:fld>
           </a:p>
         </p:txBody>
@@ -9846,7 +9866,7 @@
         <p:txBody>
           <a:bodyPr/>
           <a:p>
-            <a:fld id="{EB8DB819-C2C4-4C5D-B963-FAC2FAF68D22}" type="slidenum">
+            <a:fld id="{6BAEA98C-86AE-4259-BB20-46540F5FBF88}" type="slidenum">
               <a:t>9</a:t>
             </a:fld>
           </a:p>
@@ -9866,9 +9886,9 @@
         <p:txBody>
           <a:bodyPr/>
           <a:p>
-            <a:fld id="{D3DB9F64-17B0-4ED4-BEBC-CE3745DA4961}" type="datetime1">
+            <a:fld id="{047E89ED-EC08-4720-B66A-A517A5EC4498}" type="datetime1">
               <a:rPr lang="en-US"/>
-              <a:t>02/03/2025</a:t>
+              <a:t>03/24/2025</a:t>
             </a:fld>
           </a:p>
         </p:txBody>

</xml_diff>

<commit_message>
Explained what is new in the version 5.1.0
</commit_message>
<xml_diff>
--- a/seminar/PicoBlaze.pptx
+++ b/seminar/PicoBlaze.pptx
@@ -30,6 +30,7 @@
     <p:sldId id="277" r:id="rId25"/>
     <p:sldId id="278" r:id="rId26"/>
     <p:sldId id="279" r:id="rId27"/>
+    <p:sldId id="280" r:id="rId28"/>
   </p:sldIdLst>
   <p:sldSz cx="10080625" cy="5670550"/>
   <p:notesSz cx="7559675" cy="10691813"/>
@@ -87,7 +88,7 @@
         <p:txBody>
           <a:bodyPr/>
           <a:p>
-            <a:fld id="{24B737DB-E3A2-498A-940D-8B4D69D92BCD}" type="slidenum">
+            <a:fld id="{B898200B-4967-4F93-BC6E-BA7686B63672}" type="slidenum">
               <a:t>&lt;#&gt;</a:t>
             </a:fld>
           </a:p>
@@ -255,7 +256,7 @@
         <p:txBody>
           <a:bodyPr/>
           <a:p>
-            <a:fld id="{96D05474-8EC6-47A9-ADF4-4F329C73786F}" type="slidenum">
+            <a:fld id="{DB2026B4-0D0B-474C-B445-4367306FED27}" type="slidenum">
               <a:t>&lt;#&gt;</a:t>
             </a:fld>
           </a:p>
@@ -511,7 +512,7 @@
         <p:txBody>
           <a:bodyPr/>
           <a:p>
-            <a:fld id="{DE3836D1-ED86-46AA-905B-C9B26493E8B1}" type="slidenum">
+            <a:fld id="{B8052118-6D99-4502-B502-92DDAE9627BB}" type="slidenum">
               <a:t>&lt;#&gt;</a:t>
             </a:fld>
           </a:p>
@@ -723,7 +724,7 @@
         <p:txBody>
           <a:bodyPr/>
           <a:p>
-            <a:fld id="{B96474AC-5CBA-4794-ABC0-A04B4706C039}" type="slidenum">
+            <a:fld id="{E549771B-7B81-461F-B035-7EE1FEE9D6A8}" type="slidenum">
               <a:t>&lt;#&gt;</a:t>
             </a:fld>
           </a:p>
@@ -806,7 +807,7 @@
         <p:txBody>
           <a:bodyPr/>
           <a:p>
-            <a:fld id="{A0226CEA-FFD2-4CDD-A071-C675884F5786}" type="slidenum">
+            <a:fld id="{930F5F82-73C8-4232-A0AC-F9890556849C}" type="slidenum">
               <a:t>&lt;#&gt;</a:t>
             </a:fld>
           </a:p>
@@ -1747,7 +1748,7 @@
             <a:pPr indent="0" algn="r">
               <a:buNone/>
             </a:pPr>
-            <a:fld id="{D30B06F5-4442-419A-94C3-4ECEE35DD540}" type="slidenum">
+            <a:fld id="{E019901A-6BE6-47E0-8381-B687F1EA007E}" type="slidenum">
               <a:rPr b="0" lang="bs-BA" sz="1400" strike="noStrike" u="none">
                 <a:solidFill>
                   <a:srgbClr val="ffffff"/>
@@ -3118,7 +3119,7 @@
             <a:pPr indent="0" algn="r">
               <a:buNone/>
             </a:pPr>
-            <a:fld id="{0559069D-7FC7-41C5-933A-43FF798E7B0F}" type="slidenum">
+            <a:fld id="{37DD6535-1BE8-4DE1-B180-493F80368CC0}" type="slidenum">
               <a:rPr b="0" lang="bs-BA" sz="1400" strike="noStrike" u="none">
                 <a:solidFill>
                   <a:srgbClr val="ffffff"/>
@@ -3400,107 +3401,7 @@
                 <a:uFillTx/>
                 <a:latin typeface="Arial"/>
               </a:rPr>
-              <a:t>Ako želimo, možemo dodati i breakpointse na koje će emulacija pauzirati.</a:t>
-            </a:r>
-            <a:endParaRPr b="0" lang="bs-BA" sz="2400" strike="noStrike" u="none">
-              <a:solidFill>
-                <a:srgbClr val="009bdd"/>
-              </a:solidFill>
-              <a:uFillTx/>
-              <a:latin typeface="Arial"/>
-            </a:endParaRPr>
-          </a:p>
-          <a:p>
-            <a:pPr marL="432000" indent="-324000">
-              <a:spcBef>
-                <a:spcPts val="1060"/>
-              </a:spcBef>
-              <a:buClr>
-                <a:srgbClr val="77caee"/>
-              </a:buClr>
-              <a:buSzPct val="45000"/>
-              <a:buFont typeface="Wingdings" charset="2"/>
-              <a:buChar char=""/>
-            </a:pPr>
-            <a:r>
-              <a:rPr b="0" lang="bs-BA" sz="2400" strike="noStrike" u="none">
-                <a:solidFill>
-                  <a:srgbClr val="009bdd"/>
-                </a:solidFill>
-                <a:uFillTx/>
-                <a:latin typeface="Arial"/>
-              </a:rPr>
-              <a:t>Tu sam mogućnost dodao na prijedlog profesora Tomislava Matića mlađeg.</a:t>
-            </a:r>
-            <a:endParaRPr b="0" lang="bs-BA" sz="2400" strike="noStrike" u="none">
-              <a:solidFill>
-                <a:srgbClr val="009bdd"/>
-              </a:solidFill>
-              <a:uFillTx/>
-              <a:latin typeface="Arial"/>
-            </a:endParaRPr>
-          </a:p>
-          <a:p>
-            <a:pPr marL="432000" indent="-324000">
-              <a:spcBef>
-                <a:spcPts val="1060"/>
-              </a:spcBef>
-              <a:buClr>
-                <a:srgbClr val="77caee"/>
-              </a:buClr>
-              <a:buSzPct val="45000"/>
-              <a:buFont typeface="Wingdings" charset="2"/>
-              <a:buChar char=""/>
-            </a:pPr>
-            <a:r>
-              <a:rPr b="0" lang="bs-BA" sz="2400" strike="noStrike" u="none">
-                <a:solidFill>
-                  <a:srgbClr val="009bdd"/>
-                </a:solidFill>
-                <a:uFillTx/>
-                <a:latin typeface="Arial"/>
-              </a:rPr>
-              <a:t>Postoje samo </a:t>
-            </a:r>
-            <a:r>
-              <a:rPr b="0" i="1" lang="bs-BA" sz="2400" strike="noStrike" u="none">
-                <a:solidFill>
-                  <a:srgbClr val="009bdd"/>
-                </a:solidFill>
-                <a:uFillTx/>
-                <a:latin typeface="Arial"/>
-              </a:rPr>
-              <a:t>permanent</a:t>
-            </a:r>
-            <a:r>
-              <a:rPr b="0" lang="bs-BA" sz="2400" strike="noStrike" u="none">
-                <a:solidFill>
-                  <a:srgbClr val="009bdd"/>
-                </a:solidFill>
-                <a:uFillTx/>
-                <a:latin typeface="Arial"/>
-              </a:rPr>
-              <a:t> breakpointsi, ne i </a:t>
-            </a:r>
-            <a:r>
-              <a:rPr b="0" i="1" lang="bs-BA" sz="2400" strike="noStrike" u="none">
-                <a:solidFill>
-                  <a:srgbClr val="009bdd"/>
-                </a:solidFill>
-                <a:uFillTx/>
-                <a:latin typeface="Arial"/>
-              </a:rPr>
-              <a:t>temporary</a:t>
-            </a:r>
-            <a:r>
-              <a:rPr b="0" lang="bs-BA" sz="2400" strike="noStrike" u="none">
-                <a:solidFill>
-                  <a:srgbClr val="009bdd"/>
-                </a:solidFill>
-                <a:uFillTx/>
-                <a:latin typeface="Arial"/>
-              </a:rPr>
-              <a:t>.</a:t>
+              <a:t>Da bismo komunicirali s programima kao što je “Binary to Decimal” (prvi primjer u flexboxu “Examples” s lijeva), možemo koristiti SVG-ove generirane u JavaScriptu, koji predstavljaju switcheve, LED-ice i sedam-segmentne pokaznike.</a:t>
             </a:r>
             <a:endParaRPr b="0" lang="bs-BA" sz="2400" strike="noStrike" u="none">
               <a:solidFill>
@@ -3524,8 +3425,8 @@
         </p:blipFill>
         <p:spPr>
           <a:xfrm>
-            <a:off x="228600" y="1013760"/>
-            <a:ext cx="4739400" cy="3786840"/>
+            <a:off x="335520" y="1143000"/>
+            <a:ext cx="4693680" cy="1958040"/>
           </a:xfrm>
           <a:prstGeom prst="rect">
             <a:avLst/>
@@ -3538,49 +3439,6 @@
       </p:pic>
       <p:sp>
         <p:nvSpPr>
-          <p:cNvPr id="55" name=""/>
-          <p:cNvSpPr/>
-          <p:nvPr/>
-        </p:nvSpPr>
-        <p:spPr>
-          <a:xfrm>
-            <a:off x="228600" y="4114800"/>
-            <a:ext cx="685800" cy="228600"/>
-          </a:xfrm>
-          <a:prstGeom prst="ellipse">
-            <a:avLst/>
-          </a:prstGeom>
-          <a:noFill/>
-          <a:ln w="18000">
-            <a:solidFill>
-              <a:srgbClr val="009bdd"/>
-            </a:solidFill>
-            <a:round/>
-          </a:ln>
-        </p:spPr>
-        <p:style>
-          <a:lnRef idx="0"/>
-          <a:fillRef idx="0"/>
-          <a:effectRef idx="0"/>
-          <a:fontRef idx="minor"/>
-        </p:style>
-        <p:txBody>
-          <a:bodyPr wrap="none" lIns="90000" rIns="90000" tIns="45000" bIns="45000" anchor="ctr">
-            <a:noAutofit/>
-          </a:bodyPr>
-          <a:p>
-            <a:endParaRPr b="0" lang="bs-BA" sz="1800" strike="noStrike" u="none">
-              <a:solidFill>
-                <a:srgbClr val="000000"/>
-              </a:solidFill>
-              <a:uFillTx/>
-              <a:latin typeface="Arial"/>
-            </a:endParaRPr>
-          </a:p>
-        </p:txBody>
-      </p:sp>
-      <p:sp>
-        <p:nvSpPr>
           <p:cNvPr id="4" name="PlaceHolder 3"/>
           <p:cNvSpPr>
             <a:spLocks noGrp="1"/>
@@ -3593,7 +3451,7 @@
         <p:txBody>
           <a:bodyPr/>
           <a:p>
-            <a:fld id="{45A384A6-7842-4A4D-A37A-92FCDA311C23}" type="slidenum">
+            <a:fld id="{F0E4E2EF-DE6D-4E99-9D7F-05F73FA560A5}" type="slidenum">
               <a:t>10</a:t>
             </a:fld>
           </a:p>
@@ -3613,9 +3471,9 @@
         <p:txBody>
           <a:bodyPr/>
           <a:p>
-            <a:fld id="{26362C41-6D8C-4555-A56D-8C8F4328B7EA}" type="datetime1">
+            <a:fld id="{3A2529D7-BC1A-4EF6-8C3E-166F10473F2F}" type="datetime1">
               <a:rPr lang="en-US"/>
-              <a:t>03/24/2025</a:t>
+              <a:t>04/01/2025</a:t>
             </a:fld>
           </a:p>
         </p:txBody>
@@ -3652,7 +3510,7 @@
       </p:grpSpPr>
       <p:sp>
         <p:nvSpPr>
-          <p:cNvPr id="56" name="PlaceHolder 1"/>
+          <p:cNvPr id="55" name="PlaceHolder 1"/>
           <p:cNvSpPr>
             <a:spLocks noGrp="1"/>
           </p:cNvSpPr>
@@ -3703,7 +3561,7 @@
       </p:sp>
       <p:sp>
         <p:nvSpPr>
-          <p:cNvPr id="57" name="PlaceHolder 2"/>
+          <p:cNvPr id="56" name="PlaceHolder 2"/>
           <p:cNvSpPr>
             <a:spLocks noGrp="1"/>
           </p:cNvSpPr>
@@ -3748,27 +3606,7 @@
                 <a:uFillTx/>
                 <a:latin typeface="Arial"/>
               </a:rPr>
-              <a:t>Kada program radi kako želimo u simulatoru, možemo ga isprobati na pravom PicoBlazeu tako da kliknemo na “</a:t>
-            </a:r>
-            <a:r>
-              <a:rPr b="0" i="1" lang="bs-BA" sz="2400" strike="noStrike" u="none">
-                <a:solidFill>
-                  <a:srgbClr val="009bdd"/>
-                </a:solidFill>
-                <a:uFillTx/>
-                <a:latin typeface="Arial"/>
-              </a:rPr>
-              <a:t>Download Hexadecimal</a:t>
-            </a:r>
-            <a:r>
-              <a:rPr b="0" lang="bs-BA" sz="2400" strike="noStrike" u="none">
-                <a:solidFill>
-                  <a:srgbClr val="009bdd"/>
-                </a:solidFill>
-                <a:uFillTx/>
-                <a:latin typeface="Arial"/>
-              </a:rPr>
-              <a:t>”.</a:t>
+              <a:t>Ako želimo, možemo dodati i breakpointse na koje će emulacija pauzirati.</a:t>
             </a:r>
             <a:endParaRPr b="0" lang="bs-BA" sz="2400" strike="noStrike" u="none">
               <a:solidFill>
@@ -3798,7 +3636,77 @@
                 <a:uFillTx/>
                 <a:latin typeface="Arial"/>
               </a:rPr>
-              <a:t>I Xilinxov asembler za PicoBlaze ispisuje heksadecimalne datoteke, tako da činjenica da ne ispisujemo binarne datoteke nije problem.</a:t>
+              <a:t>Tu sam mogućnost dodao na prijedlog profesora Tomislava Matića mlađeg.</a:t>
+            </a:r>
+            <a:endParaRPr b="0" lang="bs-BA" sz="2400" strike="noStrike" u="none">
+              <a:solidFill>
+                <a:srgbClr val="009bdd"/>
+              </a:solidFill>
+              <a:uFillTx/>
+              <a:latin typeface="Arial"/>
+            </a:endParaRPr>
+          </a:p>
+          <a:p>
+            <a:pPr marL="432000" indent="-324000">
+              <a:spcBef>
+                <a:spcPts val="1060"/>
+              </a:spcBef>
+              <a:buClr>
+                <a:srgbClr val="77caee"/>
+              </a:buClr>
+              <a:buSzPct val="45000"/>
+              <a:buFont typeface="Wingdings" charset="2"/>
+              <a:buChar char=""/>
+            </a:pPr>
+            <a:r>
+              <a:rPr b="0" lang="bs-BA" sz="2400" strike="noStrike" u="none">
+                <a:solidFill>
+                  <a:srgbClr val="009bdd"/>
+                </a:solidFill>
+                <a:uFillTx/>
+                <a:latin typeface="Arial"/>
+              </a:rPr>
+              <a:t>Postoje samo </a:t>
+            </a:r>
+            <a:r>
+              <a:rPr b="0" i="1" lang="bs-BA" sz="2400" strike="noStrike" u="none">
+                <a:solidFill>
+                  <a:srgbClr val="009bdd"/>
+                </a:solidFill>
+                <a:uFillTx/>
+                <a:latin typeface="Arial"/>
+              </a:rPr>
+              <a:t>permanent</a:t>
+            </a:r>
+            <a:r>
+              <a:rPr b="0" lang="bs-BA" sz="2400" strike="noStrike" u="none">
+                <a:solidFill>
+                  <a:srgbClr val="009bdd"/>
+                </a:solidFill>
+                <a:uFillTx/>
+                <a:latin typeface="Arial"/>
+              </a:rPr>
+              <a:t> breakpointsi, ne i </a:t>
+            </a:r>
+            <a:r>
+              <a:rPr b="0" i="1" lang="bs-BA" sz="2400" strike="noStrike" u="none">
+                <a:solidFill>
+                  <a:srgbClr val="009bdd"/>
+                </a:solidFill>
+                <a:uFillTx/>
+                <a:latin typeface="Arial"/>
+              </a:rPr>
+              <a:t>temporary</a:t>
+            </a:r>
+            <a:r>
+              <a:rPr b="0" lang="bs-BA" sz="2400" strike="noStrike" u="none">
+                <a:solidFill>
+                  <a:srgbClr val="009bdd"/>
+                </a:solidFill>
+                <a:uFillTx/>
+                <a:latin typeface="Arial"/>
+              </a:rPr>
+              <a:t>.</a:t>
             </a:r>
             <a:endParaRPr b="0" lang="bs-BA" sz="2400" strike="noStrike" u="none">
               <a:solidFill>
@@ -3812,7 +3720,7 @@
       </p:sp>
       <p:pic>
         <p:nvPicPr>
-          <p:cNvPr id="58" name="" descr=""/>
+          <p:cNvPr id="57" name="" descr=""/>
           <p:cNvPicPr/>
           <p:nvPr/>
         </p:nvPicPr>
@@ -3822,8 +3730,8 @@
         </p:blipFill>
         <p:spPr>
           <a:xfrm>
-            <a:off x="365760" y="937440"/>
-            <a:ext cx="4663440" cy="3863160"/>
+            <a:off x="228600" y="1013760"/>
+            <a:ext cx="4739400" cy="3786840"/>
           </a:xfrm>
           <a:prstGeom prst="rect">
             <a:avLst/>
@@ -3836,14 +3744,14 @@
       </p:pic>
       <p:sp>
         <p:nvSpPr>
-          <p:cNvPr id="59" name=""/>
+          <p:cNvPr id="58" name=""/>
           <p:cNvSpPr/>
           <p:nvPr/>
         </p:nvSpPr>
         <p:spPr>
           <a:xfrm>
-            <a:off x="1828800" y="914400"/>
-            <a:ext cx="1828800" cy="457200"/>
+            <a:off x="228600" y="4114800"/>
+            <a:ext cx="685800" cy="228600"/>
           </a:xfrm>
           <a:prstGeom prst="ellipse">
             <a:avLst/>
@@ -3891,7 +3799,7 @@
         <p:txBody>
           <a:bodyPr/>
           <a:p>
-            <a:fld id="{0E237F78-9A0C-4B9A-9E7F-066A8E710644}" type="slidenum">
+            <a:fld id="{4475032F-87B4-4273-868B-C9EEDD7A315D}" type="slidenum">
               <a:t>11</a:t>
             </a:fld>
           </a:p>
@@ -3911,9 +3819,9 @@
         <p:txBody>
           <a:bodyPr/>
           <a:p>
-            <a:fld id="{FE537DF6-E9A8-4248-B610-49CA9216A886}" type="datetime1">
+            <a:fld id="{10429A2B-1BA1-42CF-8CFE-14DF7DB88E7E}" type="datetime1">
               <a:rPr lang="en-US"/>
-              <a:t>03/24/2025</a:t>
+              <a:t>04/01/2025</a:t>
             </a:fld>
           </a:p>
         </p:txBody>
@@ -3950,7 +3858,7 @@
       </p:grpSpPr>
       <p:sp>
         <p:nvSpPr>
-          <p:cNvPr id="60" name="PlaceHolder 1"/>
+          <p:cNvPr id="59" name="PlaceHolder 1"/>
           <p:cNvSpPr>
             <a:spLocks noGrp="1"/>
           </p:cNvSpPr>
@@ -4001,7 +3909,7 @@
       </p:sp>
       <p:sp>
         <p:nvSpPr>
-          <p:cNvPr id="61" name="PlaceHolder 2"/>
+          <p:cNvPr id="60" name="PlaceHolder 2"/>
           <p:cNvSpPr>
             <a:spLocks noGrp="1"/>
           </p:cNvSpPr>
@@ -4046,7 +3954,27 @@
                 <a:uFillTx/>
                 <a:latin typeface="Arial"/>
               </a:rPr>
-              <a:t>Kada dostignemo breakpoint, možemo pogledati trenutne registre, zastavice i memoriju u tablicama.</a:t>
+              <a:t>Kada program radi kako želimo u simulatoru, možemo ga isprobati na pravom PicoBlazeu tako da kliknemo na “</a:t>
+            </a:r>
+            <a:r>
+              <a:rPr b="0" i="1" lang="bs-BA" sz="2400" strike="noStrike" u="none">
+                <a:solidFill>
+                  <a:srgbClr val="009bdd"/>
+                </a:solidFill>
+                <a:uFillTx/>
+                <a:latin typeface="Arial"/>
+              </a:rPr>
+              <a:t>Download Hexadecimal</a:t>
+            </a:r>
+            <a:r>
+              <a:rPr b="0" lang="bs-BA" sz="2400" strike="noStrike" u="none">
+                <a:solidFill>
+                  <a:srgbClr val="009bdd"/>
+                </a:solidFill>
+                <a:uFillTx/>
+                <a:latin typeface="Arial"/>
+              </a:rPr>
+              <a:t>”.</a:t>
             </a:r>
             <a:endParaRPr b="0" lang="bs-BA" sz="2400" strike="noStrike" u="none">
               <a:solidFill>
@@ -4076,27 +4004,7 @@
                 <a:uFillTx/>
                 <a:latin typeface="Arial"/>
               </a:rPr>
-              <a:t>Nedavno promijenjene zastavice i registri obojane su različitom bojom, da nam ne bi promakli. Za to se koristio </a:t>
-            </a:r>
-            <a:r>
-              <a:rPr b="0" i="1" lang="bs-BA" sz="2400" strike="noStrike" u="none">
-                <a:solidFill>
-                  <a:srgbClr val="009bdd"/>
-                </a:solidFill>
-                <a:uFillTx/>
-                <a:latin typeface="Arial"/>
-              </a:rPr>
-              <a:t>DOM as a state</a:t>
-            </a:r>
-            <a:r>
-              <a:rPr b="0" lang="bs-BA" sz="2400" strike="noStrike" u="none">
-                <a:solidFill>
-                  <a:srgbClr val="009bdd"/>
-                </a:solidFill>
-                <a:uFillTx/>
-                <a:latin typeface="Arial"/>
-              </a:rPr>
-              <a:t>, što možda i nije najbolje rješenje.</a:t>
+              <a:t>I Xilinxov asembler za PicoBlaze ispisuje heksadecimalne datoteke, tako da činjenica da ne ispisujemo binarne datoteke nije problem.</a:t>
             </a:r>
             <a:endParaRPr b="0" lang="bs-BA" sz="2400" strike="noStrike" u="none">
               <a:solidFill>
@@ -4110,7 +4018,7 @@
       </p:sp>
       <p:pic>
         <p:nvPicPr>
-          <p:cNvPr id="62" name="" descr=""/>
+          <p:cNvPr id="61" name="" descr=""/>
           <p:cNvPicPr/>
           <p:nvPr/>
         </p:nvPicPr>
@@ -4120,8 +4028,8 @@
         </p:blipFill>
         <p:spPr>
           <a:xfrm>
-            <a:off x="343080" y="914400"/>
-            <a:ext cx="4686120" cy="3779280"/>
+            <a:off x="365760" y="937440"/>
+            <a:ext cx="4663440" cy="3863160"/>
           </a:xfrm>
           <a:prstGeom prst="rect">
             <a:avLst/>
@@ -4134,6 +4042,49 @@
       </p:pic>
       <p:sp>
         <p:nvSpPr>
+          <p:cNvPr id="62" name=""/>
+          <p:cNvSpPr/>
+          <p:nvPr/>
+        </p:nvSpPr>
+        <p:spPr>
+          <a:xfrm>
+            <a:off x="1828800" y="914400"/>
+            <a:ext cx="1828800" cy="457200"/>
+          </a:xfrm>
+          <a:prstGeom prst="ellipse">
+            <a:avLst/>
+          </a:prstGeom>
+          <a:noFill/>
+          <a:ln w="18000">
+            <a:solidFill>
+              <a:srgbClr val="009bdd"/>
+            </a:solidFill>
+            <a:round/>
+          </a:ln>
+        </p:spPr>
+        <p:style>
+          <a:lnRef idx="0"/>
+          <a:fillRef idx="0"/>
+          <a:effectRef idx="0"/>
+          <a:fontRef idx="minor"/>
+        </p:style>
+        <p:txBody>
+          <a:bodyPr wrap="none" lIns="90000" rIns="90000" tIns="45000" bIns="45000" anchor="ctr">
+            <a:noAutofit/>
+          </a:bodyPr>
+          <a:p>
+            <a:endParaRPr b="0" lang="bs-BA" sz="1800" strike="noStrike" u="none">
+              <a:solidFill>
+                <a:srgbClr val="000000"/>
+              </a:solidFill>
+              <a:uFillTx/>
+              <a:latin typeface="Arial"/>
+            </a:endParaRPr>
+          </a:p>
+        </p:txBody>
+      </p:sp>
+      <p:sp>
+        <p:nvSpPr>
           <p:cNvPr id="4" name="PlaceHolder 3"/>
           <p:cNvSpPr>
             <a:spLocks noGrp="1"/>
@@ -4146,7 +4097,7 @@
         <p:txBody>
           <a:bodyPr/>
           <a:p>
-            <a:fld id="{8E93F65E-88B0-43CA-98AC-826E4DAE3778}" type="slidenum">
+            <a:fld id="{2922666B-3647-454E-871A-E15308357421}" type="slidenum">
               <a:t>12</a:t>
             </a:fld>
           </a:p>
@@ -4166,9 +4117,9 @@
         <p:txBody>
           <a:bodyPr/>
           <a:p>
-            <a:fld id="{30478C61-F9BB-4ADE-8D23-24BD2992BFCE}" type="datetime1">
+            <a:fld id="{17B747CB-AC48-4156-84D2-BE8E42C2E6B6}" type="datetime1">
               <a:rPr lang="en-US"/>
-              <a:t>03/24/2025</a:t>
+              <a:t>04/01/2025</a:t>
             </a:fld>
           </a:p>
         </p:txBody>
@@ -4301,7 +4252,7 @@
                 <a:uFillTx/>
                 <a:latin typeface="Arial"/>
               </a:rPr>
-              <a:t>Da bismo komunicirali s programima kao što je “Decimal to Binary” (drugi primjer s lijeva), moramo uključiti UART terminal.</a:t>
+              <a:t>Kada dostignemo breakpoint, možemo pogledati trenutne registre, zastavice i memoriju u tablicama.</a:t>
             </a:r>
             <a:endParaRPr b="0" lang="bs-BA" sz="2400" strike="noStrike" u="none">
               <a:solidFill>
@@ -4331,7 +4282,7 @@
                 <a:uFillTx/>
                 <a:latin typeface="Arial"/>
               </a:rPr>
-              <a:t>Preporučljivo je pritom isključiti checkbox “</a:t>
+              <a:t>Nedavno promijenjene zastavice i registri obojane su različitom bojom, da nam ne bi promakli. Za to se koristio </a:t>
             </a:r>
             <a:r>
               <a:rPr b="0" i="1" lang="bs-BA" sz="2400" strike="noStrike" u="none">
@@ -4341,7 +4292,7 @@
                 <a:uFillTx/>
                 <a:latin typeface="Arial"/>
               </a:rPr>
-              <a:t>Update registers and flags on every step</a:t>
+              <a:t>DOM as a state</a:t>
             </a:r>
             <a:r>
               <a:rPr b="0" lang="bs-BA" sz="2400" strike="noStrike" u="none">
@@ -4351,27 +4302,7 @@
                 <a:uFillTx/>
                 <a:latin typeface="Arial"/>
               </a:rPr>
-              <a:t>”. Verzija </a:t>
-            </a:r>
-            <a:r>
-              <a:rPr b="0" i="1" lang="bs-BA" sz="2400" strike="noStrike" u="none">
-                <a:solidFill>
-                  <a:srgbClr val="009bdd"/>
-                </a:solidFill>
-                <a:uFillTx/>
-                <a:latin typeface="Arial"/>
-              </a:rPr>
-              <a:t>v3.1.4</a:t>
-            </a:r>
-            <a:r>
-              <a:rPr b="0" lang="bs-BA" sz="2400" strike="noStrike" u="none">
-                <a:solidFill>
-                  <a:srgbClr val="009bdd"/>
-                </a:solidFill>
-                <a:uFillTx/>
-                <a:latin typeface="Arial"/>
-              </a:rPr>
-              <a:t> i novije to rade automatski.</a:t>
+              <a:t>, što možda i nije najbolje rješenje.</a:t>
             </a:r>
             <a:endParaRPr b="0" lang="bs-BA" sz="2400" strike="noStrike" u="none">
               <a:solidFill>
@@ -4395,8 +4326,8 @@
         </p:blipFill>
         <p:spPr>
           <a:xfrm>
-            <a:off x="396360" y="914400"/>
-            <a:ext cx="3032640" cy="1833120"/>
+            <a:off x="343080" y="914400"/>
+            <a:ext cx="4686120" cy="3779280"/>
           </a:xfrm>
           <a:prstGeom prst="rect">
             <a:avLst/>
@@ -4407,30 +4338,6 @@
           </a:ln>
         </p:spPr>
       </p:pic>
-      <p:pic>
-        <p:nvPicPr>
-          <p:cNvPr id="66" name="" descr=""/>
-          <p:cNvPicPr/>
-          <p:nvPr/>
-        </p:nvPicPr>
-        <p:blipFill>
-          <a:blip r:embed="rId2"/>
-          <a:stretch/>
-        </p:blipFill>
-        <p:spPr>
-          <a:xfrm>
-            <a:off x="327960" y="3200400"/>
-            <a:ext cx="4701240" cy="837720"/>
-          </a:xfrm>
-          <a:prstGeom prst="rect">
-            <a:avLst/>
-          </a:prstGeom>
-          <a:noFill/>
-          <a:ln w="18000">
-            <a:noFill/>
-          </a:ln>
-        </p:spPr>
-      </p:pic>
       <p:sp>
         <p:nvSpPr>
           <p:cNvPr id="4" name="PlaceHolder 3"/>
@@ -4445,7 +4352,7 @@
         <p:txBody>
           <a:bodyPr/>
           <a:p>
-            <a:fld id="{ED104D79-4220-49C5-834B-E6E69CB25DE8}" type="slidenum">
+            <a:fld id="{D672491C-3883-49B4-8069-494DD6607ED6}" type="slidenum">
               <a:t>13</a:t>
             </a:fld>
           </a:p>
@@ -4465,9 +4372,9 @@
         <p:txBody>
           <a:bodyPr/>
           <a:p>
-            <a:fld id="{FF55313C-39AB-496A-8C57-7AC043FD9DF5}" type="datetime1">
+            <a:fld id="{C5C67459-D92E-43B4-AE2E-981C9047018F}" type="datetime1">
               <a:rPr lang="en-US"/>
-              <a:t>03/24/2025</a:t>
+              <a:t>04/01/2025</a:t>
             </a:fld>
           </a:p>
         </p:txBody>
@@ -4504,7 +4411,7 @@
       </p:grpSpPr>
       <p:sp>
         <p:nvSpPr>
-          <p:cNvPr id="67" name="PlaceHolder 1"/>
+          <p:cNvPr id="66" name="PlaceHolder 1"/>
           <p:cNvSpPr>
             <a:spLocks noGrp="1"/>
           </p:cNvSpPr>
@@ -4541,17 +4448,7 @@
                 <a:uFillTx/>
                 <a:latin typeface="Arial"/>
               </a:rPr>
-              <a:t>“</a:t>
-            </a:r>
-            <a:r>
-              <a:rPr b="0" lang="bs-BA" sz="3300" strike="noStrike" u="none">
-                <a:solidFill>
-                  <a:srgbClr val="ffffff"/>
-                </a:solidFill>
-                <a:uFillTx/>
-                <a:latin typeface="Arial"/>
-              </a:rPr>
-              <a:t>Update registers and flags on every step”</a:t>
+              <a:t>Kako se koristi...</a:t>
             </a:r>
             <a:endParaRPr b="0" lang="bs-BA" sz="3300" strike="noStrike" u="none">
               <a:solidFill>
@@ -4565,7 +4462,7 @@
       </p:sp>
       <p:sp>
         <p:nvSpPr>
-          <p:cNvPr id="68" name="PlaceHolder 2"/>
+          <p:cNvPr id="67" name="PlaceHolder 2"/>
           <p:cNvSpPr>
             <a:spLocks noGrp="1"/>
           </p:cNvSpPr>
@@ -4575,8 +4472,8 @@
         </p:nvSpPr>
         <p:spPr>
           <a:xfrm>
-            <a:off x="360000" y="1080000"/>
-            <a:ext cx="9360000" cy="3600000"/>
+            <a:off x="5155920" y="1080000"/>
+            <a:ext cx="4567320" cy="3600000"/>
           </a:xfrm>
           <a:prstGeom prst="rect">
             <a:avLst/>
@@ -4603,16 +4500,16 @@
               <a:buChar char=""/>
             </a:pPr>
             <a:r>
-              <a:rPr b="0" lang="bs-BA" sz="2200" strike="noStrike" u="none">
-                <a:solidFill>
-                  <a:srgbClr val="009bdd"/>
-                </a:solidFill>
-                <a:uFillTx/>
-                <a:latin typeface="Arial"/>
-              </a:rPr>
-              <a:t>Naime, moj program ima problem s layout trashingom: svaki put kad se upiše novi broj u tablicu s registrima (dakle, praktički svaka instrukcija), tablica se neprimjetno poveća ili smanji za nekoliko piksela... ali dovoljno da prisili browser da čitavu stranicu mora iznova renderirati.</a:t>
-            </a:r>
-            <a:endParaRPr b="0" lang="bs-BA" sz="2200" strike="noStrike" u="none">
+              <a:rPr b="0" lang="bs-BA" sz="2400" strike="noStrike" u="none">
+                <a:solidFill>
+                  <a:srgbClr val="009bdd"/>
+                </a:solidFill>
+                <a:uFillTx/>
+                <a:latin typeface="Arial"/>
+              </a:rPr>
+              <a:t>Da bismo komunicirali s programima kao što je “Decimal to Binary” (drugi primjer s lijeva), moramo uključiti UART terminal.</a:t>
+            </a:r>
+            <a:endParaRPr b="0" lang="bs-BA" sz="2400" strike="noStrike" u="none">
               <a:solidFill>
                 <a:srgbClr val="009bdd"/>
               </a:solidFill>
@@ -4633,16 +4530,56 @@
               <a:buChar char=""/>
             </a:pPr>
             <a:r>
-              <a:rPr b="0" lang="bs-BA" sz="2200" strike="noStrike" u="none">
-                <a:solidFill>
-                  <a:srgbClr val="009bdd"/>
-                </a:solidFill>
-                <a:uFillTx/>
-                <a:latin typeface="Arial"/>
-              </a:rPr>
-              <a:t>Činjenica da sam koristio monospace font u tablici, izgleda, ne pomaže.</a:t>
-            </a:r>
-            <a:endParaRPr b="0" lang="bs-BA" sz="2200" strike="noStrike" u="none">
+              <a:rPr b="0" lang="bs-BA" sz="2400" strike="noStrike" u="none">
+                <a:solidFill>
+                  <a:srgbClr val="009bdd"/>
+                </a:solidFill>
+                <a:uFillTx/>
+                <a:latin typeface="Arial"/>
+              </a:rPr>
+              <a:t>Preporučljivo je pritom isključiti checkbox “</a:t>
+            </a:r>
+            <a:r>
+              <a:rPr b="0" i="1" lang="bs-BA" sz="2400" strike="noStrike" u="none">
+                <a:solidFill>
+                  <a:srgbClr val="009bdd"/>
+                </a:solidFill>
+                <a:uFillTx/>
+                <a:latin typeface="Arial"/>
+              </a:rPr>
+              <a:t>Update registers and flags on every step</a:t>
+            </a:r>
+            <a:r>
+              <a:rPr b="0" lang="bs-BA" sz="2400" strike="noStrike" u="none">
+                <a:solidFill>
+                  <a:srgbClr val="009bdd"/>
+                </a:solidFill>
+                <a:uFillTx/>
+                <a:latin typeface="Arial"/>
+              </a:rPr>
+              <a:t>”. Verzija </a:t>
+            </a:r>
+            <a:r>
+              <a:rPr b="0" i="1" lang="bs-BA" sz="2400" strike="noStrike" u="none">
+                <a:solidFill>
+                  <a:srgbClr val="009bdd"/>
+                </a:solidFill>
+                <a:uFillTx/>
+                <a:latin typeface="Arial"/>
+              </a:rPr>
+              <a:t>v3.1.4</a:t>
+            </a:r>
+            <a:r>
+              <a:rPr b="0" lang="bs-BA" sz="2400" strike="noStrike" u="none">
+                <a:solidFill>
+                  <a:srgbClr val="009bdd"/>
+                </a:solidFill>
+                <a:uFillTx/>
+                <a:latin typeface="Arial"/>
+              </a:rPr>
+              <a:t> i novije to rade automatski.</a:t>
+            </a:r>
+            <a:endParaRPr b="0" lang="bs-BA" sz="2400" strike="noStrike" u="none">
               <a:solidFill>
                 <a:srgbClr val="009bdd"/>
               </a:solidFill>
@@ -4650,78 +4587,56 @@
               <a:latin typeface="Arial"/>
             </a:endParaRPr>
           </a:p>
-          <a:p>
-            <a:pPr marL="432000" indent="-324000">
-              <a:spcBef>
-                <a:spcPts val="1060"/>
-              </a:spcBef>
-              <a:buClr>
-                <a:srgbClr val="77caee"/>
-              </a:buClr>
-              <a:buSzPct val="45000"/>
-              <a:buFont typeface="Wingdings" charset="2"/>
-              <a:buChar char=""/>
-            </a:pPr>
-            <a:r>
-              <a:rPr b="0" lang="bs-BA" sz="2200" strike="noStrike" u="none">
-                <a:solidFill>
-                  <a:srgbClr val="009bdd"/>
-                </a:solidFill>
-                <a:uFillTx/>
-                <a:latin typeface="Arial"/>
-              </a:rPr>
-              <a:t>Vjerujemo da je u modernim internetskim preglednicima (Firefox 69, Chrome 52...) to moguće riješiti CSS-om (naredba “</a:t>
-            </a:r>
-            <a:r>
-              <a:rPr b="0" i="1" lang="bs-BA" sz="2200" strike="noStrike" u="none">
-                <a:solidFill>
-                  <a:srgbClr val="009bdd"/>
-                </a:solidFill>
-                <a:uFillTx/>
-                <a:latin typeface="Arial"/>
-              </a:rPr>
-              <a:t>contain: layout</a:t>
-            </a:r>
-            <a:r>
-              <a:rPr b="0" lang="bs-BA" sz="2200" strike="noStrike" u="none">
-                <a:solidFill>
-                  <a:srgbClr val="009bdd"/>
-                </a:solidFill>
-                <a:uFillTx/>
-                <a:latin typeface="Arial"/>
-              </a:rPr>
-              <a:t>” i njoj srodne) i da će to i biti u nekoj budućoj verziji ovog simulatora. Ali, for the time being, postoji checkbox kojim se program može donekle ubrzati. Uostalom, to rješenje sa checkboxom funkcionira i u Firefoxu 52 (koji ne podržava “</a:t>
-            </a:r>
-            <a:r>
-              <a:rPr b="0" i="1" lang="bs-BA" sz="2200" strike="noStrike" u="none">
-                <a:solidFill>
-                  <a:srgbClr val="009bdd"/>
-                </a:solidFill>
-                <a:uFillTx/>
-                <a:latin typeface="Arial"/>
-              </a:rPr>
-              <a:t>contain: layout</a:t>
-            </a:r>
-            <a:r>
-              <a:rPr b="0" lang="bs-BA" sz="2200" strike="noStrike" u="none">
-                <a:solidFill>
-                  <a:srgbClr val="009bdd"/>
-                </a:solidFill>
-                <a:uFillTx/>
-                <a:latin typeface="Arial"/>
-              </a:rPr>
-              <a:t>” i njoj srodne naredbe).</a:t>
-            </a:r>
-            <a:endParaRPr b="0" lang="bs-BA" sz="2200" strike="noStrike" u="none">
-              <a:solidFill>
-                <a:srgbClr val="009bdd"/>
-              </a:solidFill>
-              <a:uFillTx/>
-              <a:latin typeface="Arial"/>
-            </a:endParaRPr>
-          </a:p>
-        </p:txBody>
-      </p:sp>
+        </p:txBody>
+      </p:sp>
+      <p:pic>
+        <p:nvPicPr>
+          <p:cNvPr id="68" name="" descr=""/>
+          <p:cNvPicPr/>
+          <p:nvPr/>
+        </p:nvPicPr>
+        <p:blipFill>
+          <a:blip r:embed="rId1"/>
+          <a:stretch/>
+        </p:blipFill>
+        <p:spPr>
+          <a:xfrm>
+            <a:off x="396360" y="914400"/>
+            <a:ext cx="3032640" cy="1833120"/>
+          </a:xfrm>
+          <a:prstGeom prst="rect">
+            <a:avLst/>
+          </a:prstGeom>
+          <a:noFill/>
+          <a:ln w="18000">
+            <a:noFill/>
+          </a:ln>
+        </p:spPr>
+      </p:pic>
+      <p:pic>
+        <p:nvPicPr>
+          <p:cNvPr id="69" name="" descr=""/>
+          <p:cNvPicPr/>
+          <p:nvPr/>
+        </p:nvPicPr>
+        <p:blipFill>
+          <a:blip r:embed="rId2"/>
+          <a:stretch/>
+        </p:blipFill>
+        <p:spPr>
+          <a:xfrm>
+            <a:off x="327960" y="3200400"/>
+            <a:ext cx="4701240" cy="837720"/>
+          </a:xfrm>
+          <a:prstGeom prst="rect">
+            <a:avLst/>
+          </a:prstGeom>
+          <a:noFill/>
+          <a:ln w="18000">
+            <a:noFill/>
+          </a:ln>
+        </p:spPr>
+      </p:pic>
       <p:sp>
         <p:nvSpPr>
           <p:cNvPr id="4" name="PlaceHolder 3"/>
@@ -4736,7 +4651,7 @@
         <p:txBody>
           <a:bodyPr/>
           <a:p>
-            <a:fld id="{B69DA9DE-DFCD-469E-AB50-B29CBE6C47DD}" type="slidenum">
+            <a:fld id="{F8BF14C2-83E3-4E30-8BC7-02A2E25286CB}" type="slidenum">
               <a:t>14</a:t>
             </a:fld>
           </a:p>
@@ -4756,9 +4671,9 @@
         <p:txBody>
           <a:bodyPr/>
           <a:p>
-            <a:fld id="{5DD55106-47DA-4F1D-B7F2-462C3367B7CB}" type="datetime1">
+            <a:fld id="{5BD3C126-4157-4798-9B5A-9CFF711176CF}" type="datetime1">
               <a:rPr lang="en-US"/>
-              <a:t>03/24/2025</a:t>
+              <a:t>04/01/2025</a:t>
             </a:fld>
           </a:p>
         </p:txBody>
@@ -4795,7 +4710,7 @@
       </p:grpSpPr>
       <p:sp>
         <p:nvSpPr>
-          <p:cNvPr id="69" name="PlaceHolder 1"/>
+          <p:cNvPr id="70" name="PlaceHolder 1"/>
           <p:cNvSpPr>
             <a:spLocks noGrp="1"/>
           </p:cNvSpPr>
@@ -4832,7 +4747,17 @@
                 <a:uFillTx/>
                 <a:latin typeface="Arial"/>
               </a:rPr>
-              <a:t>Je li simulacija UART-a realna?</a:t>
+              <a:t>“</a:t>
+            </a:r>
+            <a:r>
+              <a:rPr b="0" lang="bs-BA" sz="3300" strike="noStrike" u="none">
+                <a:solidFill>
+                  <a:srgbClr val="ffffff"/>
+                </a:solidFill>
+                <a:uFillTx/>
+                <a:latin typeface="Arial"/>
+              </a:rPr>
+              <a:t>Update registers and flags on every step”</a:t>
             </a:r>
             <a:endParaRPr b="0" lang="bs-BA" sz="3300" strike="noStrike" u="none">
               <a:solidFill>
@@ -4846,7 +4771,7 @@
       </p:sp>
       <p:sp>
         <p:nvSpPr>
-          <p:cNvPr id="70" name="PlaceHolder 2"/>
+          <p:cNvPr id="71" name="PlaceHolder 2"/>
           <p:cNvSpPr>
             <a:spLocks noGrp="1"/>
           </p:cNvSpPr>
@@ -4884,16 +4809,16 @@
               <a:buChar char=""/>
             </a:pPr>
             <a:r>
-              <a:rPr b="0" lang="bs-BA" sz="2400" strike="noStrike" u="none">
-                <a:solidFill>
-                  <a:srgbClr val="009bdd"/>
-                </a:solidFill>
-                <a:uFillTx/>
-                <a:latin typeface="Arial"/>
-              </a:rPr>
-              <a:t>Program “Decimal to Binary” nisam uspio pokrenuti na pravom PicoBlazeu, a nisam uspio ni dijagnosticirati problem. Tako da ga ne treba uzeti kao sigurno dobar primjer kako se na PicoBlazeu koristi UART.</a:t>
-            </a:r>
-            <a:endParaRPr b="0" lang="bs-BA" sz="2400" strike="noStrike" u="none">
+              <a:rPr b="0" lang="bs-BA" sz="2200" strike="noStrike" u="none">
+                <a:solidFill>
+                  <a:srgbClr val="009bdd"/>
+                </a:solidFill>
+                <a:uFillTx/>
+                <a:latin typeface="Arial"/>
+              </a:rPr>
+              <a:t>Naime, moj program ima problem s layout trashingom: svaki put kad se upiše novi broj u tablicu s registrima (dakle, praktički svaka instrukcija), tablica se neprimjetno poveća ili smanji za nekoliko piksela... ali dovoljno da prisili browser da čitavu stranicu mora iznova renderirati.</a:t>
+            </a:r>
+            <a:endParaRPr b="0" lang="bs-BA" sz="2200" strike="noStrike" u="none">
               <a:solidFill>
                 <a:srgbClr val="009bdd"/>
               </a:solidFill>
@@ -4901,6 +4826,106 @@
               <a:latin typeface="Arial"/>
             </a:endParaRPr>
           </a:p>
+          <a:p>
+            <a:pPr marL="432000" indent="-324000">
+              <a:spcBef>
+                <a:spcPts val="1060"/>
+              </a:spcBef>
+              <a:buClr>
+                <a:srgbClr val="77caee"/>
+              </a:buClr>
+              <a:buSzPct val="45000"/>
+              <a:buFont typeface="Wingdings" charset="2"/>
+              <a:buChar char=""/>
+            </a:pPr>
+            <a:r>
+              <a:rPr b="0" lang="bs-BA" sz="2200" strike="noStrike" u="none">
+                <a:solidFill>
+                  <a:srgbClr val="009bdd"/>
+                </a:solidFill>
+                <a:uFillTx/>
+                <a:latin typeface="Arial"/>
+              </a:rPr>
+              <a:t>Činjenica da sam koristio monospace font u tablici, izgleda, ne pomaže.</a:t>
+            </a:r>
+            <a:endParaRPr b="0" lang="bs-BA" sz="2200" strike="noStrike" u="none">
+              <a:solidFill>
+                <a:srgbClr val="009bdd"/>
+              </a:solidFill>
+              <a:uFillTx/>
+              <a:latin typeface="Arial"/>
+            </a:endParaRPr>
+          </a:p>
+          <a:p>
+            <a:pPr marL="432000" indent="-324000">
+              <a:spcBef>
+                <a:spcPts val="1060"/>
+              </a:spcBef>
+              <a:buClr>
+                <a:srgbClr val="77caee"/>
+              </a:buClr>
+              <a:buSzPct val="45000"/>
+              <a:buFont typeface="Wingdings" charset="2"/>
+              <a:buChar char=""/>
+            </a:pPr>
+            <a:r>
+              <a:rPr b="0" lang="bs-BA" sz="2200" strike="noStrike" u="none">
+                <a:solidFill>
+                  <a:srgbClr val="009bdd"/>
+                </a:solidFill>
+                <a:uFillTx/>
+                <a:latin typeface="Arial"/>
+              </a:rPr>
+              <a:t>Vjerujemo da je u modernim internetskim preglednicima (Firefox 69, Chrome 52...) to moguće riješiti CSS-om (naredba “</a:t>
+            </a:r>
+            <a:r>
+              <a:rPr b="0" i="1" lang="bs-BA" sz="2200" strike="noStrike" u="none">
+                <a:solidFill>
+                  <a:srgbClr val="009bdd"/>
+                </a:solidFill>
+                <a:uFillTx/>
+                <a:latin typeface="Arial"/>
+              </a:rPr>
+              <a:t>contain: layout</a:t>
+            </a:r>
+            <a:r>
+              <a:rPr b="0" lang="bs-BA" sz="2200" strike="noStrike" u="none">
+                <a:solidFill>
+                  <a:srgbClr val="009bdd"/>
+                </a:solidFill>
+                <a:uFillTx/>
+                <a:latin typeface="Arial"/>
+              </a:rPr>
+              <a:t>” i njoj srodne) i da će to i biti u nekoj budućoj verziji ovog simulatora. Ali, for the time being, postoji checkbox kojim se program može donekle ubrzati. Uostalom, to rješenje sa checkboxom funkcionira i u Firefoxu 52 (koji ne podržava “</a:t>
+            </a:r>
+            <a:r>
+              <a:rPr b="0" i="1" lang="bs-BA" sz="2200" strike="noStrike" u="none">
+                <a:solidFill>
+                  <a:srgbClr val="009bdd"/>
+                </a:solidFill>
+                <a:uFillTx/>
+                <a:latin typeface="Arial"/>
+              </a:rPr>
+              <a:t>contain: layout</a:t>
+            </a:r>
+            <a:r>
+              <a:rPr b="0" lang="bs-BA" sz="2200" strike="noStrike" u="none">
+                <a:solidFill>
+                  <a:srgbClr val="009bdd"/>
+                </a:solidFill>
+                <a:uFillTx/>
+                <a:latin typeface="Arial"/>
+              </a:rPr>
+              <a:t>” i njoj srodne naredbe).</a:t>
+            </a:r>
+            <a:endParaRPr b="0" lang="bs-BA" sz="2200" strike="noStrike" u="none">
+              <a:solidFill>
+                <a:srgbClr val="009bdd"/>
+              </a:solidFill>
+              <a:uFillTx/>
+              <a:latin typeface="Arial"/>
+            </a:endParaRPr>
+          </a:p>
         </p:txBody>
       </p:sp>
       <p:sp>
@@ -4917,7 +4942,7 @@
         <p:txBody>
           <a:bodyPr/>
           <a:p>
-            <a:fld id="{5EB9A239-B242-4C27-9310-AD239A8570DE}" type="slidenum">
+            <a:fld id="{7411084D-123B-45A5-930F-F4B8B5A63BCA}" type="slidenum">
               <a:t>15</a:t>
             </a:fld>
           </a:p>
@@ -4937,9 +4962,9 @@
         <p:txBody>
           <a:bodyPr/>
           <a:p>
-            <a:fld id="{F6D3B875-DB34-495B-BB66-EF3902CE0D40}" type="datetime1">
+            <a:fld id="{DE825E2D-BFD3-40A5-9EDE-36988109AC7B}" type="datetime1">
               <a:rPr lang="en-US"/>
-              <a:t>03/24/2025</a:t>
+              <a:t>04/01/2025</a:t>
             </a:fld>
           </a:p>
         </p:txBody>
@@ -4976,7 +5001,7 @@
       </p:grpSpPr>
       <p:sp>
         <p:nvSpPr>
-          <p:cNvPr id="71" name="PlaceHolder 1"/>
+          <p:cNvPr id="72" name="PlaceHolder 1"/>
           <p:cNvSpPr>
             <a:spLocks noGrp="1"/>
           </p:cNvSpPr>
@@ -5013,7 +5038,7 @@
                 <a:uFillTx/>
                 <a:latin typeface="Arial"/>
               </a:rPr>
-              <a:t>Kako se koristi...</a:t>
+              <a:t>Je li simulacija UART-a realna?</a:t>
             </a:r>
             <a:endParaRPr b="0" lang="bs-BA" sz="3300" strike="noStrike" u="none">
               <a:solidFill>
@@ -5027,7 +5052,7 @@
       </p:sp>
       <p:sp>
         <p:nvSpPr>
-          <p:cNvPr id="72" name="PlaceHolder 2"/>
+          <p:cNvPr id="73" name="PlaceHolder 2"/>
           <p:cNvSpPr>
             <a:spLocks noGrp="1"/>
           </p:cNvSpPr>
@@ -5037,8 +5062,8 @@
         </p:nvSpPr>
         <p:spPr>
           <a:xfrm>
-            <a:off x="5155920" y="1080000"/>
-            <a:ext cx="4567320" cy="3600000"/>
+            <a:off x="360000" y="1080000"/>
+            <a:ext cx="9360000" cy="3600000"/>
           </a:xfrm>
           <a:prstGeom prst="rect">
             <a:avLst/>
@@ -5072,17 +5097,7 @@
                 <a:uFillTx/>
                 <a:latin typeface="Arial"/>
               </a:rPr>
-              <a:t>Asembler podržava ono što se očekuje od današnjeg asemblera: aritmetičke izraze u konstantama, if-grananje, if-else grananje i while-petlje. </a:t>
-            </a:r>
-            <a:r>
-              <a:rPr b="0" i="1" lang="bs-BA" sz="2400" strike="noStrike" u="none">
-                <a:solidFill>
-                  <a:srgbClr val="009bdd"/>
-                </a:solidFill>
-                <a:uFillTx/>
-                <a:latin typeface="Arial"/>
-              </a:rPr>
-              <a:t>Svaki asembler ujedno je i interpreter.</a:t>
+              <a:t>Program “Decimal to Binary” nisam uspio pokrenuti na pravom PicoBlazeu, a nisam uspio ni dijagnosticirati problem. Tako da ga ne treba uzeti kao sigurno dobar primjer kako se na PicoBlazeu koristi UART.</a:t>
             </a:r>
             <a:endParaRPr b="0" lang="bs-BA" sz="2400" strike="noStrike" u="none">
               <a:solidFill>
@@ -5092,62 +5107,8 @@
               <a:latin typeface="Arial"/>
             </a:endParaRPr>
           </a:p>
-          <a:p>
-            <a:pPr marL="432000" indent="-324000">
-              <a:spcBef>
-                <a:spcPts val="1060"/>
-              </a:spcBef>
-              <a:buClr>
-                <a:srgbClr val="77caee"/>
-              </a:buClr>
-              <a:buSzPct val="45000"/>
-              <a:buFont typeface="Wingdings" charset="2"/>
-              <a:buChar char=""/>
-            </a:pPr>
-            <a:r>
-              <a:rPr b="0" lang="bs-BA" sz="2400" strike="noStrike" u="none">
-                <a:solidFill>
-                  <a:srgbClr val="009bdd"/>
-                </a:solidFill>
-                <a:uFillTx/>
-                <a:latin typeface="Arial"/>
-              </a:rPr>
-              <a:t>Primjer “Preprocessor Test” ispisuje Fibonaccijeve brojeve manje od 100 za vrijeme asembliranja.</a:t>
-            </a:r>
-            <a:endParaRPr b="0" lang="bs-BA" sz="2400" strike="noStrike" u="none">
-              <a:solidFill>
-                <a:srgbClr val="009bdd"/>
-              </a:solidFill>
-              <a:uFillTx/>
-              <a:latin typeface="Arial"/>
-            </a:endParaRPr>
-          </a:p>
-        </p:txBody>
-      </p:sp>
-      <p:pic>
-        <p:nvPicPr>
-          <p:cNvPr id="73" name="" descr=""/>
-          <p:cNvPicPr/>
-          <p:nvPr/>
-        </p:nvPicPr>
-        <p:blipFill>
-          <a:blip r:embed="rId1"/>
-          <a:stretch/>
-        </p:blipFill>
-        <p:spPr>
-          <a:xfrm>
-            <a:off x="228600" y="983160"/>
-            <a:ext cx="4671000" cy="3817440"/>
-          </a:xfrm>
-          <a:prstGeom prst="rect">
-            <a:avLst/>
-          </a:prstGeom>
-          <a:noFill/>
-          <a:ln w="18000">
-            <a:noFill/>
-          </a:ln>
-        </p:spPr>
-      </p:pic>
+        </p:txBody>
+      </p:sp>
       <p:sp>
         <p:nvSpPr>
           <p:cNvPr id="4" name="PlaceHolder 3"/>
@@ -5162,7 +5123,7 @@
         <p:txBody>
           <a:bodyPr/>
           <a:p>
-            <a:fld id="{172B0059-090D-4311-93BE-67DAC4E6C5A2}" type="slidenum">
+            <a:fld id="{E6FAD8C0-8C8B-4F2C-85BF-A18FC775A61E}" type="slidenum">
               <a:t>16</a:t>
             </a:fld>
           </a:p>
@@ -5182,9 +5143,9 @@
         <p:txBody>
           <a:bodyPr/>
           <a:p>
-            <a:fld id="{1822ECF2-37E9-4127-90AD-85BFD22DADD9}" type="datetime1">
+            <a:fld id="{D9692F91-8DC3-4259-A108-F6A18B6D7DF4}" type="datetime1">
               <a:rPr lang="en-US"/>
-              <a:t>03/24/2025</a:t>
+              <a:t>04/01/2025</a:t>
             </a:fld>
           </a:p>
         </p:txBody>
@@ -5258,7 +5219,7 @@
                 <a:uFillTx/>
                 <a:latin typeface="Arial"/>
               </a:rPr>
-              <a:t>Nedostatci predprocesora</a:t>
+              <a:t>Kako se koristi...</a:t>
             </a:r>
             <a:endParaRPr b="0" lang="bs-BA" sz="3300" strike="noStrike" u="none">
               <a:solidFill>
@@ -5282,8 +5243,8 @@
         </p:nvSpPr>
         <p:spPr>
           <a:xfrm>
-            <a:off x="360000" y="1080000"/>
-            <a:ext cx="9360000" cy="3600000"/>
+            <a:off x="5155920" y="1080000"/>
+            <a:ext cx="4567320" cy="3600000"/>
           </a:xfrm>
           <a:prstGeom prst="rect">
             <a:avLst/>
@@ -5317,7 +5278,17 @@
                 <a:uFillTx/>
                 <a:latin typeface="Arial"/>
               </a:rPr>
-              <a:t>Ne podržava makro-naredbe.</a:t>
+              <a:t>Asembler podržava ono što se očekuje od današnjeg asemblera: aritmetičke izraze u konstantama, if-grananje, if-else grananje i while-petlje. </a:t>
+            </a:r>
+            <a:r>
+              <a:rPr b="0" i="1" lang="bs-BA" sz="2400" strike="noStrike" u="none">
+                <a:solidFill>
+                  <a:srgbClr val="009bdd"/>
+                </a:solidFill>
+                <a:uFillTx/>
+                <a:latin typeface="Arial"/>
+              </a:rPr>
+              <a:t>Svaki asembler ujedno je i interpreter.</a:t>
             </a:r>
             <a:endParaRPr b="0" lang="bs-BA" sz="2400" strike="noStrike" u="none">
               <a:solidFill>
@@ -5347,137 +5318,7 @@
                 <a:uFillTx/>
                 <a:latin typeface="Arial"/>
               </a:rPr>
-              <a:t>Postoji neki neobičan bug u pretprocesoru da naredba “</a:t>
-            </a:r>
-            <a:r>
-              <a:rPr b="0" i="1" lang="bs-BA" sz="2400" strike="noStrike" u="none">
-                <a:solidFill>
-                  <a:srgbClr val="009bdd"/>
-                </a:solidFill>
-                <a:uFillTx/>
-                <a:latin typeface="Arial"/>
-              </a:rPr>
-              <a:t>display a</a:t>
-            </a:r>
-            <a:r>
-              <a:rPr b="0" lang="bs-BA" sz="2400" strike="noStrike" u="none">
-                <a:solidFill>
-                  <a:srgbClr val="009bdd"/>
-                </a:solidFill>
-                <a:uFillTx/>
-                <a:latin typeface="Arial"/>
-              </a:rPr>
-              <a:t>”(novi red) ne radi kada je simulacija UART-a isključena.</a:t>
-            </a:r>
-            <a:endParaRPr b="0" lang="bs-BA" sz="2400" strike="noStrike" u="none">
-              <a:solidFill>
-                <a:srgbClr val="009bdd"/>
-              </a:solidFill>
-              <a:uFillTx/>
-              <a:latin typeface="Arial"/>
-            </a:endParaRPr>
-          </a:p>
-          <a:p>
-            <a:pPr marL="432000" indent="-324000">
-              <a:spcBef>
-                <a:spcPts val="1060"/>
-              </a:spcBef>
-              <a:buClr>
-                <a:srgbClr val="77caee"/>
-              </a:buClr>
-              <a:buSzPct val="45000"/>
-              <a:buFont typeface="Wingdings" charset="2"/>
-              <a:buChar char=""/>
-            </a:pPr>
-            <a:r>
-              <a:rPr b="0" lang="bs-BA" sz="2400" strike="noStrike" u="none">
-                <a:solidFill>
-                  <a:srgbClr val="009bdd"/>
-                </a:solidFill>
-                <a:uFillTx/>
-                <a:latin typeface="Arial"/>
-              </a:rPr>
-              <a:t>U </a:t>
-            </a:r>
-            <a:r>
-              <a:rPr b="0" i="1" lang="bs-BA" sz="2400" strike="noStrike" u="none">
-                <a:solidFill>
-                  <a:srgbClr val="009bdd"/>
-                </a:solidFill>
-                <a:uFillTx/>
-                <a:latin typeface="Arial"/>
-              </a:rPr>
-              <a:t>if</a:t>
-            </a:r>
-            <a:r>
-              <a:rPr b="0" lang="bs-BA" sz="2400" strike="noStrike" u="none">
-                <a:solidFill>
-                  <a:srgbClr val="009bdd"/>
-                </a:solidFill>
-                <a:uFillTx/>
-                <a:latin typeface="Arial"/>
-              </a:rPr>
-              <a:t>-grananjima, </a:t>
-            </a:r>
-            <a:r>
-              <a:rPr b="0" i="1" lang="bs-BA" sz="2400" strike="noStrike" u="none">
-                <a:solidFill>
-                  <a:srgbClr val="009bdd"/>
-                </a:solidFill>
-                <a:uFillTx/>
-                <a:latin typeface="Arial"/>
-              </a:rPr>
-              <a:t>if-else</a:t>
-            </a:r>
-            <a:r>
-              <a:rPr b="0" lang="bs-BA" sz="2400" strike="noStrike" u="none">
-                <a:solidFill>
-                  <a:srgbClr val="009bdd"/>
-                </a:solidFill>
-                <a:uFillTx/>
-                <a:latin typeface="Arial"/>
-              </a:rPr>
-              <a:t>-grananjima i </a:t>
-            </a:r>
-            <a:r>
-              <a:rPr b="0" i="1" lang="bs-BA" sz="2400" strike="noStrike" u="none">
-                <a:solidFill>
-                  <a:srgbClr val="009bdd"/>
-                </a:solidFill>
-                <a:uFillTx/>
-                <a:latin typeface="Arial"/>
-              </a:rPr>
-              <a:t>while</a:t>
-            </a:r>
-            <a:r>
-              <a:rPr b="0" lang="bs-BA" sz="2400" strike="noStrike" u="none">
-                <a:solidFill>
-                  <a:srgbClr val="009bdd"/>
-                </a:solidFill>
-                <a:uFillTx/>
-                <a:latin typeface="Arial"/>
-              </a:rPr>
-              <a:t>-petljama ne mogu se nalaziti mnemonike niti pretprocesorska naredba </a:t>
-            </a:r>
-            <a:r>
-              <a:rPr b="0" i="1" lang="bs-BA" sz="2400" strike="noStrike" u="none">
-                <a:solidFill>
-                  <a:srgbClr val="009bdd"/>
-                </a:solidFill>
-                <a:uFillTx/>
-                <a:latin typeface="Arial"/>
-              </a:rPr>
-              <a:t>address</a:t>
-            </a:r>
-            <a:r>
-              <a:rPr b="0" lang="bs-BA" sz="2400" strike="noStrike" u="none">
-                <a:solidFill>
-                  <a:srgbClr val="009bdd"/>
-                </a:solidFill>
-                <a:uFillTx/>
-                <a:latin typeface="Arial"/>
-              </a:rPr>
-              <a:t>. To je zato jer bi se, da se te stvari omoguće, znatno zakomplicirao pretprocesor i bilo bi lagano nenamjerno napraviti beskonačnu petlju za vrijeme pretprocesiranja:</a:t>
+              <a:t>Primjer “Preprocessor Test” ispisuje Fibonaccijeve brojeve manje od 100 za vrijeme asembliranja.</a:t>
             </a:r>
             <a:endParaRPr b="0" lang="bs-BA" sz="2400" strike="noStrike" u="none">
               <a:solidFill>
@@ -5501,8 +5342,8 @@
         </p:blipFill>
         <p:spPr>
           <a:xfrm>
-            <a:off x="685800" y="4100040"/>
-            <a:ext cx="2293200" cy="929160"/>
+            <a:off x="228600" y="983160"/>
+            <a:ext cx="4671000" cy="3817440"/>
           </a:xfrm>
           <a:prstGeom prst="rect">
             <a:avLst/>
@@ -5527,7 +5368,7 @@
         <p:txBody>
           <a:bodyPr/>
           <a:p>
-            <a:fld id="{E52B7852-0970-4BF6-9590-694972713DB3}" type="slidenum">
+            <a:fld id="{D87D285D-4CC5-45EE-AC5A-A22C1B319248}" type="slidenum">
               <a:t>17</a:t>
             </a:fld>
           </a:p>
@@ -5547,9 +5388,9 @@
         <p:txBody>
           <a:bodyPr/>
           <a:p>
-            <a:fld id="{6D0DAD7E-2B94-43B2-91D8-9E0E4BC03475}" type="datetime1">
+            <a:fld id="{255E6BDB-3002-47FE-94D5-75B04A461D03}" type="datetime1">
               <a:rPr lang="en-US"/>
-              <a:t>03/24/2025</a:t>
+              <a:t>04/01/2025</a:t>
             </a:fld>
           </a:p>
         </p:txBody>
@@ -5623,7 +5464,7 @@
                 <a:uFillTx/>
                 <a:latin typeface="Arial"/>
               </a:rPr>
-              <a:t>Nedostatci simulatora</a:t>
+              <a:t>Nedostatci predprocesora</a:t>
             </a:r>
             <a:endParaRPr b="0" lang="bs-BA" sz="3300" strike="noStrike" u="none">
               <a:solidFill>
@@ -5682,7 +5523,37 @@
                 <a:uFillTx/>
                 <a:latin typeface="Arial"/>
               </a:rPr>
-              <a:t>Ne znam kako se zastavice na pravom PicoBlazeu ponašaju kad se promijeni regbanka. U svoj simulator PicoBlazea uprogramirao sam da svaka regbanka ima zasebne zastavice carry i zero (kao na Z80), ali moguće je da to nije tako. To bi se trebalo moći provjeriti pomoću programa “</a:t>
+              <a:t>Ne podržava makro-naredbe.</a:t>
+            </a:r>
+            <a:endParaRPr b="0" lang="bs-BA" sz="2400" strike="noStrike" u="none">
+              <a:solidFill>
+                <a:srgbClr val="009bdd"/>
+              </a:solidFill>
+              <a:uFillTx/>
+              <a:latin typeface="Arial"/>
+            </a:endParaRPr>
+          </a:p>
+          <a:p>
+            <a:pPr marL="432000" indent="-324000">
+              <a:spcBef>
+                <a:spcPts val="1060"/>
+              </a:spcBef>
+              <a:buClr>
+                <a:srgbClr val="77caee"/>
+              </a:buClr>
+              <a:buSzPct val="45000"/>
+              <a:buFont typeface="Wingdings" charset="2"/>
+              <a:buChar char=""/>
+            </a:pPr>
+            <a:r>
+              <a:rPr b="0" lang="bs-BA" sz="2400" strike="noStrike" u="none">
+                <a:solidFill>
+                  <a:srgbClr val="009bdd"/>
+                </a:solidFill>
+                <a:uFillTx/>
+                <a:latin typeface="Arial"/>
+              </a:rPr>
+              <a:t>Postoji neki neobičan bug u pretprocesoru da naredba “</a:t>
             </a:r>
             <a:r>
               <a:rPr b="0" i="1" lang="bs-BA" sz="2400" strike="noStrike" u="none">
@@ -5692,7 +5563,7 @@
                 <a:uFillTx/>
                 <a:latin typeface="Arial"/>
               </a:rPr>
-              <a:t>Regbanks-Flags Test</a:t>
+              <a:t>display a</a:t>
             </a:r>
             <a:r>
               <a:rPr b="0" lang="bs-BA" sz="2400" strike="noStrike" u="none">
@@ -5702,7 +5573,117 @@
                 <a:uFillTx/>
                 <a:latin typeface="Arial"/>
               </a:rPr>
-              <a:t>”.</a:t>
+              <a:t>”(novi red) ne radi kada je simulacija UART-a isključena.</a:t>
+            </a:r>
+            <a:endParaRPr b="0" lang="bs-BA" sz="2400" strike="noStrike" u="none">
+              <a:solidFill>
+                <a:srgbClr val="009bdd"/>
+              </a:solidFill>
+              <a:uFillTx/>
+              <a:latin typeface="Arial"/>
+            </a:endParaRPr>
+          </a:p>
+          <a:p>
+            <a:pPr marL="432000" indent="-324000">
+              <a:spcBef>
+                <a:spcPts val="1060"/>
+              </a:spcBef>
+              <a:buClr>
+                <a:srgbClr val="77caee"/>
+              </a:buClr>
+              <a:buSzPct val="45000"/>
+              <a:buFont typeface="Wingdings" charset="2"/>
+              <a:buChar char=""/>
+            </a:pPr>
+            <a:r>
+              <a:rPr b="0" lang="bs-BA" sz="2400" strike="noStrike" u="none">
+                <a:solidFill>
+                  <a:srgbClr val="009bdd"/>
+                </a:solidFill>
+                <a:uFillTx/>
+                <a:latin typeface="Arial"/>
+              </a:rPr>
+              <a:t>U </a:t>
+            </a:r>
+            <a:r>
+              <a:rPr b="0" i="1" lang="bs-BA" sz="2400" strike="noStrike" u="none">
+                <a:solidFill>
+                  <a:srgbClr val="009bdd"/>
+                </a:solidFill>
+                <a:uFillTx/>
+                <a:latin typeface="Arial"/>
+              </a:rPr>
+              <a:t>if</a:t>
+            </a:r>
+            <a:r>
+              <a:rPr b="0" lang="bs-BA" sz="2400" strike="noStrike" u="none">
+                <a:solidFill>
+                  <a:srgbClr val="009bdd"/>
+                </a:solidFill>
+                <a:uFillTx/>
+                <a:latin typeface="Arial"/>
+              </a:rPr>
+              <a:t>-grananjima, </a:t>
+            </a:r>
+            <a:r>
+              <a:rPr b="0" i="1" lang="bs-BA" sz="2400" strike="noStrike" u="none">
+                <a:solidFill>
+                  <a:srgbClr val="009bdd"/>
+                </a:solidFill>
+                <a:uFillTx/>
+                <a:latin typeface="Arial"/>
+              </a:rPr>
+              <a:t>if-else</a:t>
+            </a:r>
+            <a:r>
+              <a:rPr b="0" lang="bs-BA" sz="2400" strike="noStrike" u="none">
+                <a:solidFill>
+                  <a:srgbClr val="009bdd"/>
+                </a:solidFill>
+                <a:uFillTx/>
+                <a:latin typeface="Arial"/>
+              </a:rPr>
+              <a:t>-grananjima i </a:t>
+            </a:r>
+            <a:r>
+              <a:rPr b="0" i="1" lang="bs-BA" sz="2400" strike="noStrike" u="none">
+                <a:solidFill>
+                  <a:srgbClr val="009bdd"/>
+                </a:solidFill>
+                <a:uFillTx/>
+                <a:latin typeface="Arial"/>
+              </a:rPr>
+              <a:t>while</a:t>
+            </a:r>
+            <a:r>
+              <a:rPr b="0" lang="bs-BA" sz="2400" strike="noStrike" u="none">
+                <a:solidFill>
+                  <a:srgbClr val="009bdd"/>
+                </a:solidFill>
+                <a:uFillTx/>
+                <a:latin typeface="Arial"/>
+              </a:rPr>
+              <a:t>-petljama ne mogu se nalaziti mnemonike niti pretprocesorska naredba </a:t>
+            </a:r>
+            <a:r>
+              <a:rPr b="0" i="1" lang="bs-BA" sz="2400" strike="noStrike" u="none">
+                <a:solidFill>
+                  <a:srgbClr val="009bdd"/>
+                </a:solidFill>
+                <a:uFillTx/>
+                <a:latin typeface="Arial"/>
+              </a:rPr>
+              <a:t>address</a:t>
+            </a:r>
+            <a:r>
+              <a:rPr b="0" lang="bs-BA" sz="2400" strike="noStrike" u="none">
+                <a:solidFill>
+                  <a:srgbClr val="009bdd"/>
+                </a:solidFill>
+                <a:uFillTx/>
+                <a:latin typeface="Arial"/>
+              </a:rPr>
+              <a:t>. To je zato jer bi se, da se te stvari omoguće, znatno zakomplicirao pretprocesor i bilo bi lagano nenamjerno napraviti beskonačnu petlju za vrijeme pretprocesiranja:</a:t>
             </a:r>
             <a:endParaRPr b="0" lang="bs-BA" sz="2400" strike="noStrike" u="none">
               <a:solidFill>
@@ -5726,8 +5707,8 @@
         </p:blipFill>
         <p:spPr>
           <a:xfrm>
-            <a:off x="709200" y="2971800"/>
-            <a:ext cx="1576800" cy="1371240"/>
+            <a:off x="685800" y="4100040"/>
+            <a:ext cx="2293200" cy="929160"/>
           </a:xfrm>
           <a:prstGeom prst="rect">
             <a:avLst/>
@@ -5752,7 +5733,7 @@
         <p:txBody>
           <a:bodyPr/>
           <a:p>
-            <a:fld id="{AE00E52E-E1AE-443D-85D3-409C3DB2DDEA}" type="slidenum">
+            <a:fld id="{1C0ADA6F-DECF-4F22-BE27-8D2495603A84}" type="slidenum">
               <a:t>18</a:t>
             </a:fld>
           </a:p>
@@ -5772,9 +5753,9 @@
         <p:txBody>
           <a:bodyPr/>
           <a:p>
-            <a:fld id="{7999964E-4A5E-4C52-B694-CDCEA03FB2DF}" type="datetime1">
+            <a:fld id="{DB40D812-C911-424C-A9A8-5546FD456456}" type="datetime1">
               <a:rPr lang="en-US"/>
-              <a:t>03/24/2025</a:t>
+              <a:t>04/01/2025</a:t>
             </a:fld>
           </a:p>
         </p:txBody>
@@ -5848,7 +5829,7 @@
                 <a:uFillTx/>
                 <a:latin typeface="Arial"/>
               </a:rPr>
-              <a:t>Out in the wild...</a:t>
+              <a:t>Nedostatci simulatora</a:t>
             </a:r>
             <a:endParaRPr b="0" lang="bs-BA" sz="3300" strike="noStrike" u="none">
               <a:solidFill>
@@ -5900,16 +5881,36 @@
               <a:buChar char=""/>
             </a:pPr>
             <a:r>
-              <a:rPr b="0" lang="bs-BA" sz="2200" strike="noStrike" u="none">
-                <a:solidFill>
-                  <a:srgbClr val="009bdd"/>
-                </a:solidFill>
-                <a:uFillTx/>
-                <a:latin typeface="Arial"/>
-              </a:rPr>
-              <a:t>Moj se program koristi na fakultetu u Argentini za uvod u ugrađene sustave.</a:t>
-            </a:r>
-            <a:endParaRPr b="0" lang="bs-BA" sz="2200" strike="noStrike" u="none">
+              <a:rPr b="0" lang="bs-BA" sz="2400" strike="noStrike" u="none">
+                <a:solidFill>
+                  <a:srgbClr val="009bdd"/>
+                </a:solidFill>
+                <a:uFillTx/>
+                <a:latin typeface="Arial"/>
+              </a:rPr>
+              <a:t>Ne znam kako se zastavice na pravom PicoBlazeu ponašaju kad se promijeni regbanka. U svoj simulator PicoBlazea uprogramirao sam da svaka regbanka ima zasebne zastavice carry i zero (kao na Z80), ali moguće je da to nije tako. To bi se trebalo moći provjeriti pomoću programa “</a:t>
+            </a:r>
+            <a:r>
+              <a:rPr b="0" i="1" lang="bs-BA" sz="2400" strike="noStrike" u="none">
+                <a:solidFill>
+                  <a:srgbClr val="009bdd"/>
+                </a:solidFill>
+                <a:uFillTx/>
+                <a:latin typeface="Arial"/>
+              </a:rPr>
+              <a:t>Regbanks-Flags Test</a:t>
+            </a:r>
+            <a:r>
+              <a:rPr b="0" lang="bs-BA" sz="2400" strike="noStrike" u="none">
+                <a:solidFill>
+                  <a:srgbClr val="009bdd"/>
+                </a:solidFill>
+                <a:uFillTx/>
+                <a:latin typeface="Arial"/>
+              </a:rPr>
+              <a:t>”.</a:t>
+            </a:r>
+            <a:endParaRPr b="0" lang="bs-BA" sz="2400" strike="noStrike" u="none">
               <a:solidFill>
                 <a:srgbClr val="009bdd"/>
               </a:solidFill>
@@ -5917,128 +5918,32 @@
               <a:latin typeface="Arial"/>
             </a:endParaRPr>
           </a:p>
-          <a:p>
-            <a:pPr marL="432000" indent="-324000">
-              <a:spcBef>
-                <a:spcPts val="1060"/>
-              </a:spcBef>
-              <a:buClr>
-                <a:srgbClr val="77caee"/>
-              </a:buClr>
-              <a:buSzPct val="45000"/>
-              <a:buFont typeface="Wingdings" charset="2"/>
-              <a:buChar char=""/>
-            </a:pPr>
-            <a:r>
-              <a:rPr b="0" lang="bs-BA" sz="2200" strike="noStrike" u="none">
-                <a:solidFill>
-                  <a:srgbClr val="009bdd"/>
-                </a:solidFill>
-                <a:uFillTx/>
-                <a:latin typeface="Arial"/>
-              </a:rPr>
-              <a:t>Nedavno sam dobio kontributora s tog fakulteta koji se zove Agustin Izaguirre (</a:t>
-            </a:r>
-            <a:r>
-              <a:rPr b="0" i="1" lang="bs-BA" sz="2200" strike="noStrike" u="none">
-                <a:solidFill>
-                  <a:srgbClr val="009bdd"/>
-                </a:solidFill>
-                <a:uFillTx/>
-                <a:latin typeface="Arial"/>
-              </a:rPr>
-              <a:t>agustiza</a:t>
-            </a:r>
-            <a:r>
-              <a:rPr b="0" lang="bs-BA" sz="2200" strike="noStrike" u="none">
-                <a:solidFill>
-                  <a:srgbClr val="009bdd"/>
-                </a:solidFill>
-                <a:uFillTx/>
-                <a:latin typeface="Arial"/>
-              </a:rPr>
-              <a:t>). On je napravio nekoliko pull requestova na GitHubu, isprva sitni bug-fixi (prvo da se naredba SRA ponaša ispravno kad je </a:t>
-            </a:r>
-            <a:r>
-              <a:rPr b="0" i="1" lang="bs-BA" sz="2200" strike="noStrike" u="none">
-                <a:solidFill>
-                  <a:srgbClr val="009bdd"/>
-                </a:solidFill>
-                <a:uFillTx/>
-                <a:latin typeface="Arial"/>
-              </a:rPr>
-              <a:t>carry flag</a:t>
-            </a:r>
-            <a:r>
-              <a:rPr b="0" lang="bs-BA" sz="2200" strike="noStrike" u="none">
-                <a:solidFill>
-                  <a:srgbClr val="009bdd"/>
-                </a:solidFill>
-                <a:uFillTx/>
-                <a:latin typeface="Arial"/>
-              </a:rPr>
-              <a:t> postavljen u jedinicu), a onda i dodavanje novih featuresa kao što su JEST testovi.</a:t>
-            </a:r>
-            <a:endParaRPr b="0" lang="bs-BA" sz="2200" strike="noStrike" u="none">
-              <a:solidFill>
-                <a:srgbClr val="009bdd"/>
-              </a:solidFill>
-              <a:uFillTx/>
-              <a:latin typeface="Arial"/>
-            </a:endParaRPr>
-          </a:p>
-          <a:p>
-            <a:pPr marL="432000" indent="-324000">
-              <a:spcBef>
-                <a:spcPts val="1060"/>
-              </a:spcBef>
-              <a:buClr>
-                <a:srgbClr val="77caee"/>
-              </a:buClr>
-              <a:buSzPct val="45000"/>
-              <a:buFont typeface="Wingdings" charset="2"/>
-              <a:buChar char=""/>
-            </a:pPr>
-            <a:r>
-              <a:rPr b="0" lang="bs-BA" sz="2200" strike="noStrike" u="none">
-                <a:solidFill>
-                  <a:srgbClr val="009bdd"/>
-                </a:solidFill>
-                <a:uFillTx/>
-                <a:latin typeface="Arial"/>
-              </a:rPr>
-              <a:t>JEST testira tokenizer, parser, asembler, jezgru simulatora i evaluator aritmetičkih izraza. Međutim, </a:t>
-            </a:r>
-            <a:r>
-              <a:rPr b="0" i="1" lang="bs-BA" sz="2200" strike="noStrike" u="none">
-                <a:solidFill>
-                  <a:srgbClr val="009bdd"/>
-                </a:solidFill>
-                <a:uFillTx/>
-                <a:latin typeface="Arial"/>
-              </a:rPr>
-              <a:t>test coverage</a:t>
-            </a:r>
-            <a:r>
-              <a:rPr b="0" lang="bs-BA" sz="2200" strike="noStrike" u="none">
-                <a:solidFill>
-                  <a:srgbClr val="009bdd"/>
-                </a:solidFill>
-                <a:uFillTx/>
-                <a:latin typeface="Arial"/>
-              </a:rPr>
-              <a:t> je još uvijek nizak i contributori se još uvijek moraju oslanjati na ručno testiranje.</a:t>
-            </a:r>
-            <a:endParaRPr b="0" lang="bs-BA" sz="2200" strike="noStrike" u="none">
-              <a:solidFill>
-                <a:srgbClr val="009bdd"/>
-              </a:solidFill>
-              <a:uFillTx/>
-              <a:latin typeface="Arial"/>
-            </a:endParaRPr>
-          </a:p>
-        </p:txBody>
-      </p:sp>
+        </p:txBody>
+      </p:sp>
+      <p:pic>
+        <p:nvPicPr>
+          <p:cNvPr id="82" name="" descr=""/>
+          <p:cNvPicPr/>
+          <p:nvPr/>
+        </p:nvPicPr>
+        <p:blipFill>
+          <a:blip r:embed="rId1"/>
+          <a:stretch/>
+        </p:blipFill>
+        <p:spPr>
+          <a:xfrm>
+            <a:off x="709200" y="2971800"/>
+            <a:ext cx="1576800" cy="1371240"/>
+          </a:xfrm>
+          <a:prstGeom prst="rect">
+            <a:avLst/>
+          </a:prstGeom>
+          <a:noFill/>
+          <a:ln w="18000">
+            <a:noFill/>
+          </a:ln>
+        </p:spPr>
+      </p:pic>
       <p:sp>
         <p:nvSpPr>
           <p:cNvPr id="4" name="PlaceHolder 3"/>
@@ -6053,7 +5958,7 @@
         <p:txBody>
           <a:bodyPr/>
           <a:p>
-            <a:fld id="{14B6EDB3-09C0-4802-A14B-76D4E2B48C58}" type="slidenum">
+            <a:fld id="{96F630F1-26A9-42AB-9F56-74E3F6C7618A}" type="slidenum">
               <a:t>19</a:t>
             </a:fld>
           </a:p>
@@ -6073,9 +5978,9 @@
         <p:txBody>
           <a:bodyPr/>
           <a:p>
-            <a:fld id="{86266B98-42AA-4FA5-A46C-2C1B3F6EB64B}" type="datetime1">
+            <a:fld id="{1DF28D8D-4EF2-4C0E-9A59-460F04F2FAA6}" type="datetime1">
               <a:rPr lang="en-US"/>
-              <a:t>03/24/2025</a:t>
+              <a:t>04/01/2025</a:t>
             </a:fld>
           </a:p>
         </p:txBody>
@@ -6414,7 +6319,7 @@
         <p:txBody>
           <a:bodyPr/>
           <a:p>
-            <a:fld id="{ED5C072C-E8AE-4968-9275-8420BF0D7769}" type="slidenum">
+            <a:fld id="{F5C9D8FE-ACF0-4CC7-BF04-9983D63DFF2A}" type="slidenum">
               <a:t>2</a:t>
             </a:fld>
           </a:p>
@@ -6434,9 +6339,9 @@
         <p:txBody>
           <a:bodyPr/>
           <a:p>
-            <a:fld id="{BB6C78E3-C385-49B6-8D87-9D36EFFD6391}" type="datetime1">
+            <a:fld id="{84A0F887-7323-49CE-A779-536778ED8B6A}" type="datetime1">
               <a:rPr lang="en-US"/>
-              <a:t>03/24/2025</a:t>
+              <a:t>04/01/2025</a:t>
             </a:fld>
           </a:p>
         </p:txBody>
@@ -6473,7 +6378,7 @@
       </p:grpSpPr>
       <p:sp>
         <p:nvSpPr>
-          <p:cNvPr id="82" name="PlaceHolder 1"/>
+          <p:cNvPr id="83" name="PlaceHolder 1"/>
           <p:cNvSpPr>
             <a:spLocks noGrp="1"/>
           </p:cNvSpPr>
@@ -6510,7 +6415,7 @@
                 <a:uFillTx/>
                 <a:latin typeface="Arial"/>
               </a:rPr>
-              <a:t>Kompatibilnost s browserima</a:t>
+              <a:t>Out in the wild...</a:t>
             </a:r>
             <a:endParaRPr b="0" lang="bs-BA" sz="3300" strike="noStrike" u="none">
               <a:solidFill>
@@ -6524,7 +6429,7 @@
       </p:sp>
       <p:sp>
         <p:nvSpPr>
-          <p:cNvPr id="83" name="PlaceHolder 2"/>
+          <p:cNvPr id="84" name="PlaceHolder 2"/>
           <p:cNvSpPr>
             <a:spLocks noGrp="1"/>
           </p:cNvSpPr>
@@ -6562,106 +6467,16 @@
               <a:buChar char=""/>
             </a:pPr>
             <a:r>
-              <a:rPr b="0" lang="bs-BA" sz="1200" strike="noStrike" u="none">
-                <a:solidFill>
-                  <a:srgbClr val="009bdd"/>
-                </a:solidFill>
-                <a:uFillTx/>
-                <a:latin typeface="Arial"/>
-              </a:rPr>
-              <a:t>Ciljao sam na Firefox 52.9 ESR.</a:t>
-            </a:r>
-            <a:endParaRPr b="0" lang="bs-BA" sz="1200" strike="noStrike" u="none">
-              <a:solidFill>
-                <a:srgbClr val="009bdd"/>
-              </a:solidFill>
-              <a:uFillTx/>
-              <a:latin typeface="Arial"/>
-            </a:endParaRPr>
-          </a:p>
-          <a:p>
-            <a:pPr lvl="1" marL="864000" indent="-324000">
-              <a:spcBef>
-                <a:spcPts val="850"/>
-              </a:spcBef>
-              <a:buClr>
-                <a:srgbClr val="77caee"/>
-              </a:buClr>
-              <a:buSzPct val="45000"/>
-              <a:buFont typeface="Wingdings" charset="2"/>
-              <a:buChar char=""/>
-            </a:pPr>
-            <a:r>
-              <a:rPr b="0" lang="bs-BA" sz="1200" strike="noStrike" u="none">
-                <a:solidFill>
-                  <a:srgbClr val="009bdd"/>
-                </a:solidFill>
-                <a:uFillTx/>
-                <a:latin typeface="Arial"/>
-              </a:rPr>
-              <a:t>To je posljednja verzija Firefoxa koja se može vrtjeti na Windows XP-u i Windows Visti, te također verzija Firefoxa koja se dobije uz Solaris 11.4.</a:t>
-            </a:r>
-            <a:endParaRPr b="0" lang="bs-BA" sz="1200" strike="noStrike" u="none">
-              <a:solidFill>
-                <a:srgbClr val="009bdd"/>
-              </a:solidFill>
-              <a:uFillTx/>
-              <a:latin typeface="Arial"/>
-            </a:endParaRPr>
-          </a:p>
-          <a:p>
-            <a:pPr lvl="1" marL="864000" indent="-324000">
-              <a:spcBef>
-                <a:spcPts val="850"/>
-              </a:spcBef>
-              <a:buClr>
-                <a:srgbClr val="77caee"/>
-              </a:buClr>
-              <a:buSzPct val="45000"/>
-              <a:buFont typeface="Wingdings" charset="2"/>
-              <a:buChar char=""/>
-            </a:pPr>
-            <a:r>
-              <a:rPr b="0" lang="bs-BA" sz="1200" strike="noStrike" u="none">
-                <a:solidFill>
-                  <a:srgbClr val="009bdd"/>
-                </a:solidFill>
-                <a:uFillTx/>
-                <a:latin typeface="Arial"/>
-              </a:rPr>
-              <a:t>Međutim, u Firefoxu 52.9 ESR pokrenutom na Windows XP (ali ne i ako se pokrene na Solarisu ili Windows 11), kao i u Epiphanyju na FreeBSD-u, linije koda i kod nisu alignirani (što onemogućava da se koriste breakpointsi).</a:t>
-            </a:r>
-            <a:endParaRPr b="0" lang="bs-BA" sz="1200" strike="noStrike" u="none">
-              <a:solidFill>
-                <a:srgbClr val="009bdd"/>
-              </a:solidFill>
-              <a:uFillTx/>
-              <a:latin typeface="Arial"/>
-            </a:endParaRPr>
-          </a:p>
-          <a:p>
-            <a:pPr lvl="1" marL="864000" indent="-324000">
-              <a:spcBef>
-                <a:spcPts val="850"/>
-              </a:spcBef>
-              <a:buClr>
-                <a:srgbClr val="77caee"/>
-              </a:buClr>
-              <a:buSzPct val="45000"/>
-              <a:buFont typeface="Wingdings" charset="2"/>
-              <a:buChar char=""/>
-            </a:pPr>
-            <a:r>
-              <a:rPr b="0" lang="bs-BA" sz="1200" strike="noStrike" u="none">
-                <a:solidFill>
-                  <a:srgbClr val="009bdd"/>
-                </a:solidFill>
-                <a:uFillTx/>
-                <a:latin typeface="Arial"/>
-              </a:rPr>
-              <a:t>Iz nekog meni nedokučivog razloga, JavaScript se vrti približno dvostruko brže u Firefoxu 52 nego u Firefoxu 120.</a:t>
-            </a:r>
-            <a:endParaRPr b="0" lang="bs-BA" sz="1200" strike="noStrike" u="none">
+              <a:rPr b="0" lang="bs-BA" sz="2200" strike="noStrike" u="none">
+                <a:solidFill>
+                  <a:srgbClr val="009bdd"/>
+                </a:solidFill>
+                <a:uFillTx/>
+                <a:latin typeface="Arial"/>
+              </a:rPr>
+              <a:t>Moj se program koristi na fakultetu u Argentini za uvod u ugrađene sustave.</a:t>
+            </a:r>
+            <a:endParaRPr b="0" lang="bs-BA" sz="2200" strike="noStrike" u="none">
               <a:solidFill>
                 <a:srgbClr val="009bdd"/>
               </a:solidFill>
@@ -6682,46 +6497,56 @@
               <a:buChar char=""/>
             </a:pPr>
             <a:r>
-              <a:rPr b="0" lang="bs-BA" sz="1200" strike="noStrike" u="none">
-                <a:solidFill>
-                  <a:srgbClr val="009bdd"/>
-                </a:solidFill>
-                <a:uFillTx/>
-                <a:latin typeface="Arial"/>
-              </a:rPr>
-              <a:t>Moderni Chrome</a:t>
-            </a:r>
-            <a:endParaRPr b="0" lang="bs-BA" sz="1200" strike="noStrike" u="none">
-              <a:solidFill>
-                <a:srgbClr val="009bdd"/>
-              </a:solidFill>
-              <a:uFillTx/>
-              <a:latin typeface="Arial"/>
-            </a:endParaRPr>
-          </a:p>
-          <a:p>
-            <a:pPr lvl="1" marL="864000" indent="-324000">
-              <a:spcBef>
-                <a:spcPts val="850"/>
-              </a:spcBef>
-              <a:buClr>
-                <a:srgbClr val="77caee"/>
-              </a:buClr>
-              <a:buSzPct val="45000"/>
-              <a:buFont typeface="Wingdings" charset="2"/>
-              <a:buChar char=""/>
-            </a:pPr>
-            <a:r>
-              <a:rPr b="0" lang="bs-BA" sz="1200" strike="noStrike" u="none">
-                <a:solidFill>
-                  <a:srgbClr val="009bdd"/>
-                </a:solidFill>
-                <a:uFillTx/>
-                <a:latin typeface="Arial"/>
-              </a:rPr>
-              <a:t>Za to da radi u Chromeu, morao sam izmijeniti CSS (jer tooltipsi na “Play/Pause”, “Fast Forward”, “Single Step” i “Stop” nisu bili radili).</a:t>
-            </a:r>
-            <a:endParaRPr b="0" lang="bs-BA" sz="1200" strike="noStrike" u="none">
+              <a:rPr b="0" lang="bs-BA" sz="2200" strike="noStrike" u="none">
+                <a:solidFill>
+                  <a:srgbClr val="009bdd"/>
+                </a:solidFill>
+                <a:uFillTx/>
+                <a:latin typeface="Arial"/>
+              </a:rPr>
+              <a:t>Nedavno sam dobio kontributora s tog fakulteta koji se zove Agustin Izaguirre (</a:t>
+            </a:r>
+            <a:r>
+              <a:rPr b="0" i="1" lang="bs-BA" sz="2200" strike="noStrike" u="none">
+                <a:solidFill>
+                  <a:srgbClr val="009bdd"/>
+                </a:solidFill>
+                <a:uFillTx/>
+                <a:latin typeface="Arial"/>
+              </a:rPr>
+              <a:t>agustiza</a:t>
+            </a:r>
+            <a:r>
+              <a:rPr b="0" lang="bs-BA" sz="2200" strike="noStrike" u="none">
+                <a:solidFill>
+                  <a:srgbClr val="009bdd"/>
+                </a:solidFill>
+                <a:uFillTx/>
+                <a:latin typeface="Arial"/>
+              </a:rPr>
+              <a:t>). On je napravio nekoliko pull requestova na GitHubu, isprva sitni bug-fixi (prvo da se naredba SRA ponaša ispravno kad je </a:t>
+            </a:r>
+            <a:r>
+              <a:rPr b="0" i="1" lang="bs-BA" sz="2200" strike="noStrike" u="none">
+                <a:solidFill>
+                  <a:srgbClr val="009bdd"/>
+                </a:solidFill>
+                <a:uFillTx/>
+                <a:latin typeface="Arial"/>
+              </a:rPr>
+              <a:t>carry flag</a:t>
+            </a:r>
+            <a:r>
+              <a:rPr b="0" lang="bs-BA" sz="2200" strike="noStrike" u="none">
+                <a:solidFill>
+                  <a:srgbClr val="009bdd"/>
+                </a:solidFill>
+                <a:uFillTx/>
+                <a:latin typeface="Arial"/>
+              </a:rPr>
+              <a:t> postavljen u jedinicu), a onda i dodavanje novih featuresa kao što su JEST testovi.</a:t>
+            </a:r>
+            <a:endParaRPr b="0" lang="bs-BA" sz="2200" strike="noStrike" u="none">
               <a:solidFill>
                 <a:srgbClr val="009bdd"/>
               </a:solidFill>
@@ -6742,16 +6567,36 @@
               <a:buChar char=""/>
             </a:pPr>
             <a:r>
-              <a:rPr b="0" lang="bs-BA" sz="1200" strike="noStrike" u="none">
-                <a:solidFill>
-                  <a:srgbClr val="009bdd"/>
-                </a:solidFill>
-                <a:uFillTx/>
-                <a:latin typeface="Arial"/>
-              </a:rPr>
-              <a:t>WebPositive (bliski srodnik Safariju)</a:t>
-            </a:r>
-            <a:endParaRPr b="0" lang="bs-BA" sz="1200" strike="noStrike" u="none">
+              <a:rPr b="0" lang="bs-BA" sz="2200" strike="noStrike" u="none">
+                <a:solidFill>
+                  <a:srgbClr val="009bdd"/>
+                </a:solidFill>
+                <a:uFillTx/>
+                <a:latin typeface="Arial"/>
+              </a:rPr>
+              <a:t>JEST testira tokenizer, parser, asembler, jezgru simulatora i evaluator aritmetičkih izraza. Međutim, </a:t>
+            </a:r>
+            <a:r>
+              <a:rPr b="0" i="1" lang="bs-BA" sz="2200" strike="noStrike" u="none">
+                <a:solidFill>
+                  <a:srgbClr val="009bdd"/>
+                </a:solidFill>
+                <a:uFillTx/>
+                <a:latin typeface="Arial"/>
+              </a:rPr>
+              <a:t>test coverage</a:t>
+            </a:r>
+            <a:r>
+              <a:rPr b="0" lang="bs-BA" sz="2200" strike="noStrike" u="none">
+                <a:solidFill>
+                  <a:srgbClr val="009bdd"/>
+                </a:solidFill>
+                <a:uFillTx/>
+                <a:latin typeface="Arial"/>
+              </a:rPr>
+              <a:t> je još uvijek nizak i contributori se još uvijek moraju oslanjati na ručno testiranje.</a:t>
+            </a:r>
+            <a:endParaRPr b="0" lang="bs-BA" sz="2200" strike="noStrike" u="none">
               <a:solidFill>
                 <a:srgbClr val="009bdd"/>
               </a:solidFill>
@@ -6759,116 +6604,6 @@
               <a:latin typeface="Arial"/>
             </a:endParaRPr>
           </a:p>
-          <a:p>
-            <a:pPr lvl="1" marL="864000" indent="-324000">
-              <a:spcBef>
-                <a:spcPts val="850"/>
-              </a:spcBef>
-              <a:buClr>
-                <a:srgbClr val="77caee"/>
-              </a:buClr>
-              <a:buSzPct val="45000"/>
-              <a:buFont typeface="Wingdings" charset="2"/>
-              <a:buChar char=""/>
-            </a:pPr>
-            <a:r>
-              <a:rPr b="0" lang="bs-BA" sz="1200" strike="noStrike" u="none">
-                <a:solidFill>
-                  <a:srgbClr val="009bdd"/>
-                </a:solidFill>
-                <a:uFillTx/>
-                <a:latin typeface="Arial"/>
-              </a:rPr>
-              <a:t>Za to da radi u WebPositiveu, morao sam izmijeniti i CSS i JavaScript.</a:t>
-            </a:r>
-            <a:endParaRPr b="0" lang="bs-BA" sz="1200" strike="noStrike" u="none">
-              <a:solidFill>
-                <a:srgbClr val="009bdd"/>
-              </a:solidFill>
-              <a:uFillTx/>
-              <a:latin typeface="Arial"/>
-            </a:endParaRPr>
-          </a:p>
-          <a:p>
-            <a:pPr lvl="1" marL="864000" indent="-324000">
-              <a:spcBef>
-                <a:spcPts val="850"/>
-              </a:spcBef>
-              <a:buClr>
-                <a:srgbClr val="77caee"/>
-              </a:buClr>
-              <a:buSzPct val="45000"/>
-              <a:buFont typeface="Wingdings" charset="2"/>
-              <a:buChar char=""/>
-            </a:pPr>
-            <a:r>
-              <a:rPr b="0" lang="bs-BA" sz="1200" strike="noStrike" u="none">
-                <a:solidFill>
-                  <a:srgbClr val="009bdd"/>
-                </a:solidFill>
-                <a:uFillTx/>
-                <a:latin typeface="Arial"/>
-              </a:rPr>
-              <a:t>Nisam uspio napraviti da “Download Hexadecimal” radi u WebPositiveu.</a:t>
-            </a:r>
-            <a:endParaRPr b="0" lang="bs-BA" sz="1200" strike="noStrike" u="none">
-              <a:solidFill>
-                <a:srgbClr val="009bdd"/>
-              </a:solidFill>
-              <a:uFillTx/>
-              <a:latin typeface="Arial"/>
-            </a:endParaRPr>
-          </a:p>
-          <a:p>
-            <a:pPr marL="432000" indent="-324000">
-              <a:spcBef>
-                <a:spcPts val="1060"/>
-              </a:spcBef>
-              <a:buClr>
-                <a:srgbClr val="77caee"/>
-              </a:buClr>
-              <a:buSzPct val="45000"/>
-              <a:buFont typeface="Wingdings" charset="2"/>
-              <a:buChar char=""/>
-            </a:pPr>
-            <a:r>
-              <a:rPr b="0" lang="bs-BA" sz="1200" strike="noStrike" u="none">
-                <a:solidFill>
-                  <a:srgbClr val="009bdd"/>
-                </a:solidFill>
-                <a:uFillTx/>
-                <a:latin typeface="Arial"/>
-              </a:rPr>
-              <a:t>Darko Nikolić tvrdi da je isprobao moj program na Macu u Safariju i u Operi i da funkcionira tamo. Discordaš </a:t>
-            </a:r>
-            <a:r>
-              <a:rPr b="0" i="1" lang="bs-BA" sz="1200" strike="noStrike" u="none">
-                <a:solidFill>
-                  <a:srgbClr val="009bdd"/>
-                </a:solidFill>
-                <a:uFillTx/>
-                <a:latin typeface="Arial"/>
-              </a:rPr>
-              <a:t>emm312</a:t>
-            </a:r>
-            <a:r>
-              <a:rPr b="0" lang="bs-BA" sz="1200" strike="noStrike" u="none">
-                <a:solidFill>
-                  <a:srgbClr val="009bdd"/>
-                </a:solidFill>
-                <a:uFillTx/>
-                <a:latin typeface="Arial"/>
-              </a:rPr>
-              <a:t> isto tvrdi da ga je isprobao u Safariju i da funkcionira tamo.</a:t>
-            </a:r>
-            <a:endParaRPr b="0" lang="bs-BA" sz="1200" strike="noStrike" u="none">
-              <a:solidFill>
-                <a:srgbClr val="009bdd"/>
-              </a:solidFill>
-              <a:uFillTx/>
-              <a:latin typeface="Arial"/>
-            </a:endParaRPr>
-          </a:p>
         </p:txBody>
       </p:sp>
       <p:sp>
@@ -6885,7 +6620,7 @@
         <p:txBody>
           <a:bodyPr/>
           <a:p>
-            <a:fld id="{951F935A-A42F-47A5-80C1-BAEBFC2B84D2}" type="slidenum">
+            <a:fld id="{97199030-3549-4B47-A5DF-8199A865D054}" type="slidenum">
               <a:t>20</a:t>
             </a:fld>
           </a:p>
@@ -6905,9 +6640,9 @@
         <p:txBody>
           <a:bodyPr/>
           <a:p>
-            <a:fld id="{25F1005B-A24A-4187-BB5F-DE75C30A3728}" type="datetime1">
+            <a:fld id="{7CA29D95-ED15-4BA1-93F9-B2D4DF1377D1}" type="datetime1">
               <a:rPr lang="en-US"/>
-              <a:t>03/24/2025</a:t>
+              <a:t>04/01/2025</a:t>
             </a:fld>
           </a:p>
         </p:txBody>
@@ -6944,7 +6679,7 @@
       </p:grpSpPr>
       <p:sp>
         <p:nvSpPr>
-          <p:cNvPr id="84" name="PlaceHolder 1"/>
+          <p:cNvPr id="85" name="PlaceHolder 1"/>
           <p:cNvSpPr>
             <a:spLocks noGrp="1"/>
           </p:cNvSpPr>
@@ -6981,7 +6716,7 @@
                 <a:uFillTx/>
                 <a:latin typeface="Arial"/>
               </a:rPr>
-              <a:t>Back-end</a:t>
+              <a:t>Kompatibilnost s browserima</a:t>
             </a:r>
             <a:endParaRPr b="0" lang="bs-BA" sz="3300" strike="noStrike" u="none">
               <a:solidFill>
@@ -6995,7 +6730,7 @@
       </p:sp>
       <p:sp>
         <p:nvSpPr>
-          <p:cNvPr id="85" name="PlaceHolder 2"/>
+          <p:cNvPr id="86" name="PlaceHolder 2"/>
           <p:cNvSpPr>
             <a:spLocks noGrp="1"/>
           </p:cNvSpPr>
@@ -7033,56 +6768,16 @@
               <a:buChar char=""/>
             </a:pPr>
             <a:r>
-              <a:rPr b="0" lang="bs-BA" sz="2100" strike="noStrike" u="none">
-                <a:solidFill>
-                  <a:srgbClr val="009bdd"/>
-                </a:solidFill>
-                <a:uFillTx/>
-                <a:latin typeface="Arial"/>
-              </a:rPr>
-              <a:t>Abidin Durdu (tada zvan </a:t>
-            </a:r>
-            <a:r>
-              <a:rPr b="0" i="1" lang="bs-BA" sz="2100" strike="noStrike" u="none">
-                <a:solidFill>
-                  <a:srgbClr val="009bdd"/>
-                </a:solidFill>
-                <a:uFillTx/>
-                <a:latin typeface="Arial"/>
-              </a:rPr>
-              <a:t>betelgeuse-7</a:t>
-            </a:r>
-            <a:r>
-              <a:rPr b="0" lang="bs-BA" sz="2100" strike="noStrike" u="none">
-                <a:solidFill>
-                  <a:srgbClr val="009bdd"/>
-                </a:solidFill>
-                <a:uFillTx/>
-                <a:latin typeface="Arial"/>
-              </a:rPr>
-              <a:t>, a sada zvan </a:t>
-            </a:r>
-            <a:r>
-              <a:rPr b="0" i="1" lang="bs-BA" sz="2100" strike="noStrike" u="none">
-                <a:solidFill>
-                  <a:srgbClr val="009bdd"/>
-                </a:solidFill>
-                <a:uFillTx/>
-                <a:latin typeface="Arial"/>
-              </a:rPr>
-              <a:t>abdrd</a:t>
-            </a:r>
-            <a:r>
-              <a:rPr b="0" lang="bs-BA" sz="2100" strike="noStrike" u="none">
-                <a:solidFill>
-                  <a:srgbClr val="009bdd"/>
-                </a:solidFill>
-                <a:uFillTx/>
-                <a:latin typeface="Arial"/>
-              </a:rPr>
-              <a:t>) napravio je back-end u PHP-u, koji omogućuje korisnicima da dijele asemblerske programe. Taj back-end koristi MySQL bazu podataka. Vrti se na SourceForge serverima.</a:t>
-            </a:r>
-            <a:endParaRPr b="0" lang="bs-BA" sz="2100" strike="noStrike" u="none">
+              <a:rPr b="0" lang="bs-BA" sz="1200" strike="noStrike" u="none">
+                <a:solidFill>
+                  <a:srgbClr val="009bdd"/>
+                </a:solidFill>
+                <a:uFillTx/>
+                <a:latin typeface="Arial"/>
+              </a:rPr>
+              <a:t>Ciljao sam na Firefox 52.9 ESR.</a:t>
+            </a:r>
+            <a:endParaRPr b="0" lang="bs-BA" sz="1200" strike="noStrike" u="none">
               <a:solidFill>
                 <a:srgbClr val="009bdd"/>
               </a:solidFill>
@@ -7090,99 +6785,298 @@
               <a:latin typeface="Arial"/>
             </a:endParaRPr>
           </a:p>
-        </p:txBody>
-      </p:sp>
-      <p:pic>
-        <p:nvPicPr>
-          <p:cNvPr id="86" name="" descr=""/>
-          <p:cNvPicPr/>
-          <p:nvPr/>
-        </p:nvPicPr>
-        <p:blipFill>
-          <a:blip r:embed="rId1"/>
-          <a:stretch/>
-        </p:blipFill>
-        <p:spPr>
-          <a:xfrm>
-            <a:off x="2507040" y="2289960"/>
-            <a:ext cx="5090040" cy="1104480"/>
-          </a:xfrm>
-          <a:prstGeom prst="rect">
-            <a:avLst/>
-          </a:prstGeom>
-          <a:noFill/>
-          <a:ln w="18000">
-            <a:noFill/>
-          </a:ln>
-        </p:spPr>
-      </p:pic>
-      <p:sp>
-        <p:nvSpPr>
-          <p:cNvPr id="87" name=""/>
-          <p:cNvSpPr/>
-          <p:nvPr/>
-        </p:nvSpPr>
-        <p:spPr>
-          <a:xfrm>
-            <a:off x="4898160" y="2468880"/>
-            <a:ext cx="359640" cy="359640"/>
-          </a:xfrm>
-          <a:prstGeom prst="ellipse">
-            <a:avLst/>
-          </a:prstGeom>
-          <a:noFill/>
-          <a:ln w="18000">
-            <a:solidFill>
-              <a:srgbClr val="009bdd"/>
-            </a:solidFill>
-            <a:round/>
-          </a:ln>
-        </p:spPr>
-        <p:style>
-          <a:lnRef idx="0"/>
-          <a:fillRef idx="0"/>
-          <a:effectRef idx="0"/>
-          <a:fontRef idx="minor"/>
-        </p:style>
-        <p:txBody>
-          <a:bodyPr wrap="none" lIns="90000" rIns="90000" tIns="45000" bIns="45000" anchor="ctr">
-            <a:noAutofit/>
-          </a:bodyPr>
-          <a:p>
-            <a:endParaRPr b="0" lang="bs-BA" sz="1800" strike="noStrike" u="none">
-              <a:solidFill>
-                <a:srgbClr val="000000"/>
-              </a:solidFill>
-              <a:uFillTx/>
-              <a:latin typeface="Arial"/>
-            </a:endParaRPr>
-          </a:p>
-        </p:txBody>
-      </p:sp>
-      <p:pic>
-        <p:nvPicPr>
-          <p:cNvPr id="88" name="" descr=""/>
-          <p:cNvPicPr/>
-          <p:nvPr/>
-        </p:nvPicPr>
-        <p:blipFill>
-          <a:blip r:embed="rId2"/>
-          <a:stretch/>
-        </p:blipFill>
-        <p:spPr>
-          <a:xfrm>
-            <a:off x="1356120" y="3527640"/>
-            <a:ext cx="7330680" cy="1371240"/>
-          </a:xfrm>
-          <a:prstGeom prst="rect">
-            <a:avLst/>
-          </a:prstGeom>
-          <a:noFill/>
-          <a:ln w="18000">
-            <a:noFill/>
-          </a:ln>
-        </p:spPr>
-      </p:pic>
+          <a:p>
+            <a:pPr lvl="1" marL="864000" indent="-324000">
+              <a:spcBef>
+                <a:spcPts val="850"/>
+              </a:spcBef>
+              <a:buClr>
+                <a:srgbClr val="77caee"/>
+              </a:buClr>
+              <a:buSzPct val="45000"/>
+              <a:buFont typeface="Wingdings" charset="2"/>
+              <a:buChar char=""/>
+            </a:pPr>
+            <a:r>
+              <a:rPr b="0" lang="bs-BA" sz="1200" strike="noStrike" u="none">
+                <a:solidFill>
+                  <a:srgbClr val="009bdd"/>
+                </a:solidFill>
+                <a:uFillTx/>
+                <a:latin typeface="Arial"/>
+              </a:rPr>
+              <a:t>To je posljednja verzija Firefoxa koja se može vrtjeti na Windows XP-u i Windows Visti, te također verzija Firefoxa koja se dobije uz Solaris 11.4.</a:t>
+            </a:r>
+            <a:endParaRPr b="0" lang="bs-BA" sz="1200" strike="noStrike" u="none">
+              <a:solidFill>
+                <a:srgbClr val="009bdd"/>
+              </a:solidFill>
+              <a:uFillTx/>
+              <a:latin typeface="Arial"/>
+            </a:endParaRPr>
+          </a:p>
+          <a:p>
+            <a:pPr lvl="1" marL="864000" indent="-324000">
+              <a:spcBef>
+                <a:spcPts val="850"/>
+              </a:spcBef>
+              <a:buClr>
+                <a:srgbClr val="77caee"/>
+              </a:buClr>
+              <a:buSzPct val="45000"/>
+              <a:buFont typeface="Wingdings" charset="2"/>
+              <a:buChar char=""/>
+            </a:pPr>
+            <a:r>
+              <a:rPr b="0" lang="bs-BA" sz="1200" strike="noStrike" u="none">
+                <a:solidFill>
+                  <a:srgbClr val="009bdd"/>
+                </a:solidFill>
+                <a:uFillTx/>
+                <a:latin typeface="Arial"/>
+              </a:rPr>
+              <a:t>Međutim, u Firefoxu 52.9 ESR pokrenutom na Windows XP (ali ne i ako se pokrene na Solarisu ili Windows 11), kao i u Epiphanyju na FreeBSD-u, linije koda i kod nisu alignirani (što onemogućava da se koriste breakpointsi).</a:t>
+            </a:r>
+            <a:endParaRPr b="0" lang="bs-BA" sz="1200" strike="noStrike" u="none">
+              <a:solidFill>
+                <a:srgbClr val="009bdd"/>
+              </a:solidFill>
+              <a:uFillTx/>
+              <a:latin typeface="Arial"/>
+            </a:endParaRPr>
+          </a:p>
+          <a:p>
+            <a:pPr lvl="1" marL="864000" indent="-324000">
+              <a:spcBef>
+                <a:spcPts val="850"/>
+              </a:spcBef>
+              <a:buClr>
+                <a:srgbClr val="77caee"/>
+              </a:buClr>
+              <a:buSzPct val="45000"/>
+              <a:buFont typeface="Wingdings" charset="2"/>
+              <a:buChar char=""/>
+            </a:pPr>
+            <a:r>
+              <a:rPr b="0" lang="bs-BA" sz="1200" strike="noStrike" u="none">
+                <a:solidFill>
+                  <a:srgbClr val="009bdd"/>
+                </a:solidFill>
+                <a:uFillTx/>
+                <a:latin typeface="Arial"/>
+              </a:rPr>
+              <a:t>Iz nekog meni nedokučivog razloga, JavaScript se vrti približno dvostruko brže u Firefoxu 52 nego u Firefoxu 120.</a:t>
+            </a:r>
+            <a:endParaRPr b="0" lang="bs-BA" sz="1200" strike="noStrike" u="none">
+              <a:solidFill>
+                <a:srgbClr val="009bdd"/>
+              </a:solidFill>
+              <a:uFillTx/>
+              <a:latin typeface="Arial"/>
+            </a:endParaRPr>
+          </a:p>
+          <a:p>
+            <a:pPr marL="432000" indent="-324000">
+              <a:spcBef>
+                <a:spcPts val="1060"/>
+              </a:spcBef>
+              <a:buClr>
+                <a:srgbClr val="77caee"/>
+              </a:buClr>
+              <a:buSzPct val="45000"/>
+              <a:buFont typeface="Wingdings" charset="2"/>
+              <a:buChar char=""/>
+            </a:pPr>
+            <a:r>
+              <a:rPr b="0" lang="bs-BA" sz="1200" strike="noStrike" u="none">
+                <a:solidFill>
+                  <a:srgbClr val="009bdd"/>
+                </a:solidFill>
+                <a:uFillTx/>
+                <a:latin typeface="Arial"/>
+              </a:rPr>
+              <a:t>Moderni Chrome</a:t>
+            </a:r>
+            <a:endParaRPr b="0" lang="bs-BA" sz="1200" strike="noStrike" u="none">
+              <a:solidFill>
+                <a:srgbClr val="009bdd"/>
+              </a:solidFill>
+              <a:uFillTx/>
+              <a:latin typeface="Arial"/>
+            </a:endParaRPr>
+          </a:p>
+          <a:p>
+            <a:pPr lvl="1" marL="864000" indent="-324000">
+              <a:spcBef>
+                <a:spcPts val="850"/>
+              </a:spcBef>
+              <a:buClr>
+                <a:srgbClr val="77caee"/>
+              </a:buClr>
+              <a:buSzPct val="45000"/>
+              <a:buFont typeface="Wingdings" charset="2"/>
+              <a:buChar char=""/>
+            </a:pPr>
+            <a:r>
+              <a:rPr b="0" lang="bs-BA" sz="1200" strike="noStrike" u="none">
+                <a:solidFill>
+                  <a:srgbClr val="009bdd"/>
+                </a:solidFill>
+                <a:uFillTx/>
+                <a:latin typeface="Arial"/>
+              </a:rPr>
+              <a:t>Za to da radi u Chromeu, morao sam izmijeniti CSS (jer tooltipsi na “Play/Pause”, “Fast Forward”, “Single Step” i “Stop” nisu bili radili).</a:t>
+            </a:r>
+            <a:endParaRPr b="0" lang="bs-BA" sz="1200" strike="noStrike" u="none">
+              <a:solidFill>
+                <a:srgbClr val="009bdd"/>
+              </a:solidFill>
+              <a:uFillTx/>
+              <a:latin typeface="Arial"/>
+            </a:endParaRPr>
+          </a:p>
+          <a:p>
+            <a:pPr marL="432000" indent="-324000">
+              <a:spcBef>
+                <a:spcPts val="1060"/>
+              </a:spcBef>
+              <a:buClr>
+                <a:srgbClr val="77caee"/>
+              </a:buClr>
+              <a:buSzPct val="45000"/>
+              <a:buFont typeface="Wingdings" charset="2"/>
+              <a:buChar char=""/>
+            </a:pPr>
+            <a:r>
+              <a:rPr b="0" lang="bs-BA" sz="1200" strike="noStrike" u="none">
+                <a:solidFill>
+                  <a:srgbClr val="009bdd"/>
+                </a:solidFill>
+                <a:uFillTx/>
+                <a:latin typeface="Arial"/>
+              </a:rPr>
+              <a:t>WebPositive (bliski srodnik Safariju)</a:t>
+            </a:r>
+            <a:endParaRPr b="0" lang="bs-BA" sz="1200" strike="noStrike" u="none">
+              <a:solidFill>
+                <a:srgbClr val="009bdd"/>
+              </a:solidFill>
+              <a:uFillTx/>
+              <a:latin typeface="Arial"/>
+            </a:endParaRPr>
+          </a:p>
+          <a:p>
+            <a:pPr lvl="1" marL="864000" indent="-324000">
+              <a:spcBef>
+                <a:spcPts val="850"/>
+              </a:spcBef>
+              <a:buClr>
+                <a:srgbClr val="77caee"/>
+              </a:buClr>
+              <a:buSzPct val="45000"/>
+              <a:buFont typeface="Wingdings" charset="2"/>
+              <a:buChar char=""/>
+            </a:pPr>
+            <a:r>
+              <a:rPr b="0" lang="bs-BA" sz="1200" strike="noStrike" u="none">
+                <a:solidFill>
+                  <a:srgbClr val="009bdd"/>
+                </a:solidFill>
+                <a:uFillTx/>
+                <a:latin typeface="Arial"/>
+              </a:rPr>
+              <a:t>Za to da radi u WebPositiveu, morao sam izmijeniti i CSS i JavaScript.</a:t>
+            </a:r>
+            <a:endParaRPr b="0" lang="bs-BA" sz="1200" strike="noStrike" u="none">
+              <a:solidFill>
+                <a:srgbClr val="009bdd"/>
+              </a:solidFill>
+              <a:uFillTx/>
+              <a:latin typeface="Arial"/>
+            </a:endParaRPr>
+          </a:p>
+          <a:p>
+            <a:pPr lvl="1" marL="864000" indent="-324000">
+              <a:spcBef>
+                <a:spcPts val="850"/>
+              </a:spcBef>
+              <a:buClr>
+                <a:srgbClr val="77caee"/>
+              </a:buClr>
+              <a:buSzPct val="45000"/>
+              <a:buFont typeface="Wingdings" charset="2"/>
+              <a:buChar char=""/>
+            </a:pPr>
+            <a:r>
+              <a:rPr b="0" lang="bs-BA" sz="1200" strike="noStrike" u="none">
+                <a:solidFill>
+                  <a:srgbClr val="009bdd"/>
+                </a:solidFill>
+                <a:uFillTx/>
+                <a:latin typeface="Arial"/>
+              </a:rPr>
+              <a:t>Nisam uspio napraviti da “Download Hexadecimal” radi u WebPositiveu.</a:t>
+            </a:r>
+            <a:endParaRPr b="0" lang="bs-BA" sz="1200" strike="noStrike" u="none">
+              <a:solidFill>
+                <a:srgbClr val="009bdd"/>
+              </a:solidFill>
+              <a:uFillTx/>
+              <a:latin typeface="Arial"/>
+            </a:endParaRPr>
+          </a:p>
+          <a:p>
+            <a:pPr marL="432000" indent="-324000">
+              <a:spcBef>
+                <a:spcPts val="1060"/>
+              </a:spcBef>
+              <a:buClr>
+                <a:srgbClr val="77caee"/>
+              </a:buClr>
+              <a:buSzPct val="45000"/>
+              <a:buFont typeface="Wingdings" charset="2"/>
+              <a:buChar char=""/>
+            </a:pPr>
+            <a:r>
+              <a:rPr b="0" lang="bs-BA" sz="1200" strike="noStrike" u="none">
+                <a:solidFill>
+                  <a:srgbClr val="009bdd"/>
+                </a:solidFill>
+                <a:uFillTx/>
+                <a:latin typeface="Arial"/>
+              </a:rPr>
+              <a:t>Darko Nikolić tvrdi da je isprobao moj program na Macu u Safariju i u Operi i da funkcionira tamo. Discordaš </a:t>
+            </a:r>
+            <a:r>
+              <a:rPr b="0" i="1" lang="bs-BA" sz="1200" strike="noStrike" u="none">
+                <a:solidFill>
+                  <a:srgbClr val="009bdd"/>
+                </a:solidFill>
+                <a:uFillTx/>
+                <a:latin typeface="Arial"/>
+              </a:rPr>
+              <a:t>emm312</a:t>
+            </a:r>
+            <a:r>
+              <a:rPr b="0" lang="bs-BA" sz="1200" strike="noStrike" u="none">
+                <a:solidFill>
+                  <a:srgbClr val="009bdd"/>
+                </a:solidFill>
+                <a:uFillTx/>
+                <a:latin typeface="Arial"/>
+              </a:rPr>
+              <a:t> isto tvrdi da ga je isprobao u Safariju i da funkcionira tamo.</a:t>
+            </a:r>
+            <a:endParaRPr b="0" lang="bs-BA" sz="1200" strike="noStrike" u="none">
+              <a:solidFill>
+                <a:srgbClr val="009bdd"/>
+              </a:solidFill>
+              <a:uFillTx/>
+              <a:latin typeface="Arial"/>
+            </a:endParaRPr>
+          </a:p>
+        </p:txBody>
+      </p:sp>
       <p:sp>
         <p:nvSpPr>
           <p:cNvPr id="4" name="PlaceHolder 3"/>
@@ -7197,7 +7091,7 @@
         <p:txBody>
           <a:bodyPr/>
           <a:p>
-            <a:fld id="{96716B77-A0D7-4103-9752-95158D5A125A}" type="slidenum">
+            <a:fld id="{25917F84-72C4-491E-A2DE-B21921CBCC1A}" type="slidenum">
               <a:t>21</a:t>
             </a:fld>
           </a:p>
@@ -7217,9 +7111,9 @@
         <p:txBody>
           <a:bodyPr/>
           <a:p>
-            <a:fld id="{926E158C-63E3-49B2-A6E9-61869991577C}" type="datetime1">
+            <a:fld id="{D024F3D4-5A0E-47C7-8663-4B2B16991711}" type="datetime1">
               <a:rPr lang="en-US"/>
-              <a:t>03/24/2025</a:t>
+              <a:t>04/01/2025</a:t>
             </a:fld>
           </a:p>
         </p:txBody>
@@ -7256,7 +7150,7 @@
       </p:grpSpPr>
       <p:sp>
         <p:nvSpPr>
-          <p:cNvPr id="89" name="PlaceHolder 1"/>
+          <p:cNvPr id="87" name="PlaceHolder 1"/>
           <p:cNvSpPr>
             <a:spLocks noGrp="1"/>
           </p:cNvSpPr>
@@ -7293,7 +7187,7 @@
                 <a:uFillTx/>
                 <a:latin typeface="Arial"/>
               </a:rPr>
-              <a:t>Bilješke o sintaksi</a:t>
+              <a:t>Back-end</a:t>
             </a:r>
             <a:endParaRPr b="0" lang="bs-BA" sz="3300" strike="noStrike" u="none">
               <a:solidFill>
@@ -7307,7 +7201,7 @@
       </p:sp>
       <p:sp>
         <p:nvSpPr>
-          <p:cNvPr id="90" name="PlaceHolder 2"/>
+          <p:cNvPr id="88" name="PlaceHolder 2"/>
           <p:cNvSpPr>
             <a:spLocks noGrp="1"/>
           </p:cNvSpPr>
@@ -7352,7 +7246,47 @@
                 <a:uFillTx/>
                 <a:latin typeface="Arial"/>
               </a:rPr>
-              <a:t>Moj asembler za PicoBlaze cilja na punu kompatibilnost sa Xilinxovim službenim asemblerom za PicoBlaze. To, na žalost, znači da se numerički literali bez eksplicitno određene brojevne baze interpretiraju kao heksadekadski.</a:t>
+              <a:t>Abidin Durdu (tada zvan </a:t>
+            </a:r>
+            <a:r>
+              <a:rPr b="0" i="1" lang="bs-BA" sz="2100" strike="noStrike" u="none">
+                <a:solidFill>
+                  <a:srgbClr val="009bdd"/>
+                </a:solidFill>
+                <a:uFillTx/>
+                <a:latin typeface="Arial"/>
+              </a:rPr>
+              <a:t>betelgeuse-7</a:t>
+            </a:r>
+            <a:r>
+              <a:rPr b="0" lang="bs-BA" sz="2100" strike="noStrike" u="none">
+                <a:solidFill>
+                  <a:srgbClr val="009bdd"/>
+                </a:solidFill>
+                <a:uFillTx/>
+                <a:latin typeface="Arial"/>
+              </a:rPr>
+              <a:t>, a sada zvan </a:t>
+            </a:r>
+            <a:r>
+              <a:rPr b="0" i="1" lang="bs-BA" sz="2100" strike="noStrike" u="none">
+                <a:solidFill>
+                  <a:srgbClr val="009bdd"/>
+                </a:solidFill>
+                <a:uFillTx/>
+                <a:latin typeface="Arial"/>
+              </a:rPr>
+              <a:t>abdrd</a:t>
+            </a:r>
+            <a:r>
+              <a:rPr b="0" lang="bs-BA" sz="2100" strike="noStrike" u="none">
+                <a:solidFill>
+                  <a:srgbClr val="009bdd"/>
+                </a:solidFill>
+                <a:uFillTx/>
+                <a:latin typeface="Arial"/>
+              </a:rPr>
+              <a:t>) napravio je back-end u PHP-u, koji omogućuje korisnicima da dijele asemblerske programe. Taj back-end koristi MySQL bazu podataka. Vrti se na SourceForge serverima.</a:t>
             </a:r>
             <a:endParaRPr b="0" lang="bs-BA" sz="2100" strike="noStrike" u="none">
               <a:solidFill>
@@ -7362,108 +7296,99 @@
               <a:latin typeface="Arial"/>
             </a:endParaRPr>
           </a:p>
-          <a:p>
-            <a:pPr marL="432000" indent="-324000">
-              <a:spcBef>
-                <a:spcPts val="1060"/>
-              </a:spcBef>
-              <a:buClr>
-                <a:srgbClr val="77caee"/>
-              </a:buClr>
-              <a:buSzPct val="45000"/>
-              <a:buFont typeface="Wingdings" charset="2"/>
-              <a:buChar char=""/>
-            </a:pPr>
-            <a:r>
-              <a:rPr b="0" lang="bs-BA" sz="2100" strike="noStrike" u="none">
-                <a:solidFill>
-                  <a:srgbClr val="009bdd"/>
-                </a:solidFill>
-                <a:uFillTx/>
-                <a:latin typeface="Arial"/>
-              </a:rPr>
-              <a:t>Od verzije v5.0.0 to se ponašanje može promijeniti: pretprocesor i asembler će sve brojevne literale bez specificirane baze nakon direktive </a:t>
-            </a:r>
-            <a:r>
-              <a:rPr b="0" lang="bs-BA" sz="2100" strike="noStrike" u="none">
-                <a:solidFill>
-                  <a:srgbClr val="009bdd"/>
-                </a:solidFill>
-                <a:uFillTx/>
-                <a:latin typeface="Courier New"/>
-              </a:rPr>
-              <a:t>base_decimal</a:t>
-            </a:r>
-            <a:r>
-              <a:rPr b="0" lang="bs-BA" sz="2100" strike="noStrike" u="none">
-                <a:solidFill>
-                  <a:srgbClr val="009bdd"/>
-                </a:solidFill>
-                <a:uFillTx/>
-                <a:latin typeface="Arial"/>
-              </a:rPr>
-              <a:t> interpretirati kao dekadske (kao u gotovo svim programskim jezicima), a nakon </a:t>
-            </a:r>
-            <a:r>
-              <a:rPr b="0" lang="bs-BA" sz="2100" strike="noStrike" u="none">
-                <a:solidFill>
-                  <a:srgbClr val="009bdd"/>
-                </a:solidFill>
-                <a:uFillTx/>
-                <a:latin typeface="Courier New"/>
-              </a:rPr>
-              <a:t>base_hexadecimal</a:t>
-            </a:r>
-            <a:r>
-              <a:rPr b="0" lang="bs-BA" sz="2100" strike="noStrike" u="none">
-                <a:solidFill>
-                  <a:srgbClr val="009bdd"/>
-                </a:solidFill>
-                <a:uFillTx/>
-                <a:latin typeface="Arial"/>
-              </a:rPr>
-              <a:t> kao heksadekadske.</a:t>
-            </a:r>
-            <a:endParaRPr b="0" lang="bs-BA" sz="2100" strike="noStrike" u="none">
-              <a:solidFill>
-                <a:srgbClr val="009bdd"/>
-              </a:solidFill>
-              <a:uFillTx/>
-              <a:latin typeface="Arial"/>
-            </a:endParaRPr>
-          </a:p>
-          <a:p>
-            <a:pPr marL="432000" indent="-324000">
-              <a:spcBef>
-                <a:spcPts val="1060"/>
-              </a:spcBef>
-              <a:buClr>
-                <a:srgbClr val="77caee"/>
-              </a:buClr>
-              <a:buSzPct val="45000"/>
-              <a:buFont typeface="Wingdings" charset="2"/>
-              <a:buChar char=""/>
-            </a:pPr>
-            <a:r>
-              <a:rPr b="0" lang="bs-BA" sz="2100" strike="noStrike" u="none">
-                <a:solidFill>
-                  <a:srgbClr val="009bdd"/>
-                </a:solidFill>
-                <a:uFillTx/>
-                <a:latin typeface="Arial"/>
-              </a:rPr>
-              <a:t>Zbog načina na koji je asembler napravljen, ako se te naredbe stave u if-grananje ili while-petlju, može se dogoditi da pretprocesor interpretira konstante kao dekadske, a asembler kao heksadekadske. Nema očitog rješenja za taj problem.</a:t>
-            </a:r>
-            <a:endParaRPr b="0" lang="bs-BA" sz="2100" strike="noStrike" u="none">
-              <a:solidFill>
-                <a:srgbClr val="009bdd"/>
-              </a:solidFill>
-              <a:uFillTx/>
-              <a:latin typeface="Arial"/>
-            </a:endParaRPr>
-          </a:p>
-        </p:txBody>
-      </p:sp>
+        </p:txBody>
+      </p:sp>
+      <p:pic>
+        <p:nvPicPr>
+          <p:cNvPr id="89" name="" descr=""/>
+          <p:cNvPicPr/>
+          <p:nvPr/>
+        </p:nvPicPr>
+        <p:blipFill>
+          <a:blip r:embed="rId1"/>
+          <a:stretch/>
+        </p:blipFill>
+        <p:spPr>
+          <a:xfrm>
+            <a:off x="2507040" y="2289960"/>
+            <a:ext cx="5090040" cy="1104480"/>
+          </a:xfrm>
+          <a:prstGeom prst="rect">
+            <a:avLst/>
+          </a:prstGeom>
+          <a:noFill/>
+          <a:ln w="18000">
+            <a:noFill/>
+          </a:ln>
+        </p:spPr>
+      </p:pic>
+      <p:sp>
+        <p:nvSpPr>
+          <p:cNvPr id="90" name=""/>
+          <p:cNvSpPr/>
+          <p:nvPr/>
+        </p:nvSpPr>
+        <p:spPr>
+          <a:xfrm>
+            <a:off x="4898160" y="2468880"/>
+            <a:ext cx="359640" cy="359640"/>
+          </a:xfrm>
+          <a:prstGeom prst="ellipse">
+            <a:avLst/>
+          </a:prstGeom>
+          <a:noFill/>
+          <a:ln w="18000">
+            <a:solidFill>
+              <a:srgbClr val="009bdd"/>
+            </a:solidFill>
+            <a:round/>
+          </a:ln>
+        </p:spPr>
+        <p:style>
+          <a:lnRef idx="0"/>
+          <a:fillRef idx="0"/>
+          <a:effectRef idx="0"/>
+          <a:fontRef idx="minor"/>
+        </p:style>
+        <p:txBody>
+          <a:bodyPr wrap="none" lIns="90000" rIns="90000" tIns="45000" bIns="45000" anchor="ctr">
+            <a:noAutofit/>
+          </a:bodyPr>
+          <a:p>
+            <a:endParaRPr b="0" lang="bs-BA" sz="1800" strike="noStrike" u="none">
+              <a:solidFill>
+                <a:srgbClr val="000000"/>
+              </a:solidFill>
+              <a:uFillTx/>
+              <a:latin typeface="Arial"/>
+            </a:endParaRPr>
+          </a:p>
+        </p:txBody>
+      </p:sp>
+      <p:pic>
+        <p:nvPicPr>
+          <p:cNvPr id="91" name="" descr=""/>
+          <p:cNvPicPr/>
+          <p:nvPr/>
+        </p:nvPicPr>
+        <p:blipFill>
+          <a:blip r:embed="rId2"/>
+          <a:stretch/>
+        </p:blipFill>
+        <p:spPr>
+          <a:xfrm>
+            <a:off x="1356120" y="3527640"/>
+            <a:ext cx="7330680" cy="1371240"/>
+          </a:xfrm>
+          <a:prstGeom prst="rect">
+            <a:avLst/>
+          </a:prstGeom>
+          <a:noFill/>
+          <a:ln w="18000">
+            <a:noFill/>
+          </a:ln>
+        </p:spPr>
+      </p:pic>
       <p:sp>
         <p:nvSpPr>
           <p:cNvPr id="4" name="PlaceHolder 3"/>
@@ -7478,7 +7403,7 @@
         <p:txBody>
           <a:bodyPr/>
           <a:p>
-            <a:fld id="{3AB5DF38-718B-41F9-8D37-CDE3F9F2408D}" type="slidenum">
+            <a:fld id="{AD0F523C-DCC7-4144-93A6-85D8A76B2789}" type="slidenum">
               <a:t>22</a:t>
             </a:fld>
           </a:p>
@@ -7498,9 +7423,9 @@
         <p:txBody>
           <a:bodyPr/>
           <a:p>
-            <a:fld id="{2F416E57-0BDD-4DB7-A250-9D69825A4BCF}" type="datetime1">
+            <a:fld id="{3152DF54-BAAF-470B-A543-BB04F630E637}" type="datetime1">
               <a:rPr lang="en-US"/>
-              <a:t>03/24/2025</a:t>
+              <a:t>04/01/2025</a:t>
             </a:fld>
           </a:p>
         </p:txBody>
@@ -7537,7 +7462,7 @@
       </p:grpSpPr>
       <p:sp>
         <p:nvSpPr>
-          <p:cNvPr id="91" name="PlaceHolder 1"/>
+          <p:cNvPr id="92" name="PlaceHolder 1"/>
           <p:cNvSpPr>
             <a:spLocks noGrp="1"/>
           </p:cNvSpPr>
@@ -7574,7 +7499,7 @@
                 <a:uFillTx/>
                 <a:latin typeface="Arial"/>
               </a:rPr>
-              <a:t>Bilješke o arhitekturi</a:t>
+              <a:t>Bilješke o sintaksi</a:t>
             </a:r>
             <a:endParaRPr b="0" lang="bs-BA" sz="3300" strike="noStrike" u="none">
               <a:solidFill>
@@ -7588,7 +7513,7 @@
       </p:sp>
       <p:sp>
         <p:nvSpPr>
-          <p:cNvPr id="92" name="PlaceHolder 2"/>
+          <p:cNvPr id="93" name="PlaceHolder 2"/>
           <p:cNvSpPr>
             <a:spLocks noGrp="1"/>
           </p:cNvSpPr>
@@ -7626,16 +7551,16 @@
               <a:buChar char=""/>
             </a:pPr>
             <a:r>
-              <a:rPr b="0" lang="bs-BA" sz="2400" strike="noStrike" u="none">
-                <a:solidFill>
-                  <a:srgbClr val="009bdd"/>
-                </a:solidFill>
-                <a:uFillTx/>
-                <a:latin typeface="Arial"/>
-              </a:rPr>
-              <a:t>Parseri većine asemblera pretvaraju tokenizirani asemblerski kod u dvodimenzionalno polje (tablicu) malih stabala (gdje su samo aritmetički izrazi stabla, a ostalo su pojedinačni čvorovi).</a:t>
-            </a:r>
-            <a:endParaRPr b="0" lang="bs-BA" sz="2400" strike="noStrike" u="none">
+              <a:rPr b="0" lang="bs-BA" sz="2100" strike="noStrike" u="none">
+                <a:solidFill>
+                  <a:srgbClr val="009bdd"/>
+                </a:solidFill>
+                <a:uFillTx/>
+                <a:latin typeface="Arial"/>
+              </a:rPr>
+              <a:t>Moj asembler za PicoBlaze cilja na punu kompatibilnost sa Xilinxovim službenim asemblerom za PicoBlaze. To, na žalost, znači da se numerički literali bez eksplicitno određene brojevne baze interpretiraju kao heksadekadski.</a:t>
+            </a:r>
+            <a:endParaRPr b="0" lang="bs-BA" sz="2100" strike="noStrike" u="none">
               <a:solidFill>
                 <a:srgbClr val="009bdd"/>
               </a:solidFill>
@@ -7656,16 +7581,56 @@
               <a:buChar char=""/>
             </a:pPr>
             <a:r>
-              <a:rPr b="0" lang="bs-BA" sz="2400" strike="noStrike" u="none">
-                <a:solidFill>
-                  <a:srgbClr val="009bdd"/>
-                </a:solidFill>
-                <a:uFillTx/>
-                <a:latin typeface="Arial"/>
-              </a:rPr>
-              <a:t>Parser u ovom asembleru za PicoBlaze pretvara tokenizirani asemblerski kod u jedno veliko stablo. Korijen tog stabla je čvor s tekstom “assembly”, a čvorovi dubine 1 su mnemonike, pretprocesorske naredbe i labeli.</a:t>
-            </a:r>
-            <a:endParaRPr b="0" lang="bs-BA" sz="2400" strike="noStrike" u="none">
+              <a:rPr b="0" lang="bs-BA" sz="2100" strike="noStrike" u="none">
+                <a:solidFill>
+                  <a:srgbClr val="009bdd"/>
+                </a:solidFill>
+                <a:uFillTx/>
+                <a:latin typeface="Arial"/>
+              </a:rPr>
+              <a:t>Od verzije v5.0.0 to se ponašanje može promijeniti: pretprocesor i asembler će sve brojevne literale bez specificirane baze nakon direktive </a:t>
+            </a:r>
+            <a:r>
+              <a:rPr b="0" lang="bs-BA" sz="2100" strike="noStrike" u="none">
+                <a:solidFill>
+                  <a:srgbClr val="009bdd"/>
+                </a:solidFill>
+                <a:uFillTx/>
+                <a:latin typeface="Courier New"/>
+              </a:rPr>
+              <a:t>base_decimal</a:t>
+            </a:r>
+            <a:r>
+              <a:rPr b="0" lang="bs-BA" sz="2100" strike="noStrike" u="none">
+                <a:solidFill>
+                  <a:srgbClr val="009bdd"/>
+                </a:solidFill>
+                <a:uFillTx/>
+                <a:latin typeface="Arial"/>
+              </a:rPr>
+              <a:t> interpretirati kao dekadske (kao u gotovo svim programskim jezicima), a nakon </a:t>
+            </a:r>
+            <a:r>
+              <a:rPr b="0" lang="bs-BA" sz="2100" strike="noStrike" u="none">
+                <a:solidFill>
+                  <a:srgbClr val="009bdd"/>
+                </a:solidFill>
+                <a:uFillTx/>
+                <a:latin typeface="Courier New"/>
+              </a:rPr>
+              <a:t>base_hexadecimal</a:t>
+            </a:r>
+            <a:r>
+              <a:rPr b="0" lang="bs-BA" sz="2100" strike="noStrike" u="none">
+                <a:solidFill>
+                  <a:srgbClr val="009bdd"/>
+                </a:solidFill>
+                <a:uFillTx/>
+                <a:latin typeface="Arial"/>
+              </a:rPr>
+              <a:t> kao heksadekadske.</a:t>
+            </a:r>
+            <a:endParaRPr b="0" lang="bs-BA" sz="2100" strike="noStrike" u="none">
               <a:solidFill>
                 <a:srgbClr val="009bdd"/>
               </a:solidFill>
@@ -7686,16 +7651,16 @@
               <a:buChar char=""/>
             </a:pPr>
             <a:r>
-              <a:rPr b="0" lang="bs-BA" sz="2400" strike="noStrike" u="none">
-                <a:solidFill>
-                  <a:srgbClr val="009bdd"/>
-                </a:solidFill>
-                <a:uFillTx/>
-                <a:latin typeface="Arial"/>
-              </a:rPr>
-              <a:t>Operandi mnemonika i pretprocesorskih naredbi njihova su djeca.</a:t>
-            </a:r>
-            <a:endParaRPr b="0" lang="bs-BA" sz="2400" strike="noStrike" u="none">
+              <a:rPr b="0" lang="bs-BA" sz="2100" strike="noStrike" u="none">
+                <a:solidFill>
+                  <a:srgbClr val="009bdd"/>
+                </a:solidFill>
+                <a:uFillTx/>
+                <a:latin typeface="Arial"/>
+              </a:rPr>
+              <a:t>Zbog načina na koji je asembler napravljen, ako se te naredbe stave u if-grananje ili while-petlju, može se dogoditi da pretprocesor interpretira konstante kao dekadske, a asembler kao heksadekadske. Nema očitog rješenja za taj problem.</a:t>
+            </a:r>
+            <a:endParaRPr b="0" lang="bs-BA" sz="2100" strike="noStrike" u="none">
               <a:solidFill>
                 <a:srgbClr val="009bdd"/>
               </a:solidFill>
@@ -7719,7 +7684,7 @@
         <p:txBody>
           <a:bodyPr/>
           <a:p>
-            <a:fld id="{078F0073-59E5-47C2-BEAE-5D31C3846254}" type="slidenum">
+            <a:fld id="{86A3524A-E5D0-4F30-8700-2ACB4B82AB50}" type="slidenum">
               <a:t>23</a:t>
             </a:fld>
           </a:p>
@@ -7739,9 +7704,9 @@
         <p:txBody>
           <a:bodyPr/>
           <a:p>
-            <a:fld id="{A816CBD3-45FA-4056-A5B4-216E214DD2FC}" type="datetime1">
+            <a:fld id="{43B7A3DE-FFFD-4E0A-AF97-3ED45CB464F1}" type="datetime1">
               <a:rPr lang="en-US"/>
-              <a:t>03/24/2025</a:t>
+              <a:t>04/01/2025</a:t>
             </a:fld>
           </a:p>
         </p:txBody>
@@ -7778,7 +7743,248 @@
       </p:grpSpPr>
       <p:sp>
         <p:nvSpPr>
-          <p:cNvPr id="93" name="PlaceHolder 1"/>
+          <p:cNvPr id="94" name="PlaceHolder 1"/>
+          <p:cNvSpPr>
+            <a:spLocks noGrp="1"/>
+          </p:cNvSpPr>
+          <p:nvPr>
+            <p:ph type="title"/>
+          </p:nvPr>
+        </p:nvSpPr>
+        <p:spPr>
+          <a:xfrm>
+            <a:off x="360000" y="180000"/>
+            <a:ext cx="9360000" cy="478080"/>
+          </a:xfrm>
+          <a:prstGeom prst="rect">
+            <a:avLst/>
+          </a:prstGeom>
+          <a:noFill/>
+          <a:ln w="0">
+            <a:noFill/>
+          </a:ln>
+        </p:spPr>
+        <p:txBody>
+          <a:bodyPr lIns="0" rIns="0" tIns="0" bIns="0" anchor="ctr">
+            <a:noAutofit/>
+          </a:bodyPr>
+          <a:p>
+            <a:pPr indent="0" algn="ctr">
+              <a:buNone/>
+            </a:pPr>
+            <a:r>
+              <a:rPr b="0" lang="bs-BA" sz="3300" strike="noStrike" u="none">
+                <a:solidFill>
+                  <a:srgbClr val="ffffff"/>
+                </a:solidFill>
+                <a:uFillTx/>
+                <a:latin typeface="Arial"/>
+              </a:rPr>
+              <a:t>Bilješke o arhitekturi</a:t>
+            </a:r>
+            <a:endParaRPr b="0" lang="bs-BA" sz="3300" strike="noStrike" u="none">
+              <a:solidFill>
+                <a:srgbClr val="ffffff"/>
+              </a:solidFill>
+              <a:uFillTx/>
+              <a:latin typeface="Arial"/>
+            </a:endParaRPr>
+          </a:p>
+        </p:txBody>
+      </p:sp>
+      <p:sp>
+        <p:nvSpPr>
+          <p:cNvPr id="95" name="PlaceHolder 2"/>
+          <p:cNvSpPr>
+            <a:spLocks noGrp="1"/>
+          </p:cNvSpPr>
+          <p:nvPr>
+            <p:ph/>
+          </p:nvPr>
+        </p:nvSpPr>
+        <p:spPr>
+          <a:xfrm>
+            <a:off x="360000" y="1080000"/>
+            <a:ext cx="9360000" cy="3600000"/>
+          </a:xfrm>
+          <a:prstGeom prst="rect">
+            <a:avLst/>
+          </a:prstGeom>
+          <a:noFill/>
+          <a:ln w="0">
+            <a:noFill/>
+          </a:ln>
+        </p:spPr>
+        <p:txBody>
+          <a:bodyPr lIns="0" rIns="0" tIns="0" bIns="0" anchor="t">
+            <a:noAutofit/>
+          </a:bodyPr>
+          <a:p>
+            <a:pPr marL="432000" indent="-324000">
+              <a:spcBef>
+                <a:spcPts val="1060"/>
+              </a:spcBef>
+              <a:buClr>
+                <a:srgbClr val="77caee"/>
+              </a:buClr>
+              <a:buSzPct val="45000"/>
+              <a:buFont typeface="Wingdings" charset="2"/>
+              <a:buChar char=""/>
+            </a:pPr>
+            <a:r>
+              <a:rPr b="0" lang="bs-BA" sz="2400" strike="noStrike" u="none">
+                <a:solidFill>
+                  <a:srgbClr val="009bdd"/>
+                </a:solidFill>
+                <a:uFillTx/>
+                <a:latin typeface="Arial"/>
+              </a:rPr>
+              <a:t>Parseri većine asemblera pretvaraju tokenizirani asemblerski kod u dvodimenzionalno polje (tablicu) malih stabala (gdje su samo aritmetički izrazi stabla, a ostalo su pojedinačni čvorovi).</a:t>
+            </a:r>
+            <a:endParaRPr b="0" lang="bs-BA" sz="2400" strike="noStrike" u="none">
+              <a:solidFill>
+                <a:srgbClr val="009bdd"/>
+              </a:solidFill>
+              <a:uFillTx/>
+              <a:latin typeface="Arial"/>
+            </a:endParaRPr>
+          </a:p>
+          <a:p>
+            <a:pPr marL="432000" indent="-324000">
+              <a:spcBef>
+                <a:spcPts val="1060"/>
+              </a:spcBef>
+              <a:buClr>
+                <a:srgbClr val="77caee"/>
+              </a:buClr>
+              <a:buSzPct val="45000"/>
+              <a:buFont typeface="Wingdings" charset="2"/>
+              <a:buChar char=""/>
+            </a:pPr>
+            <a:r>
+              <a:rPr b="0" lang="bs-BA" sz="2400" strike="noStrike" u="none">
+                <a:solidFill>
+                  <a:srgbClr val="009bdd"/>
+                </a:solidFill>
+                <a:uFillTx/>
+                <a:latin typeface="Arial"/>
+              </a:rPr>
+              <a:t>Parser u ovom asembleru za PicoBlaze pretvara tokenizirani asemblerski kod u jedno veliko stablo. Korijen tog stabla je čvor s tekstom “assembly”, a čvorovi dubine 1 su mnemonike, pretprocesorske naredbe i labeli.</a:t>
+            </a:r>
+            <a:endParaRPr b="0" lang="bs-BA" sz="2400" strike="noStrike" u="none">
+              <a:solidFill>
+                <a:srgbClr val="009bdd"/>
+              </a:solidFill>
+              <a:uFillTx/>
+              <a:latin typeface="Arial"/>
+            </a:endParaRPr>
+          </a:p>
+          <a:p>
+            <a:pPr marL="432000" indent="-324000">
+              <a:spcBef>
+                <a:spcPts val="1060"/>
+              </a:spcBef>
+              <a:buClr>
+                <a:srgbClr val="77caee"/>
+              </a:buClr>
+              <a:buSzPct val="45000"/>
+              <a:buFont typeface="Wingdings" charset="2"/>
+              <a:buChar char=""/>
+            </a:pPr>
+            <a:r>
+              <a:rPr b="0" lang="bs-BA" sz="2400" strike="noStrike" u="none">
+                <a:solidFill>
+                  <a:srgbClr val="009bdd"/>
+                </a:solidFill>
+                <a:uFillTx/>
+                <a:latin typeface="Arial"/>
+              </a:rPr>
+              <a:t>Operandi mnemonika i pretprocesorskih naredbi njihova su djeca.</a:t>
+            </a:r>
+            <a:endParaRPr b="0" lang="bs-BA" sz="2400" strike="noStrike" u="none">
+              <a:solidFill>
+                <a:srgbClr val="009bdd"/>
+              </a:solidFill>
+              <a:uFillTx/>
+              <a:latin typeface="Arial"/>
+            </a:endParaRPr>
+          </a:p>
+        </p:txBody>
+      </p:sp>
+      <p:sp>
+        <p:nvSpPr>
+          <p:cNvPr id="4" name="PlaceHolder 3"/>
+          <p:cNvSpPr>
+            <a:spLocks noGrp="1"/>
+          </p:cNvSpPr>
+          <p:nvPr>
+            <p:ph type="sldNum" idx="6"/>
+          </p:nvPr>
+        </p:nvSpPr>
+        <p:spPr/>
+        <p:txBody>
+          <a:bodyPr/>
+          <a:p>
+            <a:fld id="{BB7A8CC2-58B6-4D3C-B3A7-AAC7D377BD13}" type="slidenum">
+              <a:t>24</a:t>
+            </a:fld>
+          </a:p>
+        </p:txBody>
+      </p:sp>
+      <p:sp>
+        <p:nvSpPr>
+          <p:cNvPr id="5" name="PlaceHolder 4"/>
+          <p:cNvSpPr>
+            <a:spLocks noGrp="1"/>
+          </p:cNvSpPr>
+          <p:nvPr>
+            <p:ph type="dt" idx="4"/>
+          </p:nvPr>
+        </p:nvSpPr>
+        <p:spPr/>
+        <p:txBody>
+          <a:bodyPr/>
+          <a:p>
+            <a:fld id="{3BC7955A-E426-4A76-AEB6-66AA0266A89B}" type="datetime1">
+              <a:rPr lang="en-US"/>
+              <a:t>04/01/2025</a:t>
+            </a:fld>
+          </a:p>
+        </p:txBody>
+      </p:sp>
+    </p:spTree>
+  </p:cSld>
+  <mc:AlternateContent>
+    <mc:Choice Requires="p14">
+      <p:transition spd="slow" p14:dur="2000"/>
+    </mc:Choice>
+    <mc:Fallback>
+      <p:transition spd="slow"/>
+    </mc:Fallback>
+  </mc:AlternateContent>
+</p:sld>
+</file>
+
+<file path=ppt/slides/slide25.xml><?xml version="1.0" encoding="utf-8"?>
+<p:sld xmlns:a="http://schemas.openxmlformats.org/drawingml/2006/main" xmlns:p="http://schemas.openxmlformats.org/presentationml/2006/main" xmlns:r="http://schemas.openxmlformats.org/officeDocument/2006/relationships" xmlns:p14="http://schemas.microsoft.com/office/powerpoint/2010/main" xmlns:p15="http://schemas.microsoft.com/office/powerpoint/2012/main" xmlns:mc="http://schemas.openxmlformats.org/markup-compatibility/2006">
+  <p:cSld>
+    <p:spTree>
+      <p:nvGrpSpPr>
+        <p:cNvPr id="1" name=""/>
+        <p:cNvGrpSpPr/>
+        <p:nvPr/>
+      </p:nvGrpSpPr>
+      <p:grpSpPr>
+        <a:xfrm>
+          <a:off x="0" y="0"/>
+          <a:ext cx="0" cy="0"/>
+          <a:chOff x="0" y="0"/>
+          <a:chExt cx="0" cy="0"/>
+        </a:xfrm>
+      </p:grpSpPr>
+      <p:sp>
+        <p:nvSpPr>
+          <p:cNvPr id="96" name="PlaceHolder 1"/>
           <p:cNvSpPr>
             <a:spLocks noGrp="1"/>
           </p:cNvSpPr>
@@ -7845,8 +8051,8 @@
         <p:txBody>
           <a:bodyPr/>
           <a:p>
-            <a:fld id="{39DC9BF3-9971-44D9-A3F8-7758A50777C4}" type="slidenum">
-              <a:t>24</a:t>
+            <a:fld id="{F06EBB81-0C06-41A2-8003-BE0748AF3FAE}" type="slidenum">
+              <a:t>25</a:t>
             </a:fld>
           </a:p>
         </p:txBody>
@@ -7865,9 +8071,9 @@
         <p:txBody>
           <a:bodyPr/>
           <a:p>
-            <a:fld id="{AD1E0D7C-D88E-4331-A1FE-A0D27FAC61A0}" type="datetime1">
+            <a:fld id="{F7E6F624-D9B8-4CC9-8474-E74BCCFB8562}" type="datetime1">
               <a:rPr lang="en-US"/>
-              <a:t>03/24/2025</a:t>
+              <a:t>04/01/2025</a:t>
             </a:fld>
           </a:p>
         </p:txBody>
@@ -8155,7 +8361,7 @@
         <p:txBody>
           <a:bodyPr/>
           <a:p>
-            <a:fld id="{99987232-C852-4A6E-9F31-864BA716A96F}" type="slidenum">
+            <a:fld id="{13A63200-AFE6-4908-9A87-82556E62E312}" type="slidenum">
               <a:t>3</a:t>
             </a:fld>
           </a:p>
@@ -8175,9 +8381,9 @@
         <p:txBody>
           <a:bodyPr/>
           <a:p>
-            <a:fld id="{9ECEA5B8-C93E-4E7E-9C0D-EBECAECDE199}" type="datetime1">
+            <a:fld id="{FC03F4A2-A075-4CA7-9160-5420EDBCD8D5}" type="datetime1">
               <a:rPr lang="en-US"/>
-              <a:t>03/24/2025</a:t>
+              <a:t>04/01/2025</a:t>
             </a:fld>
           </a:p>
         </p:txBody>
@@ -8414,7 +8620,7 @@
         <p:txBody>
           <a:bodyPr/>
           <a:p>
-            <a:fld id="{2FCBF701-5F39-4AE7-B5D9-BE27F21F2B00}" type="slidenum">
+            <a:fld id="{18F6F5C1-2AC1-4E6F-9F9A-28AB31D2DA45}" type="slidenum">
               <a:t>4</a:t>
             </a:fld>
           </a:p>
@@ -8434,9 +8640,9 @@
         <p:txBody>
           <a:bodyPr/>
           <a:p>
-            <a:fld id="{52E51FC4-A861-4BC0-BEFC-D216D4A51CB4}" type="datetime1">
+            <a:fld id="{800B0778-1D30-450B-8422-1D96BE41FDFA}" type="datetime1">
               <a:rPr lang="en-US"/>
-              <a:t>03/24/2025</a:t>
+              <a:t>04/01/2025</a:t>
             </a:fld>
           </a:p>
         </p:txBody>
@@ -8686,7 +8892,7 @@
         <p:txBody>
           <a:bodyPr/>
           <a:p>
-            <a:fld id="{FADF69B6-FB84-4802-9BDD-BF72E7D39ED6}" type="slidenum">
+            <a:fld id="{1D910F24-E99E-49F5-AEE8-8B6D370C4889}" type="slidenum">
               <a:t>5</a:t>
             </a:fld>
           </a:p>
@@ -8706,9 +8912,9 @@
         <p:txBody>
           <a:bodyPr/>
           <a:p>
-            <a:fld id="{B428C188-AAD1-4605-8C89-E46EABB6AA5B}" type="datetime1">
+            <a:fld id="{9E984410-21FD-41B3-94AB-89A56E36D678}" type="datetime1">
               <a:rPr lang="en-US"/>
-              <a:t>03/24/2025</a:t>
+              <a:t>04/01/2025</a:t>
             </a:fld>
           </a:p>
         </p:txBody>
@@ -9071,7 +9277,7 @@
         <p:txBody>
           <a:bodyPr/>
           <a:p>
-            <a:fld id="{337EBF35-EBC3-44A9-88D1-BA3B173C1AB6}" type="slidenum">
+            <a:fld id="{35712F08-F43E-43A8-B4AF-0B3FAAC94BBF}" type="slidenum">
               <a:t>6</a:t>
             </a:fld>
           </a:p>
@@ -9091,9 +9297,9 @@
         <p:txBody>
           <a:bodyPr/>
           <a:p>
-            <a:fld id="{D0201804-1928-474F-89C9-8B7AC662AB7D}" type="datetime1">
+            <a:fld id="{98202C24-2306-400E-A64F-F7ED74962601}" type="datetime1">
               <a:rPr lang="en-US"/>
-              <a:t>03/24/2025</a:t>
+              <a:t>04/01/2025</a:t>
             </a:fld>
           </a:p>
         </p:txBody>
@@ -9413,7 +9619,7 @@
         <p:txBody>
           <a:bodyPr/>
           <a:p>
-            <a:fld id="{30225AE0-7C2B-4E4E-8396-B87951CD0EAA}" type="slidenum">
+            <a:fld id="{7F590E55-4B55-4D54-A728-1CC631E48A4B}" type="slidenum">
               <a:t>7</a:t>
             </a:fld>
           </a:p>
@@ -9433,9 +9639,9 @@
         <p:txBody>
           <a:bodyPr/>
           <a:p>
-            <a:fld id="{9B60300B-D4AD-4EB6-AD01-FEAE06569F07}" type="datetime1">
+            <a:fld id="{1442A06E-5F7A-49C2-BB11-4E638B62F0EE}" type="datetime1">
               <a:rPr lang="en-US"/>
-              <a:t>03/24/2025</a:t>
+              <a:t>04/01/2025</a:t>
             </a:fld>
           </a:p>
         </p:txBody>
@@ -9502,16 +9708,16 @@
               <a:buNone/>
             </a:pPr>
             <a:r>
-              <a:rPr b="0" lang="bs-BA" sz="3300" strike="noStrike" u="none">
+              <a:rPr b="0" lang="bs-BA" sz="3200" strike="noStrike" u="none">
                 <a:solidFill>
                   <a:srgbClr val="ffffff"/>
                 </a:solidFill>
                 <a:uFillTx/>
                 <a:latin typeface="Arial"/>
               </a:rPr>
-              <a:t>Kako se koristi...</a:t>
-            </a:r>
-            <a:endParaRPr b="0" lang="bs-BA" sz="3300" strike="noStrike" u="none">
+              <a:t>U slučaju krivo napisanog imena konstante ili labela</a:t>
+            </a:r>
+            <a:endParaRPr b="0" lang="bs-BA" sz="3200" strike="noStrike" u="none">
               <a:solidFill>
                 <a:srgbClr val="ffffff"/>
               </a:solidFill>
@@ -9533,7 +9739,7 @@
         </p:nvSpPr>
         <p:spPr>
           <a:xfrm>
-            <a:off x="5155920" y="1080000"/>
+            <a:off x="360000" y="1080000"/>
             <a:ext cx="4567320" cy="3600000"/>
           </a:xfrm>
           <a:prstGeom prst="rect">
@@ -9568,7 +9774,7 @@
                 <a:uFillTx/>
                 <a:latin typeface="Arial"/>
               </a:rPr>
-              <a:t>Onda, možemo, recimo, kliknuti na Fast Forward...</a:t>
+              <a:t>U slučaju da asembler naiđe na nešto što pretpostavlja da je krivo napisano ime konstante ili labela, on, od verzije v5.1.0, primjenjuje algoritam Levenshtain distance da pokuša pronaći na koju je konstantu ili label korisnik mislio, te ga pita o tome confirmom.</a:t>
             </a:r>
             <a:endParaRPr b="0" lang="bs-BA" sz="2400" strike="noStrike" u="none">
               <a:solidFill>
@@ -9592,8 +9798,8 @@
         </p:blipFill>
         <p:spPr>
           <a:xfrm>
-            <a:off x="228600" y="1143000"/>
-            <a:ext cx="4625280" cy="2437920"/>
+            <a:off x="6172200" y="2148840"/>
+            <a:ext cx="3291480" cy="1386360"/>
           </a:xfrm>
           <a:prstGeom prst="rect">
             <a:avLst/>
@@ -9606,49 +9812,6 @@
       </p:pic>
       <p:sp>
         <p:nvSpPr>
-          <p:cNvPr id="48" name=""/>
-          <p:cNvSpPr/>
-          <p:nvPr/>
-        </p:nvSpPr>
-        <p:spPr>
-          <a:xfrm>
-            <a:off x="2057400" y="1143000"/>
-            <a:ext cx="457200" cy="457200"/>
-          </a:xfrm>
-          <a:prstGeom prst="ellipse">
-            <a:avLst/>
-          </a:prstGeom>
-          <a:noFill/>
-          <a:ln w="18000">
-            <a:solidFill>
-              <a:srgbClr val="009bdd"/>
-            </a:solidFill>
-            <a:round/>
-          </a:ln>
-        </p:spPr>
-        <p:style>
-          <a:lnRef idx="0"/>
-          <a:fillRef idx="0"/>
-          <a:effectRef idx="0"/>
-          <a:fontRef idx="minor"/>
-        </p:style>
-        <p:txBody>
-          <a:bodyPr wrap="none" lIns="90000" rIns="90000" tIns="45000" bIns="45000" anchor="ctr">
-            <a:noAutofit/>
-          </a:bodyPr>
-          <a:p>
-            <a:endParaRPr b="0" lang="bs-BA" sz="1800" strike="noStrike" u="none">
-              <a:solidFill>
-                <a:srgbClr val="000000"/>
-              </a:solidFill>
-              <a:uFillTx/>
-              <a:latin typeface="Arial"/>
-            </a:endParaRPr>
-          </a:p>
-        </p:txBody>
-      </p:sp>
-      <p:sp>
-        <p:nvSpPr>
           <p:cNvPr id="4" name="PlaceHolder 3"/>
           <p:cNvSpPr>
             <a:spLocks noGrp="1"/>
@@ -9661,7 +9824,7 @@
         <p:txBody>
           <a:bodyPr/>
           <a:p>
-            <a:fld id="{A8FFBAF8-AC3D-4B1E-9907-AE188D813B0F}" type="slidenum">
+            <a:fld id="{41BCE5D4-76B1-4144-9C4E-11C402C1B7D2}" type="slidenum">
               <a:t>8</a:t>
             </a:fld>
           </a:p>
@@ -9681,9 +9844,9 @@
         <p:txBody>
           <a:bodyPr/>
           <a:p>
-            <a:fld id="{74AF3A89-D28C-4339-8799-64380733A280}" type="datetime1">
+            <a:fld id="{66A90D03-E172-42AA-83AE-8240C08BF148}" type="datetime1">
               <a:rPr lang="en-US"/>
-              <a:t>03/24/2025</a:t>
+              <a:t>04/01/2025</a:t>
             </a:fld>
           </a:p>
         </p:txBody>
@@ -9720,7 +9883,7 @@
       </p:grpSpPr>
       <p:sp>
         <p:nvSpPr>
-          <p:cNvPr id="49" name="PlaceHolder 1"/>
+          <p:cNvPr id="48" name="PlaceHolder 1"/>
           <p:cNvSpPr>
             <a:spLocks noGrp="1"/>
           </p:cNvSpPr>
@@ -9771,7 +9934,7 @@
       </p:sp>
       <p:sp>
         <p:nvSpPr>
-          <p:cNvPr id="50" name="PlaceHolder 2"/>
+          <p:cNvPr id="49" name="PlaceHolder 2"/>
           <p:cNvSpPr>
             <a:spLocks noGrp="1"/>
           </p:cNvSpPr>
@@ -9816,7 +9979,7 @@
                 <a:uFillTx/>
                 <a:latin typeface="Arial"/>
               </a:rPr>
-              <a:t>Da bismo komunicirali s programima kao što je “Binary to Decimal” (prvi primjer u flexboxu “Examples” s lijeva), možemo koristiti SVG-ove generirane u JavaScriptu, koji predstavljaju switcheve, LED-ice i sedam-segmentne pokaznike.</a:t>
+              <a:t>Onda, možemo, recimo, kliknuti na Fast Forward...</a:t>
             </a:r>
             <a:endParaRPr b="0" lang="bs-BA" sz="2400" strike="noStrike" u="none">
               <a:solidFill>
@@ -9830,7 +9993,7 @@
       </p:sp>
       <p:pic>
         <p:nvPicPr>
-          <p:cNvPr id="51" name="" descr=""/>
+          <p:cNvPr id="50" name="" descr=""/>
           <p:cNvPicPr/>
           <p:nvPr/>
         </p:nvPicPr>
@@ -9840,8 +10003,8 @@
         </p:blipFill>
         <p:spPr>
           <a:xfrm>
-            <a:off x="335520" y="1143000"/>
-            <a:ext cx="4693680" cy="1958040"/>
+            <a:off x="228600" y="1143000"/>
+            <a:ext cx="4625280" cy="2437920"/>
           </a:xfrm>
           <a:prstGeom prst="rect">
             <a:avLst/>
@@ -9854,6 +10017,49 @@
       </p:pic>
       <p:sp>
         <p:nvSpPr>
+          <p:cNvPr id="51" name=""/>
+          <p:cNvSpPr/>
+          <p:nvPr/>
+        </p:nvSpPr>
+        <p:spPr>
+          <a:xfrm>
+            <a:off x="2057400" y="1143000"/>
+            <a:ext cx="457200" cy="457200"/>
+          </a:xfrm>
+          <a:prstGeom prst="ellipse">
+            <a:avLst/>
+          </a:prstGeom>
+          <a:noFill/>
+          <a:ln w="18000">
+            <a:solidFill>
+              <a:srgbClr val="009bdd"/>
+            </a:solidFill>
+            <a:round/>
+          </a:ln>
+        </p:spPr>
+        <p:style>
+          <a:lnRef idx="0"/>
+          <a:fillRef idx="0"/>
+          <a:effectRef idx="0"/>
+          <a:fontRef idx="minor"/>
+        </p:style>
+        <p:txBody>
+          <a:bodyPr wrap="none" lIns="90000" rIns="90000" tIns="45000" bIns="45000" anchor="ctr">
+            <a:noAutofit/>
+          </a:bodyPr>
+          <a:p>
+            <a:endParaRPr b="0" lang="bs-BA" sz="1800" strike="noStrike" u="none">
+              <a:solidFill>
+                <a:srgbClr val="000000"/>
+              </a:solidFill>
+              <a:uFillTx/>
+              <a:latin typeface="Arial"/>
+            </a:endParaRPr>
+          </a:p>
+        </p:txBody>
+      </p:sp>
+      <p:sp>
+        <p:nvSpPr>
           <p:cNvPr id="4" name="PlaceHolder 3"/>
           <p:cNvSpPr>
             <a:spLocks noGrp="1"/>
@@ -9866,7 +10072,7 @@
         <p:txBody>
           <a:bodyPr/>
           <a:p>
-            <a:fld id="{6BAEA98C-86AE-4259-BB20-46540F5FBF88}" type="slidenum">
+            <a:fld id="{55353AF6-45C0-41CA-AA4D-35FDB03147C1}" type="slidenum">
               <a:t>9</a:t>
             </a:fld>
           </a:p>
@@ -9886,9 +10092,9 @@
         <p:txBody>
           <a:bodyPr/>
           <a:p>
-            <a:fld id="{047E89ED-EC08-4720-B66A-A517A5EC4498}" type="datetime1">
+            <a:fld id="{C72E931D-7C5F-4654-8E43-6C01C6089CF6}" type="datetime1">
               <a:rPr lang="en-US"/>
-              <a:t>03/24/2025</a:t>
+              <a:t>04/01/2025</a:t>
             </a:fld>
           </a:p>
         </p:txBody>

</xml_diff>

<commit_message>
Documented the `print_string` pseudo-mnemonic
</commit_message>
<xml_diff>
--- a/seminar/PicoBlaze.pptx
+++ b/seminar/PicoBlaze.pptx
@@ -31,6 +31,7 @@
     <p:sldId id="278" r:id="rId26"/>
     <p:sldId id="279" r:id="rId27"/>
     <p:sldId id="280" r:id="rId28"/>
+    <p:sldId id="281" r:id="rId29"/>
   </p:sldIdLst>
   <p:sldSz cx="10080625" cy="5670550"/>
   <p:notesSz cx="7559675" cy="10691813"/>
@@ -88,7 +89,7 @@
         <p:txBody>
           <a:bodyPr/>
           <a:p>
-            <a:fld id="{B898200B-4967-4F93-BC6E-BA7686B63672}" type="slidenum">
+            <a:fld id="{59817E1F-8476-42A7-8D77-46993FB779E6}" type="slidenum">
               <a:t>&lt;#&gt;</a:t>
             </a:fld>
           </a:p>
@@ -256,7 +257,7 @@
         <p:txBody>
           <a:bodyPr/>
           <a:p>
-            <a:fld id="{DB2026B4-0D0B-474C-B445-4367306FED27}" type="slidenum">
+            <a:fld id="{D9A95472-0C8E-4B66-A2B5-EBEB3EAF2749}" type="slidenum">
               <a:t>&lt;#&gt;</a:t>
             </a:fld>
           </a:p>
@@ -512,7 +513,7 @@
         <p:txBody>
           <a:bodyPr/>
           <a:p>
-            <a:fld id="{B8052118-6D99-4502-B502-92DDAE9627BB}" type="slidenum">
+            <a:fld id="{36CB555A-22EB-4FA6-8FF9-851DD812A38C}" type="slidenum">
               <a:t>&lt;#&gt;</a:t>
             </a:fld>
           </a:p>
@@ -724,7 +725,7 @@
         <p:txBody>
           <a:bodyPr/>
           <a:p>
-            <a:fld id="{E549771B-7B81-461F-B035-7EE1FEE9D6A8}" type="slidenum">
+            <a:fld id="{7943D480-FA17-4B4B-87D1-14BA72A91EB5}" type="slidenum">
               <a:t>&lt;#&gt;</a:t>
             </a:fld>
           </a:p>
@@ -807,7 +808,7 @@
         <p:txBody>
           <a:bodyPr/>
           <a:p>
-            <a:fld id="{930F5F82-73C8-4232-A0AC-F9890556849C}" type="slidenum">
+            <a:fld id="{46FA5D9C-17F9-40CF-B198-96E7856619EC}" type="slidenum">
               <a:t>&lt;#&gt;</a:t>
             </a:fld>
           </a:p>
@@ -1748,7 +1749,7 @@
             <a:pPr indent="0" algn="r">
               <a:buNone/>
             </a:pPr>
-            <a:fld id="{E019901A-6BE6-47E0-8381-B687F1EA007E}" type="slidenum">
+            <a:fld id="{67CE8A4B-CEDB-4F52-B388-6168EB0C3661}" type="slidenum">
               <a:rPr b="0" lang="bs-BA" sz="1400" strike="noStrike" u="none">
                 <a:solidFill>
                   <a:srgbClr val="ffffff"/>
@@ -3119,7 +3120,7 @@
             <a:pPr indent="0" algn="r">
               <a:buNone/>
             </a:pPr>
-            <a:fld id="{37DD6535-1BE8-4DE1-B180-493F80368CC0}" type="slidenum">
+            <a:fld id="{1030D601-25E7-4CB8-96D3-1E3D0D7D9EE9}" type="slidenum">
               <a:rPr b="0" lang="bs-BA" sz="1400" strike="noStrike" u="none">
                 <a:solidFill>
                   <a:srgbClr val="ffffff"/>
@@ -3451,7 +3452,7 @@
         <p:txBody>
           <a:bodyPr/>
           <a:p>
-            <a:fld id="{F0E4E2EF-DE6D-4E99-9D7F-05F73FA560A5}" type="slidenum">
+            <a:fld id="{9D95313D-51C3-46C3-B9E0-759E9E0D68AC}" type="slidenum">
               <a:t>10</a:t>
             </a:fld>
           </a:p>
@@ -3471,9 +3472,9 @@
         <p:txBody>
           <a:bodyPr/>
           <a:p>
-            <a:fld id="{3A2529D7-BC1A-4EF6-8C3E-166F10473F2F}" type="datetime1">
+            <a:fld id="{C4F374EF-922D-4010-8E4C-5F4A8E79D39B}" type="datetime1">
               <a:rPr lang="en-US"/>
-              <a:t>04/01/2025</a:t>
+              <a:t>04/14/2025</a:t>
             </a:fld>
           </a:p>
         </p:txBody>
@@ -3799,7 +3800,7 @@
         <p:txBody>
           <a:bodyPr/>
           <a:p>
-            <a:fld id="{4475032F-87B4-4273-868B-C9EEDD7A315D}" type="slidenum">
+            <a:fld id="{18AEEA66-6288-4BA4-8DEC-736BBBB88485}" type="slidenum">
               <a:t>11</a:t>
             </a:fld>
           </a:p>
@@ -3819,9 +3820,9 @@
         <p:txBody>
           <a:bodyPr/>
           <a:p>
-            <a:fld id="{10429A2B-1BA1-42CF-8CFE-14DF7DB88E7E}" type="datetime1">
+            <a:fld id="{FA934E66-7E0A-4857-90F7-656444B638CA}" type="datetime1">
               <a:rPr lang="en-US"/>
-              <a:t>04/01/2025</a:t>
+              <a:t>04/14/2025</a:t>
             </a:fld>
           </a:p>
         </p:txBody>
@@ -4097,7 +4098,7 @@
         <p:txBody>
           <a:bodyPr/>
           <a:p>
-            <a:fld id="{2922666B-3647-454E-871A-E15308357421}" type="slidenum">
+            <a:fld id="{5CD6791A-F1E9-472B-97E6-86C90A88F191}" type="slidenum">
               <a:t>12</a:t>
             </a:fld>
           </a:p>
@@ -4117,9 +4118,9 @@
         <p:txBody>
           <a:bodyPr/>
           <a:p>
-            <a:fld id="{17B747CB-AC48-4156-84D2-BE8E42C2E6B6}" type="datetime1">
+            <a:fld id="{FFE3383B-A346-4B1C-982A-E7580CF9B5EA}" type="datetime1">
               <a:rPr lang="en-US"/>
-              <a:t>04/01/2025</a:t>
+              <a:t>04/14/2025</a:t>
             </a:fld>
           </a:p>
         </p:txBody>
@@ -4352,7 +4353,7 @@
         <p:txBody>
           <a:bodyPr/>
           <a:p>
-            <a:fld id="{D672491C-3883-49B4-8069-494DD6607ED6}" type="slidenum">
+            <a:fld id="{E8E4E726-A200-422A-BB40-9C5094F126F0}" type="slidenum">
               <a:t>13</a:t>
             </a:fld>
           </a:p>
@@ -4372,9 +4373,9 @@
         <p:txBody>
           <a:bodyPr/>
           <a:p>
-            <a:fld id="{C5C67459-D92E-43B4-AE2E-981C9047018F}" type="datetime1">
+            <a:fld id="{4F36E4A8-FC43-44DD-A5E6-D3294336A069}" type="datetime1">
               <a:rPr lang="en-US"/>
-              <a:t>04/01/2025</a:t>
+              <a:t>04/14/2025</a:t>
             </a:fld>
           </a:p>
         </p:txBody>
@@ -4651,7 +4652,7 @@
         <p:txBody>
           <a:bodyPr/>
           <a:p>
-            <a:fld id="{F8BF14C2-83E3-4E30-8BC7-02A2E25286CB}" type="slidenum">
+            <a:fld id="{77C68A0A-EC28-4ECB-BD50-CCDDC5D4A58D}" type="slidenum">
               <a:t>14</a:t>
             </a:fld>
           </a:p>
@@ -4671,9 +4672,9 @@
         <p:txBody>
           <a:bodyPr/>
           <a:p>
-            <a:fld id="{5BD3C126-4157-4798-9B5A-9CFF711176CF}" type="datetime1">
+            <a:fld id="{D4F886C8-DD11-4169-8F7F-0CDCB1033C3C}" type="datetime1">
               <a:rPr lang="en-US"/>
-              <a:t>04/01/2025</a:t>
+              <a:t>04/14/2025</a:t>
             </a:fld>
           </a:p>
         </p:txBody>
@@ -4942,7 +4943,7 @@
         <p:txBody>
           <a:bodyPr/>
           <a:p>
-            <a:fld id="{7411084D-123B-45A5-930F-F4B8B5A63BCA}" type="slidenum">
+            <a:fld id="{ED010791-D29E-44A3-A50D-E5231991287C}" type="slidenum">
               <a:t>15</a:t>
             </a:fld>
           </a:p>
@@ -4962,9 +4963,9 @@
         <p:txBody>
           <a:bodyPr/>
           <a:p>
-            <a:fld id="{DE825E2D-BFD3-40A5-9EDE-36988109AC7B}" type="datetime1">
+            <a:fld id="{4E220718-BE79-4EC2-8225-D1C86A749082}" type="datetime1">
               <a:rPr lang="en-US"/>
-              <a:t>04/01/2025</a:t>
+              <a:t>04/14/2025</a:t>
             </a:fld>
           </a:p>
         </p:txBody>
@@ -5123,7 +5124,7 @@
         <p:txBody>
           <a:bodyPr/>
           <a:p>
-            <a:fld id="{E6FAD8C0-8C8B-4F2C-85BF-A18FC775A61E}" type="slidenum">
+            <a:fld id="{59DBC9C1-A533-4A9B-BB63-24BF05C45461}" type="slidenum">
               <a:t>16</a:t>
             </a:fld>
           </a:p>
@@ -5143,9 +5144,9 @@
         <p:txBody>
           <a:bodyPr/>
           <a:p>
-            <a:fld id="{D9692F91-8DC3-4259-A108-F6A18B6D7DF4}" type="datetime1">
+            <a:fld id="{8566C6A3-3EEA-4209-82B5-95733DDC6ED9}" type="datetime1">
               <a:rPr lang="en-US"/>
-              <a:t>04/01/2025</a:t>
+              <a:t>04/14/2025</a:t>
             </a:fld>
           </a:p>
         </p:txBody>
@@ -5368,7 +5369,7 @@
         <p:txBody>
           <a:bodyPr/>
           <a:p>
-            <a:fld id="{D87D285D-4CC5-45EE-AC5A-A22C1B319248}" type="slidenum">
+            <a:fld id="{DC19D314-B82A-49DC-82AA-1CF896B17294}" type="slidenum">
               <a:t>17</a:t>
             </a:fld>
           </a:p>
@@ -5388,9 +5389,9 @@
         <p:txBody>
           <a:bodyPr/>
           <a:p>
-            <a:fld id="{255E6BDB-3002-47FE-94D5-75B04A461D03}" type="datetime1">
+            <a:fld id="{F8BC7BAA-9AA6-4BC8-B7FB-7C51C91AEBD5}" type="datetime1">
               <a:rPr lang="en-US"/>
-              <a:t>04/01/2025</a:t>
+              <a:t>04/14/2025</a:t>
             </a:fld>
           </a:p>
         </p:txBody>
@@ -5733,7 +5734,7 @@
         <p:txBody>
           <a:bodyPr/>
           <a:p>
-            <a:fld id="{1C0ADA6F-DECF-4F22-BE27-8D2495603A84}" type="slidenum">
+            <a:fld id="{28A7B004-C4B8-40EE-AF65-A5AEAD398F88}" type="slidenum">
               <a:t>18</a:t>
             </a:fld>
           </a:p>
@@ -5753,9 +5754,9 @@
         <p:txBody>
           <a:bodyPr/>
           <a:p>
-            <a:fld id="{DB40D812-C911-424C-A9A8-5546FD456456}" type="datetime1">
+            <a:fld id="{08DF81C5-54EB-433A-B8DC-97518528CA1B}" type="datetime1">
               <a:rPr lang="en-US"/>
-              <a:t>04/01/2025</a:t>
+              <a:t>04/14/2025</a:t>
             </a:fld>
           </a:p>
         </p:txBody>
@@ -5958,7 +5959,7 @@
         <p:txBody>
           <a:bodyPr/>
           <a:p>
-            <a:fld id="{96F630F1-26A9-42AB-9F56-74E3F6C7618A}" type="slidenum">
+            <a:fld id="{46EA10C1-96F5-4C94-99F3-E849249F1006}" type="slidenum">
               <a:t>19</a:t>
             </a:fld>
           </a:p>
@@ -5978,9 +5979,9 @@
         <p:txBody>
           <a:bodyPr/>
           <a:p>
-            <a:fld id="{1DF28D8D-4EF2-4C0E-9A59-460F04F2FAA6}" type="datetime1">
+            <a:fld id="{D105A9D6-4E9F-41D3-A6E7-4924E0F0114B}" type="datetime1">
               <a:rPr lang="en-US"/>
-              <a:t>04/01/2025</a:t>
+              <a:t>04/14/2025</a:t>
             </a:fld>
           </a:p>
         </p:txBody>
@@ -6319,7 +6320,7 @@
         <p:txBody>
           <a:bodyPr/>
           <a:p>
-            <a:fld id="{F5C9D8FE-ACF0-4CC7-BF04-9983D63DFF2A}" type="slidenum">
+            <a:fld id="{5461B5B5-AC37-46B9-A0AF-8C2B87C164D3}" type="slidenum">
               <a:t>2</a:t>
             </a:fld>
           </a:p>
@@ -6339,9 +6340,9 @@
         <p:txBody>
           <a:bodyPr/>
           <a:p>
-            <a:fld id="{84A0F887-7323-49CE-A779-536778ED8B6A}" type="datetime1">
+            <a:fld id="{C5D9F1BF-07D6-487F-BF58-E74DA5E84A34}" type="datetime1">
               <a:rPr lang="en-US"/>
-              <a:t>04/01/2025</a:t>
+              <a:t>04/14/2025</a:t>
             </a:fld>
           </a:p>
         </p:txBody>
@@ -6620,7 +6621,7 @@
         <p:txBody>
           <a:bodyPr/>
           <a:p>
-            <a:fld id="{97199030-3549-4B47-A5DF-8199A865D054}" type="slidenum">
+            <a:fld id="{3C9F003E-3EAA-4177-9463-CFF47993AFD5}" type="slidenum">
               <a:t>20</a:t>
             </a:fld>
           </a:p>
@@ -6640,9 +6641,9 @@
         <p:txBody>
           <a:bodyPr/>
           <a:p>
-            <a:fld id="{7CA29D95-ED15-4BA1-93F9-B2D4DF1377D1}" type="datetime1">
+            <a:fld id="{544B47D2-C802-4ED3-96C5-0681599E18B9}" type="datetime1">
               <a:rPr lang="en-US"/>
-              <a:t>04/01/2025</a:t>
+              <a:t>04/14/2025</a:t>
             </a:fld>
           </a:p>
         </p:txBody>
@@ -7091,7 +7092,7 @@
         <p:txBody>
           <a:bodyPr/>
           <a:p>
-            <a:fld id="{25917F84-72C4-491E-A2DE-B21921CBCC1A}" type="slidenum">
+            <a:fld id="{D815974D-DEF0-4572-8E90-F3246C5EF39E}" type="slidenum">
               <a:t>21</a:t>
             </a:fld>
           </a:p>
@@ -7111,9 +7112,9 @@
         <p:txBody>
           <a:bodyPr/>
           <a:p>
-            <a:fld id="{D024F3D4-5A0E-47C7-8663-4B2B16991711}" type="datetime1">
+            <a:fld id="{0B273837-6E43-4B89-8DEE-B4C09B1686EB}" type="datetime1">
               <a:rPr lang="en-US"/>
-              <a:t>04/01/2025</a:t>
+              <a:t>04/14/2025</a:t>
             </a:fld>
           </a:p>
         </p:txBody>
@@ -7403,7 +7404,7 @@
         <p:txBody>
           <a:bodyPr/>
           <a:p>
-            <a:fld id="{AD0F523C-DCC7-4144-93A6-85D8A76B2789}" type="slidenum">
+            <a:fld id="{E536D642-6BE8-41DD-B029-F0F735E54B7A}" type="slidenum">
               <a:t>22</a:t>
             </a:fld>
           </a:p>
@@ -7423,9 +7424,9 @@
         <p:txBody>
           <a:bodyPr/>
           <a:p>
-            <a:fld id="{3152DF54-BAAF-470B-A543-BB04F630E637}" type="datetime1">
+            <a:fld id="{41D24937-1CEE-4C3F-857C-A0D0F6EB1394}" type="datetime1">
               <a:rPr lang="en-US"/>
-              <a:t>04/01/2025</a:t>
+              <a:t>04/14/2025</a:t>
             </a:fld>
           </a:p>
         </p:txBody>
@@ -7684,7 +7685,7 @@
         <p:txBody>
           <a:bodyPr/>
           <a:p>
-            <a:fld id="{86A3524A-E5D0-4F30-8700-2ACB4B82AB50}" type="slidenum">
+            <a:fld id="{82C54D99-EF02-4636-A77A-42438AD66DEE}" type="slidenum">
               <a:t>23</a:t>
             </a:fld>
           </a:p>
@@ -7704,9 +7705,9 @@
         <p:txBody>
           <a:bodyPr/>
           <a:p>
-            <a:fld id="{43B7A3DE-FFFD-4E0A-AF97-3ED45CB464F1}" type="datetime1">
+            <a:fld id="{41A138C0-AB11-42EC-A21A-11A96C175189}" type="datetime1">
               <a:rPr lang="en-US"/>
-              <a:t>04/01/2025</a:t>
+              <a:t>04/14/2025</a:t>
             </a:fld>
           </a:p>
         </p:txBody>
@@ -7753,8 +7754,8 @@
         </p:nvSpPr>
         <p:spPr>
           <a:xfrm>
-            <a:off x="360000" y="180000"/>
-            <a:ext cx="9360000" cy="478080"/>
+            <a:off x="360000" y="165960"/>
+            <a:ext cx="9360000" cy="506160"/>
           </a:xfrm>
           <a:prstGeom prst="rect">
             <a:avLst/>
@@ -7780,7 +7781,17 @@
                 <a:uFillTx/>
                 <a:latin typeface="Arial"/>
               </a:rPr>
-              <a:t>Bilješke o arhitekturi</a:t>
+              <a:t>Pretprocesorska naredba </a:t>
+            </a:r>
+            <a:r>
+              <a:rPr b="0" lang="bs-BA" sz="3300" strike="noStrike" u="none">
+                <a:solidFill>
+                  <a:srgbClr val="ffffff"/>
+                </a:solidFill>
+                <a:uFillTx/>
+                <a:latin typeface="Courier New"/>
+              </a:rPr>
+              <a:t>print_string</a:t>
             </a:r>
             <a:endParaRPr b="0" lang="bs-BA" sz="3300" strike="noStrike" u="none">
               <a:solidFill>
@@ -7832,16 +7843,36 @@
               <a:buChar char=""/>
             </a:pPr>
             <a:r>
-              <a:rPr b="0" lang="bs-BA" sz="2400" strike="noStrike" u="none">
-                <a:solidFill>
-                  <a:srgbClr val="009bdd"/>
-                </a:solidFill>
-                <a:uFillTx/>
-                <a:latin typeface="Arial"/>
-              </a:rPr>
-              <a:t>Parseri većine asemblera pretvaraju tokenizirani asemblerski kod u dvodimenzionalno polje (tablicu) malih stabala (gdje su samo aritmetički izrazi stabla, a ostalo su pojedinačni čvorovi).</a:t>
-            </a:r>
-            <a:endParaRPr b="0" lang="bs-BA" sz="2400" strike="noStrike" u="none">
+              <a:rPr b="0" lang="bs-BA" sz="1800" strike="noStrike" u="none">
+                <a:solidFill>
+                  <a:srgbClr val="009bdd"/>
+                </a:solidFill>
+                <a:uFillTx/>
+                <a:latin typeface="Arial"/>
+              </a:rPr>
+              <a:t>Pretprocesor od mog PicoBlaze asemblera od verzije v5.3.0 pa nadalje podržava naredbu </a:t>
+            </a:r>
+            <a:r>
+              <a:rPr b="0" lang="bs-BA" sz="1800" strike="noStrike" u="none">
+                <a:solidFill>
+                  <a:srgbClr val="009bdd"/>
+                </a:solidFill>
+                <a:uFillTx/>
+                <a:latin typeface="Courier New"/>
+              </a:rPr>
+              <a:t>print_string</a:t>
+            </a:r>
+            <a:r>
+              <a:rPr b="0" lang="bs-BA" sz="1800" strike="noStrike" u="none">
+                <a:solidFill>
+                  <a:srgbClr val="009bdd"/>
+                </a:solidFill>
+                <a:uFillTx/>
+                <a:latin typeface="Times New Roman"/>
+              </a:rPr>
+              <a:t>.</a:t>
+            </a:r>
+            <a:endParaRPr b="0" lang="bs-BA" sz="1800" strike="noStrike" u="none">
               <a:solidFill>
                 <a:srgbClr val="009bdd"/>
               </a:solidFill>
@@ -7862,16 +7893,29 @@
               <a:buChar char=""/>
             </a:pPr>
             <a:r>
-              <a:rPr b="0" lang="bs-BA" sz="2400" strike="noStrike" u="none">
-                <a:solidFill>
-                  <a:srgbClr val="009bdd"/>
-                </a:solidFill>
-                <a:uFillTx/>
-                <a:latin typeface="Arial"/>
-              </a:rPr>
-              <a:t>Parser u ovom asembleru za PicoBlaze pretvara tokenizirani asemblerski kod u jedno veliko stablo. Korijen tog stabla je čvor s tekstom “assembly”, a čvorovi dubine 1 su mnemonike, pretprocesorske naredbe i labeli.</a:t>
-            </a:r>
-            <a:endParaRPr b="0" lang="bs-BA" sz="2400" strike="noStrike" u="none">
+              <a:rPr b="0" lang="bs-BA" sz="1800" strike="noStrike" u="none">
+                <a:solidFill>
+                  <a:srgbClr val="009bdd"/>
+                </a:solidFill>
+                <a:uFillTx/>
+                <a:latin typeface="Arial"/>
+              </a:rPr>
+              <a:t>Primjer korištenja:</a:t>
+            </a:r>
+            <a:br>
+              <a:rPr sz="1800"/>
+            </a:br>
+            <a:r>
+              <a:rPr b="0" lang="bs-BA" sz="1800" strike="noStrike" u="none">
+                <a:solidFill>
+                  <a:srgbClr val="009bdd"/>
+                </a:solidFill>
+                <a:uFillTx/>
+                <a:latin typeface="Courier New"/>
+              </a:rPr>
+              <a:t>print_string "Hello world!", s9, UART_TX</a:t>
+            </a:r>
+            <a:endParaRPr b="0" lang="bs-BA" sz="1800" strike="noStrike" u="none">
               <a:solidFill>
                 <a:srgbClr val="009bdd"/>
               </a:solidFill>
@@ -7892,16 +7936,81 @@
               <a:buChar char=""/>
             </a:pPr>
             <a:r>
-              <a:rPr b="0" lang="bs-BA" sz="2400" strike="noStrike" u="none">
-                <a:solidFill>
-                  <a:srgbClr val="009bdd"/>
-                </a:solidFill>
-                <a:uFillTx/>
-                <a:latin typeface="Arial"/>
-              </a:rPr>
-              <a:t>Operandi mnemonika i pretprocesorskih naredbi njihova su djeca.</a:t>
-            </a:r>
-            <a:endParaRPr b="0" lang="bs-BA" sz="2400" strike="noStrike" u="none">
+              <a:rPr b="0" lang="bs-BA" sz="1800" strike="noStrike" u="none">
+                <a:solidFill>
+                  <a:srgbClr val="009bdd"/>
+                </a:solidFill>
+                <a:uFillTx/>
+                <a:latin typeface="Arial"/>
+              </a:rPr>
+              <a:t>To se pri pretprocesiranju zamjenjuje mnemonikama:</a:t>
+            </a:r>
+            <a:br>
+              <a:rPr sz="1800"/>
+            </a:br>
+            <a:r>
+              <a:rPr b="0" lang="bs-BA" sz="1800" strike="noStrike" u="none">
+                <a:solidFill>
+                  <a:srgbClr val="009bdd"/>
+                </a:solidFill>
+                <a:uFillTx/>
+                <a:latin typeface="Courier New"/>
+              </a:rPr>
+              <a:t>load s9, "H"</a:t>
+            </a:r>
+            <a:br>
+              <a:rPr sz="1800"/>
+            </a:br>
+            <a:r>
+              <a:rPr b="0" lang="bs-BA" sz="1800" strike="noStrike" u="none">
+                <a:solidFill>
+                  <a:srgbClr val="009bdd"/>
+                </a:solidFill>
+                <a:uFillTx/>
+                <a:latin typeface="Courier New"/>
+              </a:rPr>
+              <a:t>call UART_TX</a:t>
+            </a:r>
+            <a:br>
+              <a:rPr sz="1800"/>
+            </a:br>
+            <a:r>
+              <a:rPr b="0" lang="bs-BA" sz="1800" strike="noStrike" u="none">
+                <a:solidFill>
+                  <a:srgbClr val="009bdd"/>
+                </a:solidFill>
+                <a:uFillTx/>
+                <a:latin typeface="Courier New"/>
+              </a:rPr>
+              <a:t>load s9, "e"</a:t>
+            </a:r>
+            <a:br>
+              <a:rPr sz="1800"/>
+            </a:br>
+            <a:r>
+              <a:rPr b="0" lang="bs-BA" sz="1800" strike="noStrike" u="none">
+                <a:solidFill>
+                  <a:srgbClr val="009bdd"/>
+                </a:solidFill>
+                <a:uFillTx/>
+                <a:latin typeface="Courier New"/>
+              </a:rPr>
+              <a:t>call UART_TX</a:t>
+            </a:r>
+            <a:br>
+              <a:rPr sz="1800"/>
+            </a:br>
+            <a:r>
+              <a:rPr b="0" lang="bs-BA" sz="1800" strike="noStrike" u="none">
+                <a:solidFill>
+                  <a:srgbClr val="009bdd"/>
+                </a:solidFill>
+                <a:uFillTx/>
+                <a:latin typeface="Courier New"/>
+              </a:rPr>
+              <a:t>...</a:t>
+            </a:r>
+            <a:endParaRPr b="0" lang="bs-BA" sz="1800" strike="noStrike" u="none">
               <a:solidFill>
                 <a:srgbClr val="009bdd"/>
               </a:solidFill>
@@ -7909,6 +8018,56 @@
               <a:latin typeface="Arial"/>
             </a:endParaRPr>
           </a:p>
+          <a:p>
+            <a:pPr marL="432000" indent="-324000">
+              <a:spcBef>
+                <a:spcPts val="1060"/>
+              </a:spcBef>
+              <a:buClr>
+                <a:srgbClr val="77caee"/>
+              </a:buClr>
+              <a:buSzPct val="45000"/>
+              <a:buFont typeface="Wingdings" charset="2"/>
+              <a:buChar char=""/>
+            </a:pPr>
+            <a:r>
+              <a:rPr b="0" lang="bs-BA" sz="1800" strike="noStrike" u="none">
+                <a:solidFill>
+                  <a:srgbClr val="009bdd"/>
+                </a:solidFill>
+                <a:uFillTx/>
+                <a:latin typeface="Arial"/>
+              </a:rPr>
+              <a:t>To je skratilo kôd primjera “</a:t>
+            </a:r>
+            <a:r>
+              <a:rPr b="0" i="1" lang="bs-BA" sz="1800" strike="noStrike" u="none">
+                <a:solidFill>
+                  <a:srgbClr val="009bdd"/>
+                </a:solidFill>
+                <a:uFillTx/>
+                <a:latin typeface="Arial"/>
+              </a:rPr>
+              <a:t>Permutations Algorithm</a:t>
+            </a:r>
+            <a:r>
+              <a:rPr b="0" lang="bs-BA" sz="1800" strike="noStrike" u="none">
+                <a:solidFill>
+                  <a:srgbClr val="009bdd"/>
+                </a:solidFill>
+                <a:uFillTx/>
+                <a:latin typeface="Arial"/>
+              </a:rPr>
+              <a:t>” s preko 1000 redaka na manje od 400 redaka.</a:t>
+            </a:r>
+            <a:endParaRPr b="0" lang="bs-BA" sz="1800" strike="noStrike" u="none">
+              <a:solidFill>
+                <a:srgbClr val="009bdd"/>
+              </a:solidFill>
+              <a:uFillTx/>
+              <a:latin typeface="Arial"/>
+            </a:endParaRPr>
+          </a:p>
         </p:txBody>
       </p:sp>
       <p:sp>
@@ -7925,7 +8084,7 @@
         <p:txBody>
           <a:bodyPr/>
           <a:p>
-            <a:fld id="{BB7A8CC2-58B6-4D3C-B3A7-AAC7D377BD13}" type="slidenum">
+            <a:fld id="{F9B5F138-8E52-4D9E-84CC-43132C2C28B5}" type="slidenum">
               <a:t>24</a:t>
             </a:fld>
           </a:p>
@@ -7945,9 +8104,9 @@
         <p:txBody>
           <a:bodyPr/>
           <a:p>
-            <a:fld id="{3BC7955A-E426-4A76-AEB6-66AA0266A89B}" type="datetime1">
+            <a:fld id="{C7FD2898-85D9-415B-83F5-D975F1C8C660}" type="datetime1">
               <a:rPr lang="en-US"/>
-              <a:t>04/01/2025</a:t>
+              <a:t>04/14/2025</a:t>
             </a:fld>
           </a:p>
         </p:txBody>
@@ -7989,6 +8148,247 @@
             <a:spLocks noGrp="1"/>
           </p:cNvSpPr>
           <p:nvPr>
+            <p:ph type="title"/>
+          </p:nvPr>
+        </p:nvSpPr>
+        <p:spPr>
+          <a:xfrm>
+            <a:off x="360000" y="180000"/>
+            <a:ext cx="9360000" cy="478080"/>
+          </a:xfrm>
+          <a:prstGeom prst="rect">
+            <a:avLst/>
+          </a:prstGeom>
+          <a:noFill/>
+          <a:ln w="0">
+            <a:noFill/>
+          </a:ln>
+        </p:spPr>
+        <p:txBody>
+          <a:bodyPr lIns="0" rIns="0" tIns="0" bIns="0" anchor="ctr">
+            <a:noAutofit/>
+          </a:bodyPr>
+          <a:p>
+            <a:pPr indent="0" algn="ctr">
+              <a:buNone/>
+            </a:pPr>
+            <a:r>
+              <a:rPr b="0" lang="bs-BA" sz="3300" strike="noStrike" u="none">
+                <a:solidFill>
+                  <a:srgbClr val="ffffff"/>
+                </a:solidFill>
+                <a:uFillTx/>
+                <a:latin typeface="Arial"/>
+              </a:rPr>
+              <a:t>Bilješke o arhitekturi</a:t>
+            </a:r>
+            <a:endParaRPr b="0" lang="bs-BA" sz="3300" strike="noStrike" u="none">
+              <a:solidFill>
+                <a:srgbClr val="ffffff"/>
+              </a:solidFill>
+              <a:uFillTx/>
+              <a:latin typeface="Arial"/>
+            </a:endParaRPr>
+          </a:p>
+        </p:txBody>
+      </p:sp>
+      <p:sp>
+        <p:nvSpPr>
+          <p:cNvPr id="97" name="PlaceHolder 2"/>
+          <p:cNvSpPr>
+            <a:spLocks noGrp="1"/>
+          </p:cNvSpPr>
+          <p:nvPr>
+            <p:ph/>
+          </p:nvPr>
+        </p:nvSpPr>
+        <p:spPr>
+          <a:xfrm>
+            <a:off x="360000" y="1080000"/>
+            <a:ext cx="9360000" cy="3600000"/>
+          </a:xfrm>
+          <a:prstGeom prst="rect">
+            <a:avLst/>
+          </a:prstGeom>
+          <a:noFill/>
+          <a:ln w="0">
+            <a:noFill/>
+          </a:ln>
+        </p:spPr>
+        <p:txBody>
+          <a:bodyPr lIns="0" rIns="0" tIns="0" bIns="0" anchor="t">
+            <a:noAutofit/>
+          </a:bodyPr>
+          <a:p>
+            <a:pPr marL="432000" indent="-324000">
+              <a:spcBef>
+                <a:spcPts val="1060"/>
+              </a:spcBef>
+              <a:buClr>
+                <a:srgbClr val="77caee"/>
+              </a:buClr>
+              <a:buSzPct val="45000"/>
+              <a:buFont typeface="Wingdings" charset="2"/>
+              <a:buChar char=""/>
+            </a:pPr>
+            <a:r>
+              <a:rPr b="0" lang="bs-BA" sz="2400" strike="noStrike" u="none">
+                <a:solidFill>
+                  <a:srgbClr val="009bdd"/>
+                </a:solidFill>
+                <a:uFillTx/>
+                <a:latin typeface="Arial"/>
+              </a:rPr>
+              <a:t>Parseri većine asemblera pretvaraju tokenizirani asemblerski kod u dvodimenzionalno polje (tablicu) malih stabala (gdje su samo aritmetički izrazi stabla, a ostalo su pojedinačni čvorovi).</a:t>
+            </a:r>
+            <a:endParaRPr b="0" lang="bs-BA" sz="2400" strike="noStrike" u="none">
+              <a:solidFill>
+                <a:srgbClr val="009bdd"/>
+              </a:solidFill>
+              <a:uFillTx/>
+              <a:latin typeface="Arial"/>
+            </a:endParaRPr>
+          </a:p>
+          <a:p>
+            <a:pPr marL="432000" indent="-324000">
+              <a:spcBef>
+                <a:spcPts val="1060"/>
+              </a:spcBef>
+              <a:buClr>
+                <a:srgbClr val="77caee"/>
+              </a:buClr>
+              <a:buSzPct val="45000"/>
+              <a:buFont typeface="Wingdings" charset="2"/>
+              <a:buChar char=""/>
+            </a:pPr>
+            <a:r>
+              <a:rPr b="0" lang="bs-BA" sz="2400" strike="noStrike" u="none">
+                <a:solidFill>
+                  <a:srgbClr val="009bdd"/>
+                </a:solidFill>
+                <a:uFillTx/>
+                <a:latin typeface="Arial"/>
+              </a:rPr>
+              <a:t>Parser u ovom asembleru za PicoBlaze pretvara tokenizirani asemblerski kod u jedno veliko stablo. Korijen tog stabla je čvor s tekstom “assembly”, a čvorovi dubine 1 su mnemonike, pretprocesorske naredbe i labeli.</a:t>
+            </a:r>
+            <a:endParaRPr b="0" lang="bs-BA" sz="2400" strike="noStrike" u="none">
+              <a:solidFill>
+                <a:srgbClr val="009bdd"/>
+              </a:solidFill>
+              <a:uFillTx/>
+              <a:latin typeface="Arial"/>
+            </a:endParaRPr>
+          </a:p>
+          <a:p>
+            <a:pPr marL="432000" indent="-324000">
+              <a:spcBef>
+                <a:spcPts val="1060"/>
+              </a:spcBef>
+              <a:buClr>
+                <a:srgbClr val="77caee"/>
+              </a:buClr>
+              <a:buSzPct val="45000"/>
+              <a:buFont typeface="Wingdings" charset="2"/>
+              <a:buChar char=""/>
+            </a:pPr>
+            <a:r>
+              <a:rPr b="0" lang="bs-BA" sz="2400" strike="noStrike" u="none">
+                <a:solidFill>
+                  <a:srgbClr val="009bdd"/>
+                </a:solidFill>
+                <a:uFillTx/>
+                <a:latin typeface="Arial"/>
+              </a:rPr>
+              <a:t>Operandi mnemonika i pretprocesorskih naredbi njihova su djeca.</a:t>
+            </a:r>
+            <a:endParaRPr b="0" lang="bs-BA" sz="2400" strike="noStrike" u="none">
+              <a:solidFill>
+                <a:srgbClr val="009bdd"/>
+              </a:solidFill>
+              <a:uFillTx/>
+              <a:latin typeface="Arial"/>
+            </a:endParaRPr>
+          </a:p>
+        </p:txBody>
+      </p:sp>
+      <p:sp>
+        <p:nvSpPr>
+          <p:cNvPr id="4" name="PlaceHolder 3"/>
+          <p:cNvSpPr>
+            <a:spLocks noGrp="1"/>
+          </p:cNvSpPr>
+          <p:nvPr>
+            <p:ph type="sldNum" idx="6"/>
+          </p:nvPr>
+        </p:nvSpPr>
+        <p:spPr/>
+        <p:txBody>
+          <a:bodyPr/>
+          <a:p>
+            <a:fld id="{37B14621-F592-469B-AFA0-1F684E9D645E}" type="slidenum">
+              <a:t>25</a:t>
+            </a:fld>
+          </a:p>
+        </p:txBody>
+      </p:sp>
+      <p:sp>
+        <p:nvSpPr>
+          <p:cNvPr id="5" name="PlaceHolder 4"/>
+          <p:cNvSpPr>
+            <a:spLocks noGrp="1"/>
+          </p:cNvSpPr>
+          <p:nvPr>
+            <p:ph type="dt" idx="4"/>
+          </p:nvPr>
+        </p:nvSpPr>
+        <p:spPr/>
+        <p:txBody>
+          <a:bodyPr/>
+          <a:p>
+            <a:fld id="{A693237B-0E87-43F9-AEFE-D523F088599A}" type="datetime1">
+              <a:rPr lang="en-US"/>
+              <a:t>04/14/2025</a:t>
+            </a:fld>
+          </a:p>
+        </p:txBody>
+      </p:sp>
+    </p:spTree>
+  </p:cSld>
+  <mc:AlternateContent>
+    <mc:Choice Requires="p14">
+      <p:transition spd="slow" p14:dur="2000"/>
+    </mc:Choice>
+    <mc:Fallback>
+      <p:transition spd="slow"/>
+    </mc:Fallback>
+  </mc:AlternateContent>
+</p:sld>
+</file>
+
+<file path=ppt/slides/slide26.xml><?xml version="1.0" encoding="utf-8"?>
+<p:sld xmlns:a="http://schemas.openxmlformats.org/drawingml/2006/main" xmlns:p="http://schemas.openxmlformats.org/presentationml/2006/main" xmlns:r="http://schemas.openxmlformats.org/officeDocument/2006/relationships" xmlns:p14="http://schemas.microsoft.com/office/powerpoint/2010/main" xmlns:p15="http://schemas.microsoft.com/office/powerpoint/2012/main" xmlns:mc="http://schemas.openxmlformats.org/markup-compatibility/2006">
+  <p:cSld>
+    <p:spTree>
+      <p:nvGrpSpPr>
+        <p:cNvPr id="1" name=""/>
+        <p:cNvGrpSpPr/>
+        <p:nvPr/>
+      </p:nvGrpSpPr>
+      <p:grpSpPr>
+        <a:xfrm>
+          <a:off x="0" y="0"/>
+          <a:ext cx="0" cy="0"/>
+          <a:chOff x="0" y="0"/>
+          <a:chExt cx="0" cy="0"/>
+        </a:xfrm>
+      </p:grpSpPr>
+      <p:sp>
+        <p:nvSpPr>
+          <p:cNvPr id="98" name="PlaceHolder 1"/>
+          <p:cNvSpPr>
+            <a:spLocks noGrp="1"/>
+          </p:cNvSpPr>
+          <p:nvPr>
             <p:ph type="subTitle"/>
           </p:nvPr>
         </p:nvSpPr>
@@ -8051,8 +8451,8 @@
         <p:txBody>
           <a:bodyPr/>
           <a:p>
-            <a:fld id="{F06EBB81-0C06-41A2-8003-BE0748AF3FAE}" type="slidenum">
-              <a:t>25</a:t>
+            <a:fld id="{76A0B4E9-194D-4443-BED9-AA984C7844D2}" type="slidenum">
+              <a:t>26</a:t>
             </a:fld>
           </a:p>
         </p:txBody>
@@ -8071,9 +8471,9 @@
         <p:txBody>
           <a:bodyPr/>
           <a:p>
-            <a:fld id="{F7E6F624-D9B8-4CC9-8474-E74BCCFB8562}" type="datetime1">
+            <a:fld id="{38A98F13-64DC-46B4-BA14-ADBE8CC25A5C}" type="datetime1">
               <a:rPr lang="en-US"/>
-              <a:t>04/01/2025</a:t>
+              <a:t>04/14/2025</a:t>
             </a:fld>
           </a:p>
         </p:txBody>
@@ -8361,7 +8761,7 @@
         <p:txBody>
           <a:bodyPr/>
           <a:p>
-            <a:fld id="{13A63200-AFE6-4908-9A87-82556E62E312}" type="slidenum">
+            <a:fld id="{F197331F-229E-478F-A133-0B86D13C0CD6}" type="slidenum">
               <a:t>3</a:t>
             </a:fld>
           </a:p>
@@ -8381,9 +8781,9 @@
         <p:txBody>
           <a:bodyPr/>
           <a:p>
-            <a:fld id="{FC03F4A2-A075-4CA7-9160-5420EDBCD8D5}" type="datetime1">
+            <a:fld id="{B4CB9961-DA3D-4794-9B04-9D9DFB9966BE}" type="datetime1">
               <a:rPr lang="en-US"/>
-              <a:t>04/01/2025</a:t>
+              <a:t>04/14/2025</a:t>
             </a:fld>
           </a:p>
         </p:txBody>
@@ -8546,7 +8946,7 @@
                 <a:uFillTx/>
                 <a:latin typeface="Arial"/>
               </a:rPr>
-              <a:t>...ili odaberemo neki od devet primjera iz flexboxa “Examples”.</a:t>
+              <a:t>...ili odaberemo neki od deset primjera iz flexboxa “Examples”.</a:t>
             </a:r>
             <a:endParaRPr b="0" lang="bs-BA" sz="2400" strike="noStrike" u="none">
               <a:solidFill>
@@ -8620,7 +9020,7 @@
         <p:txBody>
           <a:bodyPr/>
           <a:p>
-            <a:fld id="{18F6F5C1-2AC1-4E6F-9F9A-28AB31D2DA45}" type="slidenum">
+            <a:fld id="{DD798874-AC8B-4865-8504-C7268C7BFF17}" type="slidenum">
               <a:t>4</a:t>
             </a:fld>
           </a:p>
@@ -8640,9 +9040,9 @@
         <p:txBody>
           <a:bodyPr/>
           <a:p>
-            <a:fld id="{800B0778-1D30-450B-8422-1D96BE41FDFA}" type="datetime1">
+            <a:fld id="{BA1D8CD8-E5DC-41CD-946B-3EB4218F01B0}" type="datetime1">
               <a:rPr lang="en-US"/>
-              <a:t>04/01/2025</a:t>
+              <a:t>04/14/2025</a:t>
             </a:fld>
           </a:p>
         </p:txBody>
@@ -8892,7 +9292,7 @@
         <p:txBody>
           <a:bodyPr/>
           <a:p>
-            <a:fld id="{1D910F24-E99E-49F5-AEE8-8B6D370C4889}" type="slidenum">
+            <a:fld id="{B6AA6121-BCA6-424E-819B-8A78C988DBC1}" type="slidenum">
               <a:t>5</a:t>
             </a:fld>
           </a:p>
@@ -8912,9 +9312,9 @@
         <p:txBody>
           <a:bodyPr/>
           <a:p>
-            <a:fld id="{9E984410-21FD-41B3-94AB-89A56E36D678}" type="datetime1">
+            <a:fld id="{42EE19DE-AD3B-425C-82B9-27860C0CC8BA}" type="datetime1">
               <a:rPr lang="en-US"/>
-              <a:t>04/01/2025</a:t>
+              <a:t>04/14/2025</a:t>
             </a:fld>
           </a:p>
         </p:txBody>
@@ -9277,7 +9677,7 @@
         <p:txBody>
           <a:bodyPr/>
           <a:p>
-            <a:fld id="{35712F08-F43E-43A8-B4AF-0B3FAAC94BBF}" type="slidenum">
+            <a:fld id="{006DDC93-F8EB-4FC7-89E0-D4CCDB21B90E}" type="slidenum">
               <a:t>6</a:t>
             </a:fld>
           </a:p>
@@ -9297,9 +9697,9 @@
         <p:txBody>
           <a:bodyPr/>
           <a:p>
-            <a:fld id="{98202C24-2306-400E-A64F-F7ED74962601}" type="datetime1">
+            <a:fld id="{EF259B5C-12F5-4947-9C77-132F1B71EC42}" type="datetime1">
               <a:rPr lang="en-US"/>
-              <a:t>04/01/2025</a:t>
+              <a:t>04/14/2025</a:t>
             </a:fld>
           </a:p>
         </p:txBody>
@@ -9619,7 +10019,7 @@
         <p:txBody>
           <a:bodyPr/>
           <a:p>
-            <a:fld id="{7F590E55-4B55-4D54-A728-1CC631E48A4B}" type="slidenum">
+            <a:fld id="{CC9FCDB5-2F92-4F02-A0E6-2FC3901DCF7F}" type="slidenum">
               <a:t>7</a:t>
             </a:fld>
           </a:p>
@@ -9639,9 +10039,9 @@
         <p:txBody>
           <a:bodyPr/>
           <a:p>
-            <a:fld id="{1442A06E-5F7A-49C2-BB11-4E638B62F0EE}" type="datetime1">
+            <a:fld id="{FA8B0B4B-12A0-4D81-A781-BB2FFFDDCB6C}" type="datetime1">
               <a:rPr lang="en-US"/>
-              <a:t>04/01/2025</a:t>
+              <a:t>04/14/2025</a:t>
             </a:fld>
           </a:p>
         </p:txBody>
@@ -9824,7 +10224,7 @@
         <p:txBody>
           <a:bodyPr/>
           <a:p>
-            <a:fld id="{41BCE5D4-76B1-4144-9C4E-11C402C1B7D2}" type="slidenum">
+            <a:fld id="{0117BD11-FD4C-4C38-AF21-4BD48308AF8F}" type="slidenum">
               <a:t>8</a:t>
             </a:fld>
           </a:p>
@@ -9844,9 +10244,9 @@
         <p:txBody>
           <a:bodyPr/>
           <a:p>
-            <a:fld id="{66A90D03-E172-42AA-83AE-8240C08BF148}" type="datetime1">
+            <a:fld id="{7E939549-D20E-46F1-927F-38A3CCCB5824}" type="datetime1">
               <a:rPr lang="en-US"/>
-              <a:t>04/01/2025</a:t>
+              <a:t>04/14/2025</a:t>
             </a:fld>
           </a:p>
         </p:txBody>
@@ -10072,7 +10472,7 @@
         <p:txBody>
           <a:bodyPr/>
           <a:p>
-            <a:fld id="{55353AF6-45C0-41CA-AA4D-35FDB03147C1}" type="slidenum">
+            <a:fld id="{BF7490EC-C677-4688-8AAD-25C85449155B}" type="slidenum">
               <a:t>9</a:t>
             </a:fld>
           </a:p>
@@ -10092,9 +10492,9 @@
         <p:txBody>
           <a:bodyPr/>
           <a:p>
-            <a:fld id="{C72E931D-7C5F-4654-8E43-6C01C6089CF6}" type="datetime1">
+            <a:fld id="{4C6CC586-6DB0-4024-8604-D39051E2156E}" type="datetime1">
               <a:rPr lang="en-US"/>
-              <a:t>04/01/2025</a:t>
+              <a:t>04/14/2025</a:t>
             </a:fld>
           </a:p>
         </p:txBody>

</xml_diff>

<commit_message>
Documented the bug in Levenshtain Distance
</commit_message>
<xml_diff>
--- a/seminar/PicoBlaze.pptx
+++ b/seminar/PicoBlaze.pptx
@@ -32,6 +32,7 @@
     <p:sldId id="279" r:id="rId27"/>
     <p:sldId id="280" r:id="rId28"/>
     <p:sldId id="281" r:id="rId29"/>
+    <p:sldId id="282" r:id="rId30"/>
   </p:sldIdLst>
   <p:sldSz cx="10080625" cy="5670550"/>
   <p:notesSz cx="7559675" cy="10691813"/>
@@ -89,7 +90,7 @@
         <p:txBody>
           <a:bodyPr/>
           <a:p>
-            <a:fld id="{59817E1F-8476-42A7-8D77-46993FB779E6}" type="slidenum">
+            <a:fld id="{A68D2104-CBA5-4A5B-9B29-03DA11C809C0}" type="slidenum">
               <a:t>&lt;#&gt;</a:t>
             </a:fld>
           </a:p>
@@ -257,7 +258,7 @@
         <p:txBody>
           <a:bodyPr/>
           <a:p>
-            <a:fld id="{D9A95472-0C8E-4B66-A2B5-EBEB3EAF2749}" type="slidenum">
+            <a:fld id="{BFEB588A-D9C4-4A43-9E2D-4523CC501842}" type="slidenum">
               <a:t>&lt;#&gt;</a:t>
             </a:fld>
           </a:p>
@@ -513,7 +514,7 @@
         <p:txBody>
           <a:bodyPr/>
           <a:p>
-            <a:fld id="{36CB555A-22EB-4FA6-8FF9-851DD812A38C}" type="slidenum">
+            <a:fld id="{83F64741-65E6-44CA-8E9B-44C846FA9C60}" type="slidenum">
               <a:t>&lt;#&gt;</a:t>
             </a:fld>
           </a:p>
@@ -725,7 +726,7 @@
         <p:txBody>
           <a:bodyPr/>
           <a:p>
-            <a:fld id="{7943D480-FA17-4B4B-87D1-14BA72A91EB5}" type="slidenum">
+            <a:fld id="{C803A318-1FFE-454C-A479-3F75CE1774D6}" type="slidenum">
               <a:t>&lt;#&gt;</a:t>
             </a:fld>
           </a:p>
@@ -808,7 +809,7 @@
         <p:txBody>
           <a:bodyPr/>
           <a:p>
-            <a:fld id="{46FA5D9C-17F9-40CF-B198-96E7856619EC}" type="slidenum">
+            <a:fld id="{043DF49D-AB25-46C2-84B4-6F60DEAB6F94}" type="slidenum">
               <a:t>&lt;#&gt;</a:t>
             </a:fld>
           </a:p>
@@ -1749,7 +1750,7 @@
             <a:pPr indent="0" algn="r">
               <a:buNone/>
             </a:pPr>
-            <a:fld id="{67CE8A4B-CEDB-4F52-B388-6168EB0C3661}" type="slidenum">
+            <a:fld id="{236A35E3-EA54-4F99-A363-3AAC159B1AC0}" type="slidenum">
               <a:rPr b="0" lang="bs-BA" sz="1400" strike="noStrike" u="none">
                 <a:solidFill>
                   <a:srgbClr val="ffffff"/>
@@ -3120,7 +3121,7 @@
             <a:pPr indent="0" algn="r">
               <a:buNone/>
             </a:pPr>
-            <a:fld id="{1030D601-25E7-4CB8-96D3-1E3D0D7D9EE9}" type="slidenum">
+            <a:fld id="{325FB19B-67C8-4DF0-8CE3-A55007238E8B}" type="slidenum">
               <a:rPr b="0" lang="bs-BA" sz="1400" strike="noStrike" u="none">
                 <a:solidFill>
                   <a:srgbClr val="ffffff"/>
@@ -3306,7 +3307,7 @@
       </p:grpSpPr>
       <p:sp>
         <p:nvSpPr>
-          <p:cNvPr id="52" name="PlaceHolder 1"/>
+          <p:cNvPr id="50" name="PlaceHolder 1"/>
           <p:cNvSpPr>
             <a:spLocks noGrp="1"/>
           </p:cNvSpPr>
@@ -3357,7 +3358,7 @@
       </p:sp>
       <p:sp>
         <p:nvSpPr>
-          <p:cNvPr id="53" name="PlaceHolder 2"/>
+          <p:cNvPr id="51" name="PlaceHolder 2"/>
           <p:cNvSpPr>
             <a:spLocks noGrp="1"/>
           </p:cNvSpPr>
@@ -3402,7 +3403,7 @@
                 <a:uFillTx/>
                 <a:latin typeface="Arial"/>
               </a:rPr>
-              <a:t>Da bismo komunicirali s programima kao što je “Binary to Decimal” (prvi primjer u flexboxu “Examples” s lijeva), možemo koristiti SVG-ove generirane u JavaScriptu, koji predstavljaju switcheve, LED-ice i sedam-segmentne pokaznike.</a:t>
+              <a:t>Onda, možemo, recimo, kliknuti na Fast Forward...</a:t>
             </a:r>
             <a:endParaRPr b="0" lang="bs-BA" sz="2400" strike="noStrike" u="none">
               <a:solidFill>
@@ -3416,7 +3417,7 @@
       </p:sp>
       <p:pic>
         <p:nvPicPr>
-          <p:cNvPr id="54" name="" descr=""/>
+          <p:cNvPr id="52" name="" descr=""/>
           <p:cNvPicPr/>
           <p:nvPr/>
         </p:nvPicPr>
@@ -3426,8 +3427,8 @@
         </p:blipFill>
         <p:spPr>
           <a:xfrm>
-            <a:off x="335520" y="1143000"/>
-            <a:ext cx="4693680" cy="1958040"/>
+            <a:off x="228600" y="1143000"/>
+            <a:ext cx="4625280" cy="2437920"/>
           </a:xfrm>
           <a:prstGeom prst="rect">
             <a:avLst/>
@@ -3440,6 +3441,49 @@
       </p:pic>
       <p:sp>
         <p:nvSpPr>
+          <p:cNvPr id="53" name=""/>
+          <p:cNvSpPr/>
+          <p:nvPr/>
+        </p:nvSpPr>
+        <p:spPr>
+          <a:xfrm>
+            <a:off x="2057400" y="1143000"/>
+            <a:ext cx="457200" cy="457200"/>
+          </a:xfrm>
+          <a:prstGeom prst="ellipse">
+            <a:avLst/>
+          </a:prstGeom>
+          <a:noFill/>
+          <a:ln w="18000">
+            <a:solidFill>
+              <a:srgbClr val="009bdd"/>
+            </a:solidFill>
+            <a:round/>
+          </a:ln>
+        </p:spPr>
+        <p:style>
+          <a:lnRef idx="0"/>
+          <a:fillRef idx="0"/>
+          <a:effectRef idx="0"/>
+          <a:fontRef idx="minor"/>
+        </p:style>
+        <p:txBody>
+          <a:bodyPr wrap="none" lIns="90000" rIns="90000" tIns="45000" bIns="45000" anchor="ctr">
+            <a:noAutofit/>
+          </a:bodyPr>
+          <a:p>
+            <a:endParaRPr b="0" lang="bs-BA" sz="1800" strike="noStrike" u="none">
+              <a:solidFill>
+                <a:srgbClr val="000000"/>
+              </a:solidFill>
+              <a:uFillTx/>
+              <a:latin typeface="Arial"/>
+            </a:endParaRPr>
+          </a:p>
+        </p:txBody>
+      </p:sp>
+      <p:sp>
+        <p:nvSpPr>
           <p:cNvPr id="4" name="PlaceHolder 3"/>
           <p:cNvSpPr>
             <a:spLocks noGrp="1"/>
@@ -3452,7 +3496,7 @@
         <p:txBody>
           <a:bodyPr/>
           <a:p>
-            <a:fld id="{9D95313D-51C3-46C3-B9E0-759E9E0D68AC}" type="slidenum">
+            <a:fld id="{EF4F7845-9D1C-422F-9DF5-9AB6F543A320}" type="slidenum">
               <a:t>10</a:t>
             </a:fld>
           </a:p>
@@ -3472,9 +3516,9 @@
         <p:txBody>
           <a:bodyPr/>
           <a:p>
-            <a:fld id="{C4F374EF-922D-4010-8E4C-5F4A8E79D39B}" type="datetime1">
+            <a:fld id="{28F21E9A-B3C8-4047-B69F-EA697C0B6184}" type="datetime1">
               <a:rPr lang="en-US"/>
-              <a:t>04/14/2025</a:t>
+              <a:t>04/24/2025</a:t>
             </a:fld>
           </a:p>
         </p:txBody>
@@ -3511,7 +3555,7 @@
       </p:grpSpPr>
       <p:sp>
         <p:nvSpPr>
-          <p:cNvPr id="55" name="PlaceHolder 1"/>
+          <p:cNvPr id="54" name="PlaceHolder 1"/>
           <p:cNvSpPr>
             <a:spLocks noGrp="1"/>
           </p:cNvSpPr>
@@ -3562,7 +3606,7 @@
       </p:sp>
       <p:sp>
         <p:nvSpPr>
-          <p:cNvPr id="56" name="PlaceHolder 2"/>
+          <p:cNvPr id="55" name="PlaceHolder 2"/>
           <p:cNvSpPr>
             <a:spLocks noGrp="1"/>
           </p:cNvSpPr>
@@ -3607,107 +3651,7 @@
                 <a:uFillTx/>
                 <a:latin typeface="Arial"/>
               </a:rPr>
-              <a:t>Ako želimo, možemo dodati i breakpointse na koje će emulacija pauzirati.</a:t>
-            </a:r>
-            <a:endParaRPr b="0" lang="bs-BA" sz="2400" strike="noStrike" u="none">
-              <a:solidFill>
-                <a:srgbClr val="009bdd"/>
-              </a:solidFill>
-              <a:uFillTx/>
-              <a:latin typeface="Arial"/>
-            </a:endParaRPr>
-          </a:p>
-          <a:p>
-            <a:pPr marL="432000" indent="-324000">
-              <a:spcBef>
-                <a:spcPts val="1060"/>
-              </a:spcBef>
-              <a:buClr>
-                <a:srgbClr val="77caee"/>
-              </a:buClr>
-              <a:buSzPct val="45000"/>
-              <a:buFont typeface="Wingdings" charset="2"/>
-              <a:buChar char=""/>
-            </a:pPr>
-            <a:r>
-              <a:rPr b="0" lang="bs-BA" sz="2400" strike="noStrike" u="none">
-                <a:solidFill>
-                  <a:srgbClr val="009bdd"/>
-                </a:solidFill>
-                <a:uFillTx/>
-                <a:latin typeface="Arial"/>
-              </a:rPr>
-              <a:t>Tu sam mogućnost dodao na prijedlog profesora Tomislava Matića mlađeg.</a:t>
-            </a:r>
-            <a:endParaRPr b="0" lang="bs-BA" sz="2400" strike="noStrike" u="none">
-              <a:solidFill>
-                <a:srgbClr val="009bdd"/>
-              </a:solidFill>
-              <a:uFillTx/>
-              <a:latin typeface="Arial"/>
-            </a:endParaRPr>
-          </a:p>
-          <a:p>
-            <a:pPr marL="432000" indent="-324000">
-              <a:spcBef>
-                <a:spcPts val="1060"/>
-              </a:spcBef>
-              <a:buClr>
-                <a:srgbClr val="77caee"/>
-              </a:buClr>
-              <a:buSzPct val="45000"/>
-              <a:buFont typeface="Wingdings" charset="2"/>
-              <a:buChar char=""/>
-            </a:pPr>
-            <a:r>
-              <a:rPr b="0" lang="bs-BA" sz="2400" strike="noStrike" u="none">
-                <a:solidFill>
-                  <a:srgbClr val="009bdd"/>
-                </a:solidFill>
-                <a:uFillTx/>
-                <a:latin typeface="Arial"/>
-              </a:rPr>
-              <a:t>Postoje samo </a:t>
-            </a:r>
-            <a:r>
-              <a:rPr b="0" i="1" lang="bs-BA" sz="2400" strike="noStrike" u="none">
-                <a:solidFill>
-                  <a:srgbClr val="009bdd"/>
-                </a:solidFill>
-                <a:uFillTx/>
-                <a:latin typeface="Arial"/>
-              </a:rPr>
-              <a:t>permanent</a:t>
-            </a:r>
-            <a:r>
-              <a:rPr b="0" lang="bs-BA" sz="2400" strike="noStrike" u="none">
-                <a:solidFill>
-                  <a:srgbClr val="009bdd"/>
-                </a:solidFill>
-                <a:uFillTx/>
-                <a:latin typeface="Arial"/>
-              </a:rPr>
-              <a:t> breakpointsi, ne i </a:t>
-            </a:r>
-            <a:r>
-              <a:rPr b="0" i="1" lang="bs-BA" sz="2400" strike="noStrike" u="none">
-                <a:solidFill>
-                  <a:srgbClr val="009bdd"/>
-                </a:solidFill>
-                <a:uFillTx/>
-                <a:latin typeface="Arial"/>
-              </a:rPr>
-              <a:t>temporary</a:t>
-            </a:r>
-            <a:r>
-              <a:rPr b="0" lang="bs-BA" sz="2400" strike="noStrike" u="none">
-                <a:solidFill>
-                  <a:srgbClr val="009bdd"/>
-                </a:solidFill>
-                <a:uFillTx/>
-                <a:latin typeface="Arial"/>
-              </a:rPr>
-              <a:t>.</a:t>
+              <a:t>Da bismo komunicirali s programima kao što je “Binary to Decimal” (prvi primjer u flexboxu “Examples” s lijeva), možemo koristiti SVG-ove generirane u JavaScriptu, koji predstavljaju switcheve, LED-ice i sedam-segmentne pokaznike.</a:t>
             </a:r>
             <a:endParaRPr b="0" lang="bs-BA" sz="2400" strike="noStrike" u="none">
               <a:solidFill>
@@ -3721,7 +3665,7 @@
       </p:sp>
       <p:pic>
         <p:nvPicPr>
-          <p:cNvPr id="57" name="" descr=""/>
+          <p:cNvPr id="56" name="" descr=""/>
           <p:cNvPicPr/>
           <p:nvPr/>
         </p:nvPicPr>
@@ -3731,8 +3675,8 @@
         </p:blipFill>
         <p:spPr>
           <a:xfrm>
-            <a:off x="228600" y="1013760"/>
-            <a:ext cx="4739400" cy="3786840"/>
+            <a:off x="335520" y="1143000"/>
+            <a:ext cx="4693680" cy="1958040"/>
           </a:xfrm>
           <a:prstGeom prst="rect">
             <a:avLst/>
@@ -3745,49 +3689,6 @@
       </p:pic>
       <p:sp>
         <p:nvSpPr>
-          <p:cNvPr id="58" name=""/>
-          <p:cNvSpPr/>
-          <p:nvPr/>
-        </p:nvSpPr>
-        <p:spPr>
-          <a:xfrm>
-            <a:off x="228600" y="4114800"/>
-            <a:ext cx="685800" cy="228600"/>
-          </a:xfrm>
-          <a:prstGeom prst="ellipse">
-            <a:avLst/>
-          </a:prstGeom>
-          <a:noFill/>
-          <a:ln w="18000">
-            <a:solidFill>
-              <a:srgbClr val="009bdd"/>
-            </a:solidFill>
-            <a:round/>
-          </a:ln>
-        </p:spPr>
-        <p:style>
-          <a:lnRef idx="0"/>
-          <a:fillRef idx="0"/>
-          <a:effectRef idx="0"/>
-          <a:fontRef idx="minor"/>
-        </p:style>
-        <p:txBody>
-          <a:bodyPr wrap="none" lIns="90000" rIns="90000" tIns="45000" bIns="45000" anchor="ctr">
-            <a:noAutofit/>
-          </a:bodyPr>
-          <a:p>
-            <a:endParaRPr b="0" lang="bs-BA" sz="1800" strike="noStrike" u="none">
-              <a:solidFill>
-                <a:srgbClr val="000000"/>
-              </a:solidFill>
-              <a:uFillTx/>
-              <a:latin typeface="Arial"/>
-            </a:endParaRPr>
-          </a:p>
-        </p:txBody>
-      </p:sp>
-      <p:sp>
-        <p:nvSpPr>
           <p:cNvPr id="4" name="PlaceHolder 3"/>
           <p:cNvSpPr>
             <a:spLocks noGrp="1"/>
@@ -3800,7 +3701,7 @@
         <p:txBody>
           <a:bodyPr/>
           <a:p>
-            <a:fld id="{18AEEA66-6288-4BA4-8DEC-736BBBB88485}" type="slidenum">
+            <a:fld id="{30CD37D7-CDF1-444F-BDF8-3AE69120586C}" type="slidenum">
               <a:t>11</a:t>
             </a:fld>
           </a:p>
@@ -3820,9 +3721,9 @@
         <p:txBody>
           <a:bodyPr/>
           <a:p>
-            <a:fld id="{FA934E66-7E0A-4857-90F7-656444B638CA}" type="datetime1">
+            <a:fld id="{EC52B1EA-D0B5-4713-A2FD-22429311FE2B}" type="datetime1">
               <a:rPr lang="en-US"/>
-              <a:t>04/14/2025</a:t>
+              <a:t>04/24/2025</a:t>
             </a:fld>
           </a:p>
         </p:txBody>
@@ -3859,7 +3760,7 @@
       </p:grpSpPr>
       <p:sp>
         <p:nvSpPr>
-          <p:cNvPr id="59" name="PlaceHolder 1"/>
+          <p:cNvPr id="57" name="PlaceHolder 1"/>
           <p:cNvSpPr>
             <a:spLocks noGrp="1"/>
           </p:cNvSpPr>
@@ -3910,7 +3811,7 @@
       </p:sp>
       <p:sp>
         <p:nvSpPr>
-          <p:cNvPr id="60" name="PlaceHolder 2"/>
+          <p:cNvPr id="58" name="PlaceHolder 2"/>
           <p:cNvSpPr>
             <a:spLocks noGrp="1"/>
           </p:cNvSpPr>
@@ -3955,27 +3856,7 @@
                 <a:uFillTx/>
                 <a:latin typeface="Arial"/>
               </a:rPr>
-              <a:t>Kada program radi kako želimo u simulatoru, možemo ga isprobati na pravom PicoBlazeu tako da kliknemo na “</a:t>
-            </a:r>
-            <a:r>
-              <a:rPr b="0" i="1" lang="bs-BA" sz="2400" strike="noStrike" u="none">
-                <a:solidFill>
-                  <a:srgbClr val="009bdd"/>
-                </a:solidFill>
-                <a:uFillTx/>
-                <a:latin typeface="Arial"/>
-              </a:rPr>
-              <a:t>Download Hexadecimal</a:t>
-            </a:r>
-            <a:r>
-              <a:rPr b="0" lang="bs-BA" sz="2400" strike="noStrike" u="none">
-                <a:solidFill>
-                  <a:srgbClr val="009bdd"/>
-                </a:solidFill>
-                <a:uFillTx/>
-                <a:latin typeface="Arial"/>
-              </a:rPr>
-              <a:t>”.</a:t>
+              <a:t>Ako želimo, možemo dodati i breakpointse na koje će emulacija pauzirati.</a:t>
             </a:r>
             <a:endParaRPr b="0" lang="bs-BA" sz="2400" strike="noStrike" u="none">
               <a:solidFill>
@@ -4005,7 +3886,77 @@
                 <a:uFillTx/>
                 <a:latin typeface="Arial"/>
               </a:rPr>
-              <a:t>I Xilinxov asembler za PicoBlaze ispisuje heksadecimalne datoteke, tako da činjenica da ne ispisujemo binarne datoteke nije problem.</a:t>
+              <a:t>Tu sam mogućnost dodao na prijedlog profesora Tomislava Matića mlađeg.</a:t>
+            </a:r>
+            <a:endParaRPr b="0" lang="bs-BA" sz="2400" strike="noStrike" u="none">
+              <a:solidFill>
+                <a:srgbClr val="009bdd"/>
+              </a:solidFill>
+              <a:uFillTx/>
+              <a:latin typeface="Arial"/>
+            </a:endParaRPr>
+          </a:p>
+          <a:p>
+            <a:pPr marL="432000" indent="-324000">
+              <a:spcBef>
+                <a:spcPts val="1060"/>
+              </a:spcBef>
+              <a:buClr>
+                <a:srgbClr val="77caee"/>
+              </a:buClr>
+              <a:buSzPct val="45000"/>
+              <a:buFont typeface="Wingdings" charset="2"/>
+              <a:buChar char=""/>
+            </a:pPr>
+            <a:r>
+              <a:rPr b="0" lang="bs-BA" sz="2400" strike="noStrike" u="none">
+                <a:solidFill>
+                  <a:srgbClr val="009bdd"/>
+                </a:solidFill>
+                <a:uFillTx/>
+                <a:latin typeface="Arial"/>
+              </a:rPr>
+              <a:t>Postoje samo </a:t>
+            </a:r>
+            <a:r>
+              <a:rPr b="0" i="1" lang="bs-BA" sz="2400" strike="noStrike" u="none">
+                <a:solidFill>
+                  <a:srgbClr val="009bdd"/>
+                </a:solidFill>
+                <a:uFillTx/>
+                <a:latin typeface="Arial"/>
+              </a:rPr>
+              <a:t>permanent</a:t>
+            </a:r>
+            <a:r>
+              <a:rPr b="0" lang="bs-BA" sz="2400" strike="noStrike" u="none">
+                <a:solidFill>
+                  <a:srgbClr val="009bdd"/>
+                </a:solidFill>
+                <a:uFillTx/>
+                <a:latin typeface="Arial"/>
+              </a:rPr>
+              <a:t> breakpointsi, ne i </a:t>
+            </a:r>
+            <a:r>
+              <a:rPr b="0" i="1" lang="bs-BA" sz="2400" strike="noStrike" u="none">
+                <a:solidFill>
+                  <a:srgbClr val="009bdd"/>
+                </a:solidFill>
+                <a:uFillTx/>
+                <a:latin typeface="Arial"/>
+              </a:rPr>
+              <a:t>temporary</a:t>
+            </a:r>
+            <a:r>
+              <a:rPr b="0" lang="bs-BA" sz="2400" strike="noStrike" u="none">
+                <a:solidFill>
+                  <a:srgbClr val="009bdd"/>
+                </a:solidFill>
+                <a:uFillTx/>
+                <a:latin typeface="Arial"/>
+              </a:rPr>
+              <a:t>.</a:t>
             </a:r>
             <a:endParaRPr b="0" lang="bs-BA" sz="2400" strike="noStrike" u="none">
               <a:solidFill>
@@ -4019,7 +3970,7 @@
       </p:sp>
       <p:pic>
         <p:nvPicPr>
-          <p:cNvPr id="61" name="" descr=""/>
+          <p:cNvPr id="59" name="" descr=""/>
           <p:cNvPicPr/>
           <p:nvPr/>
         </p:nvPicPr>
@@ -4029,8 +3980,8 @@
         </p:blipFill>
         <p:spPr>
           <a:xfrm>
-            <a:off x="365760" y="937440"/>
-            <a:ext cx="4663440" cy="3863160"/>
+            <a:off x="228600" y="1013760"/>
+            <a:ext cx="4739400" cy="3786840"/>
           </a:xfrm>
           <a:prstGeom prst="rect">
             <a:avLst/>
@@ -4043,14 +3994,14 @@
       </p:pic>
       <p:sp>
         <p:nvSpPr>
-          <p:cNvPr id="62" name=""/>
+          <p:cNvPr id="60" name=""/>
           <p:cNvSpPr/>
           <p:nvPr/>
         </p:nvSpPr>
         <p:spPr>
           <a:xfrm>
-            <a:off x="1828800" y="914400"/>
-            <a:ext cx="1828800" cy="457200"/>
+            <a:off x="228600" y="4114800"/>
+            <a:ext cx="685800" cy="228600"/>
           </a:xfrm>
           <a:prstGeom prst="ellipse">
             <a:avLst/>
@@ -4098,7 +4049,7 @@
         <p:txBody>
           <a:bodyPr/>
           <a:p>
-            <a:fld id="{5CD6791A-F1E9-472B-97E6-86C90A88F191}" type="slidenum">
+            <a:fld id="{AE8633DE-CBC2-4D9C-A29B-152ADE5F9F40}" type="slidenum">
               <a:t>12</a:t>
             </a:fld>
           </a:p>
@@ -4118,9 +4069,9 @@
         <p:txBody>
           <a:bodyPr/>
           <a:p>
-            <a:fld id="{FFE3383B-A346-4B1C-982A-E7580CF9B5EA}" type="datetime1">
+            <a:fld id="{EDB61A03-A40B-4879-8237-FA285383F943}" type="datetime1">
               <a:rPr lang="en-US"/>
-              <a:t>04/14/2025</a:t>
+              <a:t>04/24/2025</a:t>
             </a:fld>
           </a:p>
         </p:txBody>
@@ -4157,7 +4108,7 @@
       </p:grpSpPr>
       <p:sp>
         <p:nvSpPr>
-          <p:cNvPr id="63" name="PlaceHolder 1"/>
+          <p:cNvPr id="61" name="PlaceHolder 1"/>
           <p:cNvSpPr>
             <a:spLocks noGrp="1"/>
           </p:cNvSpPr>
@@ -4208,7 +4159,7 @@
       </p:sp>
       <p:sp>
         <p:nvSpPr>
-          <p:cNvPr id="64" name="PlaceHolder 2"/>
+          <p:cNvPr id="62" name="PlaceHolder 2"/>
           <p:cNvSpPr>
             <a:spLocks noGrp="1"/>
           </p:cNvSpPr>
@@ -4253,7 +4204,27 @@
                 <a:uFillTx/>
                 <a:latin typeface="Arial"/>
               </a:rPr>
-              <a:t>Kada dostignemo breakpoint, možemo pogledati trenutne registre, zastavice i memoriju u tablicama.</a:t>
+              <a:t>Kada program radi kako želimo u simulatoru, možemo ga isprobati na pravom PicoBlazeu tako da kliknemo na “</a:t>
+            </a:r>
+            <a:r>
+              <a:rPr b="0" i="1" lang="bs-BA" sz="2400" strike="noStrike" u="none">
+                <a:solidFill>
+                  <a:srgbClr val="009bdd"/>
+                </a:solidFill>
+                <a:uFillTx/>
+                <a:latin typeface="Arial"/>
+              </a:rPr>
+              <a:t>Download Hexadecimal</a:t>
+            </a:r>
+            <a:r>
+              <a:rPr b="0" lang="bs-BA" sz="2400" strike="noStrike" u="none">
+                <a:solidFill>
+                  <a:srgbClr val="009bdd"/>
+                </a:solidFill>
+                <a:uFillTx/>
+                <a:latin typeface="Arial"/>
+              </a:rPr>
+              <a:t>”.</a:t>
             </a:r>
             <a:endParaRPr b="0" lang="bs-BA" sz="2400" strike="noStrike" u="none">
               <a:solidFill>
@@ -4283,27 +4254,7 @@
                 <a:uFillTx/>
                 <a:latin typeface="Arial"/>
               </a:rPr>
-              <a:t>Nedavno promijenjene zastavice i registri obojane su različitom bojom, da nam ne bi promakli. Za to se koristio </a:t>
-            </a:r>
-            <a:r>
-              <a:rPr b="0" i="1" lang="bs-BA" sz="2400" strike="noStrike" u="none">
-                <a:solidFill>
-                  <a:srgbClr val="009bdd"/>
-                </a:solidFill>
-                <a:uFillTx/>
-                <a:latin typeface="Arial"/>
-              </a:rPr>
-              <a:t>DOM as a state</a:t>
-            </a:r>
-            <a:r>
-              <a:rPr b="0" lang="bs-BA" sz="2400" strike="noStrike" u="none">
-                <a:solidFill>
-                  <a:srgbClr val="009bdd"/>
-                </a:solidFill>
-                <a:uFillTx/>
-                <a:latin typeface="Arial"/>
-              </a:rPr>
-              <a:t>, što možda i nije najbolje rješenje.</a:t>
+              <a:t>I Xilinxov asembler za PicoBlaze ispisuje heksadecimalne datoteke, tako da činjenica da ne ispisujemo binarne datoteke nije problem.</a:t>
             </a:r>
             <a:endParaRPr b="0" lang="bs-BA" sz="2400" strike="noStrike" u="none">
               <a:solidFill>
@@ -4317,7 +4268,7 @@
       </p:sp>
       <p:pic>
         <p:nvPicPr>
-          <p:cNvPr id="65" name="" descr=""/>
+          <p:cNvPr id="63" name="" descr=""/>
           <p:cNvPicPr/>
           <p:nvPr/>
         </p:nvPicPr>
@@ -4327,8 +4278,8 @@
         </p:blipFill>
         <p:spPr>
           <a:xfrm>
-            <a:off x="343080" y="914400"/>
-            <a:ext cx="4686120" cy="3779280"/>
+            <a:off x="365760" y="937440"/>
+            <a:ext cx="4663440" cy="3863160"/>
           </a:xfrm>
           <a:prstGeom prst="rect">
             <a:avLst/>
@@ -4341,6 +4292,49 @@
       </p:pic>
       <p:sp>
         <p:nvSpPr>
+          <p:cNvPr id="64" name=""/>
+          <p:cNvSpPr/>
+          <p:nvPr/>
+        </p:nvSpPr>
+        <p:spPr>
+          <a:xfrm>
+            <a:off x="1828800" y="914400"/>
+            <a:ext cx="1828800" cy="457200"/>
+          </a:xfrm>
+          <a:prstGeom prst="ellipse">
+            <a:avLst/>
+          </a:prstGeom>
+          <a:noFill/>
+          <a:ln w="18000">
+            <a:solidFill>
+              <a:srgbClr val="009bdd"/>
+            </a:solidFill>
+            <a:round/>
+          </a:ln>
+        </p:spPr>
+        <p:style>
+          <a:lnRef idx="0"/>
+          <a:fillRef idx="0"/>
+          <a:effectRef idx="0"/>
+          <a:fontRef idx="minor"/>
+        </p:style>
+        <p:txBody>
+          <a:bodyPr wrap="none" lIns="90000" rIns="90000" tIns="45000" bIns="45000" anchor="ctr">
+            <a:noAutofit/>
+          </a:bodyPr>
+          <a:p>
+            <a:endParaRPr b="0" lang="bs-BA" sz="1800" strike="noStrike" u="none">
+              <a:solidFill>
+                <a:srgbClr val="000000"/>
+              </a:solidFill>
+              <a:uFillTx/>
+              <a:latin typeface="Arial"/>
+            </a:endParaRPr>
+          </a:p>
+        </p:txBody>
+      </p:sp>
+      <p:sp>
+        <p:nvSpPr>
           <p:cNvPr id="4" name="PlaceHolder 3"/>
           <p:cNvSpPr>
             <a:spLocks noGrp="1"/>
@@ -4353,7 +4347,7 @@
         <p:txBody>
           <a:bodyPr/>
           <a:p>
-            <a:fld id="{E8E4E726-A200-422A-BB40-9C5094F126F0}" type="slidenum">
+            <a:fld id="{93C45131-2CE4-4B68-B939-F1D283641FEA}" type="slidenum">
               <a:t>13</a:t>
             </a:fld>
           </a:p>
@@ -4373,9 +4367,9 @@
         <p:txBody>
           <a:bodyPr/>
           <a:p>
-            <a:fld id="{4F36E4A8-FC43-44DD-A5E6-D3294336A069}" type="datetime1">
+            <a:fld id="{7F034091-C761-4904-9E20-92665C8055C2}" type="datetime1">
               <a:rPr lang="en-US"/>
-              <a:t>04/14/2025</a:t>
+              <a:t>04/24/2025</a:t>
             </a:fld>
           </a:p>
         </p:txBody>
@@ -4412,7 +4406,7 @@
       </p:grpSpPr>
       <p:sp>
         <p:nvSpPr>
-          <p:cNvPr id="66" name="PlaceHolder 1"/>
+          <p:cNvPr id="65" name="PlaceHolder 1"/>
           <p:cNvSpPr>
             <a:spLocks noGrp="1"/>
           </p:cNvSpPr>
@@ -4463,7 +4457,7 @@
       </p:sp>
       <p:sp>
         <p:nvSpPr>
-          <p:cNvPr id="67" name="PlaceHolder 2"/>
+          <p:cNvPr id="66" name="PlaceHolder 2"/>
           <p:cNvSpPr>
             <a:spLocks noGrp="1"/>
           </p:cNvSpPr>
@@ -4508,7 +4502,7 @@
                 <a:uFillTx/>
                 <a:latin typeface="Arial"/>
               </a:rPr>
-              <a:t>Da bismo komunicirali s programima kao što je “Decimal to Binary” (drugi primjer s lijeva), moramo uključiti UART terminal.</a:t>
+              <a:t>Kada dostignemo breakpoint, možemo pogledati trenutne registre, zastavice i memoriju u tablicama.</a:t>
             </a:r>
             <a:endParaRPr b="0" lang="bs-BA" sz="2400" strike="noStrike" u="none">
               <a:solidFill>
@@ -4538,7 +4532,7 @@
                 <a:uFillTx/>
                 <a:latin typeface="Arial"/>
               </a:rPr>
-              <a:t>Preporučljivo je pritom isključiti checkbox “</a:t>
+              <a:t>Nedavno promijenjene zastavice i registri obojane su različitom bojom, da nam ne bi promakli. Za to se koristio </a:t>
             </a:r>
             <a:r>
               <a:rPr b="0" i="1" lang="bs-BA" sz="2400" strike="noStrike" u="none">
@@ -4548,7 +4542,7 @@
                 <a:uFillTx/>
                 <a:latin typeface="Arial"/>
               </a:rPr>
-              <a:t>Update registers and flags on every step</a:t>
+              <a:t>DOM as a state</a:t>
             </a:r>
             <a:r>
               <a:rPr b="0" lang="bs-BA" sz="2400" strike="noStrike" u="none">
@@ -4558,27 +4552,7 @@
                 <a:uFillTx/>
                 <a:latin typeface="Arial"/>
               </a:rPr>
-              <a:t>”. Verzija </a:t>
-            </a:r>
-            <a:r>
-              <a:rPr b="0" i="1" lang="bs-BA" sz="2400" strike="noStrike" u="none">
-                <a:solidFill>
-                  <a:srgbClr val="009bdd"/>
-                </a:solidFill>
-                <a:uFillTx/>
-                <a:latin typeface="Arial"/>
-              </a:rPr>
-              <a:t>v3.1.4</a:t>
-            </a:r>
-            <a:r>
-              <a:rPr b="0" lang="bs-BA" sz="2400" strike="noStrike" u="none">
-                <a:solidFill>
-                  <a:srgbClr val="009bdd"/>
-                </a:solidFill>
-                <a:uFillTx/>
-                <a:latin typeface="Arial"/>
-              </a:rPr>
-              <a:t> i novije to rade automatski.</a:t>
+              <a:t>, što možda i nije najbolje rješenje.</a:t>
             </a:r>
             <a:endParaRPr b="0" lang="bs-BA" sz="2400" strike="noStrike" u="none">
               <a:solidFill>
@@ -4592,7 +4566,7 @@
       </p:sp>
       <p:pic>
         <p:nvPicPr>
-          <p:cNvPr id="68" name="" descr=""/>
+          <p:cNvPr id="67" name="" descr=""/>
           <p:cNvPicPr/>
           <p:nvPr/>
         </p:nvPicPr>
@@ -4602,8 +4576,8 @@
         </p:blipFill>
         <p:spPr>
           <a:xfrm>
-            <a:off x="396360" y="914400"/>
-            <a:ext cx="3032640" cy="1833120"/>
+            <a:off x="343080" y="914400"/>
+            <a:ext cx="4686120" cy="3779280"/>
           </a:xfrm>
           <a:prstGeom prst="rect">
             <a:avLst/>
@@ -4614,30 +4588,6 @@
           </a:ln>
         </p:spPr>
       </p:pic>
-      <p:pic>
-        <p:nvPicPr>
-          <p:cNvPr id="69" name="" descr=""/>
-          <p:cNvPicPr/>
-          <p:nvPr/>
-        </p:nvPicPr>
-        <p:blipFill>
-          <a:blip r:embed="rId2"/>
-          <a:stretch/>
-        </p:blipFill>
-        <p:spPr>
-          <a:xfrm>
-            <a:off x="327960" y="3200400"/>
-            <a:ext cx="4701240" cy="837720"/>
-          </a:xfrm>
-          <a:prstGeom prst="rect">
-            <a:avLst/>
-          </a:prstGeom>
-          <a:noFill/>
-          <a:ln w="18000">
-            <a:noFill/>
-          </a:ln>
-        </p:spPr>
-      </p:pic>
       <p:sp>
         <p:nvSpPr>
           <p:cNvPr id="4" name="PlaceHolder 3"/>
@@ -4652,7 +4602,7 @@
         <p:txBody>
           <a:bodyPr/>
           <a:p>
-            <a:fld id="{77C68A0A-EC28-4ECB-BD50-CCDDC5D4A58D}" type="slidenum">
+            <a:fld id="{82DC6DFA-2443-4B38-97BB-BECBDBECF0A8}" type="slidenum">
               <a:t>14</a:t>
             </a:fld>
           </a:p>
@@ -4672,9 +4622,9 @@
         <p:txBody>
           <a:bodyPr/>
           <a:p>
-            <a:fld id="{D4F886C8-DD11-4169-8F7F-0CDCB1033C3C}" type="datetime1">
+            <a:fld id="{873972A3-BA52-4F92-A6D2-6B5A4261773C}" type="datetime1">
               <a:rPr lang="en-US"/>
-              <a:t>04/14/2025</a:t>
+              <a:t>04/24/2025</a:t>
             </a:fld>
           </a:p>
         </p:txBody>
@@ -4711,7 +4661,7 @@
       </p:grpSpPr>
       <p:sp>
         <p:nvSpPr>
-          <p:cNvPr id="70" name="PlaceHolder 1"/>
+          <p:cNvPr id="68" name="PlaceHolder 1"/>
           <p:cNvSpPr>
             <a:spLocks noGrp="1"/>
           </p:cNvSpPr>
@@ -4748,17 +4698,7 @@
                 <a:uFillTx/>
                 <a:latin typeface="Arial"/>
               </a:rPr>
-              <a:t>“</a:t>
-            </a:r>
-            <a:r>
-              <a:rPr b="0" lang="bs-BA" sz="3300" strike="noStrike" u="none">
-                <a:solidFill>
-                  <a:srgbClr val="ffffff"/>
-                </a:solidFill>
-                <a:uFillTx/>
-                <a:latin typeface="Arial"/>
-              </a:rPr>
-              <a:t>Update registers and flags on every step”</a:t>
+              <a:t>Kako se koristi...</a:t>
             </a:r>
             <a:endParaRPr b="0" lang="bs-BA" sz="3300" strike="noStrike" u="none">
               <a:solidFill>
@@ -4772,7 +4712,7 @@
       </p:sp>
       <p:sp>
         <p:nvSpPr>
-          <p:cNvPr id="71" name="PlaceHolder 2"/>
+          <p:cNvPr id="69" name="PlaceHolder 2"/>
           <p:cNvSpPr>
             <a:spLocks noGrp="1"/>
           </p:cNvSpPr>
@@ -4782,8 +4722,8 @@
         </p:nvSpPr>
         <p:spPr>
           <a:xfrm>
-            <a:off x="360000" y="1080000"/>
-            <a:ext cx="9360000" cy="3600000"/>
+            <a:off x="5155920" y="1080000"/>
+            <a:ext cx="4567320" cy="3600000"/>
           </a:xfrm>
           <a:prstGeom prst="rect">
             <a:avLst/>
@@ -4810,16 +4750,16 @@
               <a:buChar char=""/>
             </a:pPr>
             <a:r>
-              <a:rPr b="0" lang="bs-BA" sz="2200" strike="noStrike" u="none">
-                <a:solidFill>
-                  <a:srgbClr val="009bdd"/>
-                </a:solidFill>
-                <a:uFillTx/>
-                <a:latin typeface="Arial"/>
-              </a:rPr>
-              <a:t>Naime, moj program ima problem s layout trashingom: svaki put kad se upiše novi broj u tablicu s registrima (dakle, praktički svaka instrukcija), tablica se neprimjetno poveća ili smanji za nekoliko piksela... ali dovoljno da prisili browser da čitavu stranicu mora iznova renderirati.</a:t>
-            </a:r>
-            <a:endParaRPr b="0" lang="bs-BA" sz="2200" strike="noStrike" u="none">
+              <a:rPr b="0" lang="bs-BA" sz="2400" strike="noStrike" u="none">
+                <a:solidFill>
+                  <a:srgbClr val="009bdd"/>
+                </a:solidFill>
+                <a:uFillTx/>
+                <a:latin typeface="Arial"/>
+              </a:rPr>
+              <a:t>Da bismo komunicirali s programima kao što je “Decimal to Binary” (drugi primjer s lijeva), moramo uključiti UART terminal.</a:t>
+            </a:r>
+            <a:endParaRPr b="0" lang="bs-BA" sz="2400" strike="noStrike" u="none">
               <a:solidFill>
                 <a:srgbClr val="009bdd"/>
               </a:solidFill>
@@ -4840,16 +4780,56 @@
               <a:buChar char=""/>
             </a:pPr>
             <a:r>
-              <a:rPr b="0" lang="bs-BA" sz="2200" strike="noStrike" u="none">
-                <a:solidFill>
-                  <a:srgbClr val="009bdd"/>
-                </a:solidFill>
-                <a:uFillTx/>
-                <a:latin typeface="Arial"/>
-              </a:rPr>
-              <a:t>Činjenica da sam koristio monospace font u tablici, izgleda, ne pomaže.</a:t>
-            </a:r>
-            <a:endParaRPr b="0" lang="bs-BA" sz="2200" strike="noStrike" u="none">
+              <a:rPr b="0" lang="bs-BA" sz="2400" strike="noStrike" u="none">
+                <a:solidFill>
+                  <a:srgbClr val="009bdd"/>
+                </a:solidFill>
+                <a:uFillTx/>
+                <a:latin typeface="Arial"/>
+              </a:rPr>
+              <a:t>Preporučljivo je pritom isključiti checkbox “</a:t>
+            </a:r>
+            <a:r>
+              <a:rPr b="0" i="1" lang="bs-BA" sz="2400" strike="noStrike" u="none">
+                <a:solidFill>
+                  <a:srgbClr val="009bdd"/>
+                </a:solidFill>
+                <a:uFillTx/>
+                <a:latin typeface="Arial"/>
+              </a:rPr>
+              <a:t>Update registers and flags on every step</a:t>
+            </a:r>
+            <a:r>
+              <a:rPr b="0" lang="bs-BA" sz="2400" strike="noStrike" u="none">
+                <a:solidFill>
+                  <a:srgbClr val="009bdd"/>
+                </a:solidFill>
+                <a:uFillTx/>
+                <a:latin typeface="Arial"/>
+              </a:rPr>
+              <a:t>”. Verzija </a:t>
+            </a:r>
+            <a:r>
+              <a:rPr b="0" i="1" lang="bs-BA" sz="2400" strike="noStrike" u="none">
+                <a:solidFill>
+                  <a:srgbClr val="009bdd"/>
+                </a:solidFill>
+                <a:uFillTx/>
+                <a:latin typeface="Arial"/>
+              </a:rPr>
+              <a:t>v3.1.4</a:t>
+            </a:r>
+            <a:r>
+              <a:rPr b="0" lang="bs-BA" sz="2400" strike="noStrike" u="none">
+                <a:solidFill>
+                  <a:srgbClr val="009bdd"/>
+                </a:solidFill>
+                <a:uFillTx/>
+                <a:latin typeface="Arial"/>
+              </a:rPr>
+              <a:t> i novije to rade automatski.</a:t>
+            </a:r>
+            <a:endParaRPr b="0" lang="bs-BA" sz="2400" strike="noStrike" u="none">
               <a:solidFill>
                 <a:srgbClr val="009bdd"/>
               </a:solidFill>
@@ -4857,78 +4837,56 @@
               <a:latin typeface="Arial"/>
             </a:endParaRPr>
           </a:p>
-          <a:p>
-            <a:pPr marL="432000" indent="-324000">
-              <a:spcBef>
-                <a:spcPts val="1060"/>
-              </a:spcBef>
-              <a:buClr>
-                <a:srgbClr val="77caee"/>
-              </a:buClr>
-              <a:buSzPct val="45000"/>
-              <a:buFont typeface="Wingdings" charset="2"/>
-              <a:buChar char=""/>
-            </a:pPr>
-            <a:r>
-              <a:rPr b="0" lang="bs-BA" sz="2200" strike="noStrike" u="none">
-                <a:solidFill>
-                  <a:srgbClr val="009bdd"/>
-                </a:solidFill>
-                <a:uFillTx/>
-                <a:latin typeface="Arial"/>
-              </a:rPr>
-              <a:t>Vjerujemo da je u modernim internetskim preglednicima (Firefox 69, Chrome 52...) to moguće riješiti CSS-om (naredba “</a:t>
-            </a:r>
-            <a:r>
-              <a:rPr b="0" i="1" lang="bs-BA" sz="2200" strike="noStrike" u="none">
-                <a:solidFill>
-                  <a:srgbClr val="009bdd"/>
-                </a:solidFill>
-                <a:uFillTx/>
-                <a:latin typeface="Arial"/>
-              </a:rPr>
-              <a:t>contain: layout</a:t>
-            </a:r>
-            <a:r>
-              <a:rPr b="0" lang="bs-BA" sz="2200" strike="noStrike" u="none">
-                <a:solidFill>
-                  <a:srgbClr val="009bdd"/>
-                </a:solidFill>
-                <a:uFillTx/>
-                <a:latin typeface="Arial"/>
-              </a:rPr>
-              <a:t>” i njoj srodne) i da će to i biti u nekoj budućoj verziji ovog simulatora. Ali, for the time being, postoji checkbox kojim se program može donekle ubrzati. Uostalom, to rješenje sa checkboxom funkcionira i u Firefoxu 52 (koji ne podržava “</a:t>
-            </a:r>
-            <a:r>
-              <a:rPr b="0" i="1" lang="bs-BA" sz="2200" strike="noStrike" u="none">
-                <a:solidFill>
-                  <a:srgbClr val="009bdd"/>
-                </a:solidFill>
-                <a:uFillTx/>
-                <a:latin typeface="Arial"/>
-              </a:rPr>
-              <a:t>contain: layout</a:t>
-            </a:r>
-            <a:r>
-              <a:rPr b="0" lang="bs-BA" sz="2200" strike="noStrike" u="none">
-                <a:solidFill>
-                  <a:srgbClr val="009bdd"/>
-                </a:solidFill>
-                <a:uFillTx/>
-                <a:latin typeface="Arial"/>
-              </a:rPr>
-              <a:t>” i njoj srodne naredbe).</a:t>
-            </a:r>
-            <a:endParaRPr b="0" lang="bs-BA" sz="2200" strike="noStrike" u="none">
-              <a:solidFill>
-                <a:srgbClr val="009bdd"/>
-              </a:solidFill>
-              <a:uFillTx/>
-              <a:latin typeface="Arial"/>
-            </a:endParaRPr>
-          </a:p>
-        </p:txBody>
-      </p:sp>
+        </p:txBody>
+      </p:sp>
+      <p:pic>
+        <p:nvPicPr>
+          <p:cNvPr id="70" name="" descr=""/>
+          <p:cNvPicPr/>
+          <p:nvPr/>
+        </p:nvPicPr>
+        <p:blipFill>
+          <a:blip r:embed="rId1"/>
+          <a:stretch/>
+        </p:blipFill>
+        <p:spPr>
+          <a:xfrm>
+            <a:off x="396360" y="914400"/>
+            <a:ext cx="3032640" cy="1833120"/>
+          </a:xfrm>
+          <a:prstGeom prst="rect">
+            <a:avLst/>
+          </a:prstGeom>
+          <a:noFill/>
+          <a:ln w="18000">
+            <a:noFill/>
+          </a:ln>
+        </p:spPr>
+      </p:pic>
+      <p:pic>
+        <p:nvPicPr>
+          <p:cNvPr id="71" name="" descr=""/>
+          <p:cNvPicPr/>
+          <p:nvPr/>
+        </p:nvPicPr>
+        <p:blipFill>
+          <a:blip r:embed="rId2"/>
+          <a:stretch/>
+        </p:blipFill>
+        <p:spPr>
+          <a:xfrm>
+            <a:off x="327960" y="3200400"/>
+            <a:ext cx="4701240" cy="837720"/>
+          </a:xfrm>
+          <a:prstGeom prst="rect">
+            <a:avLst/>
+          </a:prstGeom>
+          <a:noFill/>
+          <a:ln w="18000">
+            <a:noFill/>
+          </a:ln>
+        </p:spPr>
+      </p:pic>
       <p:sp>
         <p:nvSpPr>
           <p:cNvPr id="4" name="PlaceHolder 3"/>
@@ -4943,7 +4901,7 @@
         <p:txBody>
           <a:bodyPr/>
           <a:p>
-            <a:fld id="{ED010791-D29E-44A3-A50D-E5231991287C}" type="slidenum">
+            <a:fld id="{0A3FBFFB-6F05-4A1B-A2EF-FA2BD3D0CB7F}" type="slidenum">
               <a:t>15</a:t>
             </a:fld>
           </a:p>
@@ -4963,9 +4921,9 @@
         <p:txBody>
           <a:bodyPr/>
           <a:p>
-            <a:fld id="{4E220718-BE79-4EC2-8225-D1C86A749082}" type="datetime1">
+            <a:fld id="{88EAE3F5-82FC-43CA-AC3D-9185B8C89A60}" type="datetime1">
               <a:rPr lang="en-US"/>
-              <a:t>04/14/2025</a:t>
+              <a:t>04/24/2025</a:t>
             </a:fld>
           </a:p>
         </p:txBody>
@@ -5039,7 +4997,17 @@
                 <a:uFillTx/>
                 <a:latin typeface="Arial"/>
               </a:rPr>
-              <a:t>Je li simulacija UART-a realna?</a:t>
+              <a:t>“</a:t>
+            </a:r>
+            <a:r>
+              <a:rPr b="0" lang="bs-BA" sz="3300" strike="noStrike" u="none">
+                <a:solidFill>
+                  <a:srgbClr val="ffffff"/>
+                </a:solidFill>
+                <a:uFillTx/>
+                <a:latin typeface="Arial"/>
+              </a:rPr>
+              <a:t>Update registers and flags on every step”</a:t>
             </a:r>
             <a:endParaRPr b="0" lang="bs-BA" sz="3300" strike="noStrike" u="none">
               <a:solidFill>
@@ -5091,16 +5059,16 @@
               <a:buChar char=""/>
             </a:pPr>
             <a:r>
-              <a:rPr b="0" lang="bs-BA" sz="2400" strike="noStrike" u="none">
-                <a:solidFill>
-                  <a:srgbClr val="009bdd"/>
-                </a:solidFill>
-                <a:uFillTx/>
-                <a:latin typeface="Arial"/>
-              </a:rPr>
-              <a:t>Program “Decimal to Binary” nisam uspio pokrenuti na pravom PicoBlazeu, a nisam uspio ni dijagnosticirati problem. Tako da ga ne treba uzeti kao sigurno dobar primjer kako se na PicoBlazeu koristi UART.</a:t>
-            </a:r>
-            <a:endParaRPr b="0" lang="bs-BA" sz="2400" strike="noStrike" u="none">
+              <a:rPr b="0" lang="bs-BA" sz="2200" strike="noStrike" u="none">
+                <a:solidFill>
+                  <a:srgbClr val="009bdd"/>
+                </a:solidFill>
+                <a:uFillTx/>
+                <a:latin typeface="Arial"/>
+              </a:rPr>
+              <a:t>Naime, moj program ima problem s layout trashingom: svaki put kad se upiše novi broj u tablicu s registrima (dakle, praktički svaka instrukcija), tablica se neprimjetno poveća ili smanji za nekoliko piksela... ali dovoljno da prisili browser da čitavu stranicu mora iznova renderirati.</a:t>
+            </a:r>
+            <a:endParaRPr b="0" lang="bs-BA" sz="2200" strike="noStrike" u="none">
               <a:solidFill>
                 <a:srgbClr val="009bdd"/>
               </a:solidFill>
@@ -5108,6 +5076,106 @@
               <a:latin typeface="Arial"/>
             </a:endParaRPr>
           </a:p>
+          <a:p>
+            <a:pPr marL="432000" indent="-324000">
+              <a:spcBef>
+                <a:spcPts val="1060"/>
+              </a:spcBef>
+              <a:buClr>
+                <a:srgbClr val="77caee"/>
+              </a:buClr>
+              <a:buSzPct val="45000"/>
+              <a:buFont typeface="Wingdings" charset="2"/>
+              <a:buChar char=""/>
+            </a:pPr>
+            <a:r>
+              <a:rPr b="0" lang="bs-BA" sz="2200" strike="noStrike" u="none">
+                <a:solidFill>
+                  <a:srgbClr val="009bdd"/>
+                </a:solidFill>
+                <a:uFillTx/>
+                <a:latin typeface="Arial"/>
+              </a:rPr>
+              <a:t>Činjenica da sam koristio monospace font u tablici, izgleda, ne pomaže.</a:t>
+            </a:r>
+            <a:endParaRPr b="0" lang="bs-BA" sz="2200" strike="noStrike" u="none">
+              <a:solidFill>
+                <a:srgbClr val="009bdd"/>
+              </a:solidFill>
+              <a:uFillTx/>
+              <a:latin typeface="Arial"/>
+            </a:endParaRPr>
+          </a:p>
+          <a:p>
+            <a:pPr marL="432000" indent="-324000">
+              <a:spcBef>
+                <a:spcPts val="1060"/>
+              </a:spcBef>
+              <a:buClr>
+                <a:srgbClr val="77caee"/>
+              </a:buClr>
+              <a:buSzPct val="45000"/>
+              <a:buFont typeface="Wingdings" charset="2"/>
+              <a:buChar char=""/>
+            </a:pPr>
+            <a:r>
+              <a:rPr b="0" lang="bs-BA" sz="2200" strike="noStrike" u="none">
+                <a:solidFill>
+                  <a:srgbClr val="009bdd"/>
+                </a:solidFill>
+                <a:uFillTx/>
+                <a:latin typeface="Arial"/>
+              </a:rPr>
+              <a:t>Vjerujemo da je u modernim internetskim preglednicima (Firefox 69, Chrome 52...) to moguće riješiti CSS-om (naredba “</a:t>
+            </a:r>
+            <a:r>
+              <a:rPr b="0" i="1" lang="bs-BA" sz="2200" strike="noStrike" u="none">
+                <a:solidFill>
+                  <a:srgbClr val="009bdd"/>
+                </a:solidFill>
+                <a:uFillTx/>
+                <a:latin typeface="Arial"/>
+              </a:rPr>
+              <a:t>contain: layout</a:t>
+            </a:r>
+            <a:r>
+              <a:rPr b="0" lang="bs-BA" sz="2200" strike="noStrike" u="none">
+                <a:solidFill>
+                  <a:srgbClr val="009bdd"/>
+                </a:solidFill>
+                <a:uFillTx/>
+                <a:latin typeface="Arial"/>
+              </a:rPr>
+              <a:t>” i njoj srodne) i da će to i biti u nekoj budućoj verziji ovog simulatora. Ali, for the time being, postoji checkbox kojim se program može donekle ubrzati. Uostalom, to rješenje sa checkboxom funkcionira i u Firefoxu 52 (koji ne podržava “</a:t>
+            </a:r>
+            <a:r>
+              <a:rPr b="0" i="1" lang="bs-BA" sz="2200" strike="noStrike" u="none">
+                <a:solidFill>
+                  <a:srgbClr val="009bdd"/>
+                </a:solidFill>
+                <a:uFillTx/>
+                <a:latin typeface="Arial"/>
+              </a:rPr>
+              <a:t>contain: layout</a:t>
+            </a:r>
+            <a:r>
+              <a:rPr b="0" lang="bs-BA" sz="2200" strike="noStrike" u="none">
+                <a:solidFill>
+                  <a:srgbClr val="009bdd"/>
+                </a:solidFill>
+                <a:uFillTx/>
+                <a:latin typeface="Arial"/>
+              </a:rPr>
+              <a:t>” i njoj srodne naredbe).</a:t>
+            </a:r>
+            <a:endParaRPr b="0" lang="bs-BA" sz="2200" strike="noStrike" u="none">
+              <a:solidFill>
+                <a:srgbClr val="009bdd"/>
+              </a:solidFill>
+              <a:uFillTx/>
+              <a:latin typeface="Arial"/>
+            </a:endParaRPr>
+          </a:p>
         </p:txBody>
       </p:sp>
       <p:sp>
@@ -5124,7 +5192,7 @@
         <p:txBody>
           <a:bodyPr/>
           <a:p>
-            <a:fld id="{59DBC9C1-A533-4A9B-BB63-24BF05C45461}" type="slidenum">
+            <a:fld id="{F47209B2-C077-4CB7-B90F-5C4A7B940026}" type="slidenum">
               <a:t>16</a:t>
             </a:fld>
           </a:p>
@@ -5144,9 +5212,9 @@
         <p:txBody>
           <a:bodyPr/>
           <a:p>
-            <a:fld id="{8566C6A3-3EEA-4209-82B5-95733DDC6ED9}" type="datetime1">
+            <a:fld id="{F09DA0E7-0762-4E7F-94C7-A2653924773D}" type="datetime1">
               <a:rPr lang="en-US"/>
-              <a:t>04/14/2025</a:t>
+              <a:t>04/24/2025</a:t>
             </a:fld>
           </a:p>
         </p:txBody>
@@ -5220,7 +5288,7 @@
                 <a:uFillTx/>
                 <a:latin typeface="Arial"/>
               </a:rPr>
-              <a:t>Kako se koristi...</a:t>
+              <a:t>Je li simulacija UART-a realna?</a:t>
             </a:r>
             <a:endParaRPr b="0" lang="bs-BA" sz="3300" strike="noStrike" u="none">
               <a:solidFill>
@@ -5244,8 +5312,8 @@
         </p:nvSpPr>
         <p:spPr>
           <a:xfrm>
-            <a:off x="5155920" y="1080000"/>
-            <a:ext cx="4567320" cy="3600000"/>
+            <a:off x="360000" y="1080000"/>
+            <a:ext cx="9360000" cy="3600000"/>
           </a:xfrm>
           <a:prstGeom prst="rect">
             <a:avLst/>
@@ -5279,17 +5347,7 @@
                 <a:uFillTx/>
                 <a:latin typeface="Arial"/>
               </a:rPr>
-              <a:t>Asembler podržava ono što se očekuje od današnjeg asemblera: aritmetičke izraze u konstantama, if-grananje, if-else grananje i while-petlje. </a:t>
-            </a:r>
-            <a:r>
-              <a:rPr b="0" i="1" lang="bs-BA" sz="2400" strike="noStrike" u="none">
-                <a:solidFill>
-                  <a:srgbClr val="009bdd"/>
-                </a:solidFill>
-                <a:uFillTx/>
-                <a:latin typeface="Arial"/>
-              </a:rPr>
-              <a:t>Svaki asembler ujedno je i interpreter.</a:t>
+              <a:t>Program “Decimal to Binary” nisam uspio pokrenuti na pravom PicoBlazeu, a nisam uspio ni dijagnosticirati problem. Tako da ga ne treba uzeti kao sigurno dobar primjer kako se na PicoBlazeu koristi UART.</a:t>
             </a:r>
             <a:endParaRPr b="0" lang="bs-BA" sz="2400" strike="noStrike" u="none">
               <a:solidFill>
@@ -5299,62 +5357,8 @@
               <a:latin typeface="Arial"/>
             </a:endParaRPr>
           </a:p>
-          <a:p>
-            <a:pPr marL="432000" indent="-324000">
-              <a:spcBef>
-                <a:spcPts val="1060"/>
-              </a:spcBef>
-              <a:buClr>
-                <a:srgbClr val="77caee"/>
-              </a:buClr>
-              <a:buSzPct val="45000"/>
-              <a:buFont typeface="Wingdings" charset="2"/>
-              <a:buChar char=""/>
-            </a:pPr>
-            <a:r>
-              <a:rPr b="0" lang="bs-BA" sz="2400" strike="noStrike" u="none">
-                <a:solidFill>
-                  <a:srgbClr val="009bdd"/>
-                </a:solidFill>
-                <a:uFillTx/>
-                <a:latin typeface="Arial"/>
-              </a:rPr>
-              <a:t>Primjer “Preprocessor Test” ispisuje Fibonaccijeve brojeve manje od 100 za vrijeme asembliranja.</a:t>
-            </a:r>
-            <a:endParaRPr b="0" lang="bs-BA" sz="2400" strike="noStrike" u="none">
-              <a:solidFill>
-                <a:srgbClr val="009bdd"/>
-              </a:solidFill>
-              <a:uFillTx/>
-              <a:latin typeface="Arial"/>
-            </a:endParaRPr>
-          </a:p>
-        </p:txBody>
-      </p:sp>
-      <p:pic>
-        <p:nvPicPr>
-          <p:cNvPr id="76" name="" descr=""/>
-          <p:cNvPicPr/>
-          <p:nvPr/>
-        </p:nvPicPr>
-        <p:blipFill>
-          <a:blip r:embed="rId1"/>
-          <a:stretch/>
-        </p:blipFill>
-        <p:spPr>
-          <a:xfrm>
-            <a:off x="228600" y="983160"/>
-            <a:ext cx="4671000" cy="3817440"/>
-          </a:xfrm>
-          <a:prstGeom prst="rect">
-            <a:avLst/>
-          </a:prstGeom>
-          <a:noFill/>
-          <a:ln w="18000">
-            <a:noFill/>
-          </a:ln>
-        </p:spPr>
-      </p:pic>
+        </p:txBody>
+      </p:sp>
       <p:sp>
         <p:nvSpPr>
           <p:cNvPr id="4" name="PlaceHolder 3"/>
@@ -5369,7 +5373,7 @@
         <p:txBody>
           <a:bodyPr/>
           <a:p>
-            <a:fld id="{DC19D314-B82A-49DC-82AA-1CF896B17294}" type="slidenum">
+            <a:fld id="{E426FA69-6470-4A38-8786-C0547B6B9C5B}" type="slidenum">
               <a:t>17</a:t>
             </a:fld>
           </a:p>
@@ -5389,9 +5393,9 @@
         <p:txBody>
           <a:bodyPr/>
           <a:p>
-            <a:fld id="{F8BC7BAA-9AA6-4BC8-B7FB-7C51C91AEBD5}" type="datetime1">
+            <a:fld id="{63B5E52E-9BF3-4F63-A6EC-A27BF1152666}" type="datetime1">
               <a:rPr lang="en-US"/>
-              <a:t>04/14/2025</a:t>
+              <a:t>04/24/2025</a:t>
             </a:fld>
           </a:p>
         </p:txBody>
@@ -5428,7 +5432,7 @@
       </p:grpSpPr>
       <p:sp>
         <p:nvSpPr>
-          <p:cNvPr id="77" name="PlaceHolder 1"/>
+          <p:cNvPr id="76" name="PlaceHolder 1"/>
           <p:cNvSpPr>
             <a:spLocks noGrp="1"/>
           </p:cNvSpPr>
@@ -5465,7 +5469,7 @@
                 <a:uFillTx/>
                 <a:latin typeface="Arial"/>
               </a:rPr>
-              <a:t>Nedostatci predprocesora</a:t>
+              <a:t>Kako se koristi...</a:t>
             </a:r>
             <a:endParaRPr b="0" lang="bs-BA" sz="3300" strike="noStrike" u="none">
               <a:solidFill>
@@ -5479,7 +5483,7 @@
       </p:sp>
       <p:sp>
         <p:nvSpPr>
-          <p:cNvPr id="78" name="PlaceHolder 2"/>
+          <p:cNvPr id="77" name="PlaceHolder 2"/>
           <p:cNvSpPr>
             <a:spLocks noGrp="1"/>
           </p:cNvSpPr>
@@ -5489,8 +5493,8 @@
         </p:nvSpPr>
         <p:spPr>
           <a:xfrm>
-            <a:off x="360000" y="1080000"/>
-            <a:ext cx="9360000" cy="3600000"/>
+            <a:off x="5155920" y="1080000"/>
+            <a:ext cx="4567320" cy="3600000"/>
           </a:xfrm>
           <a:prstGeom prst="rect">
             <a:avLst/>
@@ -5524,7 +5528,17 @@
                 <a:uFillTx/>
                 <a:latin typeface="Arial"/>
               </a:rPr>
-              <a:t>Ne podržava makro-naredbe.</a:t>
+              <a:t>Asembler podržava ono što se očekuje od današnjeg asemblera: aritmetičke izraze u konstantama, if-grananje, if-else grananje i while-petlje. </a:t>
+            </a:r>
+            <a:r>
+              <a:rPr b="0" i="1" lang="bs-BA" sz="2400" strike="noStrike" u="none">
+                <a:solidFill>
+                  <a:srgbClr val="009bdd"/>
+                </a:solidFill>
+                <a:uFillTx/>
+                <a:latin typeface="Arial"/>
+              </a:rPr>
+              <a:t>Svaki asembler ujedno je i interpreter.</a:t>
             </a:r>
             <a:endParaRPr b="0" lang="bs-BA" sz="2400" strike="noStrike" u="none">
               <a:solidFill>
@@ -5554,137 +5568,7 @@
                 <a:uFillTx/>
                 <a:latin typeface="Arial"/>
               </a:rPr>
-              <a:t>Postoji neki neobičan bug u pretprocesoru da naredba “</a:t>
-            </a:r>
-            <a:r>
-              <a:rPr b="0" i="1" lang="bs-BA" sz="2400" strike="noStrike" u="none">
-                <a:solidFill>
-                  <a:srgbClr val="009bdd"/>
-                </a:solidFill>
-                <a:uFillTx/>
-                <a:latin typeface="Arial"/>
-              </a:rPr>
-              <a:t>display a</a:t>
-            </a:r>
-            <a:r>
-              <a:rPr b="0" lang="bs-BA" sz="2400" strike="noStrike" u="none">
-                <a:solidFill>
-                  <a:srgbClr val="009bdd"/>
-                </a:solidFill>
-                <a:uFillTx/>
-                <a:latin typeface="Arial"/>
-              </a:rPr>
-              <a:t>”(novi red) ne radi kada je simulacija UART-a isključena.</a:t>
-            </a:r>
-            <a:endParaRPr b="0" lang="bs-BA" sz="2400" strike="noStrike" u="none">
-              <a:solidFill>
-                <a:srgbClr val="009bdd"/>
-              </a:solidFill>
-              <a:uFillTx/>
-              <a:latin typeface="Arial"/>
-            </a:endParaRPr>
-          </a:p>
-          <a:p>
-            <a:pPr marL="432000" indent="-324000">
-              <a:spcBef>
-                <a:spcPts val="1060"/>
-              </a:spcBef>
-              <a:buClr>
-                <a:srgbClr val="77caee"/>
-              </a:buClr>
-              <a:buSzPct val="45000"/>
-              <a:buFont typeface="Wingdings" charset="2"/>
-              <a:buChar char=""/>
-            </a:pPr>
-            <a:r>
-              <a:rPr b="0" lang="bs-BA" sz="2400" strike="noStrike" u="none">
-                <a:solidFill>
-                  <a:srgbClr val="009bdd"/>
-                </a:solidFill>
-                <a:uFillTx/>
-                <a:latin typeface="Arial"/>
-              </a:rPr>
-              <a:t>U </a:t>
-            </a:r>
-            <a:r>
-              <a:rPr b="0" i="1" lang="bs-BA" sz="2400" strike="noStrike" u="none">
-                <a:solidFill>
-                  <a:srgbClr val="009bdd"/>
-                </a:solidFill>
-                <a:uFillTx/>
-                <a:latin typeface="Arial"/>
-              </a:rPr>
-              <a:t>if</a:t>
-            </a:r>
-            <a:r>
-              <a:rPr b="0" lang="bs-BA" sz="2400" strike="noStrike" u="none">
-                <a:solidFill>
-                  <a:srgbClr val="009bdd"/>
-                </a:solidFill>
-                <a:uFillTx/>
-                <a:latin typeface="Arial"/>
-              </a:rPr>
-              <a:t>-grananjima, </a:t>
-            </a:r>
-            <a:r>
-              <a:rPr b="0" i="1" lang="bs-BA" sz="2400" strike="noStrike" u="none">
-                <a:solidFill>
-                  <a:srgbClr val="009bdd"/>
-                </a:solidFill>
-                <a:uFillTx/>
-                <a:latin typeface="Arial"/>
-              </a:rPr>
-              <a:t>if-else</a:t>
-            </a:r>
-            <a:r>
-              <a:rPr b="0" lang="bs-BA" sz="2400" strike="noStrike" u="none">
-                <a:solidFill>
-                  <a:srgbClr val="009bdd"/>
-                </a:solidFill>
-                <a:uFillTx/>
-                <a:latin typeface="Arial"/>
-              </a:rPr>
-              <a:t>-grananjima i </a:t>
-            </a:r>
-            <a:r>
-              <a:rPr b="0" i="1" lang="bs-BA" sz="2400" strike="noStrike" u="none">
-                <a:solidFill>
-                  <a:srgbClr val="009bdd"/>
-                </a:solidFill>
-                <a:uFillTx/>
-                <a:latin typeface="Arial"/>
-              </a:rPr>
-              <a:t>while</a:t>
-            </a:r>
-            <a:r>
-              <a:rPr b="0" lang="bs-BA" sz="2400" strike="noStrike" u="none">
-                <a:solidFill>
-                  <a:srgbClr val="009bdd"/>
-                </a:solidFill>
-                <a:uFillTx/>
-                <a:latin typeface="Arial"/>
-              </a:rPr>
-              <a:t>-petljama ne mogu se nalaziti mnemonike niti pretprocesorska naredba </a:t>
-            </a:r>
-            <a:r>
-              <a:rPr b="0" i="1" lang="bs-BA" sz="2400" strike="noStrike" u="none">
-                <a:solidFill>
-                  <a:srgbClr val="009bdd"/>
-                </a:solidFill>
-                <a:uFillTx/>
-                <a:latin typeface="Arial"/>
-              </a:rPr>
-              <a:t>address</a:t>
-            </a:r>
-            <a:r>
-              <a:rPr b="0" lang="bs-BA" sz="2400" strike="noStrike" u="none">
-                <a:solidFill>
-                  <a:srgbClr val="009bdd"/>
-                </a:solidFill>
-                <a:uFillTx/>
-                <a:latin typeface="Arial"/>
-              </a:rPr>
-              <a:t>. To je zato jer bi se, da se te stvari omoguće, znatno zakomplicirao pretprocesor i bilo bi lagano nenamjerno napraviti beskonačnu petlju za vrijeme pretprocesiranja:</a:t>
+              <a:t>Primjer “Preprocessor Test” ispisuje Fibonaccijeve brojeve manje od 100 za vrijeme asembliranja.</a:t>
             </a:r>
             <a:endParaRPr b="0" lang="bs-BA" sz="2400" strike="noStrike" u="none">
               <a:solidFill>
@@ -5698,7 +5582,7 @@
       </p:sp>
       <p:pic>
         <p:nvPicPr>
-          <p:cNvPr id="79" name="" descr=""/>
+          <p:cNvPr id="78" name="" descr=""/>
           <p:cNvPicPr/>
           <p:nvPr/>
         </p:nvPicPr>
@@ -5708,8 +5592,8 @@
         </p:blipFill>
         <p:spPr>
           <a:xfrm>
-            <a:off x="685800" y="4100040"/>
-            <a:ext cx="2293200" cy="929160"/>
+            <a:off x="228600" y="983160"/>
+            <a:ext cx="4671000" cy="3817440"/>
           </a:xfrm>
           <a:prstGeom prst="rect">
             <a:avLst/>
@@ -5734,7 +5618,7 @@
         <p:txBody>
           <a:bodyPr/>
           <a:p>
-            <a:fld id="{28A7B004-C4B8-40EE-AF65-A5AEAD398F88}" type="slidenum">
+            <a:fld id="{98BC8CEF-51BA-47F1-8DEB-C2056B9FB17A}" type="slidenum">
               <a:t>18</a:t>
             </a:fld>
           </a:p>
@@ -5754,9 +5638,9 @@
         <p:txBody>
           <a:bodyPr/>
           <a:p>
-            <a:fld id="{08DF81C5-54EB-433A-B8DC-97518528CA1B}" type="datetime1">
+            <a:fld id="{338A99E2-DA76-40F4-98C6-5DB393EA6E3C}" type="datetime1">
               <a:rPr lang="en-US"/>
-              <a:t>04/14/2025</a:t>
+              <a:t>04/24/2025</a:t>
             </a:fld>
           </a:p>
         </p:txBody>
@@ -5793,7 +5677,7 @@
       </p:grpSpPr>
       <p:sp>
         <p:nvSpPr>
-          <p:cNvPr id="80" name="PlaceHolder 1"/>
+          <p:cNvPr id="79" name="PlaceHolder 1"/>
           <p:cNvSpPr>
             <a:spLocks noGrp="1"/>
           </p:cNvSpPr>
@@ -5830,7 +5714,7 @@
                 <a:uFillTx/>
                 <a:latin typeface="Arial"/>
               </a:rPr>
-              <a:t>Nedostatci simulatora</a:t>
+              <a:t>Nedostatci predprocesora</a:t>
             </a:r>
             <a:endParaRPr b="0" lang="bs-BA" sz="3300" strike="noStrike" u="none">
               <a:solidFill>
@@ -5844,7 +5728,7 @@
       </p:sp>
       <p:sp>
         <p:nvSpPr>
-          <p:cNvPr id="81" name="PlaceHolder 2"/>
+          <p:cNvPr id="80" name="PlaceHolder 2"/>
           <p:cNvSpPr>
             <a:spLocks noGrp="1"/>
           </p:cNvSpPr>
@@ -5889,7 +5773,37 @@
                 <a:uFillTx/>
                 <a:latin typeface="Arial"/>
               </a:rPr>
-              <a:t>Ne znam kako se zastavice na pravom PicoBlazeu ponašaju kad se promijeni regbanka. U svoj simulator PicoBlazea uprogramirao sam da svaka regbanka ima zasebne zastavice carry i zero (kao na Z80), ali moguće je da to nije tako. To bi se trebalo moći provjeriti pomoću programa “</a:t>
+              <a:t>Ne podržava makro-naredbe.</a:t>
+            </a:r>
+            <a:endParaRPr b="0" lang="bs-BA" sz="2400" strike="noStrike" u="none">
+              <a:solidFill>
+                <a:srgbClr val="009bdd"/>
+              </a:solidFill>
+              <a:uFillTx/>
+              <a:latin typeface="Arial"/>
+            </a:endParaRPr>
+          </a:p>
+          <a:p>
+            <a:pPr marL="432000" indent="-324000">
+              <a:spcBef>
+                <a:spcPts val="1060"/>
+              </a:spcBef>
+              <a:buClr>
+                <a:srgbClr val="77caee"/>
+              </a:buClr>
+              <a:buSzPct val="45000"/>
+              <a:buFont typeface="Wingdings" charset="2"/>
+              <a:buChar char=""/>
+            </a:pPr>
+            <a:r>
+              <a:rPr b="0" lang="bs-BA" sz="2400" strike="noStrike" u="none">
+                <a:solidFill>
+                  <a:srgbClr val="009bdd"/>
+                </a:solidFill>
+                <a:uFillTx/>
+                <a:latin typeface="Arial"/>
+              </a:rPr>
+              <a:t>Postoji neki neobičan bug u pretprocesoru da naredba “</a:t>
             </a:r>
             <a:r>
               <a:rPr b="0" i="1" lang="bs-BA" sz="2400" strike="noStrike" u="none">
@@ -5899,7 +5813,7 @@
                 <a:uFillTx/>
                 <a:latin typeface="Arial"/>
               </a:rPr>
-              <a:t>Regbanks-Flags Test</a:t>
+              <a:t>display a</a:t>
             </a:r>
             <a:r>
               <a:rPr b="0" lang="bs-BA" sz="2400" strike="noStrike" u="none">
@@ -5909,7 +5823,117 @@
                 <a:uFillTx/>
                 <a:latin typeface="Arial"/>
               </a:rPr>
-              <a:t>”.</a:t>
+              <a:t>”(novi red) ne radi kada je simulacija UART-a isključena.</a:t>
+            </a:r>
+            <a:endParaRPr b="0" lang="bs-BA" sz="2400" strike="noStrike" u="none">
+              <a:solidFill>
+                <a:srgbClr val="009bdd"/>
+              </a:solidFill>
+              <a:uFillTx/>
+              <a:latin typeface="Arial"/>
+            </a:endParaRPr>
+          </a:p>
+          <a:p>
+            <a:pPr marL="432000" indent="-324000">
+              <a:spcBef>
+                <a:spcPts val="1060"/>
+              </a:spcBef>
+              <a:buClr>
+                <a:srgbClr val="77caee"/>
+              </a:buClr>
+              <a:buSzPct val="45000"/>
+              <a:buFont typeface="Wingdings" charset="2"/>
+              <a:buChar char=""/>
+            </a:pPr>
+            <a:r>
+              <a:rPr b="0" lang="bs-BA" sz="2400" strike="noStrike" u="none">
+                <a:solidFill>
+                  <a:srgbClr val="009bdd"/>
+                </a:solidFill>
+                <a:uFillTx/>
+                <a:latin typeface="Arial"/>
+              </a:rPr>
+              <a:t>U </a:t>
+            </a:r>
+            <a:r>
+              <a:rPr b="0" i="1" lang="bs-BA" sz="2400" strike="noStrike" u="none">
+                <a:solidFill>
+                  <a:srgbClr val="009bdd"/>
+                </a:solidFill>
+                <a:uFillTx/>
+                <a:latin typeface="Arial"/>
+              </a:rPr>
+              <a:t>if</a:t>
+            </a:r>
+            <a:r>
+              <a:rPr b="0" lang="bs-BA" sz="2400" strike="noStrike" u="none">
+                <a:solidFill>
+                  <a:srgbClr val="009bdd"/>
+                </a:solidFill>
+                <a:uFillTx/>
+                <a:latin typeface="Arial"/>
+              </a:rPr>
+              <a:t>-grananjima, </a:t>
+            </a:r>
+            <a:r>
+              <a:rPr b="0" i="1" lang="bs-BA" sz="2400" strike="noStrike" u="none">
+                <a:solidFill>
+                  <a:srgbClr val="009bdd"/>
+                </a:solidFill>
+                <a:uFillTx/>
+                <a:latin typeface="Arial"/>
+              </a:rPr>
+              <a:t>if-else</a:t>
+            </a:r>
+            <a:r>
+              <a:rPr b="0" lang="bs-BA" sz="2400" strike="noStrike" u="none">
+                <a:solidFill>
+                  <a:srgbClr val="009bdd"/>
+                </a:solidFill>
+                <a:uFillTx/>
+                <a:latin typeface="Arial"/>
+              </a:rPr>
+              <a:t>-grananjima i </a:t>
+            </a:r>
+            <a:r>
+              <a:rPr b="0" i="1" lang="bs-BA" sz="2400" strike="noStrike" u="none">
+                <a:solidFill>
+                  <a:srgbClr val="009bdd"/>
+                </a:solidFill>
+                <a:uFillTx/>
+                <a:latin typeface="Arial"/>
+              </a:rPr>
+              <a:t>while</a:t>
+            </a:r>
+            <a:r>
+              <a:rPr b="0" lang="bs-BA" sz="2400" strike="noStrike" u="none">
+                <a:solidFill>
+                  <a:srgbClr val="009bdd"/>
+                </a:solidFill>
+                <a:uFillTx/>
+                <a:latin typeface="Arial"/>
+              </a:rPr>
+              <a:t>-petljama ne mogu se nalaziti mnemonike niti pretprocesorska naredba </a:t>
+            </a:r>
+            <a:r>
+              <a:rPr b="0" i="1" lang="bs-BA" sz="2400" strike="noStrike" u="none">
+                <a:solidFill>
+                  <a:srgbClr val="009bdd"/>
+                </a:solidFill>
+                <a:uFillTx/>
+                <a:latin typeface="Arial"/>
+              </a:rPr>
+              <a:t>address</a:t>
+            </a:r>
+            <a:r>
+              <a:rPr b="0" lang="bs-BA" sz="2400" strike="noStrike" u="none">
+                <a:solidFill>
+                  <a:srgbClr val="009bdd"/>
+                </a:solidFill>
+                <a:uFillTx/>
+                <a:latin typeface="Arial"/>
+              </a:rPr>
+              <a:t>. To je zato jer bi se, da se te stvari omoguće, znatno zakomplicirao pretprocesor i bilo bi lagano nenamjerno napraviti beskonačnu petlju za vrijeme pretprocesiranja:</a:t>
             </a:r>
             <a:endParaRPr b="0" lang="bs-BA" sz="2400" strike="noStrike" u="none">
               <a:solidFill>
@@ -5923,7 +5947,7 @@
       </p:sp>
       <p:pic>
         <p:nvPicPr>
-          <p:cNvPr id="82" name="" descr=""/>
+          <p:cNvPr id="81" name="" descr=""/>
           <p:cNvPicPr/>
           <p:nvPr/>
         </p:nvPicPr>
@@ -5933,8 +5957,8 @@
         </p:blipFill>
         <p:spPr>
           <a:xfrm>
-            <a:off x="709200" y="2971800"/>
-            <a:ext cx="1576800" cy="1371240"/>
+            <a:off x="685800" y="4100040"/>
+            <a:ext cx="2293200" cy="929160"/>
           </a:xfrm>
           <a:prstGeom prst="rect">
             <a:avLst/>
@@ -5959,7 +5983,7 @@
         <p:txBody>
           <a:bodyPr/>
           <a:p>
-            <a:fld id="{46EA10C1-96F5-4C94-99F3-E849249F1006}" type="slidenum">
+            <a:fld id="{DEC90B00-3958-4A20-9E7B-3AC40890C706}" type="slidenum">
               <a:t>19</a:t>
             </a:fld>
           </a:p>
@@ -5979,9 +6003,9 @@
         <p:txBody>
           <a:bodyPr/>
           <a:p>
-            <a:fld id="{D105A9D6-4E9F-41D3-A6E7-4924E0F0114B}" type="datetime1">
+            <a:fld id="{63B33B6F-9770-4CA0-8CAD-FC00C22EF826}" type="datetime1">
               <a:rPr lang="en-US"/>
-              <a:t>04/14/2025</a:t>
+              <a:t>04/24/2025</a:t>
             </a:fld>
           </a:p>
         </p:txBody>
@@ -6114,7 +6138,27 @@
                 <a:uFillTx/>
                 <a:latin typeface="Arial"/>
               </a:rPr>
-              <a:t>Još u osnovnoj školi kupio sam si Kip Irvineinu knjigu “Assembly language for x86 processors” i pročitao sam je.</a:t>
+              <a:t>Još u osnovnoj školi kupio sam si Kip Irvineinu knjigu “</a:t>
+            </a:r>
+            <a:r>
+              <a:rPr b="0" i="1" lang="bs-BA" sz="1600" strike="noStrike" u="none">
+                <a:solidFill>
+                  <a:srgbClr val="009bdd"/>
+                </a:solidFill>
+                <a:uFillTx/>
+                <a:latin typeface="Arial"/>
+              </a:rPr>
+              <a:t>Assembly language for x86 processors</a:t>
+            </a:r>
+            <a:r>
+              <a:rPr b="0" lang="bs-BA" sz="1600" strike="noStrike" u="none">
+                <a:solidFill>
+                  <a:srgbClr val="009bdd"/>
+                </a:solidFill>
+                <a:uFillTx/>
+                <a:latin typeface="Arial"/>
+              </a:rPr>
+              <a:t>” i pročitao sam je.</a:t>
             </a:r>
             <a:endParaRPr b="0" lang="bs-BA" sz="1600" strike="noStrike" u="none">
               <a:solidFill>
@@ -6320,7 +6364,7 @@
         <p:txBody>
           <a:bodyPr/>
           <a:p>
-            <a:fld id="{5461B5B5-AC37-46B9-A0AF-8C2B87C164D3}" type="slidenum">
+            <a:fld id="{9EC5B6BC-8998-4E04-B040-39BF02E36C0C}" type="slidenum">
               <a:t>2</a:t>
             </a:fld>
           </a:p>
@@ -6340,9 +6384,9 @@
         <p:txBody>
           <a:bodyPr/>
           <a:p>
-            <a:fld id="{C5D9F1BF-07D6-487F-BF58-E74DA5E84A34}" type="datetime1">
+            <a:fld id="{55918F9C-CCB9-4377-B1C1-E78CC66FD015}" type="datetime1">
               <a:rPr lang="en-US"/>
-              <a:t>04/14/2025</a:t>
+              <a:t>04/24/2025</a:t>
             </a:fld>
           </a:p>
         </p:txBody>
@@ -6379,7 +6423,7 @@
       </p:grpSpPr>
       <p:sp>
         <p:nvSpPr>
-          <p:cNvPr id="83" name="PlaceHolder 1"/>
+          <p:cNvPr id="82" name="PlaceHolder 1"/>
           <p:cNvSpPr>
             <a:spLocks noGrp="1"/>
           </p:cNvSpPr>
@@ -6416,7 +6460,7 @@
                 <a:uFillTx/>
                 <a:latin typeface="Arial"/>
               </a:rPr>
-              <a:t>Out in the wild...</a:t>
+              <a:t>Nedostatci simulatora</a:t>
             </a:r>
             <a:endParaRPr b="0" lang="bs-BA" sz="3300" strike="noStrike" u="none">
               <a:solidFill>
@@ -6430,7 +6474,7 @@
       </p:sp>
       <p:sp>
         <p:nvSpPr>
-          <p:cNvPr id="84" name="PlaceHolder 2"/>
+          <p:cNvPr id="83" name="PlaceHolder 2"/>
           <p:cNvSpPr>
             <a:spLocks noGrp="1"/>
           </p:cNvSpPr>
@@ -6468,16 +6512,36 @@
               <a:buChar char=""/>
             </a:pPr>
             <a:r>
-              <a:rPr b="0" lang="bs-BA" sz="2200" strike="noStrike" u="none">
-                <a:solidFill>
-                  <a:srgbClr val="009bdd"/>
-                </a:solidFill>
-                <a:uFillTx/>
-                <a:latin typeface="Arial"/>
-              </a:rPr>
-              <a:t>Moj se program koristi na fakultetu u Argentini za uvod u ugrađene sustave.</a:t>
-            </a:r>
-            <a:endParaRPr b="0" lang="bs-BA" sz="2200" strike="noStrike" u="none">
+              <a:rPr b="0" lang="bs-BA" sz="2400" strike="noStrike" u="none">
+                <a:solidFill>
+                  <a:srgbClr val="009bdd"/>
+                </a:solidFill>
+                <a:uFillTx/>
+                <a:latin typeface="Arial"/>
+              </a:rPr>
+              <a:t>Ne znam kako se zastavice na pravom PicoBlazeu ponašaju kad se promijeni regbanka. U svoj simulator PicoBlazea uprogramirao sam da svaka regbanka ima zasebne zastavice carry i zero (kao na Z80), ali moguće je da to nije tako. To bi se trebalo moći provjeriti pomoću programa “</a:t>
+            </a:r>
+            <a:r>
+              <a:rPr b="0" i="1" lang="bs-BA" sz="2400" strike="noStrike" u="none">
+                <a:solidFill>
+                  <a:srgbClr val="009bdd"/>
+                </a:solidFill>
+                <a:uFillTx/>
+                <a:latin typeface="Arial"/>
+              </a:rPr>
+              <a:t>Regbanks-Flags Test</a:t>
+            </a:r>
+            <a:r>
+              <a:rPr b="0" lang="bs-BA" sz="2400" strike="noStrike" u="none">
+                <a:solidFill>
+                  <a:srgbClr val="009bdd"/>
+                </a:solidFill>
+                <a:uFillTx/>
+                <a:latin typeface="Arial"/>
+              </a:rPr>
+              <a:t>”.</a:t>
+            </a:r>
+            <a:endParaRPr b="0" lang="bs-BA" sz="2400" strike="noStrike" u="none">
               <a:solidFill>
                 <a:srgbClr val="009bdd"/>
               </a:solidFill>
@@ -6485,128 +6549,32 @@
               <a:latin typeface="Arial"/>
             </a:endParaRPr>
           </a:p>
-          <a:p>
-            <a:pPr marL="432000" indent="-324000">
-              <a:spcBef>
-                <a:spcPts val="1060"/>
-              </a:spcBef>
-              <a:buClr>
-                <a:srgbClr val="77caee"/>
-              </a:buClr>
-              <a:buSzPct val="45000"/>
-              <a:buFont typeface="Wingdings" charset="2"/>
-              <a:buChar char=""/>
-            </a:pPr>
-            <a:r>
-              <a:rPr b="0" lang="bs-BA" sz="2200" strike="noStrike" u="none">
-                <a:solidFill>
-                  <a:srgbClr val="009bdd"/>
-                </a:solidFill>
-                <a:uFillTx/>
-                <a:latin typeface="Arial"/>
-              </a:rPr>
-              <a:t>Nedavno sam dobio kontributora s tog fakulteta koji se zove Agustin Izaguirre (</a:t>
-            </a:r>
-            <a:r>
-              <a:rPr b="0" i="1" lang="bs-BA" sz="2200" strike="noStrike" u="none">
-                <a:solidFill>
-                  <a:srgbClr val="009bdd"/>
-                </a:solidFill>
-                <a:uFillTx/>
-                <a:latin typeface="Arial"/>
-              </a:rPr>
-              <a:t>agustiza</a:t>
-            </a:r>
-            <a:r>
-              <a:rPr b="0" lang="bs-BA" sz="2200" strike="noStrike" u="none">
-                <a:solidFill>
-                  <a:srgbClr val="009bdd"/>
-                </a:solidFill>
-                <a:uFillTx/>
-                <a:latin typeface="Arial"/>
-              </a:rPr>
-              <a:t>). On je napravio nekoliko pull requestova na GitHubu, isprva sitni bug-fixi (prvo da se naredba SRA ponaša ispravno kad je </a:t>
-            </a:r>
-            <a:r>
-              <a:rPr b="0" i="1" lang="bs-BA" sz="2200" strike="noStrike" u="none">
-                <a:solidFill>
-                  <a:srgbClr val="009bdd"/>
-                </a:solidFill>
-                <a:uFillTx/>
-                <a:latin typeface="Arial"/>
-              </a:rPr>
-              <a:t>carry flag</a:t>
-            </a:r>
-            <a:r>
-              <a:rPr b="0" lang="bs-BA" sz="2200" strike="noStrike" u="none">
-                <a:solidFill>
-                  <a:srgbClr val="009bdd"/>
-                </a:solidFill>
-                <a:uFillTx/>
-                <a:latin typeface="Arial"/>
-              </a:rPr>
-              <a:t> postavljen u jedinicu), a onda i dodavanje novih featuresa kao što su JEST testovi.</a:t>
-            </a:r>
-            <a:endParaRPr b="0" lang="bs-BA" sz="2200" strike="noStrike" u="none">
-              <a:solidFill>
-                <a:srgbClr val="009bdd"/>
-              </a:solidFill>
-              <a:uFillTx/>
-              <a:latin typeface="Arial"/>
-            </a:endParaRPr>
-          </a:p>
-          <a:p>
-            <a:pPr marL="432000" indent="-324000">
-              <a:spcBef>
-                <a:spcPts val="1060"/>
-              </a:spcBef>
-              <a:buClr>
-                <a:srgbClr val="77caee"/>
-              </a:buClr>
-              <a:buSzPct val="45000"/>
-              <a:buFont typeface="Wingdings" charset="2"/>
-              <a:buChar char=""/>
-            </a:pPr>
-            <a:r>
-              <a:rPr b="0" lang="bs-BA" sz="2200" strike="noStrike" u="none">
-                <a:solidFill>
-                  <a:srgbClr val="009bdd"/>
-                </a:solidFill>
-                <a:uFillTx/>
-                <a:latin typeface="Arial"/>
-              </a:rPr>
-              <a:t>JEST testira tokenizer, parser, asembler, jezgru simulatora i evaluator aritmetičkih izraza. Međutim, </a:t>
-            </a:r>
-            <a:r>
-              <a:rPr b="0" i="1" lang="bs-BA" sz="2200" strike="noStrike" u="none">
-                <a:solidFill>
-                  <a:srgbClr val="009bdd"/>
-                </a:solidFill>
-                <a:uFillTx/>
-                <a:latin typeface="Arial"/>
-              </a:rPr>
-              <a:t>test coverage</a:t>
-            </a:r>
-            <a:r>
-              <a:rPr b="0" lang="bs-BA" sz="2200" strike="noStrike" u="none">
-                <a:solidFill>
-                  <a:srgbClr val="009bdd"/>
-                </a:solidFill>
-                <a:uFillTx/>
-                <a:latin typeface="Arial"/>
-              </a:rPr>
-              <a:t> je još uvijek nizak i contributori se još uvijek moraju oslanjati na ručno testiranje.</a:t>
-            </a:r>
-            <a:endParaRPr b="0" lang="bs-BA" sz="2200" strike="noStrike" u="none">
-              <a:solidFill>
-                <a:srgbClr val="009bdd"/>
-              </a:solidFill>
-              <a:uFillTx/>
-              <a:latin typeface="Arial"/>
-            </a:endParaRPr>
-          </a:p>
-        </p:txBody>
-      </p:sp>
+        </p:txBody>
+      </p:sp>
+      <p:pic>
+        <p:nvPicPr>
+          <p:cNvPr id="84" name="" descr=""/>
+          <p:cNvPicPr/>
+          <p:nvPr/>
+        </p:nvPicPr>
+        <p:blipFill>
+          <a:blip r:embed="rId1"/>
+          <a:stretch/>
+        </p:blipFill>
+        <p:spPr>
+          <a:xfrm>
+            <a:off x="709200" y="2971800"/>
+            <a:ext cx="1576800" cy="1371240"/>
+          </a:xfrm>
+          <a:prstGeom prst="rect">
+            <a:avLst/>
+          </a:prstGeom>
+          <a:noFill/>
+          <a:ln w="18000">
+            <a:noFill/>
+          </a:ln>
+        </p:spPr>
+      </p:pic>
       <p:sp>
         <p:nvSpPr>
           <p:cNvPr id="4" name="PlaceHolder 3"/>
@@ -6621,7 +6589,7 @@
         <p:txBody>
           <a:bodyPr/>
           <a:p>
-            <a:fld id="{3C9F003E-3EAA-4177-9463-CFF47993AFD5}" type="slidenum">
+            <a:fld id="{EC29C384-0199-48C0-BF17-BFF3504CED0A}" type="slidenum">
               <a:t>20</a:t>
             </a:fld>
           </a:p>
@@ -6641,9 +6609,9 @@
         <p:txBody>
           <a:bodyPr/>
           <a:p>
-            <a:fld id="{544B47D2-C802-4ED3-96C5-0681599E18B9}" type="datetime1">
+            <a:fld id="{5AD532C3-DA5E-4634-A3BB-ED4AD7EEF1E9}" type="datetime1">
               <a:rPr lang="en-US"/>
-              <a:t>04/14/2025</a:t>
+              <a:t>04/24/2025</a:t>
             </a:fld>
           </a:p>
         </p:txBody>
@@ -6717,7 +6685,7 @@
                 <a:uFillTx/>
                 <a:latin typeface="Arial"/>
               </a:rPr>
-              <a:t>Kompatibilnost s browserima</a:t>
+              <a:t>Out in the wild...</a:t>
             </a:r>
             <a:endParaRPr b="0" lang="bs-BA" sz="3300" strike="noStrike" u="none">
               <a:solidFill>
@@ -6769,106 +6737,16 @@
               <a:buChar char=""/>
             </a:pPr>
             <a:r>
-              <a:rPr b="0" lang="bs-BA" sz="1200" strike="noStrike" u="none">
-                <a:solidFill>
-                  <a:srgbClr val="009bdd"/>
-                </a:solidFill>
-                <a:uFillTx/>
-                <a:latin typeface="Arial"/>
-              </a:rPr>
-              <a:t>Ciljao sam na Firefox 52.9 ESR.</a:t>
-            </a:r>
-            <a:endParaRPr b="0" lang="bs-BA" sz="1200" strike="noStrike" u="none">
-              <a:solidFill>
-                <a:srgbClr val="009bdd"/>
-              </a:solidFill>
-              <a:uFillTx/>
-              <a:latin typeface="Arial"/>
-            </a:endParaRPr>
-          </a:p>
-          <a:p>
-            <a:pPr lvl="1" marL="864000" indent="-324000">
-              <a:spcBef>
-                <a:spcPts val="850"/>
-              </a:spcBef>
-              <a:buClr>
-                <a:srgbClr val="77caee"/>
-              </a:buClr>
-              <a:buSzPct val="45000"/>
-              <a:buFont typeface="Wingdings" charset="2"/>
-              <a:buChar char=""/>
-            </a:pPr>
-            <a:r>
-              <a:rPr b="0" lang="bs-BA" sz="1200" strike="noStrike" u="none">
-                <a:solidFill>
-                  <a:srgbClr val="009bdd"/>
-                </a:solidFill>
-                <a:uFillTx/>
-                <a:latin typeface="Arial"/>
-              </a:rPr>
-              <a:t>To je posljednja verzija Firefoxa koja se može vrtjeti na Windows XP-u i Windows Visti, te također verzija Firefoxa koja se dobije uz Solaris 11.4.</a:t>
-            </a:r>
-            <a:endParaRPr b="0" lang="bs-BA" sz="1200" strike="noStrike" u="none">
-              <a:solidFill>
-                <a:srgbClr val="009bdd"/>
-              </a:solidFill>
-              <a:uFillTx/>
-              <a:latin typeface="Arial"/>
-            </a:endParaRPr>
-          </a:p>
-          <a:p>
-            <a:pPr lvl="1" marL="864000" indent="-324000">
-              <a:spcBef>
-                <a:spcPts val="850"/>
-              </a:spcBef>
-              <a:buClr>
-                <a:srgbClr val="77caee"/>
-              </a:buClr>
-              <a:buSzPct val="45000"/>
-              <a:buFont typeface="Wingdings" charset="2"/>
-              <a:buChar char=""/>
-            </a:pPr>
-            <a:r>
-              <a:rPr b="0" lang="bs-BA" sz="1200" strike="noStrike" u="none">
-                <a:solidFill>
-                  <a:srgbClr val="009bdd"/>
-                </a:solidFill>
-                <a:uFillTx/>
-                <a:latin typeface="Arial"/>
-              </a:rPr>
-              <a:t>Međutim, u Firefoxu 52.9 ESR pokrenutom na Windows XP (ali ne i ako se pokrene na Solarisu ili Windows 11), kao i u Epiphanyju na FreeBSD-u, linije koda i kod nisu alignirani (što onemogućava da se koriste breakpointsi).</a:t>
-            </a:r>
-            <a:endParaRPr b="0" lang="bs-BA" sz="1200" strike="noStrike" u="none">
-              <a:solidFill>
-                <a:srgbClr val="009bdd"/>
-              </a:solidFill>
-              <a:uFillTx/>
-              <a:latin typeface="Arial"/>
-            </a:endParaRPr>
-          </a:p>
-          <a:p>
-            <a:pPr lvl="1" marL="864000" indent="-324000">
-              <a:spcBef>
-                <a:spcPts val="850"/>
-              </a:spcBef>
-              <a:buClr>
-                <a:srgbClr val="77caee"/>
-              </a:buClr>
-              <a:buSzPct val="45000"/>
-              <a:buFont typeface="Wingdings" charset="2"/>
-              <a:buChar char=""/>
-            </a:pPr>
-            <a:r>
-              <a:rPr b="0" lang="bs-BA" sz="1200" strike="noStrike" u="none">
-                <a:solidFill>
-                  <a:srgbClr val="009bdd"/>
-                </a:solidFill>
-                <a:uFillTx/>
-                <a:latin typeface="Arial"/>
-              </a:rPr>
-              <a:t>Iz nekog meni nedokučivog razloga, JavaScript se vrti približno dvostruko brže u Firefoxu 52 nego u Firefoxu 120.</a:t>
-            </a:r>
-            <a:endParaRPr b="0" lang="bs-BA" sz="1200" strike="noStrike" u="none">
+              <a:rPr b="0" lang="bs-BA" sz="2200" strike="noStrike" u="none">
+                <a:solidFill>
+                  <a:srgbClr val="009bdd"/>
+                </a:solidFill>
+                <a:uFillTx/>
+                <a:latin typeface="Arial"/>
+              </a:rPr>
+              <a:t>Moj se program koristi na fakultetu u Argentini za uvod u ugrađene sustave.</a:t>
+            </a:r>
+            <a:endParaRPr b="0" lang="bs-BA" sz="2200" strike="noStrike" u="none">
               <a:solidFill>
                 <a:srgbClr val="009bdd"/>
               </a:solidFill>
@@ -6889,46 +6767,56 @@
               <a:buChar char=""/>
             </a:pPr>
             <a:r>
-              <a:rPr b="0" lang="bs-BA" sz="1200" strike="noStrike" u="none">
-                <a:solidFill>
-                  <a:srgbClr val="009bdd"/>
-                </a:solidFill>
-                <a:uFillTx/>
-                <a:latin typeface="Arial"/>
-              </a:rPr>
-              <a:t>Moderni Chrome</a:t>
-            </a:r>
-            <a:endParaRPr b="0" lang="bs-BA" sz="1200" strike="noStrike" u="none">
-              <a:solidFill>
-                <a:srgbClr val="009bdd"/>
-              </a:solidFill>
-              <a:uFillTx/>
-              <a:latin typeface="Arial"/>
-            </a:endParaRPr>
-          </a:p>
-          <a:p>
-            <a:pPr lvl="1" marL="864000" indent="-324000">
-              <a:spcBef>
-                <a:spcPts val="850"/>
-              </a:spcBef>
-              <a:buClr>
-                <a:srgbClr val="77caee"/>
-              </a:buClr>
-              <a:buSzPct val="45000"/>
-              <a:buFont typeface="Wingdings" charset="2"/>
-              <a:buChar char=""/>
-            </a:pPr>
-            <a:r>
-              <a:rPr b="0" lang="bs-BA" sz="1200" strike="noStrike" u="none">
-                <a:solidFill>
-                  <a:srgbClr val="009bdd"/>
-                </a:solidFill>
-                <a:uFillTx/>
-                <a:latin typeface="Arial"/>
-              </a:rPr>
-              <a:t>Za to da radi u Chromeu, morao sam izmijeniti CSS (jer tooltipsi na “Play/Pause”, “Fast Forward”, “Single Step” i “Stop” nisu bili radili).</a:t>
-            </a:r>
-            <a:endParaRPr b="0" lang="bs-BA" sz="1200" strike="noStrike" u="none">
+              <a:rPr b="0" lang="bs-BA" sz="2200" strike="noStrike" u="none">
+                <a:solidFill>
+                  <a:srgbClr val="009bdd"/>
+                </a:solidFill>
+                <a:uFillTx/>
+                <a:latin typeface="Arial"/>
+              </a:rPr>
+              <a:t>Nedavno sam dobio kontributora s tog fakulteta koji se zove Agustin Izaguirre (</a:t>
+            </a:r>
+            <a:r>
+              <a:rPr b="0" i="1" lang="bs-BA" sz="2200" strike="noStrike" u="none">
+                <a:solidFill>
+                  <a:srgbClr val="009bdd"/>
+                </a:solidFill>
+                <a:uFillTx/>
+                <a:latin typeface="Arial"/>
+              </a:rPr>
+              <a:t>agustiza</a:t>
+            </a:r>
+            <a:r>
+              <a:rPr b="0" lang="bs-BA" sz="2200" strike="noStrike" u="none">
+                <a:solidFill>
+                  <a:srgbClr val="009bdd"/>
+                </a:solidFill>
+                <a:uFillTx/>
+                <a:latin typeface="Arial"/>
+              </a:rPr>
+              <a:t>). On je napravio nekoliko pull requestova na GitHubu, isprva sitni bug-fixi (prvo da se naredba SRA ponaša ispravno kad je </a:t>
+            </a:r>
+            <a:r>
+              <a:rPr b="0" i="1" lang="bs-BA" sz="2200" strike="noStrike" u="none">
+                <a:solidFill>
+                  <a:srgbClr val="009bdd"/>
+                </a:solidFill>
+                <a:uFillTx/>
+                <a:latin typeface="Arial"/>
+              </a:rPr>
+              <a:t>carry flag</a:t>
+            </a:r>
+            <a:r>
+              <a:rPr b="0" lang="bs-BA" sz="2200" strike="noStrike" u="none">
+                <a:solidFill>
+                  <a:srgbClr val="009bdd"/>
+                </a:solidFill>
+                <a:uFillTx/>
+                <a:latin typeface="Arial"/>
+              </a:rPr>
+              <a:t> postavljen u jedinicu), a onda i dodavanje novih featuresa kao što su JEST testovi.</a:t>
+            </a:r>
+            <a:endParaRPr b="0" lang="bs-BA" sz="2200" strike="noStrike" u="none">
               <a:solidFill>
                 <a:srgbClr val="009bdd"/>
               </a:solidFill>
@@ -6949,16 +6837,36 @@
               <a:buChar char=""/>
             </a:pPr>
             <a:r>
-              <a:rPr b="0" lang="bs-BA" sz="1200" strike="noStrike" u="none">
-                <a:solidFill>
-                  <a:srgbClr val="009bdd"/>
-                </a:solidFill>
-                <a:uFillTx/>
-                <a:latin typeface="Arial"/>
-              </a:rPr>
-              <a:t>WebPositive (bliski srodnik Safariju)</a:t>
-            </a:r>
-            <a:endParaRPr b="0" lang="bs-BA" sz="1200" strike="noStrike" u="none">
+              <a:rPr b="0" lang="bs-BA" sz="2200" strike="noStrike" u="none">
+                <a:solidFill>
+                  <a:srgbClr val="009bdd"/>
+                </a:solidFill>
+                <a:uFillTx/>
+                <a:latin typeface="Arial"/>
+              </a:rPr>
+              <a:t>JEST testira tokenizer, parser, asembler, jezgru simulatora i evaluator aritmetičkih izraza. Međutim, </a:t>
+            </a:r>
+            <a:r>
+              <a:rPr b="0" i="1" lang="bs-BA" sz="2200" strike="noStrike" u="none">
+                <a:solidFill>
+                  <a:srgbClr val="009bdd"/>
+                </a:solidFill>
+                <a:uFillTx/>
+                <a:latin typeface="Arial"/>
+              </a:rPr>
+              <a:t>test coverage</a:t>
+            </a:r>
+            <a:r>
+              <a:rPr b="0" lang="bs-BA" sz="2200" strike="noStrike" u="none">
+                <a:solidFill>
+                  <a:srgbClr val="009bdd"/>
+                </a:solidFill>
+                <a:uFillTx/>
+                <a:latin typeface="Arial"/>
+              </a:rPr>
+              <a:t> je još uvijek nizak i contributori se još uvijek moraju oslanjati na ručno testiranje.</a:t>
+            </a:r>
+            <a:endParaRPr b="0" lang="bs-BA" sz="2200" strike="noStrike" u="none">
               <a:solidFill>
                 <a:srgbClr val="009bdd"/>
               </a:solidFill>
@@ -6966,116 +6874,6 @@
               <a:latin typeface="Arial"/>
             </a:endParaRPr>
           </a:p>
-          <a:p>
-            <a:pPr lvl="1" marL="864000" indent="-324000">
-              <a:spcBef>
-                <a:spcPts val="850"/>
-              </a:spcBef>
-              <a:buClr>
-                <a:srgbClr val="77caee"/>
-              </a:buClr>
-              <a:buSzPct val="45000"/>
-              <a:buFont typeface="Wingdings" charset="2"/>
-              <a:buChar char=""/>
-            </a:pPr>
-            <a:r>
-              <a:rPr b="0" lang="bs-BA" sz="1200" strike="noStrike" u="none">
-                <a:solidFill>
-                  <a:srgbClr val="009bdd"/>
-                </a:solidFill>
-                <a:uFillTx/>
-                <a:latin typeface="Arial"/>
-              </a:rPr>
-              <a:t>Za to da radi u WebPositiveu, morao sam izmijeniti i CSS i JavaScript.</a:t>
-            </a:r>
-            <a:endParaRPr b="0" lang="bs-BA" sz="1200" strike="noStrike" u="none">
-              <a:solidFill>
-                <a:srgbClr val="009bdd"/>
-              </a:solidFill>
-              <a:uFillTx/>
-              <a:latin typeface="Arial"/>
-            </a:endParaRPr>
-          </a:p>
-          <a:p>
-            <a:pPr lvl="1" marL="864000" indent="-324000">
-              <a:spcBef>
-                <a:spcPts val="850"/>
-              </a:spcBef>
-              <a:buClr>
-                <a:srgbClr val="77caee"/>
-              </a:buClr>
-              <a:buSzPct val="45000"/>
-              <a:buFont typeface="Wingdings" charset="2"/>
-              <a:buChar char=""/>
-            </a:pPr>
-            <a:r>
-              <a:rPr b="0" lang="bs-BA" sz="1200" strike="noStrike" u="none">
-                <a:solidFill>
-                  <a:srgbClr val="009bdd"/>
-                </a:solidFill>
-                <a:uFillTx/>
-                <a:latin typeface="Arial"/>
-              </a:rPr>
-              <a:t>Nisam uspio napraviti da “Download Hexadecimal” radi u WebPositiveu.</a:t>
-            </a:r>
-            <a:endParaRPr b="0" lang="bs-BA" sz="1200" strike="noStrike" u="none">
-              <a:solidFill>
-                <a:srgbClr val="009bdd"/>
-              </a:solidFill>
-              <a:uFillTx/>
-              <a:latin typeface="Arial"/>
-            </a:endParaRPr>
-          </a:p>
-          <a:p>
-            <a:pPr marL="432000" indent="-324000">
-              <a:spcBef>
-                <a:spcPts val="1060"/>
-              </a:spcBef>
-              <a:buClr>
-                <a:srgbClr val="77caee"/>
-              </a:buClr>
-              <a:buSzPct val="45000"/>
-              <a:buFont typeface="Wingdings" charset="2"/>
-              <a:buChar char=""/>
-            </a:pPr>
-            <a:r>
-              <a:rPr b="0" lang="bs-BA" sz="1200" strike="noStrike" u="none">
-                <a:solidFill>
-                  <a:srgbClr val="009bdd"/>
-                </a:solidFill>
-                <a:uFillTx/>
-                <a:latin typeface="Arial"/>
-              </a:rPr>
-              <a:t>Darko Nikolić tvrdi da je isprobao moj program na Macu u Safariju i u Operi i da funkcionira tamo. Discordaš </a:t>
-            </a:r>
-            <a:r>
-              <a:rPr b="0" i="1" lang="bs-BA" sz="1200" strike="noStrike" u="none">
-                <a:solidFill>
-                  <a:srgbClr val="009bdd"/>
-                </a:solidFill>
-                <a:uFillTx/>
-                <a:latin typeface="Arial"/>
-              </a:rPr>
-              <a:t>emm312</a:t>
-            </a:r>
-            <a:r>
-              <a:rPr b="0" lang="bs-BA" sz="1200" strike="noStrike" u="none">
-                <a:solidFill>
-                  <a:srgbClr val="009bdd"/>
-                </a:solidFill>
-                <a:uFillTx/>
-                <a:latin typeface="Arial"/>
-              </a:rPr>
-              <a:t> isto tvrdi da ga je isprobao u Safariju i da funkcionira tamo.</a:t>
-            </a:r>
-            <a:endParaRPr b="0" lang="bs-BA" sz="1200" strike="noStrike" u="none">
-              <a:solidFill>
-                <a:srgbClr val="009bdd"/>
-              </a:solidFill>
-              <a:uFillTx/>
-              <a:latin typeface="Arial"/>
-            </a:endParaRPr>
-          </a:p>
         </p:txBody>
       </p:sp>
       <p:sp>
@@ -7092,7 +6890,7 @@
         <p:txBody>
           <a:bodyPr/>
           <a:p>
-            <a:fld id="{D815974D-DEF0-4572-8E90-F3246C5EF39E}" type="slidenum">
+            <a:fld id="{790C4CEA-21F9-4A2E-97E4-A793C2E09BB3}" type="slidenum">
               <a:t>21</a:t>
             </a:fld>
           </a:p>
@@ -7112,9 +6910,9 @@
         <p:txBody>
           <a:bodyPr/>
           <a:p>
-            <a:fld id="{0B273837-6E43-4B89-8DEE-B4C09B1686EB}" type="datetime1">
+            <a:fld id="{B9AD703F-7A94-4708-9EBA-339D70A4732E}" type="datetime1">
               <a:rPr lang="en-US"/>
-              <a:t>04/14/2025</a:t>
+              <a:t>04/24/2025</a:t>
             </a:fld>
           </a:p>
         </p:txBody>
@@ -7188,7 +6986,7 @@
                 <a:uFillTx/>
                 <a:latin typeface="Arial"/>
               </a:rPr>
-              <a:t>Back-end</a:t>
+              <a:t>Kompatibilnost s browserima</a:t>
             </a:r>
             <a:endParaRPr b="0" lang="bs-BA" sz="3300" strike="noStrike" u="none">
               <a:solidFill>
@@ -7240,56 +7038,16 @@
               <a:buChar char=""/>
             </a:pPr>
             <a:r>
-              <a:rPr b="0" lang="bs-BA" sz="2100" strike="noStrike" u="none">
-                <a:solidFill>
-                  <a:srgbClr val="009bdd"/>
-                </a:solidFill>
-                <a:uFillTx/>
-                <a:latin typeface="Arial"/>
-              </a:rPr>
-              <a:t>Abidin Durdu (tada zvan </a:t>
-            </a:r>
-            <a:r>
-              <a:rPr b="0" i="1" lang="bs-BA" sz="2100" strike="noStrike" u="none">
-                <a:solidFill>
-                  <a:srgbClr val="009bdd"/>
-                </a:solidFill>
-                <a:uFillTx/>
-                <a:latin typeface="Arial"/>
-              </a:rPr>
-              <a:t>betelgeuse-7</a:t>
-            </a:r>
-            <a:r>
-              <a:rPr b="0" lang="bs-BA" sz="2100" strike="noStrike" u="none">
-                <a:solidFill>
-                  <a:srgbClr val="009bdd"/>
-                </a:solidFill>
-                <a:uFillTx/>
-                <a:latin typeface="Arial"/>
-              </a:rPr>
-              <a:t>, a sada zvan </a:t>
-            </a:r>
-            <a:r>
-              <a:rPr b="0" i="1" lang="bs-BA" sz="2100" strike="noStrike" u="none">
-                <a:solidFill>
-                  <a:srgbClr val="009bdd"/>
-                </a:solidFill>
-                <a:uFillTx/>
-                <a:latin typeface="Arial"/>
-              </a:rPr>
-              <a:t>abdrd</a:t>
-            </a:r>
-            <a:r>
-              <a:rPr b="0" lang="bs-BA" sz="2100" strike="noStrike" u="none">
-                <a:solidFill>
-                  <a:srgbClr val="009bdd"/>
-                </a:solidFill>
-                <a:uFillTx/>
-                <a:latin typeface="Arial"/>
-              </a:rPr>
-              <a:t>) napravio je back-end u PHP-u, koji omogućuje korisnicima da dijele asemblerske programe. Taj back-end koristi MySQL bazu podataka. Vrti se na SourceForge serverima.</a:t>
-            </a:r>
-            <a:endParaRPr b="0" lang="bs-BA" sz="2100" strike="noStrike" u="none">
+              <a:rPr b="0" lang="bs-BA" sz="1200" strike="noStrike" u="none">
+                <a:solidFill>
+                  <a:srgbClr val="009bdd"/>
+                </a:solidFill>
+                <a:uFillTx/>
+                <a:latin typeface="Arial"/>
+              </a:rPr>
+              <a:t>Ciljao sam na Firefox 52.9 ESR.</a:t>
+            </a:r>
+            <a:endParaRPr b="0" lang="bs-BA" sz="1200" strike="noStrike" u="none">
               <a:solidFill>
                 <a:srgbClr val="009bdd"/>
               </a:solidFill>
@@ -7297,99 +7055,298 @@
               <a:latin typeface="Arial"/>
             </a:endParaRPr>
           </a:p>
-        </p:txBody>
-      </p:sp>
-      <p:pic>
-        <p:nvPicPr>
-          <p:cNvPr id="89" name="" descr=""/>
-          <p:cNvPicPr/>
-          <p:nvPr/>
-        </p:nvPicPr>
-        <p:blipFill>
-          <a:blip r:embed="rId1"/>
-          <a:stretch/>
-        </p:blipFill>
-        <p:spPr>
-          <a:xfrm>
-            <a:off x="2507040" y="2289960"/>
-            <a:ext cx="5090040" cy="1104480"/>
-          </a:xfrm>
-          <a:prstGeom prst="rect">
-            <a:avLst/>
-          </a:prstGeom>
-          <a:noFill/>
-          <a:ln w="18000">
-            <a:noFill/>
-          </a:ln>
-        </p:spPr>
-      </p:pic>
-      <p:sp>
-        <p:nvSpPr>
-          <p:cNvPr id="90" name=""/>
-          <p:cNvSpPr/>
-          <p:nvPr/>
-        </p:nvSpPr>
-        <p:spPr>
-          <a:xfrm>
-            <a:off x="4898160" y="2468880"/>
-            <a:ext cx="359640" cy="359640"/>
-          </a:xfrm>
-          <a:prstGeom prst="ellipse">
-            <a:avLst/>
-          </a:prstGeom>
-          <a:noFill/>
-          <a:ln w="18000">
-            <a:solidFill>
-              <a:srgbClr val="009bdd"/>
-            </a:solidFill>
-            <a:round/>
-          </a:ln>
-        </p:spPr>
-        <p:style>
-          <a:lnRef idx="0"/>
-          <a:fillRef idx="0"/>
-          <a:effectRef idx="0"/>
-          <a:fontRef idx="minor"/>
-        </p:style>
-        <p:txBody>
-          <a:bodyPr wrap="none" lIns="90000" rIns="90000" tIns="45000" bIns="45000" anchor="ctr">
-            <a:noAutofit/>
-          </a:bodyPr>
-          <a:p>
-            <a:endParaRPr b="0" lang="bs-BA" sz="1800" strike="noStrike" u="none">
-              <a:solidFill>
-                <a:srgbClr val="000000"/>
-              </a:solidFill>
-              <a:uFillTx/>
-              <a:latin typeface="Arial"/>
-            </a:endParaRPr>
-          </a:p>
-        </p:txBody>
-      </p:sp>
-      <p:pic>
-        <p:nvPicPr>
-          <p:cNvPr id="91" name="" descr=""/>
-          <p:cNvPicPr/>
-          <p:nvPr/>
-        </p:nvPicPr>
-        <p:blipFill>
-          <a:blip r:embed="rId2"/>
-          <a:stretch/>
-        </p:blipFill>
-        <p:spPr>
-          <a:xfrm>
-            <a:off x="1356120" y="3527640"/>
-            <a:ext cx="7330680" cy="1371240"/>
-          </a:xfrm>
-          <a:prstGeom prst="rect">
-            <a:avLst/>
-          </a:prstGeom>
-          <a:noFill/>
-          <a:ln w="18000">
-            <a:noFill/>
-          </a:ln>
-        </p:spPr>
-      </p:pic>
+          <a:p>
+            <a:pPr lvl="1" marL="864000" indent="-324000">
+              <a:spcBef>
+                <a:spcPts val="850"/>
+              </a:spcBef>
+              <a:buClr>
+                <a:srgbClr val="77caee"/>
+              </a:buClr>
+              <a:buSzPct val="45000"/>
+              <a:buFont typeface="Wingdings" charset="2"/>
+              <a:buChar char=""/>
+            </a:pPr>
+            <a:r>
+              <a:rPr b="0" lang="bs-BA" sz="1200" strike="noStrike" u="none">
+                <a:solidFill>
+                  <a:srgbClr val="009bdd"/>
+                </a:solidFill>
+                <a:uFillTx/>
+                <a:latin typeface="Arial"/>
+              </a:rPr>
+              <a:t>To je posljednja verzija Firefoxa koja se može vrtjeti na Windows XP-u i Windows Visti, te također verzija Firefoxa koja se dobije uz Solaris 11.4.</a:t>
+            </a:r>
+            <a:endParaRPr b="0" lang="bs-BA" sz="1200" strike="noStrike" u="none">
+              <a:solidFill>
+                <a:srgbClr val="009bdd"/>
+              </a:solidFill>
+              <a:uFillTx/>
+              <a:latin typeface="Arial"/>
+            </a:endParaRPr>
+          </a:p>
+          <a:p>
+            <a:pPr lvl="1" marL="864000" indent="-324000">
+              <a:spcBef>
+                <a:spcPts val="850"/>
+              </a:spcBef>
+              <a:buClr>
+                <a:srgbClr val="77caee"/>
+              </a:buClr>
+              <a:buSzPct val="45000"/>
+              <a:buFont typeface="Wingdings" charset="2"/>
+              <a:buChar char=""/>
+            </a:pPr>
+            <a:r>
+              <a:rPr b="0" lang="bs-BA" sz="1200" strike="noStrike" u="none">
+                <a:solidFill>
+                  <a:srgbClr val="009bdd"/>
+                </a:solidFill>
+                <a:uFillTx/>
+                <a:latin typeface="Arial"/>
+              </a:rPr>
+              <a:t>Međutim, u Firefoxu 52.9 ESR pokrenutom na Windows XP (ali ne i ako se pokrene na Solarisu ili Windows 11), kao i u Epiphanyju na FreeBSD-u, linije koda i kod nisu alignirani (što onemogućava da se koriste breakpointsi).</a:t>
+            </a:r>
+            <a:endParaRPr b="0" lang="bs-BA" sz="1200" strike="noStrike" u="none">
+              <a:solidFill>
+                <a:srgbClr val="009bdd"/>
+              </a:solidFill>
+              <a:uFillTx/>
+              <a:latin typeface="Arial"/>
+            </a:endParaRPr>
+          </a:p>
+          <a:p>
+            <a:pPr lvl="1" marL="864000" indent="-324000">
+              <a:spcBef>
+                <a:spcPts val="850"/>
+              </a:spcBef>
+              <a:buClr>
+                <a:srgbClr val="77caee"/>
+              </a:buClr>
+              <a:buSzPct val="45000"/>
+              <a:buFont typeface="Wingdings" charset="2"/>
+              <a:buChar char=""/>
+            </a:pPr>
+            <a:r>
+              <a:rPr b="0" lang="bs-BA" sz="1200" strike="noStrike" u="none">
+                <a:solidFill>
+                  <a:srgbClr val="009bdd"/>
+                </a:solidFill>
+                <a:uFillTx/>
+                <a:latin typeface="Arial"/>
+              </a:rPr>
+              <a:t>Iz nekog meni nedokučivog razloga, JavaScript se vrti približno dvostruko brže u Firefoxu 52 nego u Firefoxu 120.</a:t>
+            </a:r>
+            <a:endParaRPr b="0" lang="bs-BA" sz="1200" strike="noStrike" u="none">
+              <a:solidFill>
+                <a:srgbClr val="009bdd"/>
+              </a:solidFill>
+              <a:uFillTx/>
+              <a:latin typeface="Arial"/>
+            </a:endParaRPr>
+          </a:p>
+          <a:p>
+            <a:pPr marL="432000" indent="-324000">
+              <a:spcBef>
+                <a:spcPts val="1060"/>
+              </a:spcBef>
+              <a:buClr>
+                <a:srgbClr val="77caee"/>
+              </a:buClr>
+              <a:buSzPct val="45000"/>
+              <a:buFont typeface="Wingdings" charset="2"/>
+              <a:buChar char=""/>
+            </a:pPr>
+            <a:r>
+              <a:rPr b="0" lang="bs-BA" sz="1200" strike="noStrike" u="none">
+                <a:solidFill>
+                  <a:srgbClr val="009bdd"/>
+                </a:solidFill>
+                <a:uFillTx/>
+                <a:latin typeface="Arial"/>
+              </a:rPr>
+              <a:t>Moderni Chrome</a:t>
+            </a:r>
+            <a:endParaRPr b="0" lang="bs-BA" sz="1200" strike="noStrike" u="none">
+              <a:solidFill>
+                <a:srgbClr val="009bdd"/>
+              </a:solidFill>
+              <a:uFillTx/>
+              <a:latin typeface="Arial"/>
+            </a:endParaRPr>
+          </a:p>
+          <a:p>
+            <a:pPr lvl="1" marL="864000" indent="-324000">
+              <a:spcBef>
+                <a:spcPts val="850"/>
+              </a:spcBef>
+              <a:buClr>
+                <a:srgbClr val="77caee"/>
+              </a:buClr>
+              <a:buSzPct val="45000"/>
+              <a:buFont typeface="Wingdings" charset="2"/>
+              <a:buChar char=""/>
+            </a:pPr>
+            <a:r>
+              <a:rPr b="0" lang="bs-BA" sz="1200" strike="noStrike" u="none">
+                <a:solidFill>
+                  <a:srgbClr val="009bdd"/>
+                </a:solidFill>
+                <a:uFillTx/>
+                <a:latin typeface="Arial"/>
+              </a:rPr>
+              <a:t>Za to da radi u Chromeu, morao sam izmijeniti CSS (jer tooltipsi na “Play/Pause”, “Fast Forward”, “Single Step” i “Stop” nisu bili radili).</a:t>
+            </a:r>
+            <a:endParaRPr b="0" lang="bs-BA" sz="1200" strike="noStrike" u="none">
+              <a:solidFill>
+                <a:srgbClr val="009bdd"/>
+              </a:solidFill>
+              <a:uFillTx/>
+              <a:latin typeface="Arial"/>
+            </a:endParaRPr>
+          </a:p>
+          <a:p>
+            <a:pPr marL="432000" indent="-324000">
+              <a:spcBef>
+                <a:spcPts val="1060"/>
+              </a:spcBef>
+              <a:buClr>
+                <a:srgbClr val="77caee"/>
+              </a:buClr>
+              <a:buSzPct val="45000"/>
+              <a:buFont typeface="Wingdings" charset="2"/>
+              <a:buChar char=""/>
+            </a:pPr>
+            <a:r>
+              <a:rPr b="0" lang="bs-BA" sz="1200" strike="noStrike" u="none">
+                <a:solidFill>
+                  <a:srgbClr val="009bdd"/>
+                </a:solidFill>
+                <a:uFillTx/>
+                <a:latin typeface="Arial"/>
+              </a:rPr>
+              <a:t>WebPositive (bliski srodnik Safariju)</a:t>
+            </a:r>
+            <a:endParaRPr b="0" lang="bs-BA" sz="1200" strike="noStrike" u="none">
+              <a:solidFill>
+                <a:srgbClr val="009bdd"/>
+              </a:solidFill>
+              <a:uFillTx/>
+              <a:latin typeface="Arial"/>
+            </a:endParaRPr>
+          </a:p>
+          <a:p>
+            <a:pPr lvl="1" marL="864000" indent="-324000">
+              <a:spcBef>
+                <a:spcPts val="850"/>
+              </a:spcBef>
+              <a:buClr>
+                <a:srgbClr val="77caee"/>
+              </a:buClr>
+              <a:buSzPct val="45000"/>
+              <a:buFont typeface="Wingdings" charset="2"/>
+              <a:buChar char=""/>
+            </a:pPr>
+            <a:r>
+              <a:rPr b="0" lang="bs-BA" sz="1200" strike="noStrike" u="none">
+                <a:solidFill>
+                  <a:srgbClr val="009bdd"/>
+                </a:solidFill>
+                <a:uFillTx/>
+                <a:latin typeface="Arial"/>
+              </a:rPr>
+              <a:t>Za to da radi u WebPositiveu, morao sam izmijeniti i CSS i JavaScript.</a:t>
+            </a:r>
+            <a:endParaRPr b="0" lang="bs-BA" sz="1200" strike="noStrike" u="none">
+              <a:solidFill>
+                <a:srgbClr val="009bdd"/>
+              </a:solidFill>
+              <a:uFillTx/>
+              <a:latin typeface="Arial"/>
+            </a:endParaRPr>
+          </a:p>
+          <a:p>
+            <a:pPr lvl="1" marL="864000" indent="-324000">
+              <a:spcBef>
+                <a:spcPts val="850"/>
+              </a:spcBef>
+              <a:buClr>
+                <a:srgbClr val="77caee"/>
+              </a:buClr>
+              <a:buSzPct val="45000"/>
+              <a:buFont typeface="Wingdings" charset="2"/>
+              <a:buChar char=""/>
+            </a:pPr>
+            <a:r>
+              <a:rPr b="0" lang="bs-BA" sz="1200" strike="noStrike" u="none">
+                <a:solidFill>
+                  <a:srgbClr val="009bdd"/>
+                </a:solidFill>
+                <a:uFillTx/>
+                <a:latin typeface="Arial"/>
+              </a:rPr>
+              <a:t>Nisam uspio napraviti da “Download Hexadecimal” radi u WebPositiveu.</a:t>
+            </a:r>
+            <a:endParaRPr b="0" lang="bs-BA" sz="1200" strike="noStrike" u="none">
+              <a:solidFill>
+                <a:srgbClr val="009bdd"/>
+              </a:solidFill>
+              <a:uFillTx/>
+              <a:latin typeface="Arial"/>
+            </a:endParaRPr>
+          </a:p>
+          <a:p>
+            <a:pPr marL="432000" indent="-324000">
+              <a:spcBef>
+                <a:spcPts val="1060"/>
+              </a:spcBef>
+              <a:buClr>
+                <a:srgbClr val="77caee"/>
+              </a:buClr>
+              <a:buSzPct val="45000"/>
+              <a:buFont typeface="Wingdings" charset="2"/>
+              <a:buChar char=""/>
+            </a:pPr>
+            <a:r>
+              <a:rPr b="0" lang="bs-BA" sz="1200" strike="noStrike" u="none">
+                <a:solidFill>
+                  <a:srgbClr val="009bdd"/>
+                </a:solidFill>
+                <a:uFillTx/>
+                <a:latin typeface="Arial"/>
+              </a:rPr>
+              <a:t>Darko Nikolić tvrdi da je isprobao moj program na Macu u Safariju i u Operi i da funkcionira tamo. Discordaš </a:t>
+            </a:r>
+            <a:r>
+              <a:rPr b="0" i="1" lang="bs-BA" sz="1200" strike="noStrike" u="none">
+                <a:solidFill>
+                  <a:srgbClr val="009bdd"/>
+                </a:solidFill>
+                <a:uFillTx/>
+                <a:latin typeface="Arial"/>
+              </a:rPr>
+              <a:t>emm312</a:t>
+            </a:r>
+            <a:r>
+              <a:rPr b="0" lang="bs-BA" sz="1200" strike="noStrike" u="none">
+                <a:solidFill>
+                  <a:srgbClr val="009bdd"/>
+                </a:solidFill>
+                <a:uFillTx/>
+                <a:latin typeface="Arial"/>
+              </a:rPr>
+              <a:t> isto tvrdi da ga je isprobao u Safariju i da funkcionira tamo.</a:t>
+            </a:r>
+            <a:endParaRPr b="0" lang="bs-BA" sz="1200" strike="noStrike" u="none">
+              <a:solidFill>
+                <a:srgbClr val="009bdd"/>
+              </a:solidFill>
+              <a:uFillTx/>
+              <a:latin typeface="Arial"/>
+            </a:endParaRPr>
+          </a:p>
+        </p:txBody>
+      </p:sp>
       <p:sp>
         <p:nvSpPr>
           <p:cNvPr id="4" name="PlaceHolder 3"/>
@@ -7404,7 +7361,7 @@
         <p:txBody>
           <a:bodyPr/>
           <a:p>
-            <a:fld id="{E536D642-6BE8-41DD-B029-F0F735E54B7A}" type="slidenum">
+            <a:fld id="{04D2BC23-5033-48EF-A11F-87FE873A9039}" type="slidenum">
               <a:t>22</a:t>
             </a:fld>
           </a:p>
@@ -7424,9 +7381,9 @@
         <p:txBody>
           <a:bodyPr/>
           <a:p>
-            <a:fld id="{41D24937-1CEE-4C3F-857C-A0D0F6EB1394}" type="datetime1">
+            <a:fld id="{B82B6B19-F48A-44F7-B688-FCD359600FF1}" type="datetime1">
               <a:rPr lang="en-US"/>
-              <a:t>04/14/2025</a:t>
+              <a:t>04/24/2025</a:t>
             </a:fld>
           </a:p>
         </p:txBody>
@@ -7463,7 +7420,7 @@
       </p:grpSpPr>
       <p:sp>
         <p:nvSpPr>
-          <p:cNvPr id="92" name="PlaceHolder 1"/>
+          <p:cNvPr id="89" name="PlaceHolder 1"/>
           <p:cNvSpPr>
             <a:spLocks noGrp="1"/>
           </p:cNvSpPr>
@@ -7500,7 +7457,7 @@
                 <a:uFillTx/>
                 <a:latin typeface="Arial"/>
               </a:rPr>
-              <a:t>Bilješke o sintaksi</a:t>
+              <a:t>Back-end</a:t>
             </a:r>
             <a:endParaRPr b="0" lang="bs-BA" sz="3300" strike="noStrike" u="none">
               <a:solidFill>
@@ -7514,7 +7471,7 @@
       </p:sp>
       <p:sp>
         <p:nvSpPr>
-          <p:cNvPr id="93" name="PlaceHolder 2"/>
+          <p:cNvPr id="90" name="PlaceHolder 2"/>
           <p:cNvSpPr>
             <a:spLocks noGrp="1"/>
           </p:cNvSpPr>
@@ -7559,7 +7516,47 @@
                 <a:uFillTx/>
                 <a:latin typeface="Arial"/>
               </a:rPr>
-              <a:t>Moj asembler za PicoBlaze cilja na punu kompatibilnost sa Xilinxovim službenim asemblerom za PicoBlaze. To, na žalost, znači da se numerički literali bez eksplicitno određene brojevne baze interpretiraju kao heksadekadski.</a:t>
+              <a:t>Abidin Durdu (tada zvan </a:t>
+            </a:r>
+            <a:r>
+              <a:rPr b="0" i="1" lang="bs-BA" sz="2100" strike="noStrike" u="none">
+                <a:solidFill>
+                  <a:srgbClr val="009bdd"/>
+                </a:solidFill>
+                <a:uFillTx/>
+                <a:latin typeface="Arial"/>
+              </a:rPr>
+              <a:t>betelgeuse-7</a:t>
+            </a:r>
+            <a:r>
+              <a:rPr b="0" lang="bs-BA" sz="2100" strike="noStrike" u="none">
+                <a:solidFill>
+                  <a:srgbClr val="009bdd"/>
+                </a:solidFill>
+                <a:uFillTx/>
+                <a:latin typeface="Arial"/>
+              </a:rPr>
+              <a:t>, a sada zvan </a:t>
+            </a:r>
+            <a:r>
+              <a:rPr b="0" i="1" lang="bs-BA" sz="2100" strike="noStrike" u="none">
+                <a:solidFill>
+                  <a:srgbClr val="009bdd"/>
+                </a:solidFill>
+                <a:uFillTx/>
+                <a:latin typeface="Arial"/>
+              </a:rPr>
+              <a:t>abdrd</a:t>
+            </a:r>
+            <a:r>
+              <a:rPr b="0" lang="bs-BA" sz="2100" strike="noStrike" u="none">
+                <a:solidFill>
+                  <a:srgbClr val="009bdd"/>
+                </a:solidFill>
+                <a:uFillTx/>
+                <a:latin typeface="Arial"/>
+              </a:rPr>
+              <a:t>) napravio je back-end u PHP-u, koji omogućuje korisnicima da dijele asemblerske programe. Taj back-end koristi MySQL bazu podataka. Vrti se na SourceForge serverima.</a:t>
             </a:r>
             <a:endParaRPr b="0" lang="bs-BA" sz="2100" strike="noStrike" u="none">
               <a:solidFill>
@@ -7569,108 +7566,99 @@
               <a:latin typeface="Arial"/>
             </a:endParaRPr>
           </a:p>
-          <a:p>
-            <a:pPr marL="432000" indent="-324000">
-              <a:spcBef>
-                <a:spcPts val="1060"/>
-              </a:spcBef>
-              <a:buClr>
-                <a:srgbClr val="77caee"/>
-              </a:buClr>
-              <a:buSzPct val="45000"/>
-              <a:buFont typeface="Wingdings" charset="2"/>
-              <a:buChar char=""/>
-            </a:pPr>
-            <a:r>
-              <a:rPr b="0" lang="bs-BA" sz="2100" strike="noStrike" u="none">
-                <a:solidFill>
-                  <a:srgbClr val="009bdd"/>
-                </a:solidFill>
-                <a:uFillTx/>
-                <a:latin typeface="Arial"/>
-              </a:rPr>
-              <a:t>Od verzije v5.0.0 to se ponašanje može promijeniti: pretprocesor i asembler će sve brojevne literale bez specificirane baze nakon direktive </a:t>
-            </a:r>
-            <a:r>
-              <a:rPr b="0" lang="bs-BA" sz="2100" strike="noStrike" u="none">
-                <a:solidFill>
-                  <a:srgbClr val="009bdd"/>
-                </a:solidFill>
-                <a:uFillTx/>
-                <a:latin typeface="Courier New"/>
-              </a:rPr>
-              <a:t>base_decimal</a:t>
-            </a:r>
-            <a:r>
-              <a:rPr b="0" lang="bs-BA" sz="2100" strike="noStrike" u="none">
-                <a:solidFill>
-                  <a:srgbClr val="009bdd"/>
-                </a:solidFill>
-                <a:uFillTx/>
-                <a:latin typeface="Arial"/>
-              </a:rPr>
-              <a:t> interpretirati kao dekadske (kao u gotovo svim programskim jezicima), a nakon </a:t>
-            </a:r>
-            <a:r>
-              <a:rPr b="0" lang="bs-BA" sz="2100" strike="noStrike" u="none">
-                <a:solidFill>
-                  <a:srgbClr val="009bdd"/>
-                </a:solidFill>
-                <a:uFillTx/>
-                <a:latin typeface="Courier New"/>
-              </a:rPr>
-              <a:t>base_hexadecimal</a:t>
-            </a:r>
-            <a:r>
-              <a:rPr b="0" lang="bs-BA" sz="2100" strike="noStrike" u="none">
-                <a:solidFill>
-                  <a:srgbClr val="009bdd"/>
-                </a:solidFill>
-                <a:uFillTx/>
-                <a:latin typeface="Arial"/>
-              </a:rPr>
-              <a:t> kao heksadekadske.</a:t>
-            </a:r>
-            <a:endParaRPr b="0" lang="bs-BA" sz="2100" strike="noStrike" u="none">
-              <a:solidFill>
-                <a:srgbClr val="009bdd"/>
-              </a:solidFill>
-              <a:uFillTx/>
-              <a:latin typeface="Arial"/>
-            </a:endParaRPr>
-          </a:p>
-          <a:p>
-            <a:pPr marL="432000" indent="-324000">
-              <a:spcBef>
-                <a:spcPts val="1060"/>
-              </a:spcBef>
-              <a:buClr>
-                <a:srgbClr val="77caee"/>
-              </a:buClr>
-              <a:buSzPct val="45000"/>
-              <a:buFont typeface="Wingdings" charset="2"/>
-              <a:buChar char=""/>
-            </a:pPr>
-            <a:r>
-              <a:rPr b="0" lang="bs-BA" sz="2100" strike="noStrike" u="none">
-                <a:solidFill>
-                  <a:srgbClr val="009bdd"/>
-                </a:solidFill>
-                <a:uFillTx/>
-                <a:latin typeface="Arial"/>
-              </a:rPr>
-              <a:t>Zbog načina na koji je asembler napravljen, ako se te naredbe stave u if-grananje ili while-petlju, može se dogoditi da pretprocesor interpretira konstante kao dekadske, a asembler kao heksadekadske. Nema očitog rješenja za taj problem.</a:t>
-            </a:r>
-            <a:endParaRPr b="0" lang="bs-BA" sz="2100" strike="noStrike" u="none">
-              <a:solidFill>
-                <a:srgbClr val="009bdd"/>
-              </a:solidFill>
-              <a:uFillTx/>
-              <a:latin typeface="Arial"/>
-            </a:endParaRPr>
-          </a:p>
-        </p:txBody>
-      </p:sp>
+        </p:txBody>
+      </p:sp>
+      <p:pic>
+        <p:nvPicPr>
+          <p:cNvPr id="91" name="" descr=""/>
+          <p:cNvPicPr/>
+          <p:nvPr/>
+        </p:nvPicPr>
+        <p:blipFill>
+          <a:blip r:embed="rId1"/>
+          <a:stretch/>
+        </p:blipFill>
+        <p:spPr>
+          <a:xfrm>
+            <a:off x="2507040" y="2289960"/>
+            <a:ext cx="5090040" cy="1104480"/>
+          </a:xfrm>
+          <a:prstGeom prst="rect">
+            <a:avLst/>
+          </a:prstGeom>
+          <a:noFill/>
+          <a:ln w="18000">
+            <a:noFill/>
+          </a:ln>
+        </p:spPr>
+      </p:pic>
+      <p:sp>
+        <p:nvSpPr>
+          <p:cNvPr id="92" name=""/>
+          <p:cNvSpPr/>
+          <p:nvPr/>
+        </p:nvSpPr>
+        <p:spPr>
+          <a:xfrm>
+            <a:off x="4898160" y="2468880"/>
+            <a:ext cx="359640" cy="359640"/>
+          </a:xfrm>
+          <a:prstGeom prst="ellipse">
+            <a:avLst/>
+          </a:prstGeom>
+          <a:noFill/>
+          <a:ln w="18000">
+            <a:solidFill>
+              <a:srgbClr val="009bdd"/>
+            </a:solidFill>
+            <a:round/>
+          </a:ln>
+        </p:spPr>
+        <p:style>
+          <a:lnRef idx="0"/>
+          <a:fillRef idx="0"/>
+          <a:effectRef idx="0"/>
+          <a:fontRef idx="minor"/>
+        </p:style>
+        <p:txBody>
+          <a:bodyPr wrap="none" lIns="90000" rIns="90000" tIns="45000" bIns="45000" anchor="ctr">
+            <a:noAutofit/>
+          </a:bodyPr>
+          <a:p>
+            <a:endParaRPr b="0" lang="bs-BA" sz="1800" strike="noStrike" u="none">
+              <a:solidFill>
+                <a:srgbClr val="000000"/>
+              </a:solidFill>
+              <a:uFillTx/>
+              <a:latin typeface="Arial"/>
+            </a:endParaRPr>
+          </a:p>
+        </p:txBody>
+      </p:sp>
+      <p:pic>
+        <p:nvPicPr>
+          <p:cNvPr id="93" name="" descr=""/>
+          <p:cNvPicPr/>
+          <p:nvPr/>
+        </p:nvPicPr>
+        <p:blipFill>
+          <a:blip r:embed="rId2"/>
+          <a:stretch/>
+        </p:blipFill>
+        <p:spPr>
+          <a:xfrm>
+            <a:off x="1356120" y="3527640"/>
+            <a:ext cx="7330680" cy="1371240"/>
+          </a:xfrm>
+          <a:prstGeom prst="rect">
+            <a:avLst/>
+          </a:prstGeom>
+          <a:noFill/>
+          <a:ln w="18000">
+            <a:noFill/>
+          </a:ln>
+        </p:spPr>
+      </p:pic>
       <p:sp>
         <p:nvSpPr>
           <p:cNvPr id="4" name="PlaceHolder 3"/>
@@ -7685,7 +7673,7 @@
         <p:txBody>
           <a:bodyPr/>
           <a:p>
-            <a:fld id="{82C54D99-EF02-4636-A77A-42438AD66DEE}" type="slidenum">
+            <a:fld id="{071CA60D-A815-435C-B759-CAED33CC57B7}" type="slidenum">
               <a:t>23</a:t>
             </a:fld>
           </a:p>
@@ -7705,9 +7693,9 @@
         <p:txBody>
           <a:bodyPr/>
           <a:p>
-            <a:fld id="{41A138C0-AB11-42EC-A21A-11A96C175189}" type="datetime1">
+            <a:fld id="{D238DB85-4C03-43F3-8CDC-20342E09CD3B}" type="datetime1">
               <a:rPr lang="en-US"/>
-              <a:t>04/14/2025</a:t>
+              <a:t>04/24/2025</a:t>
             </a:fld>
           </a:p>
         </p:txBody>
@@ -7754,8 +7742,8 @@
         </p:nvSpPr>
         <p:spPr>
           <a:xfrm>
-            <a:off x="360000" y="165960"/>
-            <a:ext cx="9360000" cy="506160"/>
+            <a:off x="360000" y="180000"/>
+            <a:ext cx="9360000" cy="478080"/>
           </a:xfrm>
           <a:prstGeom prst="rect">
             <a:avLst/>
@@ -7781,17 +7769,7 @@
                 <a:uFillTx/>
                 <a:latin typeface="Arial"/>
               </a:rPr>
-              <a:t>Pretprocesorska naredba </a:t>
-            </a:r>
-            <a:r>
-              <a:rPr b="0" lang="bs-BA" sz="3300" strike="noStrike" u="none">
-                <a:solidFill>
-                  <a:srgbClr val="ffffff"/>
-                </a:solidFill>
-                <a:uFillTx/>
-                <a:latin typeface="Courier New"/>
-              </a:rPr>
-              <a:t>print_string</a:t>
+              <a:t>Bilješke o sintaksi</a:t>
             </a:r>
             <a:endParaRPr b="0" lang="bs-BA" sz="3300" strike="noStrike" u="none">
               <a:solidFill>
@@ -7843,36 +7821,16 @@
               <a:buChar char=""/>
             </a:pPr>
             <a:r>
-              <a:rPr b="0" lang="bs-BA" sz="1800" strike="noStrike" u="none">
-                <a:solidFill>
-                  <a:srgbClr val="009bdd"/>
-                </a:solidFill>
-                <a:uFillTx/>
-                <a:latin typeface="Arial"/>
-              </a:rPr>
-              <a:t>Pretprocesor od mog PicoBlaze asemblera od verzije v5.3.0 pa nadalje podržava naredbu </a:t>
-            </a:r>
-            <a:r>
-              <a:rPr b="0" lang="bs-BA" sz="1800" strike="noStrike" u="none">
-                <a:solidFill>
-                  <a:srgbClr val="009bdd"/>
-                </a:solidFill>
-                <a:uFillTx/>
-                <a:latin typeface="Courier New"/>
-              </a:rPr>
-              <a:t>print_string</a:t>
-            </a:r>
-            <a:r>
-              <a:rPr b="0" lang="bs-BA" sz="1800" strike="noStrike" u="none">
-                <a:solidFill>
-                  <a:srgbClr val="009bdd"/>
-                </a:solidFill>
-                <a:uFillTx/>
-                <a:latin typeface="Times New Roman"/>
-              </a:rPr>
-              <a:t>.</a:t>
-            </a:r>
-            <a:endParaRPr b="0" lang="bs-BA" sz="1800" strike="noStrike" u="none">
+              <a:rPr b="0" lang="bs-BA" sz="2100" strike="noStrike" u="none">
+                <a:solidFill>
+                  <a:srgbClr val="009bdd"/>
+                </a:solidFill>
+                <a:uFillTx/>
+                <a:latin typeface="Arial"/>
+              </a:rPr>
+              <a:t>Moj asembler za PicoBlaze cilja na punu kompatibilnost sa Xilinxovim službenim asemblerom za PicoBlaze. To, na žalost, znači da se numerički literali bez eksplicitno određene brojevne baze interpretiraju kao heksadekadski.</a:t>
+            </a:r>
+            <a:endParaRPr b="0" lang="bs-BA" sz="2100" strike="noStrike" u="none">
               <a:solidFill>
                 <a:srgbClr val="009bdd"/>
               </a:solidFill>
@@ -7893,29 +7851,56 @@
               <a:buChar char=""/>
             </a:pPr>
             <a:r>
-              <a:rPr b="0" lang="bs-BA" sz="1800" strike="noStrike" u="none">
-                <a:solidFill>
-                  <a:srgbClr val="009bdd"/>
-                </a:solidFill>
-                <a:uFillTx/>
-                <a:latin typeface="Arial"/>
-              </a:rPr>
-              <a:t>Primjer korištenja:</a:t>
-            </a:r>
-            <a:br>
-              <a:rPr sz="1800"/>
-            </a:br>
-            <a:r>
-              <a:rPr b="0" lang="bs-BA" sz="1800" strike="noStrike" u="none">
+              <a:rPr b="0" lang="bs-BA" sz="2100" strike="noStrike" u="none">
+                <a:solidFill>
+                  <a:srgbClr val="009bdd"/>
+                </a:solidFill>
+                <a:uFillTx/>
+                <a:latin typeface="Arial"/>
+              </a:rPr>
+              <a:t>Od verzije v5.0.0 to se ponašanje može promijeniti: pretprocesor i asembler će sve brojevne literale bez specificirane baze nakon direktive </a:t>
+            </a:r>
+            <a:r>
+              <a:rPr b="0" lang="bs-BA" sz="2100" strike="noStrike" u="none">
                 <a:solidFill>
                   <a:srgbClr val="009bdd"/>
                 </a:solidFill>
                 <a:uFillTx/>
                 <a:latin typeface="Courier New"/>
               </a:rPr>
-              <a:t>print_string "Hello world!", s9, UART_TX</a:t>
-            </a:r>
-            <a:endParaRPr b="0" lang="bs-BA" sz="1800" strike="noStrike" u="none">
+              <a:t>base_decimal</a:t>
+            </a:r>
+            <a:r>
+              <a:rPr b="0" lang="bs-BA" sz="2100" strike="noStrike" u="none">
+                <a:solidFill>
+                  <a:srgbClr val="009bdd"/>
+                </a:solidFill>
+                <a:uFillTx/>
+                <a:latin typeface="Arial"/>
+              </a:rPr>
+              <a:t> interpretirati kao dekadske (kao u gotovo svim programskim jezicima), a nakon </a:t>
+            </a:r>
+            <a:r>
+              <a:rPr b="0" lang="bs-BA" sz="2100" strike="noStrike" u="none">
+                <a:solidFill>
+                  <a:srgbClr val="009bdd"/>
+                </a:solidFill>
+                <a:uFillTx/>
+                <a:latin typeface="Courier New"/>
+              </a:rPr>
+              <a:t>base_hexadecimal</a:t>
+            </a:r>
+            <a:r>
+              <a:rPr b="0" lang="bs-BA" sz="2100" strike="noStrike" u="none">
+                <a:solidFill>
+                  <a:srgbClr val="009bdd"/>
+                </a:solidFill>
+                <a:uFillTx/>
+                <a:latin typeface="Arial"/>
+              </a:rPr>
+              <a:t> kao heksadekadske.</a:t>
+            </a:r>
+            <a:endParaRPr b="0" lang="bs-BA" sz="2100" strike="noStrike" u="none">
               <a:solidFill>
                 <a:srgbClr val="009bdd"/>
               </a:solidFill>
@@ -7936,81 +7921,16 @@
               <a:buChar char=""/>
             </a:pPr>
             <a:r>
-              <a:rPr b="0" lang="bs-BA" sz="1800" strike="noStrike" u="none">
-                <a:solidFill>
-                  <a:srgbClr val="009bdd"/>
-                </a:solidFill>
-                <a:uFillTx/>
-                <a:latin typeface="Arial"/>
-              </a:rPr>
-              <a:t>To se pri pretprocesiranju zamjenjuje mnemonikama:</a:t>
-            </a:r>
-            <a:br>
-              <a:rPr sz="1800"/>
-            </a:br>
-            <a:r>
-              <a:rPr b="0" lang="bs-BA" sz="1800" strike="noStrike" u="none">
-                <a:solidFill>
-                  <a:srgbClr val="009bdd"/>
-                </a:solidFill>
-                <a:uFillTx/>
-                <a:latin typeface="Courier New"/>
-              </a:rPr>
-              <a:t>load s9, "H"</a:t>
-            </a:r>
-            <a:br>
-              <a:rPr sz="1800"/>
-            </a:br>
-            <a:r>
-              <a:rPr b="0" lang="bs-BA" sz="1800" strike="noStrike" u="none">
-                <a:solidFill>
-                  <a:srgbClr val="009bdd"/>
-                </a:solidFill>
-                <a:uFillTx/>
-                <a:latin typeface="Courier New"/>
-              </a:rPr>
-              <a:t>call UART_TX</a:t>
-            </a:r>
-            <a:br>
-              <a:rPr sz="1800"/>
-            </a:br>
-            <a:r>
-              <a:rPr b="0" lang="bs-BA" sz="1800" strike="noStrike" u="none">
-                <a:solidFill>
-                  <a:srgbClr val="009bdd"/>
-                </a:solidFill>
-                <a:uFillTx/>
-                <a:latin typeface="Courier New"/>
-              </a:rPr>
-              <a:t>load s9, "e"</a:t>
-            </a:r>
-            <a:br>
-              <a:rPr sz="1800"/>
-            </a:br>
-            <a:r>
-              <a:rPr b="0" lang="bs-BA" sz="1800" strike="noStrike" u="none">
-                <a:solidFill>
-                  <a:srgbClr val="009bdd"/>
-                </a:solidFill>
-                <a:uFillTx/>
-                <a:latin typeface="Courier New"/>
-              </a:rPr>
-              <a:t>call UART_TX</a:t>
-            </a:r>
-            <a:br>
-              <a:rPr sz="1800"/>
-            </a:br>
-            <a:r>
-              <a:rPr b="0" lang="bs-BA" sz="1800" strike="noStrike" u="none">
-                <a:solidFill>
-                  <a:srgbClr val="009bdd"/>
-                </a:solidFill>
-                <a:uFillTx/>
-                <a:latin typeface="Courier New"/>
-              </a:rPr>
-              <a:t>...</a:t>
-            </a:r>
-            <a:endParaRPr b="0" lang="bs-BA" sz="1800" strike="noStrike" u="none">
+              <a:rPr b="0" lang="bs-BA" sz="2100" strike="noStrike" u="none">
+                <a:solidFill>
+                  <a:srgbClr val="009bdd"/>
+                </a:solidFill>
+                <a:uFillTx/>
+                <a:latin typeface="Arial"/>
+              </a:rPr>
+              <a:t>Zbog načina na koji je asembler napravljen, ako se te naredbe stave u if-grananje ili while-petlju, može se dogoditi da pretprocesor interpretira konstante kao dekadske, a asembler kao heksadekadske. Nema očitog rješenja za taj problem.</a:t>
+            </a:r>
+            <a:endParaRPr b="0" lang="bs-BA" sz="2100" strike="noStrike" u="none">
               <a:solidFill>
                 <a:srgbClr val="009bdd"/>
               </a:solidFill>
@@ -8018,56 +7938,6 @@
               <a:latin typeface="Arial"/>
             </a:endParaRPr>
           </a:p>
-          <a:p>
-            <a:pPr marL="432000" indent="-324000">
-              <a:spcBef>
-                <a:spcPts val="1060"/>
-              </a:spcBef>
-              <a:buClr>
-                <a:srgbClr val="77caee"/>
-              </a:buClr>
-              <a:buSzPct val="45000"/>
-              <a:buFont typeface="Wingdings" charset="2"/>
-              <a:buChar char=""/>
-            </a:pPr>
-            <a:r>
-              <a:rPr b="0" lang="bs-BA" sz="1800" strike="noStrike" u="none">
-                <a:solidFill>
-                  <a:srgbClr val="009bdd"/>
-                </a:solidFill>
-                <a:uFillTx/>
-                <a:latin typeface="Arial"/>
-              </a:rPr>
-              <a:t>To je skratilo kôd primjera “</a:t>
-            </a:r>
-            <a:r>
-              <a:rPr b="0" i="1" lang="bs-BA" sz="1800" strike="noStrike" u="none">
-                <a:solidFill>
-                  <a:srgbClr val="009bdd"/>
-                </a:solidFill>
-                <a:uFillTx/>
-                <a:latin typeface="Arial"/>
-              </a:rPr>
-              <a:t>Permutations Algorithm</a:t>
-            </a:r>
-            <a:r>
-              <a:rPr b="0" lang="bs-BA" sz="1800" strike="noStrike" u="none">
-                <a:solidFill>
-                  <a:srgbClr val="009bdd"/>
-                </a:solidFill>
-                <a:uFillTx/>
-                <a:latin typeface="Arial"/>
-              </a:rPr>
-              <a:t>” s preko 1000 redaka na manje od 400 redaka.</a:t>
-            </a:r>
-            <a:endParaRPr b="0" lang="bs-BA" sz="1800" strike="noStrike" u="none">
-              <a:solidFill>
-                <a:srgbClr val="009bdd"/>
-              </a:solidFill>
-              <a:uFillTx/>
-              <a:latin typeface="Arial"/>
-            </a:endParaRPr>
-          </a:p>
         </p:txBody>
       </p:sp>
       <p:sp>
@@ -8084,7 +7954,7 @@
         <p:txBody>
           <a:bodyPr/>
           <a:p>
-            <a:fld id="{F9B5F138-8E52-4D9E-84CC-43132C2C28B5}" type="slidenum">
+            <a:fld id="{A234171C-E7D1-44C0-A469-02C0F4F7B8E2}" type="slidenum">
               <a:t>24</a:t>
             </a:fld>
           </a:p>
@@ -8104,9 +7974,9 @@
         <p:txBody>
           <a:bodyPr/>
           <a:p>
-            <a:fld id="{C7FD2898-85D9-415B-83F5-D975F1C8C660}" type="datetime1">
+            <a:fld id="{3C7E8B38-3990-4BE0-B383-680BDCE8699E}" type="datetime1">
               <a:rPr lang="en-US"/>
-              <a:t>04/14/2025</a:t>
+              <a:t>04/24/2025</a:t>
             </a:fld>
           </a:p>
         </p:txBody>
@@ -8153,8 +8023,8 @@
         </p:nvSpPr>
         <p:spPr>
           <a:xfrm>
-            <a:off x="360000" y="180000"/>
-            <a:ext cx="9360000" cy="478080"/>
+            <a:off x="360000" y="165960"/>
+            <a:ext cx="9360000" cy="506160"/>
           </a:xfrm>
           <a:prstGeom prst="rect">
             <a:avLst/>
@@ -8180,7 +8050,17 @@
                 <a:uFillTx/>
                 <a:latin typeface="Arial"/>
               </a:rPr>
-              <a:t>Bilješke o arhitekturi</a:t>
+              <a:t>Pretprocesorska naredba </a:t>
+            </a:r>
+            <a:r>
+              <a:rPr b="0" lang="bs-BA" sz="3300" strike="noStrike" u="none">
+                <a:solidFill>
+                  <a:srgbClr val="ffffff"/>
+                </a:solidFill>
+                <a:uFillTx/>
+                <a:latin typeface="Courier New"/>
+              </a:rPr>
+              <a:t>print_string</a:t>
             </a:r>
             <a:endParaRPr b="0" lang="bs-BA" sz="3300" strike="noStrike" u="none">
               <a:solidFill>
@@ -8232,16 +8112,36 @@
               <a:buChar char=""/>
             </a:pPr>
             <a:r>
-              <a:rPr b="0" lang="bs-BA" sz="2400" strike="noStrike" u="none">
-                <a:solidFill>
-                  <a:srgbClr val="009bdd"/>
-                </a:solidFill>
-                <a:uFillTx/>
-                <a:latin typeface="Arial"/>
-              </a:rPr>
-              <a:t>Parseri većine asemblera pretvaraju tokenizirani asemblerski kod u dvodimenzionalno polje (tablicu) malih stabala (gdje su samo aritmetički izrazi stabla, a ostalo su pojedinačni čvorovi).</a:t>
-            </a:r>
-            <a:endParaRPr b="0" lang="bs-BA" sz="2400" strike="noStrike" u="none">
+              <a:rPr b="0" lang="bs-BA" sz="1600" strike="noStrike" u="none">
+                <a:solidFill>
+                  <a:srgbClr val="009bdd"/>
+                </a:solidFill>
+                <a:uFillTx/>
+                <a:latin typeface="Arial"/>
+              </a:rPr>
+              <a:t>Pretprocesor od mog PicoBlaze asemblera od verzije v5.3.0 pa nadalje podržava naredbu </a:t>
+            </a:r>
+            <a:r>
+              <a:rPr b="0" lang="bs-BA" sz="1600" strike="noStrike" u="none">
+                <a:solidFill>
+                  <a:srgbClr val="009bdd"/>
+                </a:solidFill>
+                <a:uFillTx/>
+                <a:latin typeface="Courier New"/>
+              </a:rPr>
+              <a:t>print_string</a:t>
+            </a:r>
+            <a:r>
+              <a:rPr b="0" lang="bs-BA" sz="1600" strike="noStrike" u="none">
+                <a:solidFill>
+                  <a:srgbClr val="009bdd"/>
+                </a:solidFill>
+                <a:uFillTx/>
+                <a:latin typeface="Times New Roman"/>
+              </a:rPr>
+              <a:t>.</a:t>
+            </a:r>
+            <a:endParaRPr b="0" lang="bs-BA" sz="1600" strike="noStrike" u="none">
               <a:solidFill>
                 <a:srgbClr val="009bdd"/>
               </a:solidFill>
@@ -8262,16 +8162,29 @@
               <a:buChar char=""/>
             </a:pPr>
             <a:r>
-              <a:rPr b="0" lang="bs-BA" sz="2400" strike="noStrike" u="none">
-                <a:solidFill>
-                  <a:srgbClr val="009bdd"/>
-                </a:solidFill>
-                <a:uFillTx/>
-                <a:latin typeface="Arial"/>
-              </a:rPr>
-              <a:t>Parser u ovom asembleru za PicoBlaze pretvara tokenizirani asemblerski kod u jedno veliko stablo. Korijen tog stabla je čvor s tekstom “assembly”, a čvorovi dubine 1 su mnemonike, pretprocesorske naredbe i labeli.</a:t>
-            </a:r>
-            <a:endParaRPr b="0" lang="bs-BA" sz="2400" strike="noStrike" u="none">
+              <a:rPr b="0" lang="bs-BA" sz="1600" strike="noStrike" u="none">
+                <a:solidFill>
+                  <a:srgbClr val="009bdd"/>
+                </a:solidFill>
+                <a:uFillTx/>
+                <a:latin typeface="Arial"/>
+              </a:rPr>
+              <a:t>Primjer korištenja:</a:t>
+            </a:r>
+            <a:br>
+              <a:rPr sz="1600"/>
+            </a:br>
+            <a:r>
+              <a:rPr b="0" lang="bs-BA" sz="1600" strike="noStrike" u="none">
+                <a:solidFill>
+                  <a:srgbClr val="009bdd"/>
+                </a:solidFill>
+                <a:uFillTx/>
+                <a:latin typeface="Courier New"/>
+              </a:rPr>
+              <a:t>print_string "Hello world!", s9, UART_TX</a:t>
+            </a:r>
+            <a:endParaRPr b="0" lang="bs-BA" sz="1600" strike="noStrike" u="none">
               <a:solidFill>
                 <a:srgbClr val="009bdd"/>
               </a:solidFill>
@@ -8292,16 +8205,81 @@
               <a:buChar char=""/>
             </a:pPr>
             <a:r>
-              <a:rPr b="0" lang="bs-BA" sz="2400" strike="noStrike" u="none">
-                <a:solidFill>
-                  <a:srgbClr val="009bdd"/>
-                </a:solidFill>
-                <a:uFillTx/>
-                <a:latin typeface="Arial"/>
-              </a:rPr>
-              <a:t>Operandi mnemonika i pretprocesorskih naredbi njihova su djeca.</a:t>
-            </a:r>
-            <a:endParaRPr b="0" lang="bs-BA" sz="2400" strike="noStrike" u="none">
+              <a:rPr b="0" lang="bs-BA" sz="1600" strike="noStrike" u="none">
+                <a:solidFill>
+                  <a:srgbClr val="009bdd"/>
+                </a:solidFill>
+                <a:uFillTx/>
+                <a:latin typeface="Arial"/>
+              </a:rPr>
+              <a:t>To se pri pretprocesiranju zamjenjuje mnemonikama:</a:t>
+            </a:r>
+            <a:br>
+              <a:rPr sz="1600"/>
+            </a:br>
+            <a:r>
+              <a:rPr b="0" lang="bs-BA" sz="1600" strike="noStrike" u="none">
+                <a:solidFill>
+                  <a:srgbClr val="009bdd"/>
+                </a:solidFill>
+                <a:uFillTx/>
+                <a:latin typeface="Courier New"/>
+              </a:rPr>
+              <a:t>load s9, "H"</a:t>
+            </a:r>
+            <a:br>
+              <a:rPr sz="1600"/>
+            </a:br>
+            <a:r>
+              <a:rPr b="0" lang="bs-BA" sz="1600" strike="noStrike" u="none">
+                <a:solidFill>
+                  <a:srgbClr val="009bdd"/>
+                </a:solidFill>
+                <a:uFillTx/>
+                <a:latin typeface="Courier New"/>
+              </a:rPr>
+              <a:t>call UART_TX</a:t>
+            </a:r>
+            <a:br>
+              <a:rPr sz="1600"/>
+            </a:br>
+            <a:r>
+              <a:rPr b="0" lang="bs-BA" sz="1600" strike="noStrike" u="none">
+                <a:solidFill>
+                  <a:srgbClr val="009bdd"/>
+                </a:solidFill>
+                <a:uFillTx/>
+                <a:latin typeface="Courier New"/>
+              </a:rPr>
+              <a:t>load s9, "e"</a:t>
+            </a:r>
+            <a:br>
+              <a:rPr sz="1600"/>
+            </a:br>
+            <a:r>
+              <a:rPr b="0" lang="bs-BA" sz="1600" strike="noStrike" u="none">
+                <a:solidFill>
+                  <a:srgbClr val="009bdd"/>
+                </a:solidFill>
+                <a:uFillTx/>
+                <a:latin typeface="Courier New"/>
+              </a:rPr>
+              <a:t>call UART_TX</a:t>
+            </a:r>
+            <a:br>
+              <a:rPr sz="1600"/>
+            </a:br>
+            <a:r>
+              <a:rPr b="0" lang="bs-BA" sz="1600" strike="noStrike" u="none">
+                <a:solidFill>
+                  <a:srgbClr val="009bdd"/>
+                </a:solidFill>
+                <a:uFillTx/>
+                <a:latin typeface="Courier New"/>
+              </a:rPr>
+              <a:t>...</a:t>
+            </a:r>
+            <a:endParaRPr b="0" lang="bs-BA" sz="1600" strike="noStrike" u="none">
               <a:solidFill>
                 <a:srgbClr val="009bdd"/>
               </a:solidFill>
@@ -8309,6 +8287,106 @@
               <a:latin typeface="Arial"/>
             </a:endParaRPr>
           </a:p>
+          <a:p>
+            <a:pPr marL="432000" indent="-324000">
+              <a:spcBef>
+                <a:spcPts val="1060"/>
+              </a:spcBef>
+              <a:buClr>
+                <a:srgbClr val="77caee"/>
+              </a:buClr>
+              <a:buSzPct val="45000"/>
+              <a:buFont typeface="Wingdings" charset="2"/>
+              <a:buChar char=""/>
+            </a:pPr>
+            <a:r>
+              <a:rPr b="0" lang="bs-BA" sz="1600" strike="noStrike" u="none">
+                <a:solidFill>
+                  <a:srgbClr val="009bdd"/>
+                </a:solidFill>
+                <a:uFillTx/>
+                <a:latin typeface="Arial"/>
+              </a:rPr>
+              <a:t>To je skratilo kôd primjera “</a:t>
+            </a:r>
+            <a:r>
+              <a:rPr b="0" i="1" lang="bs-BA" sz="1600" strike="noStrike" u="none">
+                <a:solidFill>
+                  <a:srgbClr val="009bdd"/>
+                </a:solidFill>
+                <a:uFillTx/>
+                <a:latin typeface="Arial"/>
+              </a:rPr>
+              <a:t>Permutations Algorithm</a:t>
+            </a:r>
+            <a:r>
+              <a:rPr b="0" lang="bs-BA" sz="1600" strike="noStrike" u="none">
+                <a:solidFill>
+                  <a:srgbClr val="009bdd"/>
+                </a:solidFill>
+                <a:uFillTx/>
+                <a:latin typeface="Arial"/>
+              </a:rPr>
+              <a:t>” s preko 1000 redaka na manje od 400 redaka.</a:t>
+            </a:r>
+            <a:endParaRPr b="0" lang="bs-BA" sz="1600" strike="noStrike" u="none">
+              <a:solidFill>
+                <a:srgbClr val="009bdd"/>
+              </a:solidFill>
+              <a:uFillTx/>
+              <a:latin typeface="Arial"/>
+            </a:endParaRPr>
+          </a:p>
+          <a:p>
+            <a:pPr marL="432000" indent="-324000">
+              <a:spcBef>
+                <a:spcPts val="1060"/>
+              </a:spcBef>
+              <a:buClr>
+                <a:srgbClr val="77caee"/>
+              </a:buClr>
+              <a:buSzPct val="45000"/>
+              <a:buFont typeface="Wingdings" charset="2"/>
+              <a:buChar char=""/>
+            </a:pPr>
+            <a:r>
+              <a:rPr b="0" lang="bs-BA" sz="1600" strike="noStrike" u="none">
+                <a:solidFill>
+                  <a:srgbClr val="009bdd"/>
+                </a:solidFill>
+                <a:uFillTx/>
+                <a:latin typeface="Arial"/>
+              </a:rPr>
+              <a:t>Do verzije v5.3.2, breakpoint stavljen na </a:t>
+            </a:r>
+            <a:r>
+              <a:rPr b="0" lang="bs-BA" sz="1600" strike="noStrike" u="none">
+                <a:solidFill>
+                  <a:srgbClr val="009bdd"/>
+                </a:solidFill>
+                <a:uFillTx/>
+                <a:latin typeface="Courier New"/>
+              </a:rPr>
+              <a:t>print_string</a:t>
+            </a:r>
+            <a:r>
+              <a:rPr b="0" lang="bs-BA" sz="1600" strike="noStrike" u="none">
+                <a:solidFill>
+                  <a:srgbClr val="009bdd"/>
+                </a:solidFill>
+                <a:uFillTx/>
+                <a:latin typeface="Arial"/>
+              </a:rPr>
+              <a:t> okinuo bi se dva puta onoliko puta koliko ima znakova u stringu (za svaku mašinsku naredbu koja dolazi iz te asemblerske linije), ali to je ispravljeno. Sada se okine samo jednom.</a:t>
+            </a:r>
+            <a:endParaRPr b="0" lang="bs-BA" sz="1600" strike="noStrike" u="none">
+              <a:solidFill>
+                <a:srgbClr val="009bdd"/>
+              </a:solidFill>
+              <a:uFillTx/>
+              <a:latin typeface="Arial"/>
+            </a:endParaRPr>
+          </a:p>
         </p:txBody>
       </p:sp>
       <p:sp>
@@ -8325,7 +8403,7 @@
         <p:txBody>
           <a:bodyPr/>
           <a:p>
-            <a:fld id="{37B14621-F592-469B-AFA0-1F684E9D645E}" type="slidenum">
+            <a:fld id="{22D609E3-12D0-49D6-B9FA-1FEC8B89D60F}" type="slidenum">
               <a:t>25</a:t>
             </a:fld>
           </a:p>
@@ -8345,9 +8423,9 @@
         <p:txBody>
           <a:bodyPr/>
           <a:p>
-            <a:fld id="{A693237B-0E87-43F9-AEFE-D523F088599A}" type="datetime1">
+            <a:fld id="{4190EBA8-EAB5-454D-A776-6F77E10F75A8}" type="datetime1">
               <a:rPr lang="en-US"/>
-              <a:t>04/14/2025</a:t>
+              <a:t>04/24/2025</a:t>
             </a:fld>
           </a:p>
         </p:txBody>
@@ -8389,6 +8467,247 @@
             <a:spLocks noGrp="1"/>
           </p:cNvSpPr>
           <p:nvPr>
+            <p:ph type="title"/>
+          </p:nvPr>
+        </p:nvSpPr>
+        <p:spPr>
+          <a:xfrm>
+            <a:off x="360000" y="180000"/>
+            <a:ext cx="9360000" cy="478080"/>
+          </a:xfrm>
+          <a:prstGeom prst="rect">
+            <a:avLst/>
+          </a:prstGeom>
+          <a:noFill/>
+          <a:ln w="0">
+            <a:noFill/>
+          </a:ln>
+        </p:spPr>
+        <p:txBody>
+          <a:bodyPr lIns="0" rIns="0" tIns="0" bIns="0" anchor="ctr">
+            <a:noAutofit/>
+          </a:bodyPr>
+          <a:p>
+            <a:pPr indent="0" algn="ctr">
+              <a:buNone/>
+            </a:pPr>
+            <a:r>
+              <a:rPr b="0" lang="bs-BA" sz="3300" strike="noStrike" u="none">
+                <a:solidFill>
+                  <a:srgbClr val="ffffff"/>
+                </a:solidFill>
+                <a:uFillTx/>
+                <a:latin typeface="Arial"/>
+              </a:rPr>
+              <a:t>Bilješke o arhitekturi</a:t>
+            </a:r>
+            <a:endParaRPr b="0" lang="bs-BA" sz="3300" strike="noStrike" u="none">
+              <a:solidFill>
+                <a:srgbClr val="ffffff"/>
+              </a:solidFill>
+              <a:uFillTx/>
+              <a:latin typeface="Arial"/>
+            </a:endParaRPr>
+          </a:p>
+        </p:txBody>
+      </p:sp>
+      <p:sp>
+        <p:nvSpPr>
+          <p:cNvPr id="99" name="PlaceHolder 2"/>
+          <p:cNvSpPr>
+            <a:spLocks noGrp="1"/>
+          </p:cNvSpPr>
+          <p:nvPr>
+            <p:ph/>
+          </p:nvPr>
+        </p:nvSpPr>
+        <p:spPr>
+          <a:xfrm>
+            <a:off x="360000" y="1080000"/>
+            <a:ext cx="9360000" cy="3600000"/>
+          </a:xfrm>
+          <a:prstGeom prst="rect">
+            <a:avLst/>
+          </a:prstGeom>
+          <a:noFill/>
+          <a:ln w="0">
+            <a:noFill/>
+          </a:ln>
+        </p:spPr>
+        <p:txBody>
+          <a:bodyPr lIns="0" rIns="0" tIns="0" bIns="0" anchor="t">
+            <a:noAutofit/>
+          </a:bodyPr>
+          <a:p>
+            <a:pPr marL="432000" indent="-324000">
+              <a:spcBef>
+                <a:spcPts val="1060"/>
+              </a:spcBef>
+              <a:buClr>
+                <a:srgbClr val="77caee"/>
+              </a:buClr>
+              <a:buSzPct val="45000"/>
+              <a:buFont typeface="Wingdings" charset="2"/>
+              <a:buChar char=""/>
+            </a:pPr>
+            <a:r>
+              <a:rPr b="0" lang="bs-BA" sz="2400" strike="noStrike" u="none">
+                <a:solidFill>
+                  <a:srgbClr val="009bdd"/>
+                </a:solidFill>
+                <a:uFillTx/>
+                <a:latin typeface="Arial"/>
+              </a:rPr>
+              <a:t>Parseri većine asemblera pretvaraju tokenizirani asemblerski kod u dvodimenzionalno polje (tablicu) malih stabala (gdje su samo aritmetički izrazi stabla, a ostalo su pojedinačni čvorovi).</a:t>
+            </a:r>
+            <a:endParaRPr b="0" lang="bs-BA" sz="2400" strike="noStrike" u="none">
+              <a:solidFill>
+                <a:srgbClr val="009bdd"/>
+              </a:solidFill>
+              <a:uFillTx/>
+              <a:latin typeface="Arial"/>
+            </a:endParaRPr>
+          </a:p>
+          <a:p>
+            <a:pPr marL="432000" indent="-324000">
+              <a:spcBef>
+                <a:spcPts val="1060"/>
+              </a:spcBef>
+              <a:buClr>
+                <a:srgbClr val="77caee"/>
+              </a:buClr>
+              <a:buSzPct val="45000"/>
+              <a:buFont typeface="Wingdings" charset="2"/>
+              <a:buChar char=""/>
+            </a:pPr>
+            <a:r>
+              <a:rPr b="0" lang="bs-BA" sz="2400" strike="noStrike" u="none">
+                <a:solidFill>
+                  <a:srgbClr val="009bdd"/>
+                </a:solidFill>
+                <a:uFillTx/>
+                <a:latin typeface="Arial"/>
+              </a:rPr>
+              <a:t>Parser u ovom asembleru za PicoBlaze pretvara tokenizirani asemblerski kod u jedno veliko stablo. Korijen tog stabla je čvor s tekstom “assembly”, a čvorovi dubine 1 su mnemonike, pretprocesorske naredbe i labeli.</a:t>
+            </a:r>
+            <a:endParaRPr b="0" lang="bs-BA" sz="2400" strike="noStrike" u="none">
+              <a:solidFill>
+                <a:srgbClr val="009bdd"/>
+              </a:solidFill>
+              <a:uFillTx/>
+              <a:latin typeface="Arial"/>
+            </a:endParaRPr>
+          </a:p>
+          <a:p>
+            <a:pPr marL="432000" indent="-324000">
+              <a:spcBef>
+                <a:spcPts val="1060"/>
+              </a:spcBef>
+              <a:buClr>
+                <a:srgbClr val="77caee"/>
+              </a:buClr>
+              <a:buSzPct val="45000"/>
+              <a:buFont typeface="Wingdings" charset="2"/>
+              <a:buChar char=""/>
+            </a:pPr>
+            <a:r>
+              <a:rPr b="0" lang="bs-BA" sz="2400" strike="noStrike" u="none">
+                <a:solidFill>
+                  <a:srgbClr val="009bdd"/>
+                </a:solidFill>
+                <a:uFillTx/>
+                <a:latin typeface="Arial"/>
+              </a:rPr>
+              <a:t>Operandi mnemonika i pretprocesorskih naredbi njihova su djeca.</a:t>
+            </a:r>
+            <a:endParaRPr b="0" lang="bs-BA" sz="2400" strike="noStrike" u="none">
+              <a:solidFill>
+                <a:srgbClr val="009bdd"/>
+              </a:solidFill>
+              <a:uFillTx/>
+              <a:latin typeface="Arial"/>
+            </a:endParaRPr>
+          </a:p>
+        </p:txBody>
+      </p:sp>
+      <p:sp>
+        <p:nvSpPr>
+          <p:cNvPr id="4" name="PlaceHolder 3"/>
+          <p:cNvSpPr>
+            <a:spLocks noGrp="1"/>
+          </p:cNvSpPr>
+          <p:nvPr>
+            <p:ph type="sldNum" idx="6"/>
+          </p:nvPr>
+        </p:nvSpPr>
+        <p:spPr/>
+        <p:txBody>
+          <a:bodyPr/>
+          <a:p>
+            <a:fld id="{AE519DE6-C00E-469F-8F90-88515A23F4A7}" type="slidenum">
+              <a:t>26</a:t>
+            </a:fld>
+          </a:p>
+        </p:txBody>
+      </p:sp>
+      <p:sp>
+        <p:nvSpPr>
+          <p:cNvPr id="5" name="PlaceHolder 4"/>
+          <p:cNvSpPr>
+            <a:spLocks noGrp="1"/>
+          </p:cNvSpPr>
+          <p:nvPr>
+            <p:ph type="dt" idx="4"/>
+          </p:nvPr>
+        </p:nvSpPr>
+        <p:spPr/>
+        <p:txBody>
+          <a:bodyPr/>
+          <a:p>
+            <a:fld id="{FC5232A8-EC8E-4F9B-9693-52585965E495}" type="datetime1">
+              <a:rPr lang="en-US"/>
+              <a:t>04/24/2025</a:t>
+            </a:fld>
+          </a:p>
+        </p:txBody>
+      </p:sp>
+    </p:spTree>
+  </p:cSld>
+  <mc:AlternateContent>
+    <mc:Choice Requires="p14">
+      <p:transition spd="slow" p14:dur="2000"/>
+    </mc:Choice>
+    <mc:Fallback>
+      <p:transition spd="slow"/>
+    </mc:Fallback>
+  </mc:AlternateContent>
+</p:sld>
+</file>
+
+<file path=ppt/slides/slide27.xml><?xml version="1.0" encoding="utf-8"?>
+<p:sld xmlns:a="http://schemas.openxmlformats.org/drawingml/2006/main" xmlns:p="http://schemas.openxmlformats.org/presentationml/2006/main" xmlns:r="http://schemas.openxmlformats.org/officeDocument/2006/relationships" xmlns:p14="http://schemas.microsoft.com/office/powerpoint/2010/main" xmlns:p15="http://schemas.microsoft.com/office/powerpoint/2012/main" xmlns:mc="http://schemas.openxmlformats.org/markup-compatibility/2006">
+  <p:cSld>
+    <p:spTree>
+      <p:nvGrpSpPr>
+        <p:cNvPr id="1" name=""/>
+        <p:cNvGrpSpPr/>
+        <p:nvPr/>
+      </p:nvGrpSpPr>
+      <p:grpSpPr>
+        <a:xfrm>
+          <a:off x="0" y="0"/>
+          <a:ext cx="0" cy="0"/>
+          <a:chOff x="0" y="0"/>
+          <a:chExt cx="0" cy="0"/>
+        </a:xfrm>
+      </p:grpSpPr>
+      <p:sp>
+        <p:nvSpPr>
+          <p:cNvPr id="100" name="PlaceHolder 1"/>
+          <p:cNvSpPr>
+            <a:spLocks noGrp="1"/>
+          </p:cNvSpPr>
+          <p:nvPr>
             <p:ph type="subTitle"/>
           </p:nvPr>
         </p:nvSpPr>
@@ -8451,8 +8770,8 @@
         <p:txBody>
           <a:bodyPr/>
           <a:p>
-            <a:fld id="{76A0B4E9-194D-4443-BED9-AA984C7844D2}" type="slidenum">
-              <a:t>26</a:t>
+            <a:fld id="{5DF8B02D-BA1B-4388-93E1-7FA354C9FCAB}" type="slidenum">
+              <a:t>27</a:t>
             </a:fld>
           </a:p>
         </p:txBody>
@@ -8471,9 +8790,9 @@
         <p:txBody>
           <a:bodyPr/>
           <a:p>
-            <a:fld id="{38A98F13-64DC-46B4-BA14-ADBE8CC25A5C}" type="datetime1">
+            <a:fld id="{04AA948F-7DFB-4847-91AF-23BA90ADE39F}" type="datetime1">
               <a:rPr lang="en-US"/>
-              <a:t>04/14/2025</a:t>
+              <a:t>04/24/2025</a:t>
             </a:fld>
           </a:p>
         </p:txBody>
@@ -8761,7 +9080,7 @@
         <p:txBody>
           <a:bodyPr/>
           <a:p>
-            <a:fld id="{F197331F-229E-478F-A133-0B86D13C0CD6}" type="slidenum">
+            <a:fld id="{5089E5A5-40BE-4E1F-9747-EB9AD39CEF76}" type="slidenum">
               <a:t>3</a:t>
             </a:fld>
           </a:p>
@@ -8781,9 +9100,9 @@
         <p:txBody>
           <a:bodyPr/>
           <a:p>
-            <a:fld id="{B4CB9961-DA3D-4794-9B04-9D9DFB9966BE}" type="datetime1">
+            <a:fld id="{7C85F88F-FD4A-47DD-A344-5EEEA292202B}" type="datetime1">
               <a:rPr lang="en-US"/>
-              <a:t>04/14/2025</a:t>
+              <a:t>04/24/2025</a:t>
             </a:fld>
           </a:p>
         </p:txBody>
@@ -9020,7 +9339,7 @@
         <p:txBody>
           <a:bodyPr/>
           <a:p>
-            <a:fld id="{DD798874-AC8B-4865-8504-C7268C7BFF17}" type="slidenum">
+            <a:fld id="{982FBB3D-7CDC-4DFF-8D38-B924C48A4D3E}" type="slidenum">
               <a:t>4</a:t>
             </a:fld>
           </a:p>
@@ -9040,9 +9359,9 @@
         <p:txBody>
           <a:bodyPr/>
           <a:p>
-            <a:fld id="{BA1D8CD8-E5DC-41CD-946B-3EB4218F01B0}" type="datetime1">
+            <a:fld id="{0B0E1574-EA98-4451-B802-B7D8B99691F4}" type="datetime1">
               <a:rPr lang="en-US"/>
-              <a:t>04/14/2025</a:t>
+              <a:t>04/24/2025</a:t>
             </a:fld>
           </a:p>
         </p:txBody>
@@ -9292,7 +9611,7 @@
         <p:txBody>
           <a:bodyPr/>
           <a:p>
-            <a:fld id="{B6AA6121-BCA6-424E-819B-8A78C988DBC1}" type="slidenum">
+            <a:fld id="{EE207EC5-3E7B-489E-B4A0-3AE822957D22}" type="slidenum">
               <a:t>5</a:t>
             </a:fld>
           </a:p>
@@ -9312,9 +9631,9 @@
         <p:txBody>
           <a:bodyPr/>
           <a:p>
-            <a:fld id="{42EE19DE-AD3B-425C-82B9-27860C0CC8BA}" type="datetime1">
+            <a:fld id="{E4FA6BB6-5302-4686-B56E-1E2332AFE03D}" type="datetime1">
               <a:rPr lang="en-US"/>
-              <a:t>04/14/2025</a:t>
+              <a:t>04/24/2025</a:t>
             </a:fld>
           </a:p>
         </p:txBody>
@@ -9677,7 +9996,7 @@
         <p:txBody>
           <a:bodyPr/>
           <a:p>
-            <a:fld id="{006DDC93-F8EB-4FC7-89E0-D4CCDB21B90E}" type="slidenum">
+            <a:fld id="{F929DE0C-6DF3-4130-ADFE-5697DD7E2B5C}" type="slidenum">
               <a:t>6</a:t>
             </a:fld>
           </a:p>
@@ -9697,9 +10016,9 @@
         <p:txBody>
           <a:bodyPr/>
           <a:p>
-            <a:fld id="{EF259B5C-12F5-4947-9C77-132F1B71EC42}" type="datetime1">
+            <a:fld id="{EDAE2739-B780-461A-91D4-84AB05C87B4E}" type="datetime1">
               <a:rPr lang="en-US"/>
-              <a:t>04/14/2025</a:t>
+              <a:t>04/24/2025</a:t>
             </a:fld>
           </a:p>
         </p:txBody>
@@ -10019,7 +10338,7 @@
         <p:txBody>
           <a:bodyPr/>
           <a:p>
-            <a:fld id="{CC9FCDB5-2F92-4F02-A0E6-2FC3901DCF7F}" type="slidenum">
+            <a:fld id="{AF3348A4-CC6F-40C9-A706-3717B9253A02}" type="slidenum">
               <a:t>7</a:t>
             </a:fld>
           </a:p>
@@ -10039,9 +10358,9 @@
         <p:txBody>
           <a:bodyPr/>
           <a:p>
-            <a:fld id="{FA8B0B4B-12A0-4D81-A781-BB2FFFDDCB6C}" type="datetime1">
+            <a:fld id="{0E283400-DA16-47D1-9FF7-E02652B07081}" type="datetime1">
               <a:rPr lang="en-US"/>
-              <a:t>04/14/2025</a:t>
+              <a:t>04/24/2025</a:t>
             </a:fld>
           </a:p>
         </p:txBody>
@@ -10224,7 +10543,7 @@
         <p:txBody>
           <a:bodyPr/>
           <a:p>
-            <a:fld id="{0117BD11-FD4C-4C38-AF21-4BD48308AF8F}" type="slidenum">
+            <a:fld id="{5449F3B8-1B4D-4C69-B631-39146AD558AF}" type="slidenum">
               <a:t>8</a:t>
             </a:fld>
           </a:p>
@@ -10244,9 +10563,9 @@
         <p:txBody>
           <a:bodyPr/>
           <a:p>
-            <a:fld id="{7E939549-D20E-46F1-927F-38A3CCCB5824}" type="datetime1">
+            <a:fld id="{10ADB127-6428-45EA-8D48-2B2B3B8D4267}" type="datetime1">
               <a:rPr lang="en-US"/>
-              <a:t>04/14/2025</a:t>
+              <a:t>04/24/2025</a:t>
             </a:fld>
           </a:p>
         </p:txBody>
@@ -10320,7 +10639,7 @@
                 <a:uFillTx/>
                 <a:latin typeface="Arial"/>
               </a:rPr>
-              <a:t>Kako se koristi...</a:t>
+              <a:t>Levenshtainova distanca nije bez bugova</a:t>
             </a:r>
             <a:endParaRPr b="0" lang="bs-BA" sz="3300" strike="noStrike" u="none">
               <a:solidFill>
@@ -10344,8 +10663,8 @@
         </p:nvSpPr>
         <p:spPr>
           <a:xfrm>
-            <a:off x="5155920" y="1080000"/>
-            <a:ext cx="4567320" cy="3600000"/>
+            <a:off x="360000" y="1080000"/>
+            <a:ext cx="9360000" cy="3600000"/>
           </a:xfrm>
           <a:prstGeom prst="rect">
             <a:avLst/>
@@ -10379,7 +10698,7 @@
                 <a:uFillTx/>
                 <a:latin typeface="Arial"/>
               </a:rPr>
-              <a:t>Onda, možemo, recimo, kliknuti na Fast Forward...</a:t>
+              <a:t>Zbog načina na koji je asembler internalno strukturiran, Levenshtainova distanca za sugeriranje krivo napisanih imena registara iznosi 1, dok za labele i konstante nije ograničena.</a:t>
             </a:r>
             <a:endParaRPr b="0" lang="bs-BA" sz="2400" strike="noStrike" u="none">
               <a:solidFill>
@@ -10389,68 +10708,31 @@
               <a:latin typeface="Arial"/>
             </a:endParaRPr>
           </a:p>
-        </p:txBody>
-      </p:sp>
-      <p:pic>
-        <p:nvPicPr>
-          <p:cNvPr id="50" name="" descr=""/>
-          <p:cNvPicPr/>
-          <p:nvPr/>
-        </p:nvPicPr>
-        <p:blipFill>
-          <a:blip r:embed="rId1"/>
-          <a:stretch/>
-        </p:blipFill>
-        <p:spPr>
-          <a:xfrm>
-            <a:off x="228600" y="1143000"/>
-            <a:ext cx="4625280" cy="2437920"/>
-          </a:xfrm>
-          <a:prstGeom prst="rect">
-            <a:avLst/>
-          </a:prstGeom>
-          <a:noFill/>
-          <a:ln w="18000">
-            <a:noFill/>
-          </a:ln>
-        </p:spPr>
-      </p:pic>
-      <p:sp>
-        <p:nvSpPr>
-          <p:cNvPr id="51" name=""/>
-          <p:cNvSpPr/>
-          <p:nvPr/>
-        </p:nvSpPr>
-        <p:spPr>
-          <a:xfrm>
-            <a:off x="2057400" y="1143000"/>
-            <a:ext cx="457200" cy="457200"/>
-          </a:xfrm>
-          <a:prstGeom prst="ellipse">
-            <a:avLst/>
-          </a:prstGeom>
-          <a:noFill/>
-          <a:ln w="18000">
-            <a:solidFill>
-              <a:srgbClr val="009bdd"/>
-            </a:solidFill>
-            <a:round/>
-          </a:ln>
-        </p:spPr>
-        <p:style>
-          <a:lnRef idx="0"/>
-          <a:fillRef idx="0"/>
-          <a:effectRef idx="0"/>
-          <a:fontRef idx="minor"/>
-        </p:style>
-        <p:txBody>
-          <a:bodyPr wrap="none" lIns="90000" rIns="90000" tIns="45000" bIns="45000" anchor="ctr">
-            <a:noAutofit/>
-          </a:bodyPr>
-          <a:p>
-            <a:endParaRPr b="0" lang="bs-BA" sz="1800" strike="noStrike" u="none">
-              <a:solidFill>
-                <a:srgbClr val="000000"/>
+          <a:p>
+            <a:pPr marL="432000" indent="-324000">
+              <a:spcBef>
+                <a:spcPts val="1060"/>
+              </a:spcBef>
+              <a:buClr>
+                <a:srgbClr val="77caee"/>
+              </a:buClr>
+              <a:buSzPct val="45000"/>
+              <a:buFont typeface="Wingdings" charset="2"/>
+              <a:buChar char=""/>
+            </a:pPr>
+            <a:r>
+              <a:rPr b="0" lang="bs-BA" sz="2400" strike="noStrike" u="none">
+                <a:solidFill>
+                  <a:srgbClr val="009bdd"/>
+                </a:solidFill>
+                <a:uFillTx/>
+                <a:latin typeface="Arial"/>
+              </a:rPr>
+              <a:t>To je zato što asembler za neke tokene (recimo, za drugi operand naredbe load) ne može unaprijed znati predstavljaju li oni registar ili predstavljaju neki aritmetički izraz. Asembler mora moći pretpostaviti da nekada to nije registar, pa, ako nema nijednog namerega koji je od tog tokena udaljen za manje od 2 Levenshtainova znaka, to se čini kao razumna pretpostavka.</a:t>
+            </a:r>
+            <a:endParaRPr b="0" lang="bs-BA" sz="2400" strike="noStrike" u="none">
+              <a:solidFill>
+                <a:srgbClr val="009bdd"/>
               </a:solidFill>
               <a:uFillTx/>
               <a:latin typeface="Arial"/>
@@ -10472,7 +10754,7 @@
         <p:txBody>
           <a:bodyPr/>
           <a:p>
-            <a:fld id="{BF7490EC-C677-4688-8AAD-25C85449155B}" type="slidenum">
+            <a:fld id="{14B1F993-8B8A-4D59-9608-8EF1EECEA9EB}" type="slidenum">
               <a:t>9</a:t>
             </a:fld>
           </a:p>
@@ -10492,9 +10774,9 @@
         <p:txBody>
           <a:bodyPr/>
           <a:p>
-            <a:fld id="{4C6CC586-6DB0-4024-8604-D39051E2156E}" type="datetime1">
+            <a:fld id="{6FF02CBE-7BEB-4237-943C-AE539E85F4EB}" type="datetime1">
               <a:rPr lang="en-US"/>
-              <a:t>04/14/2025</a:t>
+              <a:t>04/24/2025</a:t>
             </a:fld>
           </a:p>
         </p:txBody>

</xml_diff>

<commit_message>
Added a few more notes into the documentation
</commit_message>
<xml_diff>
--- a/seminar/PicoBlaze.pptx
+++ b/seminar/PicoBlaze.pptx
@@ -33,6 +33,7 @@
     <p:sldId id="280" r:id="rId28"/>
     <p:sldId id="281" r:id="rId29"/>
     <p:sldId id="282" r:id="rId30"/>
+    <p:sldId id="283" r:id="rId31"/>
   </p:sldIdLst>
   <p:sldSz cx="10080625" cy="5670550"/>
   <p:notesSz cx="7559675" cy="10691813"/>
@@ -90,7 +91,7 @@
         <p:txBody>
           <a:bodyPr/>
           <a:p>
-            <a:fld id="{A68D2104-CBA5-4A5B-9B29-03DA11C809C0}" type="slidenum">
+            <a:fld id="{85A1C0E7-7E79-4777-AC3C-976905A7C3C2}" type="slidenum">
               <a:t>&lt;#&gt;</a:t>
             </a:fld>
           </a:p>
@@ -258,7 +259,7 @@
         <p:txBody>
           <a:bodyPr/>
           <a:p>
-            <a:fld id="{BFEB588A-D9C4-4A43-9E2D-4523CC501842}" type="slidenum">
+            <a:fld id="{CB0B99B3-9D4B-4227-ACDA-6F23A47F3CA1}" type="slidenum">
               <a:t>&lt;#&gt;</a:t>
             </a:fld>
           </a:p>
@@ -514,7 +515,7 @@
         <p:txBody>
           <a:bodyPr/>
           <a:p>
-            <a:fld id="{83F64741-65E6-44CA-8E9B-44C846FA9C60}" type="slidenum">
+            <a:fld id="{C895A95F-1C2F-44B4-9C23-273F2AE7C317}" type="slidenum">
               <a:t>&lt;#&gt;</a:t>
             </a:fld>
           </a:p>
@@ -726,7 +727,7 @@
         <p:txBody>
           <a:bodyPr/>
           <a:p>
-            <a:fld id="{C803A318-1FFE-454C-A479-3F75CE1774D6}" type="slidenum">
+            <a:fld id="{98F0D896-52BC-4B0F-B59B-B2D12F0A6C79}" type="slidenum">
               <a:t>&lt;#&gt;</a:t>
             </a:fld>
           </a:p>
@@ -809,7 +810,7 @@
         <p:txBody>
           <a:bodyPr/>
           <a:p>
-            <a:fld id="{043DF49D-AB25-46C2-84B4-6F60DEAB6F94}" type="slidenum">
+            <a:fld id="{D361D98B-EC58-462A-921E-10DB5041151A}" type="slidenum">
               <a:t>&lt;#&gt;</a:t>
             </a:fld>
           </a:p>
@@ -1750,7 +1751,7 @@
             <a:pPr indent="0" algn="r">
               <a:buNone/>
             </a:pPr>
-            <a:fld id="{236A35E3-EA54-4F99-A363-3AAC159B1AC0}" type="slidenum">
+            <a:fld id="{6E1B8AB8-FE18-4E6C-B8CB-9E011A63BD9C}" type="slidenum">
               <a:rPr b="0" lang="bs-BA" sz="1400" strike="noStrike" u="none">
                 <a:solidFill>
                   <a:srgbClr val="ffffff"/>
@@ -3121,7 +3122,7 @@
             <a:pPr indent="0" algn="r">
               <a:buNone/>
             </a:pPr>
-            <a:fld id="{325FB19B-67C8-4DF0-8CE3-A55007238E8B}" type="slidenum">
+            <a:fld id="{6648ADE1-A55F-4048-8FEB-FB7E2FA6B3D6}" type="slidenum">
               <a:rPr b="0" lang="bs-BA" sz="1400" strike="noStrike" u="none">
                 <a:solidFill>
                   <a:srgbClr val="ffffff"/>
@@ -3496,7 +3497,7 @@
         <p:txBody>
           <a:bodyPr/>
           <a:p>
-            <a:fld id="{EF4F7845-9D1C-422F-9DF5-9AB6F543A320}" type="slidenum">
+            <a:fld id="{7F7D54EF-F799-4AB1-A727-F43AD9BE7D6F}" type="slidenum">
               <a:t>10</a:t>
             </a:fld>
           </a:p>
@@ -3516,9 +3517,9 @@
         <p:txBody>
           <a:bodyPr/>
           <a:p>
-            <a:fld id="{28F21E9A-B3C8-4047-B69F-EA697C0B6184}" type="datetime1">
+            <a:fld id="{2D416A0E-6350-4003-A3A5-6CAD2E311248}" type="datetime1">
               <a:rPr lang="en-US"/>
-              <a:t>04/24/2025</a:t>
+              <a:t>04/28/2025</a:t>
             </a:fld>
           </a:p>
         </p:txBody>
@@ -3584,16 +3585,6 @@
             <a:pPr indent="0" algn="ctr">
               <a:buNone/>
             </a:pPr>
-            <a:r>
-              <a:rPr b="0" lang="bs-BA" sz="3300" strike="noStrike" u="none">
-                <a:solidFill>
-                  <a:srgbClr val="ffffff"/>
-                </a:solidFill>
-                <a:uFillTx/>
-                <a:latin typeface="Arial"/>
-              </a:rPr>
-              <a:t>Kako se koristi...</a:t>
-            </a:r>
             <a:endParaRPr b="0" lang="bs-BA" sz="3300" strike="noStrike" u="none">
               <a:solidFill>
                 <a:srgbClr val="ffffff"/>
@@ -3607,6 +3598,50 @@
       <p:sp>
         <p:nvSpPr>
           <p:cNvPr id="55" name="PlaceHolder 2"/>
+          <p:cNvSpPr>
+            <a:spLocks noGrp="1"/>
+          </p:cNvSpPr>
+          <p:nvPr>
+            <p:ph/>
+          </p:nvPr>
+        </p:nvSpPr>
+        <p:spPr>
+          <a:xfrm>
+            <a:off x="360000" y="1080000"/>
+            <a:ext cx="4567320" cy="3600000"/>
+          </a:xfrm>
+          <a:prstGeom prst="rect">
+            <a:avLst/>
+          </a:prstGeom>
+          <a:noFill/>
+          <a:ln w="0">
+            <a:noFill/>
+          </a:ln>
+        </p:spPr>
+        <p:txBody>
+          <a:bodyPr lIns="0" rIns="0" tIns="0" bIns="0" anchor="t">
+            <a:noAutofit/>
+          </a:bodyPr>
+          <a:p>
+            <a:pPr indent="0">
+              <a:spcBef>
+                <a:spcPts val="1060"/>
+              </a:spcBef>
+              <a:buNone/>
+            </a:pPr>
+            <a:endParaRPr b="0" lang="bs-BA" sz="2400" strike="noStrike" u="none">
+              <a:solidFill>
+                <a:srgbClr val="009bdd"/>
+              </a:solidFill>
+              <a:uFillTx/>
+              <a:latin typeface="Arial"/>
+            </a:endParaRPr>
+          </a:p>
+        </p:txBody>
+      </p:sp>
+      <p:sp>
+        <p:nvSpPr>
+          <p:cNvPr id="56" name="PlaceHolder 3"/>
           <p:cNvSpPr>
             <a:spLocks noGrp="1"/>
           </p:cNvSpPr>
@@ -3632,27 +3667,12 @@
             <a:noAutofit/>
           </a:bodyPr>
           <a:p>
-            <a:pPr marL="432000" indent="-324000">
+            <a:pPr indent="0">
               <a:spcBef>
                 <a:spcPts val="1060"/>
               </a:spcBef>
-              <a:buClr>
-                <a:srgbClr val="77caee"/>
-              </a:buClr>
-              <a:buSzPct val="45000"/>
-              <a:buFont typeface="Wingdings" charset="2"/>
-              <a:buChar char=""/>
-            </a:pPr>
-            <a:r>
-              <a:rPr b="0" lang="bs-BA" sz="2400" strike="noStrike" u="none">
-                <a:solidFill>
-                  <a:srgbClr val="009bdd"/>
-                </a:solidFill>
-                <a:uFillTx/>
-                <a:latin typeface="Arial"/>
-              </a:rPr>
-              <a:t>Da bismo komunicirali s programima kao što je “Binary to Decimal” (prvi primjer u flexboxu “Examples” s lijeva), možemo koristiti SVG-ove generirane u JavaScriptu, koji predstavljaju switcheve, LED-ice i sedam-segmentne pokaznike.</a:t>
-            </a:r>
+              <a:buNone/>
+            </a:pPr>
             <a:endParaRPr b="0" lang="bs-BA" sz="2400" strike="noStrike" u="none">
               <a:solidFill>
                 <a:srgbClr val="009bdd"/>
@@ -3663,33 +3683,9 @@
           </a:p>
         </p:txBody>
       </p:sp>
-      <p:pic>
-        <p:nvPicPr>
-          <p:cNvPr id="56" name="" descr=""/>
-          <p:cNvPicPr/>
-          <p:nvPr/>
-        </p:nvPicPr>
-        <p:blipFill>
-          <a:blip r:embed="rId1"/>
-          <a:stretch/>
-        </p:blipFill>
-        <p:spPr>
-          <a:xfrm>
-            <a:off x="335520" y="1143000"/>
-            <a:ext cx="4693680" cy="1958040"/>
-          </a:xfrm>
-          <a:prstGeom prst="rect">
-            <a:avLst/>
-          </a:prstGeom>
-          <a:noFill/>
-          <a:ln w="18000">
-            <a:noFill/>
-          </a:ln>
-        </p:spPr>
-      </p:pic>
-      <p:sp>
-        <p:nvSpPr>
-          <p:cNvPr id="4" name="PlaceHolder 3"/>
+      <p:sp>
+        <p:nvSpPr>
+          <p:cNvPr id="5" name="PlaceHolder 4"/>
           <p:cNvSpPr>
             <a:spLocks noGrp="1"/>
           </p:cNvSpPr>
@@ -3701,7 +3697,7 @@
         <p:txBody>
           <a:bodyPr/>
           <a:p>
-            <a:fld id="{30CD37D7-CDF1-444F-BDF8-3AE69120586C}" type="slidenum">
+            <a:fld id="{40499904-E940-4EAD-BB9D-B341A159B98A}" type="slidenum">
               <a:t>11</a:t>
             </a:fld>
           </a:p>
@@ -3709,7 +3705,7 @@
       </p:sp>
       <p:sp>
         <p:nvSpPr>
-          <p:cNvPr id="5" name="PlaceHolder 4"/>
+          <p:cNvPr id="6" name="PlaceHolder 5"/>
           <p:cNvSpPr>
             <a:spLocks noGrp="1"/>
           </p:cNvSpPr>
@@ -3721,9 +3717,9 @@
         <p:txBody>
           <a:bodyPr/>
           <a:p>
-            <a:fld id="{EC52B1EA-D0B5-4713-A2FD-22429311FE2B}" type="datetime1">
+            <a:fld id="{5E396626-E111-4BC0-A7AB-6CB73C742087}" type="datetime1">
               <a:rPr lang="en-US"/>
-              <a:t>04/24/2025</a:t>
+              <a:t>04/28/2025</a:t>
             </a:fld>
           </a:p>
         </p:txBody>
@@ -3856,107 +3852,7 @@
                 <a:uFillTx/>
                 <a:latin typeface="Arial"/>
               </a:rPr>
-              <a:t>Ako želimo, možemo dodati i breakpointse na koje će emulacija pauzirati.</a:t>
-            </a:r>
-            <a:endParaRPr b="0" lang="bs-BA" sz="2400" strike="noStrike" u="none">
-              <a:solidFill>
-                <a:srgbClr val="009bdd"/>
-              </a:solidFill>
-              <a:uFillTx/>
-              <a:latin typeface="Arial"/>
-            </a:endParaRPr>
-          </a:p>
-          <a:p>
-            <a:pPr marL="432000" indent="-324000">
-              <a:spcBef>
-                <a:spcPts val="1060"/>
-              </a:spcBef>
-              <a:buClr>
-                <a:srgbClr val="77caee"/>
-              </a:buClr>
-              <a:buSzPct val="45000"/>
-              <a:buFont typeface="Wingdings" charset="2"/>
-              <a:buChar char=""/>
-            </a:pPr>
-            <a:r>
-              <a:rPr b="0" lang="bs-BA" sz="2400" strike="noStrike" u="none">
-                <a:solidFill>
-                  <a:srgbClr val="009bdd"/>
-                </a:solidFill>
-                <a:uFillTx/>
-                <a:latin typeface="Arial"/>
-              </a:rPr>
-              <a:t>Tu sam mogućnost dodao na prijedlog profesora Tomislava Matića mlađeg.</a:t>
-            </a:r>
-            <a:endParaRPr b="0" lang="bs-BA" sz="2400" strike="noStrike" u="none">
-              <a:solidFill>
-                <a:srgbClr val="009bdd"/>
-              </a:solidFill>
-              <a:uFillTx/>
-              <a:latin typeface="Arial"/>
-            </a:endParaRPr>
-          </a:p>
-          <a:p>
-            <a:pPr marL="432000" indent="-324000">
-              <a:spcBef>
-                <a:spcPts val="1060"/>
-              </a:spcBef>
-              <a:buClr>
-                <a:srgbClr val="77caee"/>
-              </a:buClr>
-              <a:buSzPct val="45000"/>
-              <a:buFont typeface="Wingdings" charset="2"/>
-              <a:buChar char=""/>
-            </a:pPr>
-            <a:r>
-              <a:rPr b="0" lang="bs-BA" sz="2400" strike="noStrike" u="none">
-                <a:solidFill>
-                  <a:srgbClr val="009bdd"/>
-                </a:solidFill>
-                <a:uFillTx/>
-                <a:latin typeface="Arial"/>
-              </a:rPr>
-              <a:t>Postoje samo </a:t>
-            </a:r>
-            <a:r>
-              <a:rPr b="0" i="1" lang="bs-BA" sz="2400" strike="noStrike" u="none">
-                <a:solidFill>
-                  <a:srgbClr val="009bdd"/>
-                </a:solidFill>
-                <a:uFillTx/>
-                <a:latin typeface="Arial"/>
-              </a:rPr>
-              <a:t>permanent</a:t>
-            </a:r>
-            <a:r>
-              <a:rPr b="0" lang="bs-BA" sz="2400" strike="noStrike" u="none">
-                <a:solidFill>
-                  <a:srgbClr val="009bdd"/>
-                </a:solidFill>
-                <a:uFillTx/>
-                <a:latin typeface="Arial"/>
-              </a:rPr>
-              <a:t> breakpointsi, ne i </a:t>
-            </a:r>
-            <a:r>
-              <a:rPr b="0" i="1" lang="bs-BA" sz="2400" strike="noStrike" u="none">
-                <a:solidFill>
-                  <a:srgbClr val="009bdd"/>
-                </a:solidFill>
-                <a:uFillTx/>
-                <a:latin typeface="Arial"/>
-              </a:rPr>
-              <a:t>temporary</a:t>
-            </a:r>
-            <a:r>
-              <a:rPr b="0" lang="bs-BA" sz="2400" strike="noStrike" u="none">
-                <a:solidFill>
-                  <a:srgbClr val="009bdd"/>
-                </a:solidFill>
-                <a:uFillTx/>
-                <a:latin typeface="Arial"/>
-              </a:rPr>
-              <a:t>.</a:t>
+              <a:t>Da bismo komunicirali s programima kao što je “Binary to Decimal” (prvi primjer u flexboxu “Examples” s lijeva), možemo koristiti SVG-ove generirane u JavaScriptu, koji predstavljaju switcheve, LED-ice i sedam-segmentne pokaznike.</a:t>
             </a:r>
             <a:endParaRPr b="0" lang="bs-BA" sz="2400" strike="noStrike" u="none">
               <a:solidFill>
@@ -3980,8 +3876,8 @@
         </p:blipFill>
         <p:spPr>
           <a:xfrm>
-            <a:off x="228600" y="1013760"/>
-            <a:ext cx="4739400" cy="3786840"/>
+            <a:off x="335520" y="1143000"/>
+            <a:ext cx="4693680" cy="1958040"/>
           </a:xfrm>
           <a:prstGeom prst="rect">
             <a:avLst/>
@@ -3994,49 +3890,6 @@
       </p:pic>
       <p:sp>
         <p:nvSpPr>
-          <p:cNvPr id="60" name=""/>
-          <p:cNvSpPr/>
-          <p:nvPr/>
-        </p:nvSpPr>
-        <p:spPr>
-          <a:xfrm>
-            <a:off x="228600" y="4114800"/>
-            <a:ext cx="685800" cy="228600"/>
-          </a:xfrm>
-          <a:prstGeom prst="ellipse">
-            <a:avLst/>
-          </a:prstGeom>
-          <a:noFill/>
-          <a:ln w="18000">
-            <a:solidFill>
-              <a:srgbClr val="009bdd"/>
-            </a:solidFill>
-            <a:round/>
-          </a:ln>
-        </p:spPr>
-        <p:style>
-          <a:lnRef idx="0"/>
-          <a:fillRef idx="0"/>
-          <a:effectRef idx="0"/>
-          <a:fontRef idx="minor"/>
-        </p:style>
-        <p:txBody>
-          <a:bodyPr wrap="none" lIns="90000" rIns="90000" tIns="45000" bIns="45000" anchor="ctr">
-            <a:noAutofit/>
-          </a:bodyPr>
-          <a:p>
-            <a:endParaRPr b="0" lang="bs-BA" sz="1800" strike="noStrike" u="none">
-              <a:solidFill>
-                <a:srgbClr val="000000"/>
-              </a:solidFill>
-              <a:uFillTx/>
-              <a:latin typeface="Arial"/>
-            </a:endParaRPr>
-          </a:p>
-        </p:txBody>
-      </p:sp>
-      <p:sp>
-        <p:nvSpPr>
           <p:cNvPr id="4" name="PlaceHolder 3"/>
           <p:cNvSpPr>
             <a:spLocks noGrp="1"/>
@@ -4049,7 +3902,7 @@
         <p:txBody>
           <a:bodyPr/>
           <a:p>
-            <a:fld id="{AE8633DE-CBC2-4D9C-A29B-152ADE5F9F40}" type="slidenum">
+            <a:fld id="{560300AF-FEE2-4E7A-8009-211B57C2D080}" type="slidenum">
               <a:t>12</a:t>
             </a:fld>
           </a:p>
@@ -4069,9 +3922,9 @@
         <p:txBody>
           <a:bodyPr/>
           <a:p>
-            <a:fld id="{EDB61A03-A40B-4879-8237-FA285383F943}" type="datetime1">
+            <a:fld id="{DDA00927-ADBE-4EC0-BC83-F03DB1E8F27A}" type="datetime1">
               <a:rPr lang="en-US"/>
-              <a:t>04/24/2025</a:t>
+              <a:t>04/28/2025</a:t>
             </a:fld>
           </a:p>
         </p:txBody>
@@ -4108,7 +3961,7 @@
       </p:grpSpPr>
       <p:sp>
         <p:nvSpPr>
-          <p:cNvPr id="61" name="PlaceHolder 1"/>
+          <p:cNvPr id="60" name="PlaceHolder 1"/>
           <p:cNvSpPr>
             <a:spLocks noGrp="1"/>
           </p:cNvSpPr>
@@ -4159,7 +4012,7 @@
       </p:sp>
       <p:sp>
         <p:nvSpPr>
-          <p:cNvPr id="62" name="PlaceHolder 2"/>
+          <p:cNvPr id="61" name="PlaceHolder 2"/>
           <p:cNvSpPr>
             <a:spLocks noGrp="1"/>
           </p:cNvSpPr>
@@ -4204,27 +4057,7 @@
                 <a:uFillTx/>
                 <a:latin typeface="Arial"/>
               </a:rPr>
-              <a:t>Kada program radi kako želimo u simulatoru, možemo ga isprobati na pravom PicoBlazeu tako da kliknemo na “</a:t>
-            </a:r>
-            <a:r>
-              <a:rPr b="0" i="1" lang="bs-BA" sz="2400" strike="noStrike" u="none">
-                <a:solidFill>
-                  <a:srgbClr val="009bdd"/>
-                </a:solidFill>
-                <a:uFillTx/>
-                <a:latin typeface="Arial"/>
-              </a:rPr>
-              <a:t>Download Hexadecimal</a:t>
-            </a:r>
-            <a:r>
-              <a:rPr b="0" lang="bs-BA" sz="2400" strike="noStrike" u="none">
-                <a:solidFill>
-                  <a:srgbClr val="009bdd"/>
-                </a:solidFill>
-                <a:uFillTx/>
-                <a:latin typeface="Arial"/>
-              </a:rPr>
-              <a:t>”.</a:t>
+              <a:t>Ako želimo, možemo dodati i breakpointse na koje će emulacija pauzirati.</a:t>
             </a:r>
             <a:endParaRPr b="0" lang="bs-BA" sz="2400" strike="noStrike" u="none">
               <a:solidFill>
@@ -4254,7 +4087,77 @@
                 <a:uFillTx/>
                 <a:latin typeface="Arial"/>
               </a:rPr>
-              <a:t>I Xilinxov asembler za PicoBlaze ispisuje heksadecimalne datoteke, tako da činjenica da ne ispisujemo binarne datoteke nije problem.</a:t>
+              <a:t>Tu sam mogućnost dodao na prijedlog profesora Tomislava Matića mlađeg.</a:t>
+            </a:r>
+            <a:endParaRPr b="0" lang="bs-BA" sz="2400" strike="noStrike" u="none">
+              <a:solidFill>
+                <a:srgbClr val="009bdd"/>
+              </a:solidFill>
+              <a:uFillTx/>
+              <a:latin typeface="Arial"/>
+            </a:endParaRPr>
+          </a:p>
+          <a:p>
+            <a:pPr marL="432000" indent="-324000">
+              <a:spcBef>
+                <a:spcPts val="1060"/>
+              </a:spcBef>
+              <a:buClr>
+                <a:srgbClr val="77caee"/>
+              </a:buClr>
+              <a:buSzPct val="45000"/>
+              <a:buFont typeface="Wingdings" charset="2"/>
+              <a:buChar char=""/>
+            </a:pPr>
+            <a:r>
+              <a:rPr b="0" lang="bs-BA" sz="2400" strike="noStrike" u="none">
+                <a:solidFill>
+                  <a:srgbClr val="009bdd"/>
+                </a:solidFill>
+                <a:uFillTx/>
+                <a:latin typeface="Arial"/>
+              </a:rPr>
+              <a:t>Postoje samo </a:t>
+            </a:r>
+            <a:r>
+              <a:rPr b="0" i="1" lang="bs-BA" sz="2400" strike="noStrike" u="none">
+                <a:solidFill>
+                  <a:srgbClr val="009bdd"/>
+                </a:solidFill>
+                <a:uFillTx/>
+                <a:latin typeface="Arial"/>
+              </a:rPr>
+              <a:t>permanent</a:t>
+            </a:r>
+            <a:r>
+              <a:rPr b="0" lang="bs-BA" sz="2400" strike="noStrike" u="none">
+                <a:solidFill>
+                  <a:srgbClr val="009bdd"/>
+                </a:solidFill>
+                <a:uFillTx/>
+                <a:latin typeface="Arial"/>
+              </a:rPr>
+              <a:t> breakpointsi, ne i </a:t>
+            </a:r>
+            <a:r>
+              <a:rPr b="0" i="1" lang="bs-BA" sz="2400" strike="noStrike" u="none">
+                <a:solidFill>
+                  <a:srgbClr val="009bdd"/>
+                </a:solidFill>
+                <a:uFillTx/>
+                <a:latin typeface="Arial"/>
+              </a:rPr>
+              <a:t>temporary</a:t>
+            </a:r>
+            <a:r>
+              <a:rPr b="0" lang="bs-BA" sz="2400" strike="noStrike" u="none">
+                <a:solidFill>
+                  <a:srgbClr val="009bdd"/>
+                </a:solidFill>
+                <a:uFillTx/>
+                <a:latin typeface="Arial"/>
+              </a:rPr>
+              <a:t>.</a:t>
             </a:r>
             <a:endParaRPr b="0" lang="bs-BA" sz="2400" strike="noStrike" u="none">
               <a:solidFill>
@@ -4268,7 +4171,7 @@
       </p:sp>
       <p:pic>
         <p:nvPicPr>
-          <p:cNvPr id="63" name="" descr=""/>
+          <p:cNvPr id="62" name="" descr=""/>
           <p:cNvPicPr/>
           <p:nvPr/>
         </p:nvPicPr>
@@ -4278,8 +4181,8 @@
         </p:blipFill>
         <p:spPr>
           <a:xfrm>
-            <a:off x="365760" y="937440"/>
-            <a:ext cx="4663440" cy="3863160"/>
+            <a:off x="228600" y="1013760"/>
+            <a:ext cx="4739400" cy="3786840"/>
           </a:xfrm>
           <a:prstGeom prst="rect">
             <a:avLst/>
@@ -4292,14 +4195,14 @@
       </p:pic>
       <p:sp>
         <p:nvSpPr>
-          <p:cNvPr id="64" name=""/>
+          <p:cNvPr id="63" name=""/>
           <p:cNvSpPr/>
           <p:nvPr/>
         </p:nvSpPr>
         <p:spPr>
           <a:xfrm>
-            <a:off x="1828800" y="914400"/>
-            <a:ext cx="1828800" cy="457200"/>
+            <a:off x="228600" y="4114800"/>
+            <a:ext cx="685800" cy="228600"/>
           </a:xfrm>
           <a:prstGeom prst="ellipse">
             <a:avLst/>
@@ -4347,7 +4250,7 @@
         <p:txBody>
           <a:bodyPr/>
           <a:p>
-            <a:fld id="{93C45131-2CE4-4B68-B939-F1D283641FEA}" type="slidenum">
+            <a:fld id="{667DFEA9-F8FC-464D-B29F-34DD7B719BFC}" type="slidenum">
               <a:t>13</a:t>
             </a:fld>
           </a:p>
@@ -4367,9 +4270,9 @@
         <p:txBody>
           <a:bodyPr/>
           <a:p>
-            <a:fld id="{7F034091-C761-4904-9E20-92665C8055C2}" type="datetime1">
+            <a:fld id="{4272D075-C034-4778-96D0-95F18B069637}" type="datetime1">
               <a:rPr lang="en-US"/>
-              <a:t>04/24/2025</a:t>
+              <a:t>04/28/2025</a:t>
             </a:fld>
           </a:p>
         </p:txBody>
@@ -4406,7 +4309,7 @@
       </p:grpSpPr>
       <p:sp>
         <p:nvSpPr>
-          <p:cNvPr id="65" name="PlaceHolder 1"/>
+          <p:cNvPr id="64" name="PlaceHolder 1"/>
           <p:cNvSpPr>
             <a:spLocks noGrp="1"/>
           </p:cNvSpPr>
@@ -4457,7 +4360,7 @@
       </p:sp>
       <p:sp>
         <p:nvSpPr>
-          <p:cNvPr id="66" name="PlaceHolder 2"/>
+          <p:cNvPr id="65" name="PlaceHolder 2"/>
           <p:cNvSpPr>
             <a:spLocks noGrp="1"/>
           </p:cNvSpPr>
@@ -4502,7 +4405,27 @@
                 <a:uFillTx/>
                 <a:latin typeface="Arial"/>
               </a:rPr>
-              <a:t>Kada dostignemo breakpoint, možemo pogledati trenutne registre, zastavice i memoriju u tablicama.</a:t>
+              <a:t>Kada program radi kako želimo u simulatoru, možemo ga isprobati na pravom PicoBlazeu tako da kliknemo na “</a:t>
+            </a:r>
+            <a:r>
+              <a:rPr b="0" i="1" lang="bs-BA" sz="2400" strike="noStrike" u="none">
+                <a:solidFill>
+                  <a:srgbClr val="009bdd"/>
+                </a:solidFill>
+                <a:uFillTx/>
+                <a:latin typeface="Arial"/>
+              </a:rPr>
+              <a:t>Download Hexadecimal</a:t>
+            </a:r>
+            <a:r>
+              <a:rPr b="0" lang="bs-BA" sz="2400" strike="noStrike" u="none">
+                <a:solidFill>
+                  <a:srgbClr val="009bdd"/>
+                </a:solidFill>
+                <a:uFillTx/>
+                <a:latin typeface="Arial"/>
+              </a:rPr>
+              <a:t>”.</a:t>
             </a:r>
             <a:endParaRPr b="0" lang="bs-BA" sz="2400" strike="noStrike" u="none">
               <a:solidFill>
@@ -4532,27 +4455,7 @@
                 <a:uFillTx/>
                 <a:latin typeface="Arial"/>
               </a:rPr>
-              <a:t>Nedavno promijenjene zastavice i registri obojane su različitom bojom, da nam ne bi promakli. Za to se koristio </a:t>
-            </a:r>
-            <a:r>
-              <a:rPr b="0" i="1" lang="bs-BA" sz="2400" strike="noStrike" u="none">
-                <a:solidFill>
-                  <a:srgbClr val="009bdd"/>
-                </a:solidFill>
-                <a:uFillTx/>
-                <a:latin typeface="Arial"/>
-              </a:rPr>
-              <a:t>DOM as a state</a:t>
-            </a:r>
-            <a:r>
-              <a:rPr b="0" lang="bs-BA" sz="2400" strike="noStrike" u="none">
-                <a:solidFill>
-                  <a:srgbClr val="009bdd"/>
-                </a:solidFill>
-                <a:uFillTx/>
-                <a:latin typeface="Arial"/>
-              </a:rPr>
-              <a:t>, što možda i nije najbolje rješenje.</a:t>
+              <a:t>I Xilinxov asembler za PicoBlaze ispisuje heksadecimalne datoteke, tako da činjenica da ne ispisujemo binarne datoteke nije problem.</a:t>
             </a:r>
             <a:endParaRPr b="0" lang="bs-BA" sz="2400" strike="noStrike" u="none">
               <a:solidFill>
@@ -4566,7 +4469,7 @@
       </p:sp>
       <p:pic>
         <p:nvPicPr>
-          <p:cNvPr id="67" name="" descr=""/>
+          <p:cNvPr id="66" name="" descr=""/>
           <p:cNvPicPr/>
           <p:nvPr/>
         </p:nvPicPr>
@@ -4576,8 +4479,8 @@
         </p:blipFill>
         <p:spPr>
           <a:xfrm>
-            <a:off x="343080" y="914400"/>
-            <a:ext cx="4686120" cy="3779280"/>
+            <a:off x="365760" y="937440"/>
+            <a:ext cx="4663440" cy="3863160"/>
           </a:xfrm>
           <a:prstGeom prst="rect">
             <a:avLst/>
@@ -4590,6 +4493,49 @@
       </p:pic>
       <p:sp>
         <p:nvSpPr>
+          <p:cNvPr id="67" name=""/>
+          <p:cNvSpPr/>
+          <p:nvPr/>
+        </p:nvSpPr>
+        <p:spPr>
+          <a:xfrm>
+            <a:off x="1828800" y="914400"/>
+            <a:ext cx="1828800" cy="457200"/>
+          </a:xfrm>
+          <a:prstGeom prst="ellipse">
+            <a:avLst/>
+          </a:prstGeom>
+          <a:noFill/>
+          <a:ln w="18000">
+            <a:solidFill>
+              <a:srgbClr val="009bdd"/>
+            </a:solidFill>
+            <a:round/>
+          </a:ln>
+        </p:spPr>
+        <p:style>
+          <a:lnRef idx="0"/>
+          <a:fillRef idx="0"/>
+          <a:effectRef idx="0"/>
+          <a:fontRef idx="minor"/>
+        </p:style>
+        <p:txBody>
+          <a:bodyPr wrap="none" lIns="90000" rIns="90000" tIns="45000" bIns="45000" anchor="ctr">
+            <a:noAutofit/>
+          </a:bodyPr>
+          <a:p>
+            <a:endParaRPr b="0" lang="bs-BA" sz="1800" strike="noStrike" u="none">
+              <a:solidFill>
+                <a:srgbClr val="000000"/>
+              </a:solidFill>
+              <a:uFillTx/>
+              <a:latin typeface="Arial"/>
+            </a:endParaRPr>
+          </a:p>
+        </p:txBody>
+      </p:sp>
+      <p:sp>
+        <p:nvSpPr>
           <p:cNvPr id="4" name="PlaceHolder 3"/>
           <p:cNvSpPr>
             <a:spLocks noGrp="1"/>
@@ -4602,7 +4548,7 @@
         <p:txBody>
           <a:bodyPr/>
           <a:p>
-            <a:fld id="{82DC6DFA-2443-4B38-97BB-BECBDBECF0A8}" type="slidenum">
+            <a:fld id="{54602ED0-0A7C-4E6A-9BF1-A53B09938F4E}" type="slidenum">
               <a:t>14</a:t>
             </a:fld>
           </a:p>
@@ -4622,9 +4568,9 @@
         <p:txBody>
           <a:bodyPr/>
           <a:p>
-            <a:fld id="{873972A3-BA52-4F92-A6D2-6B5A4261773C}" type="datetime1">
+            <a:fld id="{1CE57045-2ECD-48EA-A410-728D8E0640E7}" type="datetime1">
               <a:rPr lang="en-US"/>
-              <a:t>04/24/2025</a:t>
+              <a:t>04/28/2025</a:t>
             </a:fld>
           </a:p>
         </p:txBody>
@@ -4757,7 +4703,7 @@
                 <a:uFillTx/>
                 <a:latin typeface="Arial"/>
               </a:rPr>
-              <a:t>Da bismo komunicirali s programima kao što je “Decimal to Binary” (drugi primjer s lijeva), moramo uključiti UART terminal.</a:t>
+              <a:t>Kada dostignemo breakpoint, možemo pogledati trenutne registre, zastavice i memoriju u tablicama.</a:t>
             </a:r>
             <a:endParaRPr b="0" lang="bs-BA" sz="2400" strike="noStrike" u="none">
               <a:solidFill>
@@ -4787,7 +4733,7 @@
                 <a:uFillTx/>
                 <a:latin typeface="Arial"/>
               </a:rPr>
-              <a:t>Preporučljivo je pritom isključiti checkbox “</a:t>
+              <a:t>Nedavno promijenjene zastavice i registri obojane su različitom bojom, da nam ne bi promakli. Za to se koristio </a:t>
             </a:r>
             <a:r>
               <a:rPr b="0" i="1" lang="bs-BA" sz="2400" strike="noStrike" u="none">
@@ -4797,7 +4743,7 @@
                 <a:uFillTx/>
                 <a:latin typeface="Arial"/>
               </a:rPr>
-              <a:t>Update registers and flags on every step</a:t>
+              <a:t>DOM as a state</a:t>
             </a:r>
             <a:r>
               <a:rPr b="0" lang="bs-BA" sz="2400" strike="noStrike" u="none">
@@ -4807,27 +4753,7 @@
                 <a:uFillTx/>
                 <a:latin typeface="Arial"/>
               </a:rPr>
-              <a:t>”. Verzija </a:t>
-            </a:r>
-            <a:r>
-              <a:rPr b="0" i="1" lang="bs-BA" sz="2400" strike="noStrike" u="none">
-                <a:solidFill>
-                  <a:srgbClr val="009bdd"/>
-                </a:solidFill>
-                <a:uFillTx/>
-                <a:latin typeface="Arial"/>
-              </a:rPr>
-              <a:t>v3.1.4</a:t>
-            </a:r>
-            <a:r>
-              <a:rPr b="0" lang="bs-BA" sz="2400" strike="noStrike" u="none">
-                <a:solidFill>
-                  <a:srgbClr val="009bdd"/>
-                </a:solidFill>
-                <a:uFillTx/>
-                <a:latin typeface="Arial"/>
-              </a:rPr>
-              <a:t> i novije to rade automatski.</a:t>
+              <a:t>, što možda i nije najbolje rješenje.</a:t>
             </a:r>
             <a:endParaRPr b="0" lang="bs-BA" sz="2400" strike="noStrike" u="none">
               <a:solidFill>
@@ -4851,8 +4777,8 @@
         </p:blipFill>
         <p:spPr>
           <a:xfrm>
-            <a:off x="396360" y="914400"/>
-            <a:ext cx="3032640" cy="1833120"/>
+            <a:off x="343080" y="914400"/>
+            <a:ext cx="4686120" cy="3779280"/>
           </a:xfrm>
           <a:prstGeom prst="rect">
             <a:avLst/>
@@ -4863,30 +4789,6 @@
           </a:ln>
         </p:spPr>
       </p:pic>
-      <p:pic>
-        <p:nvPicPr>
-          <p:cNvPr id="71" name="" descr=""/>
-          <p:cNvPicPr/>
-          <p:nvPr/>
-        </p:nvPicPr>
-        <p:blipFill>
-          <a:blip r:embed="rId2"/>
-          <a:stretch/>
-        </p:blipFill>
-        <p:spPr>
-          <a:xfrm>
-            <a:off x="327960" y="3200400"/>
-            <a:ext cx="4701240" cy="837720"/>
-          </a:xfrm>
-          <a:prstGeom prst="rect">
-            <a:avLst/>
-          </a:prstGeom>
-          <a:noFill/>
-          <a:ln w="18000">
-            <a:noFill/>
-          </a:ln>
-        </p:spPr>
-      </p:pic>
       <p:sp>
         <p:nvSpPr>
           <p:cNvPr id="4" name="PlaceHolder 3"/>
@@ -4901,7 +4803,7 @@
         <p:txBody>
           <a:bodyPr/>
           <a:p>
-            <a:fld id="{0A3FBFFB-6F05-4A1B-A2EF-FA2BD3D0CB7F}" type="slidenum">
+            <a:fld id="{B98307E8-77E8-4B76-9178-9F05003C905B}" type="slidenum">
               <a:t>15</a:t>
             </a:fld>
           </a:p>
@@ -4921,9 +4823,9 @@
         <p:txBody>
           <a:bodyPr/>
           <a:p>
-            <a:fld id="{88EAE3F5-82FC-43CA-AC3D-9185B8C89A60}" type="datetime1">
+            <a:fld id="{A50A6E45-488B-4B50-BCE9-00784C74A096}" type="datetime1">
               <a:rPr lang="en-US"/>
-              <a:t>04/24/2025</a:t>
+              <a:t>04/28/2025</a:t>
             </a:fld>
           </a:p>
         </p:txBody>
@@ -4960,7 +4862,7 @@
       </p:grpSpPr>
       <p:sp>
         <p:nvSpPr>
-          <p:cNvPr id="72" name="PlaceHolder 1"/>
+          <p:cNvPr id="71" name="PlaceHolder 1"/>
           <p:cNvSpPr>
             <a:spLocks noGrp="1"/>
           </p:cNvSpPr>
@@ -4997,17 +4899,7 @@
                 <a:uFillTx/>
                 <a:latin typeface="Arial"/>
               </a:rPr>
-              <a:t>“</a:t>
-            </a:r>
-            <a:r>
-              <a:rPr b="0" lang="bs-BA" sz="3300" strike="noStrike" u="none">
-                <a:solidFill>
-                  <a:srgbClr val="ffffff"/>
-                </a:solidFill>
-                <a:uFillTx/>
-                <a:latin typeface="Arial"/>
-              </a:rPr>
-              <a:t>Update registers and flags on every step”</a:t>
+              <a:t>Kako se koristi...</a:t>
             </a:r>
             <a:endParaRPr b="0" lang="bs-BA" sz="3300" strike="noStrike" u="none">
               <a:solidFill>
@@ -5021,7 +4913,7 @@
       </p:sp>
       <p:sp>
         <p:nvSpPr>
-          <p:cNvPr id="73" name="PlaceHolder 2"/>
+          <p:cNvPr id="72" name="PlaceHolder 2"/>
           <p:cNvSpPr>
             <a:spLocks noGrp="1"/>
           </p:cNvSpPr>
@@ -5031,8 +4923,8 @@
         </p:nvSpPr>
         <p:spPr>
           <a:xfrm>
-            <a:off x="360000" y="1080000"/>
-            <a:ext cx="9360000" cy="3600000"/>
+            <a:off x="5155920" y="1080000"/>
+            <a:ext cx="4567320" cy="3600000"/>
           </a:xfrm>
           <a:prstGeom prst="rect">
             <a:avLst/>
@@ -5059,16 +4951,16 @@
               <a:buChar char=""/>
             </a:pPr>
             <a:r>
-              <a:rPr b="0" lang="bs-BA" sz="2200" strike="noStrike" u="none">
-                <a:solidFill>
-                  <a:srgbClr val="009bdd"/>
-                </a:solidFill>
-                <a:uFillTx/>
-                <a:latin typeface="Arial"/>
-              </a:rPr>
-              <a:t>Naime, moj program ima problem s layout trashingom: svaki put kad se upiše novi broj u tablicu s registrima (dakle, praktički svaka instrukcija), tablica se neprimjetno poveća ili smanji za nekoliko piksela... ali dovoljno da prisili browser da čitavu stranicu mora iznova renderirati.</a:t>
-            </a:r>
-            <a:endParaRPr b="0" lang="bs-BA" sz="2200" strike="noStrike" u="none">
+              <a:rPr b="0" lang="bs-BA" sz="2400" strike="noStrike" u="none">
+                <a:solidFill>
+                  <a:srgbClr val="009bdd"/>
+                </a:solidFill>
+                <a:uFillTx/>
+                <a:latin typeface="Arial"/>
+              </a:rPr>
+              <a:t>Da bismo komunicirali s programima kao što je “Decimal to Binary” (drugi primjer s lijeva), moramo uključiti UART terminal.</a:t>
+            </a:r>
+            <a:endParaRPr b="0" lang="bs-BA" sz="2400" strike="noStrike" u="none">
               <a:solidFill>
                 <a:srgbClr val="009bdd"/>
               </a:solidFill>
@@ -5089,16 +4981,56 @@
               <a:buChar char=""/>
             </a:pPr>
             <a:r>
-              <a:rPr b="0" lang="bs-BA" sz="2200" strike="noStrike" u="none">
-                <a:solidFill>
-                  <a:srgbClr val="009bdd"/>
-                </a:solidFill>
-                <a:uFillTx/>
-                <a:latin typeface="Arial"/>
-              </a:rPr>
-              <a:t>Činjenica da sam koristio monospace font u tablici, izgleda, ne pomaže.</a:t>
-            </a:r>
-            <a:endParaRPr b="0" lang="bs-BA" sz="2200" strike="noStrike" u="none">
+              <a:rPr b="0" lang="bs-BA" sz="2400" strike="noStrike" u="none">
+                <a:solidFill>
+                  <a:srgbClr val="009bdd"/>
+                </a:solidFill>
+                <a:uFillTx/>
+                <a:latin typeface="Arial"/>
+              </a:rPr>
+              <a:t>Preporučljivo je pritom isključiti checkbox “</a:t>
+            </a:r>
+            <a:r>
+              <a:rPr b="0" i="1" lang="bs-BA" sz="2400" strike="noStrike" u="none">
+                <a:solidFill>
+                  <a:srgbClr val="009bdd"/>
+                </a:solidFill>
+                <a:uFillTx/>
+                <a:latin typeface="Arial"/>
+              </a:rPr>
+              <a:t>Update registers and flags on every step</a:t>
+            </a:r>
+            <a:r>
+              <a:rPr b="0" lang="bs-BA" sz="2400" strike="noStrike" u="none">
+                <a:solidFill>
+                  <a:srgbClr val="009bdd"/>
+                </a:solidFill>
+                <a:uFillTx/>
+                <a:latin typeface="Arial"/>
+              </a:rPr>
+              <a:t>”. Verzija </a:t>
+            </a:r>
+            <a:r>
+              <a:rPr b="0" i="1" lang="bs-BA" sz="2400" strike="noStrike" u="none">
+                <a:solidFill>
+                  <a:srgbClr val="009bdd"/>
+                </a:solidFill>
+                <a:uFillTx/>
+                <a:latin typeface="Arial"/>
+              </a:rPr>
+              <a:t>v3.1.4</a:t>
+            </a:r>
+            <a:r>
+              <a:rPr b="0" lang="bs-BA" sz="2400" strike="noStrike" u="none">
+                <a:solidFill>
+                  <a:srgbClr val="009bdd"/>
+                </a:solidFill>
+                <a:uFillTx/>
+                <a:latin typeface="Arial"/>
+              </a:rPr>
+              <a:t> i novije to rade automatski.</a:t>
+            </a:r>
+            <a:endParaRPr b="0" lang="bs-BA" sz="2400" strike="noStrike" u="none">
               <a:solidFill>
                 <a:srgbClr val="009bdd"/>
               </a:solidFill>
@@ -5106,78 +5038,56 @@
               <a:latin typeface="Arial"/>
             </a:endParaRPr>
           </a:p>
-          <a:p>
-            <a:pPr marL="432000" indent="-324000">
-              <a:spcBef>
-                <a:spcPts val="1060"/>
-              </a:spcBef>
-              <a:buClr>
-                <a:srgbClr val="77caee"/>
-              </a:buClr>
-              <a:buSzPct val="45000"/>
-              <a:buFont typeface="Wingdings" charset="2"/>
-              <a:buChar char=""/>
-            </a:pPr>
-            <a:r>
-              <a:rPr b="0" lang="bs-BA" sz="2200" strike="noStrike" u="none">
-                <a:solidFill>
-                  <a:srgbClr val="009bdd"/>
-                </a:solidFill>
-                <a:uFillTx/>
-                <a:latin typeface="Arial"/>
-              </a:rPr>
-              <a:t>Vjerujemo da je u modernim internetskim preglednicima (Firefox 69, Chrome 52...) to moguće riješiti CSS-om (naredba “</a:t>
-            </a:r>
-            <a:r>
-              <a:rPr b="0" i="1" lang="bs-BA" sz="2200" strike="noStrike" u="none">
-                <a:solidFill>
-                  <a:srgbClr val="009bdd"/>
-                </a:solidFill>
-                <a:uFillTx/>
-                <a:latin typeface="Arial"/>
-              </a:rPr>
-              <a:t>contain: layout</a:t>
-            </a:r>
-            <a:r>
-              <a:rPr b="0" lang="bs-BA" sz="2200" strike="noStrike" u="none">
-                <a:solidFill>
-                  <a:srgbClr val="009bdd"/>
-                </a:solidFill>
-                <a:uFillTx/>
-                <a:latin typeface="Arial"/>
-              </a:rPr>
-              <a:t>” i njoj srodne) i da će to i biti u nekoj budućoj verziji ovog simulatora. Ali, for the time being, postoji checkbox kojim se program može donekle ubrzati. Uostalom, to rješenje sa checkboxom funkcionira i u Firefoxu 52 (koji ne podržava “</a:t>
-            </a:r>
-            <a:r>
-              <a:rPr b="0" i="1" lang="bs-BA" sz="2200" strike="noStrike" u="none">
-                <a:solidFill>
-                  <a:srgbClr val="009bdd"/>
-                </a:solidFill>
-                <a:uFillTx/>
-                <a:latin typeface="Arial"/>
-              </a:rPr>
-              <a:t>contain: layout</a:t>
-            </a:r>
-            <a:r>
-              <a:rPr b="0" lang="bs-BA" sz="2200" strike="noStrike" u="none">
-                <a:solidFill>
-                  <a:srgbClr val="009bdd"/>
-                </a:solidFill>
-                <a:uFillTx/>
-                <a:latin typeface="Arial"/>
-              </a:rPr>
-              <a:t>” i njoj srodne naredbe).</a:t>
-            </a:r>
-            <a:endParaRPr b="0" lang="bs-BA" sz="2200" strike="noStrike" u="none">
-              <a:solidFill>
-                <a:srgbClr val="009bdd"/>
-              </a:solidFill>
-              <a:uFillTx/>
-              <a:latin typeface="Arial"/>
-            </a:endParaRPr>
-          </a:p>
-        </p:txBody>
-      </p:sp>
+        </p:txBody>
+      </p:sp>
+      <p:pic>
+        <p:nvPicPr>
+          <p:cNvPr id="73" name="" descr=""/>
+          <p:cNvPicPr/>
+          <p:nvPr/>
+        </p:nvPicPr>
+        <p:blipFill>
+          <a:blip r:embed="rId1"/>
+          <a:stretch/>
+        </p:blipFill>
+        <p:spPr>
+          <a:xfrm>
+            <a:off x="396360" y="914400"/>
+            <a:ext cx="3032640" cy="1833120"/>
+          </a:xfrm>
+          <a:prstGeom prst="rect">
+            <a:avLst/>
+          </a:prstGeom>
+          <a:noFill/>
+          <a:ln w="18000">
+            <a:noFill/>
+          </a:ln>
+        </p:spPr>
+      </p:pic>
+      <p:pic>
+        <p:nvPicPr>
+          <p:cNvPr id="74" name="" descr=""/>
+          <p:cNvPicPr/>
+          <p:nvPr/>
+        </p:nvPicPr>
+        <p:blipFill>
+          <a:blip r:embed="rId2"/>
+          <a:stretch/>
+        </p:blipFill>
+        <p:spPr>
+          <a:xfrm>
+            <a:off x="327960" y="3200400"/>
+            <a:ext cx="4701240" cy="837720"/>
+          </a:xfrm>
+          <a:prstGeom prst="rect">
+            <a:avLst/>
+          </a:prstGeom>
+          <a:noFill/>
+          <a:ln w="18000">
+            <a:noFill/>
+          </a:ln>
+        </p:spPr>
+      </p:pic>
       <p:sp>
         <p:nvSpPr>
           <p:cNvPr id="4" name="PlaceHolder 3"/>
@@ -5192,7 +5102,7 @@
         <p:txBody>
           <a:bodyPr/>
           <a:p>
-            <a:fld id="{F47209B2-C077-4CB7-B90F-5C4A7B940026}" type="slidenum">
+            <a:fld id="{964E01A4-3FCA-420E-9F06-BA0B88CFCE77}" type="slidenum">
               <a:t>16</a:t>
             </a:fld>
           </a:p>
@@ -5212,9 +5122,9 @@
         <p:txBody>
           <a:bodyPr/>
           <a:p>
-            <a:fld id="{F09DA0E7-0762-4E7F-94C7-A2653924773D}" type="datetime1">
+            <a:fld id="{C1015620-A880-475A-B806-D6009E42C976}" type="datetime1">
               <a:rPr lang="en-US"/>
-              <a:t>04/24/2025</a:t>
+              <a:t>04/28/2025</a:t>
             </a:fld>
           </a:p>
         </p:txBody>
@@ -5251,7 +5161,7 @@
       </p:grpSpPr>
       <p:sp>
         <p:nvSpPr>
-          <p:cNvPr id="74" name="PlaceHolder 1"/>
+          <p:cNvPr id="75" name="PlaceHolder 1"/>
           <p:cNvSpPr>
             <a:spLocks noGrp="1"/>
           </p:cNvSpPr>
@@ -5288,7 +5198,17 @@
                 <a:uFillTx/>
                 <a:latin typeface="Arial"/>
               </a:rPr>
-              <a:t>Je li simulacija UART-a realna?</a:t>
+              <a:t>“</a:t>
+            </a:r>
+            <a:r>
+              <a:rPr b="0" lang="bs-BA" sz="3300" strike="noStrike" u="none">
+                <a:solidFill>
+                  <a:srgbClr val="ffffff"/>
+                </a:solidFill>
+                <a:uFillTx/>
+                <a:latin typeface="Arial"/>
+              </a:rPr>
+              <a:t>Update registers and flags on every step”</a:t>
             </a:r>
             <a:endParaRPr b="0" lang="bs-BA" sz="3300" strike="noStrike" u="none">
               <a:solidFill>
@@ -5302,7 +5222,7 @@
       </p:sp>
       <p:sp>
         <p:nvSpPr>
-          <p:cNvPr id="75" name="PlaceHolder 2"/>
+          <p:cNvPr id="76" name="PlaceHolder 2"/>
           <p:cNvSpPr>
             <a:spLocks noGrp="1"/>
           </p:cNvSpPr>
@@ -5340,16 +5260,16 @@
               <a:buChar char=""/>
             </a:pPr>
             <a:r>
-              <a:rPr b="0" lang="bs-BA" sz="2400" strike="noStrike" u="none">
-                <a:solidFill>
-                  <a:srgbClr val="009bdd"/>
-                </a:solidFill>
-                <a:uFillTx/>
-                <a:latin typeface="Arial"/>
-              </a:rPr>
-              <a:t>Program “Decimal to Binary” nisam uspio pokrenuti na pravom PicoBlazeu, a nisam uspio ni dijagnosticirati problem. Tako da ga ne treba uzeti kao sigurno dobar primjer kako se na PicoBlazeu koristi UART.</a:t>
-            </a:r>
-            <a:endParaRPr b="0" lang="bs-BA" sz="2400" strike="noStrike" u="none">
+              <a:rPr b="0" lang="bs-BA" sz="2200" strike="noStrike" u="none">
+                <a:solidFill>
+                  <a:srgbClr val="009bdd"/>
+                </a:solidFill>
+                <a:uFillTx/>
+                <a:latin typeface="Arial"/>
+              </a:rPr>
+              <a:t>Naime, moj program ima problem s layout trashingom: svaki put kad se upiše novi broj u tablicu s registrima (dakle, praktički svaka instrukcija), tablica se neprimjetno poveća ili smanji za nekoliko piksela... ali dovoljno da prisili browser da čitavu stranicu mora iznova renderirati.</a:t>
+            </a:r>
+            <a:endParaRPr b="0" lang="bs-BA" sz="2200" strike="noStrike" u="none">
               <a:solidFill>
                 <a:srgbClr val="009bdd"/>
               </a:solidFill>
@@ -5357,6 +5277,106 @@
               <a:latin typeface="Arial"/>
             </a:endParaRPr>
           </a:p>
+          <a:p>
+            <a:pPr marL="432000" indent="-324000">
+              <a:spcBef>
+                <a:spcPts val="1060"/>
+              </a:spcBef>
+              <a:buClr>
+                <a:srgbClr val="77caee"/>
+              </a:buClr>
+              <a:buSzPct val="45000"/>
+              <a:buFont typeface="Wingdings" charset="2"/>
+              <a:buChar char=""/>
+            </a:pPr>
+            <a:r>
+              <a:rPr b="0" lang="bs-BA" sz="2200" strike="noStrike" u="none">
+                <a:solidFill>
+                  <a:srgbClr val="009bdd"/>
+                </a:solidFill>
+                <a:uFillTx/>
+                <a:latin typeface="Arial"/>
+              </a:rPr>
+              <a:t>Činjenica da sam koristio monospace font u tablici, izgleda, ne pomaže.</a:t>
+            </a:r>
+            <a:endParaRPr b="0" lang="bs-BA" sz="2200" strike="noStrike" u="none">
+              <a:solidFill>
+                <a:srgbClr val="009bdd"/>
+              </a:solidFill>
+              <a:uFillTx/>
+              <a:latin typeface="Arial"/>
+            </a:endParaRPr>
+          </a:p>
+          <a:p>
+            <a:pPr marL="432000" indent="-324000">
+              <a:spcBef>
+                <a:spcPts val="1060"/>
+              </a:spcBef>
+              <a:buClr>
+                <a:srgbClr val="77caee"/>
+              </a:buClr>
+              <a:buSzPct val="45000"/>
+              <a:buFont typeface="Wingdings" charset="2"/>
+              <a:buChar char=""/>
+            </a:pPr>
+            <a:r>
+              <a:rPr b="0" lang="bs-BA" sz="2200" strike="noStrike" u="none">
+                <a:solidFill>
+                  <a:srgbClr val="009bdd"/>
+                </a:solidFill>
+                <a:uFillTx/>
+                <a:latin typeface="Arial"/>
+              </a:rPr>
+              <a:t>Vjerujemo da je u modernim internetskim preglednicima (Firefox 69, Chrome 52...) to moguće riješiti CSS-om (naredba “</a:t>
+            </a:r>
+            <a:r>
+              <a:rPr b="0" i="1" lang="bs-BA" sz="2200" strike="noStrike" u="none">
+                <a:solidFill>
+                  <a:srgbClr val="009bdd"/>
+                </a:solidFill>
+                <a:uFillTx/>
+                <a:latin typeface="Arial"/>
+              </a:rPr>
+              <a:t>contain: layout</a:t>
+            </a:r>
+            <a:r>
+              <a:rPr b="0" lang="bs-BA" sz="2200" strike="noStrike" u="none">
+                <a:solidFill>
+                  <a:srgbClr val="009bdd"/>
+                </a:solidFill>
+                <a:uFillTx/>
+                <a:latin typeface="Arial"/>
+              </a:rPr>
+              <a:t>” i njoj srodne) i da će to i biti u nekoj budućoj verziji ovog simulatora. Ali, for the time being, postoji checkbox kojim se program može donekle ubrzati. Uostalom, to rješenje sa checkboxom funkcionira i u Firefoxu 52 (koji ne podržava “</a:t>
+            </a:r>
+            <a:r>
+              <a:rPr b="0" i="1" lang="bs-BA" sz="2200" strike="noStrike" u="none">
+                <a:solidFill>
+                  <a:srgbClr val="009bdd"/>
+                </a:solidFill>
+                <a:uFillTx/>
+                <a:latin typeface="Arial"/>
+              </a:rPr>
+              <a:t>contain: layout</a:t>
+            </a:r>
+            <a:r>
+              <a:rPr b="0" lang="bs-BA" sz="2200" strike="noStrike" u="none">
+                <a:solidFill>
+                  <a:srgbClr val="009bdd"/>
+                </a:solidFill>
+                <a:uFillTx/>
+                <a:latin typeface="Arial"/>
+              </a:rPr>
+              <a:t>” i njoj srodne naredbe).</a:t>
+            </a:r>
+            <a:endParaRPr b="0" lang="bs-BA" sz="2200" strike="noStrike" u="none">
+              <a:solidFill>
+                <a:srgbClr val="009bdd"/>
+              </a:solidFill>
+              <a:uFillTx/>
+              <a:latin typeface="Arial"/>
+            </a:endParaRPr>
+          </a:p>
         </p:txBody>
       </p:sp>
       <p:sp>
@@ -5373,7 +5393,7 @@
         <p:txBody>
           <a:bodyPr/>
           <a:p>
-            <a:fld id="{E426FA69-6470-4A38-8786-C0547B6B9C5B}" type="slidenum">
+            <a:fld id="{56927AD2-A9C0-4B56-82C8-36D830BFD269}" type="slidenum">
               <a:t>17</a:t>
             </a:fld>
           </a:p>
@@ -5393,9 +5413,9 @@
         <p:txBody>
           <a:bodyPr/>
           <a:p>
-            <a:fld id="{63B5E52E-9BF3-4F63-A6EC-A27BF1152666}" type="datetime1">
+            <a:fld id="{BE5F9045-E215-4636-8986-19C02D47D242}" type="datetime1">
               <a:rPr lang="en-US"/>
-              <a:t>04/24/2025</a:t>
+              <a:t>04/28/2025</a:t>
             </a:fld>
           </a:p>
         </p:txBody>
@@ -5432,7 +5452,7 @@
       </p:grpSpPr>
       <p:sp>
         <p:nvSpPr>
-          <p:cNvPr id="76" name="PlaceHolder 1"/>
+          <p:cNvPr id="77" name="PlaceHolder 1"/>
           <p:cNvSpPr>
             <a:spLocks noGrp="1"/>
           </p:cNvSpPr>
@@ -5469,7 +5489,7 @@
                 <a:uFillTx/>
                 <a:latin typeface="Arial"/>
               </a:rPr>
-              <a:t>Kako se koristi...</a:t>
+              <a:t>Je li simulacija UART-a realna?</a:t>
             </a:r>
             <a:endParaRPr b="0" lang="bs-BA" sz="3300" strike="noStrike" u="none">
               <a:solidFill>
@@ -5483,7 +5503,7 @@
       </p:sp>
       <p:sp>
         <p:nvSpPr>
-          <p:cNvPr id="77" name="PlaceHolder 2"/>
+          <p:cNvPr id="78" name="PlaceHolder 2"/>
           <p:cNvSpPr>
             <a:spLocks noGrp="1"/>
           </p:cNvSpPr>
@@ -5493,8 +5513,8 @@
         </p:nvSpPr>
         <p:spPr>
           <a:xfrm>
-            <a:off x="5155920" y="1080000"/>
-            <a:ext cx="4567320" cy="3600000"/>
+            <a:off x="360000" y="1080000"/>
+            <a:ext cx="9360000" cy="3600000"/>
           </a:xfrm>
           <a:prstGeom prst="rect">
             <a:avLst/>
@@ -5528,7 +5548,7 @@
                 <a:uFillTx/>
                 <a:latin typeface="Arial"/>
               </a:rPr>
-              <a:t>Asembler podržava ono što se očekuje od današnjeg asemblera: aritmetičke izraze u konstantama, if-grananje, if-else grananje i while-petlje. </a:t>
+              <a:t>Program “</a:t>
             </a:r>
             <a:r>
               <a:rPr b="0" i="1" lang="bs-BA" sz="2400" strike="noStrike" u="none">
@@ -5538,7 +5558,17 @@
                 <a:uFillTx/>
                 <a:latin typeface="Arial"/>
               </a:rPr>
-              <a:t>Svaki asembler ujedno je i interpreter.</a:t>
+              <a:t>Decimal to Binary</a:t>
+            </a:r>
+            <a:r>
+              <a:rPr b="0" lang="bs-BA" sz="2400" strike="noStrike" u="none">
+                <a:solidFill>
+                  <a:srgbClr val="009bdd"/>
+                </a:solidFill>
+                <a:uFillTx/>
+                <a:latin typeface="Arial"/>
+              </a:rPr>
+              <a:t>” nisam uspio pokrenuti na pravom PicoBlazeu, a nisam uspio ni dijagnosticirati problem (je li problem u programu ili u tome kako sam postavio PicoBlaze). Tako da ga ne treba uzeti kao sigurno dobar primjer kako se na PicoBlazeu koristi UART.</a:t>
             </a:r>
             <a:endParaRPr b="0" lang="bs-BA" sz="2400" strike="noStrike" u="none">
               <a:solidFill>
@@ -5568,7 +5598,7 @@
                 <a:uFillTx/>
                 <a:latin typeface="Arial"/>
               </a:rPr>
-              <a:t>Primjer “Preprocessor Test” ispisuje Fibonaccijeve brojeve manje od 100 za vrijeme asembliranja.</a:t>
+              <a:t>Isto vrijedi i za druge programe koji koriste UART (Permutations Algorithm, Regbanks-Flags Test, i N-Queens Puzzle): nisam ih testirao na pravom PicoBlazeu.</a:t>
             </a:r>
             <a:endParaRPr b="0" lang="bs-BA" sz="2400" strike="noStrike" u="none">
               <a:solidFill>
@@ -5580,30 +5610,6 @@
           </a:p>
         </p:txBody>
       </p:sp>
-      <p:pic>
-        <p:nvPicPr>
-          <p:cNvPr id="78" name="" descr=""/>
-          <p:cNvPicPr/>
-          <p:nvPr/>
-        </p:nvPicPr>
-        <p:blipFill>
-          <a:blip r:embed="rId1"/>
-          <a:stretch/>
-        </p:blipFill>
-        <p:spPr>
-          <a:xfrm>
-            <a:off x="228600" y="983160"/>
-            <a:ext cx="4671000" cy="3817440"/>
-          </a:xfrm>
-          <a:prstGeom prst="rect">
-            <a:avLst/>
-          </a:prstGeom>
-          <a:noFill/>
-          <a:ln w="18000">
-            <a:noFill/>
-          </a:ln>
-        </p:spPr>
-      </p:pic>
       <p:sp>
         <p:nvSpPr>
           <p:cNvPr id="4" name="PlaceHolder 3"/>
@@ -5618,7 +5624,7 @@
         <p:txBody>
           <a:bodyPr/>
           <a:p>
-            <a:fld id="{98BC8CEF-51BA-47F1-8DEB-C2056B9FB17A}" type="slidenum">
+            <a:fld id="{A6DEB538-01EA-46C6-86C4-EAC49B4E4360}" type="slidenum">
               <a:t>18</a:t>
             </a:fld>
           </a:p>
@@ -5638,9 +5644,9 @@
         <p:txBody>
           <a:bodyPr/>
           <a:p>
-            <a:fld id="{338A99E2-DA76-40F4-98C6-5DB393EA6E3C}" type="datetime1">
+            <a:fld id="{2DBABC1F-3410-4A3D-B48E-6845BBFAD285}" type="datetime1">
               <a:rPr lang="en-US"/>
-              <a:t>04/24/2025</a:t>
+              <a:t>04/28/2025</a:t>
             </a:fld>
           </a:p>
         </p:txBody>
@@ -5714,7 +5720,7 @@
                 <a:uFillTx/>
                 <a:latin typeface="Arial"/>
               </a:rPr>
-              <a:t>Nedostatci predprocesora</a:t>
+              <a:t>Kako se koristi...</a:t>
             </a:r>
             <a:endParaRPr b="0" lang="bs-BA" sz="3300" strike="noStrike" u="none">
               <a:solidFill>
@@ -5738,8 +5744,8 @@
         </p:nvSpPr>
         <p:spPr>
           <a:xfrm>
-            <a:off x="360000" y="1080000"/>
-            <a:ext cx="9360000" cy="3600000"/>
+            <a:off x="5155920" y="1080000"/>
+            <a:ext cx="4567320" cy="3600000"/>
           </a:xfrm>
           <a:prstGeom prst="rect">
             <a:avLst/>
@@ -5773,7 +5779,17 @@
                 <a:uFillTx/>
                 <a:latin typeface="Arial"/>
               </a:rPr>
-              <a:t>Ne podržava makro-naredbe.</a:t>
+              <a:t>Asembler podržava ono što se očekuje od današnjeg asemblera: aritmetičke izraze u konstantama, if-grananje, if-else grananje i while-petlje. </a:t>
+            </a:r>
+            <a:r>
+              <a:rPr b="0" i="1" lang="bs-BA" sz="2400" strike="noStrike" u="none">
+                <a:solidFill>
+                  <a:srgbClr val="009bdd"/>
+                </a:solidFill>
+                <a:uFillTx/>
+                <a:latin typeface="Arial"/>
+              </a:rPr>
+              <a:t>Svaki asembler ujedno je i interpreter.</a:t>
             </a:r>
             <a:endParaRPr b="0" lang="bs-BA" sz="2400" strike="noStrike" u="none">
               <a:solidFill>
@@ -5803,137 +5819,7 @@
                 <a:uFillTx/>
                 <a:latin typeface="Arial"/>
               </a:rPr>
-              <a:t>Postoji neki neobičan bug u pretprocesoru da naredba “</a:t>
-            </a:r>
-            <a:r>
-              <a:rPr b="0" i="1" lang="bs-BA" sz="2400" strike="noStrike" u="none">
-                <a:solidFill>
-                  <a:srgbClr val="009bdd"/>
-                </a:solidFill>
-                <a:uFillTx/>
-                <a:latin typeface="Arial"/>
-              </a:rPr>
-              <a:t>display a</a:t>
-            </a:r>
-            <a:r>
-              <a:rPr b="0" lang="bs-BA" sz="2400" strike="noStrike" u="none">
-                <a:solidFill>
-                  <a:srgbClr val="009bdd"/>
-                </a:solidFill>
-                <a:uFillTx/>
-                <a:latin typeface="Arial"/>
-              </a:rPr>
-              <a:t>”(novi red) ne radi kada je simulacija UART-a isključena.</a:t>
-            </a:r>
-            <a:endParaRPr b="0" lang="bs-BA" sz="2400" strike="noStrike" u="none">
-              <a:solidFill>
-                <a:srgbClr val="009bdd"/>
-              </a:solidFill>
-              <a:uFillTx/>
-              <a:latin typeface="Arial"/>
-            </a:endParaRPr>
-          </a:p>
-          <a:p>
-            <a:pPr marL="432000" indent="-324000">
-              <a:spcBef>
-                <a:spcPts val="1060"/>
-              </a:spcBef>
-              <a:buClr>
-                <a:srgbClr val="77caee"/>
-              </a:buClr>
-              <a:buSzPct val="45000"/>
-              <a:buFont typeface="Wingdings" charset="2"/>
-              <a:buChar char=""/>
-            </a:pPr>
-            <a:r>
-              <a:rPr b="0" lang="bs-BA" sz="2400" strike="noStrike" u="none">
-                <a:solidFill>
-                  <a:srgbClr val="009bdd"/>
-                </a:solidFill>
-                <a:uFillTx/>
-                <a:latin typeface="Arial"/>
-              </a:rPr>
-              <a:t>U </a:t>
-            </a:r>
-            <a:r>
-              <a:rPr b="0" i="1" lang="bs-BA" sz="2400" strike="noStrike" u="none">
-                <a:solidFill>
-                  <a:srgbClr val="009bdd"/>
-                </a:solidFill>
-                <a:uFillTx/>
-                <a:latin typeface="Arial"/>
-              </a:rPr>
-              <a:t>if</a:t>
-            </a:r>
-            <a:r>
-              <a:rPr b="0" lang="bs-BA" sz="2400" strike="noStrike" u="none">
-                <a:solidFill>
-                  <a:srgbClr val="009bdd"/>
-                </a:solidFill>
-                <a:uFillTx/>
-                <a:latin typeface="Arial"/>
-              </a:rPr>
-              <a:t>-grananjima, </a:t>
-            </a:r>
-            <a:r>
-              <a:rPr b="0" i="1" lang="bs-BA" sz="2400" strike="noStrike" u="none">
-                <a:solidFill>
-                  <a:srgbClr val="009bdd"/>
-                </a:solidFill>
-                <a:uFillTx/>
-                <a:latin typeface="Arial"/>
-              </a:rPr>
-              <a:t>if-else</a:t>
-            </a:r>
-            <a:r>
-              <a:rPr b="0" lang="bs-BA" sz="2400" strike="noStrike" u="none">
-                <a:solidFill>
-                  <a:srgbClr val="009bdd"/>
-                </a:solidFill>
-                <a:uFillTx/>
-                <a:latin typeface="Arial"/>
-              </a:rPr>
-              <a:t>-grananjima i </a:t>
-            </a:r>
-            <a:r>
-              <a:rPr b="0" i="1" lang="bs-BA" sz="2400" strike="noStrike" u="none">
-                <a:solidFill>
-                  <a:srgbClr val="009bdd"/>
-                </a:solidFill>
-                <a:uFillTx/>
-                <a:latin typeface="Arial"/>
-              </a:rPr>
-              <a:t>while</a:t>
-            </a:r>
-            <a:r>
-              <a:rPr b="0" lang="bs-BA" sz="2400" strike="noStrike" u="none">
-                <a:solidFill>
-                  <a:srgbClr val="009bdd"/>
-                </a:solidFill>
-                <a:uFillTx/>
-                <a:latin typeface="Arial"/>
-              </a:rPr>
-              <a:t>-petljama ne mogu se nalaziti mnemonike niti pretprocesorska naredba </a:t>
-            </a:r>
-            <a:r>
-              <a:rPr b="0" i="1" lang="bs-BA" sz="2400" strike="noStrike" u="none">
-                <a:solidFill>
-                  <a:srgbClr val="009bdd"/>
-                </a:solidFill>
-                <a:uFillTx/>
-                <a:latin typeface="Arial"/>
-              </a:rPr>
-              <a:t>address</a:t>
-            </a:r>
-            <a:r>
-              <a:rPr b="0" lang="bs-BA" sz="2400" strike="noStrike" u="none">
-                <a:solidFill>
-                  <a:srgbClr val="009bdd"/>
-                </a:solidFill>
-                <a:uFillTx/>
-                <a:latin typeface="Arial"/>
-              </a:rPr>
-              <a:t>. To je zato jer bi se, da se te stvari omoguće, znatno zakomplicirao pretprocesor i bilo bi lagano nenamjerno napraviti beskonačnu petlju za vrijeme pretprocesiranja:</a:t>
+              <a:t>Primjer “Preprocessor Test” ispisuje Fibonaccijeve brojeve manje od 1000 za vrijeme asembliranja.</a:t>
             </a:r>
             <a:endParaRPr b="0" lang="bs-BA" sz="2400" strike="noStrike" u="none">
               <a:solidFill>
@@ -5957,8 +5843,8 @@
         </p:blipFill>
         <p:spPr>
           <a:xfrm>
-            <a:off x="685800" y="4100040"/>
-            <a:ext cx="2293200" cy="929160"/>
+            <a:off x="228600" y="983160"/>
+            <a:ext cx="4671000" cy="3817440"/>
           </a:xfrm>
           <a:prstGeom prst="rect">
             <a:avLst/>
@@ -5983,7 +5869,7 @@
         <p:txBody>
           <a:bodyPr/>
           <a:p>
-            <a:fld id="{DEC90B00-3958-4A20-9E7B-3AC40890C706}" type="slidenum">
+            <a:fld id="{229C580F-A158-4441-84C0-5B36349BBD6F}" type="slidenum">
               <a:t>19</a:t>
             </a:fld>
           </a:p>
@@ -6003,9 +5889,9 @@
         <p:txBody>
           <a:bodyPr/>
           <a:p>
-            <a:fld id="{63B33B6F-9770-4CA0-8CAD-FC00C22EF826}" type="datetime1">
+            <a:fld id="{F318BA77-18D2-410D-A5D6-3886B42F8CB2}" type="datetime1">
               <a:rPr lang="en-US"/>
-              <a:t>04/24/2025</a:t>
+              <a:t>04/28/2025</a:t>
             </a:fld>
           </a:p>
         </p:txBody>
@@ -6364,7 +6250,7 @@
         <p:txBody>
           <a:bodyPr/>
           <a:p>
-            <a:fld id="{9EC5B6BC-8998-4E04-B040-39BF02E36C0C}" type="slidenum">
+            <a:fld id="{ECCFA5CB-AEEB-4C04-A462-4C3B6F387761}" type="slidenum">
               <a:t>2</a:t>
             </a:fld>
           </a:p>
@@ -6384,9 +6270,9 @@
         <p:txBody>
           <a:bodyPr/>
           <a:p>
-            <a:fld id="{55918F9C-CCB9-4377-B1C1-E78CC66FD015}" type="datetime1">
+            <a:fld id="{D33DABF9-B222-4D04-9B27-6AF17AE8B070}" type="datetime1">
               <a:rPr lang="en-US"/>
-              <a:t>04/24/2025</a:t>
+              <a:t>04/28/2025</a:t>
             </a:fld>
           </a:p>
         </p:txBody>
@@ -6460,7 +6346,7 @@
                 <a:uFillTx/>
                 <a:latin typeface="Arial"/>
               </a:rPr>
-              <a:t>Nedostatci simulatora</a:t>
+              <a:t>Nedostatci predprocesora</a:t>
             </a:r>
             <a:endParaRPr b="0" lang="bs-BA" sz="3300" strike="noStrike" u="none">
               <a:solidFill>
@@ -6519,7 +6405,37 @@
                 <a:uFillTx/>
                 <a:latin typeface="Arial"/>
               </a:rPr>
-              <a:t>Ne znam kako se zastavice na pravom PicoBlazeu ponašaju kad se promijeni regbanka. U svoj simulator PicoBlazea uprogramirao sam da svaka regbanka ima zasebne zastavice carry i zero (kao na Z80), ali moguće je da to nije tako. To bi se trebalo moći provjeriti pomoću programa “</a:t>
+              <a:t>Ne podržava makro-naredbe.</a:t>
+            </a:r>
+            <a:endParaRPr b="0" lang="bs-BA" sz="2400" strike="noStrike" u="none">
+              <a:solidFill>
+                <a:srgbClr val="009bdd"/>
+              </a:solidFill>
+              <a:uFillTx/>
+              <a:latin typeface="Arial"/>
+            </a:endParaRPr>
+          </a:p>
+          <a:p>
+            <a:pPr marL="432000" indent="-324000">
+              <a:spcBef>
+                <a:spcPts val="1060"/>
+              </a:spcBef>
+              <a:buClr>
+                <a:srgbClr val="77caee"/>
+              </a:buClr>
+              <a:buSzPct val="45000"/>
+              <a:buFont typeface="Wingdings" charset="2"/>
+              <a:buChar char=""/>
+            </a:pPr>
+            <a:r>
+              <a:rPr b="0" lang="bs-BA" sz="2400" strike="noStrike" u="none">
+                <a:solidFill>
+                  <a:srgbClr val="009bdd"/>
+                </a:solidFill>
+                <a:uFillTx/>
+                <a:latin typeface="Arial"/>
+              </a:rPr>
+              <a:t>Postoji neki neobičan bug u pretprocesoru da naredba “</a:t>
             </a:r>
             <a:r>
               <a:rPr b="0" i="1" lang="bs-BA" sz="2400" strike="noStrike" u="none">
@@ -6529,7 +6445,7 @@
                 <a:uFillTx/>
                 <a:latin typeface="Arial"/>
               </a:rPr>
-              <a:t>Regbanks-Flags Test</a:t>
+              <a:t>display a</a:t>
             </a:r>
             <a:r>
               <a:rPr b="0" lang="bs-BA" sz="2400" strike="noStrike" u="none">
@@ -6539,7 +6455,117 @@
                 <a:uFillTx/>
                 <a:latin typeface="Arial"/>
               </a:rPr>
-              <a:t>”.</a:t>
+              <a:t>”(novi red) ne radi kada je simulacija UART-a isključena.</a:t>
+            </a:r>
+            <a:endParaRPr b="0" lang="bs-BA" sz="2400" strike="noStrike" u="none">
+              <a:solidFill>
+                <a:srgbClr val="009bdd"/>
+              </a:solidFill>
+              <a:uFillTx/>
+              <a:latin typeface="Arial"/>
+            </a:endParaRPr>
+          </a:p>
+          <a:p>
+            <a:pPr marL="432000" indent="-324000">
+              <a:spcBef>
+                <a:spcPts val="1060"/>
+              </a:spcBef>
+              <a:buClr>
+                <a:srgbClr val="77caee"/>
+              </a:buClr>
+              <a:buSzPct val="45000"/>
+              <a:buFont typeface="Wingdings" charset="2"/>
+              <a:buChar char=""/>
+            </a:pPr>
+            <a:r>
+              <a:rPr b="0" lang="bs-BA" sz="2400" strike="noStrike" u="none">
+                <a:solidFill>
+                  <a:srgbClr val="009bdd"/>
+                </a:solidFill>
+                <a:uFillTx/>
+                <a:latin typeface="Arial"/>
+              </a:rPr>
+              <a:t>U </a:t>
+            </a:r>
+            <a:r>
+              <a:rPr b="0" i="1" lang="bs-BA" sz="2400" strike="noStrike" u="none">
+                <a:solidFill>
+                  <a:srgbClr val="009bdd"/>
+                </a:solidFill>
+                <a:uFillTx/>
+                <a:latin typeface="Arial"/>
+              </a:rPr>
+              <a:t>if</a:t>
+            </a:r>
+            <a:r>
+              <a:rPr b="0" lang="bs-BA" sz="2400" strike="noStrike" u="none">
+                <a:solidFill>
+                  <a:srgbClr val="009bdd"/>
+                </a:solidFill>
+                <a:uFillTx/>
+                <a:latin typeface="Arial"/>
+              </a:rPr>
+              <a:t>-grananjima, </a:t>
+            </a:r>
+            <a:r>
+              <a:rPr b="0" i="1" lang="bs-BA" sz="2400" strike="noStrike" u="none">
+                <a:solidFill>
+                  <a:srgbClr val="009bdd"/>
+                </a:solidFill>
+                <a:uFillTx/>
+                <a:latin typeface="Arial"/>
+              </a:rPr>
+              <a:t>if-else</a:t>
+            </a:r>
+            <a:r>
+              <a:rPr b="0" lang="bs-BA" sz="2400" strike="noStrike" u="none">
+                <a:solidFill>
+                  <a:srgbClr val="009bdd"/>
+                </a:solidFill>
+                <a:uFillTx/>
+                <a:latin typeface="Arial"/>
+              </a:rPr>
+              <a:t>-grananjima i </a:t>
+            </a:r>
+            <a:r>
+              <a:rPr b="0" i="1" lang="bs-BA" sz="2400" strike="noStrike" u="none">
+                <a:solidFill>
+                  <a:srgbClr val="009bdd"/>
+                </a:solidFill>
+                <a:uFillTx/>
+                <a:latin typeface="Arial"/>
+              </a:rPr>
+              <a:t>while</a:t>
+            </a:r>
+            <a:r>
+              <a:rPr b="0" lang="bs-BA" sz="2400" strike="noStrike" u="none">
+                <a:solidFill>
+                  <a:srgbClr val="009bdd"/>
+                </a:solidFill>
+                <a:uFillTx/>
+                <a:latin typeface="Arial"/>
+              </a:rPr>
+              <a:t>-petljama ne mogu se nalaziti mnemonike niti pretprocesorska naredba </a:t>
+            </a:r>
+            <a:r>
+              <a:rPr b="0" i="1" lang="bs-BA" sz="2400" strike="noStrike" u="none">
+                <a:solidFill>
+                  <a:srgbClr val="009bdd"/>
+                </a:solidFill>
+                <a:uFillTx/>
+                <a:latin typeface="Arial"/>
+              </a:rPr>
+              <a:t>address</a:t>
+            </a:r>
+            <a:r>
+              <a:rPr b="0" lang="bs-BA" sz="2400" strike="noStrike" u="none">
+                <a:solidFill>
+                  <a:srgbClr val="009bdd"/>
+                </a:solidFill>
+                <a:uFillTx/>
+                <a:latin typeface="Arial"/>
+              </a:rPr>
+              <a:t>. To je zato jer bi se, da se te stvari omoguće, znatno zakomplicirao pretprocesor i bilo bi lagano nenamjerno napraviti beskonačnu petlju za vrijeme pretprocesiranja:</a:t>
             </a:r>
             <a:endParaRPr b="0" lang="bs-BA" sz="2400" strike="noStrike" u="none">
               <a:solidFill>
@@ -6563,8 +6589,8 @@
         </p:blipFill>
         <p:spPr>
           <a:xfrm>
-            <a:off x="709200" y="2971800"/>
-            <a:ext cx="1576800" cy="1371240"/>
+            <a:off x="685800" y="4100040"/>
+            <a:ext cx="2293200" cy="929160"/>
           </a:xfrm>
           <a:prstGeom prst="rect">
             <a:avLst/>
@@ -6589,7 +6615,7 @@
         <p:txBody>
           <a:bodyPr/>
           <a:p>
-            <a:fld id="{EC29C384-0199-48C0-BF17-BFF3504CED0A}" type="slidenum">
+            <a:fld id="{7F2E5B90-7CAB-4C4F-8C0E-D464824F0AED}" type="slidenum">
               <a:t>20</a:t>
             </a:fld>
           </a:p>
@@ -6609,9 +6635,9 @@
         <p:txBody>
           <a:bodyPr/>
           <a:p>
-            <a:fld id="{5AD532C3-DA5E-4634-A3BB-ED4AD7EEF1E9}" type="datetime1">
+            <a:fld id="{55A7DF88-70BF-47B8-B521-4444C793BF43}" type="datetime1">
               <a:rPr lang="en-US"/>
-              <a:t>04/24/2025</a:t>
+              <a:t>04/28/2025</a:t>
             </a:fld>
           </a:p>
         </p:txBody>
@@ -6685,7 +6711,7 @@
                 <a:uFillTx/>
                 <a:latin typeface="Arial"/>
               </a:rPr>
-              <a:t>Out in the wild...</a:t>
+              <a:t>Nedostatci simulatora</a:t>
             </a:r>
             <a:endParaRPr b="0" lang="bs-BA" sz="3300" strike="noStrike" u="none">
               <a:solidFill>
@@ -6737,16 +6763,36 @@
               <a:buChar char=""/>
             </a:pPr>
             <a:r>
-              <a:rPr b="0" lang="bs-BA" sz="2200" strike="noStrike" u="none">
-                <a:solidFill>
-                  <a:srgbClr val="009bdd"/>
-                </a:solidFill>
-                <a:uFillTx/>
-                <a:latin typeface="Arial"/>
-              </a:rPr>
-              <a:t>Moj se program koristi na fakultetu u Argentini za uvod u ugrađene sustave.</a:t>
-            </a:r>
-            <a:endParaRPr b="0" lang="bs-BA" sz="2200" strike="noStrike" u="none">
+              <a:rPr b="0" lang="bs-BA" sz="2400" strike="noStrike" u="none">
+                <a:solidFill>
+                  <a:srgbClr val="009bdd"/>
+                </a:solidFill>
+                <a:uFillTx/>
+                <a:latin typeface="Arial"/>
+              </a:rPr>
+              <a:t>Ne znam kako se zastavice na pravom PicoBlazeu ponašaju kad se promijeni regbanka. U svoj simulator PicoBlazea uprogramirao sam da svaka regbanka ima zasebne zastavice carry i zero (kao na Z80), ali moguće je da to nije tako. To bi se trebalo moći provjeriti pomoću programa “</a:t>
+            </a:r>
+            <a:r>
+              <a:rPr b="0" i="1" lang="bs-BA" sz="2400" strike="noStrike" u="none">
+                <a:solidFill>
+                  <a:srgbClr val="009bdd"/>
+                </a:solidFill>
+                <a:uFillTx/>
+                <a:latin typeface="Arial"/>
+              </a:rPr>
+              <a:t>Regbanks-Flags Test</a:t>
+            </a:r>
+            <a:r>
+              <a:rPr b="0" lang="bs-BA" sz="2400" strike="noStrike" u="none">
+                <a:solidFill>
+                  <a:srgbClr val="009bdd"/>
+                </a:solidFill>
+                <a:uFillTx/>
+                <a:latin typeface="Arial"/>
+              </a:rPr>
+              <a:t>”.</a:t>
+            </a:r>
+            <a:endParaRPr b="0" lang="bs-BA" sz="2400" strike="noStrike" u="none">
               <a:solidFill>
                 <a:srgbClr val="009bdd"/>
               </a:solidFill>
@@ -6754,128 +6800,32 @@
               <a:latin typeface="Arial"/>
             </a:endParaRPr>
           </a:p>
-          <a:p>
-            <a:pPr marL="432000" indent="-324000">
-              <a:spcBef>
-                <a:spcPts val="1060"/>
-              </a:spcBef>
-              <a:buClr>
-                <a:srgbClr val="77caee"/>
-              </a:buClr>
-              <a:buSzPct val="45000"/>
-              <a:buFont typeface="Wingdings" charset="2"/>
-              <a:buChar char=""/>
-            </a:pPr>
-            <a:r>
-              <a:rPr b="0" lang="bs-BA" sz="2200" strike="noStrike" u="none">
-                <a:solidFill>
-                  <a:srgbClr val="009bdd"/>
-                </a:solidFill>
-                <a:uFillTx/>
-                <a:latin typeface="Arial"/>
-              </a:rPr>
-              <a:t>Nedavno sam dobio kontributora s tog fakulteta koji se zove Agustin Izaguirre (</a:t>
-            </a:r>
-            <a:r>
-              <a:rPr b="0" i="1" lang="bs-BA" sz="2200" strike="noStrike" u="none">
-                <a:solidFill>
-                  <a:srgbClr val="009bdd"/>
-                </a:solidFill>
-                <a:uFillTx/>
-                <a:latin typeface="Arial"/>
-              </a:rPr>
-              <a:t>agustiza</a:t>
-            </a:r>
-            <a:r>
-              <a:rPr b="0" lang="bs-BA" sz="2200" strike="noStrike" u="none">
-                <a:solidFill>
-                  <a:srgbClr val="009bdd"/>
-                </a:solidFill>
-                <a:uFillTx/>
-                <a:latin typeface="Arial"/>
-              </a:rPr>
-              <a:t>). On je napravio nekoliko pull requestova na GitHubu, isprva sitni bug-fixi (prvo da se naredba SRA ponaša ispravno kad je </a:t>
-            </a:r>
-            <a:r>
-              <a:rPr b="0" i="1" lang="bs-BA" sz="2200" strike="noStrike" u="none">
-                <a:solidFill>
-                  <a:srgbClr val="009bdd"/>
-                </a:solidFill>
-                <a:uFillTx/>
-                <a:latin typeface="Arial"/>
-              </a:rPr>
-              <a:t>carry flag</a:t>
-            </a:r>
-            <a:r>
-              <a:rPr b="0" lang="bs-BA" sz="2200" strike="noStrike" u="none">
-                <a:solidFill>
-                  <a:srgbClr val="009bdd"/>
-                </a:solidFill>
-                <a:uFillTx/>
-                <a:latin typeface="Arial"/>
-              </a:rPr>
-              <a:t> postavljen u jedinicu), a onda i dodavanje novih featuresa kao što su JEST testovi.</a:t>
-            </a:r>
-            <a:endParaRPr b="0" lang="bs-BA" sz="2200" strike="noStrike" u="none">
-              <a:solidFill>
-                <a:srgbClr val="009bdd"/>
-              </a:solidFill>
-              <a:uFillTx/>
-              <a:latin typeface="Arial"/>
-            </a:endParaRPr>
-          </a:p>
-          <a:p>
-            <a:pPr marL="432000" indent="-324000">
-              <a:spcBef>
-                <a:spcPts val="1060"/>
-              </a:spcBef>
-              <a:buClr>
-                <a:srgbClr val="77caee"/>
-              </a:buClr>
-              <a:buSzPct val="45000"/>
-              <a:buFont typeface="Wingdings" charset="2"/>
-              <a:buChar char=""/>
-            </a:pPr>
-            <a:r>
-              <a:rPr b="0" lang="bs-BA" sz="2200" strike="noStrike" u="none">
-                <a:solidFill>
-                  <a:srgbClr val="009bdd"/>
-                </a:solidFill>
-                <a:uFillTx/>
-                <a:latin typeface="Arial"/>
-              </a:rPr>
-              <a:t>JEST testira tokenizer, parser, asembler, jezgru simulatora i evaluator aritmetičkih izraza. Međutim, </a:t>
-            </a:r>
-            <a:r>
-              <a:rPr b="0" i="1" lang="bs-BA" sz="2200" strike="noStrike" u="none">
-                <a:solidFill>
-                  <a:srgbClr val="009bdd"/>
-                </a:solidFill>
-                <a:uFillTx/>
-                <a:latin typeface="Arial"/>
-              </a:rPr>
-              <a:t>test coverage</a:t>
-            </a:r>
-            <a:r>
-              <a:rPr b="0" lang="bs-BA" sz="2200" strike="noStrike" u="none">
-                <a:solidFill>
-                  <a:srgbClr val="009bdd"/>
-                </a:solidFill>
-                <a:uFillTx/>
-                <a:latin typeface="Arial"/>
-              </a:rPr>
-              <a:t> je još uvijek nizak i contributori se još uvijek moraju oslanjati na ručno testiranje.</a:t>
-            </a:r>
-            <a:endParaRPr b="0" lang="bs-BA" sz="2200" strike="noStrike" u="none">
-              <a:solidFill>
-                <a:srgbClr val="009bdd"/>
-              </a:solidFill>
-              <a:uFillTx/>
-              <a:latin typeface="Arial"/>
-            </a:endParaRPr>
-          </a:p>
-        </p:txBody>
-      </p:sp>
+        </p:txBody>
+      </p:sp>
+      <p:pic>
+        <p:nvPicPr>
+          <p:cNvPr id="87" name="" descr=""/>
+          <p:cNvPicPr/>
+          <p:nvPr/>
+        </p:nvPicPr>
+        <p:blipFill>
+          <a:blip r:embed="rId1"/>
+          <a:stretch/>
+        </p:blipFill>
+        <p:spPr>
+          <a:xfrm>
+            <a:off x="709200" y="2971800"/>
+            <a:ext cx="1576800" cy="1371240"/>
+          </a:xfrm>
+          <a:prstGeom prst="rect">
+            <a:avLst/>
+          </a:prstGeom>
+          <a:noFill/>
+          <a:ln w="18000">
+            <a:noFill/>
+          </a:ln>
+        </p:spPr>
+      </p:pic>
       <p:sp>
         <p:nvSpPr>
           <p:cNvPr id="4" name="PlaceHolder 3"/>
@@ -6890,7 +6840,7 @@
         <p:txBody>
           <a:bodyPr/>
           <a:p>
-            <a:fld id="{790C4CEA-21F9-4A2E-97E4-A793C2E09BB3}" type="slidenum">
+            <a:fld id="{C7933AC1-C9CC-4767-AB23-462E6A2909A9}" type="slidenum">
               <a:t>21</a:t>
             </a:fld>
           </a:p>
@@ -6910,9 +6860,9 @@
         <p:txBody>
           <a:bodyPr/>
           <a:p>
-            <a:fld id="{B9AD703F-7A94-4708-9EBA-339D70A4732E}" type="datetime1">
+            <a:fld id="{3A394B5D-49AF-48CC-986A-FAA85DCEE367}" type="datetime1">
               <a:rPr lang="en-US"/>
-              <a:t>04/24/2025</a:t>
+              <a:t>04/28/2025</a:t>
             </a:fld>
           </a:p>
         </p:txBody>
@@ -6949,7 +6899,7 @@
       </p:grpSpPr>
       <p:sp>
         <p:nvSpPr>
-          <p:cNvPr id="87" name="PlaceHolder 1"/>
+          <p:cNvPr id="88" name="PlaceHolder 1"/>
           <p:cNvSpPr>
             <a:spLocks noGrp="1"/>
           </p:cNvSpPr>
@@ -6986,7 +6936,7 @@
                 <a:uFillTx/>
                 <a:latin typeface="Arial"/>
               </a:rPr>
-              <a:t>Kompatibilnost s browserima</a:t>
+              <a:t>Out in the wild...</a:t>
             </a:r>
             <a:endParaRPr b="0" lang="bs-BA" sz="3300" strike="noStrike" u="none">
               <a:solidFill>
@@ -7000,7 +6950,7 @@
       </p:sp>
       <p:sp>
         <p:nvSpPr>
-          <p:cNvPr id="88" name="PlaceHolder 2"/>
+          <p:cNvPr id="89" name="PlaceHolder 2"/>
           <p:cNvSpPr>
             <a:spLocks noGrp="1"/>
           </p:cNvSpPr>
@@ -7038,106 +6988,16 @@
               <a:buChar char=""/>
             </a:pPr>
             <a:r>
-              <a:rPr b="0" lang="bs-BA" sz="1200" strike="noStrike" u="none">
-                <a:solidFill>
-                  <a:srgbClr val="009bdd"/>
-                </a:solidFill>
-                <a:uFillTx/>
-                <a:latin typeface="Arial"/>
-              </a:rPr>
-              <a:t>Ciljao sam na Firefox 52.9 ESR.</a:t>
-            </a:r>
-            <a:endParaRPr b="0" lang="bs-BA" sz="1200" strike="noStrike" u="none">
-              <a:solidFill>
-                <a:srgbClr val="009bdd"/>
-              </a:solidFill>
-              <a:uFillTx/>
-              <a:latin typeface="Arial"/>
-            </a:endParaRPr>
-          </a:p>
-          <a:p>
-            <a:pPr lvl="1" marL="864000" indent="-324000">
-              <a:spcBef>
-                <a:spcPts val="850"/>
-              </a:spcBef>
-              <a:buClr>
-                <a:srgbClr val="77caee"/>
-              </a:buClr>
-              <a:buSzPct val="45000"/>
-              <a:buFont typeface="Wingdings" charset="2"/>
-              <a:buChar char=""/>
-            </a:pPr>
-            <a:r>
-              <a:rPr b="0" lang="bs-BA" sz="1200" strike="noStrike" u="none">
-                <a:solidFill>
-                  <a:srgbClr val="009bdd"/>
-                </a:solidFill>
-                <a:uFillTx/>
-                <a:latin typeface="Arial"/>
-              </a:rPr>
-              <a:t>To je posljednja verzija Firefoxa koja se može vrtjeti na Windows XP-u i Windows Visti, te također verzija Firefoxa koja se dobije uz Solaris 11.4.</a:t>
-            </a:r>
-            <a:endParaRPr b="0" lang="bs-BA" sz="1200" strike="noStrike" u="none">
-              <a:solidFill>
-                <a:srgbClr val="009bdd"/>
-              </a:solidFill>
-              <a:uFillTx/>
-              <a:latin typeface="Arial"/>
-            </a:endParaRPr>
-          </a:p>
-          <a:p>
-            <a:pPr lvl="1" marL="864000" indent="-324000">
-              <a:spcBef>
-                <a:spcPts val="850"/>
-              </a:spcBef>
-              <a:buClr>
-                <a:srgbClr val="77caee"/>
-              </a:buClr>
-              <a:buSzPct val="45000"/>
-              <a:buFont typeface="Wingdings" charset="2"/>
-              <a:buChar char=""/>
-            </a:pPr>
-            <a:r>
-              <a:rPr b="0" lang="bs-BA" sz="1200" strike="noStrike" u="none">
-                <a:solidFill>
-                  <a:srgbClr val="009bdd"/>
-                </a:solidFill>
-                <a:uFillTx/>
-                <a:latin typeface="Arial"/>
-              </a:rPr>
-              <a:t>Međutim, u Firefoxu 52.9 ESR pokrenutom na Windows XP (ali ne i ako se pokrene na Solarisu ili Windows 11), kao i u Epiphanyju na FreeBSD-u, linije koda i kod nisu alignirani (što onemogućava da se koriste breakpointsi).</a:t>
-            </a:r>
-            <a:endParaRPr b="0" lang="bs-BA" sz="1200" strike="noStrike" u="none">
-              <a:solidFill>
-                <a:srgbClr val="009bdd"/>
-              </a:solidFill>
-              <a:uFillTx/>
-              <a:latin typeface="Arial"/>
-            </a:endParaRPr>
-          </a:p>
-          <a:p>
-            <a:pPr lvl="1" marL="864000" indent="-324000">
-              <a:spcBef>
-                <a:spcPts val="850"/>
-              </a:spcBef>
-              <a:buClr>
-                <a:srgbClr val="77caee"/>
-              </a:buClr>
-              <a:buSzPct val="45000"/>
-              <a:buFont typeface="Wingdings" charset="2"/>
-              <a:buChar char=""/>
-            </a:pPr>
-            <a:r>
-              <a:rPr b="0" lang="bs-BA" sz="1200" strike="noStrike" u="none">
-                <a:solidFill>
-                  <a:srgbClr val="009bdd"/>
-                </a:solidFill>
-                <a:uFillTx/>
-                <a:latin typeface="Arial"/>
-              </a:rPr>
-              <a:t>Iz nekog meni nedokučivog razloga, JavaScript se vrti približno dvostruko brže u Firefoxu 52 nego u Firefoxu 120.</a:t>
-            </a:r>
-            <a:endParaRPr b="0" lang="bs-BA" sz="1200" strike="noStrike" u="none">
+              <a:rPr b="0" lang="bs-BA" sz="2200" strike="noStrike" u="none">
+                <a:solidFill>
+                  <a:srgbClr val="009bdd"/>
+                </a:solidFill>
+                <a:uFillTx/>
+                <a:latin typeface="Arial"/>
+              </a:rPr>
+              <a:t>Moj se program koristi na fakultetu u Argentini za uvod u ugrađene sustave.</a:t>
+            </a:r>
+            <a:endParaRPr b="0" lang="bs-BA" sz="2200" strike="noStrike" u="none">
               <a:solidFill>
                 <a:srgbClr val="009bdd"/>
               </a:solidFill>
@@ -7158,46 +7018,56 @@
               <a:buChar char=""/>
             </a:pPr>
             <a:r>
-              <a:rPr b="0" lang="bs-BA" sz="1200" strike="noStrike" u="none">
-                <a:solidFill>
-                  <a:srgbClr val="009bdd"/>
-                </a:solidFill>
-                <a:uFillTx/>
-                <a:latin typeface="Arial"/>
-              </a:rPr>
-              <a:t>Moderni Chrome</a:t>
-            </a:r>
-            <a:endParaRPr b="0" lang="bs-BA" sz="1200" strike="noStrike" u="none">
-              <a:solidFill>
-                <a:srgbClr val="009bdd"/>
-              </a:solidFill>
-              <a:uFillTx/>
-              <a:latin typeface="Arial"/>
-            </a:endParaRPr>
-          </a:p>
-          <a:p>
-            <a:pPr lvl="1" marL="864000" indent="-324000">
-              <a:spcBef>
-                <a:spcPts val="850"/>
-              </a:spcBef>
-              <a:buClr>
-                <a:srgbClr val="77caee"/>
-              </a:buClr>
-              <a:buSzPct val="45000"/>
-              <a:buFont typeface="Wingdings" charset="2"/>
-              <a:buChar char=""/>
-            </a:pPr>
-            <a:r>
-              <a:rPr b="0" lang="bs-BA" sz="1200" strike="noStrike" u="none">
-                <a:solidFill>
-                  <a:srgbClr val="009bdd"/>
-                </a:solidFill>
-                <a:uFillTx/>
-                <a:latin typeface="Arial"/>
-              </a:rPr>
-              <a:t>Za to da radi u Chromeu, morao sam izmijeniti CSS (jer tooltipsi na “Play/Pause”, “Fast Forward”, “Single Step” i “Stop” nisu bili radili).</a:t>
-            </a:r>
-            <a:endParaRPr b="0" lang="bs-BA" sz="1200" strike="noStrike" u="none">
+              <a:rPr b="0" lang="bs-BA" sz="2200" strike="noStrike" u="none">
+                <a:solidFill>
+                  <a:srgbClr val="009bdd"/>
+                </a:solidFill>
+                <a:uFillTx/>
+                <a:latin typeface="Arial"/>
+              </a:rPr>
+              <a:t>Nedavno sam dobio kontributora s tog fakulteta koji se zove Agustin Izaguirre (</a:t>
+            </a:r>
+            <a:r>
+              <a:rPr b="0" i="1" lang="bs-BA" sz="2200" strike="noStrike" u="none">
+                <a:solidFill>
+                  <a:srgbClr val="009bdd"/>
+                </a:solidFill>
+                <a:uFillTx/>
+                <a:latin typeface="Arial"/>
+              </a:rPr>
+              <a:t>agustiza</a:t>
+            </a:r>
+            <a:r>
+              <a:rPr b="0" lang="bs-BA" sz="2200" strike="noStrike" u="none">
+                <a:solidFill>
+                  <a:srgbClr val="009bdd"/>
+                </a:solidFill>
+                <a:uFillTx/>
+                <a:latin typeface="Arial"/>
+              </a:rPr>
+              <a:t>). On je napravio nekoliko pull requestova na GitHubu, isprva sitni bug-fixi (prvo da se naredba SRA ponaša ispravno kad je </a:t>
+            </a:r>
+            <a:r>
+              <a:rPr b="0" i="1" lang="bs-BA" sz="2200" strike="noStrike" u="none">
+                <a:solidFill>
+                  <a:srgbClr val="009bdd"/>
+                </a:solidFill>
+                <a:uFillTx/>
+                <a:latin typeface="Arial"/>
+              </a:rPr>
+              <a:t>carry flag</a:t>
+            </a:r>
+            <a:r>
+              <a:rPr b="0" lang="bs-BA" sz="2200" strike="noStrike" u="none">
+                <a:solidFill>
+                  <a:srgbClr val="009bdd"/>
+                </a:solidFill>
+                <a:uFillTx/>
+                <a:latin typeface="Arial"/>
+              </a:rPr>
+              <a:t> postavljen u jedinicu), a onda i dodavanje novih featuresa kao što su JEST testovi.</a:t>
+            </a:r>
+            <a:endParaRPr b="0" lang="bs-BA" sz="2200" strike="noStrike" u="none">
               <a:solidFill>
                 <a:srgbClr val="009bdd"/>
               </a:solidFill>
@@ -7218,16 +7088,36 @@
               <a:buChar char=""/>
             </a:pPr>
             <a:r>
-              <a:rPr b="0" lang="bs-BA" sz="1200" strike="noStrike" u="none">
-                <a:solidFill>
-                  <a:srgbClr val="009bdd"/>
-                </a:solidFill>
-                <a:uFillTx/>
-                <a:latin typeface="Arial"/>
-              </a:rPr>
-              <a:t>WebPositive (bliski srodnik Safariju)</a:t>
-            </a:r>
-            <a:endParaRPr b="0" lang="bs-BA" sz="1200" strike="noStrike" u="none">
+              <a:rPr b="0" lang="bs-BA" sz="2200" strike="noStrike" u="none">
+                <a:solidFill>
+                  <a:srgbClr val="009bdd"/>
+                </a:solidFill>
+                <a:uFillTx/>
+                <a:latin typeface="Arial"/>
+              </a:rPr>
+              <a:t>JEST testira tokenizer, parser, asembler, jezgru simulatora i evaluator aritmetičkih izraza. Međutim, </a:t>
+            </a:r>
+            <a:r>
+              <a:rPr b="0" i="1" lang="bs-BA" sz="2200" strike="noStrike" u="none">
+                <a:solidFill>
+                  <a:srgbClr val="009bdd"/>
+                </a:solidFill>
+                <a:uFillTx/>
+                <a:latin typeface="Arial"/>
+              </a:rPr>
+              <a:t>test coverage</a:t>
+            </a:r>
+            <a:r>
+              <a:rPr b="0" lang="bs-BA" sz="2200" strike="noStrike" u="none">
+                <a:solidFill>
+                  <a:srgbClr val="009bdd"/>
+                </a:solidFill>
+                <a:uFillTx/>
+                <a:latin typeface="Arial"/>
+              </a:rPr>
+              <a:t> je još uvijek nizak i contributori se još uvijek moraju oslanjati na ručno testiranje.</a:t>
+            </a:r>
+            <a:endParaRPr b="0" lang="bs-BA" sz="2200" strike="noStrike" u="none">
               <a:solidFill>
                 <a:srgbClr val="009bdd"/>
               </a:solidFill>
@@ -7235,116 +7125,6 @@
               <a:latin typeface="Arial"/>
             </a:endParaRPr>
           </a:p>
-          <a:p>
-            <a:pPr lvl="1" marL="864000" indent="-324000">
-              <a:spcBef>
-                <a:spcPts val="850"/>
-              </a:spcBef>
-              <a:buClr>
-                <a:srgbClr val="77caee"/>
-              </a:buClr>
-              <a:buSzPct val="45000"/>
-              <a:buFont typeface="Wingdings" charset="2"/>
-              <a:buChar char=""/>
-            </a:pPr>
-            <a:r>
-              <a:rPr b="0" lang="bs-BA" sz="1200" strike="noStrike" u="none">
-                <a:solidFill>
-                  <a:srgbClr val="009bdd"/>
-                </a:solidFill>
-                <a:uFillTx/>
-                <a:latin typeface="Arial"/>
-              </a:rPr>
-              <a:t>Za to da radi u WebPositiveu, morao sam izmijeniti i CSS i JavaScript.</a:t>
-            </a:r>
-            <a:endParaRPr b="0" lang="bs-BA" sz="1200" strike="noStrike" u="none">
-              <a:solidFill>
-                <a:srgbClr val="009bdd"/>
-              </a:solidFill>
-              <a:uFillTx/>
-              <a:latin typeface="Arial"/>
-            </a:endParaRPr>
-          </a:p>
-          <a:p>
-            <a:pPr lvl="1" marL="864000" indent="-324000">
-              <a:spcBef>
-                <a:spcPts val="850"/>
-              </a:spcBef>
-              <a:buClr>
-                <a:srgbClr val="77caee"/>
-              </a:buClr>
-              <a:buSzPct val="45000"/>
-              <a:buFont typeface="Wingdings" charset="2"/>
-              <a:buChar char=""/>
-            </a:pPr>
-            <a:r>
-              <a:rPr b="0" lang="bs-BA" sz="1200" strike="noStrike" u="none">
-                <a:solidFill>
-                  <a:srgbClr val="009bdd"/>
-                </a:solidFill>
-                <a:uFillTx/>
-                <a:latin typeface="Arial"/>
-              </a:rPr>
-              <a:t>Nisam uspio napraviti da “Download Hexadecimal” radi u WebPositiveu.</a:t>
-            </a:r>
-            <a:endParaRPr b="0" lang="bs-BA" sz="1200" strike="noStrike" u="none">
-              <a:solidFill>
-                <a:srgbClr val="009bdd"/>
-              </a:solidFill>
-              <a:uFillTx/>
-              <a:latin typeface="Arial"/>
-            </a:endParaRPr>
-          </a:p>
-          <a:p>
-            <a:pPr marL="432000" indent="-324000">
-              <a:spcBef>
-                <a:spcPts val="1060"/>
-              </a:spcBef>
-              <a:buClr>
-                <a:srgbClr val="77caee"/>
-              </a:buClr>
-              <a:buSzPct val="45000"/>
-              <a:buFont typeface="Wingdings" charset="2"/>
-              <a:buChar char=""/>
-            </a:pPr>
-            <a:r>
-              <a:rPr b="0" lang="bs-BA" sz="1200" strike="noStrike" u="none">
-                <a:solidFill>
-                  <a:srgbClr val="009bdd"/>
-                </a:solidFill>
-                <a:uFillTx/>
-                <a:latin typeface="Arial"/>
-              </a:rPr>
-              <a:t>Darko Nikolić tvrdi da je isprobao moj program na Macu u Safariju i u Operi i da funkcionira tamo. Discordaš </a:t>
-            </a:r>
-            <a:r>
-              <a:rPr b="0" i="1" lang="bs-BA" sz="1200" strike="noStrike" u="none">
-                <a:solidFill>
-                  <a:srgbClr val="009bdd"/>
-                </a:solidFill>
-                <a:uFillTx/>
-                <a:latin typeface="Arial"/>
-              </a:rPr>
-              <a:t>emm312</a:t>
-            </a:r>
-            <a:r>
-              <a:rPr b="0" lang="bs-BA" sz="1200" strike="noStrike" u="none">
-                <a:solidFill>
-                  <a:srgbClr val="009bdd"/>
-                </a:solidFill>
-                <a:uFillTx/>
-                <a:latin typeface="Arial"/>
-              </a:rPr>
-              <a:t> isto tvrdi da ga je isprobao u Safariju i da funkcionira tamo.</a:t>
-            </a:r>
-            <a:endParaRPr b="0" lang="bs-BA" sz="1200" strike="noStrike" u="none">
-              <a:solidFill>
-                <a:srgbClr val="009bdd"/>
-              </a:solidFill>
-              <a:uFillTx/>
-              <a:latin typeface="Arial"/>
-            </a:endParaRPr>
-          </a:p>
         </p:txBody>
       </p:sp>
       <p:sp>
@@ -7361,7 +7141,7 @@
         <p:txBody>
           <a:bodyPr/>
           <a:p>
-            <a:fld id="{04D2BC23-5033-48EF-A11F-87FE873A9039}" type="slidenum">
+            <a:fld id="{1CE01AC6-29F3-4F28-AA66-73E22FE1EA6D}" type="slidenum">
               <a:t>22</a:t>
             </a:fld>
           </a:p>
@@ -7381,9 +7161,9 @@
         <p:txBody>
           <a:bodyPr/>
           <a:p>
-            <a:fld id="{B82B6B19-F48A-44F7-B688-FCD359600FF1}" type="datetime1">
+            <a:fld id="{06EA4473-CE90-4C69-8067-141F8B196647}" type="datetime1">
               <a:rPr lang="en-US"/>
-              <a:t>04/24/2025</a:t>
+              <a:t>04/28/2025</a:t>
             </a:fld>
           </a:p>
         </p:txBody>
@@ -7420,7 +7200,7 @@
       </p:grpSpPr>
       <p:sp>
         <p:nvSpPr>
-          <p:cNvPr id="89" name="PlaceHolder 1"/>
+          <p:cNvPr id="90" name="PlaceHolder 1"/>
           <p:cNvSpPr>
             <a:spLocks noGrp="1"/>
           </p:cNvSpPr>
@@ -7457,7 +7237,7 @@
                 <a:uFillTx/>
                 <a:latin typeface="Arial"/>
               </a:rPr>
-              <a:t>Back-end</a:t>
+              <a:t>Kompatibilnost s browserima</a:t>
             </a:r>
             <a:endParaRPr b="0" lang="bs-BA" sz="3300" strike="noStrike" u="none">
               <a:solidFill>
@@ -7471,7 +7251,7 @@
       </p:sp>
       <p:sp>
         <p:nvSpPr>
-          <p:cNvPr id="90" name="PlaceHolder 2"/>
+          <p:cNvPr id="91" name="PlaceHolder 2"/>
           <p:cNvSpPr>
             <a:spLocks noGrp="1"/>
           </p:cNvSpPr>
@@ -7509,56 +7289,16 @@
               <a:buChar char=""/>
             </a:pPr>
             <a:r>
-              <a:rPr b="0" lang="bs-BA" sz="2100" strike="noStrike" u="none">
-                <a:solidFill>
-                  <a:srgbClr val="009bdd"/>
-                </a:solidFill>
-                <a:uFillTx/>
-                <a:latin typeface="Arial"/>
-              </a:rPr>
-              <a:t>Abidin Durdu (tada zvan </a:t>
-            </a:r>
-            <a:r>
-              <a:rPr b="0" i="1" lang="bs-BA" sz="2100" strike="noStrike" u="none">
-                <a:solidFill>
-                  <a:srgbClr val="009bdd"/>
-                </a:solidFill>
-                <a:uFillTx/>
-                <a:latin typeface="Arial"/>
-              </a:rPr>
-              <a:t>betelgeuse-7</a:t>
-            </a:r>
-            <a:r>
-              <a:rPr b="0" lang="bs-BA" sz="2100" strike="noStrike" u="none">
-                <a:solidFill>
-                  <a:srgbClr val="009bdd"/>
-                </a:solidFill>
-                <a:uFillTx/>
-                <a:latin typeface="Arial"/>
-              </a:rPr>
-              <a:t>, a sada zvan </a:t>
-            </a:r>
-            <a:r>
-              <a:rPr b="0" i="1" lang="bs-BA" sz="2100" strike="noStrike" u="none">
-                <a:solidFill>
-                  <a:srgbClr val="009bdd"/>
-                </a:solidFill>
-                <a:uFillTx/>
-                <a:latin typeface="Arial"/>
-              </a:rPr>
-              <a:t>abdrd</a:t>
-            </a:r>
-            <a:r>
-              <a:rPr b="0" lang="bs-BA" sz="2100" strike="noStrike" u="none">
-                <a:solidFill>
-                  <a:srgbClr val="009bdd"/>
-                </a:solidFill>
-                <a:uFillTx/>
-                <a:latin typeface="Arial"/>
-              </a:rPr>
-              <a:t>) napravio je back-end u PHP-u, koji omogućuje korisnicima da dijele asemblerske programe. Taj back-end koristi MySQL bazu podataka. Vrti se na SourceForge serverima.</a:t>
-            </a:r>
-            <a:endParaRPr b="0" lang="bs-BA" sz="2100" strike="noStrike" u="none">
+              <a:rPr b="0" lang="bs-BA" sz="1200" strike="noStrike" u="none">
+                <a:solidFill>
+                  <a:srgbClr val="009bdd"/>
+                </a:solidFill>
+                <a:uFillTx/>
+                <a:latin typeface="Arial"/>
+              </a:rPr>
+              <a:t>Ciljao sam na Firefox 52.9 ESR.</a:t>
+            </a:r>
+            <a:endParaRPr b="0" lang="bs-BA" sz="1200" strike="noStrike" u="none">
               <a:solidFill>
                 <a:srgbClr val="009bdd"/>
               </a:solidFill>
@@ -7566,99 +7306,298 @@
               <a:latin typeface="Arial"/>
             </a:endParaRPr>
           </a:p>
-        </p:txBody>
-      </p:sp>
-      <p:pic>
-        <p:nvPicPr>
-          <p:cNvPr id="91" name="" descr=""/>
-          <p:cNvPicPr/>
-          <p:nvPr/>
-        </p:nvPicPr>
-        <p:blipFill>
-          <a:blip r:embed="rId1"/>
-          <a:stretch/>
-        </p:blipFill>
-        <p:spPr>
-          <a:xfrm>
-            <a:off x="2507040" y="2289960"/>
-            <a:ext cx="5090040" cy="1104480"/>
-          </a:xfrm>
-          <a:prstGeom prst="rect">
-            <a:avLst/>
-          </a:prstGeom>
-          <a:noFill/>
-          <a:ln w="18000">
-            <a:noFill/>
-          </a:ln>
-        </p:spPr>
-      </p:pic>
-      <p:sp>
-        <p:nvSpPr>
-          <p:cNvPr id="92" name=""/>
-          <p:cNvSpPr/>
-          <p:nvPr/>
-        </p:nvSpPr>
-        <p:spPr>
-          <a:xfrm>
-            <a:off x="4898160" y="2468880"/>
-            <a:ext cx="359640" cy="359640"/>
-          </a:xfrm>
-          <a:prstGeom prst="ellipse">
-            <a:avLst/>
-          </a:prstGeom>
-          <a:noFill/>
-          <a:ln w="18000">
-            <a:solidFill>
-              <a:srgbClr val="009bdd"/>
-            </a:solidFill>
-            <a:round/>
-          </a:ln>
-        </p:spPr>
-        <p:style>
-          <a:lnRef idx="0"/>
-          <a:fillRef idx="0"/>
-          <a:effectRef idx="0"/>
-          <a:fontRef idx="minor"/>
-        </p:style>
-        <p:txBody>
-          <a:bodyPr wrap="none" lIns="90000" rIns="90000" tIns="45000" bIns="45000" anchor="ctr">
-            <a:noAutofit/>
-          </a:bodyPr>
-          <a:p>
-            <a:endParaRPr b="0" lang="bs-BA" sz="1800" strike="noStrike" u="none">
-              <a:solidFill>
-                <a:srgbClr val="000000"/>
-              </a:solidFill>
-              <a:uFillTx/>
-              <a:latin typeface="Arial"/>
-            </a:endParaRPr>
-          </a:p>
-        </p:txBody>
-      </p:sp>
-      <p:pic>
-        <p:nvPicPr>
-          <p:cNvPr id="93" name="" descr=""/>
-          <p:cNvPicPr/>
-          <p:nvPr/>
-        </p:nvPicPr>
-        <p:blipFill>
-          <a:blip r:embed="rId2"/>
-          <a:stretch/>
-        </p:blipFill>
-        <p:spPr>
-          <a:xfrm>
-            <a:off x="1356120" y="3527640"/>
-            <a:ext cx="7330680" cy="1371240"/>
-          </a:xfrm>
-          <a:prstGeom prst="rect">
-            <a:avLst/>
-          </a:prstGeom>
-          <a:noFill/>
-          <a:ln w="18000">
-            <a:noFill/>
-          </a:ln>
-        </p:spPr>
-      </p:pic>
+          <a:p>
+            <a:pPr lvl="1" marL="864000" indent="-324000">
+              <a:spcBef>
+                <a:spcPts val="850"/>
+              </a:spcBef>
+              <a:buClr>
+                <a:srgbClr val="77caee"/>
+              </a:buClr>
+              <a:buSzPct val="45000"/>
+              <a:buFont typeface="Wingdings" charset="2"/>
+              <a:buChar char=""/>
+            </a:pPr>
+            <a:r>
+              <a:rPr b="0" lang="bs-BA" sz="1200" strike="noStrike" u="none">
+                <a:solidFill>
+                  <a:srgbClr val="009bdd"/>
+                </a:solidFill>
+                <a:uFillTx/>
+                <a:latin typeface="Arial"/>
+              </a:rPr>
+              <a:t>To je posljednja verzija Firefoxa koja se može vrtjeti na Windows XP-u i Windows Visti, te također verzija Firefoxa koja se dobije uz Solaris 11.4.</a:t>
+            </a:r>
+            <a:endParaRPr b="0" lang="bs-BA" sz="1200" strike="noStrike" u="none">
+              <a:solidFill>
+                <a:srgbClr val="009bdd"/>
+              </a:solidFill>
+              <a:uFillTx/>
+              <a:latin typeface="Arial"/>
+            </a:endParaRPr>
+          </a:p>
+          <a:p>
+            <a:pPr lvl="1" marL="864000" indent="-324000">
+              <a:spcBef>
+                <a:spcPts val="850"/>
+              </a:spcBef>
+              <a:buClr>
+                <a:srgbClr val="77caee"/>
+              </a:buClr>
+              <a:buSzPct val="45000"/>
+              <a:buFont typeface="Wingdings" charset="2"/>
+              <a:buChar char=""/>
+            </a:pPr>
+            <a:r>
+              <a:rPr b="0" lang="bs-BA" sz="1200" strike="noStrike" u="none">
+                <a:solidFill>
+                  <a:srgbClr val="009bdd"/>
+                </a:solidFill>
+                <a:uFillTx/>
+                <a:latin typeface="Arial"/>
+              </a:rPr>
+              <a:t>Međutim, u Firefoxu 52.9 ESR pokrenutom na Windows XP (ali ne i ako se pokrene na Solarisu ili Windows 11), kao i u Epiphanyju na FreeBSD-u, linije koda i kod nisu alignirani (što onemogućava da se koriste breakpointsi).</a:t>
+            </a:r>
+            <a:endParaRPr b="0" lang="bs-BA" sz="1200" strike="noStrike" u="none">
+              <a:solidFill>
+                <a:srgbClr val="009bdd"/>
+              </a:solidFill>
+              <a:uFillTx/>
+              <a:latin typeface="Arial"/>
+            </a:endParaRPr>
+          </a:p>
+          <a:p>
+            <a:pPr lvl="1" marL="864000" indent="-324000">
+              <a:spcBef>
+                <a:spcPts val="850"/>
+              </a:spcBef>
+              <a:buClr>
+                <a:srgbClr val="77caee"/>
+              </a:buClr>
+              <a:buSzPct val="45000"/>
+              <a:buFont typeface="Wingdings" charset="2"/>
+              <a:buChar char=""/>
+            </a:pPr>
+            <a:r>
+              <a:rPr b="0" lang="bs-BA" sz="1200" strike="noStrike" u="none">
+                <a:solidFill>
+                  <a:srgbClr val="009bdd"/>
+                </a:solidFill>
+                <a:uFillTx/>
+                <a:latin typeface="Arial"/>
+              </a:rPr>
+              <a:t>Iz nekog meni nedokučivog razloga, JavaScript se vrti približno dvostruko brže u Firefoxu 52 nego u Firefoxu 120.</a:t>
+            </a:r>
+            <a:endParaRPr b="0" lang="bs-BA" sz="1200" strike="noStrike" u="none">
+              <a:solidFill>
+                <a:srgbClr val="009bdd"/>
+              </a:solidFill>
+              <a:uFillTx/>
+              <a:latin typeface="Arial"/>
+            </a:endParaRPr>
+          </a:p>
+          <a:p>
+            <a:pPr marL="432000" indent="-324000">
+              <a:spcBef>
+                <a:spcPts val="1060"/>
+              </a:spcBef>
+              <a:buClr>
+                <a:srgbClr val="77caee"/>
+              </a:buClr>
+              <a:buSzPct val="45000"/>
+              <a:buFont typeface="Wingdings" charset="2"/>
+              <a:buChar char=""/>
+            </a:pPr>
+            <a:r>
+              <a:rPr b="0" lang="bs-BA" sz="1200" strike="noStrike" u="none">
+                <a:solidFill>
+                  <a:srgbClr val="009bdd"/>
+                </a:solidFill>
+                <a:uFillTx/>
+                <a:latin typeface="Arial"/>
+              </a:rPr>
+              <a:t>Moderni Chrome</a:t>
+            </a:r>
+            <a:endParaRPr b="0" lang="bs-BA" sz="1200" strike="noStrike" u="none">
+              <a:solidFill>
+                <a:srgbClr val="009bdd"/>
+              </a:solidFill>
+              <a:uFillTx/>
+              <a:latin typeface="Arial"/>
+            </a:endParaRPr>
+          </a:p>
+          <a:p>
+            <a:pPr lvl="1" marL="864000" indent="-324000">
+              <a:spcBef>
+                <a:spcPts val="850"/>
+              </a:spcBef>
+              <a:buClr>
+                <a:srgbClr val="77caee"/>
+              </a:buClr>
+              <a:buSzPct val="45000"/>
+              <a:buFont typeface="Wingdings" charset="2"/>
+              <a:buChar char=""/>
+            </a:pPr>
+            <a:r>
+              <a:rPr b="0" lang="bs-BA" sz="1200" strike="noStrike" u="none">
+                <a:solidFill>
+                  <a:srgbClr val="009bdd"/>
+                </a:solidFill>
+                <a:uFillTx/>
+                <a:latin typeface="Arial"/>
+              </a:rPr>
+              <a:t>Za to da radi u Chromeu, morao sam izmijeniti CSS (jer tooltipsi na “Play/Pause”, “Fast Forward”, “Single Step” i “Stop” nisu bili radili).</a:t>
+            </a:r>
+            <a:endParaRPr b="0" lang="bs-BA" sz="1200" strike="noStrike" u="none">
+              <a:solidFill>
+                <a:srgbClr val="009bdd"/>
+              </a:solidFill>
+              <a:uFillTx/>
+              <a:latin typeface="Arial"/>
+            </a:endParaRPr>
+          </a:p>
+          <a:p>
+            <a:pPr marL="432000" indent="-324000">
+              <a:spcBef>
+                <a:spcPts val="1060"/>
+              </a:spcBef>
+              <a:buClr>
+                <a:srgbClr val="77caee"/>
+              </a:buClr>
+              <a:buSzPct val="45000"/>
+              <a:buFont typeface="Wingdings" charset="2"/>
+              <a:buChar char=""/>
+            </a:pPr>
+            <a:r>
+              <a:rPr b="0" lang="bs-BA" sz="1200" strike="noStrike" u="none">
+                <a:solidFill>
+                  <a:srgbClr val="009bdd"/>
+                </a:solidFill>
+                <a:uFillTx/>
+                <a:latin typeface="Arial"/>
+              </a:rPr>
+              <a:t>WebPositive (bliski srodnik Safariju)</a:t>
+            </a:r>
+            <a:endParaRPr b="0" lang="bs-BA" sz="1200" strike="noStrike" u="none">
+              <a:solidFill>
+                <a:srgbClr val="009bdd"/>
+              </a:solidFill>
+              <a:uFillTx/>
+              <a:latin typeface="Arial"/>
+            </a:endParaRPr>
+          </a:p>
+          <a:p>
+            <a:pPr lvl="1" marL="864000" indent="-324000">
+              <a:spcBef>
+                <a:spcPts val="850"/>
+              </a:spcBef>
+              <a:buClr>
+                <a:srgbClr val="77caee"/>
+              </a:buClr>
+              <a:buSzPct val="45000"/>
+              <a:buFont typeface="Wingdings" charset="2"/>
+              <a:buChar char=""/>
+            </a:pPr>
+            <a:r>
+              <a:rPr b="0" lang="bs-BA" sz="1200" strike="noStrike" u="none">
+                <a:solidFill>
+                  <a:srgbClr val="009bdd"/>
+                </a:solidFill>
+                <a:uFillTx/>
+                <a:latin typeface="Arial"/>
+              </a:rPr>
+              <a:t>Za to da radi u WebPositiveu, morao sam izmijeniti i CSS i JavaScript.</a:t>
+            </a:r>
+            <a:endParaRPr b="0" lang="bs-BA" sz="1200" strike="noStrike" u="none">
+              <a:solidFill>
+                <a:srgbClr val="009bdd"/>
+              </a:solidFill>
+              <a:uFillTx/>
+              <a:latin typeface="Arial"/>
+            </a:endParaRPr>
+          </a:p>
+          <a:p>
+            <a:pPr lvl="1" marL="864000" indent="-324000">
+              <a:spcBef>
+                <a:spcPts val="850"/>
+              </a:spcBef>
+              <a:buClr>
+                <a:srgbClr val="77caee"/>
+              </a:buClr>
+              <a:buSzPct val="45000"/>
+              <a:buFont typeface="Wingdings" charset="2"/>
+              <a:buChar char=""/>
+            </a:pPr>
+            <a:r>
+              <a:rPr b="0" lang="bs-BA" sz="1200" strike="noStrike" u="none">
+                <a:solidFill>
+                  <a:srgbClr val="009bdd"/>
+                </a:solidFill>
+                <a:uFillTx/>
+                <a:latin typeface="Arial"/>
+              </a:rPr>
+              <a:t>Nisam uspio napraviti da “Download Hexadecimal” radi u WebPositiveu.</a:t>
+            </a:r>
+            <a:endParaRPr b="0" lang="bs-BA" sz="1200" strike="noStrike" u="none">
+              <a:solidFill>
+                <a:srgbClr val="009bdd"/>
+              </a:solidFill>
+              <a:uFillTx/>
+              <a:latin typeface="Arial"/>
+            </a:endParaRPr>
+          </a:p>
+          <a:p>
+            <a:pPr marL="432000" indent="-324000">
+              <a:spcBef>
+                <a:spcPts val="1060"/>
+              </a:spcBef>
+              <a:buClr>
+                <a:srgbClr val="77caee"/>
+              </a:buClr>
+              <a:buSzPct val="45000"/>
+              <a:buFont typeface="Wingdings" charset="2"/>
+              <a:buChar char=""/>
+            </a:pPr>
+            <a:r>
+              <a:rPr b="0" lang="bs-BA" sz="1200" strike="noStrike" u="none">
+                <a:solidFill>
+                  <a:srgbClr val="009bdd"/>
+                </a:solidFill>
+                <a:uFillTx/>
+                <a:latin typeface="Arial"/>
+              </a:rPr>
+              <a:t>Darko Nikolić tvrdi da je isprobao moj program na Macu u Safariju i u Operi i da funkcionira tamo. Discordaš </a:t>
+            </a:r>
+            <a:r>
+              <a:rPr b="0" i="1" lang="bs-BA" sz="1200" strike="noStrike" u="none">
+                <a:solidFill>
+                  <a:srgbClr val="009bdd"/>
+                </a:solidFill>
+                <a:uFillTx/>
+                <a:latin typeface="Arial"/>
+              </a:rPr>
+              <a:t>emm312</a:t>
+            </a:r>
+            <a:r>
+              <a:rPr b="0" lang="bs-BA" sz="1200" strike="noStrike" u="none">
+                <a:solidFill>
+                  <a:srgbClr val="009bdd"/>
+                </a:solidFill>
+                <a:uFillTx/>
+                <a:latin typeface="Arial"/>
+              </a:rPr>
+              <a:t> isto tvrdi da ga je isprobao u Safariju i da funkcionira tamo.</a:t>
+            </a:r>
+            <a:endParaRPr b="0" lang="bs-BA" sz="1200" strike="noStrike" u="none">
+              <a:solidFill>
+                <a:srgbClr val="009bdd"/>
+              </a:solidFill>
+              <a:uFillTx/>
+              <a:latin typeface="Arial"/>
+            </a:endParaRPr>
+          </a:p>
+        </p:txBody>
+      </p:sp>
       <p:sp>
         <p:nvSpPr>
           <p:cNvPr id="4" name="PlaceHolder 3"/>
@@ -7673,7 +7612,7 @@
         <p:txBody>
           <a:bodyPr/>
           <a:p>
-            <a:fld id="{071CA60D-A815-435C-B759-CAED33CC57B7}" type="slidenum">
+            <a:fld id="{2DEC8639-4B97-4F85-90F3-734030DBEFD4}" type="slidenum">
               <a:t>23</a:t>
             </a:fld>
           </a:p>
@@ -7693,9 +7632,9 @@
         <p:txBody>
           <a:bodyPr/>
           <a:p>
-            <a:fld id="{D238DB85-4C03-43F3-8CDC-20342E09CD3B}" type="datetime1">
+            <a:fld id="{168E7546-711F-4F38-AB39-3D5663DE4237}" type="datetime1">
               <a:rPr lang="en-US"/>
-              <a:t>04/24/2025</a:t>
+              <a:t>04/28/2025</a:t>
             </a:fld>
           </a:p>
         </p:txBody>
@@ -7732,7 +7671,7 @@
       </p:grpSpPr>
       <p:sp>
         <p:nvSpPr>
-          <p:cNvPr id="94" name="PlaceHolder 1"/>
+          <p:cNvPr id="92" name="PlaceHolder 1"/>
           <p:cNvSpPr>
             <a:spLocks noGrp="1"/>
           </p:cNvSpPr>
@@ -7769,7 +7708,7 @@
                 <a:uFillTx/>
                 <a:latin typeface="Arial"/>
               </a:rPr>
-              <a:t>Bilješke o sintaksi</a:t>
+              <a:t>Back-end</a:t>
             </a:r>
             <a:endParaRPr b="0" lang="bs-BA" sz="3300" strike="noStrike" u="none">
               <a:solidFill>
@@ -7783,7 +7722,7 @@
       </p:sp>
       <p:sp>
         <p:nvSpPr>
-          <p:cNvPr id="95" name="PlaceHolder 2"/>
+          <p:cNvPr id="93" name="PlaceHolder 2"/>
           <p:cNvSpPr>
             <a:spLocks noGrp="1"/>
           </p:cNvSpPr>
@@ -7828,7 +7767,47 @@
                 <a:uFillTx/>
                 <a:latin typeface="Arial"/>
               </a:rPr>
-              <a:t>Moj asembler za PicoBlaze cilja na punu kompatibilnost sa Xilinxovim službenim asemblerom za PicoBlaze. To, na žalost, znači da se numerički literali bez eksplicitno određene brojevne baze interpretiraju kao heksadekadski.</a:t>
+              <a:t>Abidin Durdu (tada zvan </a:t>
+            </a:r>
+            <a:r>
+              <a:rPr b="0" i="1" lang="bs-BA" sz="2100" strike="noStrike" u="none">
+                <a:solidFill>
+                  <a:srgbClr val="009bdd"/>
+                </a:solidFill>
+                <a:uFillTx/>
+                <a:latin typeface="Arial"/>
+              </a:rPr>
+              <a:t>betelgeuse-7</a:t>
+            </a:r>
+            <a:r>
+              <a:rPr b="0" lang="bs-BA" sz="2100" strike="noStrike" u="none">
+                <a:solidFill>
+                  <a:srgbClr val="009bdd"/>
+                </a:solidFill>
+                <a:uFillTx/>
+                <a:latin typeface="Arial"/>
+              </a:rPr>
+              <a:t>, a sada zvan </a:t>
+            </a:r>
+            <a:r>
+              <a:rPr b="0" i="1" lang="bs-BA" sz="2100" strike="noStrike" u="none">
+                <a:solidFill>
+                  <a:srgbClr val="009bdd"/>
+                </a:solidFill>
+                <a:uFillTx/>
+                <a:latin typeface="Arial"/>
+              </a:rPr>
+              <a:t>abdrd</a:t>
+            </a:r>
+            <a:r>
+              <a:rPr b="0" lang="bs-BA" sz="2100" strike="noStrike" u="none">
+                <a:solidFill>
+                  <a:srgbClr val="009bdd"/>
+                </a:solidFill>
+                <a:uFillTx/>
+                <a:latin typeface="Arial"/>
+              </a:rPr>
+              <a:t>) napravio je back-end u PHP-u, koji omogućuje korisnicima da dijele asemblerske programe. Taj back-end koristi MySQL bazu podataka. Vrti se na SourceForge serverima.</a:t>
             </a:r>
             <a:endParaRPr b="0" lang="bs-BA" sz="2100" strike="noStrike" u="none">
               <a:solidFill>
@@ -7838,108 +7817,99 @@
               <a:latin typeface="Arial"/>
             </a:endParaRPr>
           </a:p>
-          <a:p>
-            <a:pPr marL="432000" indent="-324000">
-              <a:spcBef>
-                <a:spcPts val="1060"/>
-              </a:spcBef>
-              <a:buClr>
-                <a:srgbClr val="77caee"/>
-              </a:buClr>
-              <a:buSzPct val="45000"/>
-              <a:buFont typeface="Wingdings" charset="2"/>
-              <a:buChar char=""/>
-            </a:pPr>
-            <a:r>
-              <a:rPr b="0" lang="bs-BA" sz="2100" strike="noStrike" u="none">
-                <a:solidFill>
-                  <a:srgbClr val="009bdd"/>
-                </a:solidFill>
-                <a:uFillTx/>
-                <a:latin typeface="Arial"/>
-              </a:rPr>
-              <a:t>Od verzije v5.0.0 to se ponašanje može promijeniti: pretprocesor i asembler će sve brojevne literale bez specificirane baze nakon direktive </a:t>
-            </a:r>
-            <a:r>
-              <a:rPr b="0" lang="bs-BA" sz="2100" strike="noStrike" u="none">
-                <a:solidFill>
-                  <a:srgbClr val="009bdd"/>
-                </a:solidFill>
-                <a:uFillTx/>
-                <a:latin typeface="Courier New"/>
-              </a:rPr>
-              <a:t>base_decimal</a:t>
-            </a:r>
-            <a:r>
-              <a:rPr b="0" lang="bs-BA" sz="2100" strike="noStrike" u="none">
-                <a:solidFill>
-                  <a:srgbClr val="009bdd"/>
-                </a:solidFill>
-                <a:uFillTx/>
-                <a:latin typeface="Arial"/>
-              </a:rPr>
-              <a:t> interpretirati kao dekadske (kao u gotovo svim programskim jezicima), a nakon </a:t>
-            </a:r>
-            <a:r>
-              <a:rPr b="0" lang="bs-BA" sz="2100" strike="noStrike" u="none">
-                <a:solidFill>
-                  <a:srgbClr val="009bdd"/>
-                </a:solidFill>
-                <a:uFillTx/>
-                <a:latin typeface="Courier New"/>
-              </a:rPr>
-              <a:t>base_hexadecimal</a:t>
-            </a:r>
-            <a:r>
-              <a:rPr b="0" lang="bs-BA" sz="2100" strike="noStrike" u="none">
-                <a:solidFill>
-                  <a:srgbClr val="009bdd"/>
-                </a:solidFill>
-                <a:uFillTx/>
-                <a:latin typeface="Arial"/>
-              </a:rPr>
-              <a:t> kao heksadekadske.</a:t>
-            </a:r>
-            <a:endParaRPr b="0" lang="bs-BA" sz="2100" strike="noStrike" u="none">
-              <a:solidFill>
-                <a:srgbClr val="009bdd"/>
-              </a:solidFill>
-              <a:uFillTx/>
-              <a:latin typeface="Arial"/>
-            </a:endParaRPr>
-          </a:p>
-          <a:p>
-            <a:pPr marL="432000" indent="-324000">
-              <a:spcBef>
-                <a:spcPts val="1060"/>
-              </a:spcBef>
-              <a:buClr>
-                <a:srgbClr val="77caee"/>
-              </a:buClr>
-              <a:buSzPct val="45000"/>
-              <a:buFont typeface="Wingdings" charset="2"/>
-              <a:buChar char=""/>
-            </a:pPr>
-            <a:r>
-              <a:rPr b="0" lang="bs-BA" sz="2100" strike="noStrike" u="none">
-                <a:solidFill>
-                  <a:srgbClr val="009bdd"/>
-                </a:solidFill>
-                <a:uFillTx/>
-                <a:latin typeface="Arial"/>
-              </a:rPr>
-              <a:t>Zbog načina na koji je asembler napravljen, ako se te naredbe stave u if-grananje ili while-petlju, može se dogoditi da pretprocesor interpretira konstante kao dekadske, a asembler kao heksadekadske. Nema očitog rješenja za taj problem.</a:t>
-            </a:r>
-            <a:endParaRPr b="0" lang="bs-BA" sz="2100" strike="noStrike" u="none">
-              <a:solidFill>
-                <a:srgbClr val="009bdd"/>
-              </a:solidFill>
-              <a:uFillTx/>
-              <a:latin typeface="Arial"/>
-            </a:endParaRPr>
-          </a:p>
-        </p:txBody>
-      </p:sp>
+        </p:txBody>
+      </p:sp>
+      <p:pic>
+        <p:nvPicPr>
+          <p:cNvPr id="94" name="" descr=""/>
+          <p:cNvPicPr/>
+          <p:nvPr/>
+        </p:nvPicPr>
+        <p:blipFill>
+          <a:blip r:embed="rId1"/>
+          <a:stretch/>
+        </p:blipFill>
+        <p:spPr>
+          <a:xfrm>
+            <a:off x="2507040" y="2289960"/>
+            <a:ext cx="5090040" cy="1104480"/>
+          </a:xfrm>
+          <a:prstGeom prst="rect">
+            <a:avLst/>
+          </a:prstGeom>
+          <a:noFill/>
+          <a:ln w="18000">
+            <a:noFill/>
+          </a:ln>
+        </p:spPr>
+      </p:pic>
+      <p:sp>
+        <p:nvSpPr>
+          <p:cNvPr id="95" name=""/>
+          <p:cNvSpPr/>
+          <p:nvPr/>
+        </p:nvSpPr>
+        <p:spPr>
+          <a:xfrm>
+            <a:off x="4898160" y="2468880"/>
+            <a:ext cx="359640" cy="359640"/>
+          </a:xfrm>
+          <a:prstGeom prst="ellipse">
+            <a:avLst/>
+          </a:prstGeom>
+          <a:noFill/>
+          <a:ln w="18000">
+            <a:solidFill>
+              <a:srgbClr val="009bdd"/>
+            </a:solidFill>
+            <a:round/>
+          </a:ln>
+        </p:spPr>
+        <p:style>
+          <a:lnRef idx="0"/>
+          <a:fillRef idx="0"/>
+          <a:effectRef idx="0"/>
+          <a:fontRef idx="minor"/>
+        </p:style>
+        <p:txBody>
+          <a:bodyPr wrap="none" lIns="90000" rIns="90000" tIns="45000" bIns="45000" anchor="ctr">
+            <a:noAutofit/>
+          </a:bodyPr>
+          <a:p>
+            <a:endParaRPr b="0" lang="bs-BA" sz="1800" strike="noStrike" u="none">
+              <a:solidFill>
+                <a:srgbClr val="000000"/>
+              </a:solidFill>
+              <a:uFillTx/>
+              <a:latin typeface="Arial"/>
+            </a:endParaRPr>
+          </a:p>
+        </p:txBody>
+      </p:sp>
+      <p:pic>
+        <p:nvPicPr>
+          <p:cNvPr id="96" name="" descr=""/>
+          <p:cNvPicPr/>
+          <p:nvPr/>
+        </p:nvPicPr>
+        <p:blipFill>
+          <a:blip r:embed="rId2"/>
+          <a:stretch/>
+        </p:blipFill>
+        <p:spPr>
+          <a:xfrm>
+            <a:off x="1356120" y="3527640"/>
+            <a:ext cx="7330680" cy="1371240"/>
+          </a:xfrm>
+          <a:prstGeom prst="rect">
+            <a:avLst/>
+          </a:prstGeom>
+          <a:noFill/>
+          <a:ln w="18000">
+            <a:noFill/>
+          </a:ln>
+        </p:spPr>
+      </p:pic>
       <p:sp>
         <p:nvSpPr>
           <p:cNvPr id="4" name="PlaceHolder 3"/>
@@ -7954,7 +7924,7 @@
         <p:txBody>
           <a:bodyPr/>
           <a:p>
-            <a:fld id="{A234171C-E7D1-44C0-A469-02C0F4F7B8E2}" type="slidenum">
+            <a:fld id="{3BDA46E8-AD75-4CDC-9064-F3E6E30D1FEE}" type="slidenum">
               <a:t>24</a:t>
             </a:fld>
           </a:p>
@@ -7974,9 +7944,9 @@
         <p:txBody>
           <a:bodyPr/>
           <a:p>
-            <a:fld id="{3C7E8B38-3990-4BE0-B383-680BDCE8699E}" type="datetime1">
+            <a:fld id="{C64C3C46-7DBE-4810-B874-29C85F44AADE}" type="datetime1">
               <a:rPr lang="en-US"/>
-              <a:t>04/24/2025</a:t>
+              <a:t>04/28/2025</a:t>
             </a:fld>
           </a:p>
         </p:txBody>
@@ -8013,7 +7983,7 @@
       </p:grpSpPr>
       <p:sp>
         <p:nvSpPr>
-          <p:cNvPr id="96" name="PlaceHolder 1"/>
+          <p:cNvPr id="97" name="PlaceHolder 1"/>
           <p:cNvSpPr>
             <a:spLocks noGrp="1"/>
           </p:cNvSpPr>
@@ -8023,8 +7993,8 @@
         </p:nvSpPr>
         <p:spPr>
           <a:xfrm>
-            <a:off x="360000" y="165960"/>
-            <a:ext cx="9360000" cy="506160"/>
+            <a:off x="360000" y="180000"/>
+            <a:ext cx="9360000" cy="478080"/>
           </a:xfrm>
           <a:prstGeom prst="rect">
             <a:avLst/>
@@ -8050,17 +8020,7 @@
                 <a:uFillTx/>
                 <a:latin typeface="Arial"/>
               </a:rPr>
-              <a:t>Pretprocesorska naredba </a:t>
-            </a:r>
-            <a:r>
-              <a:rPr b="0" lang="bs-BA" sz="3300" strike="noStrike" u="none">
-                <a:solidFill>
-                  <a:srgbClr val="ffffff"/>
-                </a:solidFill>
-                <a:uFillTx/>
-                <a:latin typeface="Courier New"/>
-              </a:rPr>
-              <a:t>print_string</a:t>
+              <a:t>Bilješke o sintaksi</a:t>
             </a:r>
             <a:endParaRPr b="0" lang="bs-BA" sz="3300" strike="noStrike" u="none">
               <a:solidFill>
@@ -8074,7 +8034,7 @@
       </p:sp>
       <p:sp>
         <p:nvSpPr>
-          <p:cNvPr id="97" name="PlaceHolder 2"/>
+          <p:cNvPr id="98" name="PlaceHolder 2"/>
           <p:cNvSpPr>
             <a:spLocks noGrp="1"/>
           </p:cNvSpPr>
@@ -8112,36 +8072,16 @@
               <a:buChar char=""/>
             </a:pPr>
             <a:r>
-              <a:rPr b="0" lang="bs-BA" sz="1600" strike="noStrike" u="none">
-                <a:solidFill>
-                  <a:srgbClr val="009bdd"/>
-                </a:solidFill>
-                <a:uFillTx/>
-                <a:latin typeface="Arial"/>
-              </a:rPr>
-              <a:t>Pretprocesor od mog PicoBlaze asemblera od verzije v5.3.0 pa nadalje podržava naredbu </a:t>
-            </a:r>
-            <a:r>
-              <a:rPr b="0" lang="bs-BA" sz="1600" strike="noStrike" u="none">
-                <a:solidFill>
-                  <a:srgbClr val="009bdd"/>
-                </a:solidFill>
-                <a:uFillTx/>
-                <a:latin typeface="Courier New"/>
-              </a:rPr>
-              <a:t>print_string</a:t>
-            </a:r>
-            <a:r>
-              <a:rPr b="0" lang="bs-BA" sz="1600" strike="noStrike" u="none">
-                <a:solidFill>
-                  <a:srgbClr val="009bdd"/>
-                </a:solidFill>
-                <a:uFillTx/>
-                <a:latin typeface="Times New Roman"/>
-              </a:rPr>
-              <a:t>.</a:t>
-            </a:r>
-            <a:endParaRPr b="0" lang="bs-BA" sz="1600" strike="noStrike" u="none">
+              <a:rPr b="0" lang="bs-BA" sz="2100" strike="noStrike" u="none">
+                <a:solidFill>
+                  <a:srgbClr val="009bdd"/>
+                </a:solidFill>
+                <a:uFillTx/>
+                <a:latin typeface="Arial"/>
+              </a:rPr>
+              <a:t>Moj asembler za PicoBlaze cilja na punu kompatibilnost sa Xilinxovim službenim asemblerom za PicoBlaze. To, na žalost, znači da se numerički literali bez eksplicitno određene brojevne baze interpretiraju kao heksadekadski.</a:t>
+            </a:r>
+            <a:endParaRPr b="0" lang="bs-BA" sz="2100" strike="noStrike" u="none">
               <a:solidFill>
                 <a:srgbClr val="009bdd"/>
               </a:solidFill>
@@ -8162,29 +8102,56 @@
               <a:buChar char=""/>
             </a:pPr>
             <a:r>
-              <a:rPr b="0" lang="bs-BA" sz="1600" strike="noStrike" u="none">
-                <a:solidFill>
-                  <a:srgbClr val="009bdd"/>
-                </a:solidFill>
-                <a:uFillTx/>
-                <a:latin typeface="Arial"/>
-              </a:rPr>
-              <a:t>Primjer korištenja:</a:t>
-            </a:r>
-            <a:br>
-              <a:rPr sz="1600"/>
-            </a:br>
-            <a:r>
-              <a:rPr b="0" lang="bs-BA" sz="1600" strike="noStrike" u="none">
+              <a:rPr b="0" lang="bs-BA" sz="2100" strike="noStrike" u="none">
+                <a:solidFill>
+                  <a:srgbClr val="009bdd"/>
+                </a:solidFill>
+                <a:uFillTx/>
+                <a:latin typeface="Arial"/>
+              </a:rPr>
+              <a:t>Od verzije v5.0.0 to se ponašanje može promijeniti: pretprocesor i asembler će sve brojevne literale bez specificirane baze nakon direktive </a:t>
+            </a:r>
+            <a:r>
+              <a:rPr b="0" lang="bs-BA" sz="2100" strike="noStrike" u="none">
                 <a:solidFill>
                   <a:srgbClr val="009bdd"/>
                 </a:solidFill>
                 <a:uFillTx/>
                 <a:latin typeface="Courier New"/>
               </a:rPr>
-              <a:t>print_string "Hello world!", s9, UART_TX</a:t>
-            </a:r>
-            <a:endParaRPr b="0" lang="bs-BA" sz="1600" strike="noStrike" u="none">
+              <a:t>base_decimal</a:t>
+            </a:r>
+            <a:r>
+              <a:rPr b="0" lang="bs-BA" sz="2100" strike="noStrike" u="none">
+                <a:solidFill>
+                  <a:srgbClr val="009bdd"/>
+                </a:solidFill>
+                <a:uFillTx/>
+                <a:latin typeface="Arial"/>
+              </a:rPr>
+              <a:t> interpretirati kao dekadske (kao u gotovo svim programskim jezicima), a nakon </a:t>
+            </a:r>
+            <a:r>
+              <a:rPr b="0" lang="bs-BA" sz="2100" strike="noStrike" u="none">
+                <a:solidFill>
+                  <a:srgbClr val="009bdd"/>
+                </a:solidFill>
+                <a:uFillTx/>
+                <a:latin typeface="Courier New"/>
+              </a:rPr>
+              <a:t>base_hexadecimal</a:t>
+            </a:r>
+            <a:r>
+              <a:rPr b="0" lang="bs-BA" sz="2100" strike="noStrike" u="none">
+                <a:solidFill>
+                  <a:srgbClr val="009bdd"/>
+                </a:solidFill>
+                <a:uFillTx/>
+                <a:latin typeface="Arial"/>
+              </a:rPr>
+              <a:t> kao heksadekadske.</a:t>
+            </a:r>
+            <a:endParaRPr b="0" lang="bs-BA" sz="2100" strike="noStrike" u="none">
               <a:solidFill>
                 <a:srgbClr val="009bdd"/>
               </a:solidFill>
@@ -8205,81 +8172,16 @@
               <a:buChar char=""/>
             </a:pPr>
             <a:r>
-              <a:rPr b="0" lang="bs-BA" sz="1600" strike="noStrike" u="none">
-                <a:solidFill>
-                  <a:srgbClr val="009bdd"/>
-                </a:solidFill>
-                <a:uFillTx/>
-                <a:latin typeface="Arial"/>
-              </a:rPr>
-              <a:t>To se pri pretprocesiranju zamjenjuje mnemonikama:</a:t>
-            </a:r>
-            <a:br>
-              <a:rPr sz="1600"/>
-            </a:br>
-            <a:r>
-              <a:rPr b="0" lang="bs-BA" sz="1600" strike="noStrike" u="none">
-                <a:solidFill>
-                  <a:srgbClr val="009bdd"/>
-                </a:solidFill>
-                <a:uFillTx/>
-                <a:latin typeface="Courier New"/>
-              </a:rPr>
-              <a:t>load s9, "H"</a:t>
-            </a:r>
-            <a:br>
-              <a:rPr sz="1600"/>
-            </a:br>
-            <a:r>
-              <a:rPr b="0" lang="bs-BA" sz="1600" strike="noStrike" u="none">
-                <a:solidFill>
-                  <a:srgbClr val="009bdd"/>
-                </a:solidFill>
-                <a:uFillTx/>
-                <a:latin typeface="Courier New"/>
-              </a:rPr>
-              <a:t>call UART_TX</a:t>
-            </a:r>
-            <a:br>
-              <a:rPr sz="1600"/>
-            </a:br>
-            <a:r>
-              <a:rPr b="0" lang="bs-BA" sz="1600" strike="noStrike" u="none">
-                <a:solidFill>
-                  <a:srgbClr val="009bdd"/>
-                </a:solidFill>
-                <a:uFillTx/>
-                <a:latin typeface="Courier New"/>
-              </a:rPr>
-              <a:t>load s9, "e"</a:t>
-            </a:r>
-            <a:br>
-              <a:rPr sz="1600"/>
-            </a:br>
-            <a:r>
-              <a:rPr b="0" lang="bs-BA" sz="1600" strike="noStrike" u="none">
-                <a:solidFill>
-                  <a:srgbClr val="009bdd"/>
-                </a:solidFill>
-                <a:uFillTx/>
-                <a:latin typeface="Courier New"/>
-              </a:rPr>
-              <a:t>call UART_TX</a:t>
-            </a:r>
-            <a:br>
-              <a:rPr sz="1600"/>
-            </a:br>
-            <a:r>
-              <a:rPr b="0" lang="bs-BA" sz="1600" strike="noStrike" u="none">
-                <a:solidFill>
-                  <a:srgbClr val="009bdd"/>
-                </a:solidFill>
-                <a:uFillTx/>
-                <a:latin typeface="Courier New"/>
-              </a:rPr>
-              <a:t>...</a:t>
-            </a:r>
-            <a:endParaRPr b="0" lang="bs-BA" sz="1600" strike="noStrike" u="none">
+              <a:rPr b="0" lang="bs-BA" sz="2100" strike="noStrike" u="none">
+                <a:solidFill>
+                  <a:srgbClr val="009bdd"/>
+                </a:solidFill>
+                <a:uFillTx/>
+                <a:latin typeface="Arial"/>
+              </a:rPr>
+              <a:t>Zbog načina na koji je asembler napravljen, ako se te naredbe stave u if-grananje ili while-petlju, može se dogoditi da pretprocesor interpretira konstante kao dekadske, a asembler kao heksadekadske. Nema očitog rješenja za taj problem.</a:t>
+            </a:r>
+            <a:endParaRPr b="0" lang="bs-BA" sz="2100" strike="noStrike" u="none">
               <a:solidFill>
                 <a:srgbClr val="009bdd"/>
               </a:solidFill>
@@ -8287,106 +8189,6 @@
               <a:latin typeface="Arial"/>
             </a:endParaRPr>
           </a:p>
-          <a:p>
-            <a:pPr marL="432000" indent="-324000">
-              <a:spcBef>
-                <a:spcPts val="1060"/>
-              </a:spcBef>
-              <a:buClr>
-                <a:srgbClr val="77caee"/>
-              </a:buClr>
-              <a:buSzPct val="45000"/>
-              <a:buFont typeface="Wingdings" charset="2"/>
-              <a:buChar char=""/>
-            </a:pPr>
-            <a:r>
-              <a:rPr b="0" lang="bs-BA" sz="1600" strike="noStrike" u="none">
-                <a:solidFill>
-                  <a:srgbClr val="009bdd"/>
-                </a:solidFill>
-                <a:uFillTx/>
-                <a:latin typeface="Arial"/>
-              </a:rPr>
-              <a:t>To je skratilo kôd primjera “</a:t>
-            </a:r>
-            <a:r>
-              <a:rPr b="0" i="1" lang="bs-BA" sz="1600" strike="noStrike" u="none">
-                <a:solidFill>
-                  <a:srgbClr val="009bdd"/>
-                </a:solidFill>
-                <a:uFillTx/>
-                <a:latin typeface="Arial"/>
-              </a:rPr>
-              <a:t>Permutations Algorithm</a:t>
-            </a:r>
-            <a:r>
-              <a:rPr b="0" lang="bs-BA" sz="1600" strike="noStrike" u="none">
-                <a:solidFill>
-                  <a:srgbClr val="009bdd"/>
-                </a:solidFill>
-                <a:uFillTx/>
-                <a:latin typeface="Arial"/>
-              </a:rPr>
-              <a:t>” s preko 1000 redaka na manje od 400 redaka.</a:t>
-            </a:r>
-            <a:endParaRPr b="0" lang="bs-BA" sz="1600" strike="noStrike" u="none">
-              <a:solidFill>
-                <a:srgbClr val="009bdd"/>
-              </a:solidFill>
-              <a:uFillTx/>
-              <a:latin typeface="Arial"/>
-            </a:endParaRPr>
-          </a:p>
-          <a:p>
-            <a:pPr marL="432000" indent="-324000">
-              <a:spcBef>
-                <a:spcPts val="1060"/>
-              </a:spcBef>
-              <a:buClr>
-                <a:srgbClr val="77caee"/>
-              </a:buClr>
-              <a:buSzPct val="45000"/>
-              <a:buFont typeface="Wingdings" charset="2"/>
-              <a:buChar char=""/>
-            </a:pPr>
-            <a:r>
-              <a:rPr b="0" lang="bs-BA" sz="1600" strike="noStrike" u="none">
-                <a:solidFill>
-                  <a:srgbClr val="009bdd"/>
-                </a:solidFill>
-                <a:uFillTx/>
-                <a:latin typeface="Arial"/>
-              </a:rPr>
-              <a:t>Do verzije v5.3.2, breakpoint stavljen na </a:t>
-            </a:r>
-            <a:r>
-              <a:rPr b="0" lang="bs-BA" sz="1600" strike="noStrike" u="none">
-                <a:solidFill>
-                  <a:srgbClr val="009bdd"/>
-                </a:solidFill>
-                <a:uFillTx/>
-                <a:latin typeface="Courier New"/>
-              </a:rPr>
-              <a:t>print_string</a:t>
-            </a:r>
-            <a:r>
-              <a:rPr b="0" lang="bs-BA" sz="1600" strike="noStrike" u="none">
-                <a:solidFill>
-                  <a:srgbClr val="009bdd"/>
-                </a:solidFill>
-                <a:uFillTx/>
-                <a:latin typeface="Arial"/>
-              </a:rPr>
-              <a:t> okinuo bi se dva puta onoliko puta koliko ima znakova u stringu (za svaku mašinsku naredbu koja dolazi iz te asemblerske linije), ali to je ispravljeno. Sada se okine samo jednom.</a:t>
-            </a:r>
-            <a:endParaRPr b="0" lang="bs-BA" sz="1600" strike="noStrike" u="none">
-              <a:solidFill>
-                <a:srgbClr val="009bdd"/>
-              </a:solidFill>
-              <a:uFillTx/>
-              <a:latin typeface="Arial"/>
-            </a:endParaRPr>
-          </a:p>
         </p:txBody>
       </p:sp>
       <p:sp>
@@ -8403,7 +8205,7 @@
         <p:txBody>
           <a:bodyPr/>
           <a:p>
-            <a:fld id="{22D609E3-12D0-49D6-B9FA-1FEC8B89D60F}" type="slidenum">
+            <a:fld id="{758CDE05-63C7-4B7A-B24F-46DAFA693643}" type="slidenum">
               <a:t>25</a:t>
             </a:fld>
           </a:p>
@@ -8423,9 +8225,9 @@
         <p:txBody>
           <a:bodyPr/>
           <a:p>
-            <a:fld id="{4190EBA8-EAB5-454D-A776-6F77E10F75A8}" type="datetime1">
+            <a:fld id="{A0B30B31-5E0F-4F88-9A45-3E738B0001F6}" type="datetime1">
               <a:rPr lang="en-US"/>
-              <a:t>04/24/2025</a:t>
+              <a:t>04/28/2025</a:t>
             </a:fld>
           </a:p>
         </p:txBody>
@@ -8462,7 +8264,7 @@
       </p:grpSpPr>
       <p:sp>
         <p:nvSpPr>
-          <p:cNvPr id="98" name="PlaceHolder 1"/>
+          <p:cNvPr id="99" name="PlaceHolder 1"/>
           <p:cNvSpPr>
             <a:spLocks noGrp="1"/>
           </p:cNvSpPr>
@@ -8472,8 +8274,8 @@
         </p:nvSpPr>
         <p:spPr>
           <a:xfrm>
-            <a:off x="360000" y="180000"/>
-            <a:ext cx="9360000" cy="478080"/>
+            <a:off x="360000" y="165960"/>
+            <a:ext cx="9360000" cy="506160"/>
           </a:xfrm>
           <a:prstGeom prst="rect">
             <a:avLst/>
@@ -8499,7 +8301,17 @@
                 <a:uFillTx/>
                 <a:latin typeface="Arial"/>
               </a:rPr>
-              <a:t>Bilješke o arhitekturi</a:t>
+              <a:t>Pretprocesorska naredba </a:t>
+            </a:r>
+            <a:r>
+              <a:rPr b="0" lang="bs-BA" sz="3300" strike="noStrike" u="none">
+                <a:solidFill>
+                  <a:srgbClr val="ffffff"/>
+                </a:solidFill>
+                <a:uFillTx/>
+                <a:latin typeface="Courier New"/>
+              </a:rPr>
+              <a:t>print_string</a:t>
             </a:r>
             <a:endParaRPr b="0" lang="bs-BA" sz="3300" strike="noStrike" u="none">
               <a:solidFill>
@@ -8513,7 +8325,7 @@
       </p:sp>
       <p:sp>
         <p:nvSpPr>
-          <p:cNvPr id="99" name="PlaceHolder 2"/>
+          <p:cNvPr id="100" name="PlaceHolder 2"/>
           <p:cNvSpPr>
             <a:spLocks noGrp="1"/>
           </p:cNvSpPr>
@@ -8551,16 +8363,36 @@
               <a:buChar char=""/>
             </a:pPr>
             <a:r>
-              <a:rPr b="0" lang="bs-BA" sz="2400" strike="noStrike" u="none">
-                <a:solidFill>
-                  <a:srgbClr val="009bdd"/>
-                </a:solidFill>
-                <a:uFillTx/>
-                <a:latin typeface="Arial"/>
-              </a:rPr>
-              <a:t>Parseri većine asemblera pretvaraju tokenizirani asemblerski kod u dvodimenzionalno polje (tablicu) malih stabala (gdje su samo aritmetički izrazi stabla, a ostalo su pojedinačni čvorovi).</a:t>
-            </a:r>
-            <a:endParaRPr b="0" lang="bs-BA" sz="2400" strike="noStrike" u="none">
+              <a:rPr b="0" lang="bs-BA" sz="1600" strike="noStrike" u="none">
+                <a:solidFill>
+                  <a:srgbClr val="009bdd"/>
+                </a:solidFill>
+                <a:uFillTx/>
+                <a:latin typeface="Arial"/>
+              </a:rPr>
+              <a:t>Pretprocesor od mog PicoBlaze asemblera od verzije v5.3.0 pa nadalje podržava naredbu </a:t>
+            </a:r>
+            <a:r>
+              <a:rPr b="0" lang="bs-BA" sz="1600" strike="noStrike" u="none">
+                <a:solidFill>
+                  <a:srgbClr val="009bdd"/>
+                </a:solidFill>
+                <a:uFillTx/>
+                <a:latin typeface="Courier New"/>
+              </a:rPr>
+              <a:t>print_string</a:t>
+            </a:r>
+            <a:r>
+              <a:rPr b="0" lang="bs-BA" sz="1600" strike="noStrike" u="none">
+                <a:solidFill>
+                  <a:srgbClr val="009bdd"/>
+                </a:solidFill>
+                <a:uFillTx/>
+                <a:latin typeface="Times New Roman"/>
+              </a:rPr>
+              <a:t>.</a:t>
+            </a:r>
+            <a:endParaRPr b="0" lang="bs-BA" sz="1600" strike="noStrike" u="none">
               <a:solidFill>
                 <a:srgbClr val="009bdd"/>
               </a:solidFill>
@@ -8581,16 +8413,29 @@
               <a:buChar char=""/>
             </a:pPr>
             <a:r>
-              <a:rPr b="0" lang="bs-BA" sz="2400" strike="noStrike" u="none">
-                <a:solidFill>
-                  <a:srgbClr val="009bdd"/>
-                </a:solidFill>
-                <a:uFillTx/>
-                <a:latin typeface="Arial"/>
-              </a:rPr>
-              <a:t>Parser u ovom asembleru za PicoBlaze pretvara tokenizirani asemblerski kod u jedno veliko stablo. Korijen tog stabla je čvor s tekstom “assembly”, a čvorovi dubine 1 su mnemonike, pretprocesorske naredbe i labeli.</a:t>
-            </a:r>
-            <a:endParaRPr b="0" lang="bs-BA" sz="2400" strike="noStrike" u="none">
+              <a:rPr b="0" lang="bs-BA" sz="1600" strike="noStrike" u="none">
+                <a:solidFill>
+                  <a:srgbClr val="009bdd"/>
+                </a:solidFill>
+                <a:uFillTx/>
+                <a:latin typeface="Arial"/>
+              </a:rPr>
+              <a:t>Primjer korištenja:</a:t>
+            </a:r>
+            <a:br>
+              <a:rPr sz="1600"/>
+            </a:br>
+            <a:r>
+              <a:rPr b="0" lang="bs-BA" sz="1600" strike="noStrike" u="none">
+                <a:solidFill>
+                  <a:srgbClr val="009bdd"/>
+                </a:solidFill>
+                <a:uFillTx/>
+                <a:latin typeface="Courier New"/>
+              </a:rPr>
+              <a:t>print_string "Hello world!", s9, UART_TX</a:t>
+            </a:r>
+            <a:endParaRPr b="0" lang="bs-BA" sz="1600" strike="noStrike" u="none">
               <a:solidFill>
                 <a:srgbClr val="009bdd"/>
               </a:solidFill>
@@ -8611,16 +8456,81 @@
               <a:buChar char=""/>
             </a:pPr>
             <a:r>
-              <a:rPr b="0" lang="bs-BA" sz="2400" strike="noStrike" u="none">
-                <a:solidFill>
-                  <a:srgbClr val="009bdd"/>
-                </a:solidFill>
-                <a:uFillTx/>
-                <a:latin typeface="Arial"/>
-              </a:rPr>
-              <a:t>Operandi mnemonika i pretprocesorskih naredbi njihova su djeca.</a:t>
-            </a:r>
-            <a:endParaRPr b="0" lang="bs-BA" sz="2400" strike="noStrike" u="none">
+              <a:rPr b="0" lang="bs-BA" sz="1600" strike="noStrike" u="none">
+                <a:solidFill>
+                  <a:srgbClr val="009bdd"/>
+                </a:solidFill>
+                <a:uFillTx/>
+                <a:latin typeface="Arial"/>
+              </a:rPr>
+              <a:t>To se pri pretprocesiranju zamjenjuje mnemonikama:</a:t>
+            </a:r>
+            <a:br>
+              <a:rPr sz="1600"/>
+            </a:br>
+            <a:r>
+              <a:rPr b="0" lang="bs-BA" sz="1600" strike="noStrike" u="none">
+                <a:solidFill>
+                  <a:srgbClr val="009bdd"/>
+                </a:solidFill>
+                <a:uFillTx/>
+                <a:latin typeface="Courier New"/>
+              </a:rPr>
+              <a:t>load s9, "H"</a:t>
+            </a:r>
+            <a:br>
+              <a:rPr sz="1600"/>
+            </a:br>
+            <a:r>
+              <a:rPr b="0" lang="bs-BA" sz="1600" strike="noStrike" u="none">
+                <a:solidFill>
+                  <a:srgbClr val="009bdd"/>
+                </a:solidFill>
+                <a:uFillTx/>
+                <a:latin typeface="Courier New"/>
+              </a:rPr>
+              <a:t>call UART_TX</a:t>
+            </a:r>
+            <a:br>
+              <a:rPr sz="1600"/>
+            </a:br>
+            <a:r>
+              <a:rPr b="0" lang="bs-BA" sz="1600" strike="noStrike" u="none">
+                <a:solidFill>
+                  <a:srgbClr val="009bdd"/>
+                </a:solidFill>
+                <a:uFillTx/>
+                <a:latin typeface="Courier New"/>
+              </a:rPr>
+              <a:t>load s9, "e"</a:t>
+            </a:r>
+            <a:br>
+              <a:rPr sz="1600"/>
+            </a:br>
+            <a:r>
+              <a:rPr b="0" lang="bs-BA" sz="1600" strike="noStrike" u="none">
+                <a:solidFill>
+                  <a:srgbClr val="009bdd"/>
+                </a:solidFill>
+                <a:uFillTx/>
+                <a:latin typeface="Courier New"/>
+              </a:rPr>
+              <a:t>call UART_TX</a:t>
+            </a:r>
+            <a:br>
+              <a:rPr sz="1600"/>
+            </a:br>
+            <a:r>
+              <a:rPr b="0" lang="bs-BA" sz="1600" strike="noStrike" u="none">
+                <a:solidFill>
+                  <a:srgbClr val="009bdd"/>
+                </a:solidFill>
+                <a:uFillTx/>
+                <a:latin typeface="Courier New"/>
+              </a:rPr>
+              <a:t>...</a:t>
+            </a:r>
+            <a:endParaRPr b="0" lang="bs-BA" sz="1600" strike="noStrike" u="none">
               <a:solidFill>
                 <a:srgbClr val="009bdd"/>
               </a:solidFill>
@@ -8628,6 +8538,106 @@
               <a:latin typeface="Arial"/>
             </a:endParaRPr>
           </a:p>
+          <a:p>
+            <a:pPr marL="432000" indent="-324000">
+              <a:spcBef>
+                <a:spcPts val="1060"/>
+              </a:spcBef>
+              <a:buClr>
+                <a:srgbClr val="77caee"/>
+              </a:buClr>
+              <a:buSzPct val="45000"/>
+              <a:buFont typeface="Wingdings" charset="2"/>
+              <a:buChar char=""/>
+            </a:pPr>
+            <a:r>
+              <a:rPr b="0" lang="bs-BA" sz="1600" strike="noStrike" u="none">
+                <a:solidFill>
+                  <a:srgbClr val="009bdd"/>
+                </a:solidFill>
+                <a:uFillTx/>
+                <a:latin typeface="Arial"/>
+              </a:rPr>
+              <a:t>To je skratilo kôd primjera “</a:t>
+            </a:r>
+            <a:r>
+              <a:rPr b="0" i="1" lang="bs-BA" sz="1600" strike="noStrike" u="none">
+                <a:solidFill>
+                  <a:srgbClr val="009bdd"/>
+                </a:solidFill>
+                <a:uFillTx/>
+                <a:latin typeface="Arial"/>
+              </a:rPr>
+              <a:t>Permutations Algorithm</a:t>
+            </a:r>
+            <a:r>
+              <a:rPr b="0" lang="bs-BA" sz="1600" strike="noStrike" u="none">
+                <a:solidFill>
+                  <a:srgbClr val="009bdd"/>
+                </a:solidFill>
+                <a:uFillTx/>
+                <a:latin typeface="Arial"/>
+              </a:rPr>
+              <a:t>” s preko 1000 redaka na manje od 400 redaka.</a:t>
+            </a:r>
+            <a:endParaRPr b="0" lang="bs-BA" sz="1600" strike="noStrike" u="none">
+              <a:solidFill>
+                <a:srgbClr val="009bdd"/>
+              </a:solidFill>
+              <a:uFillTx/>
+              <a:latin typeface="Arial"/>
+            </a:endParaRPr>
+          </a:p>
+          <a:p>
+            <a:pPr marL="432000" indent="-324000">
+              <a:spcBef>
+                <a:spcPts val="1060"/>
+              </a:spcBef>
+              <a:buClr>
+                <a:srgbClr val="77caee"/>
+              </a:buClr>
+              <a:buSzPct val="45000"/>
+              <a:buFont typeface="Wingdings" charset="2"/>
+              <a:buChar char=""/>
+            </a:pPr>
+            <a:r>
+              <a:rPr b="0" lang="bs-BA" sz="1600" strike="noStrike" u="none">
+                <a:solidFill>
+                  <a:srgbClr val="009bdd"/>
+                </a:solidFill>
+                <a:uFillTx/>
+                <a:latin typeface="Arial"/>
+              </a:rPr>
+              <a:t>Do verzije v5.3.2, breakpoint stavljen na </a:t>
+            </a:r>
+            <a:r>
+              <a:rPr b="0" lang="bs-BA" sz="1600" strike="noStrike" u="none">
+                <a:solidFill>
+                  <a:srgbClr val="009bdd"/>
+                </a:solidFill>
+                <a:uFillTx/>
+                <a:latin typeface="Courier New"/>
+              </a:rPr>
+              <a:t>print_string</a:t>
+            </a:r>
+            <a:r>
+              <a:rPr b="0" lang="bs-BA" sz="1600" strike="noStrike" u="none">
+                <a:solidFill>
+                  <a:srgbClr val="009bdd"/>
+                </a:solidFill>
+                <a:uFillTx/>
+                <a:latin typeface="Arial"/>
+              </a:rPr>
+              <a:t> okinuo bi se dva puta onoliko puta koliko ima znakova u stringu (za svaku mašinsku naredbu koja dolazi iz te asemblerske linije), ali to je ispravljeno. Sada se okine samo jednom.</a:t>
+            </a:r>
+            <a:endParaRPr b="0" lang="bs-BA" sz="1600" strike="noStrike" u="none">
+              <a:solidFill>
+                <a:srgbClr val="009bdd"/>
+              </a:solidFill>
+              <a:uFillTx/>
+              <a:latin typeface="Arial"/>
+            </a:endParaRPr>
+          </a:p>
         </p:txBody>
       </p:sp>
       <p:sp>
@@ -8644,7 +8654,7 @@
         <p:txBody>
           <a:bodyPr/>
           <a:p>
-            <a:fld id="{AE519DE6-C00E-469F-8F90-88515A23F4A7}" type="slidenum">
+            <a:fld id="{3D77773D-89E1-414E-9C5E-40E8D05EB519}" type="slidenum">
               <a:t>26</a:t>
             </a:fld>
           </a:p>
@@ -8664,9 +8674,9 @@
         <p:txBody>
           <a:bodyPr/>
           <a:p>
-            <a:fld id="{FC5232A8-EC8E-4F9B-9693-52585965E495}" type="datetime1">
+            <a:fld id="{457C2939-4BBA-468E-B067-3BBEE535E7F6}" type="datetime1">
               <a:rPr lang="en-US"/>
-              <a:t>04/24/2025</a:t>
+              <a:t>04/28/2025</a:t>
             </a:fld>
           </a:p>
         </p:txBody>
@@ -8703,7 +8713,248 @@
       </p:grpSpPr>
       <p:sp>
         <p:nvSpPr>
-          <p:cNvPr id="100" name="PlaceHolder 1"/>
+          <p:cNvPr id="101" name="PlaceHolder 1"/>
+          <p:cNvSpPr>
+            <a:spLocks noGrp="1"/>
+          </p:cNvSpPr>
+          <p:nvPr>
+            <p:ph type="title"/>
+          </p:nvPr>
+        </p:nvSpPr>
+        <p:spPr>
+          <a:xfrm>
+            <a:off x="360000" y="180000"/>
+            <a:ext cx="9360000" cy="478080"/>
+          </a:xfrm>
+          <a:prstGeom prst="rect">
+            <a:avLst/>
+          </a:prstGeom>
+          <a:noFill/>
+          <a:ln w="0">
+            <a:noFill/>
+          </a:ln>
+        </p:spPr>
+        <p:txBody>
+          <a:bodyPr lIns="0" rIns="0" tIns="0" bIns="0" anchor="ctr">
+            <a:noAutofit/>
+          </a:bodyPr>
+          <a:p>
+            <a:pPr indent="0" algn="ctr">
+              <a:buNone/>
+            </a:pPr>
+            <a:r>
+              <a:rPr b="0" lang="bs-BA" sz="3300" strike="noStrike" u="none">
+                <a:solidFill>
+                  <a:srgbClr val="ffffff"/>
+                </a:solidFill>
+                <a:uFillTx/>
+                <a:latin typeface="Arial"/>
+              </a:rPr>
+              <a:t>Bilješke o arhitekturi</a:t>
+            </a:r>
+            <a:endParaRPr b="0" lang="bs-BA" sz="3300" strike="noStrike" u="none">
+              <a:solidFill>
+                <a:srgbClr val="ffffff"/>
+              </a:solidFill>
+              <a:uFillTx/>
+              <a:latin typeface="Arial"/>
+            </a:endParaRPr>
+          </a:p>
+        </p:txBody>
+      </p:sp>
+      <p:sp>
+        <p:nvSpPr>
+          <p:cNvPr id="102" name="PlaceHolder 2"/>
+          <p:cNvSpPr>
+            <a:spLocks noGrp="1"/>
+          </p:cNvSpPr>
+          <p:nvPr>
+            <p:ph/>
+          </p:nvPr>
+        </p:nvSpPr>
+        <p:spPr>
+          <a:xfrm>
+            <a:off x="360000" y="1080000"/>
+            <a:ext cx="9360000" cy="3600000"/>
+          </a:xfrm>
+          <a:prstGeom prst="rect">
+            <a:avLst/>
+          </a:prstGeom>
+          <a:noFill/>
+          <a:ln w="0">
+            <a:noFill/>
+          </a:ln>
+        </p:spPr>
+        <p:txBody>
+          <a:bodyPr lIns="0" rIns="0" tIns="0" bIns="0" anchor="t">
+            <a:noAutofit/>
+          </a:bodyPr>
+          <a:p>
+            <a:pPr marL="432000" indent="-324000">
+              <a:spcBef>
+                <a:spcPts val="1060"/>
+              </a:spcBef>
+              <a:buClr>
+                <a:srgbClr val="77caee"/>
+              </a:buClr>
+              <a:buSzPct val="45000"/>
+              <a:buFont typeface="Wingdings" charset="2"/>
+              <a:buChar char=""/>
+            </a:pPr>
+            <a:r>
+              <a:rPr b="0" lang="bs-BA" sz="2400" strike="noStrike" u="none">
+                <a:solidFill>
+                  <a:srgbClr val="009bdd"/>
+                </a:solidFill>
+                <a:uFillTx/>
+                <a:latin typeface="Arial"/>
+              </a:rPr>
+              <a:t>Parseri većine asemblera pretvaraju tokenizirani asemblerski kod u dvodimenzionalno polje (tablicu) malih stabala (gdje su samo aritmetički izrazi stabla, a ostalo su pojedinačni čvorovi).</a:t>
+            </a:r>
+            <a:endParaRPr b="0" lang="bs-BA" sz="2400" strike="noStrike" u="none">
+              <a:solidFill>
+                <a:srgbClr val="009bdd"/>
+              </a:solidFill>
+              <a:uFillTx/>
+              <a:latin typeface="Arial"/>
+            </a:endParaRPr>
+          </a:p>
+          <a:p>
+            <a:pPr marL="432000" indent="-324000">
+              <a:spcBef>
+                <a:spcPts val="1060"/>
+              </a:spcBef>
+              <a:buClr>
+                <a:srgbClr val="77caee"/>
+              </a:buClr>
+              <a:buSzPct val="45000"/>
+              <a:buFont typeface="Wingdings" charset="2"/>
+              <a:buChar char=""/>
+            </a:pPr>
+            <a:r>
+              <a:rPr b="0" lang="bs-BA" sz="2400" strike="noStrike" u="none">
+                <a:solidFill>
+                  <a:srgbClr val="009bdd"/>
+                </a:solidFill>
+                <a:uFillTx/>
+                <a:latin typeface="Arial"/>
+              </a:rPr>
+              <a:t>Parser u ovom asembleru za PicoBlaze pretvara tokenizirani asemblerski kod u jedno veliko stablo. Korijen tog stabla je čvor s tekstom “assembly”, a čvorovi dubine 1 su mnemonike, pretprocesorske naredbe i labeli.</a:t>
+            </a:r>
+            <a:endParaRPr b="0" lang="bs-BA" sz="2400" strike="noStrike" u="none">
+              <a:solidFill>
+                <a:srgbClr val="009bdd"/>
+              </a:solidFill>
+              <a:uFillTx/>
+              <a:latin typeface="Arial"/>
+            </a:endParaRPr>
+          </a:p>
+          <a:p>
+            <a:pPr marL="432000" indent="-324000">
+              <a:spcBef>
+                <a:spcPts val="1060"/>
+              </a:spcBef>
+              <a:buClr>
+                <a:srgbClr val="77caee"/>
+              </a:buClr>
+              <a:buSzPct val="45000"/>
+              <a:buFont typeface="Wingdings" charset="2"/>
+              <a:buChar char=""/>
+            </a:pPr>
+            <a:r>
+              <a:rPr b="0" lang="bs-BA" sz="2400" strike="noStrike" u="none">
+                <a:solidFill>
+                  <a:srgbClr val="009bdd"/>
+                </a:solidFill>
+                <a:uFillTx/>
+                <a:latin typeface="Arial"/>
+              </a:rPr>
+              <a:t>Operandi mnemonika i pretprocesorskih naredbi njihova su djeca.</a:t>
+            </a:r>
+            <a:endParaRPr b="0" lang="bs-BA" sz="2400" strike="noStrike" u="none">
+              <a:solidFill>
+                <a:srgbClr val="009bdd"/>
+              </a:solidFill>
+              <a:uFillTx/>
+              <a:latin typeface="Arial"/>
+            </a:endParaRPr>
+          </a:p>
+        </p:txBody>
+      </p:sp>
+      <p:sp>
+        <p:nvSpPr>
+          <p:cNvPr id="4" name="PlaceHolder 3"/>
+          <p:cNvSpPr>
+            <a:spLocks noGrp="1"/>
+          </p:cNvSpPr>
+          <p:nvPr>
+            <p:ph type="sldNum" idx="6"/>
+          </p:nvPr>
+        </p:nvSpPr>
+        <p:spPr/>
+        <p:txBody>
+          <a:bodyPr/>
+          <a:p>
+            <a:fld id="{05A5AD1D-2EB8-4FA8-BB1D-2A9207E2B916}" type="slidenum">
+              <a:t>27</a:t>
+            </a:fld>
+          </a:p>
+        </p:txBody>
+      </p:sp>
+      <p:sp>
+        <p:nvSpPr>
+          <p:cNvPr id="5" name="PlaceHolder 4"/>
+          <p:cNvSpPr>
+            <a:spLocks noGrp="1"/>
+          </p:cNvSpPr>
+          <p:nvPr>
+            <p:ph type="dt" idx="4"/>
+          </p:nvPr>
+        </p:nvSpPr>
+        <p:spPr/>
+        <p:txBody>
+          <a:bodyPr/>
+          <a:p>
+            <a:fld id="{5B8ED8B7-A94B-4F71-B44D-2105FF59A2CE}" type="datetime1">
+              <a:rPr lang="en-US"/>
+              <a:t>04/28/2025</a:t>
+            </a:fld>
+          </a:p>
+        </p:txBody>
+      </p:sp>
+    </p:spTree>
+  </p:cSld>
+  <mc:AlternateContent>
+    <mc:Choice Requires="p14">
+      <p:transition spd="slow" p14:dur="2000"/>
+    </mc:Choice>
+    <mc:Fallback>
+      <p:transition spd="slow"/>
+    </mc:Fallback>
+  </mc:AlternateContent>
+</p:sld>
+</file>
+
+<file path=ppt/slides/slide28.xml><?xml version="1.0" encoding="utf-8"?>
+<p:sld xmlns:a="http://schemas.openxmlformats.org/drawingml/2006/main" xmlns:p="http://schemas.openxmlformats.org/presentationml/2006/main" xmlns:r="http://schemas.openxmlformats.org/officeDocument/2006/relationships" xmlns:p14="http://schemas.microsoft.com/office/powerpoint/2010/main" xmlns:p15="http://schemas.microsoft.com/office/powerpoint/2012/main" xmlns:mc="http://schemas.openxmlformats.org/markup-compatibility/2006">
+  <p:cSld>
+    <p:spTree>
+      <p:nvGrpSpPr>
+        <p:cNvPr id="1" name=""/>
+        <p:cNvGrpSpPr/>
+        <p:nvPr/>
+      </p:nvGrpSpPr>
+      <p:grpSpPr>
+        <a:xfrm>
+          <a:off x="0" y="0"/>
+          <a:ext cx="0" cy="0"/>
+          <a:chOff x="0" y="0"/>
+          <a:chExt cx="0" cy="0"/>
+        </a:xfrm>
+      </p:grpSpPr>
+      <p:sp>
+        <p:nvSpPr>
+          <p:cNvPr id="103" name="PlaceHolder 1"/>
           <p:cNvSpPr>
             <a:spLocks noGrp="1"/>
           </p:cNvSpPr>
@@ -8770,8 +9021,8 @@
         <p:txBody>
           <a:bodyPr/>
           <a:p>
-            <a:fld id="{5DF8B02D-BA1B-4388-93E1-7FA354C9FCAB}" type="slidenum">
-              <a:t>27</a:t>
+            <a:fld id="{11753ACA-7996-4A68-9ED8-A00872DCDDD4}" type="slidenum">
+              <a:t>28</a:t>
             </a:fld>
           </a:p>
         </p:txBody>
@@ -8790,9 +9041,9 @@
         <p:txBody>
           <a:bodyPr/>
           <a:p>
-            <a:fld id="{04AA948F-7DFB-4847-91AF-23BA90ADE39F}" type="datetime1">
+            <a:fld id="{DEFD4EED-335D-40A0-BB17-8F25B23E11EE}" type="datetime1">
               <a:rPr lang="en-US"/>
-              <a:t>04/24/2025</a:t>
+              <a:t>04/28/2025</a:t>
             </a:fld>
           </a:p>
         </p:txBody>
@@ -9080,7 +9331,7 @@
         <p:txBody>
           <a:bodyPr/>
           <a:p>
-            <a:fld id="{5089E5A5-40BE-4E1F-9747-EB9AD39CEF76}" type="slidenum">
+            <a:fld id="{3995CFB4-A1E7-4522-93F8-A9B446447224}" type="slidenum">
               <a:t>3</a:t>
             </a:fld>
           </a:p>
@@ -9100,9 +9351,9 @@
         <p:txBody>
           <a:bodyPr/>
           <a:p>
-            <a:fld id="{7C85F88F-FD4A-47DD-A344-5EEEA292202B}" type="datetime1">
+            <a:fld id="{3942A212-AE86-44AB-86AA-B9950E5F9C89}" type="datetime1">
               <a:rPr lang="en-US"/>
-              <a:t>04/24/2025</a:t>
+              <a:t>04/28/2025</a:t>
             </a:fld>
           </a:p>
         </p:txBody>
@@ -9265,7 +9516,7 @@
                 <a:uFillTx/>
                 <a:latin typeface="Arial"/>
               </a:rPr>
-              <a:t>...ili odaberemo neki od deset primjera iz flexboxa “Examples”.</a:t>
+              <a:t>...ili odaberemo neki od jedanaest primjera iz flexboxa “Examples”.</a:t>
             </a:r>
             <a:endParaRPr b="0" lang="bs-BA" sz="2400" strike="noStrike" u="none">
               <a:solidFill>
@@ -9339,7 +9590,7 @@
         <p:txBody>
           <a:bodyPr/>
           <a:p>
-            <a:fld id="{982FBB3D-7CDC-4DFF-8D38-B924C48A4D3E}" type="slidenum">
+            <a:fld id="{15CA149E-D17B-463F-89C8-54B451B4B483}" type="slidenum">
               <a:t>4</a:t>
             </a:fld>
           </a:p>
@@ -9359,9 +9610,9 @@
         <p:txBody>
           <a:bodyPr/>
           <a:p>
-            <a:fld id="{0B0E1574-EA98-4451-B802-B7D8B99691F4}" type="datetime1">
+            <a:fld id="{1DBB4704-8AA9-48F5-AE55-97654CD5ED06}" type="datetime1">
               <a:rPr lang="en-US"/>
-              <a:t>04/24/2025</a:t>
+              <a:t>04/28/2025</a:t>
             </a:fld>
           </a:p>
         </p:txBody>
@@ -9611,7 +9862,7 @@
         <p:txBody>
           <a:bodyPr/>
           <a:p>
-            <a:fld id="{EE207EC5-3E7B-489E-B4A0-3AE822957D22}" type="slidenum">
+            <a:fld id="{A283A801-C50E-4E9A-80DF-D269EDCEC9FD}" type="slidenum">
               <a:t>5</a:t>
             </a:fld>
           </a:p>
@@ -9631,9 +9882,9 @@
         <p:txBody>
           <a:bodyPr/>
           <a:p>
-            <a:fld id="{E4FA6BB6-5302-4686-B56E-1E2332AFE03D}" type="datetime1">
+            <a:fld id="{57F8C445-C49D-452B-BA38-D0FA7B274005}" type="datetime1">
               <a:rPr lang="en-US"/>
-              <a:t>04/24/2025</a:t>
+              <a:t>04/28/2025</a:t>
             </a:fld>
           </a:p>
         </p:txBody>
@@ -9996,7 +10247,7 @@
         <p:txBody>
           <a:bodyPr/>
           <a:p>
-            <a:fld id="{F929DE0C-6DF3-4130-ADFE-5697DD7E2B5C}" type="slidenum">
+            <a:fld id="{5EF3F363-F2A7-4520-99AC-AEF0480C7E4D}" type="slidenum">
               <a:t>6</a:t>
             </a:fld>
           </a:p>
@@ -10016,9 +10267,9 @@
         <p:txBody>
           <a:bodyPr/>
           <a:p>
-            <a:fld id="{EDAE2739-B780-461A-91D4-84AB05C87B4E}" type="datetime1">
+            <a:fld id="{8CCD432D-1A3A-4718-B497-01E7452A9A4D}" type="datetime1">
               <a:rPr lang="en-US"/>
-              <a:t>04/24/2025</a:t>
+              <a:t>04/28/2025</a:t>
             </a:fld>
           </a:p>
         </p:txBody>
@@ -10338,7 +10589,7 @@
         <p:txBody>
           <a:bodyPr/>
           <a:p>
-            <a:fld id="{AF3348A4-CC6F-40C9-A706-3717B9253A02}" type="slidenum">
+            <a:fld id="{5C758012-8F33-4384-B66F-64684FCFD3B5}" type="slidenum">
               <a:t>7</a:t>
             </a:fld>
           </a:p>
@@ -10358,9 +10609,9 @@
         <p:txBody>
           <a:bodyPr/>
           <a:p>
-            <a:fld id="{0E283400-DA16-47D1-9FF7-E02652B07081}" type="datetime1">
+            <a:fld id="{3D7A7FBF-CB5B-4417-8FCA-7FE5896259D1}" type="datetime1">
               <a:rPr lang="en-US"/>
-              <a:t>04/24/2025</a:t>
+              <a:t>04/28/2025</a:t>
             </a:fld>
           </a:p>
         </p:txBody>
@@ -10543,7 +10794,7 @@
         <p:txBody>
           <a:bodyPr/>
           <a:p>
-            <a:fld id="{5449F3B8-1B4D-4C69-B631-39146AD558AF}" type="slidenum">
+            <a:fld id="{FAFEBFF2-24F0-4BD3-8114-7BA23E447305}" type="slidenum">
               <a:t>8</a:t>
             </a:fld>
           </a:p>
@@ -10563,9 +10814,9 @@
         <p:txBody>
           <a:bodyPr/>
           <a:p>
-            <a:fld id="{10ADB127-6428-45EA-8D48-2B2B3B8D4267}" type="datetime1">
+            <a:fld id="{857D21B2-7CAB-4394-B638-3EF0FFCDAA31}" type="datetime1">
               <a:rPr lang="en-US"/>
-              <a:t>04/24/2025</a:t>
+              <a:t>04/28/2025</a:t>
             </a:fld>
           </a:p>
         </p:txBody>
@@ -10754,7 +11005,7 @@
         <p:txBody>
           <a:bodyPr/>
           <a:p>
-            <a:fld id="{14B1F993-8B8A-4D59-9608-8EF1EECEA9EB}" type="slidenum">
+            <a:fld id="{6DACF435-83CB-41EE-B77C-F01EE2161FE9}" type="slidenum">
               <a:t>9</a:t>
             </a:fld>
           </a:p>
@@ -10774,9 +11025,9 @@
         <p:txBody>
           <a:bodyPr/>
           <a:p>
-            <a:fld id="{6FF02CBE-7BEB-4237-943C-AE539E85F4EB}" type="datetime1">
+            <a:fld id="{D44E851D-D003-41F5-99DA-EE0B9E293CE4}" type="datetime1">
               <a:rPr lang="en-US"/>
-              <a:t>04/24/2025</a:t>
+              <a:t>04/28/2025</a:t>
             </a:fld>
           </a:p>
         </p:txBody>

</xml_diff>

<commit_message>
Removed an empty slide from the presentation
</commit_message>
<xml_diff>
--- a/seminar/PicoBlaze.pptx
+++ b/seminar/PicoBlaze.pptx
@@ -33,7 +33,6 @@
     <p:sldId id="280" r:id="rId28"/>
     <p:sldId id="281" r:id="rId29"/>
     <p:sldId id="282" r:id="rId30"/>
-    <p:sldId id="283" r:id="rId31"/>
   </p:sldIdLst>
   <p:sldSz cx="10080625" cy="5670550"/>
   <p:notesSz cx="7559675" cy="10691813"/>
@@ -91,7 +90,7 @@
         <p:txBody>
           <a:bodyPr/>
           <a:p>
-            <a:fld id="{85A1C0E7-7E79-4777-AC3C-976905A7C3C2}" type="slidenum">
+            <a:fld id="{6451A6F5-A7FB-45F9-A865-0F51C6FE1163}" type="slidenum">
               <a:t>&lt;#&gt;</a:t>
             </a:fld>
           </a:p>
@@ -259,7 +258,7 @@
         <p:txBody>
           <a:bodyPr/>
           <a:p>
-            <a:fld id="{CB0B99B3-9D4B-4227-ACDA-6F23A47F3CA1}" type="slidenum">
+            <a:fld id="{9CD35153-1570-4ECA-8065-57D21583DA41}" type="slidenum">
               <a:t>&lt;#&gt;</a:t>
             </a:fld>
           </a:p>
@@ -515,7 +514,7 @@
         <p:txBody>
           <a:bodyPr/>
           <a:p>
-            <a:fld id="{C895A95F-1C2F-44B4-9C23-273F2AE7C317}" type="slidenum">
+            <a:fld id="{0184131C-499D-4447-80BB-05384FC05161}" type="slidenum">
               <a:t>&lt;#&gt;</a:t>
             </a:fld>
           </a:p>
@@ -727,7 +726,7 @@
         <p:txBody>
           <a:bodyPr/>
           <a:p>
-            <a:fld id="{98F0D896-52BC-4B0F-B59B-B2D12F0A6C79}" type="slidenum">
+            <a:fld id="{AA8F931D-39D7-44CB-AD22-38A8CD0C7270}" type="slidenum">
               <a:t>&lt;#&gt;</a:t>
             </a:fld>
           </a:p>
@@ -810,7 +809,7 @@
         <p:txBody>
           <a:bodyPr/>
           <a:p>
-            <a:fld id="{D361D98B-EC58-462A-921E-10DB5041151A}" type="slidenum">
+            <a:fld id="{2362C644-5C0F-4636-B6D4-52B09D638BEB}" type="slidenum">
               <a:t>&lt;#&gt;</a:t>
             </a:fld>
           </a:p>
@@ -1751,7 +1750,7 @@
             <a:pPr indent="0" algn="r">
               <a:buNone/>
             </a:pPr>
-            <a:fld id="{6E1B8AB8-FE18-4E6C-B8CB-9E011A63BD9C}" type="slidenum">
+            <a:fld id="{68694CFE-865B-4A59-829A-B9DC477D69DC}" type="slidenum">
               <a:rPr b="0" lang="bs-BA" sz="1400" strike="noStrike" u="none">
                 <a:solidFill>
                   <a:srgbClr val="ffffff"/>
@@ -3122,7 +3121,7 @@
             <a:pPr indent="0" algn="r">
               <a:buNone/>
             </a:pPr>
-            <a:fld id="{6648ADE1-A55F-4048-8FEB-FB7E2FA6B3D6}" type="slidenum">
+            <a:fld id="{51E35740-324A-4950-965B-69D33A12BA73}" type="slidenum">
               <a:rPr b="0" lang="bs-BA" sz="1400" strike="noStrike" u="none">
                 <a:solidFill>
                   <a:srgbClr val="ffffff"/>
@@ -3497,7 +3496,7 @@
         <p:txBody>
           <a:bodyPr/>
           <a:p>
-            <a:fld id="{7F7D54EF-F799-4AB1-A727-F43AD9BE7D6F}" type="slidenum">
+            <a:fld id="{527BD8D5-DADB-481E-8BF4-B920D2A96629}" type="slidenum">
               <a:t>10</a:t>
             </a:fld>
           </a:p>
@@ -3517,7 +3516,7 @@
         <p:txBody>
           <a:bodyPr/>
           <a:p>
-            <a:fld id="{2D416A0E-6350-4003-A3A5-6CAD2E311248}" type="datetime1">
+            <a:fld id="{C9294787-6A8B-43CB-97F3-CFF6318CB7F9}" type="datetime1">
               <a:rPr lang="en-US"/>
               <a:t>04/28/2025</a:t>
             </a:fld>
@@ -3585,6 +3584,16 @@
             <a:pPr indent="0" algn="ctr">
               <a:buNone/>
             </a:pPr>
+            <a:r>
+              <a:rPr b="0" lang="bs-BA" sz="3300" strike="noStrike" u="none">
+                <a:solidFill>
+                  <a:srgbClr val="ffffff"/>
+                </a:solidFill>
+                <a:uFillTx/>
+                <a:latin typeface="Arial"/>
+              </a:rPr>
+              <a:t>Kako se koristi...</a:t>
+            </a:r>
             <a:endParaRPr b="0" lang="bs-BA" sz="3300" strike="noStrike" u="none">
               <a:solidFill>
                 <a:srgbClr val="ffffff"/>
@@ -3598,50 +3607,6 @@
       <p:sp>
         <p:nvSpPr>
           <p:cNvPr id="55" name="PlaceHolder 2"/>
-          <p:cNvSpPr>
-            <a:spLocks noGrp="1"/>
-          </p:cNvSpPr>
-          <p:nvPr>
-            <p:ph/>
-          </p:nvPr>
-        </p:nvSpPr>
-        <p:spPr>
-          <a:xfrm>
-            <a:off x="360000" y="1080000"/>
-            <a:ext cx="4567320" cy="3600000"/>
-          </a:xfrm>
-          <a:prstGeom prst="rect">
-            <a:avLst/>
-          </a:prstGeom>
-          <a:noFill/>
-          <a:ln w="0">
-            <a:noFill/>
-          </a:ln>
-        </p:spPr>
-        <p:txBody>
-          <a:bodyPr lIns="0" rIns="0" tIns="0" bIns="0" anchor="t">
-            <a:noAutofit/>
-          </a:bodyPr>
-          <a:p>
-            <a:pPr indent="0">
-              <a:spcBef>
-                <a:spcPts val="1060"/>
-              </a:spcBef>
-              <a:buNone/>
-            </a:pPr>
-            <a:endParaRPr b="0" lang="bs-BA" sz="2400" strike="noStrike" u="none">
-              <a:solidFill>
-                <a:srgbClr val="009bdd"/>
-              </a:solidFill>
-              <a:uFillTx/>
-              <a:latin typeface="Arial"/>
-            </a:endParaRPr>
-          </a:p>
-        </p:txBody>
-      </p:sp>
-      <p:sp>
-        <p:nvSpPr>
-          <p:cNvPr id="56" name="PlaceHolder 3"/>
           <p:cNvSpPr>
             <a:spLocks noGrp="1"/>
           </p:cNvSpPr>
@@ -3667,12 +3632,27 @@
             <a:noAutofit/>
           </a:bodyPr>
           <a:p>
-            <a:pPr indent="0">
+            <a:pPr marL="432000" indent="-324000">
               <a:spcBef>
                 <a:spcPts val="1060"/>
               </a:spcBef>
-              <a:buNone/>
-            </a:pPr>
+              <a:buClr>
+                <a:srgbClr val="77caee"/>
+              </a:buClr>
+              <a:buSzPct val="45000"/>
+              <a:buFont typeface="Wingdings" charset="2"/>
+              <a:buChar char=""/>
+            </a:pPr>
+            <a:r>
+              <a:rPr b="0" lang="bs-BA" sz="2400" strike="noStrike" u="none">
+                <a:solidFill>
+                  <a:srgbClr val="009bdd"/>
+                </a:solidFill>
+                <a:uFillTx/>
+                <a:latin typeface="Arial"/>
+              </a:rPr>
+              <a:t>Da bismo komunicirali s programima kao što je “Binary to Decimal” (prvi primjer u flexboxu “Examples” s lijeva), možemo koristiti SVG-ove generirane u JavaScriptu, koji predstavljaju switcheve, LED-ice i sedam-segmentne pokaznike.</a:t>
+            </a:r>
             <a:endParaRPr b="0" lang="bs-BA" sz="2400" strike="noStrike" u="none">
               <a:solidFill>
                 <a:srgbClr val="009bdd"/>
@@ -3683,9 +3663,33 @@
           </a:p>
         </p:txBody>
       </p:sp>
-      <p:sp>
-        <p:nvSpPr>
-          <p:cNvPr id="5" name="PlaceHolder 4"/>
+      <p:pic>
+        <p:nvPicPr>
+          <p:cNvPr id="56" name="" descr=""/>
+          <p:cNvPicPr/>
+          <p:nvPr/>
+        </p:nvPicPr>
+        <p:blipFill>
+          <a:blip r:embed="rId1"/>
+          <a:stretch/>
+        </p:blipFill>
+        <p:spPr>
+          <a:xfrm>
+            <a:off x="335520" y="1143000"/>
+            <a:ext cx="4693680" cy="1958040"/>
+          </a:xfrm>
+          <a:prstGeom prst="rect">
+            <a:avLst/>
+          </a:prstGeom>
+          <a:noFill/>
+          <a:ln w="18000">
+            <a:noFill/>
+          </a:ln>
+        </p:spPr>
+      </p:pic>
+      <p:sp>
+        <p:nvSpPr>
+          <p:cNvPr id="4" name="PlaceHolder 3"/>
           <p:cNvSpPr>
             <a:spLocks noGrp="1"/>
           </p:cNvSpPr>
@@ -3697,7 +3701,7 @@
         <p:txBody>
           <a:bodyPr/>
           <a:p>
-            <a:fld id="{40499904-E940-4EAD-BB9D-B341A159B98A}" type="slidenum">
+            <a:fld id="{7826800D-2DA5-47BC-BD6E-D2B65D3BEB65}" type="slidenum">
               <a:t>11</a:t>
             </a:fld>
           </a:p>
@@ -3705,7 +3709,7 @@
       </p:sp>
       <p:sp>
         <p:nvSpPr>
-          <p:cNvPr id="6" name="PlaceHolder 5"/>
+          <p:cNvPr id="5" name="PlaceHolder 4"/>
           <p:cNvSpPr>
             <a:spLocks noGrp="1"/>
           </p:cNvSpPr>
@@ -3717,7 +3721,7 @@
         <p:txBody>
           <a:bodyPr/>
           <a:p>
-            <a:fld id="{5E396626-E111-4BC0-A7AB-6CB73C742087}" type="datetime1">
+            <a:fld id="{6422ED7E-C84A-40F2-9613-6A9D98F87BBB}" type="datetime1">
               <a:rPr lang="en-US"/>
               <a:t>04/28/2025</a:t>
             </a:fld>
@@ -3852,7 +3856,107 @@
                 <a:uFillTx/>
                 <a:latin typeface="Arial"/>
               </a:rPr>
-              <a:t>Da bismo komunicirali s programima kao što je “Binary to Decimal” (prvi primjer u flexboxu “Examples” s lijeva), možemo koristiti SVG-ove generirane u JavaScriptu, koji predstavljaju switcheve, LED-ice i sedam-segmentne pokaznike.</a:t>
+              <a:t>Ako želimo, možemo dodati i breakpointse na koje će emulacija pauzirati.</a:t>
+            </a:r>
+            <a:endParaRPr b="0" lang="bs-BA" sz="2400" strike="noStrike" u="none">
+              <a:solidFill>
+                <a:srgbClr val="009bdd"/>
+              </a:solidFill>
+              <a:uFillTx/>
+              <a:latin typeface="Arial"/>
+            </a:endParaRPr>
+          </a:p>
+          <a:p>
+            <a:pPr marL="432000" indent="-324000">
+              <a:spcBef>
+                <a:spcPts val="1060"/>
+              </a:spcBef>
+              <a:buClr>
+                <a:srgbClr val="77caee"/>
+              </a:buClr>
+              <a:buSzPct val="45000"/>
+              <a:buFont typeface="Wingdings" charset="2"/>
+              <a:buChar char=""/>
+            </a:pPr>
+            <a:r>
+              <a:rPr b="0" lang="bs-BA" sz="2400" strike="noStrike" u="none">
+                <a:solidFill>
+                  <a:srgbClr val="009bdd"/>
+                </a:solidFill>
+                <a:uFillTx/>
+                <a:latin typeface="Arial"/>
+              </a:rPr>
+              <a:t>Tu sam mogućnost dodao na prijedlog profesora Tomislava Matića mlađeg.</a:t>
+            </a:r>
+            <a:endParaRPr b="0" lang="bs-BA" sz="2400" strike="noStrike" u="none">
+              <a:solidFill>
+                <a:srgbClr val="009bdd"/>
+              </a:solidFill>
+              <a:uFillTx/>
+              <a:latin typeface="Arial"/>
+            </a:endParaRPr>
+          </a:p>
+          <a:p>
+            <a:pPr marL="432000" indent="-324000">
+              <a:spcBef>
+                <a:spcPts val="1060"/>
+              </a:spcBef>
+              <a:buClr>
+                <a:srgbClr val="77caee"/>
+              </a:buClr>
+              <a:buSzPct val="45000"/>
+              <a:buFont typeface="Wingdings" charset="2"/>
+              <a:buChar char=""/>
+            </a:pPr>
+            <a:r>
+              <a:rPr b="0" lang="bs-BA" sz="2400" strike="noStrike" u="none">
+                <a:solidFill>
+                  <a:srgbClr val="009bdd"/>
+                </a:solidFill>
+                <a:uFillTx/>
+                <a:latin typeface="Arial"/>
+              </a:rPr>
+              <a:t>Postoje samo </a:t>
+            </a:r>
+            <a:r>
+              <a:rPr b="0" i="1" lang="bs-BA" sz="2400" strike="noStrike" u="none">
+                <a:solidFill>
+                  <a:srgbClr val="009bdd"/>
+                </a:solidFill>
+                <a:uFillTx/>
+                <a:latin typeface="Arial"/>
+              </a:rPr>
+              <a:t>permanent</a:t>
+            </a:r>
+            <a:r>
+              <a:rPr b="0" lang="bs-BA" sz="2400" strike="noStrike" u="none">
+                <a:solidFill>
+                  <a:srgbClr val="009bdd"/>
+                </a:solidFill>
+                <a:uFillTx/>
+                <a:latin typeface="Arial"/>
+              </a:rPr>
+              <a:t> breakpointsi, ne i </a:t>
+            </a:r>
+            <a:r>
+              <a:rPr b="0" i="1" lang="bs-BA" sz="2400" strike="noStrike" u="none">
+                <a:solidFill>
+                  <a:srgbClr val="009bdd"/>
+                </a:solidFill>
+                <a:uFillTx/>
+                <a:latin typeface="Arial"/>
+              </a:rPr>
+              <a:t>temporary</a:t>
+            </a:r>
+            <a:r>
+              <a:rPr b="0" lang="bs-BA" sz="2400" strike="noStrike" u="none">
+                <a:solidFill>
+                  <a:srgbClr val="009bdd"/>
+                </a:solidFill>
+                <a:uFillTx/>
+                <a:latin typeface="Arial"/>
+              </a:rPr>
+              <a:t>.</a:t>
             </a:r>
             <a:endParaRPr b="0" lang="bs-BA" sz="2400" strike="noStrike" u="none">
               <a:solidFill>
@@ -3876,8 +3980,8 @@
         </p:blipFill>
         <p:spPr>
           <a:xfrm>
-            <a:off x="335520" y="1143000"/>
-            <a:ext cx="4693680" cy="1958040"/>
+            <a:off x="228600" y="1013760"/>
+            <a:ext cx="4739400" cy="3786840"/>
           </a:xfrm>
           <a:prstGeom prst="rect">
             <a:avLst/>
@@ -3890,6 +3994,49 @@
       </p:pic>
       <p:sp>
         <p:nvSpPr>
+          <p:cNvPr id="60" name=""/>
+          <p:cNvSpPr/>
+          <p:nvPr/>
+        </p:nvSpPr>
+        <p:spPr>
+          <a:xfrm>
+            <a:off x="228600" y="4114800"/>
+            <a:ext cx="685800" cy="228600"/>
+          </a:xfrm>
+          <a:prstGeom prst="ellipse">
+            <a:avLst/>
+          </a:prstGeom>
+          <a:noFill/>
+          <a:ln w="18000">
+            <a:solidFill>
+              <a:srgbClr val="009bdd"/>
+            </a:solidFill>
+            <a:round/>
+          </a:ln>
+        </p:spPr>
+        <p:style>
+          <a:lnRef idx="0"/>
+          <a:fillRef idx="0"/>
+          <a:effectRef idx="0"/>
+          <a:fontRef idx="minor"/>
+        </p:style>
+        <p:txBody>
+          <a:bodyPr wrap="none" lIns="90000" rIns="90000" tIns="45000" bIns="45000" anchor="ctr">
+            <a:noAutofit/>
+          </a:bodyPr>
+          <a:p>
+            <a:endParaRPr b="0" lang="bs-BA" sz="1800" strike="noStrike" u="none">
+              <a:solidFill>
+                <a:srgbClr val="000000"/>
+              </a:solidFill>
+              <a:uFillTx/>
+              <a:latin typeface="Arial"/>
+            </a:endParaRPr>
+          </a:p>
+        </p:txBody>
+      </p:sp>
+      <p:sp>
+        <p:nvSpPr>
           <p:cNvPr id="4" name="PlaceHolder 3"/>
           <p:cNvSpPr>
             <a:spLocks noGrp="1"/>
@@ -3902,7 +4049,7 @@
         <p:txBody>
           <a:bodyPr/>
           <a:p>
-            <a:fld id="{560300AF-FEE2-4E7A-8009-211B57C2D080}" type="slidenum">
+            <a:fld id="{6A7193B8-7C2E-4973-84F8-1BA285EFB8C1}" type="slidenum">
               <a:t>12</a:t>
             </a:fld>
           </a:p>
@@ -3922,7 +4069,7 @@
         <p:txBody>
           <a:bodyPr/>
           <a:p>
-            <a:fld id="{DDA00927-ADBE-4EC0-BC83-F03DB1E8F27A}" type="datetime1">
+            <a:fld id="{A1FB1A4B-ACB1-4DB1-AE00-BF5285EE6CD6}" type="datetime1">
               <a:rPr lang="en-US"/>
               <a:t>04/28/2025</a:t>
             </a:fld>
@@ -3961,7 +4108,7 @@
       </p:grpSpPr>
       <p:sp>
         <p:nvSpPr>
-          <p:cNvPr id="60" name="PlaceHolder 1"/>
+          <p:cNvPr id="61" name="PlaceHolder 1"/>
           <p:cNvSpPr>
             <a:spLocks noGrp="1"/>
           </p:cNvSpPr>
@@ -4012,7 +4159,7 @@
       </p:sp>
       <p:sp>
         <p:nvSpPr>
-          <p:cNvPr id="61" name="PlaceHolder 2"/>
+          <p:cNvPr id="62" name="PlaceHolder 2"/>
           <p:cNvSpPr>
             <a:spLocks noGrp="1"/>
           </p:cNvSpPr>
@@ -4057,7 +4204,27 @@
                 <a:uFillTx/>
                 <a:latin typeface="Arial"/>
               </a:rPr>
-              <a:t>Ako želimo, možemo dodati i breakpointse na koje će emulacija pauzirati.</a:t>
+              <a:t>Kada program radi kako želimo u simulatoru, možemo ga isprobati na pravom PicoBlazeu tako da kliknemo na “</a:t>
+            </a:r>
+            <a:r>
+              <a:rPr b="0" i="1" lang="bs-BA" sz="2400" strike="noStrike" u="none">
+                <a:solidFill>
+                  <a:srgbClr val="009bdd"/>
+                </a:solidFill>
+                <a:uFillTx/>
+                <a:latin typeface="Arial"/>
+              </a:rPr>
+              <a:t>Download Hexadecimal</a:t>
+            </a:r>
+            <a:r>
+              <a:rPr b="0" lang="bs-BA" sz="2400" strike="noStrike" u="none">
+                <a:solidFill>
+                  <a:srgbClr val="009bdd"/>
+                </a:solidFill>
+                <a:uFillTx/>
+                <a:latin typeface="Arial"/>
+              </a:rPr>
+              <a:t>”.</a:t>
             </a:r>
             <a:endParaRPr b="0" lang="bs-BA" sz="2400" strike="noStrike" u="none">
               <a:solidFill>
@@ -4087,77 +4254,7 @@
                 <a:uFillTx/>
                 <a:latin typeface="Arial"/>
               </a:rPr>
-              <a:t>Tu sam mogućnost dodao na prijedlog profesora Tomislava Matića mlađeg.</a:t>
-            </a:r>
-            <a:endParaRPr b="0" lang="bs-BA" sz="2400" strike="noStrike" u="none">
-              <a:solidFill>
-                <a:srgbClr val="009bdd"/>
-              </a:solidFill>
-              <a:uFillTx/>
-              <a:latin typeface="Arial"/>
-            </a:endParaRPr>
-          </a:p>
-          <a:p>
-            <a:pPr marL="432000" indent="-324000">
-              <a:spcBef>
-                <a:spcPts val="1060"/>
-              </a:spcBef>
-              <a:buClr>
-                <a:srgbClr val="77caee"/>
-              </a:buClr>
-              <a:buSzPct val="45000"/>
-              <a:buFont typeface="Wingdings" charset="2"/>
-              <a:buChar char=""/>
-            </a:pPr>
-            <a:r>
-              <a:rPr b="0" lang="bs-BA" sz="2400" strike="noStrike" u="none">
-                <a:solidFill>
-                  <a:srgbClr val="009bdd"/>
-                </a:solidFill>
-                <a:uFillTx/>
-                <a:latin typeface="Arial"/>
-              </a:rPr>
-              <a:t>Postoje samo </a:t>
-            </a:r>
-            <a:r>
-              <a:rPr b="0" i="1" lang="bs-BA" sz="2400" strike="noStrike" u="none">
-                <a:solidFill>
-                  <a:srgbClr val="009bdd"/>
-                </a:solidFill>
-                <a:uFillTx/>
-                <a:latin typeface="Arial"/>
-              </a:rPr>
-              <a:t>permanent</a:t>
-            </a:r>
-            <a:r>
-              <a:rPr b="0" lang="bs-BA" sz="2400" strike="noStrike" u="none">
-                <a:solidFill>
-                  <a:srgbClr val="009bdd"/>
-                </a:solidFill>
-                <a:uFillTx/>
-                <a:latin typeface="Arial"/>
-              </a:rPr>
-              <a:t> breakpointsi, ne i </a:t>
-            </a:r>
-            <a:r>
-              <a:rPr b="0" i="1" lang="bs-BA" sz="2400" strike="noStrike" u="none">
-                <a:solidFill>
-                  <a:srgbClr val="009bdd"/>
-                </a:solidFill>
-                <a:uFillTx/>
-                <a:latin typeface="Arial"/>
-              </a:rPr>
-              <a:t>temporary</a:t>
-            </a:r>
-            <a:r>
-              <a:rPr b="0" lang="bs-BA" sz="2400" strike="noStrike" u="none">
-                <a:solidFill>
-                  <a:srgbClr val="009bdd"/>
-                </a:solidFill>
-                <a:uFillTx/>
-                <a:latin typeface="Arial"/>
-              </a:rPr>
-              <a:t>.</a:t>
+              <a:t>I Xilinxov asembler za PicoBlaze ispisuje heksadecimalne datoteke, tako da činjenica da ne ispisujemo binarne datoteke nije problem.</a:t>
             </a:r>
             <a:endParaRPr b="0" lang="bs-BA" sz="2400" strike="noStrike" u="none">
               <a:solidFill>
@@ -4171,7 +4268,7 @@
       </p:sp>
       <p:pic>
         <p:nvPicPr>
-          <p:cNvPr id="62" name="" descr=""/>
+          <p:cNvPr id="63" name="" descr=""/>
           <p:cNvPicPr/>
           <p:nvPr/>
         </p:nvPicPr>
@@ -4181,8 +4278,8 @@
         </p:blipFill>
         <p:spPr>
           <a:xfrm>
-            <a:off x="228600" y="1013760"/>
-            <a:ext cx="4739400" cy="3786840"/>
+            <a:off x="365760" y="937440"/>
+            <a:ext cx="4663440" cy="3863160"/>
           </a:xfrm>
           <a:prstGeom prst="rect">
             <a:avLst/>
@@ -4195,14 +4292,14 @@
       </p:pic>
       <p:sp>
         <p:nvSpPr>
-          <p:cNvPr id="63" name=""/>
+          <p:cNvPr id="64" name=""/>
           <p:cNvSpPr/>
           <p:nvPr/>
         </p:nvSpPr>
         <p:spPr>
           <a:xfrm>
-            <a:off x="228600" y="4114800"/>
-            <a:ext cx="685800" cy="228600"/>
+            <a:off x="1828800" y="914400"/>
+            <a:ext cx="1828800" cy="457200"/>
           </a:xfrm>
           <a:prstGeom prst="ellipse">
             <a:avLst/>
@@ -4250,7 +4347,7 @@
         <p:txBody>
           <a:bodyPr/>
           <a:p>
-            <a:fld id="{667DFEA9-F8FC-464D-B29F-34DD7B719BFC}" type="slidenum">
+            <a:fld id="{D384AEF1-CA02-41D9-BC03-CA4C233FDD64}" type="slidenum">
               <a:t>13</a:t>
             </a:fld>
           </a:p>
@@ -4270,7 +4367,7 @@
         <p:txBody>
           <a:bodyPr/>
           <a:p>
-            <a:fld id="{4272D075-C034-4778-96D0-95F18B069637}" type="datetime1">
+            <a:fld id="{E0BD8A60-94E3-4657-957E-C9544958FB6C}" type="datetime1">
               <a:rPr lang="en-US"/>
               <a:t>04/28/2025</a:t>
             </a:fld>
@@ -4309,7 +4406,7 @@
       </p:grpSpPr>
       <p:sp>
         <p:nvSpPr>
-          <p:cNvPr id="64" name="PlaceHolder 1"/>
+          <p:cNvPr id="65" name="PlaceHolder 1"/>
           <p:cNvSpPr>
             <a:spLocks noGrp="1"/>
           </p:cNvSpPr>
@@ -4360,7 +4457,7 @@
       </p:sp>
       <p:sp>
         <p:nvSpPr>
-          <p:cNvPr id="65" name="PlaceHolder 2"/>
+          <p:cNvPr id="66" name="PlaceHolder 2"/>
           <p:cNvSpPr>
             <a:spLocks noGrp="1"/>
           </p:cNvSpPr>
@@ -4405,27 +4502,7 @@
                 <a:uFillTx/>
                 <a:latin typeface="Arial"/>
               </a:rPr>
-              <a:t>Kada program radi kako želimo u simulatoru, možemo ga isprobati na pravom PicoBlazeu tako da kliknemo na “</a:t>
-            </a:r>
-            <a:r>
-              <a:rPr b="0" i="1" lang="bs-BA" sz="2400" strike="noStrike" u="none">
-                <a:solidFill>
-                  <a:srgbClr val="009bdd"/>
-                </a:solidFill>
-                <a:uFillTx/>
-                <a:latin typeface="Arial"/>
-              </a:rPr>
-              <a:t>Download Hexadecimal</a:t>
-            </a:r>
-            <a:r>
-              <a:rPr b="0" lang="bs-BA" sz="2400" strike="noStrike" u="none">
-                <a:solidFill>
-                  <a:srgbClr val="009bdd"/>
-                </a:solidFill>
-                <a:uFillTx/>
-                <a:latin typeface="Arial"/>
-              </a:rPr>
-              <a:t>”.</a:t>
+              <a:t>Kada dostignemo breakpoint, možemo pogledati trenutne registre, zastavice i memoriju u tablicama.</a:t>
             </a:r>
             <a:endParaRPr b="0" lang="bs-BA" sz="2400" strike="noStrike" u="none">
               <a:solidFill>
@@ -4455,7 +4532,27 @@
                 <a:uFillTx/>
                 <a:latin typeface="Arial"/>
               </a:rPr>
-              <a:t>I Xilinxov asembler za PicoBlaze ispisuje heksadecimalne datoteke, tako da činjenica da ne ispisujemo binarne datoteke nije problem.</a:t>
+              <a:t>Nedavno promijenjene zastavice i registri obojane su različitom bojom, da nam ne bi promakli. Za to se koristio </a:t>
+            </a:r>
+            <a:r>
+              <a:rPr b="0" i="1" lang="bs-BA" sz="2400" strike="noStrike" u="none">
+                <a:solidFill>
+                  <a:srgbClr val="009bdd"/>
+                </a:solidFill>
+                <a:uFillTx/>
+                <a:latin typeface="Arial"/>
+              </a:rPr>
+              <a:t>DOM as a state</a:t>
+            </a:r>
+            <a:r>
+              <a:rPr b="0" lang="bs-BA" sz="2400" strike="noStrike" u="none">
+                <a:solidFill>
+                  <a:srgbClr val="009bdd"/>
+                </a:solidFill>
+                <a:uFillTx/>
+                <a:latin typeface="Arial"/>
+              </a:rPr>
+              <a:t>, što možda i nije najbolje rješenje.</a:t>
             </a:r>
             <a:endParaRPr b="0" lang="bs-BA" sz="2400" strike="noStrike" u="none">
               <a:solidFill>
@@ -4469,7 +4566,7 @@
       </p:sp>
       <p:pic>
         <p:nvPicPr>
-          <p:cNvPr id="66" name="" descr=""/>
+          <p:cNvPr id="67" name="" descr=""/>
           <p:cNvPicPr/>
           <p:nvPr/>
         </p:nvPicPr>
@@ -4479,8 +4576,8 @@
         </p:blipFill>
         <p:spPr>
           <a:xfrm>
-            <a:off x="365760" y="937440"/>
-            <a:ext cx="4663440" cy="3863160"/>
+            <a:off x="343080" y="914400"/>
+            <a:ext cx="4686120" cy="3779280"/>
           </a:xfrm>
           <a:prstGeom prst="rect">
             <a:avLst/>
@@ -4493,49 +4590,6 @@
       </p:pic>
       <p:sp>
         <p:nvSpPr>
-          <p:cNvPr id="67" name=""/>
-          <p:cNvSpPr/>
-          <p:nvPr/>
-        </p:nvSpPr>
-        <p:spPr>
-          <a:xfrm>
-            <a:off x="1828800" y="914400"/>
-            <a:ext cx="1828800" cy="457200"/>
-          </a:xfrm>
-          <a:prstGeom prst="ellipse">
-            <a:avLst/>
-          </a:prstGeom>
-          <a:noFill/>
-          <a:ln w="18000">
-            <a:solidFill>
-              <a:srgbClr val="009bdd"/>
-            </a:solidFill>
-            <a:round/>
-          </a:ln>
-        </p:spPr>
-        <p:style>
-          <a:lnRef idx="0"/>
-          <a:fillRef idx="0"/>
-          <a:effectRef idx="0"/>
-          <a:fontRef idx="minor"/>
-        </p:style>
-        <p:txBody>
-          <a:bodyPr wrap="none" lIns="90000" rIns="90000" tIns="45000" bIns="45000" anchor="ctr">
-            <a:noAutofit/>
-          </a:bodyPr>
-          <a:p>
-            <a:endParaRPr b="0" lang="bs-BA" sz="1800" strike="noStrike" u="none">
-              <a:solidFill>
-                <a:srgbClr val="000000"/>
-              </a:solidFill>
-              <a:uFillTx/>
-              <a:latin typeface="Arial"/>
-            </a:endParaRPr>
-          </a:p>
-        </p:txBody>
-      </p:sp>
-      <p:sp>
-        <p:nvSpPr>
           <p:cNvPr id="4" name="PlaceHolder 3"/>
           <p:cNvSpPr>
             <a:spLocks noGrp="1"/>
@@ -4548,7 +4602,7 @@
         <p:txBody>
           <a:bodyPr/>
           <a:p>
-            <a:fld id="{54602ED0-0A7C-4E6A-9BF1-A53B09938F4E}" type="slidenum">
+            <a:fld id="{834DC54C-05D8-44A2-A35F-7A439FAED8C3}" type="slidenum">
               <a:t>14</a:t>
             </a:fld>
           </a:p>
@@ -4568,7 +4622,7 @@
         <p:txBody>
           <a:bodyPr/>
           <a:p>
-            <a:fld id="{1CE57045-2ECD-48EA-A410-728D8E0640E7}" type="datetime1">
+            <a:fld id="{2CB47339-6434-4B17-A195-08DEBF897C13}" type="datetime1">
               <a:rPr lang="en-US"/>
               <a:t>04/28/2025</a:t>
             </a:fld>
@@ -4703,7 +4757,7 @@
                 <a:uFillTx/>
                 <a:latin typeface="Arial"/>
               </a:rPr>
-              <a:t>Kada dostignemo breakpoint, možemo pogledati trenutne registre, zastavice i memoriju u tablicama.</a:t>
+              <a:t>Da bismo komunicirali s programima kao što je “Decimal to Binary” (drugi primjer s lijeva), moramo uključiti UART terminal.</a:t>
             </a:r>
             <a:endParaRPr b="0" lang="bs-BA" sz="2400" strike="noStrike" u="none">
               <a:solidFill>
@@ -4733,7 +4787,7 @@
                 <a:uFillTx/>
                 <a:latin typeface="Arial"/>
               </a:rPr>
-              <a:t>Nedavno promijenjene zastavice i registri obojane su različitom bojom, da nam ne bi promakli. Za to se koristio </a:t>
+              <a:t>Preporučljivo je pritom isključiti checkbox “</a:t>
             </a:r>
             <a:r>
               <a:rPr b="0" i="1" lang="bs-BA" sz="2400" strike="noStrike" u="none">
@@ -4743,7 +4797,7 @@
                 <a:uFillTx/>
                 <a:latin typeface="Arial"/>
               </a:rPr>
-              <a:t>DOM as a state</a:t>
+              <a:t>Update registers and flags on every step</a:t>
             </a:r>
             <a:r>
               <a:rPr b="0" lang="bs-BA" sz="2400" strike="noStrike" u="none">
@@ -4753,7 +4807,27 @@
                 <a:uFillTx/>
                 <a:latin typeface="Arial"/>
               </a:rPr>
-              <a:t>, što možda i nije najbolje rješenje.</a:t>
+              <a:t>”. Verzija </a:t>
+            </a:r>
+            <a:r>
+              <a:rPr b="0" i="1" lang="bs-BA" sz="2400" strike="noStrike" u="none">
+                <a:solidFill>
+                  <a:srgbClr val="009bdd"/>
+                </a:solidFill>
+                <a:uFillTx/>
+                <a:latin typeface="Arial"/>
+              </a:rPr>
+              <a:t>v3.1.4</a:t>
+            </a:r>
+            <a:r>
+              <a:rPr b="0" lang="bs-BA" sz="2400" strike="noStrike" u="none">
+                <a:solidFill>
+                  <a:srgbClr val="009bdd"/>
+                </a:solidFill>
+                <a:uFillTx/>
+                <a:latin typeface="Arial"/>
+              </a:rPr>
+              <a:t> i novije to rade automatski.</a:t>
             </a:r>
             <a:endParaRPr b="0" lang="bs-BA" sz="2400" strike="noStrike" u="none">
               <a:solidFill>
@@ -4777,8 +4851,8 @@
         </p:blipFill>
         <p:spPr>
           <a:xfrm>
-            <a:off x="343080" y="914400"/>
-            <a:ext cx="4686120" cy="3779280"/>
+            <a:off x="396360" y="914400"/>
+            <a:ext cx="3032640" cy="1833120"/>
           </a:xfrm>
           <a:prstGeom prst="rect">
             <a:avLst/>
@@ -4789,6 +4863,30 @@
           </a:ln>
         </p:spPr>
       </p:pic>
+      <p:pic>
+        <p:nvPicPr>
+          <p:cNvPr id="71" name="" descr=""/>
+          <p:cNvPicPr/>
+          <p:nvPr/>
+        </p:nvPicPr>
+        <p:blipFill>
+          <a:blip r:embed="rId2"/>
+          <a:stretch/>
+        </p:blipFill>
+        <p:spPr>
+          <a:xfrm>
+            <a:off x="327960" y="3200400"/>
+            <a:ext cx="4701240" cy="837720"/>
+          </a:xfrm>
+          <a:prstGeom prst="rect">
+            <a:avLst/>
+          </a:prstGeom>
+          <a:noFill/>
+          <a:ln w="18000">
+            <a:noFill/>
+          </a:ln>
+        </p:spPr>
+      </p:pic>
       <p:sp>
         <p:nvSpPr>
           <p:cNvPr id="4" name="PlaceHolder 3"/>
@@ -4803,7 +4901,7 @@
         <p:txBody>
           <a:bodyPr/>
           <a:p>
-            <a:fld id="{B98307E8-77E8-4B76-9178-9F05003C905B}" type="slidenum">
+            <a:fld id="{6C526579-A749-4491-B15C-353EBE92EB45}" type="slidenum">
               <a:t>15</a:t>
             </a:fld>
           </a:p>
@@ -4823,7 +4921,7 @@
         <p:txBody>
           <a:bodyPr/>
           <a:p>
-            <a:fld id="{A50A6E45-488B-4B50-BCE9-00784C74A096}" type="datetime1">
+            <a:fld id="{765B1114-15FE-41EA-9F8A-53F30BE99A58}" type="datetime1">
               <a:rPr lang="en-US"/>
               <a:t>04/28/2025</a:t>
             </a:fld>
@@ -4862,7 +4960,7 @@
       </p:grpSpPr>
       <p:sp>
         <p:nvSpPr>
-          <p:cNvPr id="71" name="PlaceHolder 1"/>
+          <p:cNvPr id="72" name="PlaceHolder 1"/>
           <p:cNvSpPr>
             <a:spLocks noGrp="1"/>
           </p:cNvSpPr>
@@ -4899,7 +4997,17 @@
                 <a:uFillTx/>
                 <a:latin typeface="Arial"/>
               </a:rPr>
-              <a:t>Kako se koristi...</a:t>
+              <a:t>“</a:t>
+            </a:r>
+            <a:r>
+              <a:rPr b="0" lang="bs-BA" sz="3300" strike="noStrike" u="none">
+                <a:solidFill>
+                  <a:srgbClr val="ffffff"/>
+                </a:solidFill>
+                <a:uFillTx/>
+                <a:latin typeface="Arial"/>
+              </a:rPr>
+              <a:t>Update registers and flags on every step”</a:t>
             </a:r>
             <a:endParaRPr b="0" lang="bs-BA" sz="3300" strike="noStrike" u="none">
               <a:solidFill>
@@ -4913,7 +5021,7 @@
       </p:sp>
       <p:sp>
         <p:nvSpPr>
-          <p:cNvPr id="72" name="PlaceHolder 2"/>
+          <p:cNvPr id="73" name="PlaceHolder 2"/>
           <p:cNvSpPr>
             <a:spLocks noGrp="1"/>
           </p:cNvSpPr>
@@ -4923,8 +5031,8 @@
         </p:nvSpPr>
         <p:spPr>
           <a:xfrm>
-            <a:off x="5155920" y="1080000"/>
-            <a:ext cx="4567320" cy="3600000"/>
+            <a:off x="360000" y="1080000"/>
+            <a:ext cx="9360000" cy="3600000"/>
           </a:xfrm>
           <a:prstGeom prst="rect">
             <a:avLst/>
@@ -4951,16 +5059,16 @@
               <a:buChar char=""/>
             </a:pPr>
             <a:r>
-              <a:rPr b="0" lang="bs-BA" sz="2400" strike="noStrike" u="none">
-                <a:solidFill>
-                  <a:srgbClr val="009bdd"/>
-                </a:solidFill>
-                <a:uFillTx/>
-                <a:latin typeface="Arial"/>
-              </a:rPr>
-              <a:t>Da bismo komunicirali s programima kao što je “Decimal to Binary” (drugi primjer s lijeva), moramo uključiti UART terminal.</a:t>
-            </a:r>
-            <a:endParaRPr b="0" lang="bs-BA" sz="2400" strike="noStrike" u="none">
+              <a:rPr b="0" lang="bs-BA" sz="2200" strike="noStrike" u="none">
+                <a:solidFill>
+                  <a:srgbClr val="009bdd"/>
+                </a:solidFill>
+                <a:uFillTx/>
+                <a:latin typeface="Arial"/>
+              </a:rPr>
+              <a:t>Naime, moj program ima problem s layout trashingom: svaki put kad se upiše novi broj u tablicu s registrima (dakle, praktički svaka instrukcija), tablica se neprimjetno poveća ili smanji za nekoliko piksela... ali dovoljno da prisili browser da čitavu stranicu mora iznova renderirati.</a:t>
+            </a:r>
+            <a:endParaRPr b="0" lang="bs-BA" sz="2200" strike="noStrike" u="none">
               <a:solidFill>
                 <a:srgbClr val="009bdd"/>
               </a:solidFill>
@@ -4981,56 +5089,16 @@
               <a:buChar char=""/>
             </a:pPr>
             <a:r>
-              <a:rPr b="0" lang="bs-BA" sz="2400" strike="noStrike" u="none">
-                <a:solidFill>
-                  <a:srgbClr val="009bdd"/>
-                </a:solidFill>
-                <a:uFillTx/>
-                <a:latin typeface="Arial"/>
-              </a:rPr>
-              <a:t>Preporučljivo je pritom isključiti checkbox “</a:t>
-            </a:r>
-            <a:r>
-              <a:rPr b="0" i="1" lang="bs-BA" sz="2400" strike="noStrike" u="none">
-                <a:solidFill>
-                  <a:srgbClr val="009bdd"/>
-                </a:solidFill>
-                <a:uFillTx/>
-                <a:latin typeface="Arial"/>
-              </a:rPr>
-              <a:t>Update registers and flags on every step</a:t>
-            </a:r>
-            <a:r>
-              <a:rPr b="0" lang="bs-BA" sz="2400" strike="noStrike" u="none">
-                <a:solidFill>
-                  <a:srgbClr val="009bdd"/>
-                </a:solidFill>
-                <a:uFillTx/>
-                <a:latin typeface="Arial"/>
-              </a:rPr>
-              <a:t>”. Verzija </a:t>
-            </a:r>
-            <a:r>
-              <a:rPr b="0" i="1" lang="bs-BA" sz="2400" strike="noStrike" u="none">
-                <a:solidFill>
-                  <a:srgbClr val="009bdd"/>
-                </a:solidFill>
-                <a:uFillTx/>
-                <a:latin typeface="Arial"/>
-              </a:rPr>
-              <a:t>v3.1.4</a:t>
-            </a:r>
-            <a:r>
-              <a:rPr b="0" lang="bs-BA" sz="2400" strike="noStrike" u="none">
-                <a:solidFill>
-                  <a:srgbClr val="009bdd"/>
-                </a:solidFill>
-                <a:uFillTx/>
-                <a:latin typeface="Arial"/>
-              </a:rPr>
-              <a:t> i novije to rade automatski.</a:t>
-            </a:r>
-            <a:endParaRPr b="0" lang="bs-BA" sz="2400" strike="noStrike" u="none">
+              <a:rPr b="0" lang="bs-BA" sz="2200" strike="noStrike" u="none">
+                <a:solidFill>
+                  <a:srgbClr val="009bdd"/>
+                </a:solidFill>
+                <a:uFillTx/>
+                <a:latin typeface="Arial"/>
+              </a:rPr>
+              <a:t>Činjenica da sam koristio monospace font u tablici, izgleda, ne pomaže.</a:t>
+            </a:r>
+            <a:endParaRPr b="0" lang="bs-BA" sz="2200" strike="noStrike" u="none">
               <a:solidFill>
                 <a:srgbClr val="009bdd"/>
               </a:solidFill>
@@ -5038,56 +5106,78 @@
               <a:latin typeface="Arial"/>
             </a:endParaRPr>
           </a:p>
-        </p:txBody>
-      </p:sp>
-      <p:pic>
-        <p:nvPicPr>
-          <p:cNvPr id="73" name="" descr=""/>
-          <p:cNvPicPr/>
-          <p:nvPr/>
-        </p:nvPicPr>
-        <p:blipFill>
-          <a:blip r:embed="rId1"/>
-          <a:stretch/>
-        </p:blipFill>
-        <p:spPr>
-          <a:xfrm>
-            <a:off x="396360" y="914400"/>
-            <a:ext cx="3032640" cy="1833120"/>
-          </a:xfrm>
-          <a:prstGeom prst="rect">
-            <a:avLst/>
-          </a:prstGeom>
-          <a:noFill/>
-          <a:ln w="18000">
-            <a:noFill/>
-          </a:ln>
-        </p:spPr>
-      </p:pic>
-      <p:pic>
-        <p:nvPicPr>
-          <p:cNvPr id="74" name="" descr=""/>
-          <p:cNvPicPr/>
-          <p:nvPr/>
-        </p:nvPicPr>
-        <p:blipFill>
-          <a:blip r:embed="rId2"/>
-          <a:stretch/>
-        </p:blipFill>
-        <p:spPr>
-          <a:xfrm>
-            <a:off x="327960" y="3200400"/>
-            <a:ext cx="4701240" cy="837720"/>
-          </a:xfrm>
-          <a:prstGeom prst="rect">
-            <a:avLst/>
-          </a:prstGeom>
-          <a:noFill/>
-          <a:ln w="18000">
-            <a:noFill/>
-          </a:ln>
-        </p:spPr>
-      </p:pic>
+          <a:p>
+            <a:pPr marL="432000" indent="-324000">
+              <a:spcBef>
+                <a:spcPts val="1060"/>
+              </a:spcBef>
+              <a:buClr>
+                <a:srgbClr val="77caee"/>
+              </a:buClr>
+              <a:buSzPct val="45000"/>
+              <a:buFont typeface="Wingdings" charset="2"/>
+              <a:buChar char=""/>
+            </a:pPr>
+            <a:r>
+              <a:rPr b="0" lang="bs-BA" sz="2200" strike="noStrike" u="none">
+                <a:solidFill>
+                  <a:srgbClr val="009bdd"/>
+                </a:solidFill>
+                <a:uFillTx/>
+                <a:latin typeface="Arial"/>
+              </a:rPr>
+              <a:t>Vjerujemo da je u modernim internetskim preglednicima (Firefox 69, Chrome 52...) to moguće riješiti CSS-om (naredba “</a:t>
+            </a:r>
+            <a:r>
+              <a:rPr b="0" i="1" lang="bs-BA" sz="2200" strike="noStrike" u="none">
+                <a:solidFill>
+                  <a:srgbClr val="009bdd"/>
+                </a:solidFill>
+                <a:uFillTx/>
+                <a:latin typeface="Arial"/>
+              </a:rPr>
+              <a:t>contain: layout</a:t>
+            </a:r>
+            <a:r>
+              <a:rPr b="0" lang="bs-BA" sz="2200" strike="noStrike" u="none">
+                <a:solidFill>
+                  <a:srgbClr val="009bdd"/>
+                </a:solidFill>
+                <a:uFillTx/>
+                <a:latin typeface="Arial"/>
+              </a:rPr>
+              <a:t>” i njoj srodne) i da će to i biti u nekoj budućoj verziji ovog simulatora. Ali, for the time being, postoji checkbox kojim se program može donekle ubrzati. Uostalom, to rješenje sa checkboxom funkcionira i u Firefoxu 52 (koji ne podržava “</a:t>
+            </a:r>
+            <a:r>
+              <a:rPr b="0" i="1" lang="bs-BA" sz="2200" strike="noStrike" u="none">
+                <a:solidFill>
+                  <a:srgbClr val="009bdd"/>
+                </a:solidFill>
+                <a:uFillTx/>
+                <a:latin typeface="Arial"/>
+              </a:rPr>
+              <a:t>contain: layout</a:t>
+            </a:r>
+            <a:r>
+              <a:rPr b="0" lang="bs-BA" sz="2200" strike="noStrike" u="none">
+                <a:solidFill>
+                  <a:srgbClr val="009bdd"/>
+                </a:solidFill>
+                <a:uFillTx/>
+                <a:latin typeface="Arial"/>
+              </a:rPr>
+              <a:t>” i njoj srodne naredbe).</a:t>
+            </a:r>
+            <a:endParaRPr b="0" lang="bs-BA" sz="2200" strike="noStrike" u="none">
+              <a:solidFill>
+                <a:srgbClr val="009bdd"/>
+              </a:solidFill>
+              <a:uFillTx/>
+              <a:latin typeface="Arial"/>
+            </a:endParaRPr>
+          </a:p>
+        </p:txBody>
+      </p:sp>
       <p:sp>
         <p:nvSpPr>
           <p:cNvPr id="4" name="PlaceHolder 3"/>
@@ -5102,7 +5192,7 @@
         <p:txBody>
           <a:bodyPr/>
           <a:p>
-            <a:fld id="{964E01A4-3FCA-420E-9F06-BA0B88CFCE77}" type="slidenum">
+            <a:fld id="{B0864470-7457-415E-BD88-E9467DB79278}" type="slidenum">
               <a:t>16</a:t>
             </a:fld>
           </a:p>
@@ -5122,7 +5212,7 @@
         <p:txBody>
           <a:bodyPr/>
           <a:p>
-            <a:fld id="{C1015620-A880-475A-B806-D6009E42C976}" type="datetime1">
+            <a:fld id="{326F732A-D40D-4961-B098-4A69DBF944C7}" type="datetime1">
               <a:rPr lang="en-US"/>
               <a:t>04/28/2025</a:t>
             </a:fld>
@@ -5161,7 +5251,7 @@
       </p:grpSpPr>
       <p:sp>
         <p:nvSpPr>
-          <p:cNvPr id="75" name="PlaceHolder 1"/>
+          <p:cNvPr id="74" name="PlaceHolder 1"/>
           <p:cNvSpPr>
             <a:spLocks noGrp="1"/>
           </p:cNvSpPr>
@@ -5198,17 +5288,7 @@
                 <a:uFillTx/>
                 <a:latin typeface="Arial"/>
               </a:rPr>
-              <a:t>“</a:t>
-            </a:r>
-            <a:r>
-              <a:rPr b="0" lang="bs-BA" sz="3300" strike="noStrike" u="none">
-                <a:solidFill>
-                  <a:srgbClr val="ffffff"/>
-                </a:solidFill>
-                <a:uFillTx/>
-                <a:latin typeface="Arial"/>
-              </a:rPr>
-              <a:t>Update registers and flags on every step”</a:t>
+              <a:t>Je li simulacija UART-a realna?</a:t>
             </a:r>
             <a:endParaRPr b="0" lang="bs-BA" sz="3300" strike="noStrike" u="none">
               <a:solidFill>
@@ -5222,7 +5302,7 @@
       </p:sp>
       <p:sp>
         <p:nvSpPr>
-          <p:cNvPr id="76" name="PlaceHolder 2"/>
+          <p:cNvPr id="75" name="PlaceHolder 2"/>
           <p:cNvSpPr>
             <a:spLocks noGrp="1"/>
           </p:cNvSpPr>
@@ -5260,16 +5340,36 @@
               <a:buChar char=""/>
             </a:pPr>
             <a:r>
-              <a:rPr b="0" lang="bs-BA" sz="2200" strike="noStrike" u="none">
-                <a:solidFill>
-                  <a:srgbClr val="009bdd"/>
-                </a:solidFill>
-                <a:uFillTx/>
-                <a:latin typeface="Arial"/>
-              </a:rPr>
-              <a:t>Naime, moj program ima problem s layout trashingom: svaki put kad se upiše novi broj u tablicu s registrima (dakle, praktički svaka instrukcija), tablica se neprimjetno poveća ili smanji za nekoliko piksela... ali dovoljno da prisili browser da čitavu stranicu mora iznova renderirati.</a:t>
-            </a:r>
-            <a:endParaRPr b="0" lang="bs-BA" sz="2200" strike="noStrike" u="none">
+              <a:rPr b="0" lang="bs-BA" sz="2400" strike="noStrike" u="none">
+                <a:solidFill>
+                  <a:srgbClr val="009bdd"/>
+                </a:solidFill>
+                <a:uFillTx/>
+                <a:latin typeface="Arial"/>
+              </a:rPr>
+              <a:t>Program “</a:t>
+            </a:r>
+            <a:r>
+              <a:rPr b="0" i="1" lang="bs-BA" sz="2400" strike="noStrike" u="none">
+                <a:solidFill>
+                  <a:srgbClr val="009bdd"/>
+                </a:solidFill>
+                <a:uFillTx/>
+                <a:latin typeface="Arial"/>
+              </a:rPr>
+              <a:t>Decimal to Binary</a:t>
+            </a:r>
+            <a:r>
+              <a:rPr b="0" lang="bs-BA" sz="2400" strike="noStrike" u="none">
+                <a:solidFill>
+                  <a:srgbClr val="009bdd"/>
+                </a:solidFill>
+                <a:uFillTx/>
+                <a:latin typeface="Arial"/>
+              </a:rPr>
+              <a:t>” nisam uspio pokrenuti na pravom PicoBlazeu, a nisam uspio ni dijagnosticirati problem (je li problem u programu ili u tome kako sam postavio PicoBlaze). Tako da ga ne treba uzeti kao sigurno dobar primjer kako se na PicoBlazeu koristi UART.</a:t>
+            </a:r>
+            <a:endParaRPr b="0" lang="bs-BA" sz="2400" strike="noStrike" u="none">
               <a:solidFill>
                 <a:srgbClr val="009bdd"/>
               </a:solidFill>
@@ -5290,16 +5390,16 @@
               <a:buChar char=""/>
             </a:pPr>
             <a:r>
-              <a:rPr b="0" lang="bs-BA" sz="2200" strike="noStrike" u="none">
-                <a:solidFill>
-                  <a:srgbClr val="009bdd"/>
-                </a:solidFill>
-                <a:uFillTx/>
-                <a:latin typeface="Arial"/>
-              </a:rPr>
-              <a:t>Činjenica da sam koristio monospace font u tablici, izgleda, ne pomaže.</a:t>
-            </a:r>
-            <a:endParaRPr b="0" lang="bs-BA" sz="2200" strike="noStrike" u="none">
+              <a:rPr b="0" lang="bs-BA" sz="2400" strike="noStrike" u="none">
+                <a:solidFill>
+                  <a:srgbClr val="009bdd"/>
+                </a:solidFill>
+                <a:uFillTx/>
+                <a:latin typeface="Arial"/>
+              </a:rPr>
+              <a:t>Isto vrijedi i za druge programe koji koriste UART (Permutations Algorithm, Regbanks-Flags Test, i N-Queens Puzzle): nisam ih testirao na pravom PicoBlazeu.</a:t>
+            </a:r>
+            <a:endParaRPr b="0" lang="bs-BA" sz="2400" strike="noStrike" u="none">
               <a:solidFill>
                 <a:srgbClr val="009bdd"/>
               </a:solidFill>
@@ -5307,76 +5407,6 @@
               <a:latin typeface="Arial"/>
             </a:endParaRPr>
           </a:p>
-          <a:p>
-            <a:pPr marL="432000" indent="-324000">
-              <a:spcBef>
-                <a:spcPts val="1060"/>
-              </a:spcBef>
-              <a:buClr>
-                <a:srgbClr val="77caee"/>
-              </a:buClr>
-              <a:buSzPct val="45000"/>
-              <a:buFont typeface="Wingdings" charset="2"/>
-              <a:buChar char=""/>
-            </a:pPr>
-            <a:r>
-              <a:rPr b="0" lang="bs-BA" sz="2200" strike="noStrike" u="none">
-                <a:solidFill>
-                  <a:srgbClr val="009bdd"/>
-                </a:solidFill>
-                <a:uFillTx/>
-                <a:latin typeface="Arial"/>
-              </a:rPr>
-              <a:t>Vjerujemo da je u modernim internetskim preglednicima (Firefox 69, Chrome 52...) to moguće riješiti CSS-om (naredba “</a:t>
-            </a:r>
-            <a:r>
-              <a:rPr b="0" i="1" lang="bs-BA" sz="2200" strike="noStrike" u="none">
-                <a:solidFill>
-                  <a:srgbClr val="009bdd"/>
-                </a:solidFill>
-                <a:uFillTx/>
-                <a:latin typeface="Arial"/>
-              </a:rPr>
-              <a:t>contain: layout</a:t>
-            </a:r>
-            <a:r>
-              <a:rPr b="0" lang="bs-BA" sz="2200" strike="noStrike" u="none">
-                <a:solidFill>
-                  <a:srgbClr val="009bdd"/>
-                </a:solidFill>
-                <a:uFillTx/>
-                <a:latin typeface="Arial"/>
-              </a:rPr>
-              <a:t>” i njoj srodne) i da će to i biti u nekoj budućoj verziji ovog simulatora. Ali, for the time being, postoji checkbox kojim se program može donekle ubrzati. Uostalom, to rješenje sa checkboxom funkcionira i u Firefoxu 52 (koji ne podržava “</a:t>
-            </a:r>
-            <a:r>
-              <a:rPr b="0" i="1" lang="bs-BA" sz="2200" strike="noStrike" u="none">
-                <a:solidFill>
-                  <a:srgbClr val="009bdd"/>
-                </a:solidFill>
-                <a:uFillTx/>
-                <a:latin typeface="Arial"/>
-              </a:rPr>
-              <a:t>contain: layout</a:t>
-            </a:r>
-            <a:r>
-              <a:rPr b="0" lang="bs-BA" sz="2200" strike="noStrike" u="none">
-                <a:solidFill>
-                  <a:srgbClr val="009bdd"/>
-                </a:solidFill>
-                <a:uFillTx/>
-                <a:latin typeface="Arial"/>
-              </a:rPr>
-              <a:t>” i njoj srodne naredbe).</a:t>
-            </a:r>
-            <a:endParaRPr b="0" lang="bs-BA" sz="2200" strike="noStrike" u="none">
-              <a:solidFill>
-                <a:srgbClr val="009bdd"/>
-              </a:solidFill>
-              <a:uFillTx/>
-              <a:latin typeface="Arial"/>
-            </a:endParaRPr>
-          </a:p>
         </p:txBody>
       </p:sp>
       <p:sp>
@@ -5393,7 +5423,7 @@
         <p:txBody>
           <a:bodyPr/>
           <a:p>
-            <a:fld id="{56927AD2-A9C0-4B56-82C8-36D830BFD269}" type="slidenum">
+            <a:fld id="{E273EF24-0043-48A8-AECC-066122206862}" type="slidenum">
               <a:t>17</a:t>
             </a:fld>
           </a:p>
@@ -5413,7 +5443,7 @@
         <p:txBody>
           <a:bodyPr/>
           <a:p>
-            <a:fld id="{BE5F9045-E215-4636-8986-19C02D47D242}" type="datetime1">
+            <a:fld id="{33004786-7303-4FE4-9A89-1644E4E64C41}" type="datetime1">
               <a:rPr lang="en-US"/>
               <a:t>04/28/2025</a:t>
             </a:fld>
@@ -5452,7 +5482,7 @@
       </p:grpSpPr>
       <p:sp>
         <p:nvSpPr>
-          <p:cNvPr id="77" name="PlaceHolder 1"/>
+          <p:cNvPr id="76" name="PlaceHolder 1"/>
           <p:cNvSpPr>
             <a:spLocks noGrp="1"/>
           </p:cNvSpPr>
@@ -5489,7 +5519,7 @@
                 <a:uFillTx/>
                 <a:latin typeface="Arial"/>
               </a:rPr>
-              <a:t>Je li simulacija UART-a realna?</a:t>
+              <a:t>Kako se koristi...</a:t>
             </a:r>
             <a:endParaRPr b="0" lang="bs-BA" sz="3300" strike="noStrike" u="none">
               <a:solidFill>
@@ -5503,7 +5533,7 @@
       </p:sp>
       <p:sp>
         <p:nvSpPr>
-          <p:cNvPr id="78" name="PlaceHolder 2"/>
+          <p:cNvPr id="77" name="PlaceHolder 2"/>
           <p:cNvSpPr>
             <a:spLocks noGrp="1"/>
           </p:cNvSpPr>
@@ -5513,8 +5543,8 @@
         </p:nvSpPr>
         <p:spPr>
           <a:xfrm>
-            <a:off x="360000" y="1080000"/>
-            <a:ext cx="9360000" cy="3600000"/>
+            <a:off x="5155920" y="1080000"/>
+            <a:ext cx="4567320" cy="3600000"/>
           </a:xfrm>
           <a:prstGeom prst="rect">
             <a:avLst/>
@@ -5548,7 +5578,7 @@
                 <a:uFillTx/>
                 <a:latin typeface="Arial"/>
               </a:rPr>
-              <a:t>Program “</a:t>
+              <a:t>Asembler podržava ono što se očekuje od današnjeg asemblera: aritmetičke izraze u konstantama, if-grananje, if-else grananje i while-petlje. </a:t>
             </a:r>
             <a:r>
               <a:rPr b="0" i="1" lang="bs-BA" sz="2400" strike="noStrike" u="none">
@@ -5558,17 +5588,7 @@
                 <a:uFillTx/>
                 <a:latin typeface="Arial"/>
               </a:rPr>
-              <a:t>Decimal to Binary</a:t>
-            </a:r>
-            <a:r>
-              <a:rPr b="0" lang="bs-BA" sz="2400" strike="noStrike" u="none">
-                <a:solidFill>
-                  <a:srgbClr val="009bdd"/>
-                </a:solidFill>
-                <a:uFillTx/>
-                <a:latin typeface="Arial"/>
-              </a:rPr>
-              <a:t>” nisam uspio pokrenuti na pravom PicoBlazeu, a nisam uspio ni dijagnosticirati problem (je li problem u programu ili u tome kako sam postavio PicoBlaze). Tako da ga ne treba uzeti kao sigurno dobar primjer kako se na PicoBlazeu koristi UART.</a:t>
+              <a:t>Svaki asembler ujedno je i interpreter.</a:t>
             </a:r>
             <a:endParaRPr b="0" lang="bs-BA" sz="2400" strike="noStrike" u="none">
               <a:solidFill>
@@ -5598,7 +5618,7 @@
                 <a:uFillTx/>
                 <a:latin typeface="Arial"/>
               </a:rPr>
-              <a:t>Isto vrijedi i za druge programe koji koriste UART (Permutations Algorithm, Regbanks-Flags Test, i N-Queens Puzzle): nisam ih testirao na pravom PicoBlazeu.</a:t>
+              <a:t>Primjer “Preprocessor Test” ispisuje Fibonaccijeve brojeve manje od 1000 za vrijeme asembliranja.</a:t>
             </a:r>
             <a:endParaRPr b="0" lang="bs-BA" sz="2400" strike="noStrike" u="none">
               <a:solidFill>
@@ -5610,6 +5630,30 @@
           </a:p>
         </p:txBody>
       </p:sp>
+      <p:pic>
+        <p:nvPicPr>
+          <p:cNvPr id="78" name="" descr=""/>
+          <p:cNvPicPr/>
+          <p:nvPr/>
+        </p:nvPicPr>
+        <p:blipFill>
+          <a:blip r:embed="rId1"/>
+          <a:stretch/>
+        </p:blipFill>
+        <p:spPr>
+          <a:xfrm>
+            <a:off x="228600" y="983160"/>
+            <a:ext cx="4671000" cy="3817440"/>
+          </a:xfrm>
+          <a:prstGeom prst="rect">
+            <a:avLst/>
+          </a:prstGeom>
+          <a:noFill/>
+          <a:ln w="18000">
+            <a:noFill/>
+          </a:ln>
+        </p:spPr>
+      </p:pic>
       <p:sp>
         <p:nvSpPr>
           <p:cNvPr id="4" name="PlaceHolder 3"/>
@@ -5624,7 +5668,7 @@
         <p:txBody>
           <a:bodyPr/>
           <a:p>
-            <a:fld id="{A6DEB538-01EA-46C6-86C4-EAC49B4E4360}" type="slidenum">
+            <a:fld id="{F910C1DE-9FA3-4524-95E3-3C4E80E5DC3A}" type="slidenum">
               <a:t>18</a:t>
             </a:fld>
           </a:p>
@@ -5644,7 +5688,7 @@
         <p:txBody>
           <a:bodyPr/>
           <a:p>
-            <a:fld id="{2DBABC1F-3410-4A3D-B48E-6845BBFAD285}" type="datetime1">
+            <a:fld id="{C3D22516-0064-4DA2-BDB1-8E649DBA11C2}" type="datetime1">
               <a:rPr lang="en-US"/>
               <a:t>04/28/2025</a:t>
             </a:fld>
@@ -5720,7 +5764,7 @@
                 <a:uFillTx/>
                 <a:latin typeface="Arial"/>
               </a:rPr>
-              <a:t>Kako se koristi...</a:t>
+              <a:t>Nedostatci predprocesora</a:t>
             </a:r>
             <a:endParaRPr b="0" lang="bs-BA" sz="3300" strike="noStrike" u="none">
               <a:solidFill>
@@ -5744,8 +5788,8 @@
         </p:nvSpPr>
         <p:spPr>
           <a:xfrm>
-            <a:off x="5155920" y="1080000"/>
-            <a:ext cx="4567320" cy="3600000"/>
+            <a:off x="360000" y="1080000"/>
+            <a:ext cx="9360000" cy="3600000"/>
           </a:xfrm>
           <a:prstGeom prst="rect">
             <a:avLst/>
@@ -5779,17 +5823,7 @@
                 <a:uFillTx/>
                 <a:latin typeface="Arial"/>
               </a:rPr>
-              <a:t>Asembler podržava ono što se očekuje od današnjeg asemblera: aritmetičke izraze u konstantama, if-grananje, if-else grananje i while-petlje. </a:t>
-            </a:r>
-            <a:r>
-              <a:rPr b="0" i="1" lang="bs-BA" sz="2400" strike="noStrike" u="none">
-                <a:solidFill>
-                  <a:srgbClr val="009bdd"/>
-                </a:solidFill>
-                <a:uFillTx/>
-                <a:latin typeface="Arial"/>
-              </a:rPr>
-              <a:t>Svaki asembler ujedno je i interpreter.</a:t>
+              <a:t>Ne podržava makro-naredbe.</a:t>
             </a:r>
             <a:endParaRPr b="0" lang="bs-BA" sz="2400" strike="noStrike" u="none">
               <a:solidFill>
@@ -5819,7 +5853,137 @@
                 <a:uFillTx/>
                 <a:latin typeface="Arial"/>
               </a:rPr>
-              <a:t>Primjer “Preprocessor Test” ispisuje Fibonaccijeve brojeve manje od 1000 za vrijeme asembliranja.</a:t>
+              <a:t>Postoji neki neobičan bug u pretprocesoru da naredba “</a:t>
+            </a:r>
+            <a:r>
+              <a:rPr b="0" i="1" lang="bs-BA" sz="2400" strike="noStrike" u="none">
+                <a:solidFill>
+                  <a:srgbClr val="009bdd"/>
+                </a:solidFill>
+                <a:uFillTx/>
+                <a:latin typeface="Arial"/>
+              </a:rPr>
+              <a:t>display a</a:t>
+            </a:r>
+            <a:r>
+              <a:rPr b="0" lang="bs-BA" sz="2400" strike="noStrike" u="none">
+                <a:solidFill>
+                  <a:srgbClr val="009bdd"/>
+                </a:solidFill>
+                <a:uFillTx/>
+                <a:latin typeface="Arial"/>
+              </a:rPr>
+              <a:t>”(novi red) ne radi kada je simulacija UART-a isključena.</a:t>
+            </a:r>
+            <a:endParaRPr b="0" lang="bs-BA" sz="2400" strike="noStrike" u="none">
+              <a:solidFill>
+                <a:srgbClr val="009bdd"/>
+              </a:solidFill>
+              <a:uFillTx/>
+              <a:latin typeface="Arial"/>
+            </a:endParaRPr>
+          </a:p>
+          <a:p>
+            <a:pPr marL="432000" indent="-324000">
+              <a:spcBef>
+                <a:spcPts val="1060"/>
+              </a:spcBef>
+              <a:buClr>
+                <a:srgbClr val="77caee"/>
+              </a:buClr>
+              <a:buSzPct val="45000"/>
+              <a:buFont typeface="Wingdings" charset="2"/>
+              <a:buChar char=""/>
+            </a:pPr>
+            <a:r>
+              <a:rPr b="0" lang="bs-BA" sz="2400" strike="noStrike" u="none">
+                <a:solidFill>
+                  <a:srgbClr val="009bdd"/>
+                </a:solidFill>
+                <a:uFillTx/>
+                <a:latin typeface="Arial"/>
+              </a:rPr>
+              <a:t>U </a:t>
+            </a:r>
+            <a:r>
+              <a:rPr b="0" i="1" lang="bs-BA" sz="2400" strike="noStrike" u="none">
+                <a:solidFill>
+                  <a:srgbClr val="009bdd"/>
+                </a:solidFill>
+                <a:uFillTx/>
+                <a:latin typeface="Arial"/>
+              </a:rPr>
+              <a:t>if</a:t>
+            </a:r>
+            <a:r>
+              <a:rPr b="0" lang="bs-BA" sz="2400" strike="noStrike" u="none">
+                <a:solidFill>
+                  <a:srgbClr val="009bdd"/>
+                </a:solidFill>
+                <a:uFillTx/>
+                <a:latin typeface="Arial"/>
+              </a:rPr>
+              <a:t>-grananjima, </a:t>
+            </a:r>
+            <a:r>
+              <a:rPr b="0" i="1" lang="bs-BA" sz="2400" strike="noStrike" u="none">
+                <a:solidFill>
+                  <a:srgbClr val="009bdd"/>
+                </a:solidFill>
+                <a:uFillTx/>
+                <a:latin typeface="Arial"/>
+              </a:rPr>
+              <a:t>if-else</a:t>
+            </a:r>
+            <a:r>
+              <a:rPr b="0" lang="bs-BA" sz="2400" strike="noStrike" u="none">
+                <a:solidFill>
+                  <a:srgbClr val="009bdd"/>
+                </a:solidFill>
+                <a:uFillTx/>
+                <a:latin typeface="Arial"/>
+              </a:rPr>
+              <a:t>-grananjima i </a:t>
+            </a:r>
+            <a:r>
+              <a:rPr b="0" i="1" lang="bs-BA" sz="2400" strike="noStrike" u="none">
+                <a:solidFill>
+                  <a:srgbClr val="009bdd"/>
+                </a:solidFill>
+                <a:uFillTx/>
+                <a:latin typeface="Arial"/>
+              </a:rPr>
+              <a:t>while</a:t>
+            </a:r>
+            <a:r>
+              <a:rPr b="0" lang="bs-BA" sz="2400" strike="noStrike" u="none">
+                <a:solidFill>
+                  <a:srgbClr val="009bdd"/>
+                </a:solidFill>
+                <a:uFillTx/>
+                <a:latin typeface="Arial"/>
+              </a:rPr>
+              <a:t>-petljama ne mogu se nalaziti mnemonike niti pretprocesorska naredba </a:t>
+            </a:r>
+            <a:r>
+              <a:rPr b="0" i="1" lang="bs-BA" sz="2400" strike="noStrike" u="none">
+                <a:solidFill>
+                  <a:srgbClr val="009bdd"/>
+                </a:solidFill>
+                <a:uFillTx/>
+                <a:latin typeface="Arial"/>
+              </a:rPr>
+              <a:t>address</a:t>
+            </a:r>
+            <a:r>
+              <a:rPr b="0" lang="bs-BA" sz="2400" strike="noStrike" u="none">
+                <a:solidFill>
+                  <a:srgbClr val="009bdd"/>
+                </a:solidFill>
+                <a:uFillTx/>
+                <a:latin typeface="Arial"/>
+              </a:rPr>
+              <a:t>. To je zato jer bi se, da se te stvari omoguće, znatno zakomplicirao pretprocesor i bilo bi lagano nenamjerno napraviti beskonačnu petlju za vrijeme pretprocesiranja:</a:t>
             </a:r>
             <a:endParaRPr b="0" lang="bs-BA" sz="2400" strike="noStrike" u="none">
               <a:solidFill>
@@ -5843,8 +6007,8 @@
         </p:blipFill>
         <p:spPr>
           <a:xfrm>
-            <a:off x="228600" y="983160"/>
-            <a:ext cx="4671000" cy="3817440"/>
+            <a:off x="685800" y="4100040"/>
+            <a:ext cx="2293200" cy="929160"/>
           </a:xfrm>
           <a:prstGeom prst="rect">
             <a:avLst/>
@@ -5869,7 +6033,7 @@
         <p:txBody>
           <a:bodyPr/>
           <a:p>
-            <a:fld id="{229C580F-A158-4441-84C0-5B36349BBD6F}" type="slidenum">
+            <a:fld id="{635CB2F6-52DD-4DD5-9840-E587DBC44779}" type="slidenum">
               <a:t>19</a:t>
             </a:fld>
           </a:p>
@@ -5889,7 +6053,7 @@
         <p:txBody>
           <a:bodyPr/>
           <a:p>
-            <a:fld id="{F318BA77-18D2-410D-A5D6-3886B42F8CB2}" type="datetime1">
+            <a:fld id="{0421259F-DA67-40C1-B5E8-C16F2C73B4B6}" type="datetime1">
               <a:rPr lang="en-US"/>
               <a:t>04/28/2025</a:t>
             </a:fld>
@@ -6250,7 +6414,7 @@
         <p:txBody>
           <a:bodyPr/>
           <a:p>
-            <a:fld id="{ECCFA5CB-AEEB-4C04-A462-4C3B6F387761}" type="slidenum">
+            <a:fld id="{4330CE8D-2495-4233-9E1B-E3D5F1381B0F}" type="slidenum">
               <a:t>2</a:t>
             </a:fld>
           </a:p>
@@ -6270,7 +6434,7 @@
         <p:txBody>
           <a:bodyPr/>
           <a:p>
-            <a:fld id="{D33DABF9-B222-4D04-9B27-6AF17AE8B070}" type="datetime1">
+            <a:fld id="{A78AE541-48B9-4ECE-937B-972D9A60BA70}" type="datetime1">
               <a:rPr lang="en-US"/>
               <a:t>04/28/2025</a:t>
             </a:fld>
@@ -6346,7 +6510,7 @@
                 <a:uFillTx/>
                 <a:latin typeface="Arial"/>
               </a:rPr>
-              <a:t>Nedostatci predprocesora</a:t>
+              <a:t>Nedostatci simulatora</a:t>
             </a:r>
             <a:endParaRPr b="0" lang="bs-BA" sz="3300" strike="noStrike" u="none">
               <a:solidFill>
@@ -6405,28 +6569,18 @@
                 <a:uFillTx/>
                 <a:latin typeface="Arial"/>
               </a:rPr>
-              <a:t>Ne podržava makro-naredbe.</a:t>
-            </a:r>
-            <a:endParaRPr b="0" lang="bs-BA" sz="2400" strike="noStrike" u="none">
-              <a:solidFill>
-                <a:srgbClr val="009bdd"/>
-              </a:solidFill>
-              <a:uFillTx/>
-              <a:latin typeface="Arial"/>
-            </a:endParaRPr>
-          </a:p>
-          <a:p>
-            <a:pPr marL="432000" indent="-324000">
-              <a:spcBef>
-                <a:spcPts val="1060"/>
-              </a:spcBef>
-              <a:buClr>
-                <a:srgbClr val="77caee"/>
-              </a:buClr>
-              <a:buSzPct val="45000"/>
-              <a:buFont typeface="Wingdings" charset="2"/>
-              <a:buChar char=""/>
-            </a:pPr>
+              <a:t>Ne znam kako se zastavice na pravom PicoBlazeu ponašaju kad se promijeni regbanka. U svoj simulator PicoBlazea uprogramirao sam da svaka regbanka ima zasebne zastavice carry i zero (kao na Z80), ali moguće je da to nije tako. To bi se trebalo moći provjeriti pomoću programa “</a:t>
+            </a:r>
+            <a:r>
+              <a:rPr b="0" i="1" lang="bs-BA" sz="2400" strike="noStrike" u="none">
+                <a:solidFill>
+                  <a:srgbClr val="009bdd"/>
+                </a:solidFill>
+                <a:uFillTx/>
+                <a:latin typeface="Arial"/>
+              </a:rPr>
+              <a:t>Regbanks-Flags Test</a:t>
+            </a:r>
             <a:r>
               <a:rPr b="0" lang="bs-BA" sz="2400" strike="noStrike" u="none">
                 <a:solidFill>
@@ -6435,137 +6589,7 @@
                 <a:uFillTx/>
                 <a:latin typeface="Arial"/>
               </a:rPr>
-              <a:t>Postoji neki neobičan bug u pretprocesoru da naredba “</a:t>
-            </a:r>
-            <a:r>
-              <a:rPr b="0" i="1" lang="bs-BA" sz="2400" strike="noStrike" u="none">
-                <a:solidFill>
-                  <a:srgbClr val="009bdd"/>
-                </a:solidFill>
-                <a:uFillTx/>
-                <a:latin typeface="Arial"/>
-              </a:rPr>
-              <a:t>display a</a:t>
-            </a:r>
-            <a:r>
-              <a:rPr b="0" lang="bs-BA" sz="2400" strike="noStrike" u="none">
-                <a:solidFill>
-                  <a:srgbClr val="009bdd"/>
-                </a:solidFill>
-                <a:uFillTx/>
-                <a:latin typeface="Arial"/>
-              </a:rPr>
-              <a:t>”(novi red) ne radi kada je simulacija UART-a isključena.</a:t>
-            </a:r>
-            <a:endParaRPr b="0" lang="bs-BA" sz="2400" strike="noStrike" u="none">
-              <a:solidFill>
-                <a:srgbClr val="009bdd"/>
-              </a:solidFill>
-              <a:uFillTx/>
-              <a:latin typeface="Arial"/>
-            </a:endParaRPr>
-          </a:p>
-          <a:p>
-            <a:pPr marL="432000" indent="-324000">
-              <a:spcBef>
-                <a:spcPts val="1060"/>
-              </a:spcBef>
-              <a:buClr>
-                <a:srgbClr val="77caee"/>
-              </a:buClr>
-              <a:buSzPct val="45000"/>
-              <a:buFont typeface="Wingdings" charset="2"/>
-              <a:buChar char=""/>
-            </a:pPr>
-            <a:r>
-              <a:rPr b="0" lang="bs-BA" sz="2400" strike="noStrike" u="none">
-                <a:solidFill>
-                  <a:srgbClr val="009bdd"/>
-                </a:solidFill>
-                <a:uFillTx/>
-                <a:latin typeface="Arial"/>
-              </a:rPr>
-              <a:t>U </a:t>
-            </a:r>
-            <a:r>
-              <a:rPr b="0" i="1" lang="bs-BA" sz="2400" strike="noStrike" u="none">
-                <a:solidFill>
-                  <a:srgbClr val="009bdd"/>
-                </a:solidFill>
-                <a:uFillTx/>
-                <a:latin typeface="Arial"/>
-              </a:rPr>
-              <a:t>if</a:t>
-            </a:r>
-            <a:r>
-              <a:rPr b="0" lang="bs-BA" sz="2400" strike="noStrike" u="none">
-                <a:solidFill>
-                  <a:srgbClr val="009bdd"/>
-                </a:solidFill>
-                <a:uFillTx/>
-                <a:latin typeface="Arial"/>
-              </a:rPr>
-              <a:t>-grananjima, </a:t>
-            </a:r>
-            <a:r>
-              <a:rPr b="0" i="1" lang="bs-BA" sz="2400" strike="noStrike" u="none">
-                <a:solidFill>
-                  <a:srgbClr val="009bdd"/>
-                </a:solidFill>
-                <a:uFillTx/>
-                <a:latin typeface="Arial"/>
-              </a:rPr>
-              <a:t>if-else</a:t>
-            </a:r>
-            <a:r>
-              <a:rPr b="0" lang="bs-BA" sz="2400" strike="noStrike" u="none">
-                <a:solidFill>
-                  <a:srgbClr val="009bdd"/>
-                </a:solidFill>
-                <a:uFillTx/>
-                <a:latin typeface="Arial"/>
-              </a:rPr>
-              <a:t>-grananjima i </a:t>
-            </a:r>
-            <a:r>
-              <a:rPr b="0" i="1" lang="bs-BA" sz="2400" strike="noStrike" u="none">
-                <a:solidFill>
-                  <a:srgbClr val="009bdd"/>
-                </a:solidFill>
-                <a:uFillTx/>
-                <a:latin typeface="Arial"/>
-              </a:rPr>
-              <a:t>while</a:t>
-            </a:r>
-            <a:r>
-              <a:rPr b="0" lang="bs-BA" sz="2400" strike="noStrike" u="none">
-                <a:solidFill>
-                  <a:srgbClr val="009bdd"/>
-                </a:solidFill>
-                <a:uFillTx/>
-                <a:latin typeface="Arial"/>
-              </a:rPr>
-              <a:t>-petljama ne mogu se nalaziti mnemonike niti pretprocesorska naredba </a:t>
-            </a:r>
-            <a:r>
-              <a:rPr b="0" i="1" lang="bs-BA" sz="2400" strike="noStrike" u="none">
-                <a:solidFill>
-                  <a:srgbClr val="009bdd"/>
-                </a:solidFill>
-                <a:uFillTx/>
-                <a:latin typeface="Arial"/>
-              </a:rPr>
-              <a:t>address</a:t>
-            </a:r>
-            <a:r>
-              <a:rPr b="0" lang="bs-BA" sz="2400" strike="noStrike" u="none">
-                <a:solidFill>
-                  <a:srgbClr val="009bdd"/>
-                </a:solidFill>
-                <a:uFillTx/>
-                <a:latin typeface="Arial"/>
-              </a:rPr>
-              <a:t>. To je zato jer bi se, da se te stvari omoguće, znatno zakomplicirao pretprocesor i bilo bi lagano nenamjerno napraviti beskonačnu petlju za vrijeme pretprocesiranja:</a:t>
+              <a:t>”.</a:t>
             </a:r>
             <a:endParaRPr b="0" lang="bs-BA" sz="2400" strike="noStrike" u="none">
               <a:solidFill>
@@ -6589,8 +6613,8 @@
         </p:blipFill>
         <p:spPr>
           <a:xfrm>
-            <a:off x="685800" y="4100040"/>
-            <a:ext cx="2293200" cy="929160"/>
+            <a:off x="709200" y="2971800"/>
+            <a:ext cx="1576800" cy="1371240"/>
           </a:xfrm>
           <a:prstGeom prst="rect">
             <a:avLst/>
@@ -6615,7 +6639,7 @@
         <p:txBody>
           <a:bodyPr/>
           <a:p>
-            <a:fld id="{7F2E5B90-7CAB-4C4F-8C0E-D464824F0AED}" type="slidenum">
+            <a:fld id="{84A4548E-2A0F-4F36-A8EF-1497D2EE3ACC}" type="slidenum">
               <a:t>20</a:t>
             </a:fld>
           </a:p>
@@ -6635,7 +6659,7 @@
         <p:txBody>
           <a:bodyPr/>
           <a:p>
-            <a:fld id="{55A7DF88-70BF-47B8-B521-4444C793BF43}" type="datetime1">
+            <a:fld id="{C7AF8E10-3371-47C8-A672-E20D91267E78}" type="datetime1">
               <a:rPr lang="en-US"/>
               <a:t>04/28/2025</a:t>
             </a:fld>
@@ -6711,7 +6735,7 @@
                 <a:uFillTx/>
                 <a:latin typeface="Arial"/>
               </a:rPr>
-              <a:t>Nedostatci simulatora</a:t>
+              <a:t>Out in the wild...</a:t>
             </a:r>
             <a:endParaRPr b="0" lang="bs-BA" sz="3300" strike="noStrike" u="none">
               <a:solidFill>
@@ -6763,36 +6787,16 @@
               <a:buChar char=""/>
             </a:pPr>
             <a:r>
-              <a:rPr b="0" lang="bs-BA" sz="2400" strike="noStrike" u="none">
-                <a:solidFill>
-                  <a:srgbClr val="009bdd"/>
-                </a:solidFill>
-                <a:uFillTx/>
-                <a:latin typeface="Arial"/>
-              </a:rPr>
-              <a:t>Ne znam kako se zastavice na pravom PicoBlazeu ponašaju kad se promijeni regbanka. U svoj simulator PicoBlazea uprogramirao sam da svaka regbanka ima zasebne zastavice carry i zero (kao na Z80), ali moguće je da to nije tako. To bi se trebalo moći provjeriti pomoću programa “</a:t>
-            </a:r>
-            <a:r>
-              <a:rPr b="0" i="1" lang="bs-BA" sz="2400" strike="noStrike" u="none">
-                <a:solidFill>
-                  <a:srgbClr val="009bdd"/>
-                </a:solidFill>
-                <a:uFillTx/>
-                <a:latin typeface="Arial"/>
-              </a:rPr>
-              <a:t>Regbanks-Flags Test</a:t>
-            </a:r>
-            <a:r>
-              <a:rPr b="0" lang="bs-BA" sz="2400" strike="noStrike" u="none">
-                <a:solidFill>
-                  <a:srgbClr val="009bdd"/>
-                </a:solidFill>
-                <a:uFillTx/>
-                <a:latin typeface="Arial"/>
-              </a:rPr>
-              <a:t>”.</a:t>
-            </a:r>
-            <a:endParaRPr b="0" lang="bs-BA" sz="2400" strike="noStrike" u="none">
+              <a:rPr b="0" lang="bs-BA" sz="2200" strike="noStrike" u="none">
+                <a:solidFill>
+                  <a:srgbClr val="009bdd"/>
+                </a:solidFill>
+                <a:uFillTx/>
+                <a:latin typeface="Arial"/>
+              </a:rPr>
+              <a:t>Moj se program koristi na fakultetu u Argentini za uvod u ugrađene sustave.</a:t>
+            </a:r>
+            <a:endParaRPr b="0" lang="bs-BA" sz="2200" strike="noStrike" u="none">
               <a:solidFill>
                 <a:srgbClr val="009bdd"/>
               </a:solidFill>
@@ -6800,32 +6804,128 @@
               <a:latin typeface="Arial"/>
             </a:endParaRPr>
           </a:p>
-        </p:txBody>
-      </p:sp>
-      <p:pic>
-        <p:nvPicPr>
-          <p:cNvPr id="87" name="" descr=""/>
-          <p:cNvPicPr/>
-          <p:nvPr/>
-        </p:nvPicPr>
-        <p:blipFill>
-          <a:blip r:embed="rId1"/>
-          <a:stretch/>
-        </p:blipFill>
-        <p:spPr>
-          <a:xfrm>
-            <a:off x="709200" y="2971800"/>
-            <a:ext cx="1576800" cy="1371240"/>
-          </a:xfrm>
-          <a:prstGeom prst="rect">
-            <a:avLst/>
-          </a:prstGeom>
-          <a:noFill/>
-          <a:ln w="18000">
-            <a:noFill/>
-          </a:ln>
-        </p:spPr>
-      </p:pic>
+          <a:p>
+            <a:pPr marL="432000" indent="-324000">
+              <a:spcBef>
+                <a:spcPts val="1060"/>
+              </a:spcBef>
+              <a:buClr>
+                <a:srgbClr val="77caee"/>
+              </a:buClr>
+              <a:buSzPct val="45000"/>
+              <a:buFont typeface="Wingdings" charset="2"/>
+              <a:buChar char=""/>
+            </a:pPr>
+            <a:r>
+              <a:rPr b="0" lang="bs-BA" sz="2200" strike="noStrike" u="none">
+                <a:solidFill>
+                  <a:srgbClr val="009bdd"/>
+                </a:solidFill>
+                <a:uFillTx/>
+                <a:latin typeface="Arial"/>
+              </a:rPr>
+              <a:t>Nedavno sam dobio kontributora s tog fakulteta koji se zove Agustin Izaguirre (</a:t>
+            </a:r>
+            <a:r>
+              <a:rPr b="0" i="1" lang="bs-BA" sz="2200" strike="noStrike" u="none">
+                <a:solidFill>
+                  <a:srgbClr val="009bdd"/>
+                </a:solidFill>
+                <a:uFillTx/>
+                <a:latin typeface="Arial"/>
+              </a:rPr>
+              <a:t>agustiza</a:t>
+            </a:r>
+            <a:r>
+              <a:rPr b="0" lang="bs-BA" sz="2200" strike="noStrike" u="none">
+                <a:solidFill>
+                  <a:srgbClr val="009bdd"/>
+                </a:solidFill>
+                <a:uFillTx/>
+                <a:latin typeface="Arial"/>
+              </a:rPr>
+              <a:t>). On je napravio nekoliko pull requestova na GitHubu, isprva sitni bug-fixi (prvo da se naredba SRA ponaša ispravno kad je </a:t>
+            </a:r>
+            <a:r>
+              <a:rPr b="0" i="1" lang="bs-BA" sz="2200" strike="noStrike" u="none">
+                <a:solidFill>
+                  <a:srgbClr val="009bdd"/>
+                </a:solidFill>
+                <a:uFillTx/>
+                <a:latin typeface="Arial"/>
+              </a:rPr>
+              <a:t>carry flag</a:t>
+            </a:r>
+            <a:r>
+              <a:rPr b="0" lang="bs-BA" sz="2200" strike="noStrike" u="none">
+                <a:solidFill>
+                  <a:srgbClr val="009bdd"/>
+                </a:solidFill>
+                <a:uFillTx/>
+                <a:latin typeface="Arial"/>
+              </a:rPr>
+              <a:t> postavljen u jedinicu), a onda i dodavanje novih featuresa kao što su JEST testovi.</a:t>
+            </a:r>
+            <a:endParaRPr b="0" lang="bs-BA" sz="2200" strike="noStrike" u="none">
+              <a:solidFill>
+                <a:srgbClr val="009bdd"/>
+              </a:solidFill>
+              <a:uFillTx/>
+              <a:latin typeface="Arial"/>
+            </a:endParaRPr>
+          </a:p>
+          <a:p>
+            <a:pPr marL="432000" indent="-324000">
+              <a:spcBef>
+                <a:spcPts val="1060"/>
+              </a:spcBef>
+              <a:buClr>
+                <a:srgbClr val="77caee"/>
+              </a:buClr>
+              <a:buSzPct val="45000"/>
+              <a:buFont typeface="Wingdings" charset="2"/>
+              <a:buChar char=""/>
+            </a:pPr>
+            <a:r>
+              <a:rPr b="0" lang="bs-BA" sz="2200" strike="noStrike" u="none">
+                <a:solidFill>
+                  <a:srgbClr val="009bdd"/>
+                </a:solidFill>
+                <a:uFillTx/>
+                <a:latin typeface="Arial"/>
+              </a:rPr>
+              <a:t>JEST testira tokenizer, parser, asembler, jezgru simulatora i evaluator aritmetičkih izraza. Međutim, </a:t>
+            </a:r>
+            <a:r>
+              <a:rPr b="0" i="1" lang="bs-BA" sz="2200" strike="noStrike" u="none">
+                <a:solidFill>
+                  <a:srgbClr val="009bdd"/>
+                </a:solidFill>
+                <a:uFillTx/>
+                <a:latin typeface="Arial"/>
+              </a:rPr>
+              <a:t>test coverage</a:t>
+            </a:r>
+            <a:r>
+              <a:rPr b="0" lang="bs-BA" sz="2200" strike="noStrike" u="none">
+                <a:solidFill>
+                  <a:srgbClr val="009bdd"/>
+                </a:solidFill>
+                <a:uFillTx/>
+                <a:latin typeface="Arial"/>
+              </a:rPr>
+              <a:t> je još uvijek nizak i contributori se još uvijek moraju oslanjati na ručno testiranje.</a:t>
+            </a:r>
+            <a:endParaRPr b="0" lang="bs-BA" sz="2200" strike="noStrike" u="none">
+              <a:solidFill>
+                <a:srgbClr val="009bdd"/>
+              </a:solidFill>
+              <a:uFillTx/>
+              <a:latin typeface="Arial"/>
+            </a:endParaRPr>
+          </a:p>
+        </p:txBody>
+      </p:sp>
       <p:sp>
         <p:nvSpPr>
           <p:cNvPr id="4" name="PlaceHolder 3"/>
@@ -6840,7 +6940,7 @@
         <p:txBody>
           <a:bodyPr/>
           <a:p>
-            <a:fld id="{C7933AC1-C9CC-4767-AB23-462E6A2909A9}" type="slidenum">
+            <a:fld id="{C53D0839-A514-49CE-BA42-6B88CF63B5AC}" type="slidenum">
               <a:t>21</a:t>
             </a:fld>
           </a:p>
@@ -6860,7 +6960,7 @@
         <p:txBody>
           <a:bodyPr/>
           <a:p>
-            <a:fld id="{3A394B5D-49AF-48CC-986A-FAA85DCEE367}" type="datetime1">
+            <a:fld id="{F468BABA-2AC9-4297-8505-DD2E54E33699}" type="datetime1">
               <a:rPr lang="en-US"/>
               <a:t>04/28/2025</a:t>
             </a:fld>
@@ -6899,7 +6999,7 @@
       </p:grpSpPr>
       <p:sp>
         <p:nvSpPr>
-          <p:cNvPr id="88" name="PlaceHolder 1"/>
+          <p:cNvPr id="87" name="PlaceHolder 1"/>
           <p:cNvSpPr>
             <a:spLocks noGrp="1"/>
           </p:cNvSpPr>
@@ -6936,7 +7036,7 @@
                 <a:uFillTx/>
                 <a:latin typeface="Arial"/>
               </a:rPr>
-              <a:t>Out in the wild...</a:t>
+              <a:t>Kompatibilnost s browserima</a:t>
             </a:r>
             <a:endParaRPr b="0" lang="bs-BA" sz="3300" strike="noStrike" u="none">
               <a:solidFill>
@@ -6950,7 +7050,7 @@
       </p:sp>
       <p:sp>
         <p:nvSpPr>
-          <p:cNvPr id="89" name="PlaceHolder 2"/>
+          <p:cNvPr id="88" name="PlaceHolder 2"/>
           <p:cNvSpPr>
             <a:spLocks noGrp="1"/>
           </p:cNvSpPr>
@@ -6988,16 +7088,106 @@
               <a:buChar char=""/>
             </a:pPr>
             <a:r>
-              <a:rPr b="0" lang="bs-BA" sz="2200" strike="noStrike" u="none">
-                <a:solidFill>
-                  <a:srgbClr val="009bdd"/>
-                </a:solidFill>
-                <a:uFillTx/>
-                <a:latin typeface="Arial"/>
-              </a:rPr>
-              <a:t>Moj se program koristi na fakultetu u Argentini za uvod u ugrađene sustave.</a:t>
-            </a:r>
-            <a:endParaRPr b="0" lang="bs-BA" sz="2200" strike="noStrike" u="none">
+              <a:rPr b="0" lang="bs-BA" sz="1200" strike="noStrike" u="none">
+                <a:solidFill>
+                  <a:srgbClr val="009bdd"/>
+                </a:solidFill>
+                <a:uFillTx/>
+                <a:latin typeface="Arial"/>
+              </a:rPr>
+              <a:t>Ciljao sam na Firefox 52.9 ESR.</a:t>
+            </a:r>
+            <a:endParaRPr b="0" lang="bs-BA" sz="1200" strike="noStrike" u="none">
+              <a:solidFill>
+                <a:srgbClr val="009bdd"/>
+              </a:solidFill>
+              <a:uFillTx/>
+              <a:latin typeface="Arial"/>
+            </a:endParaRPr>
+          </a:p>
+          <a:p>
+            <a:pPr lvl="1" marL="864000" indent="-324000">
+              <a:spcBef>
+                <a:spcPts val="850"/>
+              </a:spcBef>
+              <a:buClr>
+                <a:srgbClr val="77caee"/>
+              </a:buClr>
+              <a:buSzPct val="45000"/>
+              <a:buFont typeface="Wingdings" charset="2"/>
+              <a:buChar char=""/>
+            </a:pPr>
+            <a:r>
+              <a:rPr b="0" lang="bs-BA" sz="1200" strike="noStrike" u="none">
+                <a:solidFill>
+                  <a:srgbClr val="009bdd"/>
+                </a:solidFill>
+                <a:uFillTx/>
+                <a:latin typeface="Arial"/>
+              </a:rPr>
+              <a:t>To je posljednja verzija Firefoxa koja se može vrtjeti na Windows XP-u i Windows Visti, te također verzija Firefoxa koja se dobije uz Solaris 11.4.</a:t>
+            </a:r>
+            <a:endParaRPr b="0" lang="bs-BA" sz="1200" strike="noStrike" u="none">
+              <a:solidFill>
+                <a:srgbClr val="009bdd"/>
+              </a:solidFill>
+              <a:uFillTx/>
+              <a:latin typeface="Arial"/>
+            </a:endParaRPr>
+          </a:p>
+          <a:p>
+            <a:pPr lvl="1" marL="864000" indent="-324000">
+              <a:spcBef>
+                <a:spcPts val="850"/>
+              </a:spcBef>
+              <a:buClr>
+                <a:srgbClr val="77caee"/>
+              </a:buClr>
+              <a:buSzPct val="45000"/>
+              <a:buFont typeface="Wingdings" charset="2"/>
+              <a:buChar char=""/>
+            </a:pPr>
+            <a:r>
+              <a:rPr b="0" lang="bs-BA" sz="1200" strike="noStrike" u="none">
+                <a:solidFill>
+                  <a:srgbClr val="009bdd"/>
+                </a:solidFill>
+                <a:uFillTx/>
+                <a:latin typeface="Arial"/>
+              </a:rPr>
+              <a:t>Međutim, u Firefoxu 52.9 ESR pokrenutom na Windows XP (ali ne i ako se pokrene na Solarisu ili Windows 11), kao i u Epiphanyju na FreeBSD-u, linije koda i kod nisu alignirani (što onemogućava da se koriste breakpointsi).</a:t>
+            </a:r>
+            <a:endParaRPr b="0" lang="bs-BA" sz="1200" strike="noStrike" u="none">
+              <a:solidFill>
+                <a:srgbClr val="009bdd"/>
+              </a:solidFill>
+              <a:uFillTx/>
+              <a:latin typeface="Arial"/>
+            </a:endParaRPr>
+          </a:p>
+          <a:p>
+            <a:pPr lvl="1" marL="864000" indent="-324000">
+              <a:spcBef>
+                <a:spcPts val="850"/>
+              </a:spcBef>
+              <a:buClr>
+                <a:srgbClr val="77caee"/>
+              </a:buClr>
+              <a:buSzPct val="45000"/>
+              <a:buFont typeface="Wingdings" charset="2"/>
+              <a:buChar char=""/>
+            </a:pPr>
+            <a:r>
+              <a:rPr b="0" lang="bs-BA" sz="1200" strike="noStrike" u="none">
+                <a:solidFill>
+                  <a:srgbClr val="009bdd"/>
+                </a:solidFill>
+                <a:uFillTx/>
+                <a:latin typeface="Arial"/>
+              </a:rPr>
+              <a:t>Iz nekog meni nedokučivog razloga, JavaScript se vrti približno dvostruko brže u Firefoxu 52 nego u Firefoxu 120.</a:t>
+            </a:r>
+            <a:endParaRPr b="0" lang="bs-BA" sz="1200" strike="noStrike" u="none">
               <a:solidFill>
                 <a:srgbClr val="009bdd"/>
               </a:solidFill>
@@ -7018,56 +7208,46 @@
               <a:buChar char=""/>
             </a:pPr>
             <a:r>
-              <a:rPr b="0" lang="bs-BA" sz="2200" strike="noStrike" u="none">
-                <a:solidFill>
-                  <a:srgbClr val="009bdd"/>
-                </a:solidFill>
-                <a:uFillTx/>
-                <a:latin typeface="Arial"/>
-              </a:rPr>
-              <a:t>Nedavno sam dobio kontributora s tog fakulteta koji se zove Agustin Izaguirre (</a:t>
-            </a:r>
-            <a:r>
-              <a:rPr b="0" i="1" lang="bs-BA" sz="2200" strike="noStrike" u="none">
-                <a:solidFill>
-                  <a:srgbClr val="009bdd"/>
-                </a:solidFill>
-                <a:uFillTx/>
-                <a:latin typeface="Arial"/>
-              </a:rPr>
-              <a:t>agustiza</a:t>
-            </a:r>
-            <a:r>
-              <a:rPr b="0" lang="bs-BA" sz="2200" strike="noStrike" u="none">
-                <a:solidFill>
-                  <a:srgbClr val="009bdd"/>
-                </a:solidFill>
-                <a:uFillTx/>
-                <a:latin typeface="Arial"/>
-              </a:rPr>
-              <a:t>). On je napravio nekoliko pull requestova na GitHubu, isprva sitni bug-fixi (prvo da se naredba SRA ponaša ispravno kad je </a:t>
-            </a:r>
-            <a:r>
-              <a:rPr b="0" i="1" lang="bs-BA" sz="2200" strike="noStrike" u="none">
-                <a:solidFill>
-                  <a:srgbClr val="009bdd"/>
-                </a:solidFill>
-                <a:uFillTx/>
-                <a:latin typeface="Arial"/>
-              </a:rPr>
-              <a:t>carry flag</a:t>
-            </a:r>
-            <a:r>
-              <a:rPr b="0" lang="bs-BA" sz="2200" strike="noStrike" u="none">
-                <a:solidFill>
-                  <a:srgbClr val="009bdd"/>
-                </a:solidFill>
-                <a:uFillTx/>
-                <a:latin typeface="Arial"/>
-              </a:rPr>
-              <a:t> postavljen u jedinicu), a onda i dodavanje novih featuresa kao što su JEST testovi.</a:t>
-            </a:r>
-            <a:endParaRPr b="0" lang="bs-BA" sz="2200" strike="noStrike" u="none">
+              <a:rPr b="0" lang="bs-BA" sz="1200" strike="noStrike" u="none">
+                <a:solidFill>
+                  <a:srgbClr val="009bdd"/>
+                </a:solidFill>
+                <a:uFillTx/>
+                <a:latin typeface="Arial"/>
+              </a:rPr>
+              <a:t>Moderni Chrome</a:t>
+            </a:r>
+            <a:endParaRPr b="0" lang="bs-BA" sz="1200" strike="noStrike" u="none">
+              <a:solidFill>
+                <a:srgbClr val="009bdd"/>
+              </a:solidFill>
+              <a:uFillTx/>
+              <a:latin typeface="Arial"/>
+            </a:endParaRPr>
+          </a:p>
+          <a:p>
+            <a:pPr lvl="1" marL="864000" indent="-324000">
+              <a:spcBef>
+                <a:spcPts val="850"/>
+              </a:spcBef>
+              <a:buClr>
+                <a:srgbClr val="77caee"/>
+              </a:buClr>
+              <a:buSzPct val="45000"/>
+              <a:buFont typeface="Wingdings" charset="2"/>
+              <a:buChar char=""/>
+            </a:pPr>
+            <a:r>
+              <a:rPr b="0" lang="bs-BA" sz="1200" strike="noStrike" u="none">
+                <a:solidFill>
+                  <a:srgbClr val="009bdd"/>
+                </a:solidFill>
+                <a:uFillTx/>
+                <a:latin typeface="Arial"/>
+              </a:rPr>
+              <a:t>Za to da radi u Chromeu, morao sam izmijeniti CSS (jer tooltipsi na “Play/Pause”, “Fast Forward”, “Single Step” i “Stop” nisu bili radili).</a:t>
+            </a:r>
+            <a:endParaRPr b="0" lang="bs-BA" sz="1200" strike="noStrike" u="none">
               <a:solidFill>
                 <a:srgbClr val="009bdd"/>
               </a:solidFill>
@@ -7088,36 +7268,16 @@
               <a:buChar char=""/>
             </a:pPr>
             <a:r>
-              <a:rPr b="0" lang="bs-BA" sz="2200" strike="noStrike" u="none">
-                <a:solidFill>
-                  <a:srgbClr val="009bdd"/>
-                </a:solidFill>
-                <a:uFillTx/>
-                <a:latin typeface="Arial"/>
-              </a:rPr>
-              <a:t>JEST testira tokenizer, parser, asembler, jezgru simulatora i evaluator aritmetičkih izraza. Međutim, </a:t>
-            </a:r>
-            <a:r>
-              <a:rPr b="0" i="1" lang="bs-BA" sz="2200" strike="noStrike" u="none">
-                <a:solidFill>
-                  <a:srgbClr val="009bdd"/>
-                </a:solidFill>
-                <a:uFillTx/>
-                <a:latin typeface="Arial"/>
-              </a:rPr>
-              <a:t>test coverage</a:t>
-            </a:r>
-            <a:r>
-              <a:rPr b="0" lang="bs-BA" sz="2200" strike="noStrike" u="none">
-                <a:solidFill>
-                  <a:srgbClr val="009bdd"/>
-                </a:solidFill>
-                <a:uFillTx/>
-                <a:latin typeface="Arial"/>
-              </a:rPr>
-              <a:t> je još uvijek nizak i contributori se još uvijek moraju oslanjati na ručno testiranje.</a:t>
-            </a:r>
-            <a:endParaRPr b="0" lang="bs-BA" sz="2200" strike="noStrike" u="none">
+              <a:rPr b="0" lang="bs-BA" sz="1200" strike="noStrike" u="none">
+                <a:solidFill>
+                  <a:srgbClr val="009bdd"/>
+                </a:solidFill>
+                <a:uFillTx/>
+                <a:latin typeface="Arial"/>
+              </a:rPr>
+              <a:t>WebPositive (bliski srodnik Safariju)</a:t>
+            </a:r>
+            <a:endParaRPr b="0" lang="bs-BA" sz="1200" strike="noStrike" u="none">
               <a:solidFill>
                 <a:srgbClr val="009bdd"/>
               </a:solidFill>
@@ -7125,6 +7285,116 @@
               <a:latin typeface="Arial"/>
             </a:endParaRPr>
           </a:p>
+          <a:p>
+            <a:pPr lvl="1" marL="864000" indent="-324000">
+              <a:spcBef>
+                <a:spcPts val="850"/>
+              </a:spcBef>
+              <a:buClr>
+                <a:srgbClr val="77caee"/>
+              </a:buClr>
+              <a:buSzPct val="45000"/>
+              <a:buFont typeface="Wingdings" charset="2"/>
+              <a:buChar char=""/>
+            </a:pPr>
+            <a:r>
+              <a:rPr b="0" lang="bs-BA" sz="1200" strike="noStrike" u="none">
+                <a:solidFill>
+                  <a:srgbClr val="009bdd"/>
+                </a:solidFill>
+                <a:uFillTx/>
+                <a:latin typeface="Arial"/>
+              </a:rPr>
+              <a:t>Za to da radi u WebPositiveu, morao sam izmijeniti i CSS i JavaScript.</a:t>
+            </a:r>
+            <a:endParaRPr b="0" lang="bs-BA" sz="1200" strike="noStrike" u="none">
+              <a:solidFill>
+                <a:srgbClr val="009bdd"/>
+              </a:solidFill>
+              <a:uFillTx/>
+              <a:latin typeface="Arial"/>
+            </a:endParaRPr>
+          </a:p>
+          <a:p>
+            <a:pPr lvl="1" marL="864000" indent="-324000">
+              <a:spcBef>
+                <a:spcPts val="850"/>
+              </a:spcBef>
+              <a:buClr>
+                <a:srgbClr val="77caee"/>
+              </a:buClr>
+              <a:buSzPct val="45000"/>
+              <a:buFont typeface="Wingdings" charset="2"/>
+              <a:buChar char=""/>
+            </a:pPr>
+            <a:r>
+              <a:rPr b="0" lang="bs-BA" sz="1200" strike="noStrike" u="none">
+                <a:solidFill>
+                  <a:srgbClr val="009bdd"/>
+                </a:solidFill>
+                <a:uFillTx/>
+                <a:latin typeface="Arial"/>
+              </a:rPr>
+              <a:t>Nisam uspio napraviti da “Download Hexadecimal” radi u WebPositiveu.</a:t>
+            </a:r>
+            <a:endParaRPr b="0" lang="bs-BA" sz="1200" strike="noStrike" u="none">
+              <a:solidFill>
+                <a:srgbClr val="009bdd"/>
+              </a:solidFill>
+              <a:uFillTx/>
+              <a:latin typeface="Arial"/>
+            </a:endParaRPr>
+          </a:p>
+          <a:p>
+            <a:pPr marL="432000" indent="-324000">
+              <a:spcBef>
+                <a:spcPts val="1060"/>
+              </a:spcBef>
+              <a:buClr>
+                <a:srgbClr val="77caee"/>
+              </a:buClr>
+              <a:buSzPct val="45000"/>
+              <a:buFont typeface="Wingdings" charset="2"/>
+              <a:buChar char=""/>
+            </a:pPr>
+            <a:r>
+              <a:rPr b="0" lang="bs-BA" sz="1200" strike="noStrike" u="none">
+                <a:solidFill>
+                  <a:srgbClr val="009bdd"/>
+                </a:solidFill>
+                <a:uFillTx/>
+                <a:latin typeface="Arial"/>
+              </a:rPr>
+              <a:t>Darko Nikolić tvrdi da je isprobao moj program na Macu u Safariju i u Operi i da funkcionira tamo. Discordaš </a:t>
+            </a:r>
+            <a:r>
+              <a:rPr b="0" i="1" lang="bs-BA" sz="1200" strike="noStrike" u="none">
+                <a:solidFill>
+                  <a:srgbClr val="009bdd"/>
+                </a:solidFill>
+                <a:uFillTx/>
+                <a:latin typeface="Arial"/>
+              </a:rPr>
+              <a:t>emm312</a:t>
+            </a:r>
+            <a:r>
+              <a:rPr b="0" lang="bs-BA" sz="1200" strike="noStrike" u="none">
+                <a:solidFill>
+                  <a:srgbClr val="009bdd"/>
+                </a:solidFill>
+                <a:uFillTx/>
+                <a:latin typeface="Arial"/>
+              </a:rPr>
+              <a:t> isto tvrdi da ga je isprobao u Safariju i da funkcionira tamo.</a:t>
+            </a:r>
+            <a:endParaRPr b="0" lang="bs-BA" sz="1200" strike="noStrike" u="none">
+              <a:solidFill>
+                <a:srgbClr val="009bdd"/>
+              </a:solidFill>
+              <a:uFillTx/>
+              <a:latin typeface="Arial"/>
+            </a:endParaRPr>
+          </a:p>
         </p:txBody>
       </p:sp>
       <p:sp>
@@ -7141,7 +7411,7 @@
         <p:txBody>
           <a:bodyPr/>
           <a:p>
-            <a:fld id="{1CE01AC6-29F3-4F28-AA66-73E22FE1EA6D}" type="slidenum">
+            <a:fld id="{7F2C7547-907C-4136-BF78-D685A32EE4A8}" type="slidenum">
               <a:t>22</a:t>
             </a:fld>
           </a:p>
@@ -7161,7 +7431,7 @@
         <p:txBody>
           <a:bodyPr/>
           <a:p>
-            <a:fld id="{06EA4473-CE90-4C69-8067-141F8B196647}" type="datetime1">
+            <a:fld id="{A7C567DC-6AB3-44CC-9D03-E539BB717D72}" type="datetime1">
               <a:rPr lang="en-US"/>
               <a:t>04/28/2025</a:t>
             </a:fld>
@@ -7200,7 +7470,7 @@
       </p:grpSpPr>
       <p:sp>
         <p:nvSpPr>
-          <p:cNvPr id="90" name="PlaceHolder 1"/>
+          <p:cNvPr id="89" name="PlaceHolder 1"/>
           <p:cNvSpPr>
             <a:spLocks noGrp="1"/>
           </p:cNvSpPr>
@@ -7237,7 +7507,7 @@
                 <a:uFillTx/>
                 <a:latin typeface="Arial"/>
               </a:rPr>
-              <a:t>Kompatibilnost s browserima</a:t>
+              <a:t>Back-end</a:t>
             </a:r>
             <a:endParaRPr b="0" lang="bs-BA" sz="3300" strike="noStrike" u="none">
               <a:solidFill>
@@ -7251,7 +7521,7 @@
       </p:sp>
       <p:sp>
         <p:nvSpPr>
-          <p:cNvPr id="91" name="PlaceHolder 2"/>
+          <p:cNvPr id="90" name="PlaceHolder 2"/>
           <p:cNvSpPr>
             <a:spLocks noGrp="1"/>
           </p:cNvSpPr>
@@ -7289,16 +7559,56 @@
               <a:buChar char=""/>
             </a:pPr>
             <a:r>
-              <a:rPr b="0" lang="bs-BA" sz="1200" strike="noStrike" u="none">
-                <a:solidFill>
-                  <a:srgbClr val="009bdd"/>
-                </a:solidFill>
-                <a:uFillTx/>
-                <a:latin typeface="Arial"/>
-              </a:rPr>
-              <a:t>Ciljao sam na Firefox 52.9 ESR.</a:t>
-            </a:r>
-            <a:endParaRPr b="0" lang="bs-BA" sz="1200" strike="noStrike" u="none">
+              <a:rPr b="0" lang="bs-BA" sz="2100" strike="noStrike" u="none">
+                <a:solidFill>
+                  <a:srgbClr val="009bdd"/>
+                </a:solidFill>
+                <a:uFillTx/>
+                <a:latin typeface="Arial"/>
+              </a:rPr>
+              <a:t>Abidin Durdu (tada zvan </a:t>
+            </a:r>
+            <a:r>
+              <a:rPr b="0" i="1" lang="bs-BA" sz="2100" strike="noStrike" u="none">
+                <a:solidFill>
+                  <a:srgbClr val="009bdd"/>
+                </a:solidFill>
+                <a:uFillTx/>
+                <a:latin typeface="Arial"/>
+              </a:rPr>
+              <a:t>betelgeuse-7</a:t>
+            </a:r>
+            <a:r>
+              <a:rPr b="0" lang="bs-BA" sz="2100" strike="noStrike" u="none">
+                <a:solidFill>
+                  <a:srgbClr val="009bdd"/>
+                </a:solidFill>
+                <a:uFillTx/>
+                <a:latin typeface="Arial"/>
+              </a:rPr>
+              <a:t>, a sada zvan </a:t>
+            </a:r>
+            <a:r>
+              <a:rPr b="0" i="1" lang="bs-BA" sz="2100" strike="noStrike" u="none">
+                <a:solidFill>
+                  <a:srgbClr val="009bdd"/>
+                </a:solidFill>
+                <a:uFillTx/>
+                <a:latin typeface="Arial"/>
+              </a:rPr>
+              <a:t>abdrd</a:t>
+            </a:r>
+            <a:r>
+              <a:rPr b="0" lang="bs-BA" sz="2100" strike="noStrike" u="none">
+                <a:solidFill>
+                  <a:srgbClr val="009bdd"/>
+                </a:solidFill>
+                <a:uFillTx/>
+                <a:latin typeface="Arial"/>
+              </a:rPr>
+              <a:t>) napravio je back-end u PHP-u, koji omogućuje korisnicima da dijele asemblerske programe. Taj back-end koristi MySQL bazu podataka. Vrti se na SourceForge serverima.</a:t>
+            </a:r>
+            <a:endParaRPr b="0" lang="bs-BA" sz="2100" strike="noStrike" u="none">
               <a:solidFill>
                 <a:srgbClr val="009bdd"/>
               </a:solidFill>
@@ -7306,298 +7616,99 @@
               <a:latin typeface="Arial"/>
             </a:endParaRPr>
           </a:p>
-          <a:p>
-            <a:pPr lvl="1" marL="864000" indent="-324000">
-              <a:spcBef>
-                <a:spcPts val="850"/>
-              </a:spcBef>
-              <a:buClr>
-                <a:srgbClr val="77caee"/>
-              </a:buClr>
-              <a:buSzPct val="45000"/>
-              <a:buFont typeface="Wingdings" charset="2"/>
-              <a:buChar char=""/>
-            </a:pPr>
-            <a:r>
-              <a:rPr b="0" lang="bs-BA" sz="1200" strike="noStrike" u="none">
-                <a:solidFill>
-                  <a:srgbClr val="009bdd"/>
-                </a:solidFill>
-                <a:uFillTx/>
-                <a:latin typeface="Arial"/>
-              </a:rPr>
-              <a:t>To je posljednja verzija Firefoxa koja se može vrtjeti na Windows XP-u i Windows Visti, te također verzija Firefoxa koja se dobije uz Solaris 11.4.</a:t>
-            </a:r>
-            <a:endParaRPr b="0" lang="bs-BA" sz="1200" strike="noStrike" u="none">
-              <a:solidFill>
-                <a:srgbClr val="009bdd"/>
-              </a:solidFill>
-              <a:uFillTx/>
-              <a:latin typeface="Arial"/>
-            </a:endParaRPr>
-          </a:p>
-          <a:p>
-            <a:pPr lvl="1" marL="864000" indent="-324000">
-              <a:spcBef>
-                <a:spcPts val="850"/>
-              </a:spcBef>
-              <a:buClr>
-                <a:srgbClr val="77caee"/>
-              </a:buClr>
-              <a:buSzPct val="45000"/>
-              <a:buFont typeface="Wingdings" charset="2"/>
-              <a:buChar char=""/>
-            </a:pPr>
-            <a:r>
-              <a:rPr b="0" lang="bs-BA" sz="1200" strike="noStrike" u="none">
-                <a:solidFill>
-                  <a:srgbClr val="009bdd"/>
-                </a:solidFill>
-                <a:uFillTx/>
-                <a:latin typeface="Arial"/>
-              </a:rPr>
-              <a:t>Međutim, u Firefoxu 52.9 ESR pokrenutom na Windows XP (ali ne i ako se pokrene na Solarisu ili Windows 11), kao i u Epiphanyju na FreeBSD-u, linije koda i kod nisu alignirani (što onemogućava da se koriste breakpointsi).</a:t>
-            </a:r>
-            <a:endParaRPr b="0" lang="bs-BA" sz="1200" strike="noStrike" u="none">
-              <a:solidFill>
-                <a:srgbClr val="009bdd"/>
-              </a:solidFill>
-              <a:uFillTx/>
-              <a:latin typeface="Arial"/>
-            </a:endParaRPr>
-          </a:p>
-          <a:p>
-            <a:pPr lvl="1" marL="864000" indent="-324000">
-              <a:spcBef>
-                <a:spcPts val="850"/>
-              </a:spcBef>
-              <a:buClr>
-                <a:srgbClr val="77caee"/>
-              </a:buClr>
-              <a:buSzPct val="45000"/>
-              <a:buFont typeface="Wingdings" charset="2"/>
-              <a:buChar char=""/>
-            </a:pPr>
-            <a:r>
-              <a:rPr b="0" lang="bs-BA" sz="1200" strike="noStrike" u="none">
-                <a:solidFill>
-                  <a:srgbClr val="009bdd"/>
-                </a:solidFill>
-                <a:uFillTx/>
-                <a:latin typeface="Arial"/>
-              </a:rPr>
-              <a:t>Iz nekog meni nedokučivog razloga, JavaScript se vrti približno dvostruko brže u Firefoxu 52 nego u Firefoxu 120.</a:t>
-            </a:r>
-            <a:endParaRPr b="0" lang="bs-BA" sz="1200" strike="noStrike" u="none">
-              <a:solidFill>
-                <a:srgbClr val="009bdd"/>
-              </a:solidFill>
-              <a:uFillTx/>
-              <a:latin typeface="Arial"/>
-            </a:endParaRPr>
-          </a:p>
-          <a:p>
-            <a:pPr marL="432000" indent="-324000">
-              <a:spcBef>
-                <a:spcPts val="1060"/>
-              </a:spcBef>
-              <a:buClr>
-                <a:srgbClr val="77caee"/>
-              </a:buClr>
-              <a:buSzPct val="45000"/>
-              <a:buFont typeface="Wingdings" charset="2"/>
-              <a:buChar char=""/>
-            </a:pPr>
-            <a:r>
-              <a:rPr b="0" lang="bs-BA" sz="1200" strike="noStrike" u="none">
-                <a:solidFill>
-                  <a:srgbClr val="009bdd"/>
-                </a:solidFill>
-                <a:uFillTx/>
-                <a:latin typeface="Arial"/>
-              </a:rPr>
-              <a:t>Moderni Chrome</a:t>
-            </a:r>
-            <a:endParaRPr b="0" lang="bs-BA" sz="1200" strike="noStrike" u="none">
-              <a:solidFill>
-                <a:srgbClr val="009bdd"/>
-              </a:solidFill>
-              <a:uFillTx/>
-              <a:latin typeface="Arial"/>
-            </a:endParaRPr>
-          </a:p>
-          <a:p>
-            <a:pPr lvl="1" marL="864000" indent="-324000">
-              <a:spcBef>
-                <a:spcPts val="850"/>
-              </a:spcBef>
-              <a:buClr>
-                <a:srgbClr val="77caee"/>
-              </a:buClr>
-              <a:buSzPct val="45000"/>
-              <a:buFont typeface="Wingdings" charset="2"/>
-              <a:buChar char=""/>
-            </a:pPr>
-            <a:r>
-              <a:rPr b="0" lang="bs-BA" sz="1200" strike="noStrike" u="none">
-                <a:solidFill>
-                  <a:srgbClr val="009bdd"/>
-                </a:solidFill>
-                <a:uFillTx/>
-                <a:latin typeface="Arial"/>
-              </a:rPr>
-              <a:t>Za to da radi u Chromeu, morao sam izmijeniti CSS (jer tooltipsi na “Play/Pause”, “Fast Forward”, “Single Step” i “Stop” nisu bili radili).</a:t>
-            </a:r>
-            <a:endParaRPr b="0" lang="bs-BA" sz="1200" strike="noStrike" u="none">
-              <a:solidFill>
-                <a:srgbClr val="009bdd"/>
-              </a:solidFill>
-              <a:uFillTx/>
-              <a:latin typeface="Arial"/>
-            </a:endParaRPr>
-          </a:p>
-          <a:p>
-            <a:pPr marL="432000" indent="-324000">
-              <a:spcBef>
-                <a:spcPts val="1060"/>
-              </a:spcBef>
-              <a:buClr>
-                <a:srgbClr val="77caee"/>
-              </a:buClr>
-              <a:buSzPct val="45000"/>
-              <a:buFont typeface="Wingdings" charset="2"/>
-              <a:buChar char=""/>
-            </a:pPr>
-            <a:r>
-              <a:rPr b="0" lang="bs-BA" sz="1200" strike="noStrike" u="none">
-                <a:solidFill>
-                  <a:srgbClr val="009bdd"/>
-                </a:solidFill>
-                <a:uFillTx/>
-                <a:latin typeface="Arial"/>
-              </a:rPr>
-              <a:t>WebPositive (bliski srodnik Safariju)</a:t>
-            </a:r>
-            <a:endParaRPr b="0" lang="bs-BA" sz="1200" strike="noStrike" u="none">
-              <a:solidFill>
-                <a:srgbClr val="009bdd"/>
-              </a:solidFill>
-              <a:uFillTx/>
-              <a:latin typeface="Arial"/>
-            </a:endParaRPr>
-          </a:p>
-          <a:p>
-            <a:pPr lvl="1" marL="864000" indent="-324000">
-              <a:spcBef>
-                <a:spcPts val="850"/>
-              </a:spcBef>
-              <a:buClr>
-                <a:srgbClr val="77caee"/>
-              </a:buClr>
-              <a:buSzPct val="45000"/>
-              <a:buFont typeface="Wingdings" charset="2"/>
-              <a:buChar char=""/>
-            </a:pPr>
-            <a:r>
-              <a:rPr b="0" lang="bs-BA" sz="1200" strike="noStrike" u="none">
-                <a:solidFill>
-                  <a:srgbClr val="009bdd"/>
-                </a:solidFill>
-                <a:uFillTx/>
-                <a:latin typeface="Arial"/>
-              </a:rPr>
-              <a:t>Za to da radi u WebPositiveu, morao sam izmijeniti i CSS i JavaScript.</a:t>
-            </a:r>
-            <a:endParaRPr b="0" lang="bs-BA" sz="1200" strike="noStrike" u="none">
-              <a:solidFill>
-                <a:srgbClr val="009bdd"/>
-              </a:solidFill>
-              <a:uFillTx/>
-              <a:latin typeface="Arial"/>
-            </a:endParaRPr>
-          </a:p>
-          <a:p>
-            <a:pPr lvl="1" marL="864000" indent="-324000">
-              <a:spcBef>
-                <a:spcPts val="850"/>
-              </a:spcBef>
-              <a:buClr>
-                <a:srgbClr val="77caee"/>
-              </a:buClr>
-              <a:buSzPct val="45000"/>
-              <a:buFont typeface="Wingdings" charset="2"/>
-              <a:buChar char=""/>
-            </a:pPr>
-            <a:r>
-              <a:rPr b="0" lang="bs-BA" sz="1200" strike="noStrike" u="none">
-                <a:solidFill>
-                  <a:srgbClr val="009bdd"/>
-                </a:solidFill>
-                <a:uFillTx/>
-                <a:latin typeface="Arial"/>
-              </a:rPr>
-              <a:t>Nisam uspio napraviti da “Download Hexadecimal” radi u WebPositiveu.</a:t>
-            </a:r>
-            <a:endParaRPr b="0" lang="bs-BA" sz="1200" strike="noStrike" u="none">
-              <a:solidFill>
-                <a:srgbClr val="009bdd"/>
-              </a:solidFill>
-              <a:uFillTx/>
-              <a:latin typeface="Arial"/>
-            </a:endParaRPr>
-          </a:p>
-          <a:p>
-            <a:pPr marL="432000" indent="-324000">
-              <a:spcBef>
-                <a:spcPts val="1060"/>
-              </a:spcBef>
-              <a:buClr>
-                <a:srgbClr val="77caee"/>
-              </a:buClr>
-              <a:buSzPct val="45000"/>
-              <a:buFont typeface="Wingdings" charset="2"/>
-              <a:buChar char=""/>
-            </a:pPr>
-            <a:r>
-              <a:rPr b="0" lang="bs-BA" sz="1200" strike="noStrike" u="none">
-                <a:solidFill>
-                  <a:srgbClr val="009bdd"/>
-                </a:solidFill>
-                <a:uFillTx/>
-                <a:latin typeface="Arial"/>
-              </a:rPr>
-              <a:t>Darko Nikolić tvrdi da je isprobao moj program na Macu u Safariju i u Operi i da funkcionira tamo. Discordaš </a:t>
-            </a:r>
-            <a:r>
-              <a:rPr b="0" i="1" lang="bs-BA" sz="1200" strike="noStrike" u="none">
-                <a:solidFill>
-                  <a:srgbClr val="009bdd"/>
-                </a:solidFill>
-                <a:uFillTx/>
-                <a:latin typeface="Arial"/>
-              </a:rPr>
-              <a:t>emm312</a:t>
-            </a:r>
-            <a:r>
-              <a:rPr b="0" lang="bs-BA" sz="1200" strike="noStrike" u="none">
-                <a:solidFill>
-                  <a:srgbClr val="009bdd"/>
-                </a:solidFill>
-                <a:uFillTx/>
-                <a:latin typeface="Arial"/>
-              </a:rPr>
-              <a:t> isto tvrdi da ga je isprobao u Safariju i da funkcionira tamo.</a:t>
-            </a:r>
-            <a:endParaRPr b="0" lang="bs-BA" sz="1200" strike="noStrike" u="none">
-              <a:solidFill>
-                <a:srgbClr val="009bdd"/>
-              </a:solidFill>
-              <a:uFillTx/>
-              <a:latin typeface="Arial"/>
-            </a:endParaRPr>
-          </a:p>
-        </p:txBody>
-      </p:sp>
+        </p:txBody>
+      </p:sp>
+      <p:pic>
+        <p:nvPicPr>
+          <p:cNvPr id="91" name="" descr=""/>
+          <p:cNvPicPr/>
+          <p:nvPr/>
+        </p:nvPicPr>
+        <p:blipFill>
+          <a:blip r:embed="rId1"/>
+          <a:stretch/>
+        </p:blipFill>
+        <p:spPr>
+          <a:xfrm>
+            <a:off x="2507040" y="2289960"/>
+            <a:ext cx="5090040" cy="1104480"/>
+          </a:xfrm>
+          <a:prstGeom prst="rect">
+            <a:avLst/>
+          </a:prstGeom>
+          <a:noFill/>
+          <a:ln w="18000">
+            <a:noFill/>
+          </a:ln>
+        </p:spPr>
+      </p:pic>
+      <p:sp>
+        <p:nvSpPr>
+          <p:cNvPr id="92" name=""/>
+          <p:cNvSpPr/>
+          <p:nvPr/>
+        </p:nvSpPr>
+        <p:spPr>
+          <a:xfrm>
+            <a:off x="4898160" y="2468880"/>
+            <a:ext cx="359640" cy="359640"/>
+          </a:xfrm>
+          <a:prstGeom prst="ellipse">
+            <a:avLst/>
+          </a:prstGeom>
+          <a:noFill/>
+          <a:ln w="18000">
+            <a:solidFill>
+              <a:srgbClr val="009bdd"/>
+            </a:solidFill>
+            <a:round/>
+          </a:ln>
+        </p:spPr>
+        <p:style>
+          <a:lnRef idx="0"/>
+          <a:fillRef idx="0"/>
+          <a:effectRef idx="0"/>
+          <a:fontRef idx="minor"/>
+        </p:style>
+        <p:txBody>
+          <a:bodyPr wrap="none" lIns="90000" rIns="90000" tIns="45000" bIns="45000" anchor="ctr">
+            <a:noAutofit/>
+          </a:bodyPr>
+          <a:p>
+            <a:endParaRPr b="0" lang="bs-BA" sz="1800" strike="noStrike" u="none">
+              <a:solidFill>
+                <a:srgbClr val="000000"/>
+              </a:solidFill>
+              <a:uFillTx/>
+              <a:latin typeface="Arial"/>
+            </a:endParaRPr>
+          </a:p>
+        </p:txBody>
+      </p:sp>
+      <p:pic>
+        <p:nvPicPr>
+          <p:cNvPr id="93" name="" descr=""/>
+          <p:cNvPicPr/>
+          <p:nvPr/>
+        </p:nvPicPr>
+        <p:blipFill>
+          <a:blip r:embed="rId2"/>
+          <a:stretch/>
+        </p:blipFill>
+        <p:spPr>
+          <a:xfrm>
+            <a:off x="1356120" y="3527640"/>
+            <a:ext cx="7330680" cy="1371240"/>
+          </a:xfrm>
+          <a:prstGeom prst="rect">
+            <a:avLst/>
+          </a:prstGeom>
+          <a:noFill/>
+          <a:ln w="18000">
+            <a:noFill/>
+          </a:ln>
+        </p:spPr>
+      </p:pic>
       <p:sp>
         <p:nvSpPr>
           <p:cNvPr id="4" name="PlaceHolder 3"/>
@@ -7612,7 +7723,7 @@
         <p:txBody>
           <a:bodyPr/>
           <a:p>
-            <a:fld id="{2DEC8639-4B97-4F85-90F3-734030DBEFD4}" type="slidenum">
+            <a:fld id="{89FE7A1F-4968-4942-90B6-920E6DEC9D0A}" type="slidenum">
               <a:t>23</a:t>
             </a:fld>
           </a:p>
@@ -7632,7 +7743,7 @@
         <p:txBody>
           <a:bodyPr/>
           <a:p>
-            <a:fld id="{168E7546-711F-4F38-AB39-3D5663DE4237}" type="datetime1">
+            <a:fld id="{24D56AEF-20F1-4D75-8E86-F06FA1F0E9AF}" type="datetime1">
               <a:rPr lang="en-US"/>
               <a:t>04/28/2025</a:t>
             </a:fld>
@@ -7671,7 +7782,7 @@
       </p:grpSpPr>
       <p:sp>
         <p:nvSpPr>
-          <p:cNvPr id="92" name="PlaceHolder 1"/>
+          <p:cNvPr id="94" name="PlaceHolder 1"/>
           <p:cNvSpPr>
             <a:spLocks noGrp="1"/>
           </p:cNvSpPr>
@@ -7708,7 +7819,7 @@
                 <a:uFillTx/>
                 <a:latin typeface="Arial"/>
               </a:rPr>
-              <a:t>Back-end</a:t>
+              <a:t>Bilješke o sintaksi</a:t>
             </a:r>
             <a:endParaRPr b="0" lang="bs-BA" sz="3300" strike="noStrike" u="none">
               <a:solidFill>
@@ -7722,7 +7833,7 @@
       </p:sp>
       <p:sp>
         <p:nvSpPr>
-          <p:cNvPr id="93" name="PlaceHolder 2"/>
+          <p:cNvPr id="95" name="PlaceHolder 2"/>
           <p:cNvSpPr>
             <a:spLocks noGrp="1"/>
           </p:cNvSpPr>
@@ -7767,18 +7878,28 @@
                 <a:uFillTx/>
                 <a:latin typeface="Arial"/>
               </a:rPr>
-              <a:t>Abidin Durdu (tada zvan </a:t>
-            </a:r>
-            <a:r>
-              <a:rPr b="0" i="1" lang="bs-BA" sz="2100" strike="noStrike" u="none">
-                <a:solidFill>
-                  <a:srgbClr val="009bdd"/>
-                </a:solidFill>
-                <a:uFillTx/>
-                <a:latin typeface="Arial"/>
-              </a:rPr>
-              <a:t>betelgeuse-7</a:t>
-            </a:r>
+              <a:t>Moj asembler za PicoBlaze cilja na punu kompatibilnost sa Xilinxovim službenim asemblerom za PicoBlaze. To, na žalost, znači da se numerički literali bez eksplicitno određene brojevne baze interpretiraju kao heksadekadski.</a:t>
+            </a:r>
+            <a:endParaRPr b="0" lang="bs-BA" sz="2100" strike="noStrike" u="none">
+              <a:solidFill>
+                <a:srgbClr val="009bdd"/>
+              </a:solidFill>
+              <a:uFillTx/>
+              <a:latin typeface="Arial"/>
+            </a:endParaRPr>
+          </a:p>
+          <a:p>
+            <a:pPr marL="432000" indent="-324000">
+              <a:spcBef>
+                <a:spcPts val="1060"/>
+              </a:spcBef>
+              <a:buClr>
+                <a:srgbClr val="77caee"/>
+              </a:buClr>
+              <a:buSzPct val="45000"/>
+              <a:buFont typeface="Wingdings" charset="2"/>
+              <a:buChar char=""/>
+            </a:pPr>
             <a:r>
               <a:rPr b="0" lang="bs-BA" sz="2100" strike="noStrike" u="none">
                 <a:solidFill>
@@ -7787,17 +7908,7 @@
                 <a:uFillTx/>
                 <a:latin typeface="Arial"/>
               </a:rPr>
-              <a:t>, a sada zvan </a:t>
-            </a:r>
-            <a:r>
-              <a:rPr b="0" i="1" lang="bs-BA" sz="2100" strike="noStrike" u="none">
-                <a:solidFill>
-                  <a:srgbClr val="009bdd"/>
-                </a:solidFill>
-                <a:uFillTx/>
-                <a:latin typeface="Arial"/>
-              </a:rPr>
-              <a:t>abdrd</a:t>
+              <a:t>Od verzije v5.0.0 to se ponašanje može promijeniti: pretprocesor i asembler će sve brojevne literale bez specificirane baze nakon direktive </a:t>
             </a:r>
             <a:r>
               <a:rPr b="0" lang="bs-BA" sz="2100" strike="noStrike" u="none">
@@ -7805,9 +7916,39 @@
                   <a:srgbClr val="009bdd"/>
                 </a:solidFill>
                 <a:uFillTx/>
-                <a:latin typeface="Arial"/>
-              </a:rPr>
-              <a:t>) napravio je back-end u PHP-u, koji omogućuje korisnicima da dijele asemblerske programe. Taj back-end koristi MySQL bazu podataka. Vrti se na SourceForge serverima.</a:t>
+                <a:latin typeface="Courier New"/>
+              </a:rPr>
+              <a:t>base_decimal</a:t>
+            </a:r>
+            <a:r>
+              <a:rPr b="0" lang="bs-BA" sz="2100" strike="noStrike" u="none">
+                <a:solidFill>
+                  <a:srgbClr val="009bdd"/>
+                </a:solidFill>
+                <a:uFillTx/>
+                <a:latin typeface="Arial"/>
+              </a:rPr>
+              <a:t> interpretirati kao dekadske (kao u gotovo svim programskim jezicima), a nakon </a:t>
+            </a:r>
+            <a:r>
+              <a:rPr b="0" lang="bs-BA" sz="2100" strike="noStrike" u="none">
+                <a:solidFill>
+                  <a:srgbClr val="009bdd"/>
+                </a:solidFill>
+                <a:uFillTx/>
+                <a:latin typeface="Courier New"/>
+              </a:rPr>
+              <a:t>base_hexadecimal</a:t>
+            </a:r>
+            <a:r>
+              <a:rPr b="0" lang="bs-BA" sz="2100" strike="noStrike" u="none">
+                <a:solidFill>
+                  <a:srgbClr val="009bdd"/>
+                </a:solidFill>
+                <a:uFillTx/>
+                <a:latin typeface="Arial"/>
+              </a:rPr>
+              <a:t> kao heksadekadske.</a:t>
             </a:r>
             <a:endParaRPr b="0" lang="bs-BA" sz="2100" strike="noStrike" u="none">
               <a:solidFill>
@@ -7817,99 +7958,38 @@
               <a:latin typeface="Arial"/>
             </a:endParaRPr>
           </a:p>
-        </p:txBody>
-      </p:sp>
-      <p:pic>
-        <p:nvPicPr>
-          <p:cNvPr id="94" name="" descr=""/>
-          <p:cNvPicPr/>
-          <p:nvPr/>
-        </p:nvPicPr>
-        <p:blipFill>
-          <a:blip r:embed="rId1"/>
-          <a:stretch/>
-        </p:blipFill>
-        <p:spPr>
-          <a:xfrm>
-            <a:off x="2507040" y="2289960"/>
-            <a:ext cx="5090040" cy="1104480"/>
-          </a:xfrm>
-          <a:prstGeom prst="rect">
-            <a:avLst/>
-          </a:prstGeom>
-          <a:noFill/>
-          <a:ln w="18000">
-            <a:noFill/>
-          </a:ln>
-        </p:spPr>
-      </p:pic>
-      <p:sp>
-        <p:nvSpPr>
-          <p:cNvPr id="95" name=""/>
-          <p:cNvSpPr/>
-          <p:nvPr/>
-        </p:nvSpPr>
-        <p:spPr>
-          <a:xfrm>
-            <a:off x="4898160" y="2468880"/>
-            <a:ext cx="359640" cy="359640"/>
-          </a:xfrm>
-          <a:prstGeom prst="ellipse">
-            <a:avLst/>
-          </a:prstGeom>
-          <a:noFill/>
-          <a:ln w="18000">
-            <a:solidFill>
-              <a:srgbClr val="009bdd"/>
-            </a:solidFill>
-            <a:round/>
-          </a:ln>
-        </p:spPr>
-        <p:style>
-          <a:lnRef idx="0"/>
-          <a:fillRef idx="0"/>
-          <a:effectRef idx="0"/>
-          <a:fontRef idx="minor"/>
-        </p:style>
-        <p:txBody>
-          <a:bodyPr wrap="none" lIns="90000" rIns="90000" tIns="45000" bIns="45000" anchor="ctr">
-            <a:noAutofit/>
-          </a:bodyPr>
-          <a:p>
-            <a:endParaRPr b="0" lang="bs-BA" sz="1800" strike="noStrike" u="none">
-              <a:solidFill>
-                <a:srgbClr val="000000"/>
-              </a:solidFill>
-              <a:uFillTx/>
-              <a:latin typeface="Arial"/>
-            </a:endParaRPr>
-          </a:p>
-        </p:txBody>
-      </p:sp>
-      <p:pic>
-        <p:nvPicPr>
-          <p:cNvPr id="96" name="" descr=""/>
-          <p:cNvPicPr/>
-          <p:nvPr/>
-        </p:nvPicPr>
-        <p:blipFill>
-          <a:blip r:embed="rId2"/>
-          <a:stretch/>
-        </p:blipFill>
-        <p:spPr>
-          <a:xfrm>
-            <a:off x="1356120" y="3527640"/>
-            <a:ext cx="7330680" cy="1371240"/>
-          </a:xfrm>
-          <a:prstGeom prst="rect">
-            <a:avLst/>
-          </a:prstGeom>
-          <a:noFill/>
-          <a:ln w="18000">
-            <a:noFill/>
-          </a:ln>
-        </p:spPr>
-      </p:pic>
+          <a:p>
+            <a:pPr marL="432000" indent="-324000">
+              <a:spcBef>
+                <a:spcPts val="1060"/>
+              </a:spcBef>
+              <a:buClr>
+                <a:srgbClr val="77caee"/>
+              </a:buClr>
+              <a:buSzPct val="45000"/>
+              <a:buFont typeface="Wingdings" charset="2"/>
+              <a:buChar char=""/>
+            </a:pPr>
+            <a:r>
+              <a:rPr b="0" lang="bs-BA" sz="2100" strike="noStrike" u="none">
+                <a:solidFill>
+                  <a:srgbClr val="009bdd"/>
+                </a:solidFill>
+                <a:uFillTx/>
+                <a:latin typeface="Arial"/>
+              </a:rPr>
+              <a:t>Zbog načina na koji je asembler napravljen, ako se te naredbe stave u if-grananje ili while-petlju, može se dogoditi da pretprocesor interpretira konstante kao dekadske, a asembler kao heksadekadske. Nema očitog rješenja za taj problem.</a:t>
+            </a:r>
+            <a:endParaRPr b="0" lang="bs-BA" sz="2100" strike="noStrike" u="none">
+              <a:solidFill>
+                <a:srgbClr val="009bdd"/>
+              </a:solidFill>
+              <a:uFillTx/>
+              <a:latin typeface="Arial"/>
+            </a:endParaRPr>
+          </a:p>
+        </p:txBody>
+      </p:sp>
       <p:sp>
         <p:nvSpPr>
           <p:cNvPr id="4" name="PlaceHolder 3"/>
@@ -7924,7 +8004,7 @@
         <p:txBody>
           <a:bodyPr/>
           <a:p>
-            <a:fld id="{3BDA46E8-AD75-4CDC-9064-F3E6E30D1FEE}" type="slidenum">
+            <a:fld id="{EBBEE447-3ADB-487B-9A9E-FD4278E0A838}" type="slidenum">
               <a:t>24</a:t>
             </a:fld>
           </a:p>
@@ -7944,7 +8024,7 @@
         <p:txBody>
           <a:bodyPr/>
           <a:p>
-            <a:fld id="{C64C3C46-7DBE-4810-B874-29C85F44AADE}" type="datetime1">
+            <a:fld id="{D6D25E6C-5F92-4E56-8228-FFB97ACE43DC}" type="datetime1">
               <a:rPr lang="en-US"/>
               <a:t>04/28/2025</a:t>
             </a:fld>
@@ -7983,7 +8063,7 @@
       </p:grpSpPr>
       <p:sp>
         <p:nvSpPr>
-          <p:cNvPr id="97" name="PlaceHolder 1"/>
+          <p:cNvPr id="96" name="PlaceHolder 1"/>
           <p:cNvSpPr>
             <a:spLocks noGrp="1"/>
           </p:cNvSpPr>
@@ -7993,8 +8073,8 @@
         </p:nvSpPr>
         <p:spPr>
           <a:xfrm>
-            <a:off x="360000" y="180000"/>
-            <a:ext cx="9360000" cy="478080"/>
+            <a:off x="360000" y="165960"/>
+            <a:ext cx="9360000" cy="506160"/>
           </a:xfrm>
           <a:prstGeom prst="rect">
             <a:avLst/>
@@ -8020,7 +8100,17 @@
                 <a:uFillTx/>
                 <a:latin typeface="Arial"/>
               </a:rPr>
-              <a:t>Bilješke o sintaksi</a:t>
+              <a:t>Pretprocesorska naredba </a:t>
+            </a:r>
+            <a:r>
+              <a:rPr b="0" lang="bs-BA" sz="3300" strike="noStrike" u="none">
+                <a:solidFill>
+                  <a:srgbClr val="ffffff"/>
+                </a:solidFill>
+                <a:uFillTx/>
+                <a:latin typeface="Courier New"/>
+              </a:rPr>
+              <a:t>print_string</a:t>
             </a:r>
             <a:endParaRPr b="0" lang="bs-BA" sz="3300" strike="noStrike" u="none">
               <a:solidFill>
@@ -8034,7 +8124,7 @@
       </p:sp>
       <p:sp>
         <p:nvSpPr>
-          <p:cNvPr id="98" name="PlaceHolder 2"/>
+          <p:cNvPr id="97" name="PlaceHolder 2"/>
           <p:cNvSpPr>
             <a:spLocks noGrp="1"/>
           </p:cNvSpPr>
@@ -8072,16 +8162,36 @@
               <a:buChar char=""/>
             </a:pPr>
             <a:r>
-              <a:rPr b="0" lang="bs-BA" sz="2100" strike="noStrike" u="none">
-                <a:solidFill>
-                  <a:srgbClr val="009bdd"/>
-                </a:solidFill>
-                <a:uFillTx/>
-                <a:latin typeface="Arial"/>
-              </a:rPr>
-              <a:t>Moj asembler za PicoBlaze cilja na punu kompatibilnost sa Xilinxovim službenim asemblerom za PicoBlaze. To, na žalost, znači da se numerički literali bez eksplicitno određene brojevne baze interpretiraju kao heksadekadski.</a:t>
-            </a:r>
-            <a:endParaRPr b="0" lang="bs-BA" sz="2100" strike="noStrike" u="none">
+              <a:rPr b="0" lang="bs-BA" sz="1600" strike="noStrike" u="none">
+                <a:solidFill>
+                  <a:srgbClr val="009bdd"/>
+                </a:solidFill>
+                <a:uFillTx/>
+                <a:latin typeface="Arial"/>
+              </a:rPr>
+              <a:t>Pretprocesor od mog PicoBlaze asemblera od verzije v5.3.0 pa nadalje podržava naredbu </a:t>
+            </a:r>
+            <a:r>
+              <a:rPr b="0" lang="bs-BA" sz="1600" strike="noStrike" u="none">
+                <a:solidFill>
+                  <a:srgbClr val="009bdd"/>
+                </a:solidFill>
+                <a:uFillTx/>
+                <a:latin typeface="Courier New"/>
+              </a:rPr>
+              <a:t>print_string</a:t>
+            </a:r>
+            <a:r>
+              <a:rPr b="0" lang="bs-BA" sz="1600" strike="noStrike" u="none">
+                <a:solidFill>
+                  <a:srgbClr val="009bdd"/>
+                </a:solidFill>
+                <a:uFillTx/>
+                <a:latin typeface="Times New Roman"/>
+              </a:rPr>
+              <a:t>.</a:t>
+            </a:r>
+            <a:endParaRPr b="0" lang="bs-BA" sz="1600" strike="noStrike" u="none">
               <a:solidFill>
                 <a:srgbClr val="009bdd"/>
               </a:solidFill>
@@ -8102,56 +8212,29 @@
               <a:buChar char=""/>
             </a:pPr>
             <a:r>
-              <a:rPr b="0" lang="bs-BA" sz="2100" strike="noStrike" u="none">
-                <a:solidFill>
-                  <a:srgbClr val="009bdd"/>
-                </a:solidFill>
-                <a:uFillTx/>
-                <a:latin typeface="Arial"/>
-              </a:rPr>
-              <a:t>Od verzije v5.0.0 to se ponašanje može promijeniti: pretprocesor i asembler će sve brojevne literale bez specificirane baze nakon direktive </a:t>
-            </a:r>
-            <a:r>
-              <a:rPr b="0" lang="bs-BA" sz="2100" strike="noStrike" u="none">
+              <a:rPr b="0" lang="bs-BA" sz="1600" strike="noStrike" u="none">
+                <a:solidFill>
+                  <a:srgbClr val="009bdd"/>
+                </a:solidFill>
+                <a:uFillTx/>
+                <a:latin typeface="Arial"/>
+              </a:rPr>
+              <a:t>Primjer korištenja:</a:t>
+            </a:r>
+            <a:br>
+              <a:rPr sz="1600"/>
+            </a:br>
+            <a:r>
+              <a:rPr b="0" lang="bs-BA" sz="1600" strike="noStrike" u="none">
                 <a:solidFill>
                   <a:srgbClr val="009bdd"/>
                 </a:solidFill>
                 <a:uFillTx/>
                 <a:latin typeface="Courier New"/>
               </a:rPr>
-              <a:t>base_decimal</a:t>
-            </a:r>
-            <a:r>
-              <a:rPr b="0" lang="bs-BA" sz="2100" strike="noStrike" u="none">
-                <a:solidFill>
-                  <a:srgbClr val="009bdd"/>
-                </a:solidFill>
-                <a:uFillTx/>
-                <a:latin typeface="Arial"/>
-              </a:rPr>
-              <a:t> interpretirati kao dekadske (kao u gotovo svim programskim jezicima), a nakon </a:t>
-            </a:r>
-            <a:r>
-              <a:rPr b="0" lang="bs-BA" sz="2100" strike="noStrike" u="none">
-                <a:solidFill>
-                  <a:srgbClr val="009bdd"/>
-                </a:solidFill>
-                <a:uFillTx/>
-                <a:latin typeface="Courier New"/>
-              </a:rPr>
-              <a:t>base_hexadecimal</a:t>
-            </a:r>
-            <a:r>
-              <a:rPr b="0" lang="bs-BA" sz="2100" strike="noStrike" u="none">
-                <a:solidFill>
-                  <a:srgbClr val="009bdd"/>
-                </a:solidFill>
-                <a:uFillTx/>
-                <a:latin typeface="Arial"/>
-              </a:rPr>
-              <a:t> kao heksadekadske.</a:t>
-            </a:r>
-            <a:endParaRPr b="0" lang="bs-BA" sz="2100" strike="noStrike" u="none">
+              <a:t>print_string "Hello world!", s9, UART_TX</a:t>
+            </a:r>
+            <a:endParaRPr b="0" lang="bs-BA" sz="1600" strike="noStrike" u="none">
               <a:solidFill>
                 <a:srgbClr val="009bdd"/>
               </a:solidFill>
@@ -8172,16 +8255,81 @@
               <a:buChar char=""/>
             </a:pPr>
             <a:r>
-              <a:rPr b="0" lang="bs-BA" sz="2100" strike="noStrike" u="none">
-                <a:solidFill>
-                  <a:srgbClr val="009bdd"/>
-                </a:solidFill>
-                <a:uFillTx/>
-                <a:latin typeface="Arial"/>
-              </a:rPr>
-              <a:t>Zbog načina na koji je asembler napravljen, ako se te naredbe stave u if-grananje ili while-petlju, može se dogoditi da pretprocesor interpretira konstante kao dekadske, a asembler kao heksadekadske. Nema očitog rješenja za taj problem.</a:t>
-            </a:r>
-            <a:endParaRPr b="0" lang="bs-BA" sz="2100" strike="noStrike" u="none">
+              <a:rPr b="0" lang="bs-BA" sz="1600" strike="noStrike" u="none">
+                <a:solidFill>
+                  <a:srgbClr val="009bdd"/>
+                </a:solidFill>
+                <a:uFillTx/>
+                <a:latin typeface="Arial"/>
+              </a:rPr>
+              <a:t>To se pri pretprocesiranju zamjenjuje mnemonikama:</a:t>
+            </a:r>
+            <a:br>
+              <a:rPr sz="1600"/>
+            </a:br>
+            <a:r>
+              <a:rPr b="0" lang="bs-BA" sz="1600" strike="noStrike" u="none">
+                <a:solidFill>
+                  <a:srgbClr val="009bdd"/>
+                </a:solidFill>
+                <a:uFillTx/>
+                <a:latin typeface="Courier New"/>
+              </a:rPr>
+              <a:t>load s9, "H"</a:t>
+            </a:r>
+            <a:br>
+              <a:rPr sz="1600"/>
+            </a:br>
+            <a:r>
+              <a:rPr b="0" lang="bs-BA" sz="1600" strike="noStrike" u="none">
+                <a:solidFill>
+                  <a:srgbClr val="009bdd"/>
+                </a:solidFill>
+                <a:uFillTx/>
+                <a:latin typeface="Courier New"/>
+              </a:rPr>
+              <a:t>call UART_TX</a:t>
+            </a:r>
+            <a:br>
+              <a:rPr sz="1600"/>
+            </a:br>
+            <a:r>
+              <a:rPr b="0" lang="bs-BA" sz="1600" strike="noStrike" u="none">
+                <a:solidFill>
+                  <a:srgbClr val="009bdd"/>
+                </a:solidFill>
+                <a:uFillTx/>
+                <a:latin typeface="Courier New"/>
+              </a:rPr>
+              <a:t>load s9, "e"</a:t>
+            </a:r>
+            <a:br>
+              <a:rPr sz="1600"/>
+            </a:br>
+            <a:r>
+              <a:rPr b="0" lang="bs-BA" sz="1600" strike="noStrike" u="none">
+                <a:solidFill>
+                  <a:srgbClr val="009bdd"/>
+                </a:solidFill>
+                <a:uFillTx/>
+                <a:latin typeface="Courier New"/>
+              </a:rPr>
+              <a:t>call UART_TX</a:t>
+            </a:r>
+            <a:br>
+              <a:rPr sz="1600"/>
+            </a:br>
+            <a:r>
+              <a:rPr b="0" lang="bs-BA" sz="1600" strike="noStrike" u="none">
+                <a:solidFill>
+                  <a:srgbClr val="009bdd"/>
+                </a:solidFill>
+                <a:uFillTx/>
+                <a:latin typeface="Courier New"/>
+              </a:rPr>
+              <a:t>...</a:t>
+            </a:r>
+            <a:endParaRPr b="0" lang="bs-BA" sz="1600" strike="noStrike" u="none">
               <a:solidFill>
                 <a:srgbClr val="009bdd"/>
               </a:solidFill>
@@ -8189,6 +8337,106 @@
               <a:latin typeface="Arial"/>
             </a:endParaRPr>
           </a:p>
+          <a:p>
+            <a:pPr marL="432000" indent="-324000">
+              <a:spcBef>
+                <a:spcPts val="1060"/>
+              </a:spcBef>
+              <a:buClr>
+                <a:srgbClr val="77caee"/>
+              </a:buClr>
+              <a:buSzPct val="45000"/>
+              <a:buFont typeface="Wingdings" charset="2"/>
+              <a:buChar char=""/>
+            </a:pPr>
+            <a:r>
+              <a:rPr b="0" lang="bs-BA" sz="1600" strike="noStrike" u="none">
+                <a:solidFill>
+                  <a:srgbClr val="009bdd"/>
+                </a:solidFill>
+                <a:uFillTx/>
+                <a:latin typeface="Arial"/>
+              </a:rPr>
+              <a:t>To je skratilo kôd primjera “</a:t>
+            </a:r>
+            <a:r>
+              <a:rPr b="0" i="1" lang="bs-BA" sz="1600" strike="noStrike" u="none">
+                <a:solidFill>
+                  <a:srgbClr val="009bdd"/>
+                </a:solidFill>
+                <a:uFillTx/>
+                <a:latin typeface="Arial"/>
+              </a:rPr>
+              <a:t>Permutations Algorithm</a:t>
+            </a:r>
+            <a:r>
+              <a:rPr b="0" lang="bs-BA" sz="1600" strike="noStrike" u="none">
+                <a:solidFill>
+                  <a:srgbClr val="009bdd"/>
+                </a:solidFill>
+                <a:uFillTx/>
+                <a:latin typeface="Arial"/>
+              </a:rPr>
+              <a:t>” s preko 1000 redaka na manje od 400 redaka.</a:t>
+            </a:r>
+            <a:endParaRPr b="0" lang="bs-BA" sz="1600" strike="noStrike" u="none">
+              <a:solidFill>
+                <a:srgbClr val="009bdd"/>
+              </a:solidFill>
+              <a:uFillTx/>
+              <a:latin typeface="Arial"/>
+            </a:endParaRPr>
+          </a:p>
+          <a:p>
+            <a:pPr marL="432000" indent="-324000">
+              <a:spcBef>
+                <a:spcPts val="1060"/>
+              </a:spcBef>
+              <a:buClr>
+                <a:srgbClr val="77caee"/>
+              </a:buClr>
+              <a:buSzPct val="45000"/>
+              <a:buFont typeface="Wingdings" charset="2"/>
+              <a:buChar char=""/>
+            </a:pPr>
+            <a:r>
+              <a:rPr b="0" lang="bs-BA" sz="1600" strike="noStrike" u="none">
+                <a:solidFill>
+                  <a:srgbClr val="009bdd"/>
+                </a:solidFill>
+                <a:uFillTx/>
+                <a:latin typeface="Arial"/>
+              </a:rPr>
+              <a:t>Do verzije v5.3.2, breakpoint stavljen na </a:t>
+            </a:r>
+            <a:r>
+              <a:rPr b="0" lang="bs-BA" sz="1600" strike="noStrike" u="none">
+                <a:solidFill>
+                  <a:srgbClr val="009bdd"/>
+                </a:solidFill>
+                <a:uFillTx/>
+                <a:latin typeface="Courier New"/>
+              </a:rPr>
+              <a:t>print_string</a:t>
+            </a:r>
+            <a:r>
+              <a:rPr b="0" lang="bs-BA" sz="1600" strike="noStrike" u="none">
+                <a:solidFill>
+                  <a:srgbClr val="009bdd"/>
+                </a:solidFill>
+                <a:uFillTx/>
+                <a:latin typeface="Arial"/>
+              </a:rPr>
+              <a:t> okinuo bi se dva puta onoliko puta koliko ima znakova u stringu (za svaku mašinsku naredbu koja dolazi iz te asemblerske linije), ali to je ispravljeno. Sada se okine samo jednom.</a:t>
+            </a:r>
+            <a:endParaRPr b="0" lang="bs-BA" sz="1600" strike="noStrike" u="none">
+              <a:solidFill>
+                <a:srgbClr val="009bdd"/>
+              </a:solidFill>
+              <a:uFillTx/>
+              <a:latin typeface="Arial"/>
+            </a:endParaRPr>
+          </a:p>
         </p:txBody>
       </p:sp>
       <p:sp>
@@ -8205,7 +8453,7 @@
         <p:txBody>
           <a:bodyPr/>
           <a:p>
-            <a:fld id="{758CDE05-63C7-4B7A-B24F-46DAFA693643}" type="slidenum">
+            <a:fld id="{56542FAA-B553-4A04-A91C-35F6A62821D3}" type="slidenum">
               <a:t>25</a:t>
             </a:fld>
           </a:p>
@@ -8225,7 +8473,7 @@
         <p:txBody>
           <a:bodyPr/>
           <a:p>
-            <a:fld id="{A0B30B31-5E0F-4F88-9A45-3E738B0001F6}" type="datetime1">
+            <a:fld id="{514DCA2B-E1FB-40B1-80A6-C93DB797BC1F}" type="datetime1">
               <a:rPr lang="en-US"/>
               <a:t>04/28/2025</a:t>
             </a:fld>
@@ -8264,7 +8512,7 @@
       </p:grpSpPr>
       <p:sp>
         <p:nvSpPr>
-          <p:cNvPr id="99" name="PlaceHolder 1"/>
+          <p:cNvPr id="98" name="PlaceHolder 1"/>
           <p:cNvSpPr>
             <a:spLocks noGrp="1"/>
           </p:cNvSpPr>
@@ -8274,8 +8522,8 @@
         </p:nvSpPr>
         <p:spPr>
           <a:xfrm>
-            <a:off x="360000" y="165960"/>
-            <a:ext cx="9360000" cy="506160"/>
+            <a:off x="360000" y="180000"/>
+            <a:ext cx="9360000" cy="478080"/>
           </a:xfrm>
           <a:prstGeom prst="rect">
             <a:avLst/>
@@ -8301,17 +8549,7 @@
                 <a:uFillTx/>
                 <a:latin typeface="Arial"/>
               </a:rPr>
-              <a:t>Pretprocesorska naredba </a:t>
-            </a:r>
-            <a:r>
-              <a:rPr b="0" lang="bs-BA" sz="3300" strike="noStrike" u="none">
-                <a:solidFill>
-                  <a:srgbClr val="ffffff"/>
-                </a:solidFill>
-                <a:uFillTx/>
-                <a:latin typeface="Courier New"/>
-              </a:rPr>
-              <a:t>print_string</a:t>
+              <a:t>Bilješke o arhitekturi</a:t>
             </a:r>
             <a:endParaRPr b="0" lang="bs-BA" sz="3300" strike="noStrike" u="none">
               <a:solidFill>
@@ -8325,7 +8563,7 @@
       </p:sp>
       <p:sp>
         <p:nvSpPr>
-          <p:cNvPr id="100" name="PlaceHolder 2"/>
+          <p:cNvPr id="99" name="PlaceHolder 2"/>
           <p:cNvSpPr>
             <a:spLocks noGrp="1"/>
           </p:cNvSpPr>
@@ -8363,36 +8601,16 @@
               <a:buChar char=""/>
             </a:pPr>
             <a:r>
-              <a:rPr b="0" lang="bs-BA" sz="1600" strike="noStrike" u="none">
-                <a:solidFill>
-                  <a:srgbClr val="009bdd"/>
-                </a:solidFill>
-                <a:uFillTx/>
-                <a:latin typeface="Arial"/>
-              </a:rPr>
-              <a:t>Pretprocesor od mog PicoBlaze asemblera od verzije v5.3.0 pa nadalje podržava naredbu </a:t>
-            </a:r>
-            <a:r>
-              <a:rPr b="0" lang="bs-BA" sz="1600" strike="noStrike" u="none">
-                <a:solidFill>
-                  <a:srgbClr val="009bdd"/>
-                </a:solidFill>
-                <a:uFillTx/>
-                <a:latin typeface="Courier New"/>
-              </a:rPr>
-              <a:t>print_string</a:t>
-            </a:r>
-            <a:r>
-              <a:rPr b="0" lang="bs-BA" sz="1600" strike="noStrike" u="none">
-                <a:solidFill>
-                  <a:srgbClr val="009bdd"/>
-                </a:solidFill>
-                <a:uFillTx/>
-                <a:latin typeface="Times New Roman"/>
-              </a:rPr>
-              <a:t>.</a:t>
-            </a:r>
-            <a:endParaRPr b="0" lang="bs-BA" sz="1600" strike="noStrike" u="none">
+              <a:rPr b="0" lang="bs-BA" sz="2400" strike="noStrike" u="none">
+                <a:solidFill>
+                  <a:srgbClr val="009bdd"/>
+                </a:solidFill>
+                <a:uFillTx/>
+                <a:latin typeface="Arial"/>
+              </a:rPr>
+              <a:t>Parseri većine asemblera pretvaraju tokenizirani asemblerski kod u dvodimenzionalno polje (tablicu) malih stabala (gdje su samo aritmetički izrazi stabla, a ostalo su pojedinačni čvorovi).</a:t>
+            </a:r>
+            <a:endParaRPr b="0" lang="bs-BA" sz="2400" strike="noStrike" u="none">
               <a:solidFill>
                 <a:srgbClr val="009bdd"/>
               </a:solidFill>
@@ -8413,29 +8631,16 @@
               <a:buChar char=""/>
             </a:pPr>
             <a:r>
-              <a:rPr b="0" lang="bs-BA" sz="1600" strike="noStrike" u="none">
-                <a:solidFill>
-                  <a:srgbClr val="009bdd"/>
-                </a:solidFill>
-                <a:uFillTx/>
-                <a:latin typeface="Arial"/>
-              </a:rPr>
-              <a:t>Primjer korištenja:</a:t>
-            </a:r>
-            <a:br>
-              <a:rPr sz="1600"/>
-            </a:br>
-            <a:r>
-              <a:rPr b="0" lang="bs-BA" sz="1600" strike="noStrike" u="none">
-                <a:solidFill>
-                  <a:srgbClr val="009bdd"/>
-                </a:solidFill>
-                <a:uFillTx/>
-                <a:latin typeface="Courier New"/>
-              </a:rPr>
-              <a:t>print_string "Hello world!", s9, UART_TX</a:t>
-            </a:r>
-            <a:endParaRPr b="0" lang="bs-BA" sz="1600" strike="noStrike" u="none">
+              <a:rPr b="0" lang="bs-BA" sz="2400" strike="noStrike" u="none">
+                <a:solidFill>
+                  <a:srgbClr val="009bdd"/>
+                </a:solidFill>
+                <a:uFillTx/>
+                <a:latin typeface="Arial"/>
+              </a:rPr>
+              <a:t>Parser u ovom asembleru za PicoBlaze pretvara tokenizirani asemblerski kod u jedno veliko stablo. Korijen tog stabla je čvor s tekstom “assembly”, a čvorovi dubine 1 su mnemonike, pretprocesorske naredbe i labeli.</a:t>
+            </a:r>
+            <a:endParaRPr b="0" lang="bs-BA" sz="2400" strike="noStrike" u="none">
               <a:solidFill>
                 <a:srgbClr val="009bdd"/>
               </a:solidFill>
@@ -8456,81 +8661,16 @@
               <a:buChar char=""/>
             </a:pPr>
             <a:r>
-              <a:rPr b="0" lang="bs-BA" sz="1600" strike="noStrike" u="none">
-                <a:solidFill>
-                  <a:srgbClr val="009bdd"/>
-                </a:solidFill>
-                <a:uFillTx/>
-                <a:latin typeface="Arial"/>
-              </a:rPr>
-              <a:t>To se pri pretprocesiranju zamjenjuje mnemonikama:</a:t>
-            </a:r>
-            <a:br>
-              <a:rPr sz="1600"/>
-            </a:br>
-            <a:r>
-              <a:rPr b="0" lang="bs-BA" sz="1600" strike="noStrike" u="none">
-                <a:solidFill>
-                  <a:srgbClr val="009bdd"/>
-                </a:solidFill>
-                <a:uFillTx/>
-                <a:latin typeface="Courier New"/>
-              </a:rPr>
-              <a:t>load s9, "H"</a:t>
-            </a:r>
-            <a:br>
-              <a:rPr sz="1600"/>
-            </a:br>
-            <a:r>
-              <a:rPr b="0" lang="bs-BA" sz="1600" strike="noStrike" u="none">
-                <a:solidFill>
-                  <a:srgbClr val="009bdd"/>
-                </a:solidFill>
-                <a:uFillTx/>
-                <a:latin typeface="Courier New"/>
-              </a:rPr>
-              <a:t>call UART_TX</a:t>
-            </a:r>
-            <a:br>
-              <a:rPr sz="1600"/>
-            </a:br>
-            <a:r>
-              <a:rPr b="0" lang="bs-BA" sz="1600" strike="noStrike" u="none">
-                <a:solidFill>
-                  <a:srgbClr val="009bdd"/>
-                </a:solidFill>
-                <a:uFillTx/>
-                <a:latin typeface="Courier New"/>
-              </a:rPr>
-              <a:t>load s9, "e"</a:t>
-            </a:r>
-            <a:br>
-              <a:rPr sz="1600"/>
-            </a:br>
-            <a:r>
-              <a:rPr b="0" lang="bs-BA" sz="1600" strike="noStrike" u="none">
-                <a:solidFill>
-                  <a:srgbClr val="009bdd"/>
-                </a:solidFill>
-                <a:uFillTx/>
-                <a:latin typeface="Courier New"/>
-              </a:rPr>
-              <a:t>call UART_TX</a:t>
-            </a:r>
-            <a:br>
-              <a:rPr sz="1600"/>
-            </a:br>
-            <a:r>
-              <a:rPr b="0" lang="bs-BA" sz="1600" strike="noStrike" u="none">
-                <a:solidFill>
-                  <a:srgbClr val="009bdd"/>
-                </a:solidFill>
-                <a:uFillTx/>
-                <a:latin typeface="Courier New"/>
-              </a:rPr>
-              <a:t>...</a:t>
-            </a:r>
-            <a:endParaRPr b="0" lang="bs-BA" sz="1600" strike="noStrike" u="none">
+              <a:rPr b="0" lang="bs-BA" sz="2400" strike="noStrike" u="none">
+                <a:solidFill>
+                  <a:srgbClr val="009bdd"/>
+                </a:solidFill>
+                <a:uFillTx/>
+                <a:latin typeface="Arial"/>
+              </a:rPr>
+              <a:t>Operandi mnemonika i pretprocesorskih naredbi njihova su djeca.</a:t>
+            </a:r>
+            <a:endParaRPr b="0" lang="bs-BA" sz="2400" strike="noStrike" u="none">
               <a:solidFill>
                 <a:srgbClr val="009bdd"/>
               </a:solidFill>
@@ -8538,106 +8678,6 @@
               <a:latin typeface="Arial"/>
             </a:endParaRPr>
           </a:p>
-          <a:p>
-            <a:pPr marL="432000" indent="-324000">
-              <a:spcBef>
-                <a:spcPts val="1060"/>
-              </a:spcBef>
-              <a:buClr>
-                <a:srgbClr val="77caee"/>
-              </a:buClr>
-              <a:buSzPct val="45000"/>
-              <a:buFont typeface="Wingdings" charset="2"/>
-              <a:buChar char=""/>
-            </a:pPr>
-            <a:r>
-              <a:rPr b="0" lang="bs-BA" sz="1600" strike="noStrike" u="none">
-                <a:solidFill>
-                  <a:srgbClr val="009bdd"/>
-                </a:solidFill>
-                <a:uFillTx/>
-                <a:latin typeface="Arial"/>
-              </a:rPr>
-              <a:t>To je skratilo kôd primjera “</a:t>
-            </a:r>
-            <a:r>
-              <a:rPr b="0" i="1" lang="bs-BA" sz="1600" strike="noStrike" u="none">
-                <a:solidFill>
-                  <a:srgbClr val="009bdd"/>
-                </a:solidFill>
-                <a:uFillTx/>
-                <a:latin typeface="Arial"/>
-              </a:rPr>
-              <a:t>Permutations Algorithm</a:t>
-            </a:r>
-            <a:r>
-              <a:rPr b="0" lang="bs-BA" sz="1600" strike="noStrike" u="none">
-                <a:solidFill>
-                  <a:srgbClr val="009bdd"/>
-                </a:solidFill>
-                <a:uFillTx/>
-                <a:latin typeface="Arial"/>
-              </a:rPr>
-              <a:t>” s preko 1000 redaka na manje od 400 redaka.</a:t>
-            </a:r>
-            <a:endParaRPr b="0" lang="bs-BA" sz="1600" strike="noStrike" u="none">
-              <a:solidFill>
-                <a:srgbClr val="009bdd"/>
-              </a:solidFill>
-              <a:uFillTx/>
-              <a:latin typeface="Arial"/>
-            </a:endParaRPr>
-          </a:p>
-          <a:p>
-            <a:pPr marL="432000" indent="-324000">
-              <a:spcBef>
-                <a:spcPts val="1060"/>
-              </a:spcBef>
-              <a:buClr>
-                <a:srgbClr val="77caee"/>
-              </a:buClr>
-              <a:buSzPct val="45000"/>
-              <a:buFont typeface="Wingdings" charset="2"/>
-              <a:buChar char=""/>
-            </a:pPr>
-            <a:r>
-              <a:rPr b="0" lang="bs-BA" sz="1600" strike="noStrike" u="none">
-                <a:solidFill>
-                  <a:srgbClr val="009bdd"/>
-                </a:solidFill>
-                <a:uFillTx/>
-                <a:latin typeface="Arial"/>
-              </a:rPr>
-              <a:t>Do verzije v5.3.2, breakpoint stavljen na </a:t>
-            </a:r>
-            <a:r>
-              <a:rPr b="0" lang="bs-BA" sz="1600" strike="noStrike" u="none">
-                <a:solidFill>
-                  <a:srgbClr val="009bdd"/>
-                </a:solidFill>
-                <a:uFillTx/>
-                <a:latin typeface="Courier New"/>
-              </a:rPr>
-              <a:t>print_string</a:t>
-            </a:r>
-            <a:r>
-              <a:rPr b="0" lang="bs-BA" sz="1600" strike="noStrike" u="none">
-                <a:solidFill>
-                  <a:srgbClr val="009bdd"/>
-                </a:solidFill>
-                <a:uFillTx/>
-                <a:latin typeface="Arial"/>
-              </a:rPr>
-              <a:t> okinuo bi se dva puta onoliko puta koliko ima znakova u stringu (za svaku mašinsku naredbu koja dolazi iz te asemblerske linije), ali to je ispravljeno. Sada se okine samo jednom.</a:t>
-            </a:r>
-            <a:endParaRPr b="0" lang="bs-BA" sz="1600" strike="noStrike" u="none">
-              <a:solidFill>
-                <a:srgbClr val="009bdd"/>
-              </a:solidFill>
-              <a:uFillTx/>
-              <a:latin typeface="Arial"/>
-            </a:endParaRPr>
-          </a:p>
         </p:txBody>
       </p:sp>
       <p:sp>
@@ -8654,7 +8694,7 @@
         <p:txBody>
           <a:bodyPr/>
           <a:p>
-            <a:fld id="{3D77773D-89E1-414E-9C5E-40E8D05EB519}" type="slidenum">
+            <a:fld id="{6DEF9451-B482-41AC-A09E-4C6396CCBDBB}" type="slidenum">
               <a:t>26</a:t>
             </a:fld>
           </a:p>
@@ -8674,7 +8714,7 @@
         <p:txBody>
           <a:bodyPr/>
           <a:p>
-            <a:fld id="{457C2939-4BBA-468E-B067-3BBEE535E7F6}" type="datetime1">
+            <a:fld id="{5FFEE323-80FB-4F31-A9FB-79E7624084D1}" type="datetime1">
               <a:rPr lang="en-US"/>
               <a:t>04/28/2025</a:t>
             </a:fld>
@@ -8713,248 +8753,7 @@
       </p:grpSpPr>
       <p:sp>
         <p:nvSpPr>
-          <p:cNvPr id="101" name="PlaceHolder 1"/>
-          <p:cNvSpPr>
-            <a:spLocks noGrp="1"/>
-          </p:cNvSpPr>
-          <p:nvPr>
-            <p:ph type="title"/>
-          </p:nvPr>
-        </p:nvSpPr>
-        <p:spPr>
-          <a:xfrm>
-            <a:off x="360000" y="180000"/>
-            <a:ext cx="9360000" cy="478080"/>
-          </a:xfrm>
-          <a:prstGeom prst="rect">
-            <a:avLst/>
-          </a:prstGeom>
-          <a:noFill/>
-          <a:ln w="0">
-            <a:noFill/>
-          </a:ln>
-        </p:spPr>
-        <p:txBody>
-          <a:bodyPr lIns="0" rIns="0" tIns="0" bIns="0" anchor="ctr">
-            <a:noAutofit/>
-          </a:bodyPr>
-          <a:p>
-            <a:pPr indent="0" algn="ctr">
-              <a:buNone/>
-            </a:pPr>
-            <a:r>
-              <a:rPr b="0" lang="bs-BA" sz="3300" strike="noStrike" u="none">
-                <a:solidFill>
-                  <a:srgbClr val="ffffff"/>
-                </a:solidFill>
-                <a:uFillTx/>
-                <a:latin typeface="Arial"/>
-              </a:rPr>
-              <a:t>Bilješke o arhitekturi</a:t>
-            </a:r>
-            <a:endParaRPr b="0" lang="bs-BA" sz="3300" strike="noStrike" u="none">
-              <a:solidFill>
-                <a:srgbClr val="ffffff"/>
-              </a:solidFill>
-              <a:uFillTx/>
-              <a:latin typeface="Arial"/>
-            </a:endParaRPr>
-          </a:p>
-        </p:txBody>
-      </p:sp>
-      <p:sp>
-        <p:nvSpPr>
-          <p:cNvPr id="102" name="PlaceHolder 2"/>
-          <p:cNvSpPr>
-            <a:spLocks noGrp="1"/>
-          </p:cNvSpPr>
-          <p:nvPr>
-            <p:ph/>
-          </p:nvPr>
-        </p:nvSpPr>
-        <p:spPr>
-          <a:xfrm>
-            <a:off x="360000" y="1080000"/>
-            <a:ext cx="9360000" cy="3600000"/>
-          </a:xfrm>
-          <a:prstGeom prst="rect">
-            <a:avLst/>
-          </a:prstGeom>
-          <a:noFill/>
-          <a:ln w="0">
-            <a:noFill/>
-          </a:ln>
-        </p:spPr>
-        <p:txBody>
-          <a:bodyPr lIns="0" rIns="0" tIns="0" bIns="0" anchor="t">
-            <a:noAutofit/>
-          </a:bodyPr>
-          <a:p>
-            <a:pPr marL="432000" indent="-324000">
-              <a:spcBef>
-                <a:spcPts val="1060"/>
-              </a:spcBef>
-              <a:buClr>
-                <a:srgbClr val="77caee"/>
-              </a:buClr>
-              <a:buSzPct val="45000"/>
-              <a:buFont typeface="Wingdings" charset="2"/>
-              <a:buChar char=""/>
-            </a:pPr>
-            <a:r>
-              <a:rPr b="0" lang="bs-BA" sz="2400" strike="noStrike" u="none">
-                <a:solidFill>
-                  <a:srgbClr val="009bdd"/>
-                </a:solidFill>
-                <a:uFillTx/>
-                <a:latin typeface="Arial"/>
-              </a:rPr>
-              <a:t>Parseri većine asemblera pretvaraju tokenizirani asemblerski kod u dvodimenzionalno polje (tablicu) malih stabala (gdje su samo aritmetički izrazi stabla, a ostalo su pojedinačni čvorovi).</a:t>
-            </a:r>
-            <a:endParaRPr b="0" lang="bs-BA" sz="2400" strike="noStrike" u="none">
-              <a:solidFill>
-                <a:srgbClr val="009bdd"/>
-              </a:solidFill>
-              <a:uFillTx/>
-              <a:latin typeface="Arial"/>
-            </a:endParaRPr>
-          </a:p>
-          <a:p>
-            <a:pPr marL="432000" indent="-324000">
-              <a:spcBef>
-                <a:spcPts val="1060"/>
-              </a:spcBef>
-              <a:buClr>
-                <a:srgbClr val="77caee"/>
-              </a:buClr>
-              <a:buSzPct val="45000"/>
-              <a:buFont typeface="Wingdings" charset="2"/>
-              <a:buChar char=""/>
-            </a:pPr>
-            <a:r>
-              <a:rPr b="0" lang="bs-BA" sz="2400" strike="noStrike" u="none">
-                <a:solidFill>
-                  <a:srgbClr val="009bdd"/>
-                </a:solidFill>
-                <a:uFillTx/>
-                <a:latin typeface="Arial"/>
-              </a:rPr>
-              <a:t>Parser u ovom asembleru za PicoBlaze pretvara tokenizirani asemblerski kod u jedno veliko stablo. Korijen tog stabla je čvor s tekstom “assembly”, a čvorovi dubine 1 su mnemonike, pretprocesorske naredbe i labeli.</a:t>
-            </a:r>
-            <a:endParaRPr b="0" lang="bs-BA" sz="2400" strike="noStrike" u="none">
-              <a:solidFill>
-                <a:srgbClr val="009bdd"/>
-              </a:solidFill>
-              <a:uFillTx/>
-              <a:latin typeface="Arial"/>
-            </a:endParaRPr>
-          </a:p>
-          <a:p>
-            <a:pPr marL="432000" indent="-324000">
-              <a:spcBef>
-                <a:spcPts val="1060"/>
-              </a:spcBef>
-              <a:buClr>
-                <a:srgbClr val="77caee"/>
-              </a:buClr>
-              <a:buSzPct val="45000"/>
-              <a:buFont typeface="Wingdings" charset="2"/>
-              <a:buChar char=""/>
-            </a:pPr>
-            <a:r>
-              <a:rPr b="0" lang="bs-BA" sz="2400" strike="noStrike" u="none">
-                <a:solidFill>
-                  <a:srgbClr val="009bdd"/>
-                </a:solidFill>
-                <a:uFillTx/>
-                <a:latin typeface="Arial"/>
-              </a:rPr>
-              <a:t>Operandi mnemonika i pretprocesorskih naredbi njihova su djeca.</a:t>
-            </a:r>
-            <a:endParaRPr b="0" lang="bs-BA" sz="2400" strike="noStrike" u="none">
-              <a:solidFill>
-                <a:srgbClr val="009bdd"/>
-              </a:solidFill>
-              <a:uFillTx/>
-              <a:latin typeface="Arial"/>
-            </a:endParaRPr>
-          </a:p>
-        </p:txBody>
-      </p:sp>
-      <p:sp>
-        <p:nvSpPr>
-          <p:cNvPr id="4" name="PlaceHolder 3"/>
-          <p:cNvSpPr>
-            <a:spLocks noGrp="1"/>
-          </p:cNvSpPr>
-          <p:nvPr>
-            <p:ph type="sldNum" idx="6"/>
-          </p:nvPr>
-        </p:nvSpPr>
-        <p:spPr/>
-        <p:txBody>
-          <a:bodyPr/>
-          <a:p>
-            <a:fld id="{05A5AD1D-2EB8-4FA8-BB1D-2A9207E2B916}" type="slidenum">
-              <a:t>27</a:t>
-            </a:fld>
-          </a:p>
-        </p:txBody>
-      </p:sp>
-      <p:sp>
-        <p:nvSpPr>
-          <p:cNvPr id="5" name="PlaceHolder 4"/>
-          <p:cNvSpPr>
-            <a:spLocks noGrp="1"/>
-          </p:cNvSpPr>
-          <p:nvPr>
-            <p:ph type="dt" idx="4"/>
-          </p:nvPr>
-        </p:nvSpPr>
-        <p:spPr/>
-        <p:txBody>
-          <a:bodyPr/>
-          <a:p>
-            <a:fld id="{5B8ED8B7-A94B-4F71-B44D-2105FF59A2CE}" type="datetime1">
-              <a:rPr lang="en-US"/>
-              <a:t>04/28/2025</a:t>
-            </a:fld>
-          </a:p>
-        </p:txBody>
-      </p:sp>
-    </p:spTree>
-  </p:cSld>
-  <mc:AlternateContent>
-    <mc:Choice Requires="p14">
-      <p:transition spd="slow" p14:dur="2000"/>
-    </mc:Choice>
-    <mc:Fallback>
-      <p:transition spd="slow"/>
-    </mc:Fallback>
-  </mc:AlternateContent>
-</p:sld>
-</file>
-
-<file path=ppt/slides/slide28.xml><?xml version="1.0" encoding="utf-8"?>
-<p:sld xmlns:a="http://schemas.openxmlformats.org/drawingml/2006/main" xmlns:p="http://schemas.openxmlformats.org/presentationml/2006/main" xmlns:r="http://schemas.openxmlformats.org/officeDocument/2006/relationships" xmlns:p14="http://schemas.microsoft.com/office/powerpoint/2010/main" xmlns:p15="http://schemas.microsoft.com/office/powerpoint/2012/main" xmlns:mc="http://schemas.openxmlformats.org/markup-compatibility/2006">
-  <p:cSld>
-    <p:spTree>
-      <p:nvGrpSpPr>
-        <p:cNvPr id="1" name=""/>
-        <p:cNvGrpSpPr/>
-        <p:nvPr/>
-      </p:nvGrpSpPr>
-      <p:grpSpPr>
-        <a:xfrm>
-          <a:off x="0" y="0"/>
-          <a:ext cx="0" cy="0"/>
-          <a:chOff x="0" y="0"/>
-          <a:chExt cx="0" cy="0"/>
-        </a:xfrm>
-      </p:grpSpPr>
-      <p:sp>
-        <p:nvSpPr>
-          <p:cNvPr id="103" name="PlaceHolder 1"/>
+          <p:cNvPr id="100" name="PlaceHolder 1"/>
           <p:cNvSpPr>
             <a:spLocks noGrp="1"/>
           </p:cNvSpPr>
@@ -9021,8 +8820,8 @@
         <p:txBody>
           <a:bodyPr/>
           <a:p>
-            <a:fld id="{11753ACA-7996-4A68-9ED8-A00872DCDDD4}" type="slidenum">
-              <a:t>28</a:t>
+            <a:fld id="{2D5D3404-65B4-4DFF-9E5B-7220DDE5D2FF}" type="slidenum">
+              <a:t>27</a:t>
             </a:fld>
           </a:p>
         </p:txBody>
@@ -9041,7 +8840,7 @@
         <p:txBody>
           <a:bodyPr/>
           <a:p>
-            <a:fld id="{DEFD4EED-335D-40A0-BB17-8F25B23E11EE}" type="datetime1">
+            <a:fld id="{21F339DF-BD21-45E9-A244-1456D84AC1F6}" type="datetime1">
               <a:rPr lang="en-US"/>
               <a:t>04/28/2025</a:t>
             </a:fld>
@@ -9331,7 +9130,7 @@
         <p:txBody>
           <a:bodyPr/>
           <a:p>
-            <a:fld id="{3995CFB4-A1E7-4522-93F8-A9B446447224}" type="slidenum">
+            <a:fld id="{31E41A39-C694-448B-83FE-A379B0B52EB8}" type="slidenum">
               <a:t>3</a:t>
             </a:fld>
           </a:p>
@@ -9351,7 +9150,7 @@
         <p:txBody>
           <a:bodyPr/>
           <a:p>
-            <a:fld id="{3942A212-AE86-44AB-86AA-B9950E5F9C89}" type="datetime1">
+            <a:fld id="{D2EA40A5-F9D5-453E-BD02-994D948BB331}" type="datetime1">
               <a:rPr lang="en-US"/>
               <a:t>04/28/2025</a:t>
             </a:fld>
@@ -9590,7 +9389,7 @@
         <p:txBody>
           <a:bodyPr/>
           <a:p>
-            <a:fld id="{15CA149E-D17B-463F-89C8-54B451B4B483}" type="slidenum">
+            <a:fld id="{DA14ACEB-F8EE-4E09-9208-D9DBB7E19820}" type="slidenum">
               <a:t>4</a:t>
             </a:fld>
           </a:p>
@@ -9610,7 +9409,7 @@
         <p:txBody>
           <a:bodyPr/>
           <a:p>
-            <a:fld id="{1DBB4704-8AA9-48F5-AE55-97654CD5ED06}" type="datetime1">
+            <a:fld id="{0EFD3842-8DA5-494A-B414-72A98B1B8811}" type="datetime1">
               <a:rPr lang="en-US"/>
               <a:t>04/28/2025</a:t>
             </a:fld>
@@ -9862,7 +9661,7 @@
         <p:txBody>
           <a:bodyPr/>
           <a:p>
-            <a:fld id="{A283A801-C50E-4E9A-80DF-D269EDCEC9FD}" type="slidenum">
+            <a:fld id="{D6AA2831-46F7-4940-A201-5CA222C42C38}" type="slidenum">
               <a:t>5</a:t>
             </a:fld>
           </a:p>
@@ -9882,7 +9681,7 @@
         <p:txBody>
           <a:bodyPr/>
           <a:p>
-            <a:fld id="{57F8C445-C49D-452B-BA38-D0FA7B274005}" type="datetime1">
+            <a:fld id="{AA3BFDC4-53E0-4BE3-AAA3-41E2A4D9F3D9}" type="datetime1">
               <a:rPr lang="en-US"/>
               <a:t>04/28/2025</a:t>
             </a:fld>
@@ -10247,7 +10046,7 @@
         <p:txBody>
           <a:bodyPr/>
           <a:p>
-            <a:fld id="{5EF3F363-F2A7-4520-99AC-AEF0480C7E4D}" type="slidenum">
+            <a:fld id="{F054F20A-1ED5-4F7C-8AC1-A4E674458F09}" type="slidenum">
               <a:t>6</a:t>
             </a:fld>
           </a:p>
@@ -10267,7 +10066,7 @@
         <p:txBody>
           <a:bodyPr/>
           <a:p>
-            <a:fld id="{8CCD432D-1A3A-4718-B497-01E7452A9A4D}" type="datetime1">
+            <a:fld id="{C60BDE3F-37C3-4FDD-B7CF-62BF64B80926}" type="datetime1">
               <a:rPr lang="en-US"/>
               <a:t>04/28/2025</a:t>
             </a:fld>
@@ -10589,7 +10388,7 @@
         <p:txBody>
           <a:bodyPr/>
           <a:p>
-            <a:fld id="{5C758012-8F33-4384-B66F-64684FCFD3B5}" type="slidenum">
+            <a:fld id="{26E66D4C-113C-4C4F-BDCB-7FCB5B7C5D96}" type="slidenum">
               <a:t>7</a:t>
             </a:fld>
           </a:p>
@@ -10609,7 +10408,7 @@
         <p:txBody>
           <a:bodyPr/>
           <a:p>
-            <a:fld id="{3D7A7FBF-CB5B-4417-8FCA-7FE5896259D1}" type="datetime1">
+            <a:fld id="{8ED492AC-1487-42E1-842B-29DC022813D0}" type="datetime1">
               <a:rPr lang="en-US"/>
               <a:t>04/28/2025</a:t>
             </a:fld>
@@ -10794,7 +10593,7 @@
         <p:txBody>
           <a:bodyPr/>
           <a:p>
-            <a:fld id="{FAFEBFF2-24F0-4BD3-8114-7BA23E447305}" type="slidenum">
+            <a:fld id="{0CF9D525-3732-4986-A213-CD0A86F9FEF3}" type="slidenum">
               <a:t>8</a:t>
             </a:fld>
           </a:p>
@@ -10814,7 +10613,7 @@
         <p:txBody>
           <a:bodyPr/>
           <a:p>
-            <a:fld id="{857D21B2-7CAB-4394-B638-3EF0FFCDAA31}" type="datetime1">
+            <a:fld id="{0431EBEF-EA02-4853-A98F-9DCDD9C547F9}" type="datetime1">
               <a:rPr lang="en-US"/>
               <a:t>04/28/2025</a:t>
             </a:fld>
@@ -11005,7 +10804,7 @@
         <p:txBody>
           <a:bodyPr/>
           <a:p>
-            <a:fld id="{6DACF435-83CB-41EE-B77C-F01EE2161FE9}" type="slidenum">
+            <a:fld id="{F9AD1578-6BDB-4D1C-9BF4-9AA30FDB7F6B}" type="slidenum">
               <a:t>9</a:t>
             </a:fld>
           </a:p>
@@ -11025,7 +10824,7 @@
         <p:txBody>
           <a:bodyPr/>
           <a:p>
-            <a:fld id="{D44E851D-D003-41F5-99DA-EE0B9E293CE4}" type="datetime1">
+            <a:fld id="{6EBA1F58-7D81-4D4F-8643-EDDA923A2FE1}" type="datetime1">
               <a:rPr lang="en-US"/>
               <a:t>04/28/2025</a:t>
             </a:fld>

</xml_diff>